<commit_message>
ejercicios de Waits, buscar peliculas imdb y inmobiliaria colombia
</commit_message>
<xml_diff>
--- a/presentations/SeleniumModule4a.pptx
+++ b/presentations/SeleniumModule4a.pptx
@@ -5,7 +5,7 @@
     <p:sldMasterId id="2147483664" r:id="rId1"/>
   </p:sldMasterIdLst>
   <p:notesMasterIdLst>
-    <p:notesMasterId r:id="rId30"/>
+    <p:notesMasterId r:id="rId35"/>
   </p:notesMasterIdLst>
   <p:sldIdLst>
     <p:sldId id="256" r:id="rId2"/>
@@ -25,17 +25,22 @@
     <p:sldId id="299" r:id="rId16"/>
     <p:sldId id="300" r:id="rId17"/>
     <p:sldId id="301" r:id="rId18"/>
-    <p:sldId id="279" r:id="rId19"/>
-    <p:sldId id="280" r:id="rId20"/>
-    <p:sldId id="281" r:id="rId21"/>
-    <p:sldId id="282" r:id="rId22"/>
-    <p:sldId id="284" r:id="rId23"/>
-    <p:sldId id="287" r:id="rId24"/>
-    <p:sldId id="290" r:id="rId25"/>
-    <p:sldId id="283" r:id="rId26"/>
-    <p:sldId id="285" r:id="rId27"/>
-    <p:sldId id="286" r:id="rId28"/>
-    <p:sldId id="289" r:id="rId29"/>
+    <p:sldId id="302" r:id="rId19"/>
+    <p:sldId id="303" r:id="rId20"/>
+    <p:sldId id="304" r:id="rId21"/>
+    <p:sldId id="305" r:id="rId22"/>
+    <p:sldId id="306" r:id="rId23"/>
+    <p:sldId id="279" r:id="rId24"/>
+    <p:sldId id="280" r:id="rId25"/>
+    <p:sldId id="281" r:id="rId26"/>
+    <p:sldId id="282" r:id="rId27"/>
+    <p:sldId id="284" r:id="rId28"/>
+    <p:sldId id="287" r:id="rId29"/>
+    <p:sldId id="290" r:id="rId30"/>
+    <p:sldId id="283" r:id="rId31"/>
+    <p:sldId id="285" r:id="rId32"/>
+    <p:sldId id="286" r:id="rId33"/>
+    <p:sldId id="289" r:id="rId34"/>
   </p:sldIdLst>
   <p:sldSz cx="12192000" cy="6858000"/>
   <p:notesSz cx="6858000" cy="9144000"/>
@@ -3549,7 +3554,7 @@
             <a:spLocks noGrp="1" noRot="1" noChangeAspect="1" noChangeArrowheads="1"/>
             <a:extLst>
               <a:ext uri="smNativeData">
-                <pr:smNativeData xmlns="" xmlns:p14="http://schemas.microsoft.com/office/powerpoint/2010/main" xmlns:pr="smNativeData" val="SMDATA_13_w78LXxMAAAAlAAAACwAAAC0AAAAAAAAAAAAAAAAAAAAAAAAAAAAAAAAAAAAAAAAAAAEAAABQAAAAAAAAAAAA4D8AAAAAAADgPwAAAAAAAOA/AAAAAAAA4D8AAAAAAADgPwAAAAAAAOA/AAAAAAAA4D8AAAAAAADgPwAAAAAAAOA/AAAAAAAA4D8CAAAAjAAAAAAAAAAAAAAABY3HDP///wgAAAAAAAAAAAAAAAAAAAAAAAAAAAAAAAAAAAAAZAAAAAEAAABAAAAAAAAAAAAAAAAAAAAAAAAAAAAAAAAAAAAAAAAAAAAAAAAAAAAAAAAAAAAAAAAAAAAAAAAAAAAAAAAAAAAAAAAAAAAAAAAAAAAAAAAAAAAAAAAAAAAAFAAAADwAAAABAAAAAAAAAAAAAAAPAAAAAQAAACMAAAAjAAAAIwAAAB4AAAAAAAAASwAAAEsAAAAAAAAASwAAAEsAAAAVAAAAYAAAAAAAAAAAAAAADwAAACADAAAAAAAAAAAAAAEAAACgMgAAVgcAAKr4//8BAAAAf39/AAEAAABkAAAAAAAAABQAAABAHwAAAAAAACYAAAAAAAAAwOD//wAAAAAmAAAAZAAAABYAAABMAAAAAAAAAAAAAAAEAAAAAAAAAAEAAAAVgVgKAAAAACgAAAAoAAAAZAAAAGQAAAAAAAAAzMzMAAAAAABQAAAAUAAAAGQAAABkAAAAAAAAABcAAAAUAAAAAAAAAAAAAAD/fwAA/38AAAAAAAAJAAAABAAAAAAAAAAMAAAAEAAAAAAAAAAAAAAAAAAAAAAAAAAeAAAAaAAAAAAAAAAAAAAAAAAAAAAAAAAAAAAAECcAABAnAAAAAAAAAAAAAAAAAAAAAAAAAAAAAAAAAAAAAAAAAAAAABQAAAAAAAAAwMD/AAAAAABkAAAAMgAAAAAAAABkAAAAAAAAAH9/fwAKAAAAHwAAAFQAAAAAAAAFAAAAAQAAAAAAAAAAAAAAAAAAAAAAAAAAAAAAAAAAAAAAAAAAAAAAAH9/fwAAAAADzMzMAMDA/wB/f38AAAAAAAAAAAAAAAAAAAAAAAAAAAAhAAAAGAAAABQAAAAIBwAAOAQAACkjAABQGQAAEAAAACYAAAAIAAAAAQ8AAP8fAAA="/>
+                <pr:smNativeData xmlns:pr="smNativeData" xmlns:p14="http://schemas.microsoft.com/office/powerpoint/2010/main" xmlns="" val="SMDATA_13_w78LXxMAAAAlAAAACwAAAC0AAAAAAAAAAAAAAAAAAAAAAAAAAAAAAAAAAAAAAAAAAAEAAABQAAAAAAAAAAAA4D8AAAAAAADgPwAAAAAAAOA/AAAAAAAA4D8AAAAAAADgPwAAAAAAAOA/AAAAAAAA4D8AAAAAAADgPwAAAAAAAOA/AAAAAAAA4D8CAAAAjAAAAAAAAAAAAAAABY3HDP///wgAAAAAAAAAAAAAAAAAAAAAAAAAAAAAAAAAAAAAZAAAAAEAAABAAAAAAAAAAAAAAAAAAAAAAAAAAAAAAAAAAAAAAAAAAAAAAAAAAAAAAAAAAAAAAAAAAAAAAAAAAAAAAAAAAAAAAAAAAAAAAAAAAAAAAAAAAAAAAAAAAAAAFAAAADwAAAABAAAAAAAAAAAAAAAPAAAAAQAAACMAAAAjAAAAIwAAAB4AAAAAAAAASwAAAEsAAAAAAAAASwAAAEsAAAAVAAAAYAAAAAAAAAAAAAAADwAAACADAAAAAAAAAAAAAAEAAACgMgAAVgcAAKr4//8BAAAAf39/AAEAAABkAAAAAAAAABQAAABAHwAAAAAAACYAAAAAAAAAwOD//wAAAAAmAAAAZAAAABYAAABMAAAAAAAAAAAAAAAEAAAAAAAAAAEAAAAVgVgKAAAAACgAAAAoAAAAZAAAAGQAAAAAAAAAzMzMAAAAAABQAAAAUAAAAGQAAABkAAAAAAAAABcAAAAUAAAAAAAAAAAAAAD/fwAA/38AAAAAAAAJAAAABAAAAAAAAAAMAAAAEAAAAAAAAAAAAAAAAAAAAAAAAAAeAAAAaAAAAAAAAAAAAAAAAAAAAAAAAAAAAAAAECcAABAnAAAAAAAAAAAAAAAAAAAAAAAAAAAAAAAAAAAAAAAAAAAAABQAAAAAAAAAwMD/AAAAAABkAAAAMgAAAAAAAABkAAAAAAAAAH9/fwAKAAAAHwAAAFQAAAAAAAAFAAAAAQAAAAAAAAAAAAAAAAAAAAAAAAAAAAAAAAAAAAAAAAAAAAAAAH9/fwAAAAADzMzMAMDA/wB/f38AAAAAAAAAAAAAAAAAAAAAAAAAAAAhAAAAGAAAABQAAAAIBwAAOAQAACkjAABQGQAAEAAAACYAAAAIAAAAAQ8AAP8fAAA="/>
               </a:ext>
             </a:extLst>
           </p:cNvSpPr>
@@ -3604,7 +3609,7 @@
             <a:spLocks noGrp="1" noChangeArrowheads="1"/>
             <a:extLst>
               <a:ext uri="smNativeData">
-                <pr:smNativeData xmlns="" xmlns:p14="http://schemas.microsoft.com/office/powerpoint/2010/main" xmlns:pr="smNativeData" val="SMDATA_13_w78LXxMAAAAlAAAAZAAAAA0AAAAAkAAAAJAAAACQAAAAkAAAAAAAAAAAAAAAAAAAAAEAAABQAAAAAAAAAAAA4D8AAAAAAADgPwAAAAAAAOA/AAAAAAAA4D8AAAAAAADgPwAAAAAAAOA/AAAAAAAA4D8AAAAAAADgPwAAAAAAAOA/AAAAAAAA4D8CAAAAjAAAAAAAAAAAAAAABY3HDP///wgAAAAAAAAAAAAAAAAAAAAAAAAAAAAAAAAAAAAAZAAAAAEAAABAAAAAAAAAAAAAAAAAAAAAAAAAAAAAAAAAAAAAAAAAAAAAAAAAAAAAAAAAAAAAAAAAAAAAAAAAAAAAAAAAAAAAAAAAAAAAAAAAAAAAAAAAAAAAAAAAAAAAFAAAADwAAAAAAAAAAAAAAAAAAAkUAAAAAQAAABQAAAAUAAAAFAAAAAEAAAAAAAAAZAAAAGQAAAAAAAAAZAAAAGQAAAAVAAAAYAAAAAAAAAAAAAAADwAAACADAAAAAAAAAAAAAAEAAACgMgAAVgcAAKr4//8BAAAAf39/AAEAAABkAAAAAAAAABQAAABAHwAAAAAAACYAAAAAAAAAwOD//wAAAAAmAAAAZAAAABYAAABMAAAAAAAAAAAAAAAEAAAAAAAAAAEAAAAVgVgKAAAAACgAAAAoAAAAZAAAAGQAAAAAAAAAzMzMAAAAAABQAAAAUAAAAGQAAABkAAAAAAAAABcAAAAUAAAAAAAAAAAAAAD/fwAA/38AAAAAAAAJAAAABAAAAAAAAAAMAAAAEAAAAAAAAAAAAAAAAAAAAAAAAAAeAAAAaAAAAAAAAAAAAAAAAAAAAAAAAAAAAAAAECcAABAnAAAAAAAAAAAAAAAAAAAAAAAAAAAAAAAAAAAAAAAAAAAAABQAAAAAAAAAwMD/AAAAAABkAAAAMgAAAAAAAABkAAAAAAAAAH9/fwAKAAAAHwAAAFQAAAAAAAAFAAAAAQAAAAAAAAAAAAAAAAAAAAAAAAAAAAAAAAAAAAAAAAAAAAAAAn9/fwAAAAADzMzMAMDA/wB/f38AAAAAAAAAAAAAAAAAAAAAAAAAAAAhAAAAGAAAABQAAAA4BAAAuBoAAPglAAAINAAAEAAAACYAAAAIAAAAvZ8AAP8fAAA="/>
+                <pr:smNativeData xmlns:pr="smNativeData" xmlns:p14="http://schemas.microsoft.com/office/powerpoint/2010/main" xmlns="" val="SMDATA_13_w78LXxMAAAAlAAAAZAAAAA0AAAAAkAAAAJAAAACQAAAAkAAAAAAAAAAAAAAAAAAAAAEAAABQAAAAAAAAAAAA4D8AAAAAAADgPwAAAAAAAOA/AAAAAAAA4D8AAAAAAADgPwAAAAAAAOA/AAAAAAAA4D8AAAAAAADgPwAAAAAAAOA/AAAAAAAA4D8CAAAAjAAAAAAAAAAAAAAABY3HDP///wgAAAAAAAAAAAAAAAAAAAAAAAAAAAAAAAAAAAAAZAAAAAEAAABAAAAAAAAAAAAAAAAAAAAAAAAAAAAAAAAAAAAAAAAAAAAAAAAAAAAAAAAAAAAAAAAAAAAAAAAAAAAAAAAAAAAAAAAAAAAAAAAAAAAAAAAAAAAAAAAAAAAAFAAAADwAAAAAAAAAAAAAAAAAAAkUAAAAAQAAABQAAAAUAAAAFAAAAAEAAAAAAAAAZAAAAGQAAAAAAAAAZAAAAGQAAAAVAAAAYAAAAAAAAAAAAAAADwAAACADAAAAAAAAAAAAAAEAAACgMgAAVgcAAKr4//8BAAAAf39/AAEAAABkAAAAAAAAABQAAABAHwAAAAAAACYAAAAAAAAAwOD//wAAAAAmAAAAZAAAABYAAABMAAAAAAAAAAAAAAAEAAAAAAAAAAEAAAAVgVgKAAAAACgAAAAoAAAAZAAAAGQAAAAAAAAAzMzMAAAAAABQAAAAUAAAAGQAAABkAAAAAAAAABcAAAAUAAAAAAAAAAAAAAD/fwAA/38AAAAAAAAJAAAABAAAAAAAAAAMAAAAEAAAAAAAAAAAAAAAAAAAAAAAAAAeAAAAaAAAAAAAAAAAAAAAAAAAAAAAAAAAAAAAECcAABAnAAAAAAAAAAAAAAAAAAAAAAAAAAAAAAAAAAAAAAAAAAAAABQAAAAAAAAAwMD/AAAAAABkAAAAMgAAAAAAAABkAAAAAAAAAH9/fwAKAAAAHwAAAFQAAAAAAAAFAAAAAQAAAAAAAAAAAAAAAAAAAAAAAAAAAAAAAAAAAAAAAAAAAAAAAn9/fwAAAAADzMzMAMDA/wB/f38AAAAAAAAAAAAAAAAAAAAAAAAAAAAhAAAAGAAAABQAAAA4BAAAuBoAAPglAAAINAAAEAAAACYAAAAIAAAAvZ8AAP8fAAA="/>
               </a:ext>
             </a:extLst>
           </p:cNvSpPr>
@@ -3976,7 +3981,7 @@
             <a:spLocks noGrp="1" noChangeArrowheads="1"/>
             <a:extLst>
               <a:ext uri="smNativeData">
-                <pr:smNativeData xmlns="" xmlns:p14="http://schemas.microsoft.com/office/powerpoint/2010/main" xmlns:pr="smNativeData" val="SMDATA_13_w78LXxMAAAAlAAAAZAAAAA0AAAAAkAAAAJAAAACQAAAAkAAAAAAAAAABAAAAAAAAAAEAAABQAAAAAAAAAAAA4D8AAAAAAADgPwAAAAAAAOA/AAAAAAAA4D8AAAAAAADgPwAAAAAAAOA/AAAAAAAA4D8AAAAAAADgPwAAAAAAAOA/AAAAAAAA4D8CAAAAjAAAAAAAAAAAAAAAkMImDP///wgAAAAAAAAAAAAAAAAAAAAAAAAAAAAAAAAAAAAAZAAAAAEAAABAAAAAAAAAAAAAAAAAAAAAAAAAAAAAAAAAAAAAAAAAAAAAAAAAAAAAAAAAAAAAAAAAAAAAAAAAAAAAAAAAAAAAAAAAAAAAAAAAAAAAAAAAAAAAAAAAAAAAFAAAADwAAAAAAAAAAAAAAAAAAAkUAAAAAQAAABQAAAAUAAAAFAAAAAEAAAAAAAAAZAAAAGQAAAAAAAAAZAAAAGQAAAAVAAAAYAAAAAAAAAAAAAAADwAAACADAAAAAAAAAAAAAAEAAACgMgAAVgcAAKr4//8BAAAAf39/AAEAAABkAAAAAAAAABQAAABAHwAAAAAAACYAAAAAAAAAwOD//wAAAAAmAAAAZAAAABYAAABMAAAAAAAAAAAAAAAEAAAAAAAAAAEAAAAsPEMKAAAAACgAAAAoAAAAZAAAAGQAAAAAAAAAzMzMAAAAAABQAAAAUAAAAGQAAABkAAAAAAAAABcAAAAUAAAAAAAAAAAAAAD/fwAA/38AAAAAAAAJAAAABAAAAAAAAAAMAAAAEAAAAAAAAAAAAAAAAAAAAAAAAAAeAAAAaAAAAAAAAAAAAAAAAAAAAAAAAAAAAAAAECcAABAnAAAAAAAAAAAAAAAAAAAAAAAAAAAAAAAAAAAAAAAAAAAAABQAAAAAAAAAwMD/AAAAAABkAAAAMgAAAAAAAABkAAAAAAAAAH9/fwAKAAAAHwAAAFQAAAAAAAAFAAAAAQAAAAAAAAAAAAAAAAAAAAAAAAAAAAAAAAAAAAAAAAAAAAAAAn9/fwAAAAADzMzMAMDA/wB/f38AAAAAAAAAAAAAAAAAAAAAAAAAAAAhAAAAGAAAABQAAAA4BAAAuBoAAPglAAAINAAAEAAAACYAAAAIAAAAvT8AAP8fAAA="/>
+                <pr:smNativeData xmlns:pr="smNativeData" xmlns:p14="http://schemas.microsoft.com/office/powerpoint/2010/main" xmlns="" val="SMDATA_13_w78LXxMAAAAlAAAAZAAAAA0AAAAAkAAAAJAAAACQAAAAkAAAAAAAAAABAAAAAAAAAAEAAABQAAAAAAAAAAAA4D8AAAAAAADgPwAAAAAAAOA/AAAAAAAA4D8AAAAAAADgPwAAAAAAAOA/AAAAAAAA4D8AAAAAAADgPwAAAAAAAOA/AAAAAAAA4D8CAAAAjAAAAAAAAAAAAAAAkMImDP///wgAAAAAAAAAAAAAAAAAAAAAAAAAAAAAAAAAAAAAZAAAAAEAAABAAAAAAAAAAAAAAAAAAAAAAAAAAAAAAAAAAAAAAAAAAAAAAAAAAAAAAAAAAAAAAAAAAAAAAAAAAAAAAAAAAAAAAAAAAAAAAAAAAAAAAAAAAAAAAAAAAAAAFAAAADwAAAAAAAAAAAAAAAAAAAkUAAAAAQAAABQAAAAUAAAAFAAAAAEAAAAAAAAAZAAAAGQAAAAAAAAAZAAAAGQAAAAVAAAAYAAAAAAAAAAAAAAADwAAACADAAAAAAAAAAAAAAEAAACgMgAAVgcAAKr4//8BAAAAf39/AAEAAABkAAAAAAAAABQAAABAHwAAAAAAACYAAAAAAAAAwOD//wAAAAAmAAAAZAAAABYAAABMAAAAAAAAAAAAAAAEAAAAAAAAAAEAAAAsPEMKAAAAACgAAAAoAAAAZAAAAGQAAAAAAAAAzMzMAAAAAABQAAAAUAAAAGQAAABkAAAAAAAAABcAAAAUAAAAAAAAAAAAAAD/fwAA/38AAAAAAAAJAAAABAAAAAAAAAAMAAAAEAAAAAAAAAAAAAAAAAAAAAAAAAAeAAAAaAAAAAAAAAAAAAAAAAAAAAAAAAAAAAAAECcAABAnAAAAAAAAAAAAAAAAAAAAAAAAAAAAAAAAAAAAAAAAAAAAABQAAAAAAAAAwMD/AAAAAABkAAAAMgAAAAAAAABkAAAAAAAAAH9/fwAKAAAAHwAAAFQAAAAAAAAFAAAAAQAAAAAAAAAAAAAAAAAAAAAAAAAAAAAAAAAAAAAAAAAAAAAAAn9/fwAAAAADzMzMAMDA/wB/f38AAAAAAAAAAAAAAAAAAAAAAAAAAAAhAAAAGAAAABQAAAA4BAAAuBoAAPglAAAINAAAEAAAACYAAAAIAAAAvT8AAP8fAAA="/>
               </a:ext>
             </a:extLst>
           </p:cNvSpPr>
@@ -4025,7 +4030,7 @@
             <a:spLocks noGrp="1" noRot="1" noChangeAspect="1" noChangeArrowheads="1"/>
             <a:extLst>
               <a:ext uri="smNativeData">
-                <pr:smNativeData xmlns="" xmlns:p14="http://schemas.microsoft.com/office/powerpoint/2010/main" xmlns:pr="smNativeData" val="SMDATA_13_w78LXxMAAAAlAAAACwAAAC0AAAAAAAAAAAAAAAAAAAAAAAAAAAAAAAAAAAAAAAAAAAEAAABQAAAAAAAAAAAA4D8AAAAAAADgPwAAAAAAAOA/AAAAAAAA4D8AAAAAAADgPwAAAAAAAOA/AAAAAAAA4D8AAAAAAADgPwAAAAAAAOA/AAAAAAAA4D8CAAAAjAAAAAAAAAAAAAAAkMImDP///wgAAAAAAAAAAAAAAAAAAAAAAAAAAAAAAAAAAAAAZAAAAAEAAABAAAAAAAAAAAAAAAAAAAAAAAAAAAAAAAAAAAAAAAAAAAAAAAAAAAAAAAAAAAAAAAAAAAAAAAAAAAAAAAAAAAAAAAAAAAAAAAAAAAAAAAAAAAAAAAAAAAAAFAAAADwAAAABAAAAAAAAAAAAAAAPAAAAAQAAACMAAAAjAAAAIwAAAB4AAAAAAAAASwAAAEsAAAAAAAAASwAAAEsAAAAVAAAAYAAAAAAAAAAAAAAADwAAACADAAAAAAAAAAAAAAEAAACgMgAAVgcAAKr4//8BAAAAf39/AAEAAABkAAAAAAAAABQAAABAHwAAAAAAACYAAAAAAAAAwOD//wAAAAAmAAAAZAAAABYAAABMAAAAAAAAAAAAAAAEAAAAAAAAAAEAAAAsPEMKAAAAACgAAAAoAAAAZAAAAGQAAAAAAAAAzMzMAAAAAABQAAAAUAAAAGQAAABkAAAAAAAAABcAAAAUAAAAAAAAAAAAAAD/fwAA/38AAAAAAAAJAAAABAAAAAAAAAAMAAAAEAAAAAAAAAAAAAAAAAAAAAAAAAAeAAAAaAAAAAAAAAAAAAAAAAAAAAAAAAAAAAAAECcAABAnAAAAAAAAAAAAAAAAAAAAAAAAAAAAAAAAAAAAAAAAAAAAABQAAAAAAAAAwMD/AAAAAABkAAAAMgAAAAAAAABkAAAAAAAAAH9/fwAKAAAAHwAAAFQAAAAAAAAFAAAAAQAAAAAAAAAAAAAAAAAAAAAAAAAAAAAAAAAAAAAAAAAAAAAAAH9/fwAAAAADzMzMAMDA/wB/f38AAAAAAAAAAAAAAAAAAAAAAAAAAAAhAAAAGAAAABQAAABYAgAAOAQAANgnAABQGQAAEAAAACYAAAAIAAAAAQ8AAAAAAAA="/>
+                <pr:smNativeData xmlns:pr="smNativeData" xmlns:p14="http://schemas.microsoft.com/office/powerpoint/2010/main" xmlns="" val="SMDATA_13_w78LXxMAAAAlAAAACwAAAC0AAAAAAAAAAAAAAAAAAAAAAAAAAAAAAAAAAAAAAAAAAAEAAABQAAAAAAAAAAAA4D8AAAAAAADgPwAAAAAAAOA/AAAAAAAA4D8AAAAAAADgPwAAAAAAAOA/AAAAAAAA4D8AAAAAAADgPwAAAAAAAOA/AAAAAAAA4D8CAAAAjAAAAAAAAAAAAAAAkMImDP///wgAAAAAAAAAAAAAAAAAAAAAAAAAAAAAAAAAAAAAZAAAAAEAAABAAAAAAAAAAAAAAAAAAAAAAAAAAAAAAAAAAAAAAAAAAAAAAAAAAAAAAAAAAAAAAAAAAAAAAAAAAAAAAAAAAAAAAAAAAAAAAAAAAAAAAAAAAAAAAAAAAAAAFAAAADwAAAABAAAAAAAAAAAAAAAPAAAAAQAAACMAAAAjAAAAIwAAAB4AAAAAAAAASwAAAEsAAAAAAAAASwAAAEsAAAAVAAAAYAAAAAAAAAAAAAAADwAAACADAAAAAAAAAAAAAAEAAACgMgAAVgcAAKr4//8BAAAAf39/AAEAAABkAAAAAAAAABQAAABAHwAAAAAAACYAAAAAAAAAwOD//wAAAAAmAAAAZAAAABYAAABMAAAAAAAAAAAAAAAEAAAAAAAAAAEAAAAsPEMKAAAAACgAAAAoAAAAZAAAAGQAAAAAAAAAzMzMAAAAAABQAAAAUAAAAGQAAABkAAAAAAAAABcAAAAUAAAAAAAAAAAAAAD/fwAA/38AAAAAAAAJAAAABAAAAAAAAAAMAAAAEAAAAAAAAAAAAAAAAAAAAAAAAAAeAAAAaAAAAAAAAAAAAAAAAAAAAAAAAAAAAAAAECcAABAnAAAAAAAAAAAAAAAAAAAAAAAAAAAAAAAAAAAAAAAAAAAAABQAAAAAAAAAwMD/AAAAAABkAAAAMgAAAAAAAABkAAAAAAAAAH9/fwAKAAAAHwAAAFQAAAAAAAAFAAAAAQAAAAAAAAAAAAAAAAAAAAAAAAAAAAAAAAAAAAAAAAAAAAAAAH9/fwAAAAADzMzMAMDA/wB/f38AAAAAAAAAAAAAAAAAAAAAAAAAAAAhAAAAGAAAABQAAABYAgAAOAQAANgnAABQGQAAEAAAACYAAAAIAAAAAQ8AAAAAAAA="/>
               </a:ext>
             </a:extLst>
           </p:cNvSpPr>
@@ -4104,7 +4109,7 @@
             <a:spLocks noGrp="1" noChangeArrowheads="1"/>
             <a:extLst>
               <a:ext uri="smNativeData">
-                <pr:smNativeData xmlns="" xmlns:p14="http://schemas.microsoft.com/office/powerpoint/2010/main" xmlns:pr="smNativeData" val="SMDATA_13_w78LXxMAAAAlAAAAZAAAAA0AAAAAkAAAAJAAAACQAAAAkAAAAAAAAAABAAAAAAAAAAEAAABQAAAAAAAAAAAA4D8AAAAAAADgPwAAAAAAAOA/AAAAAAAA4D8AAAAAAADgPwAAAAAAAOA/AAAAAAAA4D8AAAAAAADgPwAAAAAAAOA/AAAAAAAA4D8CAAAAjAAAAAAAAAAAAAAAkMImDP///wgAAAAAAAAAAAAAAAAAAAAAAAAAAAAAAAAAAAAAZAAAAAEAAABAAAAAAAAAAAAAAAAAAAAAAAAAAAAAAAAAAAAAAAAAAAAAAAAAAAAAAAAAAAAAAAAAAAAAAAAAAAAAAAAAAAAAAAAAAAAAAAAAAAAAAAAAAAAAAAAAAAAAFAAAADwAAAAAAAAAAAAAAAAAAAkUAAAAAQAAABQAAAAUAAAAFAAAAAEAAAAAAAAAZAAAAGQAAAAAAAAAZAAAAGQAAAAVAAAAYAAAAAAAAAAAAAAADwAAACADAAAAAAAAAAAAAAEAAACgMgAAVgcAAKr4//8BAAAAf39/AAEAAABkAAAAAAAAABQAAABAHwAAAAAAACYAAAAAAAAAwOD//wAAAAAmAAAAZAAAABYAAABMAAAAAAAAAAAAAAAEAAAAAAAAAAEAAAAsPEMKAAAAACgAAAAoAAAAZAAAAGQAAAAAAAAAzMzMAAAAAABQAAAAUAAAAGQAAABkAAAAAAAAABcAAAAUAAAAAAAAAAAAAAD/fwAA/38AAAAAAAAJAAAABAAAAAAAAAAMAAAAEAAAAAAAAAAAAAAAAAAAAAAAAAAeAAAAaAAAAAAAAAAAAAAAAAAAAAAAAAAAAAAAECcAABAnAAAAAAAAAAAAAAAAAAAAAAAAAAAAAAAAAAAAAAAAAAAAABQAAAAAAAAAwMD/AAAAAABkAAAAMgAAAAAAAABkAAAAAAAAAH9/fwAKAAAAHwAAAFQAAAAAAAAFAAAAAQAAAAAAAAAAAAAAAAAAAAAAAAAAAAAAAAAAAAAAAAAAAAAAAn9/fwAAAAADzMzMAMDA/wB/f38AAAAAAAAAAAAAAAAAAAAAAAAAAAAhAAAAGAAAABQAAAA4BAAAuBoAAPglAAAINAAAEAAAACYAAAAIAAAAvT8AAP8fAAA="/>
+                <pr:smNativeData xmlns:pr="smNativeData" xmlns:p14="http://schemas.microsoft.com/office/powerpoint/2010/main" xmlns="" val="SMDATA_13_w78LXxMAAAAlAAAAZAAAAA0AAAAAkAAAAJAAAACQAAAAkAAAAAAAAAABAAAAAAAAAAEAAABQAAAAAAAAAAAA4D8AAAAAAADgPwAAAAAAAOA/AAAAAAAA4D8AAAAAAADgPwAAAAAAAOA/AAAAAAAA4D8AAAAAAADgPwAAAAAAAOA/AAAAAAAA4D8CAAAAjAAAAAAAAAAAAAAAkMImDP///wgAAAAAAAAAAAAAAAAAAAAAAAAAAAAAAAAAAAAAZAAAAAEAAABAAAAAAAAAAAAAAAAAAAAAAAAAAAAAAAAAAAAAAAAAAAAAAAAAAAAAAAAAAAAAAAAAAAAAAAAAAAAAAAAAAAAAAAAAAAAAAAAAAAAAAAAAAAAAAAAAAAAAFAAAADwAAAAAAAAAAAAAAAAAAAkUAAAAAQAAABQAAAAUAAAAFAAAAAEAAAAAAAAAZAAAAGQAAAAAAAAAZAAAAGQAAAAVAAAAYAAAAAAAAAAAAAAADwAAACADAAAAAAAAAAAAAAEAAACgMgAAVgcAAKr4//8BAAAAf39/AAEAAABkAAAAAAAAABQAAABAHwAAAAAAACYAAAAAAAAAwOD//wAAAAAmAAAAZAAAABYAAABMAAAAAAAAAAAAAAAEAAAAAAAAAAEAAAAsPEMKAAAAACgAAAAoAAAAZAAAAGQAAAAAAAAAzMzMAAAAAABQAAAAUAAAAGQAAABkAAAAAAAAABcAAAAUAAAAAAAAAAAAAAD/fwAA/38AAAAAAAAJAAAABAAAAAAAAAAMAAAAEAAAAAAAAAAAAAAAAAAAAAAAAAAeAAAAaAAAAAAAAAAAAAAAAAAAAAAAAAAAAAAAECcAABAnAAAAAAAAAAAAAAAAAAAAAAAAAAAAAAAAAAAAAAAAAAAAABQAAAAAAAAAwMD/AAAAAABkAAAAMgAAAAAAAABkAAAAAAAAAH9/fwAKAAAAHwAAAFQAAAAAAAAFAAAAAQAAAAAAAAAAAAAAAAAAAAAAAAAAAAAAAAAAAAAAAAAAAAAAAn9/fwAAAAADzMzMAMDA/wB/f38AAAAAAAAAAAAAAAAAAAAAAAAAAAAhAAAAGAAAABQAAAA4BAAAuBoAAPglAAAINAAAEAAAACYAAAAIAAAAvT8AAP8fAAA="/>
               </a:ext>
             </a:extLst>
           </p:cNvSpPr>
@@ -4153,7 +4158,7 @@
             <a:spLocks noGrp="1" noRot="1" noChangeAspect="1" noChangeArrowheads="1"/>
             <a:extLst>
               <a:ext uri="smNativeData">
-                <pr:smNativeData xmlns="" xmlns:p14="http://schemas.microsoft.com/office/powerpoint/2010/main" xmlns:pr="smNativeData" val="SMDATA_13_w78LXxMAAAAlAAAACwAAAC0AAAAAAAAAAAAAAAAAAAAAAAAAAAAAAAAAAAAAAAAAAAEAAABQAAAAAAAAAAAA4D8AAAAAAADgPwAAAAAAAOA/AAAAAAAA4D8AAAAAAADgPwAAAAAAAOA/AAAAAAAA4D8AAAAAAADgPwAAAAAAAOA/AAAAAAAA4D8CAAAAjAAAAAAAAAAAAAAAkMImDP///wgAAAAAAAAAAAAAAAAAAAAAAAAAAAAAAAAAAAAAZAAAAAEAAABAAAAAAAAAAAAAAAAAAAAAAAAAAAAAAAAAAAAAAAAAAAAAAAAAAAAAAAAAAAAAAAAAAAAAAAAAAAAAAAAAAAAAAAAAAAAAAAAAAAAAAAAAAAAAAAAAAAAAFAAAADwAAAABAAAAAAAAAAAAAAAPAAAAAQAAACMAAAAjAAAAIwAAAB4AAAAAAAAASwAAAEsAAAAAAAAASwAAAEsAAAAVAAAAYAAAAAAAAAAAAAAADwAAACADAAAAAAAAAAAAAAEAAACgMgAAVgcAAKr4//8BAAAAf39/AAEAAABkAAAAAAAAABQAAABAHwAAAAAAACYAAAAAAAAAwOD//wAAAAAmAAAAZAAAABYAAABMAAAAAAAAAAAAAAAEAAAAAAAAAAEAAAAsPEMKAAAAACgAAAAoAAAAZAAAAGQAAAAAAAAAzMzMAAAAAABQAAAAUAAAAGQAAABkAAAAAAAAABcAAAAUAAAAAAAAAAAAAAD/fwAA/38AAAAAAAAJAAAABAAAAGATAAAMAAAAEAAAAAAAAAAAAAAAAAAAAAAAAAAeAAAAaAAAAAAAAAAAAAAAAAAAAAAAAAAAAAAAECcAABAnAAAAAAAAAAAAAAAAAAAAAAAAAAAAAAAAAAAAAAAAAAAAABQAAAAAAAAAwMD/AAAAAABkAAAAMgAAAAAAAABkAAAAAAAAAH9/fwAKAAAAHwAAAFQAAAAAAAAFAAAAAQAAAAAAAAAAAAAAAAAAAAAAAAAAAAAAAAAAAAAAAAAAAAAAAH9/fwAAAAADzMzMAMDA/wB/f38AAAAAAAAAAAAAAAAAAAAAAAAAAAAhAAAAGAAAABQAAABYAgAAOAQAANgnAABQGQAAEAAAACYAAAAIAAAAAQ8AAAAAAAA="/>
+                <pr:smNativeData xmlns:pr="smNativeData" xmlns:p14="http://schemas.microsoft.com/office/powerpoint/2010/main" xmlns="" val="SMDATA_13_w78LXxMAAAAlAAAACwAAAC0AAAAAAAAAAAAAAAAAAAAAAAAAAAAAAAAAAAAAAAAAAAEAAABQAAAAAAAAAAAA4D8AAAAAAADgPwAAAAAAAOA/AAAAAAAA4D8AAAAAAADgPwAAAAAAAOA/AAAAAAAA4D8AAAAAAADgPwAAAAAAAOA/AAAAAAAA4D8CAAAAjAAAAAAAAAAAAAAAkMImDP///wgAAAAAAAAAAAAAAAAAAAAAAAAAAAAAAAAAAAAAZAAAAAEAAABAAAAAAAAAAAAAAAAAAAAAAAAAAAAAAAAAAAAAAAAAAAAAAAAAAAAAAAAAAAAAAAAAAAAAAAAAAAAAAAAAAAAAAAAAAAAAAAAAAAAAAAAAAAAAAAAAAAAAFAAAADwAAAABAAAAAAAAAAAAAAAPAAAAAQAAACMAAAAjAAAAIwAAAB4AAAAAAAAASwAAAEsAAAAAAAAASwAAAEsAAAAVAAAAYAAAAAAAAAAAAAAADwAAACADAAAAAAAAAAAAAAEAAACgMgAAVgcAAKr4//8BAAAAf39/AAEAAABkAAAAAAAAABQAAABAHwAAAAAAACYAAAAAAAAAwOD//wAAAAAmAAAAZAAAABYAAABMAAAAAAAAAAAAAAAEAAAAAAAAAAEAAAAsPEMKAAAAACgAAAAoAAAAZAAAAGQAAAAAAAAAzMzMAAAAAABQAAAAUAAAAGQAAABkAAAAAAAAABcAAAAUAAAAAAAAAAAAAAD/fwAA/38AAAAAAAAJAAAABAAAAGATAAAMAAAAEAAAAAAAAAAAAAAAAAAAAAAAAAAeAAAAaAAAAAAAAAAAAAAAAAAAAAAAAAAAAAAAECcAABAnAAAAAAAAAAAAAAAAAAAAAAAAAAAAAAAAAAAAAAAAAAAAABQAAAAAAAAAwMD/AAAAAABkAAAAMgAAAAAAAABkAAAAAAAAAH9/fwAKAAAAHwAAAFQAAAAAAAAFAAAAAQAAAAAAAAAAAAAAAAAAAAAAAAAAAAAAAAAAAAAAAAAAAAAAAH9/fwAAAAADzMzMAMDA/wB/f38AAAAAAAAAAAAAAAAAAAAAAAAAAAAhAAAAGAAAABQAAABYAgAAOAQAANgnAABQGQAAEAAAACYAAAAIAAAAAQ8AAAAAAAA="/>
               </a:ext>
             </a:extLst>
           </p:cNvSpPr>
@@ -4232,7 +4237,7 @@
             <a:spLocks noGrp="1" noRot="1" noChangeAspect="1" noChangeArrowheads="1"/>
             <a:extLst>
               <a:ext uri="smNativeData">
-                <pr:smNativeData xmlns="" xmlns:p14="http://schemas.microsoft.com/office/powerpoint/2010/main" xmlns:pr="smNativeData" val="SMDATA_13_w78LXxMAAAAlAAAACwAAAC0AAAAAAAAAAAAAAAAAAAAAAAAAAAAAAAAAAAAAAAAAAAEAAABQAAAAAAAAAAAA4D8AAAAAAADgPwAAAAAAAOA/AAAAAAAA4D8AAAAAAADgPwAAAAAAAOA/AAAAAAAA4D8AAAAAAADgPwAAAAAAAOA/AAAAAAAA4D8CAAAAjAAAAAAAAAAAAAAAkMImDP///wgAAAAAAAAAAAAAAAAAAAAAAAAAAAAAAAAAAAAAZAAAAAEAAABAAAAAAAAAAAAAAAAAAAAAAAAAAAAAAAAAAAAAAAAAAAAAAAAAAAAAAAAAAAAAAAAAAAAAAAAAAAAAAAAAAAAAAAAAAAAAAAAAAAAAAAAAAAAAAAAAAAAAFAAAADwAAAABAAAAAAAAAAAAAAAPAAAAAQAAACMAAAAjAAAAIwAAAB4AAAAAAAAASwAAAEsAAAAAAAAASwAAAEsAAAAVAAAAYAAAAAAAAAAAAAAADwAAACADAAAAAAAAAAAAAAEAAACgMgAAVgcAAKr4//8BAAAAf39/AAEAAABkAAAAAAAAABQAAABAHwAAAAAAACYAAAAAAAAAwOD//wAAAAAmAAAAZAAAABYAAABMAAAAAAAAAAAAAAAEAAAAAAAAAAEAAAAsPEMKAAAAACgAAAAoAAAAZAAAAGQAAAAAAAAAzMzMAAAAAABQAAAAUAAAAGQAAABkAAAAAAAAABcAAAAUAAAAAAAAAAAAAAD/fwAA/38AAAAAAAAJAAAABAAAAOsZAAAMAAAAEAAAAAAAAAAAAAAAAAAAAAAAAAAeAAAAaAAAAAAAAAAAAAAAAAAAAAAAAAAAAAAAECcAABAnAAAAAAAAAAAAAAAAAAAAAAAAAAAAAAAAAAAAAAAAAAAAABQAAAAAAAAAwMD/AAAAAABkAAAAMgAAAAAAAABkAAAAAAAAAH9/fwAKAAAAHwAAAFQAAAAAAAAFAAAAAQAAAAAAAAAAAAAAAAAAAAAAAAAAAAAAAAAAAAAAAAAAAAAAAH9/fwAAAAADzMzMAMDA/wB/f38AAAAAAAAAAAAAAAAAAAAAAAAAAAAhAAAAGAAAABQAAAAIBwAAOAQAACkjAABQGQAAEAAAACYAAAAIAAAAAQ8AAAAAAAA="/>
+                <pr:smNativeData xmlns:pr="smNativeData" xmlns:p14="http://schemas.microsoft.com/office/powerpoint/2010/main" xmlns="" val="SMDATA_13_w78LXxMAAAAlAAAACwAAAC0AAAAAAAAAAAAAAAAAAAAAAAAAAAAAAAAAAAAAAAAAAAEAAABQAAAAAAAAAAAA4D8AAAAAAADgPwAAAAAAAOA/AAAAAAAA4D8AAAAAAADgPwAAAAAAAOA/AAAAAAAA4D8AAAAAAADgPwAAAAAAAOA/AAAAAAAA4D8CAAAAjAAAAAAAAAAAAAAAkMImDP///wgAAAAAAAAAAAAAAAAAAAAAAAAAAAAAAAAAAAAAZAAAAAEAAABAAAAAAAAAAAAAAAAAAAAAAAAAAAAAAAAAAAAAAAAAAAAAAAAAAAAAAAAAAAAAAAAAAAAAAAAAAAAAAAAAAAAAAAAAAAAAAAAAAAAAAAAAAAAAAAAAAAAAFAAAADwAAAABAAAAAAAAAAAAAAAPAAAAAQAAACMAAAAjAAAAIwAAAB4AAAAAAAAASwAAAEsAAAAAAAAASwAAAEsAAAAVAAAAYAAAAAAAAAAAAAAADwAAACADAAAAAAAAAAAAAAEAAACgMgAAVgcAAKr4//8BAAAAf39/AAEAAABkAAAAAAAAABQAAABAHwAAAAAAACYAAAAAAAAAwOD//wAAAAAmAAAAZAAAABYAAABMAAAAAAAAAAAAAAAEAAAAAAAAAAEAAAAsPEMKAAAAACgAAAAoAAAAZAAAAGQAAAAAAAAAzMzMAAAAAABQAAAAUAAAAGQAAABkAAAAAAAAABcAAAAUAAAAAAAAAAAAAAD/fwAA/38AAAAAAAAJAAAABAAAAOsZAAAMAAAAEAAAAAAAAAAAAAAAAAAAAAAAAAAeAAAAaAAAAAAAAAAAAAAAAAAAAAAAAAAAAAAAECcAABAnAAAAAAAAAAAAAAAAAAAAAAAAAAAAAAAAAAAAAAAAAAAAABQAAAAAAAAAwMD/AAAAAABkAAAAMgAAAAAAAABkAAAAAAAAAH9/fwAKAAAAHwAAAFQAAAAAAAAFAAAAAQAAAAAAAAAAAAAAAAAAAAAAAAAAAAAAAAAAAAAAAAAAAAAAAH9/fwAAAAADzMzMAMDA/wB/f38AAAAAAAAAAAAAAAAAAAAAAAAAAAAhAAAAGAAAABQAAAAIBwAAOAQAACkjAABQGQAAEAAAACYAAAAIAAAAAQ8AAAAAAAA="/>
               </a:ext>
             </a:extLst>
           </p:cNvSpPr>
@@ -4278,7 +4283,7 @@
             <a:spLocks noGrp="1" noChangeArrowheads="1"/>
             <a:extLst>
               <a:ext uri="smNativeData">
-                <pr:smNativeData xmlns="" xmlns:p14="http://schemas.microsoft.com/office/powerpoint/2010/main" xmlns:pr="smNativeData" val="SMDATA_13_w78LXxMAAAAlAAAAZAAAAA0AAAAAkAAAAJAAAACQAAAAkAAAAAAAAAAAAAAAAAAAAAEAAABQAAAAAAAAAAAA4D8AAAAAAADgPwAAAAAAAOA/AAAAAAAA4D8AAAAAAADgPwAAAAAAAOA/AAAAAAAA4D8AAAAAAADgPwAAAAAAAOA/AAAAAAAA4D8CAAAAjAAAAAAAAAAAAAAAkMImDP///wgAAAAAAAAAAAAAAAAAAAAAAAAAAAAAAAAAAAAAZAAAAAEAAABAAAAAAAAAAAAAAAAAAAAAAAAAAAAAAAAAAAAAAAAAAAAAAAAAAAAAAAAAAAAAAAAAAAAAAAAAAAAAAAAAAAAAAAAAAAAAAAAAAAAAAAAAAAAAAAAAAAAAFAAAADwAAAAAAAAAAAAAAAAAAAkUAAAAAQAAABQAAAAUAAAAFAAAAAEAAAAAAAAAZAAAAGQAAAAAAAAAZAAAAGQAAAAVAAAAYAAAAAAAAAAAAAAADwAAACADAAAAAAAAAAAAAAEAAACgMgAAVgcAAKr4//8BAAAAf39/AAEAAABkAAAAAAAAABQAAABAHwAAAAAAACYAAAAAAAAAwOD//wAAAAAmAAAAZAAAABYAAABMAAAAAAAAAAAAAAAEAAAAAAAAAAEAAAAsPEMKAAAAACgAAAAoAAAAZAAAAGQAAAAAAAAAzMzMAAAAAABQAAAAUAAAAGQAAABkAAAAAAAAABcAAAAUAAAAAAAAAAAAAAD/fwAA/38AAAAAAAAJAAAABAAAAAAAAAAMAAAAEAAAAAAAAAAAAAAAAAAAAAAAAAAeAAAAaAAAAAAAAAAAAAAAAAAAAAAAAAAAAAAAECcAABAnAAAAAAAAAAAAAAAAAAAAAAAAAAAAAAAAAAAAAAAAAAAAABQAAAAAAAAAwMD/AAAAAABkAAAAMgAAAAAAAABkAAAAAAAAAH9/fwAKAAAAHwAAAFQAAAAAAAAFAAAAAQAAAAAAAAAAAAAAAAAAAAAAAAAAAAAAAAAAAAAAAAAAAAAAAn9/fwAAAAADzMzMAMDA/wB/f38AAAAAAAAAAAAAAAAAAAAAAAAAAAAhAAAAGAAAABQAAAA4BAAAuBoAAPglAAAINAAAEAAAACYAAAAIAAAAvT8AAAAAAAA="/>
+                <pr:smNativeData xmlns:pr="smNativeData" xmlns:p14="http://schemas.microsoft.com/office/powerpoint/2010/main" xmlns="" val="SMDATA_13_w78LXxMAAAAlAAAAZAAAAA0AAAAAkAAAAJAAAACQAAAAkAAAAAAAAAAAAAAAAAAAAAEAAABQAAAAAAAAAAAA4D8AAAAAAADgPwAAAAAAAOA/AAAAAAAA4D8AAAAAAADgPwAAAAAAAOA/AAAAAAAA4D8AAAAAAADgPwAAAAAAAOA/AAAAAAAA4D8CAAAAjAAAAAAAAAAAAAAAkMImDP///wgAAAAAAAAAAAAAAAAAAAAAAAAAAAAAAAAAAAAAZAAAAAEAAABAAAAAAAAAAAAAAAAAAAAAAAAAAAAAAAAAAAAAAAAAAAAAAAAAAAAAAAAAAAAAAAAAAAAAAAAAAAAAAAAAAAAAAAAAAAAAAAAAAAAAAAAAAAAAAAAAAAAAFAAAADwAAAAAAAAAAAAAAAAAAAkUAAAAAQAAABQAAAAUAAAAFAAAAAEAAAAAAAAAZAAAAGQAAAAAAAAAZAAAAGQAAAAVAAAAYAAAAAAAAAAAAAAADwAAACADAAAAAAAAAAAAAAEAAACgMgAAVgcAAKr4//8BAAAAf39/AAEAAABkAAAAAAAAABQAAABAHwAAAAAAACYAAAAAAAAAwOD//wAAAAAmAAAAZAAAABYAAABMAAAAAAAAAAAAAAAEAAAAAAAAAAEAAAAsPEMKAAAAACgAAAAoAAAAZAAAAGQAAAAAAAAAzMzMAAAAAABQAAAAUAAAAGQAAABkAAAAAAAAABcAAAAUAAAAAAAAAAAAAAD/fwAA/38AAAAAAAAJAAAABAAAAAAAAAAMAAAAEAAAAAAAAAAAAAAAAAAAAAAAAAAeAAAAaAAAAAAAAAAAAAAAAAAAAAAAAAAAAAAAECcAABAnAAAAAAAAAAAAAAAAAAAAAAAAAAAAAAAAAAAAAAAAAAAAABQAAAAAAAAAwMD/AAAAAABkAAAAMgAAAAAAAABkAAAAAAAAAH9/fwAKAAAAHwAAAFQAAAAAAAAFAAAAAQAAAAAAAAAAAAAAAAAAAAAAAAAAAAAAAAAAAAAAAAAAAAAAAn9/fwAAAAADzMzMAMDA/wB/f38AAAAAAAAAAAAAAAAAAAAAAAAAAAAhAAAAGAAAABQAAAA4BAAAuBoAAPglAAAINAAAEAAAACYAAAAIAAAAvT8AAAAAAAA="/>
               </a:ext>
             </a:extLst>
           </p:cNvSpPr>
@@ -4467,7 +4472,7 @@
             <a:spLocks noGrp="1" noRot="1" noChangeAspect="1" noChangeArrowheads="1"/>
             <a:extLst>
               <a:ext uri="smNativeData">
-                <pr:smNativeData xmlns="" xmlns:p14="http://schemas.microsoft.com/office/powerpoint/2010/main" xmlns:pr="smNativeData" val="SMDATA_13_w78LXxMAAAAlAAAACwAAAC0AAAAAAAAAAAAAAAAAAAAAAAAAAAAAAAAAAAAAAAAAAAEAAABQAAAAAAAAAAAA4D8AAAAAAADgPwAAAAAAAOA/AAAAAAAA4D8AAAAAAADgPwAAAAAAAOA/AAAAAAAA4D8AAAAAAADgPwAAAAAAAOA/AAAAAAAA4D8CAAAAjAAAAAAAAAAAAAAAkMImDP///wgAAAAAAAAAAAAAAAAAAAAAAAAAAAAAAAAAAAAAZAAAAAEAAABAAAAAAAAAAAAAAAAAAAAAAAAAAAAAAAAAAAAAAAAAAAAAAAAAAAAAAAAAAAAAAAAAAAAAAAAAAAAAAAAAAAAAAAAAAAAAAAAAAAAAAAAAAAAAAAAAAAAAFAAAADwAAAABAAAAAAAAAAAAAAAPAAAAAQAAACMAAAAjAAAAIwAAAB4AAAAAAAAASwAAAEsAAAAAAAAASwAAAEsAAAAVAAAAYAAAAAAAAAAAAAAADwAAACADAAAAAAAAAAAAAAEAAACgMgAAVgcAAKr4//8BAAAAf39/AAEAAABkAAAAAAAAABQAAABAHwAAAAAAACYAAAAAAAAAwOD//wAAAAAmAAAAZAAAABYAAABMAAAAAAAAAAAAAAAEAAAAAAAAAAEAAAAsPEMKAAAAACgAAAAoAAAAZAAAAGQAAAAAAAAAzMzMAAAAAABQAAAAUAAAAGQAAABkAAAAAAAAABcAAAAUAAAAAAAAAAAAAAD/fwAA/38AAAAAAAAJAAAABAAAAONAAAAMAAAAEAAAAAAAAAAAAAAAAAAAAAAAAAAeAAAAaAAAAAAAAAAAAAAAAAAAAAAAAAAAAAAAECcAABAnAAAAAAAAAAAAAAAAAAAAAAAAAAAAAAAAAAAAAAAAAAAAABQAAAAAAAAAwMD/AAAAAABkAAAAMgAAAAAAAABkAAAAAAAAAH9/fwAKAAAAHwAAAFQAAAAAAAAFAAAAAQAAAAAAAAAAAAAAAAAAAAAAAAAAAAAAAAAAAAAAAAAAAAAAAH9/fwAAAAADzMzMAMDA/wB/f38AAAAAAAAAAAAAAAAAAAAAAAAAAAAhAAAAGAAAABQAAAAIBwAAOAQAACkjAABQGQAAEAAAACYAAAAIAAAAAQ8AAAAAAAA="/>
+                <pr:smNativeData xmlns:pr="smNativeData" xmlns:p14="http://schemas.microsoft.com/office/powerpoint/2010/main" xmlns="" val="SMDATA_13_w78LXxMAAAAlAAAACwAAAC0AAAAAAAAAAAAAAAAAAAAAAAAAAAAAAAAAAAAAAAAAAAEAAABQAAAAAAAAAAAA4D8AAAAAAADgPwAAAAAAAOA/AAAAAAAA4D8AAAAAAADgPwAAAAAAAOA/AAAAAAAA4D8AAAAAAADgPwAAAAAAAOA/AAAAAAAA4D8CAAAAjAAAAAAAAAAAAAAAkMImDP///wgAAAAAAAAAAAAAAAAAAAAAAAAAAAAAAAAAAAAAZAAAAAEAAABAAAAAAAAAAAAAAAAAAAAAAAAAAAAAAAAAAAAAAAAAAAAAAAAAAAAAAAAAAAAAAAAAAAAAAAAAAAAAAAAAAAAAAAAAAAAAAAAAAAAAAAAAAAAAAAAAAAAAFAAAADwAAAABAAAAAAAAAAAAAAAPAAAAAQAAACMAAAAjAAAAIwAAAB4AAAAAAAAASwAAAEsAAAAAAAAASwAAAEsAAAAVAAAAYAAAAAAAAAAAAAAADwAAACADAAAAAAAAAAAAAAEAAACgMgAAVgcAAKr4//8BAAAAf39/AAEAAABkAAAAAAAAABQAAABAHwAAAAAAACYAAAAAAAAAwOD//wAAAAAmAAAAZAAAABYAAABMAAAAAAAAAAAAAAAEAAAAAAAAAAEAAAAsPEMKAAAAACgAAAAoAAAAZAAAAGQAAAAAAAAAzMzMAAAAAABQAAAAUAAAAGQAAABkAAAAAAAAABcAAAAUAAAAAAAAAAAAAAD/fwAA/38AAAAAAAAJAAAABAAAAONAAAAMAAAAEAAAAAAAAAAAAAAAAAAAAAAAAAAeAAAAaAAAAAAAAAAAAAAAAAAAAAAAAAAAAAAAECcAABAnAAAAAAAAAAAAAAAAAAAAAAAAAAAAAAAAAAAAAAAAAAAAABQAAAAAAAAAwMD/AAAAAABkAAAAMgAAAAAAAABkAAAAAAAAAH9/fwAKAAAAHwAAAFQAAAAAAAAFAAAAAQAAAAAAAAAAAAAAAAAAAAAAAAAAAAAAAAAAAAAAAAAAAAAAAH9/fwAAAAADzMzMAMDA/wB/f38AAAAAAAAAAAAAAAAAAAAAAAAAAAAhAAAAGAAAABQAAAAIBwAAOAQAACkjAABQGQAAEAAAACYAAAAIAAAAAQ8AAAAAAAA="/>
               </a:ext>
             </a:extLst>
           </p:cNvSpPr>
@@ -4513,7 +4518,7 @@
             <a:spLocks noGrp="1" noChangeArrowheads="1"/>
             <a:extLst>
               <a:ext uri="smNativeData">
-                <pr:smNativeData xmlns="" xmlns:p14="http://schemas.microsoft.com/office/powerpoint/2010/main" xmlns:pr="smNativeData" val="SMDATA_13_w78LXxMAAAAlAAAAZAAAAA0AAAAAkAAAAJAAAACQAAAAkAAAAAAAAAAAAAAAAAAAAAEAAABQAAAAAAAAAAAA4D8AAAAAAADgPwAAAAAAAOA/AAAAAAAA4D8AAAAAAADgPwAAAAAAAOA/AAAAAAAA4D8AAAAAAADgPwAAAAAAAOA/AAAAAAAA4D8CAAAAjAAAAAAAAAAAAAAAkMImDP///wgAAAAAAAAAAAAAAAAAAAAAAAAAAAAAAAAAAAAAZAAAAAEAAABAAAAAAAAAAAAAAAAAAAAAAAAAAAAAAAAAAAAAAAAAAAAAAAAAAAAAAAAAAAAAAAAAAAAAAAAAAAAAAAAAAAAAAAAAAAAAAAAAAAAAAAAAAAAAAAAAAAAAFAAAADwAAAAAAAAAAAAAAAAAAAkUAAAAAQAAABQAAAAUAAAAFAAAAAEAAAAAAAAAZAAAAGQAAAAAAAAAZAAAAGQAAAAVAAAAYAAAAAAAAAAAAAAADwAAACADAAAAAAAAAAAAAAEAAACgMgAAVgcAAKr4//8BAAAAf39/AAEAAABkAAAAAAAAABQAAABAHwAAAAAAACYAAAAAAAAAwOD//wAAAAAmAAAAZAAAABYAAABMAAAAAAAAAAAAAAAEAAAAAAAAAAEAAAAsPEMKAAAAACgAAAAoAAAAZAAAAGQAAAAAAAAAzMzMAAAAAABQAAAAUAAAAGQAAABkAAAAAAAAABcAAAAUAAAAAAAAAAAAAAD/fwAA/38AAAAAAAAJAAAABAAAAAAAAAAMAAAAEAAAAAAAAAAAAAAAAAAAAAAAAAAeAAAAaAAAAAAAAAAAAAAAAAAAAAAAAAAAAAAAECcAABAnAAAAAAAAAAAAAAAAAAAAAAAAAAAAAAAAAAAAAAAAAAAAABQAAAAAAAAAwMD/AAAAAABkAAAAMgAAAAAAAABkAAAAAAAAAH9/fwAKAAAAHwAAAFQAAAAAAAAFAAAAAQAAAAAAAAAAAAAAAAAAAAAAAAAAAAAAAAAAAAAAAAAAAAAAAn9/fwAAAAADzMzMAMDA/wB/f38AAAAAAAAAAAAAAAAAAAAAAAAAAAAhAAAAGAAAABQAAAA4BAAAuBoAAPglAAAINAAAEAAAACYAAAAIAAAAvT8AAAAAAAA="/>
+                <pr:smNativeData xmlns:pr="smNativeData" xmlns:p14="http://schemas.microsoft.com/office/powerpoint/2010/main" xmlns="" val="SMDATA_13_w78LXxMAAAAlAAAAZAAAAA0AAAAAkAAAAJAAAACQAAAAkAAAAAAAAAAAAAAAAAAAAAEAAABQAAAAAAAAAAAA4D8AAAAAAADgPwAAAAAAAOA/AAAAAAAA4D8AAAAAAADgPwAAAAAAAOA/AAAAAAAA4D8AAAAAAADgPwAAAAAAAOA/AAAAAAAA4D8CAAAAjAAAAAAAAAAAAAAAkMImDP///wgAAAAAAAAAAAAAAAAAAAAAAAAAAAAAAAAAAAAAZAAAAAEAAABAAAAAAAAAAAAAAAAAAAAAAAAAAAAAAAAAAAAAAAAAAAAAAAAAAAAAAAAAAAAAAAAAAAAAAAAAAAAAAAAAAAAAAAAAAAAAAAAAAAAAAAAAAAAAAAAAAAAAFAAAADwAAAAAAAAAAAAAAAAAAAkUAAAAAQAAABQAAAAUAAAAFAAAAAEAAAAAAAAAZAAAAGQAAAAAAAAAZAAAAGQAAAAVAAAAYAAAAAAAAAAAAAAADwAAACADAAAAAAAAAAAAAAEAAACgMgAAVgcAAKr4//8BAAAAf39/AAEAAABkAAAAAAAAABQAAABAHwAAAAAAACYAAAAAAAAAwOD//wAAAAAmAAAAZAAAABYAAABMAAAAAAAAAAAAAAAEAAAAAAAAAAEAAAAsPEMKAAAAACgAAAAoAAAAZAAAAGQAAAAAAAAAzMzMAAAAAABQAAAAUAAAAGQAAABkAAAAAAAAABcAAAAUAAAAAAAAAAAAAAD/fwAA/38AAAAAAAAJAAAABAAAAAAAAAAMAAAAEAAAAAAAAAAAAAAAAAAAAAAAAAAeAAAAaAAAAAAAAAAAAAAAAAAAAAAAAAAAAAAAECcAABAnAAAAAAAAAAAAAAAAAAAAAAAAAAAAAAAAAAAAAAAAAAAAABQAAAAAAAAAwMD/AAAAAABkAAAAMgAAAAAAAABkAAAAAAAAAH9/fwAKAAAAHwAAAFQAAAAAAAAFAAAAAQAAAAAAAAAAAAAAAAAAAAAAAAAAAAAAAAAAAAAAAAAAAAAAAn9/fwAAAAADzMzMAMDA/wB/f38AAAAAAAAAAAAAAAAAAAAAAAAAAAAhAAAAGAAAABQAAAA4BAAAuBoAAPglAAAINAAAEAAAACYAAAAIAAAAvT8AAAAAAAA="/>
               </a:ext>
             </a:extLst>
           </p:cNvSpPr>
@@ -4624,7 +4629,7 @@
             <a:spLocks noGrp="1" noRot="1" noChangeAspect="1" noChangeArrowheads="1"/>
             <a:extLst>
               <a:ext uri="smNativeData">
-                <pr:smNativeData xmlns="" xmlns:p14="http://schemas.microsoft.com/office/powerpoint/2010/main" xmlns:pr="smNativeData" val="SMDATA_13_w78LXxMAAAAlAAAACwAAAC0AAAAAAAAAAAAAAAAAAAAAAAAAAAAAAAAAAAAAAAAAAAEAAABQAAAAAAAAAAAA4D8AAAAAAADgPwAAAAAAAOA/AAAAAAAA4D8AAAAAAADgPwAAAAAAAOA/AAAAAAAA4D8AAAAAAADgPwAAAAAAAOA/AAAAAAAA4D8CAAAAjAAAAAAAAAAAAAAAkMImDP///wgAAAAAAAAAAAAAAAAAAAAAAAAAAAAAAAAAAAAAZAAAAAEAAABAAAAAAAAAAAAAAAAAAAAAAAAAAAAAAAAAAAAAAAAAAAAAAAAAAAAAAAAAAAAAAAAAAAAAAAAAAAAAAAAAAAAAAAAAAAAAAAAAAAAAAAAAAAAAAAAAAAAAFAAAADwAAAABAAAAAAAAAAAAAAAPAAAAAQAAACMAAAAjAAAAIwAAAB4AAAAAAAAASwAAAEsAAAAAAAAASwAAAEsAAAAVAAAAYAAAAAAAAAAAAAAADwAAACADAAAAAAAAAAAAAAEAAACgMgAAVgcAAKr4//8BAAAAf39/AAEAAABkAAAAAAAAABQAAABAHwAAAAAAACYAAAAAAAAAwOD//wAAAAAmAAAAZAAAABYAAABMAAAAAAAAAAAAAAAEAAAAAAAAAAEAAAAsPEMKAAAAACgAAAAoAAAAZAAAAGQAAAAAAAAAzMzMAAAAAABQAAAAUAAAAGQAAABkAAAAAAAAABcAAAAUAAAAAAAAAAAAAAD/fwAA/38AAAAAAAAJAAAABAAAAJnBFREMAAAAEAAAAAAAAAAAAAAAAAAAAAAAAAAeAAAAaAAAAAAAAAAAAAAAAAAAAAAAAAAAAAAAECcAABAnAAAAAAAAAAAAAAAAAAAAAAAAAAAAAAAAAAAAAAAAAAAAABQAAAAAAAAAwMD/AAAAAABkAAAAMgAAAAAAAABkAAAAAAAAAH9/fwAKAAAAHwAAAFQAAAAAAAAFAAAAAQAAAAAAAAAAAAAAAAAAAAAAAAAAAAAAAAAAAAAAAAAAAAAAAH9/fwAAAAADzMzMAMDA/wB/f38AAAAAAAAAAAAAAAAAAAAAAAAAAAAhAAAAGAAAABQAAAAIBwAAOAQAACkjAABQGQAAEAAAACYAAAAIAAAAAQ8AAAAAAAA="/>
+                <pr:smNativeData xmlns:pr="smNativeData" xmlns:p14="http://schemas.microsoft.com/office/powerpoint/2010/main" xmlns="" val="SMDATA_13_w78LXxMAAAAlAAAACwAAAC0AAAAAAAAAAAAAAAAAAAAAAAAAAAAAAAAAAAAAAAAAAAEAAABQAAAAAAAAAAAA4D8AAAAAAADgPwAAAAAAAOA/AAAAAAAA4D8AAAAAAADgPwAAAAAAAOA/AAAAAAAA4D8AAAAAAADgPwAAAAAAAOA/AAAAAAAA4D8CAAAAjAAAAAAAAAAAAAAAkMImDP///wgAAAAAAAAAAAAAAAAAAAAAAAAAAAAAAAAAAAAAZAAAAAEAAABAAAAAAAAAAAAAAAAAAAAAAAAAAAAAAAAAAAAAAAAAAAAAAAAAAAAAAAAAAAAAAAAAAAAAAAAAAAAAAAAAAAAAAAAAAAAAAAAAAAAAAAAAAAAAAAAAAAAAFAAAADwAAAABAAAAAAAAAAAAAAAPAAAAAQAAACMAAAAjAAAAIwAAAB4AAAAAAAAASwAAAEsAAAAAAAAASwAAAEsAAAAVAAAAYAAAAAAAAAAAAAAADwAAACADAAAAAAAAAAAAAAEAAACgMgAAVgcAAKr4//8BAAAAf39/AAEAAABkAAAAAAAAABQAAABAHwAAAAAAACYAAAAAAAAAwOD//wAAAAAmAAAAZAAAABYAAABMAAAAAAAAAAAAAAAEAAAAAAAAAAEAAAAsPEMKAAAAACgAAAAoAAAAZAAAAGQAAAAAAAAAzMzMAAAAAABQAAAAUAAAAGQAAABkAAAAAAAAABcAAAAUAAAAAAAAAAAAAAD/fwAA/38AAAAAAAAJAAAABAAAAJnBFREMAAAAEAAAAAAAAAAAAAAAAAAAAAAAAAAeAAAAaAAAAAAAAAAAAAAAAAAAAAAAAAAAAAAAECcAABAnAAAAAAAAAAAAAAAAAAAAAAAAAAAAAAAAAAAAAAAAAAAAABQAAAAAAAAAwMD/AAAAAABkAAAAMgAAAAAAAABkAAAAAAAAAH9/fwAKAAAAHwAAAFQAAAAAAAAFAAAAAQAAAAAAAAAAAAAAAAAAAAAAAAAAAAAAAAAAAAAAAAAAAAAAAH9/fwAAAAADzMzMAMDA/wB/f38AAAAAAAAAAAAAAAAAAAAAAAAAAAAhAAAAGAAAABQAAAAIBwAAOAQAACkjAABQGQAAEAAAACYAAAAIAAAAAQ8AAAAAAAA="/>
               </a:ext>
             </a:extLst>
           </p:cNvSpPr>
@@ -4670,7 +4675,7 @@
             <a:spLocks noGrp="1" noChangeArrowheads="1"/>
             <a:extLst>
               <a:ext uri="smNativeData">
-                <pr:smNativeData xmlns="" xmlns:p14="http://schemas.microsoft.com/office/powerpoint/2010/main" xmlns:pr="smNativeData" val="SMDATA_13_w78LXxMAAAAlAAAAZAAAAA0AAAAAkAAAAJAAAACQAAAAkAAAAAAAAAAAAAAAAAAAAAEAAABQAAAAAAAAAAAA4D8AAAAAAADgPwAAAAAAAOA/AAAAAAAA4D8AAAAAAADgPwAAAAAAAOA/AAAAAAAA4D8AAAAAAADgPwAAAAAAAOA/AAAAAAAA4D8CAAAAjAAAAAAAAAAAAAAAkMImDP///wgAAAAAAAAAAAAAAAAAAAAAAAAAAAAAAAAAAAAAZAAAAAEAAABAAAAAAAAAAAAAAAAAAAAAAAAAAAAAAAAAAAAAAAAAAAAAAAAAAAAAAAAAAAAAAAAAAAAAAAAAAAAAAAAAAAAAAAAAAAAAAAAAAAAAAAAAAAAAAAAAAAAAFAAAADwAAAAAAAAAAAAAAAAAAAkUAAAAAQAAABQAAAAUAAAAFAAAAAEAAAAAAAAAZAAAAGQAAAAAAAAAZAAAAGQAAAAVAAAAYAAAAAAAAAAAAAAADwAAACADAAAAAAAAAAAAAAEAAACgMgAAVgcAAKr4//8BAAAAf39/AAEAAABkAAAAAAAAABQAAABAHwAAAAAAACYAAAAAAAAAwOD//wAAAAAmAAAAZAAAABYAAABMAAAAAAAAAAAAAAAEAAAAAAAAAAEAAAAsPEMKAAAAACgAAAAoAAAAZAAAAGQAAAAAAAAAzMzMAAAAAABQAAAAUAAAAGQAAABkAAAAAAAAABcAAAAUAAAAAAAAAAAAAAD/fwAA/38AAAAAAAAJAAAABAAAAAAAAAAMAAAAEAAAAAAAAAAAAAAAAAAAAAAAAAAeAAAAaAAAAAAAAAAAAAAAAAAAAAAAAAAAAAAAECcAABAnAAAAAAAAAAAAAAAAAAAAAAAAAAAAAAAAAAAAAAAAAAAAABQAAAAAAAAAwMD/AAAAAABkAAAAMgAAAAAAAABkAAAAAAAAAH9/fwAKAAAAHwAAAFQAAAAAAAAFAAAAAQAAAAAAAAAAAAAAAAAAAAAAAAAAAAAAAAAAAAAAAAAAAAAAAn9/fwAAAAADzMzMAMDA/wB/f38AAAAAAAAAAAAAAAAAAAAAAAAAAAAhAAAAGAAAABQAAAA4BAAAuBoAAPglAAAINAAAEAAAACYAAAAIAAAAvT8AAAAAAAA="/>
+                <pr:smNativeData xmlns:pr="smNativeData" xmlns:p14="http://schemas.microsoft.com/office/powerpoint/2010/main" xmlns="" val="SMDATA_13_w78LXxMAAAAlAAAAZAAAAA0AAAAAkAAAAJAAAACQAAAAkAAAAAAAAAAAAAAAAAAAAAEAAABQAAAAAAAAAAAA4D8AAAAAAADgPwAAAAAAAOA/AAAAAAAA4D8AAAAAAADgPwAAAAAAAOA/AAAAAAAA4D8AAAAAAADgPwAAAAAAAOA/AAAAAAAA4D8CAAAAjAAAAAAAAAAAAAAAkMImDP///wgAAAAAAAAAAAAAAAAAAAAAAAAAAAAAAAAAAAAAZAAAAAEAAABAAAAAAAAAAAAAAAAAAAAAAAAAAAAAAAAAAAAAAAAAAAAAAAAAAAAAAAAAAAAAAAAAAAAAAAAAAAAAAAAAAAAAAAAAAAAAAAAAAAAAAAAAAAAAAAAAAAAAFAAAADwAAAAAAAAAAAAAAAAAAAkUAAAAAQAAABQAAAAUAAAAFAAAAAEAAAAAAAAAZAAAAGQAAAAAAAAAZAAAAGQAAAAVAAAAYAAAAAAAAAAAAAAADwAAACADAAAAAAAAAAAAAAEAAACgMgAAVgcAAKr4//8BAAAAf39/AAEAAABkAAAAAAAAABQAAABAHwAAAAAAACYAAAAAAAAAwOD//wAAAAAmAAAAZAAAABYAAABMAAAAAAAAAAAAAAAEAAAAAAAAAAEAAAAsPEMKAAAAACgAAAAoAAAAZAAAAGQAAAAAAAAAzMzMAAAAAABQAAAAUAAAAGQAAABkAAAAAAAAABcAAAAUAAAAAAAAAAAAAAD/fwAA/38AAAAAAAAJAAAABAAAAAAAAAAMAAAAEAAAAAAAAAAAAAAAAAAAAAAAAAAeAAAAaAAAAAAAAAAAAAAAAAAAAAAAAAAAAAAAECcAABAnAAAAAAAAAAAAAAAAAAAAAAAAAAAAAAAAAAAAAAAAAAAAABQAAAAAAAAAwMD/AAAAAABkAAAAMgAAAAAAAABkAAAAAAAAAH9/fwAKAAAAHwAAAFQAAAAAAAAFAAAAAQAAAAAAAAAAAAAAAAAAAAAAAAAAAAAAAAAAAAAAAAAAAAAAAn9/fwAAAAADzMzMAMDA/wB/f38AAAAAAAAAAAAAAAAAAAAAAAAAAAAhAAAAGAAAABQAAAA4BAAAuBoAAPglAAAINAAAEAAAACYAAAAIAAAAvT8AAAAAAAA="/>
               </a:ext>
             </a:extLst>
           </p:cNvSpPr>
@@ -4839,7 +4844,7 @@
           <p:cNvGrpSpPr>
             <a:extLst>
               <a:ext uri="smNativeData">
-                <pr:smNativeData xmlns="" xmlns:p14="http://schemas.microsoft.com/office/powerpoint/2010/main" xmlns:pr="smNativeData" val="SMDATA_7_w78LXxMAAAAlAAAAAQAAAA8BAAAAkAAAAEgAAACQAAAASAAAAAAAAAAAAAAAAAAAABcAAAAUAAAAAAAAAAAAAAD/fwAA/38AAAAAAAAJAAAABAAAAAAAAAAMAAAAEAAAAAAAAAAAAAAAAAAAAAAAAAAfAAAAVAAAAAAAAAAAAAAAAAAAAAAAAAAAAAAAAAAAAAAAAAAAAAAAAAAAAAAAAAAAAAAAAAAAAAAAAAAAAAAAAAAAAAAAAAAAAAAAAAAAAAAAAAAAAAAAAAAAACEAAAAYAAAAFAAAAAAAAADz////AEsAADAqAAAQAAAAJgAAAAgAAAD/////AAAAAA=="/>
+                <pr:smNativeData xmlns:pr="smNativeData" xmlns:p14="http://schemas.microsoft.com/office/powerpoint/2010/main" xmlns="" val="SMDATA_7_w78LXxMAAAAlAAAAAQAAAA8BAAAAkAAAAEgAAACQAAAASAAAAAAAAAAAAAAAAAAAABcAAAAUAAAAAAAAAAAAAAD/fwAA/38AAAAAAAAJAAAABAAAAAAAAAAMAAAAEAAAAAAAAAAAAAAAAAAAAAAAAAAfAAAAVAAAAAAAAAAAAAAAAAAAAAAAAAAAAAAAAAAAAAAAAAAAAAAAAAAAAAAAAAAAAAAAAAAAAAAAAAAAAAAAAAAAAAAAAAAAAAAAAAAAAAAAAAAAAAAAAAAAACEAAAAYAAAAFAAAAAAAAADz////AEsAADAqAAAQAAAAJgAAAAgAAAD/////AAAAAA=="/>
               </a:ext>
             </a:extLst>
           </p:cNvGrpSpPr>
@@ -4859,7 +4864,7 @@
             <p:cNvCxnSpPr>
               <a:extLst>
                 <a:ext uri="smNativeData">
-                  <pr:smNativeData xmlns="" xmlns:p14="http://schemas.microsoft.com/office/powerpoint/2010/main" xmlns:pr="smNativeData" val="SMDATA_13_w78LXxMAAAAlAAAADQAAAA0AAAAAkAAAAEgAAACQAAAASAAAAAAAAAAAAAAAAAAAAAEAAABQAAAAAAAAAAAA8L8AAAAAAAAAAAAAAAAAAPA/AAAAAAAA4D8AAAAAAADgPwAAAAAAAOA/AAAAAAAA4D8AAAAAAADgPwAAAAAAAOA/AAAAAAAA4D8CAAAAjAAAAAAAAAAAAAAAkMImDP///wgAAAAAAAAAAAAAAAAAAAAAAAAAAAAAAAAAAAAAZAAAAAEAAABAAAAAAAAAAAAAAAAAAAAAAAAAAAAAAAAAAAAAAAAAAAAAAAAAAAAAAAAAAAAAAAAAAAAAAAAAAAAAAAAAAAAAAAAAAAAAAAAAAAAAAAAAAAAAAAAAAAAAFAAAADwAAAABAAAAAAAAAL+/vwAPAAAAAQAAACMAAAAjAAAAIwAAAB4AAAAAAAAASwAAAEsAAAAAAAAASwAAAEsAAAAVAAAAYAAAAAAAAAAAAAAADwAAACADAAAAAAAAAAAAAAEAAACgMgAAVgcAAKr4//8BAAAAf39/AAEAAABkAAAAAAAAABQAAABAHwAAAAAAACYAAAAAAAAAwOD//wAAAAAmAAAAZAAAABYAAABMAAAAAAAAAAAAAAAEAAAAAAAAAAEAAAAsPEMKAAAAACgAAAAoAAAAZAAAAGQAAAAAAAAAzMzMAAAAAABQAAAAUAAAAGQAAABkAAAAAAAAABcAAAAUAAAAAAAAAAAAAAD/fwAA/38AAAAAAAAJAAAABAAAAAAAAAAMAAAAEAAAAAAAAAAAAAAAAAAAAAAAAAAeAAAAaAAAAAAAAAAAAAAAAAAAAAAAAAAAAAAAECcAABAnAAAAAAAAAAAAAAAAAAAAAAAAAAAAAAAAAAAAAAAAAAAAABQAAAAAAAAAwMD/AAAAAABkAAAAMgAAAAAAAABkAAAAAAAAAH9/fwAKAAAAHwAAAFQAAACQwiYF////AQAAAAAAAAAAAAAAAAAAAAAAAAAAAAAAAAAAAAAAAAAAv7+/AH9/fwAsPEMDzMzMAMDA/wB/f38AAAAAAAAAAAAAAAAAAAAAAAAAAAAhAAAAGAAAABQAAAClOQAAAAAAACVBAAAwKgAAAAAAACYAAAAIAAAA//////////8="/>
+                  <pr:smNativeData xmlns:pr="smNativeData" xmlns:p14="http://schemas.microsoft.com/office/powerpoint/2010/main" xmlns="" val="SMDATA_13_w78LXxMAAAAlAAAADQAAAA0AAAAAkAAAAEgAAACQAAAASAAAAAAAAAAAAAAAAAAAAAEAAABQAAAAAAAAAAAA8L8AAAAAAAAAAAAAAAAAAPA/AAAAAAAA4D8AAAAAAADgPwAAAAAAAOA/AAAAAAAA4D8AAAAAAADgPwAAAAAAAOA/AAAAAAAA4D8CAAAAjAAAAAAAAAAAAAAAkMImDP///wgAAAAAAAAAAAAAAAAAAAAAAAAAAAAAAAAAAAAAZAAAAAEAAABAAAAAAAAAAAAAAAAAAAAAAAAAAAAAAAAAAAAAAAAAAAAAAAAAAAAAAAAAAAAAAAAAAAAAAAAAAAAAAAAAAAAAAAAAAAAAAAAAAAAAAAAAAAAAAAAAAAAAFAAAADwAAAABAAAAAAAAAL+/vwAPAAAAAQAAACMAAAAjAAAAIwAAAB4AAAAAAAAASwAAAEsAAAAAAAAASwAAAEsAAAAVAAAAYAAAAAAAAAAAAAAADwAAACADAAAAAAAAAAAAAAEAAACgMgAAVgcAAKr4//8BAAAAf39/AAEAAABkAAAAAAAAABQAAABAHwAAAAAAACYAAAAAAAAAwOD//wAAAAAmAAAAZAAAABYAAABMAAAAAAAAAAAAAAAEAAAAAAAAAAEAAAAsPEMKAAAAACgAAAAoAAAAZAAAAGQAAAAAAAAAzMzMAAAAAABQAAAAUAAAAGQAAABkAAAAAAAAABcAAAAUAAAAAAAAAAAAAAD/fwAA/38AAAAAAAAJAAAABAAAAAAAAAAMAAAAEAAAAAAAAAAAAAAAAAAAAAAAAAAeAAAAaAAAAAAAAAAAAAAAAAAAAAAAAAAAAAAAECcAABAnAAAAAAAAAAAAAAAAAAAAAAAAAAAAAAAAAAAAAAAAAAAAABQAAAAAAAAAwMD/AAAAAABkAAAAMgAAAAAAAABkAAAAAAAAAH9/fwAKAAAAHwAAAFQAAACQwiYF////AQAAAAAAAAAAAAAAAAAAAAAAAAAAAAAAAAAAAAAAAAAAv7+/AH9/fwAsPEMDzMzMAMDA/wB/f38AAAAAAAAAAAAAAAAAAAAAAAAAAAAhAAAAGAAAABQAAAClOQAAAAAAACVBAAAwKgAAAAAAACYAAAAIAAAA//////////8="/>
                 </a:ext>
               </a:extLst>
             </p:cNvCxnSpPr>
@@ -4891,7 +4896,7 @@
             <p:cNvCxnSpPr>
               <a:extLst>
                 <a:ext uri="smNativeData">
-                  <pr:smNativeData xmlns="" xmlns:p14="http://schemas.microsoft.com/office/powerpoint/2010/main" xmlns:pr="smNativeData" val="SMDATA_13_w78LXxMAAAAlAAAADQAAAA0AAAAAkAAAAEgAAACQAAAASAAAAAAAAAAAAAAAAAAAAAEAAABQAAAAAAAAAAAA8L8AAAAAAAAAAAAAAAAAAPA/AAAAAAAA4D8AAAAAAADgPwAAAAAAAOA/AAAAAAAA4D8AAAAAAADgPwAAAAAAAOA/AAAAAAAA4D8CAAAAjAAAAAAAAAAAAAAAkMImDP///wgAAAAAAAAAAAAAAAAAAAAAAAAAAAAAAAAAAAAAZAAAAAEAAABAAAAAAAAAAAAAAAAAAAAAAAAAAAAAAAAAAAAAAAAAAAAAAAAAAAAAAAAAAAAAAAAAAAAAAAAAAAAAAAAAAAAAAAAAAAAAAAAAAAAAAAAAAAAAAAAAAAAAFAAAADwAAAABAAAAAAAAANjY2AAPAAAAAQAAACMAAAAjAAAAIwAAAB4AAAAAAAAASwAAAEsAAAAAAAAASwAAAEsAAAAVAAAAYAAAAAAAAAAAAAAADwAAACADAAAAAAAAAAAAAAEAAACgMgAAVgcAAKr4//8BAAAAf39/AAEAAABkAAAAAAAAABQAAABAHwAAAAAAACYAAAAAAAAAwOD//wAAAAAmAAAAZAAAABYAAABMAAAAAAAAAAAAAAAEAAAAAAAAAAEAAAAsPEMKAAAAACgAAAAoAAAAZAAAAGQAAAAAAAAAzMzMAAAAAABQAAAAUAAAAGQAAABkAAAAAAAAABcAAAAUAAAAAAAAAAAAAAD/fwAA/38AAAAAAAAJAAAABAAAAAAAAAAMAAAAEAAAAAAAAAAAAAAAAAAAAAAAAAAeAAAAaAAAAAAAAAAAAAAAAAAAAAAAAAAAAAAAECcAABAnAAAAAAAAAAAAAAAAAAAAAAAAAAAAAAAAAAAAAAAAAAAAABQAAAAAAAAAwMD/AAAAAABkAAAAMgAAAAAAAABkAAAAAAAAAH9/fwAKAAAAHwAAAFQAAACQwiYF////AQAAAAAAAAAAAAAAAAAAAAAAAAAAAAAAAAAAAAAAAAAA2NjYAH9/fwAsPEMDzMzMAMDA/wB/f38AAAAAAAAAAAAAAAAAAAAAAAAAAAAhAAAAGAAAABQAAACtLQAAphYAAPtKAAAwKgAAAAAAACYAAAAIAAAA//////////8="/>
+                  <pr:smNativeData xmlns:pr="smNativeData" xmlns:p14="http://schemas.microsoft.com/office/powerpoint/2010/main" xmlns="" val="SMDATA_13_w78LXxMAAAAlAAAADQAAAA0AAAAAkAAAAEgAAACQAAAASAAAAAAAAAAAAAAAAAAAAAEAAABQAAAAAAAAAAAA8L8AAAAAAAAAAAAAAAAAAPA/AAAAAAAA4D8AAAAAAADgPwAAAAAAAOA/AAAAAAAA4D8AAAAAAADgPwAAAAAAAOA/AAAAAAAA4D8CAAAAjAAAAAAAAAAAAAAAkMImDP///wgAAAAAAAAAAAAAAAAAAAAAAAAAAAAAAAAAAAAAZAAAAAEAAABAAAAAAAAAAAAAAAAAAAAAAAAAAAAAAAAAAAAAAAAAAAAAAAAAAAAAAAAAAAAAAAAAAAAAAAAAAAAAAAAAAAAAAAAAAAAAAAAAAAAAAAAAAAAAAAAAAAAAFAAAADwAAAABAAAAAAAAANjY2AAPAAAAAQAAACMAAAAjAAAAIwAAAB4AAAAAAAAASwAAAEsAAAAAAAAASwAAAEsAAAAVAAAAYAAAAAAAAAAAAAAADwAAACADAAAAAAAAAAAAAAEAAACgMgAAVgcAAKr4//8BAAAAf39/AAEAAABkAAAAAAAAABQAAABAHwAAAAAAACYAAAAAAAAAwOD//wAAAAAmAAAAZAAAABYAAABMAAAAAAAAAAAAAAAEAAAAAAAAAAEAAAAsPEMKAAAAACgAAAAoAAAAZAAAAGQAAAAAAAAAzMzMAAAAAABQAAAAUAAAAGQAAABkAAAAAAAAABcAAAAUAAAAAAAAAAAAAAD/fwAA/38AAAAAAAAJAAAABAAAAAAAAAAMAAAAEAAAAAAAAAAAAAAAAAAAAAAAAAAeAAAAaAAAAAAAAAAAAAAAAAAAAAAAAAAAAAAAECcAABAnAAAAAAAAAAAAAAAAAAAAAAAAAAAAAAAAAAAAAAAAAAAAABQAAAAAAAAAwMD/AAAAAABkAAAAMgAAAAAAAABkAAAAAAAAAH9/fwAKAAAAHwAAAFQAAACQwiYF////AQAAAAAAAAAAAAAAAAAAAAAAAAAAAAAAAAAAAAAAAAAA2NjYAH9/fwAsPEMDzMzMAMDA/wB/f38AAAAAAAAAAAAAAAAAAAAAAAAAAAAhAAAAGAAAABQAAACtLQAAphYAAPtKAAAwKgAAAAAAACYAAAAIAAAA//////////8="/>
                 </a:ext>
               </a:extLst>
             </p:cNvCxnSpPr>
@@ -4923,7 +4928,7 @@
             <p:cNvSpPr>
               <a:extLst>
                 <a:ext uri="smNativeData">
-                  <pr:smNativeData xmlns="" xmlns:p14="http://schemas.microsoft.com/office/powerpoint/2010/main" xmlns:pr="smNativeData" val="SMDATA_13_w78LXxMAAAAlAAAACwAAAA0AAAAAAAAAAAAAAAAAAAAAAAAAAAAAAAAAAAAAAAAAAAEAAABQAAAAAAAAAAAA4D8AAAAAAADgPwAAAAAAAOA/AAAAAAAA4D8AAAAAAADgPwAAAAAAAOA/AAAAAAAA4D8AAAAAAADgPwAAAAAAAOA/AAAAAAAA4D8CAAAAjAAAAAEAAAAAAAAAkMImDP///whIAAAAAAAAAAAAAAAAAAAAAAAAAAAAAAAAAAAAeAAAAAEAAABAAAAAAAAAAAAAAABaAAAAAAAAAAAAAAAAAAAAAAAAAAAAAAAAAAAAAAAAAAAAAAAAAAAAAAAAAAAAAAAAAAAAAAAAAAAAAAAAAAAAAAAAAAAAAAAAAAAAFAAAADwAAAAAAAAAAAAAAAAAAAkUAAAAAQAAABQAAAAUAAAAFAAAAAEAAAAAAAAAZAAAAGQAAAAAAAAAZAAAAGQAAAAVAAAAYAAAAAAAAAAAAAAADwAAACADAAAAAAAAAAAAAAEAAACgMgAAVgcAAKr4//8BAAAAf39/AAEAAABkAAAAAAAAABQAAABAHwAAAAAAACYAAAAAAAAAwOD//wAAAAAmAAAAZAAAABYAAABMAAAAAAAAAAAAAAAEAAAAAAAAAAEAAAAsPEMKAAAAACgAAAAoAAAAZAAAAGQAAAAAAAAAzMzMAAAAAABQAAAAUAAAAGQAAABkAAAAAAAAABcAAAAUAAAAAAAAAAAAAAD/fwAA/38AAAAAAAAJAAAABAAAAHgAbQAMAAAAEAAAAAAAAAAAAAAAAAAAAAAAAAAeAAAAaAAAAAAAAAAAAAAAAAAAAAAAAAAAAAAAECcAABAnAAAAAAAAAAAAAAAAAAAAAAAAAAAAAAAAAAAAAAAAAAAAABQAAAAAAAAAwMD/AAAAAABkAAAAMgAAAAAAAABkAAAAAAAAAH9/fwAKAAAAHwAAAFQAAACQwiYF////AQAAAAAAAAAAAAAAAAAAAAAAAAAAAAAAAAAAAAAAAAAAAAAAAn9/fwAsPEMDzMzMAMDA/wB/f38AAAAAAAAAAAAAAAAAAAAAAAAAAAAhAAAAGAAAABQAAAB7OAAA8/////tKAAAwKgAAAAAAACYAAAAIAAAA//////////8="/>
+                  <pr:smNativeData xmlns:pr="smNativeData" xmlns:p14="http://schemas.microsoft.com/office/powerpoint/2010/main" xmlns="" val="SMDATA_13_w78LXxMAAAAlAAAACwAAAA0AAAAAAAAAAAAAAAAAAAAAAAAAAAAAAAAAAAAAAAAAAAEAAABQAAAAAAAAAAAA4D8AAAAAAADgPwAAAAAAAOA/AAAAAAAA4D8AAAAAAADgPwAAAAAAAOA/AAAAAAAA4D8AAAAAAADgPwAAAAAAAOA/AAAAAAAA4D8CAAAAjAAAAAEAAAAAAAAAkMImDP///whIAAAAAAAAAAAAAAAAAAAAAAAAAAAAAAAAAAAAeAAAAAEAAABAAAAAAAAAAAAAAABaAAAAAAAAAAAAAAAAAAAAAAAAAAAAAAAAAAAAAAAAAAAAAAAAAAAAAAAAAAAAAAAAAAAAAAAAAAAAAAAAAAAAAAAAAAAAAAAAAAAAFAAAADwAAAAAAAAAAAAAAAAAAAkUAAAAAQAAABQAAAAUAAAAFAAAAAEAAAAAAAAAZAAAAGQAAAAAAAAAZAAAAGQAAAAVAAAAYAAAAAAAAAAAAAAADwAAACADAAAAAAAAAAAAAAEAAACgMgAAVgcAAKr4//8BAAAAf39/AAEAAABkAAAAAAAAABQAAABAHwAAAAAAACYAAAAAAAAAwOD//wAAAAAmAAAAZAAAABYAAABMAAAAAAAAAAAAAAAEAAAAAAAAAAEAAAAsPEMKAAAAACgAAAAoAAAAZAAAAGQAAAAAAAAAzMzMAAAAAABQAAAAUAAAAGQAAABkAAAAAAAAABcAAAAUAAAAAAAAAAAAAAD/fwAA/38AAAAAAAAJAAAABAAAAHgAbQAMAAAAEAAAAAAAAAAAAAAAAAAAAAAAAAAeAAAAaAAAAAAAAAAAAAAAAAAAAAAAAAAAAAAAECcAABAnAAAAAAAAAAAAAAAAAAAAAAAAAAAAAAAAAAAAAAAAAAAAABQAAAAAAAAAwMD/AAAAAABkAAAAMgAAAAAAAABkAAAAAAAAAH9/fwAKAAAAHwAAAFQAAACQwiYF////AQAAAAAAAAAAAAAAAAAAAAAAAAAAAAAAAAAAAAAAAAAAAAAAAn9/fwAsPEMDzMzMAMDA/wB/f38AAAAAAAAAAAAAAAAAAAAAAAAAAAAhAAAAGAAAABQAAAB7OAAA8/////tKAAAwKgAAAAAAACYAAAAIAAAA//////////8="/>
                 </a:ext>
               </a:extLst>
             </p:cNvSpPr>
@@ -4978,7 +4983,7 @@
             <p:cNvSpPr>
               <a:extLst>
                 <a:ext uri="smNativeData">
-                  <pr:smNativeData xmlns="" xmlns:p14="http://schemas.microsoft.com/office/powerpoint/2010/main" xmlns:pr="smNativeData" val="SMDATA_13_w78LXxMAAAAlAAAACwAAAA0AAAAAAAAAAAAAAAAAAAAAAAAAAAAAAAAAAAAAAAAAAAEAAABQAAAAAAAAAAAA4D8AAAAAAADgPwAAAAAAAOA/AAAAAAAA4D8AAAAAAADgPwAAAAAAAOA/AAAAAAAA4D8AAAAAAADgPwAAAAAAAOA/AAAAAAAA4D8CAAAAjAAAAAEAAAAAAAAAkMImDP///whRAAAAAAAAAAAAAAAAAAAAAAAAAAAAAAAAAAAAeAAAAAEAAABAAAAAAAAAAAAAAABaAAAAAAAAAAAAAAAAAAAAAAAAAAAAAAAAAAAAAAAAAAAAAAAAAAAAAAAAAAAAAAAAAAAAAAAAAAAAAAAAAAAAAAAAAAAAAAAAAAAAFAAAADwAAAAAAAAAAAAAAAAAAAkUAAAAAQAAABQAAAAUAAAAFAAAAAEAAAAAAAAAZAAAAGQAAAAAAAAAZAAAAGQAAAAVAAAAYAAAAAAAAAAAAAAADwAAACADAAAAAAAAAAAAAAEAAACgMgAAVgcAAKr4//8BAAAAf39/AAEAAABkAAAAAAAAABQAAABAHwAAAAAAACYAAAAAAAAAwOD//wAAAAAmAAAAZAAAABYAAABMAAAAAAAAAAAAAAAEAAAAAAAAAAEAAAAsPEMKAAAAACgAAAAoAAAAZAAAAGQAAAAAAAAAzMzMAAAAAABQAAAAUAAAAGQAAABkAAAAAAAAABcAAAAUAAAAAAAAAAAAAAD/fwAA/38AAAAAAAAJAAAABAAAACBQYXIMAAAAEAAAAAAAAAAAAAAAAAAAAAAAAAAeAAAAaAAAAAAAAAAAAAAAAAAAAAAAAAAAAAAAECcAABAnAAAAAAAAAAAAAAAAAAAAAAAAAAAAAAAAAAAAAAAAAAAAABQAAAAAAAAAwMD/AAAAAABkAAAAMgAAAAAAAABkAAAAAAAAAH9/fwAKAAAAHwAAAFQAAACQwiYF////AQAAAAAAAAAAAAAAAAAAAAAAAAAAAAAAAAAAAAAAAAAAAAAAAn9/fwAsPEMDzMzMAMDA/wB/f38AAAAAAAAAAAAAAAAAAAAAAAAAAAAhAAAAGAAAABQAAAAUOwAA8////wBLAAAwKgAAAAAAACYAAAAIAAAA//////////8="/>
+                  <pr:smNativeData xmlns:pr="smNativeData" xmlns:p14="http://schemas.microsoft.com/office/powerpoint/2010/main" xmlns="" val="SMDATA_13_w78LXxMAAAAlAAAACwAAAA0AAAAAAAAAAAAAAAAAAAAAAAAAAAAAAAAAAAAAAAAAAAEAAABQAAAAAAAAAAAA4D8AAAAAAADgPwAAAAAAAOA/AAAAAAAA4D8AAAAAAADgPwAAAAAAAOA/AAAAAAAA4D8AAAAAAADgPwAAAAAAAOA/AAAAAAAA4D8CAAAAjAAAAAEAAAAAAAAAkMImDP///whRAAAAAAAAAAAAAAAAAAAAAAAAAAAAAAAAAAAAeAAAAAEAAABAAAAAAAAAAAAAAABaAAAAAAAAAAAAAAAAAAAAAAAAAAAAAAAAAAAAAAAAAAAAAAAAAAAAAAAAAAAAAAAAAAAAAAAAAAAAAAAAAAAAAAAAAAAAAAAAAAAAFAAAADwAAAAAAAAAAAAAAAAAAAkUAAAAAQAAABQAAAAUAAAAFAAAAAEAAAAAAAAAZAAAAGQAAAAAAAAAZAAAAGQAAAAVAAAAYAAAAAAAAAAAAAAADwAAACADAAAAAAAAAAAAAAEAAACgMgAAVgcAAKr4//8BAAAAf39/AAEAAABkAAAAAAAAABQAAABAHwAAAAAAACYAAAAAAAAAwOD//wAAAAAmAAAAZAAAABYAAABMAAAAAAAAAAAAAAAEAAAAAAAAAAEAAAAsPEMKAAAAACgAAAAoAAAAZAAAAGQAAAAAAAAAzMzMAAAAAABQAAAAUAAAAGQAAABkAAAAAAAAABcAAAAUAAAAAAAAAAAAAAD/fwAA/38AAAAAAAAJAAAABAAAACBQYXIMAAAAEAAAAAAAAAAAAAAAAAAAAAAAAAAeAAAAaAAAAAAAAAAAAAAAAAAAAAAAAAAAAAAAECcAABAnAAAAAAAAAAAAAAAAAAAAAAAAAAAAAAAAAAAAAAAAAAAAABQAAAAAAAAAwMD/AAAAAABkAAAAMgAAAAAAAABkAAAAAAAAAH9/fwAKAAAAHwAAAFQAAACQwiYF////AQAAAAAAAAAAAAAAAAAAAAAAAAAAAAAAAAAAAAAAAAAAAAAAAn9/fwAsPEMDzMzMAMDA/wB/f38AAAAAAAAAAAAAAAAAAAAAAAAAAAAhAAAAGAAAABQAAAAUOwAA8////wBLAAAwKgAAAAAAACYAAAAIAAAA//////////8="/>
                 </a:ext>
               </a:extLst>
             </p:cNvSpPr>
@@ -5033,7 +5038,7 @@
             <p:cNvSpPr>
               <a:extLst>
                 <a:ext uri="smNativeData">
-                  <pr:smNativeData xmlns="" xmlns:p14="http://schemas.microsoft.com/office/powerpoint/2010/main" xmlns:pr="smNativeData" val="SMDATA_13_w78LXxMAAAAlAAAAagAAAA0AAAAAkAAAAJAAAACQAAAAkAAAAAAAAAABAAAAAAAAAAEAAABQAAAAAAAAAAAA8D8AAAAAAADgPwAAAAAAAOA/AAAAAAAA4D8AAAAAAADgPwAAAAAAAOA/AAAAAAAA4D8AAAAAAADgPwAAAAAAAOA/AAAAAAAA4D8CAAAAjAAAAAEAAAAAAAAAVKAhDf///wgeAAAAAAAAAAAAAAAAAAAAAAAAAAAAAAAAAAAAeAAAAAEAAABAAAAAAAAAAAAAAABaAAAAAAAAAAAAAAAAAAAAAAAAAAAAAAAAAAAAAAAAAAAAAAAAAAAAAAAAAAAAAAAAAAAAAAAAAAAAAAAAAAAAAAAAAAAAAAAAAAAAFAAAADwAAAAAAAAAAAAAAAAAAAkUAAAAAQAAABQAAAAUAAAAFAAAAAEAAAAAAAAAZAAAAGQAAAAAAAAAZAAAAGQAAAAVAAAAYAAAAAAAAAAAAAAADwAAACADAAAAAAAAAAAAAAEAAACgMgAAVgcAAKr4//8BAAAAf39/AAEAAABkAAAAAAAAABQAAABAHwAAAAAAACYAAAAAAAAAwOD//wAAAAAmAAAAZAAAABYAAABMAAAAAAAAAAAAAAAEAAAAAAAAAAEAAAAsPEMKAAAAACgAAAAoAAAAZAAAAGQAAAAAAAAAzMzMAAAAAABQAAAAUAAAAGQAAABkAAAAAAAAABcAAAAUAAAAAAAAAAAAAAD/fwAA/38AAAAAAAAJAAAABAAAAAAAAAAMAAAAEAAAAAAAAAAAAAAAAAAAAAAAAAAeAAAAaAAAAAAAAAAAAAAAAAAAAAAAAAAAAAAAECcAABAnAAAAAAAAAAAAAAAAAAAAAAAAAAAAAAAAAAAAAAAAAAAAABQAAAAAAAAAwMD/AAAAAABkAAAAMgAAAAAAAABkAAAAAAAAAH9/fwAKAAAAHwAAAFQAAABUoCEG////AQAAAAAAAAAAAAAAAAAAAAAAAAAAAAAAAAAAAAAAAAAAAAAAAn9/fwAsPEMDzMzMAMDA/wB/f38AAAAAAAAAAAAAAAAAAAAAAAAAAAAhAAAAGAAAABQAAADzNgAAwBIAAABLAAAwKgAAAAAAACYAAAAIAAAA//////////8="/>
+                  <pr:smNativeData xmlns:pr="smNativeData" xmlns:p14="http://schemas.microsoft.com/office/powerpoint/2010/main" xmlns="" val="SMDATA_13_w78LXxMAAAAlAAAAagAAAA0AAAAAkAAAAJAAAACQAAAAkAAAAAAAAAABAAAAAAAAAAEAAABQAAAAAAAAAAAA8D8AAAAAAADgPwAAAAAAAOA/AAAAAAAA4D8AAAAAAADgPwAAAAAAAOA/AAAAAAAA4D8AAAAAAADgPwAAAAAAAOA/AAAAAAAA4D8CAAAAjAAAAAEAAAAAAAAAVKAhDf///wgeAAAAAAAAAAAAAAAAAAAAAAAAAAAAAAAAAAAAeAAAAAEAAABAAAAAAAAAAAAAAABaAAAAAAAAAAAAAAAAAAAAAAAAAAAAAAAAAAAAAAAAAAAAAAAAAAAAAAAAAAAAAAAAAAAAAAAAAAAAAAAAAAAAAAAAAAAAAAAAAAAAFAAAADwAAAAAAAAAAAAAAAAAAAkUAAAAAQAAABQAAAAUAAAAFAAAAAEAAAAAAAAAZAAAAGQAAAAAAAAAZAAAAGQAAAAVAAAAYAAAAAAAAAAAAAAADwAAACADAAAAAAAAAAAAAAEAAACgMgAAVgcAAKr4//8BAAAAf39/AAEAAABkAAAAAAAAABQAAABAHwAAAAAAACYAAAAAAAAAwOD//wAAAAAmAAAAZAAAABYAAABMAAAAAAAAAAAAAAAEAAAAAAAAAAEAAAAsPEMKAAAAACgAAAAoAAAAZAAAAGQAAAAAAAAAzMzMAAAAAABQAAAAUAAAAGQAAABkAAAAAAAAABcAAAAUAAAAAAAAAAAAAAD/fwAA/38AAAAAAAAJAAAABAAAAAAAAAAMAAAAEAAAAAAAAAAAAAAAAAAAAAAAAAAeAAAAaAAAAAAAAAAAAAAAAAAAAAAAAAAAAAAAECcAABAnAAAAAAAAAAAAAAAAAAAAAAAAAAAAAAAAAAAAAAAAAAAAABQAAAAAAAAAwMD/AAAAAABkAAAAMgAAAAAAAABkAAAAAAAAAH9/fwAKAAAAHwAAAFQAAABUoCEG////AQAAAAAAAAAAAAAAAAAAAAAAAAAAAAAAAAAAAAAAAAAAAAAAAn9/fwAsPEMDzMzMAMDA/wB/f38AAAAAAAAAAAAAAAAAAAAAAAAAAAAhAAAAGAAAABQAAADzNgAAwBIAAABLAAAwKgAAAAAAACYAAAAIAAAA//////////8="/>
                 </a:ext>
               </a:extLst>
             </p:cNvSpPr>
@@ -5082,7 +5087,7 @@
             <p:cNvSpPr>
               <a:extLst>
                 <a:ext uri="smNativeData">
-                  <pr:smNativeData xmlns="" xmlns:p14="http://schemas.microsoft.com/office/powerpoint/2010/main" xmlns:pr="smNativeData" val="SMDATA_13_w78LXxMAAAAlAAAACwAAAA0AAAAAAAAAAAAAAAAAAAAAAAAAAAAAAAAAAAAAAAAAAAEAAABQAAAAAAAAAAAA4D8AAAAAAADgPwAAAAAAAOA/AAAAAAAA4D8AAAAAAADgPwAAAAAAAOA/AAAAAAAA4D8AAAAAAADgPwAAAAAAAOA/AAAAAAAA4D8CAAAAjAAAAAEAAAAAAAAAP3gYAP///wggAAAAAAAAAAAAAAAAAAAAAAAAAAAAAAAAAAAAeAAAAAEAAABAAAAAAAAAAAAAAABaAAAAAAAAAAAAAAAAAAAAAAAAAAAAAAAAAAAAAAAAAAAAAAAAAAAAAAAAAAAAAAAAAAAAAAAAAAAAAAAAAAAAAAAAAAAAAAAAAAAAFAAAADwAAAAAAAAAAAAAAAAAAAkUAAAAAQAAABQAAAAUAAAAFAAAAAEAAAAAAAAAZAAAAGQAAAAAAAAAZAAAAGQAAAAVAAAAYAAAAAAAAAAAAAAADwAAACADAAAAAAAAAAAAAAEAAACgMgAAVgcAAKr4//8BAAAAf39/AAEAAABkAAAAAAAAABQAAABAHwAAAAAAACYAAAAAAAAAwOD//wAAAAAmAAAAZAAAABYAAABMAAAAAAAAAAAAAAAEAAAAAAAAAAEAAAAsPEMKAAAAACgAAAAoAAAAZAAAAGQAAAAAAAAAzMzMAAAAAABQAAAAUAAAAGQAAABkAAAAAAAAABcAAAAUAAAAAAAAAAAAAAD/fwAA/38AAAAAAAAJAAAABAAAAAAAAAAMAAAAEAAAAAAAAAAAAAAAAAAAAAAAAAAeAAAAaAAAAAAAAAAAAAAAAAAAAAAAAAAAAAAAECcAABAnAAAAAAAAAAAAAAAAAAAAAAAAAAAAAAAAAAAAAAAAAAAAABQAAAAAAAAAwMD/AAAAAABkAAAAMgAAAAAAAABkAAAAAAAAAH9/fwAKAAAAHwAAAFQAAAA/eBgA////AQAAAAAAAAAAAAAAAAAAAAAAAAAAAAAAAAAAAAAAAAAAAAAAAn9/fwAsPEMDzMzMAMDA/wB/f38AAAAAAAAAAAAAAAAAAAAAAAAAAAAhAAAAGAAAABQAAABsOQAA8/////tKAAAwKgAAAAAAACYAAAAIAAAA//////////8="/>
+                  <pr:smNativeData xmlns:pr="smNativeData" xmlns:p14="http://schemas.microsoft.com/office/powerpoint/2010/main" xmlns="" val="SMDATA_13_w78LXxMAAAAlAAAACwAAAA0AAAAAAAAAAAAAAAAAAAAAAAAAAAAAAAAAAAAAAAAAAAEAAABQAAAAAAAAAAAA4D8AAAAAAADgPwAAAAAAAOA/AAAAAAAA4D8AAAAAAADgPwAAAAAAAOA/AAAAAAAA4D8AAAAAAADgPwAAAAAAAOA/AAAAAAAA4D8CAAAAjAAAAAEAAAAAAAAAP3gYAP///wggAAAAAAAAAAAAAAAAAAAAAAAAAAAAAAAAAAAAeAAAAAEAAABAAAAAAAAAAAAAAABaAAAAAAAAAAAAAAAAAAAAAAAAAAAAAAAAAAAAAAAAAAAAAAAAAAAAAAAAAAAAAAAAAAAAAAAAAAAAAAAAAAAAAAAAAAAAAAAAAAAAFAAAADwAAAAAAAAAAAAAAAAAAAkUAAAAAQAAABQAAAAUAAAAFAAAAAEAAAAAAAAAZAAAAGQAAAAAAAAAZAAAAGQAAAAVAAAAYAAAAAAAAAAAAAAADwAAACADAAAAAAAAAAAAAAEAAACgMgAAVgcAAKr4//8BAAAAf39/AAEAAABkAAAAAAAAABQAAABAHwAAAAAAACYAAAAAAAAAwOD//wAAAAAmAAAAZAAAABYAAABMAAAAAAAAAAAAAAAEAAAAAAAAAAEAAAAsPEMKAAAAACgAAAAoAAAAZAAAAGQAAAAAAAAAzMzMAAAAAABQAAAAUAAAAGQAAABkAAAAAAAAABcAAAAUAAAAAAAAAAAAAAD/fwAA/38AAAAAAAAJAAAABAAAAAAAAAAMAAAAEAAAAAAAAAAAAAAAAAAAAAAAAAAeAAAAaAAAAAAAAAAAAAAAAAAAAAAAAAAAAAAAECcAABAnAAAAAAAAAAAAAAAAAAAAAAAAAAAAAAAAAAAAAAAAAAAAABQAAAAAAAAAwMD/AAAAAABkAAAAMgAAAAAAAABkAAAAAAAAAH9/fwAKAAAAHwAAAFQAAAA/eBgA////AQAAAAAAAAAAAAAAAAAAAAAAAAAAAAAAAAAAAAAAAAAAAAAAAn9/fwAsPEMDzMzMAMDA/wB/f38AAAAAAAAAAAAAAAAAAAAAAAAAAAAhAAAAGAAAABQAAABsOQAA8/////tKAAAwKgAAAAAAACYAAAAIAAAA//////////8="/>
                 </a:ext>
               </a:extLst>
             </p:cNvSpPr>
@@ -5137,7 +5142,7 @@
             <p:cNvSpPr>
               <a:extLst>
                 <a:ext uri="smNativeData">
-                  <pr:smNativeData xmlns="" xmlns:p14="http://schemas.microsoft.com/office/powerpoint/2010/main" xmlns:pr="smNativeData" val="SMDATA_13_w78LXxMAAAAlAAAACwAAAA0AAAAAAAAAAAAAAAAAAAAAAAAAAAAAAAAAAAAAAAAAAAEAAABQAAAAAAAAAAAA4D8AAAAAAADgPwAAAAAAAOA/AAAAAAAA4D8AAAAAAADgPwAAAAAAAOA/AAAAAAAA4D8AAAAAAADgPwAAAAAAAOA/AAAAAAAA4D8CAAAAjAAAAAEAAAAAAAAAv+RxAP///wggAAAAAAAAAAAAAAAAAAAAAAAAAAAAAAAAAAAAeAAAAAEAAABAAAAAAAAAAAAAAABaAAAAAAAAAAAAAAAAAAAAAAAAAAAAAAAAAAAAAAAAAAAAAAAAAAAAAAAAAAAAAAAAAAAAAAAAAAAAAAAAAAAAAAAAAAAAAAAAAAAAFAAAADwAAAAAAAAAAAAAAAAAAAkUAAAAAQAAABQAAAAUAAAAFAAAAAEAAAAAAAAAZAAAAGQAAAAAAAAAZAAAAGQAAAAVAAAAYAAAAAAAAAAAAAAADwAAACADAAAAAAAAAAAAAAEAAACgMgAAVgcAAKr4//8BAAAAf39/AAEAAABkAAAAAAAAABQAAABAHwAAAAAAACYAAAAAAAAAwOD//wAAAAAmAAAAZAAAABYAAABMAAAAAAAAAAAAAAAEAAAAAAAAAAEAAAAsPEMKAAAAACgAAAAoAAAAZAAAAGQAAAAAAAAAzMzMAAAAAABQAAAAUAAAAGQAAABkAAAAAAAAABcAAAAUAAAAAAAAAAAAAAD/fwAA/38AAAAAAAAJAAAABAAAAAAAAAAMAAAAEAAAAAAAAAAAAAAAAAAAAAAAAAAeAAAAaAAAAAAAAAAAAAAAAAAAAAAAAAAAAAAAECcAABAnAAAAAAAAAAAAAAAAAAAAAAAAAAAAAAAAAAAAAAAAAAAAABQAAAAAAAAAwMD/AAAAAABkAAAAMgAAAAAAAABkAAAAAAAAAH9/fwAKAAAAHwAAAFQAAAC/5HEA////AQAAAAAAAAAAAAAAAAAAAAAAAAAAAAAAAAAAAAAAAAAAAAAAAn9/fwAsPEMDzMzMAMDA/wB/f38AAAAAAAAAAAAAAAAAAAAAAAAAAAAhAAAAGAAAABQAAAALQwAA8/////tKAAAwKgAAAAAAACYAAAAIAAAA//////////8="/>
+                  <pr:smNativeData xmlns:pr="smNativeData" xmlns:p14="http://schemas.microsoft.com/office/powerpoint/2010/main" xmlns="" val="SMDATA_13_w78LXxMAAAAlAAAACwAAAA0AAAAAAAAAAAAAAAAAAAAAAAAAAAAAAAAAAAAAAAAAAAEAAABQAAAAAAAAAAAA4D8AAAAAAADgPwAAAAAAAOA/AAAAAAAA4D8AAAAAAADgPwAAAAAAAOA/AAAAAAAA4D8AAAAAAADgPwAAAAAAAOA/AAAAAAAA4D8CAAAAjAAAAAEAAAAAAAAAv+RxAP///wggAAAAAAAAAAAAAAAAAAAAAAAAAAAAAAAAAAAAeAAAAAEAAABAAAAAAAAAAAAAAABaAAAAAAAAAAAAAAAAAAAAAAAAAAAAAAAAAAAAAAAAAAAAAAAAAAAAAAAAAAAAAAAAAAAAAAAAAAAAAAAAAAAAAAAAAAAAAAAAAAAAFAAAADwAAAAAAAAAAAAAAAAAAAkUAAAAAQAAABQAAAAUAAAAFAAAAAEAAAAAAAAAZAAAAGQAAAAAAAAAZAAAAGQAAAAVAAAAYAAAAAAAAAAAAAAADwAAACADAAAAAAAAAAAAAAEAAACgMgAAVgcAAKr4//8BAAAAf39/AAEAAABkAAAAAAAAABQAAABAHwAAAAAAACYAAAAAAAAAwOD//wAAAAAmAAAAZAAAABYAAABMAAAAAAAAAAAAAAAEAAAAAAAAAAEAAAAsPEMKAAAAACgAAAAoAAAAZAAAAGQAAAAAAAAAzMzMAAAAAABQAAAAUAAAAGQAAABkAAAAAAAAABcAAAAUAAAAAAAAAAAAAAD/fwAA/38AAAAAAAAJAAAABAAAAAAAAAAMAAAAEAAAAAAAAAAAAAAAAAAAAAAAAAAeAAAAaAAAAAAAAAAAAAAAAAAAAAAAAAAAAAAAECcAABAnAAAAAAAAAAAAAAAAAAAAAAAAAAAAAAAAAAAAAAAAAAAAABQAAAAAAAAAwMD/AAAAAABkAAAAMgAAAAAAAABkAAAAAAAAAH9/fwAKAAAAHwAAAFQAAAC/5HEA////AQAAAAAAAAAAAAAAAAAAAAAAAAAAAAAAAAAAAAAAAAAAAAAAAn9/fwAsPEMDzMzMAMDA/wB/f38AAAAAAAAAAAAAAAAAAAAAAAAAAAAhAAAAGAAAABQAAAALQwAA8/////tKAAAwKgAAAAAAACYAAAAIAAAA//////////8="/>
                 </a:ext>
               </a:extLst>
             </p:cNvSpPr>
@@ -5192,7 +5197,7 @@
             <p:cNvSpPr>
               <a:extLst>
                 <a:ext uri="smNativeData">
-                  <pr:smNativeData xmlns="" xmlns:p14="http://schemas.microsoft.com/office/powerpoint/2010/main" xmlns:pr="smNativeData" val="SMDATA_13_w78LXxMAAAAlAAAACwAAAA0AAAAAAAAAAAAAAAAAAAAAAAAAAAAAAAAAAAAAAAAAAAEAAABQAAAAAAAAAAAA4D8AAAAAAADgPwAAAAAAAOA/AAAAAAAA4D8AAAAAAADgPwAAAAAAAOA/AAAAAAAA4D8AAAAAAADgPwAAAAAAAOA/AAAAAAAA4D8CAAAAjAAAAAEAAAAAAAAAkMImDP///wglAAAAAAAAAAAAAAAAAAAAAAAAAAAAAAAAAAAAeAAAAAEAAABAAAAAAAAAAAAAAABaAAAAAAAAAAAAAAAAAAAAAAAAAAAAAAAAAAAAAAAAAAAAAAAAAAAAAAAAAAAAAAAAAAAAAAAAAAAAAAAAAAAAAAAAAAAAAAAAAAAAFAAAADwAAAAAAAAAAAAAAAAAAAkUAAAAAQAAABQAAAAUAAAAFAAAAAEAAAAAAAAAZAAAAGQAAAAAAAAAZAAAAGQAAAAVAAAAYAAAAAAAAAAAAAAADwAAACADAAAAAAAAAAAAAAEAAACgMgAAVgcAAKr4//8BAAAAf39/AAEAAABkAAAAAAAAABQAAABAHwAAAAAAACYAAAAAAAAAwOD//wAAAAAmAAAAZAAAABYAAABMAAAAAAAAAAAAAAAEAAAAAAAAAAEAAAAsPEMKAAAAACgAAAAoAAAAZAAAAGQAAAAAAAAAzMzMAAAAAABQAAAAUAAAAGQAAABkAAAAAAAAABcAAAAUAAAAAAAAAAAAAAD/fwAA/38AAAAAAAAJAAAABAAAAAAAAAAMAAAAEAAAAAAAAAAAAAAAAAAAAAAAAAAeAAAAaAAAAAAAAAAAAAAAAAAAAAAAAAAAAAAAECcAABAnAAAAAAAAAAAAAAAAAAAAAAAAAAAAAAAAAAAAAAAAAAAAABQAAAAAAAAAwMD/AAAAAABkAAAAMgAAAAAAAABkAAAAAAAAAH9/fwAKAAAAHwAAAFQAAACQwiYF////AQAAAAAAAAAAAAAAAAAAAAAAAAAAAAAAAAAAAAAAAAAAAAAAAn9/fwAsPEMDzMzMAMDA/wB/f38AAAAAAAAAAAAAAAAAAAAAAAAAAAAhAAAAGAAAABQAAABLQwAA8/////tKAAAwKgAAAAAAACYAAAAIAAAA//////////8="/>
+                  <pr:smNativeData xmlns:pr="smNativeData" xmlns:p14="http://schemas.microsoft.com/office/powerpoint/2010/main" xmlns="" val="SMDATA_13_w78LXxMAAAAlAAAACwAAAA0AAAAAAAAAAAAAAAAAAAAAAAAAAAAAAAAAAAAAAAAAAAEAAABQAAAAAAAAAAAA4D8AAAAAAADgPwAAAAAAAOA/AAAAAAAA4D8AAAAAAADgPwAAAAAAAOA/AAAAAAAA4D8AAAAAAADgPwAAAAAAAOA/AAAAAAAA4D8CAAAAjAAAAAEAAAAAAAAAkMImDP///wglAAAAAAAAAAAAAAAAAAAAAAAAAAAAAAAAAAAAeAAAAAEAAABAAAAAAAAAAAAAAABaAAAAAAAAAAAAAAAAAAAAAAAAAAAAAAAAAAAAAAAAAAAAAAAAAAAAAAAAAAAAAAAAAAAAAAAAAAAAAAAAAAAAAAAAAAAAAAAAAAAAFAAAADwAAAAAAAAAAAAAAAAAAAkUAAAAAQAAABQAAAAUAAAAFAAAAAEAAAAAAAAAZAAAAGQAAAAAAAAAZAAAAGQAAAAVAAAAYAAAAAAAAAAAAAAADwAAACADAAAAAAAAAAAAAAEAAACgMgAAVgcAAKr4//8BAAAAf39/AAEAAABkAAAAAAAAABQAAABAHwAAAAAAACYAAAAAAAAAwOD//wAAAAAmAAAAZAAAABYAAABMAAAAAAAAAAAAAAAEAAAAAAAAAAEAAAAsPEMKAAAAACgAAAAoAAAAZAAAAGQAAAAAAAAAzMzMAAAAAABQAAAAUAAAAGQAAABkAAAAAAAAABcAAAAUAAAAAAAAAAAAAAD/fwAA/38AAAAAAAAJAAAABAAAAAAAAAAMAAAAEAAAAAAAAAAAAAAAAAAAAAAAAAAeAAAAaAAAAAAAAAAAAAAAAAAAAAAAAAAAAAAAECcAABAnAAAAAAAAAAAAAAAAAAAAAAAAAAAAAAAAAAAAAAAAAAAAABQAAAAAAAAAwMD/AAAAAABkAAAAMgAAAAAAAABkAAAAAAAAAH9/fwAKAAAAHwAAAFQAAACQwiYF////AQAAAAAAAAAAAAAAAAAAAAAAAAAAAAAAAAAAAAAAAAAAAAAAAn9/fwAsPEMDzMzMAMDA/wB/f38AAAAAAAAAAAAAAAAAAAAAAAAAAAAhAAAAGAAAABQAAABLQwAA8/////tKAAAwKgAAAAAAACYAAAAIAAAA//////////8="/>
                 </a:ext>
               </a:extLst>
             </p:cNvSpPr>
@@ -5247,7 +5252,7 @@
             <p:cNvSpPr>
               <a:extLst>
                 <a:ext uri="smNativeData">
-                  <pr:smNativeData xmlns="" xmlns:p14="http://schemas.microsoft.com/office/powerpoint/2010/main" xmlns:pr="smNativeData" val="SMDATA_13_w78LXxMAAAAlAAAAagAAAA0AAAAAkAAAAJAAAACQAAAAkAAAAAAAAAABAAAAAAAAAAEAAABQAAAAAAAAAAAA8D8AAAAAAADgPwAAAAAAAOA/AAAAAAAA4D8AAAAAAADgPwAAAAAAAOA/AAAAAAAA4D8AAAAAAADgPwAAAAAAAOA/AAAAAAAA4D8CAAAAjAAAAAEAAAAAAAAAkMImDP///wgVAAAAAAAAAAAAAAAAAAAAAAAAAAAAAAAAAAAAeAAAAAEAAABAAAAAAAAAAAAAAABaAAAAAAAAAAAAAAAAAAAAAAAAAAAAAAAAAAAAAAAAAAAAAAAAAAAAAAAAAAAAAAAAAAAAAAAAAAAAAAAAAAAAAAAAAAAAAAAAAAAAFAAAADwAAAAAAAAAAAAAAAAAAAkUAAAAAQAAABQAAAAUAAAAFAAAAAEAAAAAAAAAZAAAAGQAAAAAAAAAZAAAAGQAAAAVAAAAYAAAAAAAAAAAAAAADwAAACADAAAAAAAAAAAAAAEAAACgMgAAVgcAAKr4//8BAAAAf39/AAEAAABkAAAAAAAAABQAAABAHwAAAAAAACYAAAAAAAAAwOD//wAAAAAmAAAAZAAAABYAAABMAAAAAAAAAAAAAAAEAAAAAAAAAAEAAAAsPEMKAAAAACgAAAAoAAAAZAAAAGQAAAAAAAAAzMzMAAAAAABQAAAAUAAAAGQAAABkAAAAAAAAABcAAAAUAAAAAAAAAAAAAAD/fwAA/38AAAAAAAAJAAAABAAAAAAAAAAMAAAAEAAAAAAAAAAAAAAAAAAAAAAAAAAeAAAAaAAAAAAAAAAAAAAAAAAAAAAAAAAAAAAAECcAABAnAAAAAAAAAAAAAAAAAAAAAAAAAAAAAAAAAAAAAAAAAAAAABQAAAAAAAAAwMD/AAAAAABkAAAAMgAAAAAAAABkAAAAAAAAAH9/fwAKAAAAHwAAAFQAAACQwiYF////AQAAAAAAAAAAAAAAAAAAAAAAAAAAAAAAAAAAAAAAAAAAAAAAAn9/fwAsPEMDzMzMAMDA/wB/f38AAAAAAAAAAAAAAAAAAAAAAAAAAAAhAAAAGAAAABQAAADNPwAAFRYAAPtKAAAwKgAAAAAAACYAAAAIAAAA//////////8="/>
+                  <pr:smNativeData xmlns:pr="smNativeData" xmlns:p14="http://schemas.microsoft.com/office/powerpoint/2010/main" xmlns="" val="SMDATA_13_w78LXxMAAAAlAAAAagAAAA0AAAAAkAAAAJAAAACQAAAAkAAAAAAAAAABAAAAAAAAAAEAAABQAAAAAAAAAAAA8D8AAAAAAADgPwAAAAAAAOA/AAAAAAAA4D8AAAAAAADgPwAAAAAAAOA/AAAAAAAA4D8AAAAAAADgPwAAAAAAAOA/AAAAAAAA4D8CAAAAjAAAAAEAAAAAAAAAkMImDP///wgVAAAAAAAAAAAAAAAAAAAAAAAAAAAAAAAAAAAAeAAAAAEAAABAAAAAAAAAAAAAAABaAAAAAAAAAAAAAAAAAAAAAAAAAAAAAAAAAAAAAAAAAAAAAAAAAAAAAAAAAAAAAAAAAAAAAAAAAAAAAAAAAAAAAAAAAAAAAAAAAAAAFAAAADwAAAAAAAAAAAAAAAAAAAkUAAAAAQAAABQAAAAUAAAAFAAAAAEAAAAAAAAAZAAAAGQAAAAAAAAAZAAAAGQAAAAVAAAAYAAAAAAAAAAAAAAADwAAACADAAAAAAAAAAAAAAEAAACgMgAAVgcAAKr4//8BAAAAf39/AAEAAABkAAAAAAAAABQAAABAHwAAAAAAACYAAAAAAAAAwOD//wAAAAAmAAAAZAAAABYAAABMAAAAAAAAAAAAAAAEAAAAAAAAAAEAAAAsPEMKAAAAACgAAAAoAAAAZAAAAGQAAAAAAAAAzMzMAAAAAABQAAAAUAAAAGQAAABkAAAAAAAAABcAAAAUAAAAAAAAAAAAAAD/fwAA/38AAAAAAAAJAAAABAAAAAAAAAAMAAAAEAAAAAAAAAAAAAAAAAAAAAAAAAAeAAAAaAAAAAAAAAAAAAAAAAAAAAAAAAAAAAAAECcAABAnAAAAAAAAAAAAAAAAAAAAAAAAAAAAAAAAAAAAAAAAAAAAABQAAAAAAAAAwMD/AAAAAABkAAAAMgAAAAAAAABkAAAAAAAAAH9/fwAKAAAAHwAAAFQAAACQwiYF////AQAAAAAAAAAAAAAAAAAAAAAAAAAAAAAAAAAAAAAAAAAAAAAAAn9/fwAsPEMDzMzMAMDA/wB/f38AAAAAAAAAAAAAAAAAAAAAAAAAAAAhAAAAGAAAABQAAADNPwAAFRYAAPtKAAAwKgAAAAAAACYAAAAIAAAA//////////8="/>
                 </a:ext>
               </a:extLst>
             </p:cNvSpPr>
@@ -5296,7 +5301,7 @@
             <p:cNvSpPr>
               <a:extLst>
                 <a:ext uri="smNativeData">
-                  <pr:smNativeData xmlns="" xmlns:p14="http://schemas.microsoft.com/office/powerpoint/2010/main" xmlns:pr="smNativeData" val="SMDATA_13_w78LXxMAAAAlAAAAagAAAA0AAAAAkAAAAJAAAACQAAAAkAAAAAAAAAABAAAAAAAAAAEAAABQAAAAAAAAAAAA8D8AAAAAAADgPwAAAAAAAOA/AAAAAAAA4D8AAAAAAADgPwAAAAAAAOA/AAAAAAAA4D8AAAAAAADgPwAAAAAAAOA/AAAAAAAA4D8CAAAAjAAAAAEAAAAAAAAAkMImDP///wgRAAAAAAAAAAAAAAAAAAAAAAAAAAAAAAAAAAAAeAAAAAEAAABAAAAAAAAAAAAAAABaAAAAAAAAAAAAAAAAAAAAAAAAAAAAAAAAAAAAAAAAAAAAAAAAAAAAAAAAAAAAAAAAAAAAAAAAAAAAAAAAAAAAAAAAAAAAAAAAAAAAFAAAADwAAAAAAAAAAAAAAAAAAAkUAAAAAQAAABQAAAAUAAAAFAAAAAEAAAAAAAAAZAAAAGQAAAAAAAAAZAAAAGQAAAAVAAAAYAAAAAAAAAAAAAAADwAAACADAAAAAAAAAAAAAAEAAACgMgAAVgcAAKr4//8BAAAAf39/AAEAAABkAAAAAAAAABQAAABAHwAAAAAAACYAAAAAAAAAwOD//wAAAAAmAAAAZAAAABYAAABMAAAAAAAAAAAAAAAEAAAAAAAAAAEAAAAsPEMKAAAAACgAAAAoAAAAZAAAAGQAAAAAAAAAzMzMAAAAAABQAAAAUAAAAGQAAABkAAAAAAAAABcAAAAUAAAAAAAAAAAAAAD/fwAA/38AAAAAAAAJAAAABAAAAGDUaxAMAAAAEAAAAAAAAAAAAAAAAAAAAAAAAAAeAAAAaAAAAAAAAAAAAAAAAAAAAAAAAAAAAAAAECcAABAnAAAAAAAAAAAAAAAAAAAAAAAAAAAAAAAAAAAAAAAAAAAAABQAAAAAAAAAwMD/AAAAAABkAAAAMgAAAAAAAABkAAAAAAAAAH9/fwAKAAAAHwAAAFQAAACQwiYF////AQAAAAAAAAAAAAAAAAAAAAAAAAAAAAAAAAAAAAAAAAAAAAAAAn9/fwAsPEMDzMzMAMDA/wB/f38AAAAAAAAAAAAAAAAAAAAAAAAAAAAhAAAAGAAAABQAAAAAAAAAAAAAAC8FAADbIgAAAAAAACYAAAAIAAAA//////////8="/>
+                  <pr:smNativeData xmlns:pr="smNativeData" xmlns:p14="http://schemas.microsoft.com/office/powerpoint/2010/main" xmlns="" val="SMDATA_13_w78LXxMAAAAlAAAAagAAAA0AAAAAkAAAAJAAAACQAAAAkAAAAAAAAAABAAAAAAAAAAEAAABQAAAAAAAAAAAA8D8AAAAAAADgPwAAAAAAAOA/AAAAAAAA4D8AAAAAAADgPwAAAAAAAOA/AAAAAAAA4D8AAAAAAADgPwAAAAAAAOA/AAAAAAAA4D8CAAAAjAAAAAEAAAAAAAAAkMImDP///wgRAAAAAAAAAAAAAAAAAAAAAAAAAAAAAAAAAAAAeAAAAAEAAABAAAAAAAAAAAAAAABaAAAAAAAAAAAAAAAAAAAAAAAAAAAAAAAAAAAAAAAAAAAAAAAAAAAAAAAAAAAAAAAAAAAAAAAAAAAAAAAAAAAAAAAAAAAAAAAAAAAAFAAAADwAAAAAAAAAAAAAAAAAAAkUAAAAAQAAABQAAAAUAAAAFAAAAAEAAAAAAAAAZAAAAGQAAAAAAAAAZAAAAGQAAAAVAAAAYAAAAAAAAAAAAAAADwAAACADAAAAAAAAAAAAAAEAAACgMgAAVgcAAKr4//8BAAAAf39/AAEAAABkAAAAAAAAABQAAABAHwAAAAAAACYAAAAAAAAAwOD//wAAAAAmAAAAZAAAABYAAABMAAAAAAAAAAAAAAAEAAAAAAAAAAEAAAAsPEMKAAAAACgAAAAoAAAAZAAAAGQAAAAAAAAAzMzMAAAAAABQAAAAUAAAAGQAAABkAAAAAAAAABcAAAAUAAAAAAAAAAAAAAD/fwAA/38AAAAAAAAJAAAABAAAAGDUaxAMAAAAEAAAAAAAAAAAAAAAAAAAAAAAAAAeAAAAaAAAAAAAAAAAAAAAAAAAAAAAAAAAAAAAECcAABAnAAAAAAAAAAAAAAAAAAAAAAAAAAAAAAAAAAAAAAAAAAAAABQAAAAAAAAAwMD/AAAAAABkAAAAMgAAAAAAAABkAAAAAAAAAH9/fwAKAAAAHwAAAFQAAACQwiYF////AQAAAAAAAAAAAAAAAAAAAAAAAAAAAAAAAAAAAAAAAAAAAAAAAn9/fwAsPEMDzMzMAMDA/wB/f38AAAAAAAAAAAAAAAAAAAAAAAAAAAAhAAAAGAAAABQAAAAAAAAAAAAAAC8FAADbIgAAAAAAACYAAAAIAAAA//////////8="/>
                 </a:ext>
               </a:extLst>
             </p:cNvSpPr>
@@ -5347,7 +5352,7 @@
             <a:spLocks noGrp="1" noChangeArrowheads="1"/>
             <a:extLst>
               <a:ext uri="smNativeData">
-                <pr:smNativeData xmlns="" xmlns:p14="http://schemas.microsoft.com/office/powerpoint/2010/main" xmlns:pr="smNativeData" val="SMDATA_13_w78LXxMAAAAlAAAAZAAAAA0AAAAAkAAAAJAAAACQAAAAkAAAAAAAAAACAAAAAAAAAAEAAABQAAAAAAAAAAAA4D8AAAAAAADgPwAAAAAAAOA/AAAAAAAA4D8AAAAAAADgPwAAAAAAAOA/AAAAAAAA4D8AAAAAAADgPwAAAAAAAOA/AAAAAAAA4D8CAAAAjAAAAAAAAAAAAAAAkMImDP///wgAAAAAAAAAAAAAAAAAAAAAAAAAAAAAAAAAAAAAZAAAAAEAAABAAAAAAAAAAAAAAAAAAAAAAAAAAAAAAAAAAAAAAAAAAAAAAAAAAAAAAAAAAAAAAAAAAAAAAAAAAAAAAAAAAAAAAAAAAAAAAAAAAAAAAAAAAAAAAAAAAAAAFAAAADwAAAAAAAAAAAAAAAAAAAkUAAAAAQAAABQAAAAUAAAAFAAAAAEAAAAAAAAAZAAAAGQAAAAAAAAAZAAAAGQAAAAVAAAAYAAAAAAAAAAAAAAADwAAACADAAAAAAAAAAAAAAEAAACgMgAAVgcAAKr4//8BAAAAf39/AAEAAABkAAAAAAAAABQAAABAHwAAAAAAACYAAAAAAAAAwOD//wAAAAAmAAAAZAAAABYAAABMAAAAAAAAAAAAAAAEAAAAAAAAAAEAAAAsPEMKAAAAACgAAAAoAAAAZAAAAGQAAAAAAAAAzMzMAAAAAABQAAAAUAAAAGQAAABkAAAAAAAAABcAAAAUAAAAAAAAAAAAAAD/fwAA/38AAAAAAAAJAAAABAAAAAAAAAAMAAAAEAAAAAAAAAAAAAAAAAAAAAAAAAAeAAAAaAAAAAAAAAAAAAAAAAAAAAAAAAAAAAAAECcAABAnAAAAAAAAAAAAAAAAAAAAAAAAAAAAAAAAAAAAAAAAAAAAABQAAAAAAAAAwMD/AAAAAABkAAAAMgAAAAAAAABkAAAAAAAAAH9/fwAKAAAAHwAAAFQAAAAAAAAFAAAAAQAAAAAAAAAAAAAAAAAAAAAAAAAAAAAAAAAAAAAAAAAAAAAAAn9/fwAAAAADzMzMAMDA/wB/f38AAAAAAAAAAAAAAAAAAAAAAAAAAAAhAAAAGAAAABQAAABFCQAAyw4AAA05AADrGAAAEAAAACYAAAAIAAAAvZAAAP8fAAA="/>
+                <pr:smNativeData xmlns:pr="smNativeData" xmlns:p14="http://schemas.microsoft.com/office/powerpoint/2010/main" xmlns="" val="SMDATA_13_w78LXxMAAAAlAAAAZAAAAA0AAAAAkAAAAJAAAACQAAAAkAAAAAAAAAACAAAAAAAAAAEAAABQAAAAAAAAAAAA4D8AAAAAAADgPwAAAAAAAOA/AAAAAAAA4D8AAAAAAADgPwAAAAAAAOA/AAAAAAAA4D8AAAAAAADgPwAAAAAAAOA/AAAAAAAA4D8CAAAAjAAAAAAAAAAAAAAAkMImDP///wgAAAAAAAAAAAAAAAAAAAAAAAAAAAAAAAAAAAAAZAAAAAEAAABAAAAAAAAAAAAAAAAAAAAAAAAAAAAAAAAAAAAAAAAAAAAAAAAAAAAAAAAAAAAAAAAAAAAAAAAAAAAAAAAAAAAAAAAAAAAAAAAAAAAAAAAAAAAAAAAAAAAAFAAAADwAAAAAAAAAAAAAAAAAAAkUAAAAAQAAABQAAAAUAAAAFAAAAAEAAAAAAAAAZAAAAGQAAAAAAAAAZAAAAGQAAAAVAAAAYAAAAAAAAAAAAAAADwAAACADAAAAAAAAAAAAAAEAAACgMgAAVgcAAKr4//8BAAAAf39/AAEAAABkAAAAAAAAABQAAABAHwAAAAAAACYAAAAAAAAAwOD//wAAAAAmAAAAZAAAABYAAABMAAAAAAAAAAAAAAAEAAAAAAAAAAEAAAAsPEMKAAAAACgAAAAoAAAAZAAAAGQAAAAAAAAAzMzMAAAAAABQAAAAUAAAAGQAAABkAAAAAAAAABcAAAAUAAAAAAAAAAAAAAD/fwAA/38AAAAAAAAJAAAABAAAAAAAAAAMAAAAEAAAAAAAAAAAAAAAAAAAAAAAAAAeAAAAaAAAAAAAAAAAAAAAAAAAAAAAAAAAAAAAECcAABAnAAAAAAAAAAAAAAAAAAAAAAAAAAAAAAAAAAAAAAAAAAAAABQAAAAAAAAAwMD/AAAAAABkAAAAMgAAAAAAAABkAAAAAAAAAH9/fwAKAAAAHwAAAFQAAAAAAAAFAAAAAQAAAAAAAAAAAAAAAAAAAAAAAAAAAAAAAAAAAAAAAAAAAAAAAn9/fwAAAAADzMzMAMDA/wB/f38AAAAAAAAAAAAAAAAAAAAAAAAAAAAhAAAAGAAAABQAAABFCQAAyw4AAA05AADrGAAAEAAAACYAAAAIAAAAvZAAAP8fAAA="/>
               </a:ext>
             </a:extLst>
           </p:cNvSpPr>
@@ -5514,7 +5519,7 @@
             <a:spLocks noGrp="1" noChangeArrowheads="1"/>
             <a:extLst>
               <a:ext uri="smNativeData">
-                <pr:smNativeData xmlns="" xmlns:p14="http://schemas.microsoft.com/office/powerpoint/2010/main" xmlns:pr="smNativeData" val="SMDATA_13_w78LXxMAAAAlAAAAZAAAAA0AAAAAkAAAAJAAAACQAAAAkAAAAAAAAAAAAAAAAAAAAAEAAABQAAAAAAAAAAAA4D8AAAAAAADgPwAAAAAAAOA/AAAAAAAA4D8AAAAAAADgPwAAAAAAAOA/AAAAAAAA4D8AAAAAAADgPwAAAAAAAOA/AAAAAAAA4D8CAAAAjAAAAAAAAAAAAAAAkMImDP///wgAAAAAAAAAAAAAAAAAAAAAAAAAAAAAAAAAAAAAZAAAAAEAAABAAAAAAAAAAAAAAAAAAAAAAAAAAAAAAAAAAAAAAAAAAAAAAAAAAAAAAAAAAAAAAAAAAAAAAAAAAAAAAAAAAAAAAAAAAAAAAAAAAAAAAAAAAAAAAAAAAAAAFAAAADwAAAAAAAAAAAAAAAAAAAkUAAAAAQAAABQAAAAUAAAAFAAAAAEAAAAAAAAAZAAAAGQAAAAAAAAAZAAAAGQAAAAVAAAAYAAAAAAAAAAAAAAADwAAACADAAAAAAAAAAAAAAEAAACgMgAAVgcAAKr4//8BAAAAf39/AAEAAABkAAAAAAAAABQAAABAHwAAAAAAACYAAAAAAAAAwOD//wAAAAAmAAAAZAAAABYAAABMAAAAAAAAAAAAAAAEAAAAAAAAAAEAAAAsPEMKAAAAACgAAAAoAAAAZAAAAGQAAAAAAAAAzMzMAAAAAABQAAAAUAAAAGQAAABkAAAAAAAAABcAAAAUAAAAAAAAAAAAAAD/fwAA/38AAAAAAAAJAAAABAAAAAAAAAAMAAAAEAAAAAAAAAAAAAAAAAAAAAAAAAAeAAAAaAAAAAAAAAAAAAAAAAAAAAAAAAAAAAAAECcAABAnAAAAAAAAAAAAAAAAAAAAAAAAAAAAAAAAAAAAAAAAAAAAABQAAAAAAAAAwMD/AAAAAABkAAAAMgAAAAAAAABkAAAAAAAAAH9/fwAKAAAAHwAAAFQAAAAAAAAFAAAAAQAAAAAAAAAAAAAAAAAAAAAAAAAAAAAAAAAAAAAAAAAAAAAAAn9/fwAAAAADzMzMAMDA/wB/f38AAAAAAAAAAAAAAAAAAAAAAAAAAAAhAAAAGAAAABQAAABFCQAA6xgAAA05AACrHwAAEAAAACYAAAAIAAAAPZAAAP8fAAA="/>
+                <pr:smNativeData xmlns:pr="smNativeData" xmlns:p14="http://schemas.microsoft.com/office/powerpoint/2010/main" xmlns="" val="SMDATA_13_w78LXxMAAAAlAAAAZAAAAA0AAAAAkAAAAJAAAACQAAAAkAAAAAAAAAAAAAAAAAAAAAEAAABQAAAAAAAAAAAA4D8AAAAAAADgPwAAAAAAAOA/AAAAAAAA4D8AAAAAAADgPwAAAAAAAOA/AAAAAAAA4D8AAAAAAADgPwAAAAAAAOA/AAAAAAAA4D8CAAAAjAAAAAAAAAAAAAAAkMImDP///wgAAAAAAAAAAAAAAAAAAAAAAAAAAAAAAAAAAAAAZAAAAAEAAABAAAAAAAAAAAAAAAAAAAAAAAAAAAAAAAAAAAAAAAAAAAAAAAAAAAAAAAAAAAAAAAAAAAAAAAAAAAAAAAAAAAAAAAAAAAAAAAAAAAAAAAAAAAAAAAAAAAAAFAAAADwAAAAAAAAAAAAAAAAAAAkUAAAAAQAAABQAAAAUAAAAFAAAAAEAAAAAAAAAZAAAAGQAAAAAAAAAZAAAAGQAAAAVAAAAYAAAAAAAAAAAAAAADwAAACADAAAAAAAAAAAAAAEAAACgMgAAVgcAAKr4//8BAAAAf39/AAEAAABkAAAAAAAAABQAAABAHwAAAAAAACYAAAAAAAAAwOD//wAAAAAmAAAAZAAAABYAAABMAAAAAAAAAAAAAAAEAAAAAAAAAAEAAAAsPEMKAAAAACgAAAAoAAAAZAAAAGQAAAAAAAAAzMzMAAAAAABQAAAAUAAAAGQAAABkAAAAAAAAABcAAAAUAAAAAAAAAAAAAAD/fwAA/38AAAAAAAAJAAAABAAAAAAAAAAMAAAAEAAAAAAAAAAAAAAAAAAAAAAAAAAeAAAAaAAAAAAAAAAAAAAAAAAAAAAAAAAAAAAAECcAABAnAAAAAAAAAAAAAAAAAAAAAAAAAAAAAAAAAAAAAAAAAAAAABQAAAAAAAAAwMD/AAAAAABkAAAAMgAAAAAAAABkAAAAAAAAAH9/fwAKAAAAHwAAAFQAAAAAAAAFAAAAAQAAAAAAAAAAAAAAAAAAAAAAAAAAAAAAAAAAAAAAAAAAAAAAAn9/fwAAAAADzMzMAMDA/wB/f38AAAAAAAAAAAAAAAAAAAAAAAAAAAAhAAAAGAAAABQAAABFCQAA6xgAAA05AACrHwAAEAAAACYAAAAIAAAAPZAAAP8fAAA="/>
               </a:ext>
             </a:extLst>
           </p:cNvSpPr>
@@ -5705,7 +5710,7 @@
             <a:spLocks noGrp="1" noChangeArrowheads="1"/>
             <a:extLst>
               <a:ext uri="smNativeData">
-                <pr:smNativeData xmlns="" xmlns:p14="http://schemas.microsoft.com/office/powerpoint/2010/main" xmlns:pr="smNativeData" val="SMDATA_13_w78LXxMAAAAlAAAAZAAAAA0AAAAAkAAAAJAAAACQAAAAkAAAAAAAAAABAAAAAAAAAAEAAABQAAAAAAAAAAAA4D8AAAAAAADgPwAAAAAAAOA/AAAAAAAA4D8AAAAAAADgPwAAAAAAAOA/AAAAAAAA4D8AAAAAAADgPwAAAAAAAOA/AAAAAAAA4D8CAAAAjAAAAAAAAAAAAAAAkMImDP///wgAAAAAAAAAAAAAAAAAAAAAAAAAAAAAAAAAAAAAZAAAAAEAAABAAAAAAAAAAAAAAAAAAAAAAAAAAAAAAAAAAAAAAAAAAAAAAAAAAAAAAAAAAAAAAAAAAAAAAAAAAAAAAAAAAAAAAAAAAAAAAAAAAAAAAAAAAAAAAAAAAAAAFAAAADwAAAAAAAAAAAAAAAAAAAkUAAAAAQAAABQAAAAUAAAAFAAAAAEAAAAAAAAAZAAAAGQAAAAAAAAAZAAAAGQAAAAVAAAAYAAAAAAAAAAAAAAADwAAACADAAAAAAAAAAAAAAEAAACgMgAAVgcAAKr4//8BAAAAf39/AAEAAABkAAAAAAAAABQAAABAHwAAAAAAACYAAAAAAAAAwOD//wAAAAAmAAAAZAAAABYAAABMAAAAAAAAAAAAAAAEAAAAAAAAAAEAAAAsPEMKAAAAACgAAAAoAAAAZAAAAGQAAAAAAAAAzMzMAAAAAABQAAAAUAAAAGQAAABkAAAAAAAAABcAAAAUAAAAAAAAAAAAAAD/fwAA/38AAAAAAAAJAAAABAAAAAAAAAAMAAAAEAAAAAAAAAAAAAAAAAAAAAAAAAAeAAAAaAAAAAAAAAAAAAAAAAAAAAAAAAAAAAAAECcAABAnAAAAAAAAAAAAAAAAAAAAAAAAAAAAAAAAAAAAAAAAAAAAABQAAAAAAAAAwMD/AAAAAABkAAAAMgAAAAAAAABkAAAAAAAAAH9/fwAKAAAAHwAAAFQAAAAAAAAFAAAAAQAAAAAAAAAAAAAAAAAAAAAAAAAAAAAAAAAAAAAAAAAAAAAAAn9/fwAAAAADzMzMAMDA/wB/f38AAAAAAAAAAAAAAAAAAAAAAAAAAAAhAAAAGAAAABQAAABTLAAAKiUAAO8xAABpJwAAEAAAACYAAAAIAAAAPJAAAP8fAAA="/>
+                <pr:smNativeData xmlns:pr="smNativeData" xmlns:p14="http://schemas.microsoft.com/office/powerpoint/2010/main" xmlns="" val="SMDATA_13_w78LXxMAAAAlAAAAZAAAAA0AAAAAkAAAAJAAAACQAAAAkAAAAAAAAAABAAAAAAAAAAEAAABQAAAAAAAAAAAA4D8AAAAAAADgPwAAAAAAAOA/AAAAAAAA4D8AAAAAAADgPwAAAAAAAOA/AAAAAAAA4D8AAAAAAADgPwAAAAAAAOA/AAAAAAAA4D8CAAAAjAAAAAAAAAAAAAAAkMImDP///wgAAAAAAAAAAAAAAAAAAAAAAAAAAAAAAAAAAAAAZAAAAAEAAABAAAAAAAAAAAAAAAAAAAAAAAAAAAAAAAAAAAAAAAAAAAAAAAAAAAAAAAAAAAAAAAAAAAAAAAAAAAAAAAAAAAAAAAAAAAAAAAAAAAAAAAAAAAAAAAAAAAAAFAAAADwAAAAAAAAAAAAAAAAAAAkUAAAAAQAAABQAAAAUAAAAFAAAAAEAAAAAAAAAZAAAAGQAAAAAAAAAZAAAAGQAAAAVAAAAYAAAAAAAAAAAAAAADwAAACADAAAAAAAAAAAAAAEAAACgMgAAVgcAAKr4//8BAAAAf39/AAEAAABkAAAAAAAAABQAAABAHwAAAAAAACYAAAAAAAAAwOD//wAAAAAmAAAAZAAAABYAAABMAAAAAAAAAAAAAAAEAAAAAAAAAAEAAAAsPEMKAAAAACgAAAAoAAAAZAAAAGQAAAAAAAAAzMzMAAAAAABQAAAAUAAAAGQAAABkAAAAAAAAABcAAAAUAAAAAAAAAAAAAAD/fwAA/38AAAAAAAAJAAAABAAAAAAAAAAMAAAAEAAAAAAAAAAAAAAAAAAAAAAAAAAeAAAAaAAAAAAAAAAAAAAAAAAAAAAAAAAAAAAAECcAABAnAAAAAAAAAAAAAAAAAAAAAAAAAAAAAAAAAAAAAAAAAAAAABQAAAAAAAAAwMD/AAAAAABkAAAAMgAAAAAAAABkAAAAAAAAAH9/fwAKAAAAHwAAAFQAAAAAAAAFAAAAAQAAAAAAAAAAAAAAAAAAAAAAAAAAAAAAAAAAAAAAAAAAAAAAAn9/fwAAAAADzMzMAMDA/wB/f38AAAAAAAAAAAAAAAAAAAAAAAAAAAAhAAAAGAAAABQAAABTLAAAKiUAAO8xAABpJwAAEAAAACYAAAAIAAAAPJAAAP8fAAA="/>
               </a:ext>
             </a:extLst>
           </p:cNvSpPr>
@@ -5892,7 +5897,7 @@
             <a:spLocks noGrp="1" noChangeArrowheads="1"/>
             <a:extLst>
               <a:ext uri="smNativeData">
-                <pr:smNativeData xmlns="" xmlns:p14="http://schemas.microsoft.com/office/powerpoint/2010/main" xmlns:pr="smNativeData" val="SMDATA_13_w78LXxMAAAAlAAAAZAAAAA0AAAAAkAAAAJAAAACQAAAAkAAAAAAAAAABAAAAAAAAAAEAAABQAAAAAAAAAAAA4D8AAAAAAADgPwAAAAAAAOA/AAAAAAAA4D8AAAAAAADgPwAAAAAAAOA/AAAAAAAA4D8AAAAAAADgPwAAAAAAAOA/AAAAAAAA4D8CAAAAjAAAAAAAAAAAAAAAkMImDP///wgAAAAAAAAAAAAAAAAAAAAAAAAAAAAAAAAAAAAAZAAAAAEAAABAAAAAAAAAAAAAAAAAAAAAAAAAAAAAAAAAAAAAAAAAAAAAAAAAAAAAAAAAAAAAAAAAAAAAAAAAAAAAAAAAAAAAAAAAAAAAAAAAAAAAAAAAAAAAAAAAAAAAFAAAADwAAAAAAAAAAAAAAAAAAAkUAAAAAQAAABQAAAAUAAAAFAAAAAEAAAAAAAAAZAAAAGQAAAAAAAAAZAAAAGQAAAAVAAAAYAAAAAAAAAAAAAAADwAAACADAAAAAAAAAAAAAAEAAACgMgAAVgcAAKr4//8BAAAAf39/AAEAAABkAAAAAAAAABQAAABAHwAAAAAAACYAAAAAAAAAwOD//wAAAAAmAAAAZAAAABYAAABMAAAAAAAAAAAAAAAEAAAAAAAAAAEAAAAsPEMKAAAAACgAAAAoAAAAZAAAAGQAAAAAAAAAzMzMAAAAAABQAAAAUAAAAGQAAABkAAAAAAAAABcAAAAUAAAAAAAAAAAAAAD/fwAA/38AAAAAAAAJAAAABAAAAAAAAAAMAAAAEAAAAAAAAAAAAAAAAAAAAAAAAAAeAAAAaAAAAAAAAAAAAAAAAAAAAAAAAAAAAAAAECcAABAnAAAAAAAAAAAAAAAAAAAAAAAAAAAAAAAAAAAAAAAAAAAAABQAAAAAAAAAwMD/AAAAAABkAAAAMgAAAAAAAABkAAAAAAAAAH9/fwAKAAAAHwAAAFQAAAAAAAAFAAAAAQAAAAAAAAAAAAAAAAAAAAAAAAAAAAAAAAAAAAAAAAAAAAAAAn9/fwAAAAADzMzMAMDA/wB/f38AAAAAAAAAAAAAAAAAAAAAAAAAAAAhAAAAGAAAABQAAAArBAAAKiUAAOgqAABpJwAAEAAAACYAAAAIAAAAPJAAAP8fAAA="/>
+                <pr:smNativeData xmlns:pr="smNativeData" xmlns:p14="http://schemas.microsoft.com/office/powerpoint/2010/main" xmlns="" val="SMDATA_13_w78LXxMAAAAlAAAAZAAAAA0AAAAAkAAAAJAAAACQAAAAkAAAAAAAAAABAAAAAAAAAAEAAABQAAAAAAAAAAAA4D8AAAAAAADgPwAAAAAAAOA/AAAAAAAA4D8AAAAAAADgPwAAAAAAAOA/AAAAAAAA4D8AAAAAAADgPwAAAAAAAOA/AAAAAAAA4D8CAAAAjAAAAAAAAAAAAAAAkMImDP///wgAAAAAAAAAAAAAAAAAAAAAAAAAAAAAAAAAAAAAZAAAAAEAAABAAAAAAAAAAAAAAAAAAAAAAAAAAAAAAAAAAAAAAAAAAAAAAAAAAAAAAAAAAAAAAAAAAAAAAAAAAAAAAAAAAAAAAAAAAAAAAAAAAAAAAAAAAAAAAAAAAAAAFAAAADwAAAAAAAAAAAAAAAAAAAkUAAAAAQAAABQAAAAUAAAAFAAAAAEAAAAAAAAAZAAAAGQAAAAAAAAAZAAAAGQAAAAVAAAAYAAAAAAAAAAAAAAADwAAACADAAAAAAAAAAAAAAEAAACgMgAAVgcAAKr4//8BAAAAf39/AAEAAABkAAAAAAAAABQAAABAHwAAAAAAACYAAAAAAAAAwOD//wAAAAAmAAAAZAAAABYAAABMAAAAAAAAAAAAAAAEAAAAAAAAAAEAAAAsPEMKAAAAACgAAAAoAAAAZAAAAGQAAAAAAAAAzMzMAAAAAABQAAAAUAAAAGQAAABkAAAAAAAAABcAAAAUAAAAAAAAAAAAAAD/fwAA/38AAAAAAAAJAAAABAAAAAAAAAAMAAAAEAAAAAAAAAAAAAAAAAAAAAAAAAAeAAAAaAAAAAAAAAAAAAAAAAAAAAAAAAAAAAAAECcAABAnAAAAAAAAAAAAAAAAAAAAAAAAAAAAAAAAAAAAAAAAAAAAABQAAAAAAAAAwMD/AAAAAABkAAAAMgAAAAAAAABkAAAAAAAAAH9/fwAKAAAAHwAAAFQAAAAAAAAFAAAAAQAAAAAAAAAAAAAAAAAAAAAAAAAAAAAAAAAAAAAAAAAAAAAAAn9/fwAAAAADzMzMAMDA/wB/f38AAAAAAAAAAAAAAAAAAAAAAAAAAAAhAAAAGAAAABQAAAArBAAAKiUAAOgqAABpJwAAEAAAACYAAAAIAAAAPJAAAP8fAAA="/>
               </a:ext>
             </a:extLst>
           </p:cNvSpPr>
@@ -6079,7 +6084,7 @@
             <a:spLocks noGrp="1" noChangeArrowheads="1"/>
             <a:extLst>
               <a:ext uri="smNativeData">
-                <pr:smNativeData xmlns="" xmlns:p14="http://schemas.microsoft.com/office/powerpoint/2010/main" xmlns:pr="smNativeData" val="SMDATA_13_w78LXxMAAAAlAAAAZAAAAA0AAAAAkAAAAEgAAACQAAAASAAAAAAAAAABAAAAAAAAAAEAAABQAAAAAAAAAAAA4D8AAAAAAADgPwAAAAAAAOA/AAAAAAAA4D8AAAAAAADgPwAAAAAAAOA/AAAAAAAA4D8AAAAAAADgPwAAAAAAAOA/AAAAAAAA4D8CAAAAjAAAAAAAAAAAAAAAkMImDP///wgAAAAAAAAAAAAAAAAAAAAAAAAAAAAAAAAAAAAAZAAAAAEAAABAAAAAAAAAAAAAAAAAAAAAAAAAAAAAAAAAAAAAAAAAAAAAAAAAAAAAAAAAAAAAAAAAAAAAAAAAAAAAAAAAAAAAAAAAAAAAAAAAAAAAAAAAAAAAAAAAAAAAFAAAADwAAAAAAAAAAAAAAAAAAAkUAAAAAQAAABQAAAAUAAAAFAAAAAEAAAAAAAAAZAAAAGQAAAAAAAAAZAAAAGQAAAAVAAAAYAAAAAAAAAAAAAAADwAAACADAAAAAAAAAAAAAAEAAACgMgAAVgcAAKr4//8BAAAAf39/AAEAAABkAAAAAAAAABQAAABAHwAAAAAAACYAAAAAAAAAwOD//wAAAAAmAAAAZAAAABYAAABMAAAAAAAAAAAAAAAEAAAAAAAAAAEAAAAsPEMKAAAAACgAAAAoAAAAZAAAAGQAAAAAAAAAzMzMAAAAAABQAAAAUAAAAGQAAABkAAAAAAAAABcAAAAUAAAAAAAAAAAAAAD/fwAA/38AAAAAAAAJAAAABAAAAAAAAAAMAAAAEAAAAAAAAAAAAAAAAAAAAAAAAAAeAAAAaAAAAAAAAAAAAAAAAAAAAAAAAAAAAAAAECcAABAnAAAAAAAAAAAAAAAAAAAAAAAAAAAAAAAAAAAAAAAAAAAAABQAAAAAAAAAwMD/AAAAAABkAAAAMgAAAAAAAABkAAAAAAAAAH9/fwAKAAAAHwAAAFQAAAAAAAAFAAAAAQAAAAAAAAAAAAAAAAAAAAAAAAAAAAAAAAAAAAAAAAAAAAAAAn9/fwAAAAADzMzMAMDA/wB/f38AAAAAAAAAAAAAAAAAAAAAAAAAAAAhAAAAGAAAABQAAADZNAAAKiUAAA05AABpJwAAEAAAACYAAAAIAAAAPLAAAP8fAAA="/>
+                <pr:smNativeData xmlns:pr="smNativeData" xmlns:p14="http://schemas.microsoft.com/office/powerpoint/2010/main" xmlns="" val="SMDATA_13_w78LXxMAAAAlAAAAZAAAAA0AAAAAkAAAAEgAAACQAAAASAAAAAAAAAABAAAAAAAAAAEAAABQAAAAAAAAAAAA4D8AAAAAAADgPwAAAAAAAOA/AAAAAAAA4D8AAAAAAADgPwAAAAAAAOA/AAAAAAAA4D8AAAAAAADgPwAAAAAAAOA/AAAAAAAA4D8CAAAAjAAAAAAAAAAAAAAAkMImDP///wgAAAAAAAAAAAAAAAAAAAAAAAAAAAAAAAAAAAAAZAAAAAEAAABAAAAAAAAAAAAAAAAAAAAAAAAAAAAAAAAAAAAAAAAAAAAAAAAAAAAAAAAAAAAAAAAAAAAAAAAAAAAAAAAAAAAAAAAAAAAAAAAAAAAAAAAAAAAAAAAAAAAAFAAAADwAAAAAAAAAAAAAAAAAAAkUAAAAAQAAABQAAAAUAAAAFAAAAAEAAAAAAAAAZAAAAGQAAAAAAAAAZAAAAGQAAAAVAAAAYAAAAAAAAAAAAAAADwAAACADAAAAAAAAAAAAAAEAAACgMgAAVgcAAKr4//8BAAAAf39/AAEAAABkAAAAAAAAABQAAABAHwAAAAAAACYAAAAAAAAAwOD//wAAAAAmAAAAZAAAABYAAABMAAAAAAAAAAAAAAAEAAAAAAAAAAEAAAAsPEMKAAAAACgAAAAoAAAAZAAAAGQAAAAAAAAAzMzMAAAAAABQAAAAUAAAAGQAAABkAAAAAAAAABcAAAAUAAAAAAAAAAAAAAD/fwAA/38AAAAAAAAJAAAABAAAAAAAAAAMAAAAEAAAAAAAAAAAAAAAAAAAAAAAAAAeAAAAaAAAAAAAAAAAAAAAAAAAAAAAAAAAAAAAECcAABAnAAAAAAAAAAAAAAAAAAAAAAAAAAAAAAAAAAAAAAAAAAAAABQAAAAAAAAAwMD/AAAAAABkAAAAMgAAAAAAAABkAAAAAAAAAH9/fwAKAAAAHwAAAFQAAAAAAAAFAAAAAQAAAAAAAAAAAAAAAAAAAAAAAAAAAAAAAAAAAAAAAAAAAAAAAn9/fwAAAAADzMzMAMDA/wB/f38AAAAAAAAAAAAAAAAAAAAAAAAAAAAhAAAAGAAAABQAAADZNAAAKiUAAA05AABpJwAAEAAAACYAAAAIAAAAPLAAAP8fAAA="/>
               </a:ext>
             </a:extLst>
           </p:cNvSpPr>
@@ -6271,7 +6276,7 @@
             <a:spLocks noGrp="1" noChangeArrowheads="1"/>
             <a:extLst>
               <a:ext uri="smNativeData">
-                <pr:smNativeData xmlns="" xmlns:p14="http://schemas.microsoft.com/office/powerpoint/2010/main" xmlns:pr="smNativeData" val="SMDATA_13_w78LXxMAAAAlAAAAZAAAAA0AAAAAkAAAAJAAAACQAAAAkAAAAAAAAAABAAAAAAAAAAEAAABQAAAAAAAAAAAA4D8AAAAAAADgPwAAAAAAAOA/AAAAAAAA4D8AAAAAAADgPwAAAAAAAOA/AAAAAAAA4D8AAAAAAADgPwAAAAAAAOA/AAAAAAAA4D8CAAAAjAAAAAAAAAAAAAAAkMImDP///wgAAAAAAAAAAAAAAAAAAAAAAAAAAAAAAAAAAAAAZAAAAAEAAABAAAAAAAAAAAAAAAAAAAAAAAAAAAAAAAAAAAAAAAAAAAAAAAAAAAAAAAAAAAAAAAAAAAAAAAAAAAAAAAAAAAAAAAAAAAAAAAAAAAAAAAAAAAAAAAAAAAAAFAAAADwAAAAAAAAAAAAAAAAAAAkUAAAAAQAAABQAAAAUAAAAFAAAAAEAAAAAAAAAZAAAAGQAAAAAAAAAZAAAAGQAAAAVAAAAYAAAAAAAAAAAAAAADwAAACADAAAAAAAAAAAAAAEAAACgMgAAVgcAAKr4//8BAAAAf39/AAEAAABkAAAAAAAAABQAAABAHwAAAAAAACYAAAAAAAAAwOD//wAAAAAmAAAAZAAAABYAAABMAAAAAAAAAAAAAAAEAAAAAAAAAAEAAAAsPEMKAAAAACgAAAAoAAAAZAAAAGQAAAAAAAAAzMzMAAAAAABQAAAAUAAAAGQAAABkAAAAAAAAABcAAAAUAAAAAAAAAAAAAAD/fwAA/38AAAAAAAAJAAAABAAAAAAAAAAMAAAAEAAAAAAAAAAAAAAAAAAAAAAAAAAeAAAAaAAAAAAAAAAAAAAAAAAAAAAAAAAAAAAAECcAABAnAAAAAAAAAAAAAAAAAAAAAAAAAAAAAAAAAAAAAAAAAAAAABQAAAAAAAAAwMD/AAAAAABkAAAAMgAAAAAAAABkAAAAAAAAAH9/fwAKAAAAHwAAAFQAAAAAAAAFAAAAAQAAAAAAAAAAAAAAAAAAAAAAAAAAAAAAAAAAAAAAAAAAAAAAAn9/fwAAAAADzMzMAMDA/wB/f38AAAAAAAAAAAAAAAAAAAAAAAAAAAAhAAAAGAAAABQAAAArBAAAwAMAAA05AACwGAAAEAAAACYAAAAIAAAAvZAAAP8fAAA="/>
+                <pr:smNativeData xmlns:pr="smNativeData" xmlns:p14="http://schemas.microsoft.com/office/powerpoint/2010/main" xmlns="" val="SMDATA_13_w78LXxMAAAAlAAAAZAAAAA0AAAAAkAAAAJAAAACQAAAAkAAAAAAAAAABAAAAAAAAAAEAAABQAAAAAAAAAAAA4D8AAAAAAADgPwAAAAAAAOA/AAAAAAAA4D8AAAAAAADgPwAAAAAAAOA/AAAAAAAA4D8AAAAAAADgPwAAAAAAAOA/AAAAAAAA4D8CAAAAjAAAAAAAAAAAAAAAkMImDP///wgAAAAAAAAAAAAAAAAAAAAAAAAAAAAAAAAAAAAAZAAAAAEAAABAAAAAAAAAAAAAAAAAAAAAAAAAAAAAAAAAAAAAAAAAAAAAAAAAAAAAAAAAAAAAAAAAAAAAAAAAAAAAAAAAAAAAAAAAAAAAAAAAAAAAAAAAAAAAAAAAAAAAFAAAADwAAAAAAAAAAAAAAAAAAAkUAAAAAQAAABQAAAAUAAAAFAAAAAEAAAAAAAAAZAAAAGQAAAAAAAAAZAAAAGQAAAAVAAAAYAAAAAAAAAAAAAAADwAAACADAAAAAAAAAAAAAAEAAACgMgAAVgcAAKr4//8BAAAAf39/AAEAAABkAAAAAAAAABQAAABAHwAAAAAAACYAAAAAAAAAwOD//wAAAAAmAAAAZAAAABYAAABMAAAAAAAAAAAAAAAEAAAAAAAAAAEAAAAsPEMKAAAAACgAAAAoAAAAZAAAAGQAAAAAAAAAzMzMAAAAAABQAAAAUAAAAGQAAABkAAAAAAAAABcAAAAUAAAAAAAAAAAAAAD/fwAA/38AAAAAAAAJAAAABAAAAAAAAAAMAAAAEAAAAAAAAAAAAAAAAAAAAAAAAAAeAAAAaAAAAAAAAAAAAAAAAAAAAAAAAAAAAAAAECcAABAnAAAAAAAAAAAAAAAAAAAAAAAAAAAAAAAAAAAAAAAAAAAAABQAAAAAAAAAwMD/AAAAAABkAAAAMgAAAAAAAABkAAAAAAAAAH9/fwAKAAAAHwAAAFQAAAAAAAAFAAAAAQAAAAAAAAAAAAAAAAAAAAAAAAAAAAAAAAAAAAAAAAAAAAAAAn9/fwAAAAADzMzMAMDA/wB/f38AAAAAAAAAAAAAAAAAAAAAAAAAAAAhAAAAGAAAABQAAAArBAAAwAMAAA05AACwGAAAEAAAACYAAAAIAAAAvZAAAP8fAAA="/>
               </a:ext>
             </a:extLst>
           </p:cNvSpPr>
@@ -6438,7 +6443,7 @@
             <a:spLocks noGrp="1" noChangeArrowheads="1"/>
             <a:extLst>
               <a:ext uri="smNativeData">
-                <pr:smNativeData xmlns="" xmlns:p14="http://schemas.microsoft.com/office/powerpoint/2010/main" xmlns:pr="smNativeData" val="SMDATA_13_w78LXxMAAAAlAAAAZAAAAA0AAAAAkAAAAJAAAACQAAAAkAAAAAAAAAABAAAAAAAAAAEAAABQAAAAAAAAAAAA4D8AAAAAAADgPwAAAAAAAOA/AAAAAAAA4D8AAAAAAADgPwAAAAAAAOA/AAAAAAAA4D8AAAAAAADgPwAAAAAAAOA/AAAAAAAA4D8CAAAAjAAAAAAAAAAAAAAAkMImDP///wgAAAAAAAAAAAAAAAAAAAAAAAAAAAAAAAAAAAAAZAAAAAEAAABAAAAAAAAAAAAAAAAAAAAAAAAAAAAAAAAAAAAAAAAAAAAAAAAAAAAAAAAAAAAAAAAAAAAAAAAAAAAAAAAAAAAAAAAAAAAAAAAAAAAAAAAAAAAAAAAAAAAAFAAAADwAAAAAAAAAAAAAAAAAAAkUAAAAAQAAABQAAAAUAAAAFAAAAAEAAAAAAAAAZAAAAGQAAAAAAAAAZAAAAGQAAAAVAAAAYAAAAAAAAAAAAAAADwAAACADAAAAAAAAAAAAAAEAAACgMgAAVgcAAKr4//8BAAAAf39/AAEAAABkAAAAAAAAABQAAABAHwAAAAAAACYAAAAAAAAAwOD//wAAAAAmAAAAZAAAABYAAABMAAAAAAAAAAAAAAAEAAAAAAAAAAEAAAAsPEMKAAAAACgAAAAoAAAAZAAAAGQAAAAAAAAAzMzMAAAAAABQAAAAUAAAAGQAAABkAAAAAAAAABcAAAAUAAAAAAAAAAAAAAD/fwAA/38AAAAAAAAJAAAABAAAAAAAAAAMAAAAEAAAAAAAAAAAAAAAAAAAAAAAAAAeAAAAaAAAAAAAAAAAAAAAAAAAAAAAAAAAAAAAECcAABAnAAAAAAAAAAAAAAAAAAAAAAAAAAAAAAAAAAAAAAAAAAAAABQAAAAAAAAAwMD/AAAAAABkAAAAMgAAAAAAAABkAAAAAAAAAH9/fwAKAAAAHwAAAFQAAAAAAAAFAAAAAQAAAAAAAAAAAAAAAAAAAAAAAAAAAAAAAAAAAAAAAAAAAAAAAn9/fwAAAAADzMzMAMDA/wB/f38AAAAAAAAAAAAAAAAAAAAAAAAAAAAhAAAAGAAAABQAAAArBAAAgBsAAA05AAAqJQAAEAAAACYAAAAIAAAAvZAAAP8fAAA="/>
+                <pr:smNativeData xmlns:pr="smNativeData" xmlns:p14="http://schemas.microsoft.com/office/powerpoint/2010/main" xmlns="" val="SMDATA_13_w78LXxMAAAAlAAAAZAAAAA0AAAAAkAAAAJAAAACQAAAAkAAAAAAAAAABAAAAAAAAAAEAAABQAAAAAAAAAAAA4D8AAAAAAADgPwAAAAAAAOA/AAAAAAAA4D8AAAAAAADgPwAAAAAAAOA/AAAAAAAA4D8AAAAAAADgPwAAAAAAAOA/AAAAAAAA4D8CAAAAjAAAAAAAAAAAAAAAkMImDP///wgAAAAAAAAAAAAAAAAAAAAAAAAAAAAAAAAAAAAAZAAAAAEAAABAAAAAAAAAAAAAAAAAAAAAAAAAAAAAAAAAAAAAAAAAAAAAAAAAAAAAAAAAAAAAAAAAAAAAAAAAAAAAAAAAAAAAAAAAAAAAAAAAAAAAAAAAAAAAAAAAAAAAFAAAADwAAAAAAAAAAAAAAAAAAAkUAAAAAQAAABQAAAAUAAAAFAAAAAEAAAAAAAAAZAAAAGQAAAAAAAAAZAAAAGQAAAAVAAAAYAAAAAAAAAAAAAAADwAAACADAAAAAAAAAAAAAAEAAACgMgAAVgcAAKr4//8BAAAAf39/AAEAAABkAAAAAAAAABQAAABAHwAAAAAAACYAAAAAAAAAwOD//wAAAAAmAAAAZAAAABYAAABMAAAAAAAAAAAAAAAEAAAAAAAAAAEAAAAsPEMKAAAAACgAAAAoAAAAZAAAAGQAAAAAAAAAzMzMAAAAAABQAAAAUAAAAGQAAABkAAAAAAAAABcAAAAUAAAAAAAAAAAAAAD/fwAA/38AAAAAAAAJAAAABAAAAAAAAAAMAAAAEAAAAAAAAAAAAAAAAAAAAAAAAAAeAAAAaAAAAAAAAAAAAAAAAAAAAAAAAAAAAAAAECcAABAnAAAAAAAAAAAAAAAAAAAAAAAAAAAAAAAAAAAAAAAAAAAAABQAAAAAAAAAwMD/AAAAAABkAAAAMgAAAAAAAABkAAAAAAAAAH9/fwAKAAAAHwAAAFQAAAAAAAAFAAAAAQAAAAAAAAAAAAAAAAAAAAAAAAAAAAAAAAAAAAAAAAAAAAAAAn9/fwAAAAADzMzMAMDA/wB/f38AAAAAAAAAAAAAAAAAAAAAAAAAAAAhAAAAGAAAABQAAAArBAAAgBsAAA05AAAqJQAAEAAAACYAAAAIAAAAvZAAAP8fAAA="/>
               </a:ext>
             </a:extLst>
           </p:cNvSpPr>
@@ -6629,7 +6634,7 @@
             <a:spLocks noGrp="1" noChangeArrowheads="1"/>
             <a:extLst>
               <a:ext uri="smNativeData">
-                <pr:smNativeData xmlns="" xmlns:p14="http://schemas.microsoft.com/office/powerpoint/2010/main" xmlns:pr="smNativeData" val="SMDATA_13_w78LXxMAAAAlAAAAZAAAAA0AAAAAkAAAAJAAAACQAAAAkAAAAAAAAAABAAAAAAAAAAEAAABQAAAAAAAAAAAA4D8AAAAAAADgPwAAAAAAAOA/AAAAAAAA4D8AAAAAAADgPwAAAAAAAOA/AAAAAAAA4D8AAAAAAADgPwAAAAAAAOA/AAAAAAAA4D8CAAAAjAAAAAAAAAAAAAAAkMImDP///wgAAAAAAAAAAAAAAAAAAAAAAAAAAAAAAAAAAAAAZAAAAAEAAABAAAAAAAAAAAAAAAAAAAAAAAAAAAAAAAAAAAAAAAAAAAAAAAAAAAAAAAAAAAAAAAAAAAAAAAAAAAAAAAAAAAAAAAAAAAAAAAAAAAAAAAAAAAAAAAAAAAAAFAAAADwAAAAAAAAAAAAAAAAAAAkUAAAAAQAAABQAAAAUAAAAFAAAAAEAAAAAAAAAZAAAAGQAAAAAAAAAZAAAAGQAAAAVAAAAYAAAAAAAAAAAAAAADwAAACADAAAAAAAAAAAAAAEAAACgMgAAVgcAAKr4//8BAAAAf39/AAEAAABkAAAAAAAAABQAAABAHwAAAAAAACYAAAAAAAAAwOD//wAAAAAmAAAAZAAAABYAAABMAAAAAAAAAAAAAAAEAAAAAAAAAAEAAAAsPEMKAAAAACgAAAAoAAAAZAAAAGQAAAAAAAAAzMzMAAAAAABQAAAAUAAAAGQAAABkAAAAAAAAABcAAAAUAAAAAAAAAAAAAAD/fwAA/38AAAAAAAAJAAAABAAAAAAAAAAMAAAAEAAAAAAAAAAAAAAAAAAAAAAAAAAeAAAAaAAAAAAAAAAAAAAAAAAAAAAAAAAAAAAAECcAABAnAAAAAAAAAAAAAAAAAAAAAAAAAAAAAAAAAAAAAAAAAAAAABQAAAAAAAAAwMD/AAAAAABkAAAAMgAAAAAAAABkAAAAAAAAAH9/fwAKAAAAHwAAAFQAAAAAAAAFAAAAAQAAAAAAAAAAAAAAAAAAAAAAAAAAAAAAAAAAAAAAAAAAAAAAAn9/fwAAAAADzMzMAMDA/wB/f38AAAAAAAAAAAAAAAAAAAAAAAAAAAAhAAAAGAAAABQAAABTLAAAKiUAAO8xAABpJwAAEAAAACYAAAAIAAAAPJAAAP8fAAA="/>
+                <pr:smNativeData xmlns:pr="smNativeData" xmlns:p14="http://schemas.microsoft.com/office/powerpoint/2010/main" xmlns="" val="SMDATA_13_w78LXxMAAAAlAAAAZAAAAA0AAAAAkAAAAJAAAACQAAAAkAAAAAAAAAABAAAAAAAAAAEAAABQAAAAAAAAAAAA4D8AAAAAAADgPwAAAAAAAOA/AAAAAAAA4D8AAAAAAADgPwAAAAAAAOA/AAAAAAAA4D8AAAAAAADgPwAAAAAAAOA/AAAAAAAA4D8CAAAAjAAAAAAAAAAAAAAAkMImDP///wgAAAAAAAAAAAAAAAAAAAAAAAAAAAAAAAAAAAAAZAAAAAEAAABAAAAAAAAAAAAAAAAAAAAAAAAAAAAAAAAAAAAAAAAAAAAAAAAAAAAAAAAAAAAAAAAAAAAAAAAAAAAAAAAAAAAAAAAAAAAAAAAAAAAAAAAAAAAAAAAAAAAAFAAAADwAAAAAAAAAAAAAAAAAAAkUAAAAAQAAABQAAAAUAAAAFAAAAAEAAAAAAAAAZAAAAGQAAAAAAAAAZAAAAGQAAAAVAAAAYAAAAAAAAAAAAAAADwAAACADAAAAAAAAAAAAAAEAAACgMgAAVgcAAKr4//8BAAAAf39/AAEAAABkAAAAAAAAABQAAABAHwAAAAAAACYAAAAAAAAAwOD//wAAAAAmAAAAZAAAABYAAABMAAAAAAAAAAAAAAAEAAAAAAAAAAEAAAAsPEMKAAAAACgAAAAoAAAAZAAAAGQAAAAAAAAAzMzMAAAAAABQAAAAUAAAAGQAAABkAAAAAAAAABcAAAAUAAAAAAAAAAAAAAD/fwAA/38AAAAAAAAJAAAABAAAAAAAAAAMAAAAEAAAAAAAAAAAAAAAAAAAAAAAAAAeAAAAaAAAAAAAAAAAAAAAAAAAAAAAAAAAAAAAECcAABAnAAAAAAAAAAAAAAAAAAAAAAAAAAAAAAAAAAAAAAAAAAAAABQAAAAAAAAAwMD/AAAAAABkAAAAMgAAAAAAAABkAAAAAAAAAH9/fwAKAAAAHwAAAFQAAAAAAAAFAAAAAQAAAAAAAAAAAAAAAAAAAAAAAAAAAAAAAAAAAAAAAAAAAAAAAn9/fwAAAAADzMzMAMDA/wB/f38AAAAAAAAAAAAAAAAAAAAAAAAAAAAhAAAAGAAAABQAAABTLAAAKiUAAO8xAABpJwAAEAAAACYAAAAIAAAAPJAAAP8fAAA="/>
               </a:ext>
             </a:extLst>
           </p:cNvSpPr>
@@ -6816,7 +6821,7 @@
             <a:spLocks noGrp="1" noChangeArrowheads="1"/>
             <a:extLst>
               <a:ext uri="smNativeData">
-                <pr:smNativeData xmlns="" xmlns:p14="http://schemas.microsoft.com/office/powerpoint/2010/main" xmlns:pr="smNativeData" val="SMDATA_13_w78LXxMAAAAlAAAAZAAAAA0AAAAAkAAAAJAAAACQAAAAkAAAAAAAAAABAAAAAAAAAAEAAABQAAAAAAAAAAAA4D8AAAAAAADgPwAAAAAAAOA/AAAAAAAA4D8AAAAAAADgPwAAAAAAAOA/AAAAAAAA4D8AAAAAAADgPwAAAAAAAOA/AAAAAAAA4D8CAAAAjAAAAAAAAAAAAAAAkMImDP///wgAAAAAAAAAAAAAAAAAAAAAAAAAAAAAAAAAAAAAZAAAAAEAAABAAAAAAAAAAAAAAAAAAAAAAAAAAAAAAAAAAAAAAAAAAAAAAAAAAAAAAAAAAAAAAAAAAAAAAAAAAAAAAAAAAAAAAAAAAAAAAAAAAAAAAAAAAAAAAAAAAAAAFAAAADwAAAAAAAAAAAAAAAAAAAkUAAAAAQAAABQAAAAUAAAAFAAAAAEAAAAAAAAAZAAAAGQAAAAAAAAAZAAAAGQAAAAVAAAAYAAAAAAAAAAAAAAADwAAACADAAAAAAAAAAAAAAEAAACgMgAAVgcAAKr4//8BAAAAf39/AAEAAABkAAAAAAAAABQAAABAHwAAAAAAACYAAAAAAAAAwOD//wAAAAAmAAAAZAAAABYAAABMAAAAAAAAAAAAAAAEAAAAAAAAAAEAAAAsPEMKAAAAACgAAAAoAAAAZAAAAGQAAAAAAAAAzMzMAAAAAABQAAAAUAAAAGQAAABkAAAAAAAAABcAAAAUAAAAAAAAAAAAAAD/fwAA/38AAAAAAAAJAAAABAAAAAAAAAAMAAAAEAAAAAAAAAAAAAAAAAAAAAAAAAAeAAAAaAAAAAAAAAAAAAAAAAAAAAAAAAAAAAAAECcAABAnAAAAAAAAAAAAAAAAAAAAAAAAAAAAAAAAAAAAAAAAAAAAABQAAAAAAAAAwMD/AAAAAABkAAAAMgAAAAAAAABkAAAAAAAAAH9/fwAKAAAAHwAAAFQAAAAAAAAFAAAAAQAAAAAAAAAAAAAAAAAAAAAAAAAAAAAAAAAAAAAAAAAAAAAAAn9/fwAAAAADzMzMAMDA/wB/f38AAAAAAAAAAAAAAAAAAAAAAAAAAAAhAAAAGAAAABQAAAArBAAAKiUAAOgqAABpJwAAEAAAACYAAAAIAAAAPJAAAP8fAAA="/>
+                <pr:smNativeData xmlns:pr="smNativeData" xmlns:p14="http://schemas.microsoft.com/office/powerpoint/2010/main" xmlns="" val="SMDATA_13_w78LXxMAAAAlAAAAZAAAAA0AAAAAkAAAAJAAAACQAAAAkAAAAAAAAAABAAAAAAAAAAEAAABQAAAAAAAAAAAA4D8AAAAAAADgPwAAAAAAAOA/AAAAAAAA4D8AAAAAAADgPwAAAAAAAOA/AAAAAAAA4D8AAAAAAADgPwAAAAAAAOA/AAAAAAAA4D8CAAAAjAAAAAAAAAAAAAAAkMImDP///wgAAAAAAAAAAAAAAAAAAAAAAAAAAAAAAAAAAAAAZAAAAAEAAABAAAAAAAAAAAAAAAAAAAAAAAAAAAAAAAAAAAAAAAAAAAAAAAAAAAAAAAAAAAAAAAAAAAAAAAAAAAAAAAAAAAAAAAAAAAAAAAAAAAAAAAAAAAAAAAAAAAAAFAAAADwAAAAAAAAAAAAAAAAAAAkUAAAAAQAAABQAAAAUAAAAFAAAAAEAAAAAAAAAZAAAAGQAAAAAAAAAZAAAAGQAAAAVAAAAYAAAAAAAAAAAAAAADwAAACADAAAAAAAAAAAAAAEAAACgMgAAVgcAAKr4//8BAAAAf39/AAEAAABkAAAAAAAAABQAAABAHwAAAAAAACYAAAAAAAAAwOD//wAAAAAmAAAAZAAAABYAAABMAAAAAAAAAAAAAAAEAAAAAAAAAAEAAAAsPEMKAAAAACgAAAAoAAAAZAAAAGQAAAAAAAAAzMzMAAAAAABQAAAAUAAAAGQAAABkAAAAAAAAABcAAAAUAAAAAAAAAAAAAAD/fwAA/38AAAAAAAAJAAAABAAAAAAAAAAMAAAAEAAAAAAAAAAAAAAAAAAAAAAAAAAeAAAAaAAAAAAAAAAAAAAAAAAAAAAAAAAAAAAAECcAABAnAAAAAAAAAAAAAAAAAAAAAAAAAAAAAAAAAAAAAAAAAAAAABQAAAAAAAAAwMD/AAAAAABkAAAAMgAAAAAAAABkAAAAAAAAAH9/fwAKAAAAHwAAAFQAAAAAAAAFAAAAAQAAAAAAAAAAAAAAAAAAAAAAAAAAAAAAAAAAAAAAAAAAAAAAAn9/fwAAAAADzMzMAMDA/wB/f38AAAAAAAAAAAAAAAAAAAAAAAAAAAAhAAAAGAAAABQAAAArBAAAKiUAAOgqAABpJwAAEAAAACYAAAAIAAAAPJAAAP8fAAA="/>
               </a:ext>
             </a:extLst>
           </p:cNvSpPr>
@@ -7003,7 +7008,7 @@
             <a:spLocks noGrp="1" noChangeArrowheads="1"/>
             <a:extLst>
               <a:ext uri="smNativeData">
-                <pr:smNativeData xmlns="" xmlns:p14="http://schemas.microsoft.com/office/powerpoint/2010/main" xmlns:pr="smNativeData" val="SMDATA_13_w78LXxMAAAAlAAAAZAAAAA0AAAAAkAAAAEgAAACQAAAASAAAAAAAAAABAAAAAAAAAAEAAABQAAAAAAAAAAAA4D8AAAAAAADgPwAAAAAAAOA/AAAAAAAA4D8AAAAAAADgPwAAAAAAAOA/AAAAAAAA4D8AAAAAAADgPwAAAAAAAOA/AAAAAAAA4D8CAAAAjAAAAAAAAAAAAAAAkMImDP///wgAAAAAAAAAAAAAAAAAAAAAAAAAAAAAAAAAAAAAZAAAAAEAAABAAAAAAAAAAAAAAAAAAAAAAAAAAAAAAAAAAAAAAAAAAAAAAAAAAAAAAAAAAAAAAAAAAAAAAAAAAAAAAAAAAAAAAAAAAAAAAAAAAAAAAAAAAAAAAAAAAAAAFAAAADwAAAAAAAAAAAAAAAAAAAkUAAAAAQAAABQAAAAUAAAAFAAAAAEAAAAAAAAAZAAAAGQAAAAAAAAAZAAAAGQAAAAVAAAAYAAAAAAAAAAAAAAADwAAACADAAAAAAAAAAAAAAEAAACgMgAAVgcAAKr4//8BAAAAf39/AAEAAABkAAAAAAAAABQAAABAHwAAAAAAACYAAAAAAAAAwOD//wAAAAAmAAAAZAAAABYAAABMAAAAAAAAAAAAAAAEAAAAAAAAAAEAAAAsPEMKAAAAACgAAAAoAAAAZAAAAGQAAAAAAAAAzMzMAAAAAABQAAAAUAAAAGQAAABkAAAAAAAAABcAAAAUAAAAAAAAAAAAAAD/fwAA/38AAAAAAAAJAAAABAAAAAAAAAAMAAAAEAAAAAAAAAAAAAAAAAAAAAAAAAAeAAAAaAAAAAAAAAAAAAAAAAAAAAAAAAAAAAAAECcAABAnAAAAAAAAAAAAAAAAAAAAAAAAAAAAAAAAAAAAAAAAAAAAABQAAAAAAAAAwMD/AAAAAABkAAAAMgAAAAAAAABkAAAAAAAAAH9/fwAKAAAAHwAAAFQAAAAAAAAFAAAAAQAAAAAAAAAAAAAAAAAAAAAAAAAAAAAAAAAAAAAAAAAAAAAAAn9/fwAAAAADzMzMAMDA/wB/f38AAAAAAAAAAAAAAAAAAAAAAAAAAAAhAAAAGAAAABQAAADZNAAAKiUAAA05AABpJwAAEAAAACYAAAAIAAAAPLAAAP8fAAA="/>
+                <pr:smNativeData xmlns:pr="smNativeData" xmlns:p14="http://schemas.microsoft.com/office/powerpoint/2010/main" xmlns="" val="SMDATA_13_w78LXxMAAAAlAAAAZAAAAA0AAAAAkAAAAEgAAACQAAAASAAAAAAAAAABAAAAAAAAAAEAAABQAAAAAAAAAAAA4D8AAAAAAADgPwAAAAAAAOA/AAAAAAAA4D8AAAAAAADgPwAAAAAAAOA/AAAAAAAA4D8AAAAAAADgPwAAAAAAAOA/AAAAAAAA4D8CAAAAjAAAAAAAAAAAAAAAkMImDP///wgAAAAAAAAAAAAAAAAAAAAAAAAAAAAAAAAAAAAAZAAAAAEAAABAAAAAAAAAAAAAAAAAAAAAAAAAAAAAAAAAAAAAAAAAAAAAAAAAAAAAAAAAAAAAAAAAAAAAAAAAAAAAAAAAAAAAAAAAAAAAAAAAAAAAAAAAAAAAAAAAAAAAFAAAADwAAAAAAAAAAAAAAAAAAAkUAAAAAQAAABQAAAAUAAAAFAAAAAEAAAAAAAAAZAAAAGQAAAAAAAAAZAAAAGQAAAAVAAAAYAAAAAAAAAAAAAAADwAAACADAAAAAAAAAAAAAAEAAACgMgAAVgcAAKr4//8BAAAAf39/AAEAAABkAAAAAAAAABQAAABAHwAAAAAAACYAAAAAAAAAwOD//wAAAAAmAAAAZAAAABYAAABMAAAAAAAAAAAAAAAEAAAAAAAAAAEAAAAsPEMKAAAAACgAAAAoAAAAZAAAAGQAAAAAAAAAzMzMAAAAAABQAAAAUAAAAGQAAABkAAAAAAAAABcAAAAUAAAAAAAAAAAAAAD/fwAA/38AAAAAAAAJAAAABAAAAAAAAAAMAAAAEAAAAAAAAAAAAAAAAAAAAAAAAAAeAAAAaAAAAAAAAAAAAAAAAAAAAAAAAAAAAAAAECcAABAnAAAAAAAAAAAAAAAAAAAAAAAAAAAAAAAAAAAAAAAAAAAAABQAAAAAAAAAwMD/AAAAAABkAAAAMgAAAAAAAABkAAAAAAAAAH9/fwAKAAAAHwAAAFQAAAAAAAAFAAAAAQAAAAAAAAAAAAAAAAAAAAAAAAAAAAAAAAAAAAAAAAAAAAAAAn9/fwAAAAADzMzMAMDA/wB/f38AAAAAAAAAAAAAAAAAAAAAAAAAAAAhAAAAGAAAABQAAADZNAAAKiUAAA05AABpJwAAEAAAACYAAAAIAAAAPLAAAP8fAAA="/>
               </a:ext>
             </a:extLst>
           </p:cNvSpPr>
@@ -7195,7 +7200,7 @@
             <a:spLocks noGrp="1" noChangeArrowheads="1"/>
             <a:extLst>
               <a:ext uri="smNativeData">
-                <pr:smNativeData xmlns="" xmlns:p14="http://schemas.microsoft.com/office/powerpoint/2010/main" xmlns:pr="smNativeData" val="SMDATA_13_w78LXxMAAAAlAAAAZAAAAA0AAAAAkAAAAJAAAACQAAAAkAAAAAAAAAABAAAAAAAAAAEAAABQAAAAAAAAAAAA4D8AAAAAAADgPwAAAAAAAOA/AAAAAAAA4D8AAAAAAADgPwAAAAAAAOA/AAAAAAAA4D8AAAAAAADgPwAAAAAAAOA/AAAAAAAA4D8CAAAAjAAAAAAAAAAAAAAAkMImDP///wgAAAAAAAAAAAAAAAAAAAAAAAAAAAAAAAAAAAAAZAAAAAEAAABAAAAAAAAAAAAAAAAAAAAAAAAAAAAAAAAAAAAAAAAAAAAAAAAAAAAAAAAAAAAAAAAAAAAAAAAAAAAAAAAAAAAAAAAAAAAAAAAAAAAAAAAAAAAAAAAAAAAAFAAAADwAAAAAAAAAAAAAAAAAAAkUAAAAAQAAABQAAAAUAAAAFAAAAAEAAAAAAAAAZAAAAGQAAAAAAAAAZAAAAGQAAAAVAAAAYAAAAAAAAAAAAAAADwAAACADAAAAAAAAAAAAAAEAAACgMgAAVgcAAKr4//8BAAAAf39/AAEAAABkAAAAAAAAABQAAABAHwAAAAAAACYAAAAAAAAAwOD//wAAAAAmAAAAZAAAABYAAABMAAAAAAAAAAAAAAAEAAAAAAAAAAEAAAAsPEMKAAAAACgAAAAoAAAAZAAAAGQAAAAAAAAAzMzMAAAAAABQAAAAUAAAAGQAAABkAAAAAAAAABcAAAAUAAAAAAAAAAAAAAD/fwAA/38AAAAAAAAJAAAABAAAAAAAAAAMAAAAEAAAAAAAAAAAAAAAAAAAAAAAAAAeAAAAaAAAAAAAAAAAAAAAAAAAAAAAAAAAAAAAECcAABAnAAAAAAAAAAAAAAAAAAAAAAAAAAAAAAAAAAAAAAAAAAAAABQAAAAAAAAAwMD/AAAAAABkAAAAMgAAAAAAAABkAAAAAAAAAH9/fwAKAAAAHwAAAFQAAAAAAAAFAAAAAQAAAAAAAAAAAAAAAAAAAAAAAAAAAAAAAAAAAAAAAAAAAAAAAn9/fwAAAAADzMzMAMDA/wB/f38AAAAAAAAAAAAAAAAAAAAAAAAAAAAhAAAAGAAAABQAAAC7BQAAwAMAAIU3AABYFgAAEAAAACYAAAAIAAAAvZAAAP8fAAA="/>
+                <pr:smNativeData xmlns:pr="smNativeData" xmlns:p14="http://schemas.microsoft.com/office/powerpoint/2010/main" xmlns="" val="SMDATA_13_w78LXxMAAAAlAAAAZAAAAA0AAAAAkAAAAJAAAACQAAAAkAAAAAAAAAABAAAAAAAAAAEAAABQAAAAAAAAAAAA4D8AAAAAAADgPwAAAAAAAOA/AAAAAAAA4D8AAAAAAADgPwAAAAAAAOA/AAAAAAAA4D8AAAAAAADgPwAAAAAAAOA/AAAAAAAA4D8CAAAAjAAAAAAAAAAAAAAAkMImDP///wgAAAAAAAAAAAAAAAAAAAAAAAAAAAAAAAAAAAAAZAAAAAEAAABAAAAAAAAAAAAAAAAAAAAAAAAAAAAAAAAAAAAAAAAAAAAAAAAAAAAAAAAAAAAAAAAAAAAAAAAAAAAAAAAAAAAAAAAAAAAAAAAAAAAAAAAAAAAAAAAAAAAAFAAAADwAAAAAAAAAAAAAAAAAAAkUAAAAAQAAABQAAAAUAAAAFAAAAAEAAAAAAAAAZAAAAGQAAAAAAAAAZAAAAGQAAAAVAAAAYAAAAAAAAAAAAAAADwAAACADAAAAAAAAAAAAAAEAAACgMgAAVgcAAKr4//8BAAAAf39/AAEAAABkAAAAAAAAABQAAABAHwAAAAAAACYAAAAAAAAAwOD//wAAAAAmAAAAZAAAABYAAABMAAAAAAAAAAAAAAAEAAAAAAAAAAEAAAAsPEMKAAAAACgAAAAoAAAAZAAAAGQAAAAAAAAAzMzMAAAAAABQAAAAUAAAAGQAAABkAAAAAAAAABcAAAAUAAAAAAAAAAAAAAD/fwAA/38AAAAAAAAJAAAABAAAAAAAAAAMAAAAEAAAAAAAAAAAAAAAAAAAAAAAAAAeAAAAaAAAAAAAAAAAAAAAAAAAAAAAAAAAAAAAECcAABAnAAAAAAAAAAAAAAAAAAAAAAAAAAAAAAAAAAAAAAAAAAAAABQAAAAAAAAAwMD/AAAAAABkAAAAMgAAAAAAAABkAAAAAAAAAH9/fwAKAAAAHwAAAFQAAAAAAAAFAAAAAQAAAAAAAAAAAAAAAAAAAAAAAAAAAAAAAAAAAAAAAAAAAAAAAn9/fwAAAAADzMzMAMDA/wB/f38AAAAAAAAAAAAAAAAAAAAAAAAAAAAhAAAAGAAAABQAAAC7BQAAwAMAAIU3AABYFgAAEAAAACYAAAAIAAAAvZAAAP8fAAA="/>
               </a:ext>
             </a:extLst>
           </p:cNvSpPr>
@@ -7362,7 +7367,7 @@
             <a:spLocks noGrp="1" noChangeArrowheads="1"/>
             <a:extLst>
               <a:ext uri="smNativeData">
-                <pr:smNativeData xmlns="" xmlns:p14="http://schemas.microsoft.com/office/powerpoint/2010/main" xmlns:pr="smNativeData" val="SMDATA_13_w78LXxMAAAAlAAAAZAAAAA0AAAAAkAAAAJAAAACQAAAAkAAAAAAAAAABAAAAAAAAAAEAAABQAAAAAAAAAAAA4D8AAAAAAADgPwAAAAAAAOA/AAAAAAAA4D8AAAAAAADgPwAAAAAAAOA/AAAAAAAA4D8AAAAAAADgPwAAAAAAAOA/AAAAAAAA4D8CAAAAjAAAAAAAAAAAAAAAkMImDP///wgAAAAAAAAAAAAAAAAAAAAAAAAAAAAAAAAAAAAAZAAAAAEAAABAAAAAAAAAAAAAAAAAAAAAAAAAAAAAAAAAAAAAAAAAAAAAAAAAAAAAAAAAAAAAAAAAAAAAAAAAAAAAAAAAAAAAAAAAAAAAAAAAAAAAAAAAAAAAAAAAAAAAFAAAADwAAAAAAAAAAAAAAAAAAAkUAAAAAQAAABQAAAAUAAAAFAAAAAEAAAAAAAAAZAAAAGQAAAAAAAAAZAAAAGQAAAAVAAAAYAAAAAAAAAAAAAAADwAAACADAAAAAAAAAAAAAAEAAACgMgAAVgcAAKr4//8BAAAAf39/AAEAAABkAAAAAAAAABQAAABAHwAAAAAAACYAAAAAAAAAwOD//wAAAAAmAAAAZAAAABYAAABMAAAAAAAAAAAAAAAEAAAAAAAAAAEAAAAsPEMKAAAAACgAAAAoAAAAZAAAAGQAAAAAAAAAzMzMAAAAAABQAAAAUAAAAGQAAABkAAAAAAAAABcAAAAUAAAAAAAAAAAAAAD/fwAA/38AAAAAAAAJAAAABAAAAAAAAAAMAAAAEAAAAAAAAAAAAAAAAAAAAAAAAAAeAAAAaAAAAAAAAAAAAAAAAAAAAAAAAAAAAAAAECcAABAnAAAAAAAAAAAAAAAAAAAAAAAAAAAAAAAAAAAAAAAAAAAAABQAAAAAAAAAwMD/AAAAAABkAAAAMgAAAAAAAABkAAAAAAAAAH9/fwAKAAAAHwAAAFQAAAAAAAAFAAAAAQAAAAAAAAAAAAAAAAAAAAAAAAAAAAAAAAAAAAAAAAAAAAAAAn9/fwAAAAADzMzMAMDA/wB/f38AAAAAAAAAAAAAAAAAAAAAAAAAAAAhAAAAGAAAABQAAABnCAAAWBYAANk0AACwGAAAEAAAACYAAAAIAAAAvZAAAP8fAAA="/>
+                <pr:smNativeData xmlns:pr="smNativeData" xmlns:p14="http://schemas.microsoft.com/office/powerpoint/2010/main" xmlns="" val="SMDATA_13_w78LXxMAAAAlAAAAZAAAAA0AAAAAkAAAAJAAAACQAAAAkAAAAAAAAAABAAAAAAAAAAEAAABQAAAAAAAAAAAA4D8AAAAAAADgPwAAAAAAAOA/AAAAAAAA4D8AAAAAAADgPwAAAAAAAOA/AAAAAAAA4D8AAAAAAADgPwAAAAAAAOA/AAAAAAAA4D8CAAAAjAAAAAAAAAAAAAAAkMImDP///wgAAAAAAAAAAAAAAAAAAAAAAAAAAAAAAAAAAAAAZAAAAAEAAABAAAAAAAAAAAAAAAAAAAAAAAAAAAAAAAAAAAAAAAAAAAAAAAAAAAAAAAAAAAAAAAAAAAAAAAAAAAAAAAAAAAAAAAAAAAAAAAAAAAAAAAAAAAAAAAAAAAAAFAAAADwAAAAAAAAAAAAAAAAAAAkUAAAAAQAAABQAAAAUAAAAFAAAAAEAAAAAAAAAZAAAAGQAAAAAAAAAZAAAAGQAAAAVAAAAYAAAAAAAAAAAAAAADwAAACADAAAAAAAAAAAAAAEAAACgMgAAVgcAAKr4//8BAAAAf39/AAEAAABkAAAAAAAAABQAAABAHwAAAAAAACYAAAAAAAAAwOD//wAAAAAmAAAAZAAAABYAAABMAAAAAAAAAAAAAAAEAAAAAAAAAAEAAAAsPEMKAAAAACgAAAAoAAAAZAAAAGQAAAAAAAAAzMzMAAAAAABQAAAAUAAAAGQAAABkAAAAAAAAABcAAAAUAAAAAAAAAAAAAAD/fwAA/38AAAAAAAAJAAAABAAAAAAAAAAMAAAAEAAAAAAAAAAAAAAAAAAAAAAAAAAeAAAAaAAAAAAAAAAAAAAAAAAAAAAAAAAAAAAAECcAABAnAAAAAAAAAAAAAAAAAAAAAAAAAAAAAAAAAAAAAAAAAAAAABQAAAAAAAAAwMD/AAAAAABkAAAAMgAAAAAAAABkAAAAAAAAAH9/fwAKAAAAHwAAAFQAAAAAAAAFAAAAAQAAAAAAAAAAAAAAAAAAAAAAAAAAAAAAAAAAAAAAAAAAAAAAAn9/fwAAAAADzMzMAMDA/wB/f38AAAAAAAAAAAAAAAAAAAAAAAAAAAAhAAAAGAAAABQAAABnCAAAWBYAANk0AACwGAAAEAAAACYAAAAIAAAAvZAAAP8fAAA="/>
               </a:ext>
             </a:extLst>
           </p:cNvSpPr>
@@ -7573,7 +7578,7 @@
             <a:spLocks noGrp="1" noChangeArrowheads="1"/>
             <a:extLst>
               <a:ext uri="smNativeData">
-                <pr:smNativeData xmlns="" xmlns:p14="http://schemas.microsoft.com/office/powerpoint/2010/main" xmlns:pr="smNativeData" val="SMDATA_13_w78LXxMAAAAlAAAAZAAAAA0AAAAAkAAAAJAAAACQAAAAkAAAAAAAAAABAAAAAAAAAAEAAABQAAAAAAAAAAAA4D8AAAAAAADgPwAAAAAAAOA/AAAAAAAA4D8AAAAAAADgPwAAAAAAAOA/AAAAAAAA4D8AAAAAAADgPwAAAAAAAOA/AAAAAAAA4D8CAAAAjAAAAAAAAAAAAAAAkMImDP///wgAAAAAAAAAAAAAAAAAAAAAAAAAAAAAAAAAAAAAZAAAAAEAAABAAAAAAAAAAAAAAAAAAAAAAAAAAAAAAAAAAAAAAAAAAAAAAAAAAAAAAAAAAAAAAAAAAAAAAAAAAAAAAAAAAAAAAAAAAAAAAAAAAAAAAAAAAAAAAAAAAAAAFAAAADwAAAAAAAAAAAAAAAAAAAkUAAAAAQAAABQAAAAUAAAAFAAAAAEAAAAAAAAAZAAAAGQAAAAAAAAAZAAAAGQAAAAVAAAAYAAAAAAAAAAAAAAADwAAACADAAAAAAAAAAAAAAEAAACgMgAAVgcAAKr4//8BAAAAf39/AAEAAABkAAAAAAAAABQAAABAHwAAAAAAACYAAAAAAAAAwOD//wAAAAAmAAAAZAAAABYAAABMAAAAAAAAAAAAAAAEAAAAAAAAAAEAAAAsPEMKAAAAACgAAAAoAAAAZAAAAGQAAAAAAAAAzMzMAAAAAABQAAAAUAAAAGQAAABkAAAAAAAAABcAAAAUAAAAAAAAAAAAAAD/fwAA/38AAAAAAAAJAAAABAAAAAAAAAAMAAAAEAAAAAAAAAAAAAAAAAAAAAAAAAAeAAAAaAAAAAAAAAAAAAAAAAAAAAAAAAAAAAAAECcAABAnAAAAAAAAAAAAAAAAAAAAAAAAAAAAAAAAAAAAAAAAAAAAABQAAAAAAAAAwMD/AAAAAABkAAAAMgAAAAAAAABkAAAAAAAAAH9/fwAKAAAAHwAAAFQAAAAAAAAFAAAAAQAAAAAAAAAAAAAAAAAAAAAAAAAAAAAAAAAAAAAAAAAAAAAAAn9/fwAAAAADzMzMAMDA/wB/f38AAAAAAAAAAAAAAAAAAAAAAAAAAAAhAAAAGAAAABQAAAArBAAAgBsAAA05AAAqJQAAEAAAACYAAAAIAAAAvZAAAP8fAAA="/>
+                <pr:smNativeData xmlns:pr="smNativeData" xmlns:p14="http://schemas.microsoft.com/office/powerpoint/2010/main" xmlns="" val="SMDATA_13_w78LXxMAAAAlAAAAZAAAAA0AAAAAkAAAAJAAAACQAAAAkAAAAAAAAAABAAAAAAAAAAEAAABQAAAAAAAAAAAA4D8AAAAAAADgPwAAAAAAAOA/AAAAAAAA4D8AAAAAAADgPwAAAAAAAOA/AAAAAAAA4D8AAAAAAADgPwAAAAAAAOA/AAAAAAAA4D8CAAAAjAAAAAAAAAAAAAAAkMImDP///wgAAAAAAAAAAAAAAAAAAAAAAAAAAAAAAAAAAAAAZAAAAAEAAABAAAAAAAAAAAAAAAAAAAAAAAAAAAAAAAAAAAAAAAAAAAAAAAAAAAAAAAAAAAAAAAAAAAAAAAAAAAAAAAAAAAAAAAAAAAAAAAAAAAAAAAAAAAAAAAAAAAAAFAAAADwAAAAAAAAAAAAAAAAAAAkUAAAAAQAAABQAAAAUAAAAFAAAAAEAAAAAAAAAZAAAAGQAAAAAAAAAZAAAAGQAAAAVAAAAYAAAAAAAAAAAAAAADwAAACADAAAAAAAAAAAAAAEAAACgMgAAVgcAAKr4//8BAAAAf39/AAEAAABkAAAAAAAAABQAAABAHwAAAAAAACYAAAAAAAAAwOD//wAAAAAmAAAAZAAAABYAAABMAAAAAAAAAAAAAAAEAAAAAAAAAAEAAAAsPEMKAAAAACgAAAAoAAAAZAAAAGQAAAAAAAAAzMzMAAAAAABQAAAAUAAAAGQAAABkAAAAAAAAABcAAAAUAAAAAAAAAAAAAAD/fwAA/38AAAAAAAAJAAAABAAAAAAAAAAMAAAAEAAAAAAAAAAAAAAAAAAAAAAAAAAeAAAAaAAAAAAAAAAAAAAAAAAAAAAAAAAAAAAAECcAABAnAAAAAAAAAAAAAAAAAAAAAAAAAAAAAAAAAAAAAAAAAAAAABQAAAAAAAAAwMD/AAAAAABkAAAAMgAAAAAAAABkAAAAAAAAAH9/fwAKAAAAHwAAAFQAAAAAAAAFAAAAAQAAAAAAAAAAAAAAAAAAAAAAAAAAAAAAAAAAAAAAAAAAAAAAAn9/fwAAAAADzMzMAMDA/wB/f38AAAAAAAAAAAAAAAAAAAAAAAAAAAAhAAAAGAAAABQAAAArBAAAgBsAAA05AAAqJQAAEAAAACYAAAAIAAAAvZAAAP8fAAA="/>
               </a:ext>
             </a:extLst>
           </p:cNvSpPr>
@@ -7764,7 +7769,7 @@
             <a:spLocks noGrp="1" noChangeArrowheads="1"/>
             <a:extLst>
               <a:ext uri="smNativeData">
-                <pr:smNativeData xmlns="" xmlns:p14="http://schemas.microsoft.com/office/powerpoint/2010/main" xmlns:pr="smNativeData" val="SMDATA_13_w78LXxMAAAAlAAAAZAAAAA0AAAAAkAAAAJAAAACQAAAAkAAAAAAAAAABAAAAAAAAAAEAAABQAAAAAAAAAAAA4D8AAAAAAADgPwAAAAAAAOA/AAAAAAAA4D8AAAAAAADgPwAAAAAAAOA/AAAAAAAA4D8AAAAAAADgPwAAAAAAAOA/AAAAAAAA4D8CAAAAjAAAAAAAAAAAAAAAkMImDP///wgAAAAAAAAAAAAAAAAAAAAAAAAAAAAAAAAAAAAAZAAAAAEAAABAAAAAAAAAAAAAAAAAAAAAAAAAAAAAAAAAAAAAAAAAAAAAAAAAAAAAAAAAAAAAAAAAAAAAAAAAAAAAAAAAAAAAAAAAAAAAAAAAAAAAAAAAAAAAAAAAAAAAFAAAADwAAAAAAAAAAAAAAAAAAAkUAAAAAQAAABQAAAAUAAAAFAAAAAEAAAAAAAAAZAAAAGQAAAAAAAAAZAAAAGQAAAAVAAAAYAAAAAAAAAAAAAAADwAAACADAAAAAAAAAAAAAAEAAACgMgAAVgcAAKr4//8BAAAAf39/AAEAAABkAAAAAAAAABQAAABAHwAAAAAAACYAAAAAAAAAwOD//wAAAAAmAAAAZAAAABYAAABMAAAAAAAAAAAAAAAEAAAAAAAAAAEAAAAsPEMKAAAAACgAAAAoAAAAZAAAAGQAAAAAAAAAzMzMAAAAAABQAAAAUAAAAGQAAABkAAAAAAAAABcAAAAUAAAAAAAAAAAAAAD/fwAA/38AAAAAAAAJAAAABAAAAAAAAAAMAAAAEAAAAAAAAAAAAAAAAAAAAAAAAAAeAAAAaAAAAAAAAAAAAAAAAAAAAAAAAAAAAAAAECcAABAnAAAAAAAAAAAAAAAAAAAAAAAAAAAAAAAAAAAAAAAAAAAAABQAAAAAAAAAwMD/AAAAAABkAAAAMgAAAAAAAABkAAAAAAAAAH9/fwAKAAAAHwAAAFQAAAAAAAAFAAAAAQAAAAAAAAAAAAAAAAAAAAAAAAAAAAAAAAAAAAAAAAAAAAAAAn9/fwAAAAADzMzMAMDA/wB/f38AAAAAAAAAAAAAAAAAAAAAAAAAAAAhAAAAGAAAABQAAABTLAAAKiUAAO8xAABpJwAAEAAAACYAAAAIAAAAPJAAAP8fAAA="/>
+                <pr:smNativeData xmlns:pr="smNativeData" xmlns:p14="http://schemas.microsoft.com/office/powerpoint/2010/main" xmlns="" val="SMDATA_13_w78LXxMAAAAlAAAAZAAAAA0AAAAAkAAAAJAAAACQAAAAkAAAAAAAAAABAAAAAAAAAAEAAABQAAAAAAAAAAAA4D8AAAAAAADgPwAAAAAAAOA/AAAAAAAA4D8AAAAAAADgPwAAAAAAAOA/AAAAAAAA4D8AAAAAAADgPwAAAAAAAOA/AAAAAAAA4D8CAAAAjAAAAAAAAAAAAAAAkMImDP///wgAAAAAAAAAAAAAAAAAAAAAAAAAAAAAAAAAAAAAZAAAAAEAAABAAAAAAAAAAAAAAAAAAAAAAAAAAAAAAAAAAAAAAAAAAAAAAAAAAAAAAAAAAAAAAAAAAAAAAAAAAAAAAAAAAAAAAAAAAAAAAAAAAAAAAAAAAAAAAAAAAAAAFAAAADwAAAAAAAAAAAAAAAAAAAkUAAAAAQAAABQAAAAUAAAAFAAAAAEAAAAAAAAAZAAAAGQAAAAAAAAAZAAAAGQAAAAVAAAAYAAAAAAAAAAAAAAADwAAACADAAAAAAAAAAAAAAEAAACgMgAAVgcAAKr4//8BAAAAf39/AAEAAABkAAAAAAAAABQAAABAHwAAAAAAACYAAAAAAAAAwOD//wAAAAAmAAAAZAAAABYAAABMAAAAAAAAAAAAAAAEAAAAAAAAAAEAAAAsPEMKAAAAACgAAAAoAAAAZAAAAGQAAAAAAAAAzMzMAAAAAABQAAAAUAAAAGQAAABkAAAAAAAAABcAAAAUAAAAAAAAAAAAAAD/fwAA/38AAAAAAAAJAAAABAAAAAAAAAAMAAAAEAAAAAAAAAAAAAAAAAAAAAAAAAAeAAAAaAAAAAAAAAAAAAAAAAAAAAAAAAAAAAAAECcAABAnAAAAAAAAAAAAAAAAAAAAAAAAAAAAAAAAAAAAAAAAAAAAABQAAAAAAAAAwMD/AAAAAABkAAAAMgAAAAAAAABkAAAAAAAAAH9/fwAKAAAAHwAAAFQAAAAAAAAFAAAAAQAAAAAAAAAAAAAAAAAAAAAAAAAAAAAAAAAAAAAAAAAAAAAAAn9/fwAAAAADzMzMAMDA/wB/f38AAAAAAAAAAAAAAAAAAAAAAAAAAAAhAAAAGAAAABQAAABTLAAAKiUAAO8xAABpJwAAEAAAACYAAAAIAAAAPJAAAP8fAAA="/>
               </a:ext>
             </a:extLst>
           </p:cNvSpPr>
@@ -7951,7 +7956,7 @@
             <a:spLocks noGrp="1" noChangeArrowheads="1"/>
             <a:extLst>
               <a:ext uri="smNativeData">
-                <pr:smNativeData xmlns="" xmlns:p14="http://schemas.microsoft.com/office/powerpoint/2010/main" xmlns:pr="smNativeData" val="SMDATA_13_w78LXxMAAAAlAAAAZAAAAA0AAAAAkAAAAJAAAACQAAAAkAAAAAAAAAABAAAAAAAAAAEAAABQAAAAAAAAAAAA4D8AAAAAAADgPwAAAAAAAOA/AAAAAAAA4D8AAAAAAADgPwAAAAAAAOA/AAAAAAAA4D8AAAAAAADgPwAAAAAAAOA/AAAAAAAA4D8CAAAAjAAAAAAAAAAAAAAAkMImDP///wgAAAAAAAAAAAAAAAAAAAAAAAAAAAAAAAAAAAAAZAAAAAEAAABAAAAAAAAAAAAAAAAAAAAAAAAAAAAAAAAAAAAAAAAAAAAAAAAAAAAAAAAAAAAAAAAAAAAAAAAAAAAAAAAAAAAAAAAAAAAAAAAAAAAAAAAAAAAAAAAAAAAAFAAAADwAAAAAAAAAAAAAAAAAAAkUAAAAAQAAABQAAAAUAAAAFAAAAAEAAAAAAAAAZAAAAGQAAAAAAAAAZAAAAGQAAAAVAAAAYAAAAAAAAAAAAAAADwAAACADAAAAAAAAAAAAAAEAAACgMgAAVgcAAKr4//8BAAAAf39/AAEAAABkAAAAAAAAABQAAABAHwAAAAAAACYAAAAAAAAAwOD//wAAAAAmAAAAZAAAABYAAABMAAAAAAAAAAAAAAAEAAAAAAAAAAEAAAAsPEMKAAAAACgAAAAoAAAAZAAAAGQAAAAAAAAAzMzMAAAAAABQAAAAUAAAAGQAAABkAAAAAAAAABcAAAAUAAAAAAAAAAAAAAD/fwAA/38AAAAAAAAJAAAABAAAAAAAAAAMAAAAEAAAAAAAAAAAAAAAAAAAAAAAAAAeAAAAaAAAAAAAAAAAAAAAAAAAAAAAAAAAAAAAECcAABAnAAAAAAAAAAAAAAAAAAAAAAAAAAAAAAAAAAAAAAAAAAAAABQAAAAAAAAAwMD/AAAAAABkAAAAMgAAAAAAAABkAAAAAAAAAH9/fwAKAAAAHwAAAFQAAAAAAAAFAAAAAQAAAAAAAAAAAAAAAAAAAAAAAAAAAAAAAAAAAAAAAAAAAAAAAn9/fwAAAAADzMzMAMDA/wB/f38AAAAAAAAAAAAAAAAAAAAAAAAAAAAhAAAAGAAAABQAAAArBAAAKiUAAOgqAABpJwAAEAAAACYAAAAIAAAAPJAAAP8fAAA="/>
+                <pr:smNativeData xmlns:pr="smNativeData" xmlns:p14="http://schemas.microsoft.com/office/powerpoint/2010/main" xmlns="" val="SMDATA_13_w78LXxMAAAAlAAAAZAAAAA0AAAAAkAAAAJAAAACQAAAAkAAAAAAAAAABAAAAAAAAAAEAAABQAAAAAAAAAAAA4D8AAAAAAADgPwAAAAAAAOA/AAAAAAAA4D8AAAAAAADgPwAAAAAAAOA/AAAAAAAA4D8AAAAAAADgPwAAAAAAAOA/AAAAAAAA4D8CAAAAjAAAAAAAAAAAAAAAkMImDP///wgAAAAAAAAAAAAAAAAAAAAAAAAAAAAAAAAAAAAAZAAAAAEAAABAAAAAAAAAAAAAAAAAAAAAAAAAAAAAAAAAAAAAAAAAAAAAAAAAAAAAAAAAAAAAAAAAAAAAAAAAAAAAAAAAAAAAAAAAAAAAAAAAAAAAAAAAAAAAAAAAAAAAFAAAADwAAAAAAAAAAAAAAAAAAAkUAAAAAQAAABQAAAAUAAAAFAAAAAEAAAAAAAAAZAAAAGQAAAAAAAAAZAAAAGQAAAAVAAAAYAAAAAAAAAAAAAAADwAAACADAAAAAAAAAAAAAAEAAACgMgAAVgcAAKr4//8BAAAAf39/AAEAAABkAAAAAAAAABQAAABAHwAAAAAAACYAAAAAAAAAwOD//wAAAAAmAAAAZAAAABYAAABMAAAAAAAAAAAAAAAEAAAAAAAAAAEAAAAsPEMKAAAAACgAAAAoAAAAZAAAAGQAAAAAAAAAzMzMAAAAAABQAAAAUAAAAGQAAABkAAAAAAAAABcAAAAUAAAAAAAAAAAAAAD/fwAA/38AAAAAAAAJAAAABAAAAAAAAAAMAAAAEAAAAAAAAAAAAAAAAAAAAAAAAAAeAAAAaAAAAAAAAAAAAAAAAAAAAAAAAAAAAAAAECcAABAnAAAAAAAAAAAAAAAAAAAAAAAAAAAAAAAAAAAAAAAAAAAAABQAAAAAAAAAwMD/AAAAAABkAAAAMgAAAAAAAABkAAAAAAAAAH9/fwAKAAAAHwAAAFQAAAAAAAAFAAAAAQAAAAAAAAAAAAAAAAAAAAAAAAAAAAAAAAAAAAAAAAAAAAAAAn9/fwAAAAADzMzMAMDA/wB/f38AAAAAAAAAAAAAAAAAAAAAAAAAAAAhAAAAGAAAABQAAAArBAAAKiUAAOgqAABpJwAAEAAAACYAAAAIAAAAPJAAAP8fAAA="/>
               </a:ext>
             </a:extLst>
           </p:cNvSpPr>
@@ -8138,7 +8143,7 @@
             <a:spLocks noGrp="1" noChangeArrowheads="1"/>
             <a:extLst>
               <a:ext uri="smNativeData">
-                <pr:smNativeData xmlns="" xmlns:p14="http://schemas.microsoft.com/office/powerpoint/2010/main" xmlns:pr="smNativeData" val="SMDATA_13_w78LXxMAAAAlAAAAZAAAAA0AAAAAkAAAAEgAAACQAAAASAAAAAAAAAABAAAAAAAAAAEAAABQAAAAAAAAAAAA4D8AAAAAAADgPwAAAAAAAOA/AAAAAAAA4D8AAAAAAADgPwAAAAAAAOA/AAAAAAAA4D8AAAAAAADgPwAAAAAAAOA/AAAAAAAA4D8CAAAAjAAAAAAAAAAAAAAAkMImDP///wgAAAAAAAAAAAAAAAAAAAAAAAAAAAAAAAAAAAAAZAAAAAEAAABAAAAAAAAAAAAAAAAAAAAAAAAAAAAAAAAAAAAAAAAAAAAAAAAAAAAAAAAAAAAAAAAAAAAAAAAAAAAAAAAAAAAAAAAAAAAAAAAAAAAAAAAAAAAAAAAAAAAAFAAAADwAAAAAAAAAAAAAAAAAAAkUAAAAAQAAABQAAAAUAAAAFAAAAAEAAAAAAAAAZAAAAGQAAAAAAAAAZAAAAGQAAAAVAAAAYAAAAAAAAAAAAAAADwAAACADAAAAAAAAAAAAAAEAAACgMgAAVgcAAKr4//8BAAAAf39/AAEAAABkAAAAAAAAABQAAABAHwAAAAAAACYAAAAAAAAAwOD//wAAAAAmAAAAZAAAABYAAABMAAAAAAAAAAAAAAAEAAAAAAAAAAEAAAAsPEMKAAAAACgAAAAoAAAAZAAAAGQAAAAAAAAAzMzMAAAAAABQAAAAUAAAAGQAAABkAAAAAAAAABcAAAAUAAAAAAAAAAAAAAD/fwAA/38AAAAAAAAJAAAABAAAAAAAAAAMAAAAEAAAAAAAAAAAAAAAAAAAAAAAAAAeAAAAaAAAAAAAAAAAAAAAAAAAAAAAAAAAAAAAECcAABAnAAAAAAAAAAAAAAAAAAAAAAAAAAAAAAAAAAAAAAAAAAAAABQAAAAAAAAAwMD/AAAAAABkAAAAMgAAAAAAAABkAAAAAAAAAH9/fwAKAAAAHwAAAFQAAAAAAAAFAAAAAQAAAAAAAAAAAAAAAAAAAAAAAAAAAAAAAAAAAAAAAAAAAAAAAn9/fwAAAAADzMzMAMDA/wB/f38AAAAAAAAAAAAAAAAAAAAAAAAAAAAhAAAAGAAAABQAAADZNAAAKiUAAA05AABpJwAAEAAAACYAAAAIAAAAPLAAAP8fAAA="/>
+                <pr:smNativeData xmlns:pr="smNativeData" xmlns:p14="http://schemas.microsoft.com/office/powerpoint/2010/main" xmlns="" val="SMDATA_13_w78LXxMAAAAlAAAAZAAAAA0AAAAAkAAAAEgAAACQAAAASAAAAAAAAAABAAAAAAAAAAEAAABQAAAAAAAAAAAA4D8AAAAAAADgPwAAAAAAAOA/AAAAAAAA4D8AAAAAAADgPwAAAAAAAOA/AAAAAAAA4D8AAAAAAADgPwAAAAAAAOA/AAAAAAAA4D8CAAAAjAAAAAAAAAAAAAAAkMImDP///wgAAAAAAAAAAAAAAAAAAAAAAAAAAAAAAAAAAAAAZAAAAAEAAABAAAAAAAAAAAAAAAAAAAAAAAAAAAAAAAAAAAAAAAAAAAAAAAAAAAAAAAAAAAAAAAAAAAAAAAAAAAAAAAAAAAAAAAAAAAAAAAAAAAAAAAAAAAAAAAAAAAAAFAAAADwAAAAAAAAAAAAAAAAAAAkUAAAAAQAAABQAAAAUAAAAFAAAAAEAAAAAAAAAZAAAAGQAAAAAAAAAZAAAAGQAAAAVAAAAYAAAAAAAAAAAAAAADwAAACADAAAAAAAAAAAAAAEAAACgMgAAVgcAAKr4//8BAAAAf39/AAEAAABkAAAAAAAAABQAAABAHwAAAAAAACYAAAAAAAAAwOD//wAAAAAmAAAAZAAAABYAAABMAAAAAAAAAAAAAAAEAAAAAAAAAAEAAAAsPEMKAAAAACgAAAAoAAAAZAAAAGQAAAAAAAAAzMzMAAAAAABQAAAAUAAAAGQAAABkAAAAAAAAABcAAAAUAAAAAAAAAAAAAAD/fwAA/38AAAAAAAAJAAAABAAAAAAAAAAMAAAAEAAAAAAAAAAAAAAAAAAAAAAAAAAeAAAAaAAAAAAAAAAAAAAAAAAAAAAAAAAAAAAAECcAABAnAAAAAAAAAAAAAAAAAAAAAAAAAAAAAAAAAAAAAAAAAAAAABQAAAAAAAAAwMD/AAAAAABkAAAAMgAAAAAAAABkAAAAAAAAAH9/fwAKAAAAHwAAAFQAAAAAAAAFAAAAAQAAAAAAAAAAAAAAAAAAAAAAAAAAAAAAAAAAAAAAAAAAAAAAAn9/fwAAAAADzMzMAMDA/wB/f38AAAAAAAAAAAAAAAAAAAAAAAAAAAAhAAAAGAAAABQAAADZNAAAKiUAAA05AABpJwAAEAAAACYAAAAIAAAAPLAAAP8fAAA="/>
               </a:ext>
             </a:extLst>
           </p:cNvSpPr>
@@ -8304,7 +8309,7 @@
           <p:cNvSpPr>
             <a:extLst>
               <a:ext uri="smNativeData">
-                <pr:smNativeData xmlns="" xmlns:p14="http://schemas.microsoft.com/office/powerpoint/2010/main" xmlns:pr="smNativeData" val="SMDATA_13_w78LXxMAAAAlAAAAZAAAAA0AAAAAkAAAAEgAAACQAAAASAAAAAAAAAABAAAAAAAAAAEAAABQAAAAAAAAAAAA4D8AAAAAAADgPwAAAAAAAOA/AAAAAAAA4D8AAAAAAADgPwAAAAAAAOA/AAAAAAAA4D8AAAAAAADgPwAAAAAAAOA/AAAAAAAA4D8CAAAAjAAAAAAAAAAAAAAAkMImDP///wgAAAAAAAAAAAAAAAAAAAAAAAAAAAAAAAAAAAAAZAAAAAEAAABAAAAAAAAAAAAAAAAAAAAAAAAAAAAAAAAAAAAAAAAAAAAAAAAAAAAAAAAAAAAAAAAAAAAAAAAAAAAAAAAAAAAAAAAAAAAAAAAAAAAAAAAAAAAAAAAAAAAAFAAAADwAAAAAAAAAAAAAAAAAAAkUAAAAAQAAABQAAAAUAAAAFAAAAAEAAAAAAAAAZAAAAGQAAAAAAAAAZAAAAGQAAAAVAAAAYAAAAAAAAAAAAAAADwAAACADAAAAAAAAAAAAAAEAAACgMgAAVgcAAKr4//8BAAAAf39/AAEAAABkAAAAAAAAABQAAABAHwAAAAAAACYAAAAAAAAAwOD//wAAAAAmAAAAZAAAABYAAABMAAAAAAAAAAAAAAAEAAAAAAAAAAEAAAAsPEMKAAAAACgAAAAoAAAAZAAAAGQAAAAAAAAAzMzMAAAAAABQAAAAUAAAAGQAAABkAAAAAAAAABcAAAAUAAAAAAAAAAAAAAD/fwAA/38AAAAAAAAJAAAABAAAAAAAAAAMAAAAEAAAAAAAAAAAAAAAAAAAAAAAAAAeAAAAaAAAAAAAAAAAAAAAAAAAAAAAAAAAAAAAECcAABAnAAAAAAAAAAAAAAAAAAAAAAAAAAAAAAAAAAAAAAAAAAAAABQAAAAAAAAAwMD/AAAAAABkAAAAMgAAAAAAAABkAAAAAAAAAH9/fwAKAAAAHwAAAFQAAAAAAAAFAAAAAQAAAAAAAAAAAAAAAAAAAAAAAAAAAAAAAAAAAAAAAAAAAAAAAn9/fwAAAAADzMzMAMDA/wB/f38AAAAAAAAAAAAAAAAAAAAAAAAAAAAhAAAAGAAAABQAAABVAwAA3QQAABUHAAB2CAAAEAAAACYAAAAIAAAA//////////8="/>
+                <pr:smNativeData xmlns:pr="smNativeData" xmlns:p14="http://schemas.microsoft.com/office/powerpoint/2010/main" xmlns="" val="SMDATA_13_w78LXxMAAAAlAAAAZAAAAA0AAAAAkAAAAEgAAACQAAAASAAAAAAAAAABAAAAAAAAAAEAAABQAAAAAAAAAAAA4D8AAAAAAADgPwAAAAAAAOA/AAAAAAAA4D8AAAAAAADgPwAAAAAAAOA/AAAAAAAA4D8AAAAAAADgPwAAAAAAAOA/AAAAAAAA4D8CAAAAjAAAAAAAAAAAAAAAkMImDP///wgAAAAAAAAAAAAAAAAAAAAAAAAAAAAAAAAAAAAAZAAAAAEAAABAAAAAAAAAAAAAAAAAAAAAAAAAAAAAAAAAAAAAAAAAAAAAAAAAAAAAAAAAAAAAAAAAAAAAAAAAAAAAAAAAAAAAAAAAAAAAAAAAAAAAAAAAAAAAAAAAAAAAFAAAADwAAAAAAAAAAAAAAAAAAAkUAAAAAQAAABQAAAAUAAAAFAAAAAEAAAAAAAAAZAAAAGQAAAAAAAAAZAAAAGQAAAAVAAAAYAAAAAAAAAAAAAAADwAAACADAAAAAAAAAAAAAAEAAACgMgAAVgcAAKr4//8BAAAAf39/AAEAAABkAAAAAAAAABQAAABAHwAAAAAAACYAAAAAAAAAwOD//wAAAAAmAAAAZAAAABYAAABMAAAAAAAAAAAAAAAEAAAAAAAAAAEAAAAsPEMKAAAAACgAAAAoAAAAZAAAAGQAAAAAAAAAzMzMAAAAAABQAAAAUAAAAGQAAABkAAAAAAAAABcAAAAUAAAAAAAAAAAAAAD/fwAA/38AAAAAAAAJAAAABAAAAAAAAAAMAAAAEAAAAAAAAAAAAAAAAAAAAAAAAAAeAAAAaAAAAAAAAAAAAAAAAAAAAAAAAAAAAAAAECcAABAnAAAAAAAAAAAAAAAAAAAAAAAAAAAAAAAAAAAAAAAAAAAAABQAAAAAAAAAwMD/AAAAAABkAAAAMgAAAAAAAABkAAAAAAAAAH9/fwAKAAAAHwAAAFQAAAAAAAAFAAAAAQAAAAAAAAAAAAAAAAAAAAAAAAAAAAAAAAAAAAAAAAAAAAAAAn9/fwAAAAADzMzMAMDA/wB/f38AAAAAAAAAAAAAAAAAAAAAAAAAAAAhAAAAGAAAABQAAABVAwAA3QQAABUHAAB2CAAAEAAAACYAAAAIAAAA//////////8="/>
               </a:ext>
             </a:extLst>
           </p:cNvSpPr>
@@ -8354,7 +8359,7 @@
           <p:cNvSpPr>
             <a:extLst>
               <a:ext uri="smNativeData">
-                <pr:smNativeData xmlns="" xmlns:p14="http://schemas.microsoft.com/office/powerpoint/2010/main" xmlns:pr="smNativeData" val="SMDATA_13_w78LXxMAAAAlAAAAZAAAAA0AAAAAkAAAAEgAAACQAAAASAAAAAAAAAABAAAAAAAAAAEAAABQAAAAAAAAAAAA4D8AAAAAAADgPwAAAAAAAOA/AAAAAAAA4D8AAAAAAADgPwAAAAAAAOA/AAAAAAAA4D8AAAAAAADgPwAAAAAAAOA/AAAAAAAA4D8CAAAAjAAAAAAAAAAAAAAAkMImDP///wgAAAAAAAAAAAAAAAAAAAAAAAAAAAAAAAAAAAAAZAAAAAEAAABAAAAAAAAAAAAAAAAAAAAAAAAAAAAAAAAAAAAAAAAAAAAAAAAAAAAAAAAAAAAAAAAAAAAAAAAAAAAAAAAAAAAAAAAAAAAAAAAAAAAAAAAAAAAAAAAAAAAAFAAAADwAAAAAAAAAAAAAAAAAAAkUAAAAAQAAABQAAAAUAAAAFAAAAAEAAAAAAAAAZAAAAGQAAAAAAAAAZAAAAGQAAAAVAAAAYAAAAAAAAAAAAAAADwAAACADAAAAAAAAAAAAAAEAAACgMgAAVgcAAKr4//8BAAAAf39/AAEAAABkAAAAAAAAABQAAABAHwAAAAAAACYAAAAAAAAAwOD//wAAAAAmAAAAZAAAABYAAABMAAAAAAAAAAAAAAAEAAAAAAAAAAEAAAAsPEMKAAAAACgAAAAoAAAAZAAAAGQAAAAAAAAAzMzMAAAAAABQAAAAUAAAAGQAAABkAAAAAAAAABcAAAAUAAAAAAAAAAAAAAD/fwAA/38AAAAAAAAJAAAABAAAAAAAAAAMAAAAEAAAAAAAAAAAAAAAAAAAAAAAAAAeAAAAaAAAAAAAAAAAAAAAAAAAAAAAAAAAAAAAECcAABAnAAAAAAAAAAAAAAAAAAAAAAAAAAAAAAAAAAAAAAAAAAAAABQAAAAAAAAAwMD/AAAAAABkAAAAMgAAAAAAAABkAAAAAAAAAH9/fwAKAAAAHwAAAFQAAAAAAAAFAAAAAQAAAAAAAAAAAAAAAAAAAAAAAAAAAAAAAAAAAAAAAAAAAAAAAn9/fwAAAAADzMzMAMDA/wB/f38AAAAAAAAAAAAAAAAAAAAAAAAAAAAhAAAAGAAAABQAAAC1NgAAwhEAAHU6AABbFQAAEAAAACYAAAAIAAAA//////////8="/>
+                <pr:smNativeData xmlns:pr="smNativeData" xmlns:p14="http://schemas.microsoft.com/office/powerpoint/2010/main" xmlns="" val="SMDATA_13_w78LXxMAAAAlAAAAZAAAAA0AAAAAkAAAAEgAAACQAAAASAAAAAAAAAABAAAAAAAAAAEAAABQAAAAAAAAAAAA4D8AAAAAAADgPwAAAAAAAOA/AAAAAAAA4D8AAAAAAADgPwAAAAAAAOA/AAAAAAAA4D8AAAAAAADgPwAAAAAAAOA/AAAAAAAA4D8CAAAAjAAAAAAAAAAAAAAAkMImDP///wgAAAAAAAAAAAAAAAAAAAAAAAAAAAAAAAAAAAAAZAAAAAEAAABAAAAAAAAAAAAAAAAAAAAAAAAAAAAAAAAAAAAAAAAAAAAAAAAAAAAAAAAAAAAAAAAAAAAAAAAAAAAAAAAAAAAAAAAAAAAAAAAAAAAAAAAAAAAAAAAAAAAAFAAAADwAAAAAAAAAAAAAAAAAAAkUAAAAAQAAABQAAAAUAAAAFAAAAAEAAAAAAAAAZAAAAGQAAAAAAAAAZAAAAGQAAAAVAAAAYAAAAAAAAAAAAAAADwAAACADAAAAAAAAAAAAAAEAAACgMgAAVgcAAKr4//8BAAAAf39/AAEAAABkAAAAAAAAABQAAABAHwAAAAAAACYAAAAAAAAAwOD//wAAAAAmAAAAZAAAABYAAABMAAAAAAAAAAAAAAAEAAAAAAAAAAEAAAAsPEMKAAAAACgAAAAoAAAAZAAAAGQAAAAAAAAAzMzMAAAAAABQAAAAUAAAAGQAAABkAAAAAAAAABcAAAAUAAAAAAAAAAAAAAD/fwAA/38AAAAAAAAJAAAABAAAAAAAAAAMAAAAEAAAAAAAAAAAAAAAAAAAAAAAAAAeAAAAaAAAAAAAAAAAAAAAAAAAAAAAAAAAAAAAECcAABAnAAAAAAAAAAAAAAAAAAAAAAAAAAAAAAAAAAAAAAAAAAAAABQAAAAAAAAAwMD/AAAAAABkAAAAMgAAAAAAAABkAAAAAAAAAH9/fwAKAAAAHwAAAFQAAAAAAAAFAAAAAQAAAAAAAAAAAAAAAAAAAAAAAAAAAAAAAAAAAAAAAAAAAAAAAn9/fwAAAAADzMzMAMDA/wB/f38AAAAAAAAAAAAAAAAAAAAAAAAAAAAhAAAAGAAAABQAAAC1NgAAwhEAAHU6AABbFQAAEAAAACYAAAAIAAAA//////////8="/>
               </a:ext>
             </a:extLst>
           </p:cNvSpPr>
@@ -8435,7 +8440,7 @@
             <a:spLocks noGrp="1" noChangeArrowheads="1"/>
             <a:extLst>
               <a:ext uri="smNativeData">
-                <pr:smNativeData xmlns="" xmlns:p14="http://schemas.microsoft.com/office/powerpoint/2010/main" xmlns:pr="smNativeData" val="SMDATA_13_w78LXxMAAAAlAAAAZAAAAA0AAAAAkAAAAJAAAACQAAAAkAAAAAAAAAACAAAAAAAAAAEAAABQAAAAAAAAAAAA4D8AAAAAAADgPwAAAAAAAOA/AAAAAAAA4D8AAAAAAADgPwAAAAAAAOA/AAAAAAAA4D8AAAAAAADgPwAAAAAAAOA/AAAAAAAA4D8CAAAAjAAAAAAAAAAAAAAAkMImDP///wgAAAAAAAAAAAAAAAAAAAAAAAAAAAAAAAAAAAAAZAAAAAEAAABAAAAAAAAAAAAAAAAAAAAAAAAAAAAAAAAAAAAAAAAAAAAAAAAAAAAAAAAAAAAAAAAAAAAAAAAAAAAAAAAAAAAAAAAAAAAAAAAAAAAAAAAAAAAAAAAAAAAAFAAAADwAAAAAAAAAAAAAAAAAAAkUAAAAAQAAABQAAAAUAAAAFAAAAAEAAAAAAAAAZAAAAGQAAAAAAAAAZAAAAGQAAAAVAAAAYAAAAAAAAAAAAAAADwAAACADAAAAAAAAAAAAAAEAAACgMgAAVgcAAKr4//8BAAAAf39/AAEAAABkAAAAAAAAABQAAABAHwAAAAAAACYAAAAAAAAAwOD//wAAAAAmAAAAZAAAABYAAABMAAAAAAAAAAAAAAAEAAAAAAAAAAEAAAAsPEMKAAAAACgAAAAoAAAAZAAAAGQAAAAAAAAAzMzMAAAAAABQAAAAUAAAAGQAAABkAAAAAAAAABcAAAAUAAAAAAAAAAAAAAD/fwAA/38AAAAAAAAJAAAABAAAAAAAAAAMAAAAEAAAAAAAAAAAAAAAAAAAAAAAAAAeAAAAaAAAAAAAAAAAAAAAAAAAAAAAAAAAAAAAECcAABAnAAAAAAAAAAAAAAAAAAAAAAAAAAAAAAAAAAAAAAAAAAAAABQAAAAAAAAAwMD/AAAAAABkAAAAMgAAAAAAAABkAAAAAAAAAH9/fwAKAAAAHwAAAFQAAAAAAAAFAAAAAQAAAAAAAAAAAAAAAAAAAAAAAAAAAAAAAAAAAAAAAAAAAAAAAn9/fwAAAAADzMzMAMDA/wB/f38AAAAAAAAAAAAAAAAAAAAAAAAAAAAhAAAAGAAAABQAAAArBAAA4wsAAA05AADaGwAAEAAAACYAAAAIAAAAvZAAAP8fAAA="/>
+                <pr:smNativeData xmlns:pr="smNativeData" xmlns:p14="http://schemas.microsoft.com/office/powerpoint/2010/main" xmlns="" val="SMDATA_13_w78LXxMAAAAlAAAAZAAAAA0AAAAAkAAAAJAAAACQAAAAkAAAAAAAAAACAAAAAAAAAAEAAABQAAAAAAAAAAAA4D8AAAAAAADgPwAAAAAAAOA/AAAAAAAA4D8AAAAAAADgPwAAAAAAAOA/AAAAAAAA4D8AAAAAAADgPwAAAAAAAOA/AAAAAAAA4D8CAAAAjAAAAAAAAAAAAAAAkMImDP///wgAAAAAAAAAAAAAAAAAAAAAAAAAAAAAAAAAAAAAZAAAAAEAAABAAAAAAAAAAAAAAAAAAAAAAAAAAAAAAAAAAAAAAAAAAAAAAAAAAAAAAAAAAAAAAAAAAAAAAAAAAAAAAAAAAAAAAAAAAAAAAAAAAAAAAAAAAAAAAAAAAAAAFAAAADwAAAAAAAAAAAAAAAAAAAkUAAAAAQAAABQAAAAUAAAAFAAAAAEAAAAAAAAAZAAAAGQAAAAAAAAAZAAAAGQAAAAVAAAAYAAAAAAAAAAAAAAADwAAACADAAAAAAAAAAAAAAEAAACgMgAAVgcAAKr4//8BAAAAf39/AAEAAABkAAAAAAAAABQAAABAHwAAAAAAACYAAAAAAAAAwOD//wAAAAAmAAAAZAAAABYAAABMAAAAAAAAAAAAAAAEAAAAAAAAAAEAAAAsPEMKAAAAACgAAAAoAAAAZAAAAGQAAAAAAAAAzMzMAAAAAABQAAAAUAAAAGQAAABkAAAAAAAAABcAAAAUAAAAAAAAAAAAAAD/fwAA/38AAAAAAAAJAAAABAAAAAAAAAAMAAAAEAAAAAAAAAAAAAAAAAAAAAAAAAAeAAAAaAAAAAAAAAAAAAAAAAAAAAAAAAAAAAAAECcAABAnAAAAAAAAAAAAAAAAAAAAAAAAAAAAAAAAAAAAAAAAAAAAABQAAAAAAAAAwMD/AAAAAABkAAAAMgAAAAAAAABkAAAAAAAAAH9/fwAKAAAAHwAAAFQAAAAAAAAFAAAAAQAAAAAAAAAAAAAAAAAAAAAAAAAAAAAAAAAAAAAAAAAAAAAAAn9/fwAAAAADzMzMAMDA/wB/f38AAAAAAAAAAAAAAAAAAAAAAAAAAAAhAAAAGAAAABQAAAArBAAA4wsAAA05AADaGwAAEAAAACYAAAAIAAAAvZAAAP8fAAA="/>
               </a:ext>
             </a:extLst>
           </p:cNvSpPr>
@@ -8602,7 +8607,7 @@
             <a:spLocks noGrp="1" noChangeArrowheads="1"/>
             <a:extLst>
               <a:ext uri="smNativeData">
-                <pr:smNativeData xmlns="" xmlns:p14="http://schemas.microsoft.com/office/powerpoint/2010/main" xmlns:pr="smNativeData" val="SMDATA_13_w78LXxMAAAAlAAAAZAAAAA0AAAAAkAAAAJAAAACQAAAAkAAAAAAAAAAAAAAAAAAAAAEAAABQAAAAAAAAAAAA4D8AAAAAAADgPwAAAAAAAOA/AAAAAAAA4D8AAAAAAADgPwAAAAAAAOA/AAAAAAAA4D8AAAAAAADgPwAAAAAAAOA/AAAAAAAA4D8CAAAAjAAAAAAAAAAAAAAAkMImDP///wgAAAAAAAAAAAAAAAAAAAAAAAAAAAAAAAAAAAAAZAAAAAEAAABAAAAAAAAAAAAAAAAAAAAAAAAAAAAAAAAAAAAAAAAAAAAAAAAAAAAAAAAAAAAAAAAAAAAAAAAAAAAAAAAAAAAAAAAAAAAAAAAAAAAAAAAAAAAAAAAAAAAAFAAAADwAAAAAAAAAAAAAAAAAAAkUAAAAAQAAABQAAAAUAAAAFAAAAAEAAAAAAAAAZAAAAGQAAAAAAAAAZAAAAGQAAAAVAAAAYAAAAAAAAAAAAAAADwAAACADAAAAAAAAAAAAAAEAAACgMgAAVgcAAKr4//8BAAAAf39/AAEAAABkAAAAAAAAABQAAABAHwAAAAAAACYAAAAAAAAAwOD//wAAAAAmAAAAZAAAABYAAABMAAAAAAAAAAAAAAAEAAAAAAAAAAEAAAAsPEMKAAAAACgAAAAoAAAAZAAAAGQAAAAAAAAAzMzMAAAAAABQAAAAUAAAAGQAAABkAAAAAAAAABcAAAAUAAAAAAAAAAAAAAD/fwAA/38AAAAAAAAJAAAABAAAAAAAAAAMAAAAEAAAAAAAAAAAAAAAAAAAAAAAAAAeAAAAaAAAAAAAAAAAAAAAAAAAAAAAAAAAAAAAECcAABAnAAAAAAAAAAAAAAAAAAAAAAAAAAAAAAAAAAAAAAAAAAAAABQAAAAAAAAAwMD/AAAAAABkAAAAMgAAAAAAAABkAAAAAAAAAH9/fwAKAAAAHwAAAFQAAAAAAAAFAAAAAQAAAAAAAAAAAAAAAAAAAAAAAAAAAAAAAAAAAAAAAAAAAAAAAn9/fwAAAAADzMzMAMDA/wB/f38AAAAAAAAAAAAAAAAAAAAAAAAAAAAhAAAAGAAAABQAAAArBAAA2hsAAA05AAAqJQAAEAAAACYAAAAIAAAAPZAAAP8fAAA="/>
+                <pr:smNativeData xmlns:pr="smNativeData" xmlns:p14="http://schemas.microsoft.com/office/powerpoint/2010/main" xmlns="" val="SMDATA_13_w78LXxMAAAAlAAAAZAAAAA0AAAAAkAAAAJAAAACQAAAAkAAAAAAAAAAAAAAAAAAAAAEAAABQAAAAAAAAAAAA4D8AAAAAAADgPwAAAAAAAOA/AAAAAAAA4D8AAAAAAADgPwAAAAAAAOA/AAAAAAAA4D8AAAAAAADgPwAAAAAAAOA/AAAAAAAA4D8CAAAAjAAAAAAAAAAAAAAAkMImDP///wgAAAAAAAAAAAAAAAAAAAAAAAAAAAAAAAAAAAAAZAAAAAEAAABAAAAAAAAAAAAAAAAAAAAAAAAAAAAAAAAAAAAAAAAAAAAAAAAAAAAAAAAAAAAAAAAAAAAAAAAAAAAAAAAAAAAAAAAAAAAAAAAAAAAAAAAAAAAAAAAAAAAAFAAAADwAAAAAAAAAAAAAAAAAAAkUAAAAAQAAABQAAAAUAAAAFAAAAAEAAAAAAAAAZAAAAGQAAAAAAAAAZAAAAGQAAAAVAAAAYAAAAAAAAAAAAAAADwAAACADAAAAAAAAAAAAAAEAAACgMgAAVgcAAKr4//8BAAAAf39/AAEAAABkAAAAAAAAABQAAABAHwAAAAAAACYAAAAAAAAAwOD//wAAAAAmAAAAZAAAABYAAABMAAAAAAAAAAAAAAAEAAAAAAAAAAEAAAAsPEMKAAAAACgAAAAoAAAAZAAAAGQAAAAAAAAAzMzMAAAAAABQAAAAUAAAAGQAAABkAAAAAAAAABcAAAAUAAAAAAAAAAAAAAD/fwAA/38AAAAAAAAJAAAABAAAAAAAAAAMAAAAEAAAAAAAAAAAAAAAAAAAAAAAAAAeAAAAaAAAAAAAAAAAAAAAAAAAAAAAAAAAAAAAECcAABAnAAAAAAAAAAAAAAAAAAAAAAAAAAAAAAAAAAAAAAAAAAAAABQAAAAAAAAAwMD/AAAAAABkAAAAMgAAAAAAAABkAAAAAAAAAH9/fwAKAAAAHwAAAFQAAAAAAAAFAAAAAQAAAAAAAAAAAAAAAAAAAAAAAAAAAAAAAAAAAAAAAAAAAAAAAn9/fwAAAAADzMzMAMDA/wB/f38AAAAAAAAAAAAAAAAAAAAAAAAAAAAhAAAAGAAAABQAAAArBAAA2hsAAA05AAAqJQAAEAAAACYAAAAIAAAAPZAAAP8fAAA="/>
               </a:ext>
             </a:extLst>
           </p:cNvSpPr>
@@ -8793,7 +8798,7 @@
             <a:spLocks noGrp="1" noChangeArrowheads="1"/>
             <a:extLst>
               <a:ext uri="smNativeData">
-                <pr:smNativeData xmlns="" xmlns:p14="http://schemas.microsoft.com/office/powerpoint/2010/main" xmlns:pr="smNativeData" val="SMDATA_13_w78LXxMAAAAlAAAAZAAAAA0AAAAAkAAAAJAAAACQAAAAkAAAAAAAAAABAAAAAAAAAAEAAABQAAAAAAAAAAAA4D8AAAAAAADgPwAAAAAAAOA/AAAAAAAA4D8AAAAAAADgPwAAAAAAAOA/AAAAAAAA4D8AAAAAAADgPwAAAAAAAOA/AAAAAAAA4D8CAAAAjAAAAAAAAAAAAAAAkMImDP///wgAAAAAAAAAAAAAAAAAAAAAAAAAAAAAAAAAAAAAZAAAAAEAAABAAAAAAAAAAAAAAAAAAAAAAAAAAAAAAAAAAAAAAAAAAAAAAAAAAAAAAAAAAAAAAAAAAAAAAAAAAAAAAAAAAAAAAAAAAAAAAAAAAAAAAAAAAAAAAAAAAAAAFAAAADwAAAAAAAAAAAAAAAAAAAkUAAAAAQAAABQAAAAUAAAAFAAAAAEAAAAAAAAAZAAAAGQAAAAAAAAAZAAAAGQAAAAVAAAAYAAAAAAAAAAAAAAADwAAACADAAAAAAAAAAAAAAEAAACgMgAAVgcAAKr4//8BAAAAf39/AAEAAABkAAAAAAAAABQAAABAHwAAAAAAACYAAAAAAAAAwOD//wAAAAAmAAAAZAAAABYAAABMAAAAAAAAAAAAAAAEAAAAAAAAAAEAAAAsPEMKAAAAACgAAAAoAAAAZAAAAGQAAAAAAAAAzMzMAAAAAABQAAAAUAAAAGQAAABkAAAAAAAAABcAAAAUAAAAAAAAAAAAAAD/fwAA/38AAAAAAAAJAAAABAAAAAAAAAAMAAAAEAAAAAAAAAAAAAAAAAAAAAAAAAAeAAAAaAAAAAAAAAAAAAAAAAAAAAAAAAAAAAAAECcAABAnAAAAAAAAAAAAAAAAAAAAAAAAAAAAAAAAAAAAAAAAAAAAABQAAAAAAAAAwMD/AAAAAABkAAAAMgAAAAAAAABkAAAAAAAAAH9/fwAKAAAAHwAAAFQAAAAAAAAFAAAAAQAAAAAAAAAAAAAAAAAAAAAAAAAAAAAAAAAAAAAAAAAAAAAAAn9/fwAAAAADzMzMAMDA/wB/f38AAAAAAAAAAAAAAAAAAAAAAAAAAAAhAAAAGAAAABQAAABTLAAAKiUAAO8xAABpJwAAEAAAACYAAAAIAAAAPJAAAP8fAAA="/>
+                <pr:smNativeData xmlns:pr="smNativeData" xmlns:p14="http://schemas.microsoft.com/office/powerpoint/2010/main" xmlns="" val="SMDATA_13_w78LXxMAAAAlAAAAZAAAAA0AAAAAkAAAAJAAAACQAAAAkAAAAAAAAAABAAAAAAAAAAEAAABQAAAAAAAAAAAA4D8AAAAAAADgPwAAAAAAAOA/AAAAAAAA4D8AAAAAAADgPwAAAAAAAOA/AAAAAAAA4D8AAAAAAADgPwAAAAAAAOA/AAAAAAAA4D8CAAAAjAAAAAAAAAAAAAAAkMImDP///wgAAAAAAAAAAAAAAAAAAAAAAAAAAAAAAAAAAAAAZAAAAAEAAABAAAAAAAAAAAAAAAAAAAAAAAAAAAAAAAAAAAAAAAAAAAAAAAAAAAAAAAAAAAAAAAAAAAAAAAAAAAAAAAAAAAAAAAAAAAAAAAAAAAAAAAAAAAAAAAAAAAAAFAAAADwAAAAAAAAAAAAAAAAAAAkUAAAAAQAAABQAAAAUAAAAFAAAAAEAAAAAAAAAZAAAAGQAAAAAAAAAZAAAAGQAAAAVAAAAYAAAAAAAAAAAAAAADwAAACADAAAAAAAAAAAAAAEAAACgMgAAVgcAAKr4//8BAAAAf39/AAEAAABkAAAAAAAAABQAAABAHwAAAAAAACYAAAAAAAAAwOD//wAAAAAmAAAAZAAAABYAAABMAAAAAAAAAAAAAAAEAAAAAAAAAAEAAAAsPEMKAAAAACgAAAAoAAAAZAAAAGQAAAAAAAAAzMzMAAAAAABQAAAAUAAAAGQAAABkAAAAAAAAABcAAAAUAAAAAAAAAAAAAAD/fwAA/38AAAAAAAAJAAAABAAAAAAAAAAMAAAAEAAAAAAAAAAAAAAAAAAAAAAAAAAeAAAAaAAAAAAAAAAAAAAAAAAAAAAAAAAAAAAAECcAABAnAAAAAAAAAAAAAAAAAAAAAAAAAAAAAAAAAAAAAAAAAAAAABQAAAAAAAAAwMD/AAAAAABkAAAAMgAAAAAAAABkAAAAAAAAAH9/fwAKAAAAHwAAAFQAAAAAAAAFAAAAAQAAAAAAAAAAAAAAAAAAAAAAAAAAAAAAAAAAAAAAAAAAAAAAAn9/fwAAAAADzMzMAMDA/wB/f38AAAAAAAAAAAAAAAAAAAAAAAAAAAAhAAAAGAAAABQAAABTLAAAKiUAAO8xAABpJwAAEAAAACYAAAAIAAAAPJAAAP8fAAA="/>
               </a:ext>
             </a:extLst>
           </p:cNvSpPr>
@@ -8980,7 +8985,7 @@
             <a:spLocks noGrp="1" noChangeArrowheads="1"/>
             <a:extLst>
               <a:ext uri="smNativeData">
-                <pr:smNativeData xmlns="" xmlns:p14="http://schemas.microsoft.com/office/powerpoint/2010/main" xmlns:pr="smNativeData" val="SMDATA_13_w78LXxMAAAAlAAAAZAAAAA0AAAAAkAAAAJAAAACQAAAAkAAAAAAAAAABAAAAAAAAAAEAAABQAAAAAAAAAAAA4D8AAAAAAADgPwAAAAAAAOA/AAAAAAAA4D8AAAAAAADgPwAAAAAAAOA/AAAAAAAA4D8AAAAAAADgPwAAAAAAAOA/AAAAAAAA4D8CAAAAjAAAAAAAAAAAAAAAkMImDP///wgAAAAAAAAAAAAAAAAAAAAAAAAAAAAAAAAAAAAAZAAAAAEAAABAAAAAAAAAAAAAAAAAAAAAAAAAAAAAAAAAAAAAAAAAAAAAAAAAAAAAAAAAAAAAAAAAAAAAAAAAAAAAAAAAAAAAAAAAAAAAAAAAAAAAAAAAAAAAAAAAAAAAFAAAADwAAAAAAAAAAAAAAAAAAAkUAAAAAQAAABQAAAAUAAAAFAAAAAEAAAAAAAAAZAAAAGQAAAAAAAAAZAAAAGQAAAAVAAAAYAAAAAAAAAAAAAAADwAAACADAAAAAAAAAAAAAAEAAACgMgAAVgcAAKr4//8BAAAAf39/AAEAAABkAAAAAAAAABQAAABAHwAAAAAAACYAAAAAAAAAwOD//wAAAAAmAAAAZAAAABYAAABMAAAAAAAAAAAAAAAEAAAAAAAAAAEAAAAsPEMKAAAAACgAAAAoAAAAZAAAAGQAAAAAAAAAzMzMAAAAAABQAAAAUAAAAGQAAABkAAAAAAAAABcAAAAUAAAAAAAAAAAAAAD/fwAA/38AAAAAAAAJAAAABAAAAAAAAAAMAAAAEAAAAAAAAAAAAAAAAAAAAAAAAAAeAAAAaAAAAAAAAAAAAAAAAAAAAAAAAAAAAAAAECcAABAnAAAAAAAAAAAAAAAAAAAAAAAAAAAAAAAAAAAAAAAAAAAAABQAAAAAAAAAwMD/AAAAAABkAAAAMgAAAAAAAABkAAAAAAAAAH9/fwAKAAAAHwAAAFQAAAAAAAAFAAAAAQAAAAAAAAAAAAAAAAAAAAAAAAAAAAAAAAAAAAAAAAAAAAAAAn9/fwAAAAADzMzMAMDA/wB/f38AAAAAAAAAAAAAAAAAAAAAAAAAAAAhAAAAGAAAABQAAAArBAAAKiUAAOgqAABpJwAAEAAAACYAAAAIAAAAPJAAAP8fAAA="/>
+                <pr:smNativeData xmlns:pr="smNativeData" xmlns:p14="http://schemas.microsoft.com/office/powerpoint/2010/main" xmlns="" val="SMDATA_13_w78LXxMAAAAlAAAAZAAAAA0AAAAAkAAAAJAAAACQAAAAkAAAAAAAAAABAAAAAAAAAAEAAABQAAAAAAAAAAAA4D8AAAAAAADgPwAAAAAAAOA/AAAAAAAA4D8AAAAAAADgPwAAAAAAAOA/AAAAAAAA4D8AAAAAAADgPwAAAAAAAOA/AAAAAAAA4D8CAAAAjAAAAAAAAAAAAAAAkMImDP///wgAAAAAAAAAAAAAAAAAAAAAAAAAAAAAAAAAAAAAZAAAAAEAAABAAAAAAAAAAAAAAAAAAAAAAAAAAAAAAAAAAAAAAAAAAAAAAAAAAAAAAAAAAAAAAAAAAAAAAAAAAAAAAAAAAAAAAAAAAAAAAAAAAAAAAAAAAAAAAAAAAAAAFAAAADwAAAAAAAAAAAAAAAAAAAkUAAAAAQAAABQAAAAUAAAAFAAAAAEAAAAAAAAAZAAAAGQAAAAAAAAAZAAAAGQAAAAVAAAAYAAAAAAAAAAAAAAADwAAACADAAAAAAAAAAAAAAEAAACgMgAAVgcAAKr4//8BAAAAf39/AAEAAABkAAAAAAAAABQAAABAHwAAAAAAACYAAAAAAAAAwOD//wAAAAAmAAAAZAAAABYAAABMAAAAAAAAAAAAAAAEAAAAAAAAAAEAAAAsPEMKAAAAACgAAAAoAAAAZAAAAGQAAAAAAAAAzMzMAAAAAABQAAAAUAAAAGQAAABkAAAAAAAAABcAAAAUAAAAAAAAAAAAAAD/fwAA/38AAAAAAAAJAAAABAAAAAAAAAAMAAAAEAAAAAAAAAAAAAAAAAAAAAAAAAAeAAAAaAAAAAAAAAAAAAAAAAAAAAAAAAAAAAAAECcAABAnAAAAAAAAAAAAAAAAAAAAAAAAAAAAAAAAAAAAAAAAAAAAABQAAAAAAAAAwMD/AAAAAABkAAAAMgAAAAAAAABkAAAAAAAAAH9/fwAKAAAAHwAAAFQAAAAAAAAFAAAAAQAAAAAAAAAAAAAAAAAAAAAAAAAAAAAAAAAAAAAAAAAAAAAAAn9/fwAAAAADzMzMAMDA/wB/f38AAAAAAAAAAAAAAAAAAAAAAAAAAAAhAAAAGAAAABQAAAArBAAAKiUAAOgqAABpJwAAEAAAACYAAAAIAAAAPJAAAP8fAAA="/>
               </a:ext>
             </a:extLst>
           </p:cNvSpPr>
@@ -9167,7 +9172,7 @@
             <a:spLocks noGrp="1" noChangeArrowheads="1"/>
             <a:extLst>
               <a:ext uri="smNativeData">
-                <pr:smNativeData xmlns="" xmlns:p14="http://schemas.microsoft.com/office/powerpoint/2010/main" xmlns:pr="smNativeData" val="SMDATA_13_w78LXxMAAAAlAAAAZAAAAA0AAAAAkAAAAEgAAACQAAAASAAAAAAAAAABAAAAAAAAAAEAAABQAAAAAAAAAAAA4D8AAAAAAADgPwAAAAAAAOA/AAAAAAAA4D8AAAAAAADgPwAAAAAAAOA/AAAAAAAA4D8AAAAAAADgPwAAAAAAAOA/AAAAAAAA4D8CAAAAjAAAAAAAAAAAAAAAkMImDP///wgAAAAAAAAAAAAAAAAAAAAAAAAAAAAAAAAAAAAAZAAAAAEAAABAAAAAAAAAAAAAAAAAAAAAAAAAAAAAAAAAAAAAAAAAAAAAAAAAAAAAAAAAAAAAAAAAAAAAAAAAAAAAAAAAAAAAAAAAAAAAAAAAAAAAAAAAAAAAAAAAAAAAFAAAADwAAAAAAAAAAAAAAAAAAAkUAAAAAQAAABQAAAAUAAAAFAAAAAEAAAAAAAAAZAAAAGQAAAAAAAAAZAAAAGQAAAAVAAAAYAAAAAAAAAAAAAAADwAAACADAAAAAAAAAAAAAAEAAACgMgAAVgcAAKr4//8BAAAAf39/AAEAAABkAAAAAAAAABQAAABAHwAAAAAAACYAAAAAAAAAwOD//wAAAAAmAAAAZAAAABYAAABMAAAAAAAAAAAAAAAEAAAAAAAAAAEAAAAsPEMKAAAAACgAAAAoAAAAZAAAAGQAAAAAAAAAzMzMAAAAAABQAAAAUAAAAGQAAABkAAAAAAAAABcAAAAUAAAAAAAAAAAAAAD/fwAA/38AAAAAAAAJAAAABAAAAAAAAAAMAAAAEAAAAAAAAAAAAAAAAAAAAAAAAAAeAAAAaAAAAAAAAAAAAAAAAAAAAAAAAAAAAAAAECcAABAnAAAAAAAAAAAAAAAAAAAAAAAAAAAAAAAAAAAAAAAAAAAAABQAAAAAAAAAwMD/AAAAAABkAAAAMgAAAAAAAABkAAAAAAAAAH9/fwAKAAAAHwAAAFQAAAAAAAAFAAAAAQAAAAAAAAAAAAAAAAAAAAAAAAAAAAAAAAAAAAAAAAAAAAAAAn9/fwAAAAADzMzMAMDA/wB/f38AAAAAAAAAAAAAAAAAAAAAAAAAAAAhAAAAGAAAABQAAADZNAAAKiUAAA05AABpJwAAEAAAACYAAAAIAAAAPLAAAP8fAAA="/>
+                <pr:smNativeData xmlns:pr="smNativeData" xmlns:p14="http://schemas.microsoft.com/office/powerpoint/2010/main" xmlns="" val="SMDATA_13_w78LXxMAAAAlAAAAZAAAAA0AAAAAkAAAAEgAAACQAAAASAAAAAAAAAABAAAAAAAAAAEAAABQAAAAAAAAAAAA4D8AAAAAAADgPwAAAAAAAOA/AAAAAAAA4D8AAAAAAADgPwAAAAAAAOA/AAAAAAAA4D8AAAAAAADgPwAAAAAAAOA/AAAAAAAA4D8CAAAAjAAAAAAAAAAAAAAAkMImDP///wgAAAAAAAAAAAAAAAAAAAAAAAAAAAAAAAAAAAAAZAAAAAEAAABAAAAAAAAAAAAAAAAAAAAAAAAAAAAAAAAAAAAAAAAAAAAAAAAAAAAAAAAAAAAAAAAAAAAAAAAAAAAAAAAAAAAAAAAAAAAAAAAAAAAAAAAAAAAAAAAAAAAAFAAAADwAAAAAAAAAAAAAAAAAAAkUAAAAAQAAABQAAAAUAAAAFAAAAAEAAAAAAAAAZAAAAGQAAAAAAAAAZAAAAGQAAAAVAAAAYAAAAAAAAAAAAAAADwAAACADAAAAAAAAAAAAAAEAAACgMgAAVgcAAKr4//8BAAAAf39/AAEAAABkAAAAAAAAABQAAABAHwAAAAAAACYAAAAAAAAAwOD//wAAAAAmAAAAZAAAABYAAABMAAAAAAAAAAAAAAAEAAAAAAAAAAEAAAAsPEMKAAAAACgAAAAoAAAAZAAAAGQAAAAAAAAAzMzMAAAAAABQAAAAUAAAAGQAAABkAAAAAAAAABcAAAAUAAAAAAAAAAAAAAD/fwAA/38AAAAAAAAJAAAABAAAAAAAAAAMAAAAEAAAAAAAAAAAAAAAAAAAAAAAAAAeAAAAaAAAAAAAAAAAAAAAAAAAAAAAAAAAAAAAECcAABAnAAAAAAAAAAAAAAAAAAAAAAAAAAAAAAAAAAAAAAAAAAAAABQAAAAAAAAAwMD/AAAAAABkAAAAMgAAAAAAAABkAAAAAAAAAH9/fwAKAAAAHwAAAFQAAAAAAAAFAAAAAQAAAAAAAAAAAAAAAAAAAAAAAAAAAAAAAAAAAAAAAAAAAAAAAn9/fwAAAAADzMzMAMDA/wB/f38AAAAAAAAAAAAAAAAAAAAAAAAAAAAhAAAAGAAAABQAAADZNAAAKiUAAA05AABpJwAAEAAAACYAAAAIAAAAPLAAAP8fAAA="/>
               </a:ext>
             </a:extLst>
           </p:cNvSpPr>
@@ -9359,7 +9364,7 @@
             <a:spLocks noGrp="1" noChangeArrowheads="1"/>
             <a:extLst>
               <a:ext uri="smNativeData">
-                <pr:smNativeData xmlns="" xmlns:p14="http://schemas.microsoft.com/office/powerpoint/2010/main" xmlns:pr="smNativeData" val="SMDATA_13_w78LXxMAAAAlAAAAZAAAAA0AAAAAkAAAAJAAAACQAAAAkAAAAAAAAAABAAAAAAAAAAEAAABQAAAAAAAAAAAA4D8AAAAAAADgPwAAAAAAAOA/AAAAAAAA4D8AAAAAAADgPwAAAAAAAOA/AAAAAAAA4D8AAAAAAADgPwAAAAAAAOA/AAAAAAAA4D8CAAAAjAAAAAAAAAAAAAAAkMImDP///wgAAAAAAAAAAAAAAAAAAAAAAAAAAAAAAAAAAAAAZAAAAAEAAABAAAAAAAAAAAAAAAAAAAAAAAAAAAAAAAAAAAAAAAAAAAAAAAAAAAAAAAAAAAAAAAAAAAAAAAAAAAAAAAAAAAAAAAAAAAAAAAAAAAAAAAAAAAAAAAAAAAAAFAAAADwAAAAAAAAAAAAAAAAAAAkUAAAAAQAAABQAAAAUAAAAFAAAAAEAAAAAAAAAZAAAAGQAAAAAAAAAZAAAAGQAAAAVAAAAYAAAAAAAAAAAAAAADwAAACADAAAAAAAAAAAAAAEAAACgMgAAVgcAAKr4//8BAAAAf39/AAEAAABkAAAAAAAAABQAAABAHwAAAAAAACYAAAAAAAAAwOD//wAAAAAmAAAAZAAAABYAAABMAAAAAAAAAAAAAAAEAAAAAAAAAAEAAAAsPEMKAAAAACgAAAAoAAAAZAAAAGQAAAAAAAAAzMzMAAAAAABQAAAAUAAAAGQAAABkAAAAAAAAABcAAAAUAAAAAAAAAAAAAAD/fwAA/38AAAAAAAAJAAAABAAAAAAAAAAMAAAAEAAAAAAAAAAAAAAAAAAAAAAAAAAeAAAAaAAAAAAAAAAAAAAAAAAAAAAAAAAAAAAAECcAABAnAAAAAAAAAAAAAAAAAAAAAAAAAAAAAAAAAAAAAAAAAAAAABQAAAAAAAAAwMD/AAAAAABkAAAAMgAAAAAAAABkAAAAAAAAAH9/fwAKAAAAHwAAAFQAAAAAAAAFAAAAAQAAAAAAAAAAAAAAAAAAAAAAAAAAAAAAAAAAAAAAAAAAAAAAAn9/fwAAAAADzMzMAMDA/wB/f38AAAAAAAAAAAAAAAAAAAAAAAAAAAAhAAAAGAAAABQAAAC7BQAAwAMAAIU3AABYFgAAEAAAACYAAAAIAAAAvZAAAP8fAAA="/>
+                <pr:smNativeData xmlns:pr="smNativeData" xmlns:p14="http://schemas.microsoft.com/office/powerpoint/2010/main" xmlns="" val="SMDATA_13_w78LXxMAAAAlAAAAZAAAAA0AAAAAkAAAAJAAAACQAAAAkAAAAAAAAAABAAAAAAAAAAEAAABQAAAAAAAAAAAA4D8AAAAAAADgPwAAAAAAAOA/AAAAAAAA4D8AAAAAAADgPwAAAAAAAOA/AAAAAAAA4D8AAAAAAADgPwAAAAAAAOA/AAAAAAAA4D8CAAAAjAAAAAAAAAAAAAAAkMImDP///wgAAAAAAAAAAAAAAAAAAAAAAAAAAAAAAAAAAAAAZAAAAAEAAABAAAAAAAAAAAAAAAAAAAAAAAAAAAAAAAAAAAAAAAAAAAAAAAAAAAAAAAAAAAAAAAAAAAAAAAAAAAAAAAAAAAAAAAAAAAAAAAAAAAAAAAAAAAAAAAAAAAAAFAAAADwAAAAAAAAAAAAAAAAAAAkUAAAAAQAAABQAAAAUAAAAFAAAAAEAAAAAAAAAZAAAAGQAAAAAAAAAZAAAAGQAAAAVAAAAYAAAAAAAAAAAAAAADwAAACADAAAAAAAAAAAAAAEAAACgMgAAVgcAAKr4//8BAAAAf39/AAEAAABkAAAAAAAAABQAAABAHwAAAAAAACYAAAAAAAAAwOD//wAAAAAmAAAAZAAAABYAAABMAAAAAAAAAAAAAAAEAAAAAAAAAAEAAAAsPEMKAAAAACgAAAAoAAAAZAAAAGQAAAAAAAAAzMzMAAAAAABQAAAAUAAAAGQAAABkAAAAAAAAABcAAAAUAAAAAAAAAAAAAAD/fwAA/38AAAAAAAAJAAAABAAAAAAAAAAMAAAAEAAAAAAAAAAAAAAAAAAAAAAAAAAeAAAAaAAAAAAAAAAAAAAAAAAAAAAAAAAAAAAAECcAABAnAAAAAAAAAAAAAAAAAAAAAAAAAAAAAAAAAAAAAAAAAAAAABQAAAAAAAAAwMD/AAAAAABkAAAAMgAAAAAAAABkAAAAAAAAAH9/fwAKAAAAHwAAAFQAAAAAAAAFAAAAAQAAAAAAAAAAAAAAAAAAAAAAAAAAAAAAAAAAAAAAAAAAAAAAAn9/fwAAAAADzMzMAMDA/wB/f38AAAAAAAAAAAAAAAAAAAAAAAAAAAAhAAAAGAAAABQAAAC7BQAAwAMAAIU3AABYFgAAEAAAACYAAAAIAAAAvZAAAP8fAAA="/>
               </a:ext>
             </a:extLst>
           </p:cNvSpPr>
@@ -9526,7 +9531,7 @@
             <a:spLocks noGrp="1" noChangeArrowheads="1"/>
             <a:extLst>
               <a:ext uri="smNativeData">
-                <pr:smNativeData xmlns="" xmlns:p14="http://schemas.microsoft.com/office/powerpoint/2010/main" xmlns:pr="smNativeData" val="SMDATA_13_w78LXxMAAAAlAAAAZAAAAA0AAAAAkAAAAJAAAACQAAAAkAAAAAAAAAACAAAAAAAAAAEAAABQAAAAAAAAAAAA4D8AAAAAAADgPwAAAAAAAOA/AAAAAAAA4D8AAAAAAADgPwAAAAAAAOA/AAAAAAAA4D8AAAAAAADgPwAAAAAAAOA/AAAAAAAA4D8CAAAAjAAAAAAAAAAAAAAAkMImDP///wgAAAAAAAAAAAAAAAAAAAAAAAAAAAAAAAAAAAAAZAAAAAEAAABAAAAAAAAAAAAAAAAAAAAAAAAAAAAAAAAAAAAAAAAAAAAAAAAAAAAAAAAAAAAAAAAAAAAAAAAAAAAAAAAAAAAAAAAAAAAAAAAAAAAAAAAAAAAAAAAAAAAAFAAAADwAAAAAAAAAAAAAAAAAAAkUAAAAAQAAABQAAAAUAAAAFAAAAAEAAAAAAAAAZAAAAGQAAAAAAAAAZAAAAGQAAAAVAAAAYAAAAAAAAAAAAAAADwAAACADAAAAAAAAAAAAAAEAAACgMgAAVgcAAKr4//8BAAAAf39/AAEAAABkAAAAAAAAABQAAABAHwAAAAAAACYAAAAAAAAAwOD//wAAAAAmAAAAZAAAABYAAABMAAAAAAAAAAAAAAAEAAAAAAAAAAEAAAAsPEMKAAAAACgAAAAoAAAAZAAAAGQAAAAAAAAAzMzMAAAAAABQAAAAUAAAAGQAAABkAAAAAAAAABcAAAAUAAAAAAAAAAAAAAD/fwAA/38AAAAAAAAJAAAABAAAAAAAAAAMAAAAEAAAAAAAAAAAAAAAAAAAAAAAAAAeAAAAaAAAAAAAAAAAAAAAAAAAAAAAAAAAAAAAECcAABAnAAAAAAAAAAAAAAAAAAAAAAAAAAAAAAAAAAAAAAAAAAAAABQAAAAAAAAAwMD/AAAAAABkAAAAMgAAAAAAAABkAAAAAAAAAH9/fwAKAAAAHwAAAFQAAAAAAAAFAAAAAQAAAAAAAAAAAAAAAAAAAAAAAAAAAAAAAAAAAAAAAAAAAAAAAn9/fwAAAAADzMzMAMDA/wB/f38AAAAAAAAAAAAAAAAAAAAAAAAAAAAhAAAAGAAAABQAAAArBAAAsBgAAA05AADaGwAAEAAAACYAAAAIAAAAvZAAAP8fAAA="/>
+                <pr:smNativeData xmlns:pr="smNativeData" xmlns:p14="http://schemas.microsoft.com/office/powerpoint/2010/main" xmlns="" val="SMDATA_13_w78LXxMAAAAlAAAAZAAAAA0AAAAAkAAAAJAAAACQAAAAkAAAAAAAAAACAAAAAAAAAAEAAABQAAAAAAAAAAAA4D8AAAAAAADgPwAAAAAAAOA/AAAAAAAA4D8AAAAAAADgPwAAAAAAAOA/AAAAAAAA4D8AAAAAAADgPwAAAAAAAOA/AAAAAAAA4D8CAAAAjAAAAAAAAAAAAAAAkMImDP///wgAAAAAAAAAAAAAAAAAAAAAAAAAAAAAAAAAAAAAZAAAAAEAAABAAAAAAAAAAAAAAAAAAAAAAAAAAAAAAAAAAAAAAAAAAAAAAAAAAAAAAAAAAAAAAAAAAAAAAAAAAAAAAAAAAAAAAAAAAAAAAAAAAAAAAAAAAAAAAAAAAAAAFAAAADwAAAAAAAAAAAAAAAAAAAkUAAAAAQAAABQAAAAUAAAAFAAAAAEAAAAAAAAAZAAAAGQAAAAAAAAAZAAAAGQAAAAVAAAAYAAAAAAAAAAAAAAADwAAACADAAAAAAAAAAAAAAEAAACgMgAAVgcAAKr4//8BAAAAf39/AAEAAABkAAAAAAAAABQAAABAHwAAAAAAACYAAAAAAAAAwOD//wAAAAAmAAAAZAAAABYAAABMAAAAAAAAAAAAAAAEAAAAAAAAAAEAAAAsPEMKAAAAACgAAAAoAAAAZAAAAGQAAAAAAAAAzMzMAAAAAABQAAAAUAAAAGQAAABkAAAAAAAAABcAAAAUAAAAAAAAAAAAAAD/fwAA/38AAAAAAAAJAAAABAAAAAAAAAAMAAAAEAAAAAAAAAAAAAAAAAAAAAAAAAAeAAAAaAAAAAAAAAAAAAAAAAAAAAAAAAAAAAAAECcAABAnAAAAAAAAAAAAAAAAAAAAAAAAAAAAAAAAAAAAAAAAAAAAABQAAAAAAAAAwMD/AAAAAABkAAAAMgAAAAAAAABkAAAAAAAAAH9/fwAKAAAAHwAAAFQAAAAAAAAFAAAAAQAAAAAAAAAAAAAAAAAAAAAAAAAAAAAAAAAAAAAAAAAAAAAAAn9/fwAAAAADzMzMAMDA/wB/f38AAAAAAAAAAAAAAAAAAAAAAAAAAAAhAAAAGAAAABQAAAArBAAAsBgAAA05AADaGwAAEAAAACYAAAAIAAAAvZAAAP8fAAA="/>
               </a:ext>
             </a:extLst>
           </p:cNvSpPr>
@@ -9737,7 +9742,7 @@
             <a:spLocks noGrp="1" noChangeArrowheads="1"/>
             <a:extLst>
               <a:ext uri="smNativeData">
-                <pr:smNativeData xmlns="" xmlns:p14="http://schemas.microsoft.com/office/powerpoint/2010/main" xmlns:pr="smNativeData" val="SMDATA_13_w78LXxMAAAAlAAAAZAAAAA0AAAAAkAAAAJAAAACQAAAAkAAAAAAAAAAAAAAAAAAAAAEAAABQAAAAAAAAAAAA4D8AAAAAAADgPwAAAAAAAOA/AAAAAAAA4D8AAAAAAADgPwAAAAAAAOA/AAAAAAAA4D8AAAAAAADgPwAAAAAAAOA/AAAAAAAA4D8CAAAAjAAAAAAAAAAAAAAAkMImDP///wgAAAAAAAAAAAAAAAAAAAAAAAAAAAAAAAAAAAAAZAAAAAEAAABAAAAAAAAAAAAAAAAAAAAAAAAAAAAAAAAAAAAAAAAAAAAAAAAAAAAAAAAAAAAAAAAAAAAAAAAAAAAAAAAAAAAAAAAAAAAAAAAAAAAAAAAAAAAAAAAAAAAAFAAAADwAAAAAAAAAAAAAAAAAAAkUAAAAAQAAABQAAAAUAAAAFAAAAAEAAAAAAAAAZAAAAGQAAAAAAAAAZAAAAGQAAAAVAAAAYAAAAAAAAAAAAAAADwAAACADAAAAAAAAAAAAAAEAAACgMgAAVgcAAKr4//8BAAAAf39/AAEAAABkAAAAAAAAABQAAABAHwAAAAAAACYAAAAAAAAAwOD//wAAAAAmAAAAZAAAABYAAABMAAAAAAAAAAAAAAAEAAAAAAAAAAEAAAAsPEMKAAAAACgAAAAoAAAAZAAAAGQAAAAAAAAAzMzMAAAAAABQAAAAUAAAAGQAAABkAAAAAAAAABcAAAAUAAAAAAAAAAAAAAD/fwAA/38AAAAAAAAJAAAABAAAAAAAAAAMAAAAEAAAAAAAAAAAAAAAAAAAAAAAAAAeAAAAaAAAAAAAAAAAAAAAAAAAAAAAAAAAAAAAECcAABAnAAAAAAAAAAAAAAAAAAAAAAAAAAAAAAAAAAAAAAAAAAAAABQAAAAAAAAAwMD/AAAAAABkAAAAMgAAAAAAAABkAAAAAAAAAH9/fwAKAAAAHwAAAFQAAAAAAAAFAAAAAQAAAAAAAAAAAAAAAAAAAAAAAAAAAAAAAAAAAAAAAAAAAAAAAn9/fwAAAAADzMzMAMDA/wB/f38AAAAAAAAAAAAAAAAAAAAAAAAAAAAhAAAAGAAAABQAAAArBAAA2hsAAA05AAAqJQAAEAAAACYAAAAIAAAAPZAAAP8fAAA="/>
+                <pr:smNativeData xmlns:pr="smNativeData" xmlns:p14="http://schemas.microsoft.com/office/powerpoint/2010/main" xmlns="" val="SMDATA_13_w78LXxMAAAAlAAAAZAAAAA0AAAAAkAAAAJAAAACQAAAAkAAAAAAAAAAAAAAAAAAAAAEAAABQAAAAAAAAAAAA4D8AAAAAAADgPwAAAAAAAOA/AAAAAAAA4D8AAAAAAADgPwAAAAAAAOA/AAAAAAAA4D8AAAAAAADgPwAAAAAAAOA/AAAAAAAA4D8CAAAAjAAAAAAAAAAAAAAAkMImDP///wgAAAAAAAAAAAAAAAAAAAAAAAAAAAAAAAAAAAAAZAAAAAEAAABAAAAAAAAAAAAAAAAAAAAAAAAAAAAAAAAAAAAAAAAAAAAAAAAAAAAAAAAAAAAAAAAAAAAAAAAAAAAAAAAAAAAAAAAAAAAAAAAAAAAAAAAAAAAAAAAAAAAAFAAAADwAAAAAAAAAAAAAAAAAAAkUAAAAAQAAABQAAAAUAAAAFAAAAAEAAAAAAAAAZAAAAGQAAAAAAAAAZAAAAGQAAAAVAAAAYAAAAAAAAAAAAAAADwAAACADAAAAAAAAAAAAAAEAAACgMgAAVgcAAKr4//8BAAAAf39/AAEAAABkAAAAAAAAABQAAABAHwAAAAAAACYAAAAAAAAAwOD//wAAAAAmAAAAZAAAABYAAABMAAAAAAAAAAAAAAAEAAAAAAAAAAEAAAAsPEMKAAAAACgAAAAoAAAAZAAAAGQAAAAAAAAAzMzMAAAAAABQAAAAUAAAAGQAAABkAAAAAAAAABcAAAAUAAAAAAAAAAAAAAD/fwAA/38AAAAAAAAJAAAABAAAAAAAAAAMAAAAEAAAAAAAAAAAAAAAAAAAAAAAAAAeAAAAaAAAAAAAAAAAAAAAAAAAAAAAAAAAAAAAECcAABAnAAAAAAAAAAAAAAAAAAAAAAAAAAAAAAAAAAAAAAAAAAAAABQAAAAAAAAAwMD/AAAAAABkAAAAMgAAAAAAAABkAAAAAAAAAH9/fwAKAAAAHwAAAFQAAAAAAAAFAAAAAQAAAAAAAAAAAAAAAAAAAAAAAAAAAAAAAAAAAAAAAAAAAAAAAn9/fwAAAAADzMzMAMDA/wB/f38AAAAAAAAAAAAAAAAAAAAAAAAAAAAhAAAAGAAAABQAAAArBAAA2hsAAA05AAAqJQAAEAAAACYAAAAIAAAAPZAAAP8fAAA="/>
               </a:ext>
             </a:extLst>
           </p:cNvSpPr>
@@ -9928,7 +9933,7 @@
             <a:spLocks noGrp="1" noChangeArrowheads="1"/>
             <a:extLst>
               <a:ext uri="smNativeData">
-                <pr:smNativeData xmlns="" xmlns:p14="http://schemas.microsoft.com/office/powerpoint/2010/main" xmlns:pr="smNativeData" val="SMDATA_13_w78LXxMAAAAlAAAAZAAAAA0AAAAAkAAAAJAAAACQAAAAkAAAAAAAAAABAAAAAAAAAAEAAABQAAAAAAAAAAAA4D8AAAAAAADgPwAAAAAAAOA/AAAAAAAA4D8AAAAAAADgPwAAAAAAAOA/AAAAAAAA4D8AAAAAAADgPwAAAAAAAOA/AAAAAAAA4D8CAAAAjAAAAAAAAAAAAAAAkMImDP///wgAAAAAAAAAAAAAAAAAAAAAAAAAAAAAAAAAAAAAZAAAAAEAAABAAAAAAAAAAAAAAAAAAAAAAAAAAAAAAAAAAAAAAAAAAAAAAAAAAAAAAAAAAAAAAAAAAAAAAAAAAAAAAAAAAAAAAAAAAAAAAAAAAAAAAAAAAAAAAAAAAAAAFAAAADwAAAAAAAAAAAAAAAAAAAkUAAAAAQAAABQAAAAUAAAAFAAAAAEAAAAAAAAAZAAAAGQAAAAAAAAAZAAAAGQAAAAVAAAAYAAAAAAAAAAAAAAADwAAACADAAAAAAAAAAAAAAEAAACgMgAAVgcAAKr4//8BAAAAf39/AAEAAABkAAAAAAAAABQAAABAHwAAAAAAACYAAAAAAAAAwOD//wAAAAAmAAAAZAAAABYAAABMAAAAAAAAAAAAAAAEAAAAAAAAAAEAAAAsPEMKAAAAACgAAAAoAAAAZAAAAGQAAAAAAAAAzMzMAAAAAABQAAAAUAAAAGQAAABkAAAAAAAAABcAAAAUAAAAAAAAAAAAAAD/fwAA/38AAAAAAAAJAAAABAAAAAAAAAAMAAAAEAAAAAAAAAAAAAAAAAAAAAAAAAAeAAAAaAAAAAAAAAAAAAAAAAAAAAAAAAAAAAAAECcAABAnAAAAAAAAAAAAAAAAAAAAAAAAAAAAAAAAAAAAAAAAAAAAABQAAAAAAAAAwMD/AAAAAABkAAAAMgAAAAAAAABkAAAAAAAAAH9/fwAKAAAAHwAAAFQAAAAAAAAFAAAAAQAAAAAAAAAAAAAAAAAAAAAAAAAAAAAAAAAAAAAAAAAAAAAAAn9/fwAAAAADzMzMAMDA/wB/f38AAAAAAAAAAAAAAAAAAAAAAAAAAAAhAAAAGAAAABQAAABTLAAAKiUAAO8xAABpJwAAEAAAACYAAAAIAAAAPJAAAP8fAAA="/>
+                <pr:smNativeData xmlns:pr="smNativeData" xmlns:p14="http://schemas.microsoft.com/office/powerpoint/2010/main" xmlns="" val="SMDATA_13_w78LXxMAAAAlAAAAZAAAAA0AAAAAkAAAAJAAAACQAAAAkAAAAAAAAAABAAAAAAAAAAEAAABQAAAAAAAAAAAA4D8AAAAAAADgPwAAAAAAAOA/AAAAAAAA4D8AAAAAAADgPwAAAAAAAOA/AAAAAAAA4D8AAAAAAADgPwAAAAAAAOA/AAAAAAAA4D8CAAAAjAAAAAAAAAAAAAAAkMImDP///wgAAAAAAAAAAAAAAAAAAAAAAAAAAAAAAAAAAAAAZAAAAAEAAABAAAAAAAAAAAAAAAAAAAAAAAAAAAAAAAAAAAAAAAAAAAAAAAAAAAAAAAAAAAAAAAAAAAAAAAAAAAAAAAAAAAAAAAAAAAAAAAAAAAAAAAAAAAAAAAAAAAAAFAAAADwAAAAAAAAAAAAAAAAAAAkUAAAAAQAAABQAAAAUAAAAFAAAAAEAAAAAAAAAZAAAAGQAAAAAAAAAZAAAAGQAAAAVAAAAYAAAAAAAAAAAAAAADwAAACADAAAAAAAAAAAAAAEAAACgMgAAVgcAAKr4//8BAAAAf39/AAEAAABkAAAAAAAAABQAAABAHwAAAAAAACYAAAAAAAAAwOD//wAAAAAmAAAAZAAAABYAAABMAAAAAAAAAAAAAAAEAAAAAAAAAAEAAAAsPEMKAAAAACgAAAAoAAAAZAAAAGQAAAAAAAAAzMzMAAAAAABQAAAAUAAAAGQAAABkAAAAAAAAABcAAAAUAAAAAAAAAAAAAAD/fwAA/38AAAAAAAAJAAAABAAAAAAAAAAMAAAAEAAAAAAAAAAAAAAAAAAAAAAAAAAeAAAAaAAAAAAAAAAAAAAAAAAAAAAAAAAAAAAAECcAABAnAAAAAAAAAAAAAAAAAAAAAAAAAAAAAAAAAAAAAAAAAAAAABQAAAAAAAAAwMD/AAAAAABkAAAAMgAAAAAAAABkAAAAAAAAAH9/fwAKAAAAHwAAAFQAAAAAAAAFAAAAAQAAAAAAAAAAAAAAAAAAAAAAAAAAAAAAAAAAAAAAAAAAAAAAAn9/fwAAAAADzMzMAMDA/wB/f38AAAAAAAAAAAAAAAAAAAAAAAAAAAAhAAAAGAAAABQAAABTLAAAKiUAAO8xAABpJwAAEAAAACYAAAAIAAAAPJAAAP8fAAA="/>
               </a:ext>
             </a:extLst>
           </p:cNvSpPr>
@@ -10115,7 +10120,7 @@
             <a:spLocks noGrp="1" noChangeArrowheads="1"/>
             <a:extLst>
               <a:ext uri="smNativeData">
-                <pr:smNativeData xmlns="" xmlns:p14="http://schemas.microsoft.com/office/powerpoint/2010/main" xmlns:pr="smNativeData" val="SMDATA_13_w78LXxMAAAAlAAAAZAAAAA0AAAAAkAAAAJAAAACQAAAAkAAAAAAAAAABAAAAAAAAAAEAAABQAAAAAAAAAAAA4D8AAAAAAADgPwAAAAAAAOA/AAAAAAAA4D8AAAAAAADgPwAAAAAAAOA/AAAAAAAA4D8AAAAAAADgPwAAAAAAAOA/AAAAAAAA4D8CAAAAjAAAAAAAAAAAAAAAkMImDP///wgAAAAAAAAAAAAAAAAAAAAAAAAAAAAAAAAAAAAAZAAAAAEAAABAAAAAAAAAAAAAAAAAAAAAAAAAAAAAAAAAAAAAAAAAAAAAAAAAAAAAAAAAAAAAAAAAAAAAAAAAAAAAAAAAAAAAAAAAAAAAAAAAAAAAAAAAAAAAAAAAAAAAFAAAADwAAAAAAAAAAAAAAAAAAAkUAAAAAQAAABQAAAAUAAAAFAAAAAEAAAAAAAAAZAAAAGQAAAAAAAAAZAAAAGQAAAAVAAAAYAAAAAAAAAAAAAAADwAAACADAAAAAAAAAAAAAAEAAACgMgAAVgcAAKr4//8BAAAAf39/AAEAAABkAAAAAAAAABQAAABAHwAAAAAAACYAAAAAAAAAwOD//wAAAAAmAAAAZAAAABYAAABMAAAAAAAAAAAAAAAEAAAAAAAAAAEAAAAsPEMKAAAAACgAAAAoAAAAZAAAAGQAAAAAAAAAzMzMAAAAAABQAAAAUAAAAGQAAABkAAAAAAAAABcAAAAUAAAAAAAAAAAAAAD/fwAA/38AAAAAAAAJAAAABAAAAAAAAAAMAAAAEAAAAAAAAAAAAAAAAAAAAAAAAAAeAAAAaAAAAAAAAAAAAAAAAAAAAAAAAAAAAAAAECcAABAnAAAAAAAAAAAAAAAAAAAAAAAAAAAAAAAAAAAAAAAAAAAAABQAAAAAAAAAwMD/AAAAAABkAAAAMgAAAAAAAABkAAAAAAAAAH9/fwAKAAAAHwAAAFQAAAAAAAAFAAAAAQAAAAAAAAAAAAAAAAAAAAAAAAAAAAAAAAAAAAAAAAAAAAAAAn9/fwAAAAADzMzMAMDA/wB/f38AAAAAAAAAAAAAAAAAAAAAAAAAAAAhAAAAGAAAABQAAAArBAAAKiUAAOgqAABpJwAAEAAAACYAAAAIAAAAPJAAAP8fAAA="/>
+                <pr:smNativeData xmlns:pr="smNativeData" xmlns:p14="http://schemas.microsoft.com/office/powerpoint/2010/main" xmlns="" val="SMDATA_13_w78LXxMAAAAlAAAAZAAAAA0AAAAAkAAAAJAAAACQAAAAkAAAAAAAAAABAAAAAAAAAAEAAABQAAAAAAAAAAAA4D8AAAAAAADgPwAAAAAAAOA/AAAAAAAA4D8AAAAAAADgPwAAAAAAAOA/AAAAAAAA4D8AAAAAAADgPwAAAAAAAOA/AAAAAAAA4D8CAAAAjAAAAAAAAAAAAAAAkMImDP///wgAAAAAAAAAAAAAAAAAAAAAAAAAAAAAAAAAAAAAZAAAAAEAAABAAAAAAAAAAAAAAAAAAAAAAAAAAAAAAAAAAAAAAAAAAAAAAAAAAAAAAAAAAAAAAAAAAAAAAAAAAAAAAAAAAAAAAAAAAAAAAAAAAAAAAAAAAAAAAAAAAAAAFAAAADwAAAAAAAAAAAAAAAAAAAkUAAAAAQAAABQAAAAUAAAAFAAAAAEAAAAAAAAAZAAAAGQAAAAAAAAAZAAAAGQAAAAVAAAAYAAAAAAAAAAAAAAADwAAACADAAAAAAAAAAAAAAEAAACgMgAAVgcAAKr4//8BAAAAf39/AAEAAABkAAAAAAAAABQAAABAHwAAAAAAACYAAAAAAAAAwOD//wAAAAAmAAAAZAAAABYAAABMAAAAAAAAAAAAAAAEAAAAAAAAAAEAAAAsPEMKAAAAACgAAAAoAAAAZAAAAGQAAAAAAAAAzMzMAAAAAABQAAAAUAAAAGQAAABkAAAAAAAAABcAAAAUAAAAAAAAAAAAAAD/fwAA/38AAAAAAAAJAAAABAAAAAAAAAAMAAAAEAAAAAAAAAAAAAAAAAAAAAAAAAAeAAAAaAAAAAAAAAAAAAAAAAAAAAAAAAAAAAAAECcAABAnAAAAAAAAAAAAAAAAAAAAAAAAAAAAAAAAAAAAAAAAAAAAABQAAAAAAAAAwMD/AAAAAABkAAAAMgAAAAAAAABkAAAAAAAAAH9/fwAKAAAAHwAAAFQAAAAAAAAFAAAAAQAAAAAAAAAAAAAAAAAAAAAAAAAAAAAAAAAAAAAAAAAAAAAAAn9/fwAAAAADzMzMAMDA/wB/f38AAAAAAAAAAAAAAAAAAAAAAAAAAAAhAAAAGAAAABQAAAArBAAAKiUAAOgqAABpJwAAEAAAACYAAAAIAAAAPJAAAP8fAAA="/>
               </a:ext>
             </a:extLst>
           </p:cNvSpPr>
@@ -10302,7 +10307,7 @@
             <a:spLocks noGrp="1" noChangeArrowheads="1"/>
             <a:extLst>
               <a:ext uri="smNativeData">
-                <pr:smNativeData xmlns="" xmlns:p14="http://schemas.microsoft.com/office/powerpoint/2010/main" xmlns:pr="smNativeData" val="SMDATA_13_w78LXxMAAAAlAAAAZAAAAA0AAAAAkAAAAEgAAACQAAAASAAAAAAAAAABAAAAAAAAAAEAAABQAAAAAAAAAAAA4D8AAAAAAADgPwAAAAAAAOA/AAAAAAAA4D8AAAAAAADgPwAAAAAAAOA/AAAAAAAA4D8AAAAAAADgPwAAAAAAAOA/AAAAAAAA4D8CAAAAjAAAAAAAAAAAAAAAkMImDP///wgAAAAAAAAAAAAAAAAAAAAAAAAAAAAAAAAAAAAAZAAAAAEAAABAAAAAAAAAAAAAAAAAAAAAAAAAAAAAAAAAAAAAAAAAAAAAAAAAAAAAAAAAAAAAAAAAAAAAAAAAAAAAAAAAAAAAAAAAAAAAAAAAAAAAAAAAAAAAAAAAAAAAFAAAADwAAAAAAAAAAAAAAAAAAAkUAAAAAQAAABQAAAAUAAAAFAAAAAEAAAAAAAAAZAAAAGQAAAAAAAAAZAAAAGQAAAAVAAAAYAAAAAAAAAAAAAAADwAAACADAAAAAAAAAAAAAAEAAACgMgAAVgcAAKr4//8BAAAAf39/AAEAAABkAAAAAAAAABQAAABAHwAAAAAAACYAAAAAAAAAwOD//wAAAAAmAAAAZAAAABYAAABMAAAAAAAAAAAAAAAEAAAAAAAAAAEAAAAsPEMKAAAAACgAAAAoAAAAZAAAAGQAAAAAAAAAzMzMAAAAAABQAAAAUAAAAGQAAABkAAAAAAAAABcAAAAUAAAAAAAAAAAAAAD/fwAA/38AAAAAAAAJAAAABAAAAAAAAAAMAAAAEAAAAAAAAAAAAAAAAAAAAAAAAAAeAAAAaAAAAAAAAAAAAAAAAAAAAAAAAAAAAAAAECcAABAnAAAAAAAAAAAAAAAAAAAAAAAAAAAAAAAAAAAAAAAAAAAAABQAAAAAAAAAwMD/AAAAAABkAAAAMgAAAAAAAABkAAAAAAAAAH9/fwAKAAAAHwAAAFQAAAAAAAAFAAAAAQAAAAAAAAAAAAAAAAAAAAAAAAAAAAAAAAAAAAAAAAAAAAAAAn9/fwAAAAADzMzMAMDA/wB/f38AAAAAAAAAAAAAAAAAAAAAAAAAAAAhAAAAGAAAABQAAADZNAAAKiUAAA05AABpJwAAEAAAACYAAAAIAAAAPLAAAP8fAAA="/>
+                <pr:smNativeData xmlns:pr="smNativeData" xmlns:p14="http://schemas.microsoft.com/office/powerpoint/2010/main" xmlns="" val="SMDATA_13_w78LXxMAAAAlAAAAZAAAAA0AAAAAkAAAAEgAAACQAAAASAAAAAAAAAABAAAAAAAAAAEAAABQAAAAAAAAAAAA4D8AAAAAAADgPwAAAAAAAOA/AAAAAAAA4D8AAAAAAADgPwAAAAAAAOA/AAAAAAAA4D8AAAAAAADgPwAAAAAAAOA/AAAAAAAA4D8CAAAAjAAAAAAAAAAAAAAAkMImDP///wgAAAAAAAAAAAAAAAAAAAAAAAAAAAAAAAAAAAAAZAAAAAEAAABAAAAAAAAAAAAAAAAAAAAAAAAAAAAAAAAAAAAAAAAAAAAAAAAAAAAAAAAAAAAAAAAAAAAAAAAAAAAAAAAAAAAAAAAAAAAAAAAAAAAAAAAAAAAAAAAAAAAAFAAAADwAAAAAAAAAAAAAAAAAAAkUAAAAAQAAABQAAAAUAAAAFAAAAAEAAAAAAAAAZAAAAGQAAAAAAAAAZAAAAGQAAAAVAAAAYAAAAAAAAAAAAAAADwAAACADAAAAAAAAAAAAAAEAAACgMgAAVgcAAKr4//8BAAAAf39/AAEAAABkAAAAAAAAABQAAABAHwAAAAAAACYAAAAAAAAAwOD//wAAAAAmAAAAZAAAABYAAABMAAAAAAAAAAAAAAAEAAAAAAAAAAEAAAAsPEMKAAAAACgAAAAoAAAAZAAAAGQAAAAAAAAAzMzMAAAAAABQAAAAUAAAAGQAAABkAAAAAAAAABcAAAAUAAAAAAAAAAAAAAD/fwAA/38AAAAAAAAJAAAABAAAAAAAAAAMAAAAEAAAAAAAAAAAAAAAAAAAAAAAAAAeAAAAaAAAAAAAAAAAAAAAAAAAAAAAAAAAAAAAECcAABAnAAAAAAAAAAAAAAAAAAAAAAAAAAAAAAAAAAAAAAAAAAAAABQAAAAAAAAAwMD/AAAAAABkAAAAMgAAAAAAAABkAAAAAAAAAH9/fwAKAAAAHwAAAFQAAAAAAAAFAAAAAQAAAAAAAAAAAAAAAAAAAAAAAAAAAAAAAAAAAAAAAAAAAAAAAn9/fwAAAAADzMzMAMDA/wB/f38AAAAAAAAAAAAAAAAAAAAAAAAAAAAhAAAAGAAAABQAAADZNAAAKiUAAA05AABpJwAAEAAAACYAAAAIAAAAPLAAAP8fAAA="/>
               </a:ext>
             </a:extLst>
           </p:cNvSpPr>
@@ -10468,7 +10473,7 @@
           <p:cNvSpPr>
             <a:extLst>
               <a:ext uri="smNativeData">
-                <pr:smNativeData xmlns="" xmlns:p14="http://schemas.microsoft.com/office/powerpoint/2010/main" xmlns:pr="smNativeData" val="SMDATA_13_w78LXxMAAAAlAAAAZAAAAA0AAAAAkAAAAEgAAACQAAAASAAAAAAAAAABAAAAAAAAAAEAAABQAAAAAAAAAAAA4D8AAAAAAADgPwAAAAAAAOA/AAAAAAAA4D8AAAAAAADgPwAAAAAAAOA/AAAAAAAA4D8AAAAAAADgPwAAAAAAAOA/AAAAAAAA4D8CAAAAjAAAAAAAAAAAAAAAkMImDP///wgAAAAAAAAAAAAAAAAAAAAAAAAAAAAAAAAAAAAAZAAAAAEAAABAAAAAAAAAAAAAAAAAAAAAAAAAAAAAAAAAAAAAAAAAAAAAAAAAAAAAAAAAAAAAAAAAAAAAAAAAAAAAAAAAAAAAAAAAAAAAAAAAAAAAAAAAAAAAAAAAAAAAFAAAADwAAAAAAAAAAAAAAAAAAAkUAAAAAQAAABQAAAAUAAAAFAAAAAEAAAAAAAAAZAAAAGQAAAAAAAAAZAAAAGQAAAAVAAAAYAAAAAAAAAAAAAAADwAAACADAAAAAAAAAAAAAAEAAACgMgAAVgcAAKr4//8BAAAAf39/AAEAAABkAAAAAAAAABQAAABAHwAAAAAAACYAAAAAAAAAwOD//wAAAAAmAAAAZAAAABYAAABMAAAAAAAAAAAAAAAEAAAAAAAAAAEAAAAsPEMKAAAAACgAAAAoAAAAZAAAAGQAAAAAAAAAzMzMAAAAAABQAAAAUAAAAGQAAABkAAAAAAAAABcAAAAUAAAAAAAAAAAAAAD/fwAA/38AAAAAAAAJAAAABAAAAAAAAAAMAAAAEAAAAAAAAAAAAAAAAAAAAAAAAAAeAAAAaAAAAAAAAAAAAAAAAAAAAAAAAAAAAAAAECcAABAnAAAAAAAAAAAAAAAAAAAAAAAAAAAAAAAAAAAAAAAAAAAAABQAAAAAAAAAwMD/AAAAAABkAAAAMgAAAAAAAABkAAAAAAAAAH9/fwAKAAAAHwAAAFQAAAAAAAAFAAAAAQAAAAAAAAAAAAAAAAAAAAAAAAAAAAAAAAAAAAAAAAAAAAAAAn9/fwAAAAADzMzMAMDA/wB/f38AAAAAAAAAAAAAAAAAAAAAAAAAAAAhAAAAGAAAABQAAABVAwAA3QQAABUHAAB2CAAAEAAAACYAAAAIAAAA//////////8="/>
+                <pr:smNativeData xmlns:pr="smNativeData" xmlns:p14="http://schemas.microsoft.com/office/powerpoint/2010/main" xmlns="" val="SMDATA_13_w78LXxMAAAAlAAAAZAAAAA0AAAAAkAAAAEgAAACQAAAASAAAAAAAAAABAAAAAAAAAAEAAABQAAAAAAAAAAAA4D8AAAAAAADgPwAAAAAAAOA/AAAAAAAA4D8AAAAAAADgPwAAAAAAAOA/AAAAAAAA4D8AAAAAAADgPwAAAAAAAOA/AAAAAAAA4D8CAAAAjAAAAAAAAAAAAAAAkMImDP///wgAAAAAAAAAAAAAAAAAAAAAAAAAAAAAAAAAAAAAZAAAAAEAAABAAAAAAAAAAAAAAAAAAAAAAAAAAAAAAAAAAAAAAAAAAAAAAAAAAAAAAAAAAAAAAAAAAAAAAAAAAAAAAAAAAAAAAAAAAAAAAAAAAAAAAAAAAAAAAAAAAAAAFAAAADwAAAAAAAAAAAAAAAAAAAkUAAAAAQAAABQAAAAUAAAAFAAAAAEAAAAAAAAAZAAAAGQAAAAAAAAAZAAAAGQAAAAVAAAAYAAAAAAAAAAAAAAADwAAACADAAAAAAAAAAAAAAEAAACgMgAAVgcAAKr4//8BAAAAf39/AAEAAABkAAAAAAAAABQAAABAHwAAAAAAACYAAAAAAAAAwOD//wAAAAAmAAAAZAAAABYAAABMAAAAAAAAAAAAAAAEAAAAAAAAAAEAAAAsPEMKAAAAACgAAAAoAAAAZAAAAGQAAAAAAAAAzMzMAAAAAABQAAAAUAAAAGQAAABkAAAAAAAAABcAAAAUAAAAAAAAAAAAAAD/fwAA/38AAAAAAAAJAAAABAAAAAAAAAAMAAAAEAAAAAAAAAAAAAAAAAAAAAAAAAAeAAAAaAAAAAAAAAAAAAAAAAAAAAAAAAAAAAAAECcAABAnAAAAAAAAAAAAAAAAAAAAAAAAAAAAAAAAAAAAAAAAAAAAABQAAAAAAAAAwMD/AAAAAABkAAAAMgAAAAAAAABkAAAAAAAAAH9/fwAKAAAAHwAAAFQAAAAAAAAFAAAAAQAAAAAAAAAAAAAAAAAAAAAAAAAAAAAAAAAAAAAAAAAAAAAAAn9/fwAAAAADzMzMAMDA/wB/f38AAAAAAAAAAAAAAAAAAAAAAAAAAAAhAAAAGAAAABQAAABVAwAA3QQAABUHAAB2CAAAEAAAACYAAAAIAAAA//////////8="/>
               </a:ext>
             </a:extLst>
           </p:cNvSpPr>
@@ -10518,7 +10523,7 @@
           <p:cNvSpPr>
             <a:extLst>
               <a:ext uri="smNativeData">
-                <pr:smNativeData xmlns="" xmlns:p14="http://schemas.microsoft.com/office/powerpoint/2010/main" xmlns:pr="smNativeData" val="SMDATA_13_w78LXxMAAAAlAAAAZAAAAA0AAAAAkAAAAEgAAACQAAAASAAAAAAAAAABAAAAAAAAAAEAAABQAAAAAAAAAAAA4D8AAAAAAADgPwAAAAAAAOA/AAAAAAAA4D8AAAAAAADgPwAAAAAAAOA/AAAAAAAA4D8AAAAAAADgPwAAAAAAAOA/AAAAAAAA4D8CAAAAjAAAAAAAAAAAAAAAkMImDP///wgAAAAAAAAAAAAAAAAAAAAAAAAAAAAAAAAAAAAAZAAAAAEAAABAAAAAAAAAAAAAAAAAAAAAAAAAAAAAAAAAAAAAAAAAAAAAAAAAAAAAAAAAAAAAAAAAAAAAAAAAAAAAAAAAAAAAAAAAAAAAAAAAAAAAAAAAAAAAAAAAAAAAFAAAADwAAAAAAAAAAAAAAAAAAAkUAAAAAQAAABQAAAAUAAAAFAAAAAEAAAAAAAAAZAAAAGQAAAAAAAAAZAAAAGQAAAAVAAAAYAAAAAAAAAAAAAAADwAAACADAAAAAAAAAAAAAAEAAACgMgAAVgcAAKr4//8BAAAAf39/AAEAAABkAAAAAAAAABQAAABAHwAAAAAAACYAAAAAAAAAwOD//wAAAAAmAAAAZAAAABYAAABMAAAAAAAAAAAAAAAEAAAAAAAAAAEAAAAsPEMKAAAAACgAAAAoAAAAZAAAAGQAAAAAAAAAzMzMAAAAAABQAAAAUAAAAGQAAABkAAAAAAAAABcAAAAUAAAAAAAAAAAAAAD/fwAA/38AAAAAAAAJAAAABAAAAAAAAAAMAAAAEAAAAAAAAAAAAAAAAAAAAAAAAAAeAAAAaAAAAAAAAAAAAAAAAAAAAAAAAAAAAAAAECcAABAnAAAAAAAAAAAAAAAAAAAAAAAAAAAAAAAAAAAAAAAAAAAAABQAAAAAAAAAwMD/AAAAAABkAAAAMgAAAAAAAABkAAAAAAAAAH9/fwAKAAAAHwAAAFQAAAAAAAAFAAAAAQAAAAAAAAAAAAAAAAAAAAAAAAAAAAAAAAAAAAAAAAAAAAAAAn9/fwAAAAADzMzMAMDA/wB/f38AAAAAAAAAAAAAAAAAAAAAAAAAAAAhAAAAGAAAABQAAAC1NgAAwhEAAHU6AABbFQAAEAAAACYAAAAIAAAA//////////8="/>
+                <pr:smNativeData xmlns:pr="smNativeData" xmlns:p14="http://schemas.microsoft.com/office/powerpoint/2010/main" xmlns="" val="SMDATA_13_w78LXxMAAAAlAAAAZAAAAA0AAAAAkAAAAEgAAACQAAAASAAAAAAAAAABAAAAAAAAAAEAAABQAAAAAAAAAAAA4D8AAAAAAADgPwAAAAAAAOA/AAAAAAAA4D8AAAAAAADgPwAAAAAAAOA/AAAAAAAA4D8AAAAAAADgPwAAAAAAAOA/AAAAAAAA4D8CAAAAjAAAAAAAAAAAAAAAkMImDP///wgAAAAAAAAAAAAAAAAAAAAAAAAAAAAAAAAAAAAAZAAAAAEAAABAAAAAAAAAAAAAAAAAAAAAAAAAAAAAAAAAAAAAAAAAAAAAAAAAAAAAAAAAAAAAAAAAAAAAAAAAAAAAAAAAAAAAAAAAAAAAAAAAAAAAAAAAAAAAAAAAAAAAFAAAADwAAAAAAAAAAAAAAAAAAAkUAAAAAQAAABQAAAAUAAAAFAAAAAEAAAAAAAAAZAAAAGQAAAAAAAAAZAAAAGQAAAAVAAAAYAAAAAAAAAAAAAAADwAAACADAAAAAAAAAAAAAAEAAACgMgAAVgcAAKr4//8BAAAAf39/AAEAAABkAAAAAAAAABQAAABAHwAAAAAAACYAAAAAAAAAwOD//wAAAAAmAAAAZAAAABYAAABMAAAAAAAAAAAAAAAEAAAAAAAAAAEAAAAsPEMKAAAAACgAAAAoAAAAZAAAAGQAAAAAAAAAzMzMAAAAAABQAAAAUAAAAGQAAABkAAAAAAAAABcAAAAUAAAAAAAAAAAAAAD/fwAA/38AAAAAAAAJAAAABAAAAAAAAAAMAAAAEAAAAAAAAAAAAAAAAAAAAAAAAAAeAAAAaAAAAAAAAAAAAAAAAAAAAAAAAAAAAAAAECcAABAnAAAAAAAAAAAAAAAAAAAAAAAAAAAAAAAAAAAAAAAAAAAAABQAAAAAAAAAwMD/AAAAAABkAAAAMgAAAAAAAABkAAAAAAAAAH9/fwAKAAAAHwAAAFQAAAAAAAAFAAAAAQAAAAAAAAAAAAAAAAAAAAAAAAAAAAAAAAAAAAAAAAAAAAAAAn9/fwAAAAADzMzMAMDA/wB/f38AAAAAAAAAAAAAAAAAAAAAAAAAAAAhAAAAGAAAABQAAAC1NgAAwhEAAHU6AABbFQAAEAAAACYAAAAIAAAA//////////8="/>
               </a:ext>
             </a:extLst>
           </p:cNvSpPr>
@@ -10594,7 +10599,7 @@
             <a:spLocks noGrp="1" noChangeArrowheads="1"/>
             <a:extLst>
               <a:ext uri="smNativeData">
-                <pr:smNativeData xmlns="" xmlns:p14="http://schemas.microsoft.com/office/powerpoint/2010/main" xmlns:pr="smNativeData" val="SMDATA_13_w78LXxMAAAAlAAAAZAAAAA0AAAAAkAAAAJAAAACQAAAAkAAAAAAAAAABAAAAAAAAAAEAAABQAAAAAAAAAAAA4D8AAAAAAADgPwAAAAAAAOA/AAAAAAAA4D8AAAAAAADgPwAAAAAAAOA/AAAAAAAA4D8AAAAAAADgPwAAAAAAAOA/AAAAAAAA4D8CAAAAjAAAAAAAAAAAAAAAkMImDP///wgAAAAAAAAAAAAAAAAAAAAAAAAAAAAAAAAAAAAAZAAAAAEAAABAAAAAAAAAAAAAAAAAAAAAAAAAAAAAAAAAAAAAAAAAAAAAAAAAAAAAAAAAAAAAAAAAAAAAAAAAAAAAAAAAAAAAAAAAAAAAAAAAAAAAAAAAAAAAAAAAAAAAFAAAADwAAAAAAAAAAAAAAAAAAAkUAAAAAQAAABQAAAAUAAAAFAAAAAEAAAAAAAAAZAAAAGQAAAAAAAAAZAAAAGQAAAAVAAAAYAAAAAAAAAAAAAAADwAAACADAAAAAAAAAAAAAAEAAACgMgAAVgcAAKr4//8BAAAAf39/AAEAAABkAAAAAAAAABQAAABAHwAAAAAAACYAAAAAAAAAwOD//wAAAAAmAAAAZAAAABYAAABMAAAAAAAAAAAAAAAEAAAAAAAAAAEAAAAsPEMKAAAAACgAAAAoAAAAZAAAAGQAAAAAAAAAzMzMAAAAAABQAAAAUAAAAGQAAABkAAAAAAAAABcAAAAUAAAAAAAAAAAAAAD/fwAA/38AAAAAAAAJAAAABAAAAAAAAAAMAAAAEAAAAAAAAAAAAAAAAAAAAAAAAAAeAAAAaAAAAAAAAAAAAAAAAAAAAAAAAAAAAAAAECcAABAnAAAAAAAAAAAAAAAAAAAAAAAAAAAAAAAAAAAAAAAAAAAAABQAAAAAAAAAwMD/AAAAAABkAAAAMgAAAAAAAABkAAAAAAAAAH9/fwAKAAAAHwAAAFQAAAAAAAAFAAAAAQAAAAAAAAAAAAAAAAAAAAAAAAAAAAAAAAAAAAAAAAAAAAAAAn9/fwAAAAADzMzMAMDA/wB/f38AAAAAAAAAAAAAAAAAAAAAAAAAAAAhAAAAGAAAABQAAAA4BAAAwAMAAA05AABYFgAAEAAAACYAAAAIAAAAvZAAAP8fAAA="/>
+                <pr:smNativeData xmlns:pr="smNativeData" xmlns:p14="http://schemas.microsoft.com/office/powerpoint/2010/main" xmlns="" val="SMDATA_13_w78LXxMAAAAlAAAAZAAAAA0AAAAAkAAAAJAAAACQAAAAkAAAAAAAAAABAAAAAAAAAAEAAABQAAAAAAAAAAAA4D8AAAAAAADgPwAAAAAAAOA/AAAAAAAA4D8AAAAAAADgPwAAAAAAAOA/AAAAAAAA4D8AAAAAAADgPwAAAAAAAOA/AAAAAAAA4D8CAAAAjAAAAAAAAAAAAAAAkMImDP///wgAAAAAAAAAAAAAAAAAAAAAAAAAAAAAAAAAAAAAZAAAAAEAAABAAAAAAAAAAAAAAAAAAAAAAAAAAAAAAAAAAAAAAAAAAAAAAAAAAAAAAAAAAAAAAAAAAAAAAAAAAAAAAAAAAAAAAAAAAAAAAAAAAAAAAAAAAAAAAAAAAAAAFAAAADwAAAAAAAAAAAAAAAAAAAkUAAAAAQAAABQAAAAUAAAAFAAAAAEAAAAAAAAAZAAAAGQAAAAAAAAAZAAAAGQAAAAVAAAAYAAAAAAAAAAAAAAADwAAACADAAAAAAAAAAAAAAEAAACgMgAAVgcAAKr4//8BAAAAf39/AAEAAABkAAAAAAAAABQAAABAHwAAAAAAACYAAAAAAAAAwOD//wAAAAAmAAAAZAAAABYAAABMAAAAAAAAAAAAAAAEAAAAAAAAAAEAAAAsPEMKAAAAACgAAAAoAAAAZAAAAGQAAAAAAAAAzMzMAAAAAABQAAAAUAAAAGQAAABkAAAAAAAAABcAAAAUAAAAAAAAAAAAAAD/fwAA/38AAAAAAAAJAAAABAAAAAAAAAAMAAAAEAAAAAAAAAAAAAAAAAAAAAAAAAAeAAAAaAAAAAAAAAAAAAAAAAAAAAAAAAAAAAAAECcAABAnAAAAAAAAAAAAAAAAAAAAAAAAAAAAAAAAAAAAAAAAAAAAABQAAAAAAAAAwMD/AAAAAABkAAAAMgAAAAAAAABkAAAAAAAAAH9/fwAKAAAAHwAAAFQAAAAAAAAFAAAAAQAAAAAAAAAAAAAAAAAAAAAAAAAAAAAAAAAAAAAAAAAAAAAAAn9/fwAAAAADzMzMAMDA/wB/f38AAAAAAAAAAAAAAAAAAAAAAAAAAAAhAAAAGAAAABQAAAA4BAAAwAMAAA05AABYFgAAEAAAACYAAAAIAAAAvZAAAP8fAAA="/>
               </a:ext>
             </a:extLst>
           </p:cNvSpPr>
@@ -10761,7 +10766,7 @@
             <a:spLocks noGrp="1" noChangeArrowheads="1"/>
             <a:extLst>
               <a:ext uri="smNativeData">
-                <pr:smNativeData xmlns="" xmlns:p14="http://schemas.microsoft.com/office/powerpoint/2010/main" xmlns:pr="smNativeData" val="SMDATA_13_w78LXxMAAAAlAAAAZAAAAA0AAAAAkAAAAJAAAACQAAAAkAAAAAAAAAACAAAAAAAAAAEAAABQAAAAAAAAAAAA4D8AAAAAAADgPwAAAAAAAOA/AAAAAAAA4D8AAAAAAADgPwAAAAAAAOA/AAAAAAAA4D8AAAAAAADgPwAAAAAAAOA/AAAAAAAA4D8CAAAAjAAAAAAAAAAAAAAAkMImDP///wgAAAAAAAAAAAAAAAAAAAAAAAAAAAAAAAAAAAAAZAAAAAEAAABAAAAAAAAAAAAAAAAAAAAAAAAAAAAAAAAAAAAAAAAAAAAAAAAAAAAAAAAAAAAAAAAAAAAAAAAAAAAAAAAAAAAAAAAAAAAAAAAAAAAAAAAAAAAAAAAAAAAAFAAAADwAAAAAAAAAAAAAAAAAAAkUAAAAAQAAABQAAAAUAAAAFAAAAAEAAAAAAAAAZAAAAGQAAAAAAAAAZAAAAGQAAAAVAAAAYAAAAAAAAAAAAAAADwAAACADAAAAAAAAAAAAAAEAAACgMgAAVgcAAKr4//8BAAAAf39/AAEAAABkAAAAAAAAABQAAABAHwAAAAAAACYAAAAAAAAAwOD//wAAAAAmAAAAZAAAABYAAABMAAAAAAAAAAAAAAAEAAAAAAAAAAEAAAAsPEMKAAAAACgAAAAoAAAAZAAAAGQAAAAAAAAAzMzMAAAAAABQAAAAUAAAAGQAAABkAAAAAAAAABcAAAAUAAAAAAAAAAAAAAD/fwAA/38AAAAAAAAJAAAABAAAAAAAAAAMAAAAEAAAAAAAAAAAAAAAAAAAAAAAAAAeAAAAaAAAAAAAAAAAAAAAAAAAAAAAAAAAAAAAECcAABAnAAAAAAAAAAAAAAAAAAAAAAAAAAAAAAAAAAAAAAAAAAAAABQAAAAAAAAAwMD/AAAAAABkAAAAMgAAAAAAAABkAAAAAAAAAH9/fwAKAAAAHwAAAFQAAAAAAAAFAAAAAQAAAAAAAAAAAAAAAAAAAAAAAAAAAAAAAAAAAAAAAAAAAAAAAn9/fwAAAAADzMzMAMDA/wB/f38AAAAAAAAAAAAAAAAAAAAAAAAAAAAhAAAAGAAAABQAAAArBAAAsBgAAA05AADaGwAAEAAAACYAAAAIAAAAvZAAAP8fAAA="/>
+                <pr:smNativeData xmlns:pr="smNativeData" xmlns:p14="http://schemas.microsoft.com/office/powerpoint/2010/main" xmlns="" val="SMDATA_13_w78LXxMAAAAlAAAAZAAAAA0AAAAAkAAAAJAAAACQAAAAkAAAAAAAAAACAAAAAAAAAAEAAABQAAAAAAAAAAAA4D8AAAAAAADgPwAAAAAAAOA/AAAAAAAA4D8AAAAAAADgPwAAAAAAAOA/AAAAAAAA4D8AAAAAAADgPwAAAAAAAOA/AAAAAAAA4D8CAAAAjAAAAAAAAAAAAAAAkMImDP///wgAAAAAAAAAAAAAAAAAAAAAAAAAAAAAAAAAAAAAZAAAAAEAAABAAAAAAAAAAAAAAAAAAAAAAAAAAAAAAAAAAAAAAAAAAAAAAAAAAAAAAAAAAAAAAAAAAAAAAAAAAAAAAAAAAAAAAAAAAAAAAAAAAAAAAAAAAAAAAAAAAAAAFAAAADwAAAAAAAAAAAAAAAAAAAkUAAAAAQAAABQAAAAUAAAAFAAAAAEAAAAAAAAAZAAAAGQAAAAAAAAAZAAAAGQAAAAVAAAAYAAAAAAAAAAAAAAADwAAACADAAAAAAAAAAAAAAEAAACgMgAAVgcAAKr4//8BAAAAf39/AAEAAABkAAAAAAAAABQAAABAHwAAAAAAACYAAAAAAAAAwOD//wAAAAAmAAAAZAAAABYAAABMAAAAAAAAAAAAAAAEAAAAAAAAAAEAAAAsPEMKAAAAACgAAAAoAAAAZAAAAGQAAAAAAAAAzMzMAAAAAABQAAAAUAAAAGQAAABkAAAAAAAAABcAAAAUAAAAAAAAAAAAAAD/fwAA/38AAAAAAAAJAAAABAAAAAAAAAAMAAAAEAAAAAAAAAAAAAAAAAAAAAAAAAAeAAAAaAAAAAAAAAAAAAAAAAAAAAAAAAAAAAAAECcAABAnAAAAAAAAAAAAAAAAAAAAAAAAAAAAAAAAAAAAAAAAAAAAABQAAAAAAAAAwMD/AAAAAABkAAAAMgAAAAAAAABkAAAAAAAAAH9/fwAKAAAAHwAAAFQAAAAAAAAFAAAAAQAAAAAAAAAAAAAAAAAAAAAAAAAAAAAAAAAAAAAAAAAAAAAAAn9/fwAAAAADzMzMAMDA/wB/f38AAAAAAAAAAAAAAAAAAAAAAAAAAAAhAAAAGAAAABQAAAArBAAAsBgAAA05AADaGwAAEAAAACYAAAAIAAAAvZAAAP8fAAA="/>
               </a:ext>
             </a:extLst>
           </p:cNvSpPr>
@@ -10972,7 +10977,7 @@
             <a:spLocks noGrp="1" noChangeArrowheads="1"/>
             <a:extLst>
               <a:ext uri="smNativeData">
-                <pr:smNativeData xmlns="" xmlns:p14="http://schemas.microsoft.com/office/powerpoint/2010/main" xmlns:pr="smNativeData" val="SMDATA_13_w78LXxMAAAAlAAAAZAAAAA0AAAAAkAAAAJAAAACQAAAAkAAAAAAAAAAAAAAAAAAAAAEAAABQAAAAAAAAAAAA4D8AAAAAAADgPwAAAAAAAOA/AAAAAAAA4D8AAAAAAADgPwAAAAAAAOA/AAAAAAAA4D8AAAAAAADgPwAAAAAAAOA/AAAAAAAA4D8CAAAAjAAAAAAAAAAAAAAAkMImDP///wgAAAAAAAAAAAAAAAAAAAAAAAAAAAAAAAAAAAAAZAAAAAEAAABAAAAAAAAAAAAAAAAAAAAAAAAAAAAAAAAAAAAAAAAAAAAAAAAAAAAAAAAAAAAAAAAAAAAAAAAAAAAAAAAAAAAAAAAAAAAAAAAAAAAAAAAAAAAAAAAAAAAAFAAAADwAAAAAAAAAAAAAAAAAAAkUAAAAAQAAABQAAAAUAAAAFAAAAAEAAAAAAAAAZAAAAGQAAAAAAAAAZAAAAGQAAAAVAAAAYAAAAAAAAAAAAAAADwAAACADAAAAAAAAAAAAAAEAAACgMgAAVgcAAKr4//8BAAAAf39/AAEAAABkAAAAAAAAABQAAABAHwAAAAAAACYAAAAAAAAAwOD//wAAAAAmAAAAZAAAABYAAABMAAAAAAAAAAAAAAAEAAAAAAAAAAEAAAAsPEMKAAAAACgAAAAoAAAAZAAAAGQAAAAAAAAAzMzMAAAAAABQAAAAUAAAAGQAAABkAAAAAAAAABcAAAAUAAAAAAAAAAAAAAD/fwAA/38AAAAAAAAJAAAABAAAAAAAAAAMAAAAEAAAAAAAAAAAAAAAAAAAAAAAAAAeAAAAaAAAAAAAAAAAAAAAAAAAAAAAAAAAAAAAECcAABAnAAAAAAAAAAAAAAAAAAAAAAAAAAAAAAAAAAAAAAAAAAAAABQAAAAAAAAAwMD/AAAAAABkAAAAMgAAAAAAAABkAAAAAAAAAH9/fwAKAAAAHwAAAFQAAAAAAAAFAAAAAQAAAAAAAAAAAAAAAAAAAAAAAAAAAAAAAAAAAAAAAAAAAAAAAn9/fwAAAAADzMzMAMDA/wB/f38AAAAAAAAAAAAAAAAAAAAAAAAAAAAhAAAAGAAAABQAAAArBAAA2hsAAA05AAAqJQAAEAAAACYAAAAIAAAAPZAAAP8fAAA="/>
+                <pr:smNativeData xmlns:pr="smNativeData" xmlns:p14="http://schemas.microsoft.com/office/powerpoint/2010/main" xmlns="" val="SMDATA_13_w78LXxMAAAAlAAAAZAAAAA0AAAAAkAAAAJAAAACQAAAAkAAAAAAAAAAAAAAAAAAAAAEAAABQAAAAAAAAAAAA4D8AAAAAAADgPwAAAAAAAOA/AAAAAAAA4D8AAAAAAADgPwAAAAAAAOA/AAAAAAAA4D8AAAAAAADgPwAAAAAAAOA/AAAAAAAA4D8CAAAAjAAAAAAAAAAAAAAAkMImDP///wgAAAAAAAAAAAAAAAAAAAAAAAAAAAAAAAAAAAAAZAAAAAEAAABAAAAAAAAAAAAAAAAAAAAAAAAAAAAAAAAAAAAAAAAAAAAAAAAAAAAAAAAAAAAAAAAAAAAAAAAAAAAAAAAAAAAAAAAAAAAAAAAAAAAAAAAAAAAAAAAAAAAAFAAAADwAAAAAAAAAAAAAAAAAAAkUAAAAAQAAABQAAAAUAAAAFAAAAAEAAAAAAAAAZAAAAGQAAAAAAAAAZAAAAGQAAAAVAAAAYAAAAAAAAAAAAAAADwAAACADAAAAAAAAAAAAAAEAAACgMgAAVgcAAKr4//8BAAAAf39/AAEAAABkAAAAAAAAABQAAABAHwAAAAAAACYAAAAAAAAAwOD//wAAAAAmAAAAZAAAABYAAABMAAAAAAAAAAAAAAAEAAAAAAAAAAEAAAAsPEMKAAAAACgAAAAoAAAAZAAAAGQAAAAAAAAAzMzMAAAAAABQAAAAUAAAAGQAAABkAAAAAAAAABcAAAAUAAAAAAAAAAAAAAD/fwAA/38AAAAAAAAJAAAABAAAAAAAAAAMAAAAEAAAAAAAAAAAAAAAAAAAAAAAAAAeAAAAaAAAAAAAAAAAAAAAAAAAAAAAAAAAAAAAECcAABAnAAAAAAAAAAAAAAAAAAAAAAAAAAAAAAAAAAAAAAAAAAAAABQAAAAAAAAAwMD/AAAAAABkAAAAMgAAAAAAAABkAAAAAAAAAH9/fwAKAAAAHwAAAFQAAAAAAAAFAAAAAQAAAAAAAAAAAAAAAAAAAAAAAAAAAAAAAAAAAAAAAAAAAAAAAn9/fwAAAAADzMzMAMDA/wB/f38AAAAAAAAAAAAAAAAAAAAAAAAAAAAhAAAAGAAAABQAAAArBAAA2hsAAA05AAAqJQAAEAAAACYAAAAIAAAAPZAAAP8fAAA="/>
               </a:ext>
             </a:extLst>
           </p:cNvSpPr>
@@ -11163,7 +11168,7 @@
             <a:spLocks noGrp="1" noChangeArrowheads="1"/>
             <a:extLst>
               <a:ext uri="smNativeData">
-                <pr:smNativeData xmlns="" xmlns:p14="http://schemas.microsoft.com/office/powerpoint/2010/main" xmlns:pr="smNativeData" val="SMDATA_13_w78LXxMAAAAlAAAAZAAAAA0AAAAAkAAAAJAAAACQAAAAkAAAAAAAAAABAAAAAAAAAAEAAABQAAAAAAAAAAAA4D8AAAAAAADgPwAAAAAAAOA/AAAAAAAA4D8AAAAAAADgPwAAAAAAAOA/AAAAAAAA4D8AAAAAAADgPwAAAAAAAOA/AAAAAAAA4D8CAAAAjAAAAAAAAAAAAAAAkMImDP///wgAAAAAAAAAAAAAAAAAAAAAAAAAAAAAAAAAAAAAZAAAAAEAAABAAAAAAAAAAAAAAAAAAAAAAAAAAAAAAAAAAAAAAAAAAAAAAAAAAAAAAAAAAAAAAAAAAAAAAAAAAAAAAAAAAAAAAAAAAAAAAAAAAAAAAAAAAAAAAAAAAAAAFAAAADwAAAAAAAAAAAAAAAAAAAkUAAAAAQAAABQAAAAUAAAAFAAAAAEAAAAAAAAAZAAAAGQAAAAAAAAAZAAAAGQAAAAVAAAAYAAAAAAAAAAAAAAADwAAACADAAAAAAAAAAAAAAEAAACgMgAAVgcAAKr4//8BAAAAf39/AAEAAABkAAAAAAAAABQAAABAHwAAAAAAACYAAAAAAAAAwOD//wAAAAAmAAAAZAAAABYAAABMAAAAAAAAAAAAAAAEAAAAAAAAAAEAAAAsPEMKAAAAACgAAAAoAAAAZAAAAGQAAAAAAAAAzMzMAAAAAABQAAAAUAAAAGQAAABkAAAAAAAAABcAAAAUAAAAAAAAAAAAAAD/fwAA/38AAAAAAAAJAAAABAAAAAAAAAAMAAAAEAAAAAAAAAAAAAAAAAAAAAAAAAAeAAAAaAAAAAAAAAAAAAAAAAAAAAAAAAAAAAAAECcAABAnAAAAAAAAAAAAAAAAAAAAAAAAAAAAAAAAAAAAAAAAAAAAABQAAAAAAAAAwMD/AAAAAABkAAAAMgAAAAAAAABkAAAAAAAAAH9/fwAKAAAAHwAAAFQAAAAAAAAFAAAAAQAAAAAAAAAAAAAAAAAAAAAAAAAAAAAAAAAAAAAAAAAAAAAAAn9/fwAAAAADzMzMAMDA/wB/f38AAAAAAAAAAAAAAAAAAAAAAAAAAAAhAAAAGAAAABQAAABTLAAAKiUAAO8xAABpJwAAEAAAACYAAAAIAAAAPJAAAP8fAAA="/>
+                <pr:smNativeData xmlns:pr="smNativeData" xmlns:p14="http://schemas.microsoft.com/office/powerpoint/2010/main" xmlns="" val="SMDATA_13_w78LXxMAAAAlAAAAZAAAAA0AAAAAkAAAAJAAAACQAAAAkAAAAAAAAAABAAAAAAAAAAEAAABQAAAAAAAAAAAA4D8AAAAAAADgPwAAAAAAAOA/AAAAAAAA4D8AAAAAAADgPwAAAAAAAOA/AAAAAAAA4D8AAAAAAADgPwAAAAAAAOA/AAAAAAAA4D8CAAAAjAAAAAAAAAAAAAAAkMImDP///wgAAAAAAAAAAAAAAAAAAAAAAAAAAAAAAAAAAAAAZAAAAAEAAABAAAAAAAAAAAAAAAAAAAAAAAAAAAAAAAAAAAAAAAAAAAAAAAAAAAAAAAAAAAAAAAAAAAAAAAAAAAAAAAAAAAAAAAAAAAAAAAAAAAAAAAAAAAAAAAAAAAAAFAAAADwAAAAAAAAAAAAAAAAAAAkUAAAAAQAAABQAAAAUAAAAFAAAAAEAAAAAAAAAZAAAAGQAAAAAAAAAZAAAAGQAAAAVAAAAYAAAAAAAAAAAAAAADwAAACADAAAAAAAAAAAAAAEAAACgMgAAVgcAAKr4//8BAAAAf39/AAEAAABkAAAAAAAAABQAAABAHwAAAAAAACYAAAAAAAAAwOD//wAAAAAmAAAAZAAAABYAAABMAAAAAAAAAAAAAAAEAAAAAAAAAAEAAAAsPEMKAAAAACgAAAAoAAAAZAAAAGQAAAAAAAAAzMzMAAAAAABQAAAAUAAAAGQAAABkAAAAAAAAABcAAAAUAAAAAAAAAAAAAAD/fwAA/38AAAAAAAAJAAAABAAAAAAAAAAMAAAAEAAAAAAAAAAAAAAAAAAAAAAAAAAeAAAAaAAAAAAAAAAAAAAAAAAAAAAAAAAAAAAAECcAABAnAAAAAAAAAAAAAAAAAAAAAAAAAAAAAAAAAAAAAAAAAAAAABQAAAAAAAAAwMD/AAAAAABkAAAAMgAAAAAAAABkAAAAAAAAAH9/fwAKAAAAHwAAAFQAAAAAAAAFAAAAAQAAAAAAAAAAAAAAAAAAAAAAAAAAAAAAAAAAAAAAAAAAAAAAAn9/fwAAAAADzMzMAMDA/wB/f38AAAAAAAAAAAAAAAAAAAAAAAAAAAAhAAAAGAAAABQAAABTLAAAKiUAAO8xAABpJwAAEAAAACYAAAAIAAAAPJAAAP8fAAA="/>
               </a:ext>
             </a:extLst>
           </p:cNvSpPr>
@@ -11350,7 +11355,7 @@
             <a:spLocks noGrp="1" noChangeArrowheads="1"/>
             <a:extLst>
               <a:ext uri="smNativeData">
-                <pr:smNativeData xmlns="" xmlns:p14="http://schemas.microsoft.com/office/powerpoint/2010/main" xmlns:pr="smNativeData" val="SMDATA_13_w78LXxMAAAAlAAAAZAAAAA0AAAAAkAAAAJAAAACQAAAAkAAAAAAAAAABAAAAAAAAAAEAAABQAAAAAAAAAAAA4D8AAAAAAADgPwAAAAAAAOA/AAAAAAAA4D8AAAAAAADgPwAAAAAAAOA/AAAAAAAA4D8AAAAAAADgPwAAAAAAAOA/AAAAAAAA4D8CAAAAjAAAAAAAAAAAAAAAkMImDP///wgAAAAAAAAAAAAAAAAAAAAAAAAAAAAAAAAAAAAAZAAAAAEAAABAAAAAAAAAAAAAAAAAAAAAAAAAAAAAAAAAAAAAAAAAAAAAAAAAAAAAAAAAAAAAAAAAAAAAAAAAAAAAAAAAAAAAAAAAAAAAAAAAAAAAAAAAAAAAAAAAAAAAFAAAADwAAAAAAAAAAAAAAAAAAAkUAAAAAQAAABQAAAAUAAAAFAAAAAEAAAAAAAAAZAAAAGQAAAAAAAAAZAAAAGQAAAAVAAAAYAAAAAAAAAAAAAAADwAAACADAAAAAAAAAAAAAAEAAACgMgAAVgcAAKr4//8BAAAAf39/AAEAAABkAAAAAAAAABQAAABAHwAAAAAAACYAAAAAAAAAwOD//wAAAAAmAAAAZAAAABYAAABMAAAAAAAAAAAAAAAEAAAAAAAAAAEAAAAsPEMKAAAAACgAAAAoAAAAZAAAAGQAAAAAAAAAzMzMAAAAAABQAAAAUAAAAGQAAABkAAAAAAAAABcAAAAUAAAAAAAAAAAAAAD/fwAA/38AAAAAAAAJAAAABAAAAAAAAAAMAAAAEAAAAAAAAAAAAAAAAAAAAAAAAAAeAAAAaAAAAAAAAAAAAAAAAAAAAAAAAAAAAAAAECcAABAnAAAAAAAAAAAAAAAAAAAAAAAAAAAAAAAAAAAAAAAAAAAAABQAAAAAAAAAwMD/AAAAAABkAAAAMgAAAAAAAABkAAAAAAAAAH9/fwAKAAAAHwAAAFQAAAAAAAAFAAAAAQAAAAAAAAAAAAAAAAAAAAAAAAAAAAAAAAAAAAAAAAAAAAAAAn9/fwAAAAADzMzMAMDA/wB/f38AAAAAAAAAAAAAAAAAAAAAAAAAAAAhAAAAGAAAABQAAAArBAAAKiUAAOgqAABpJwAAEAAAACYAAAAIAAAAPJAAAP8fAAA="/>
+                <pr:smNativeData xmlns:pr="smNativeData" xmlns:p14="http://schemas.microsoft.com/office/powerpoint/2010/main" xmlns="" val="SMDATA_13_w78LXxMAAAAlAAAAZAAAAA0AAAAAkAAAAJAAAACQAAAAkAAAAAAAAAABAAAAAAAAAAEAAABQAAAAAAAAAAAA4D8AAAAAAADgPwAAAAAAAOA/AAAAAAAA4D8AAAAAAADgPwAAAAAAAOA/AAAAAAAA4D8AAAAAAADgPwAAAAAAAOA/AAAAAAAA4D8CAAAAjAAAAAAAAAAAAAAAkMImDP///wgAAAAAAAAAAAAAAAAAAAAAAAAAAAAAAAAAAAAAZAAAAAEAAABAAAAAAAAAAAAAAAAAAAAAAAAAAAAAAAAAAAAAAAAAAAAAAAAAAAAAAAAAAAAAAAAAAAAAAAAAAAAAAAAAAAAAAAAAAAAAAAAAAAAAAAAAAAAAAAAAAAAAFAAAADwAAAAAAAAAAAAAAAAAAAkUAAAAAQAAABQAAAAUAAAAFAAAAAEAAAAAAAAAZAAAAGQAAAAAAAAAZAAAAGQAAAAVAAAAYAAAAAAAAAAAAAAADwAAACADAAAAAAAAAAAAAAEAAACgMgAAVgcAAKr4//8BAAAAf39/AAEAAABkAAAAAAAAABQAAABAHwAAAAAAACYAAAAAAAAAwOD//wAAAAAmAAAAZAAAABYAAABMAAAAAAAAAAAAAAAEAAAAAAAAAAEAAAAsPEMKAAAAACgAAAAoAAAAZAAAAGQAAAAAAAAAzMzMAAAAAABQAAAAUAAAAGQAAABkAAAAAAAAABcAAAAUAAAAAAAAAAAAAAD/fwAA/38AAAAAAAAJAAAABAAAAAAAAAAMAAAAEAAAAAAAAAAAAAAAAAAAAAAAAAAeAAAAaAAAAAAAAAAAAAAAAAAAAAAAAAAAAAAAECcAABAnAAAAAAAAAAAAAAAAAAAAAAAAAAAAAAAAAAAAAAAAAAAAABQAAAAAAAAAwMD/AAAAAABkAAAAMgAAAAAAAABkAAAAAAAAAH9/fwAKAAAAHwAAAFQAAAAAAAAFAAAAAQAAAAAAAAAAAAAAAAAAAAAAAAAAAAAAAAAAAAAAAAAAAAAAAn9/fwAAAAADzMzMAMDA/wB/f38AAAAAAAAAAAAAAAAAAAAAAAAAAAAhAAAAGAAAABQAAAArBAAAKiUAAOgqAABpJwAAEAAAACYAAAAIAAAAPJAAAP8fAAA="/>
               </a:ext>
             </a:extLst>
           </p:cNvSpPr>
@@ -11537,7 +11542,7 @@
             <a:spLocks noGrp="1" noChangeArrowheads="1"/>
             <a:extLst>
               <a:ext uri="smNativeData">
-                <pr:smNativeData xmlns="" xmlns:p14="http://schemas.microsoft.com/office/powerpoint/2010/main" xmlns:pr="smNativeData" val="SMDATA_13_w78LXxMAAAAlAAAAZAAAAA0AAAAAkAAAAEgAAACQAAAASAAAAAAAAAABAAAAAAAAAAEAAABQAAAAAAAAAAAA4D8AAAAAAADgPwAAAAAAAOA/AAAAAAAA4D8AAAAAAADgPwAAAAAAAOA/AAAAAAAA4D8AAAAAAADgPwAAAAAAAOA/AAAAAAAA4D8CAAAAjAAAAAAAAAAAAAAAkMImDP///wgAAAAAAAAAAAAAAAAAAAAAAAAAAAAAAAAAAAAAZAAAAAEAAABAAAAAAAAAAAAAAAAAAAAAAAAAAAAAAAAAAAAAAAAAAAAAAAAAAAAAAAAAAAAAAAAAAAAAAAAAAAAAAAAAAAAAAAAAAAAAAAAAAAAAAAAAAAAAAAAAAAAAFAAAADwAAAAAAAAAAAAAAAAAAAkUAAAAAQAAABQAAAAUAAAAFAAAAAEAAAAAAAAAZAAAAGQAAAAAAAAAZAAAAGQAAAAVAAAAYAAAAAAAAAAAAAAADwAAACADAAAAAAAAAAAAAAEAAACgMgAAVgcAAKr4//8BAAAAf39/AAEAAABkAAAAAAAAABQAAABAHwAAAAAAACYAAAAAAAAAwOD//wAAAAAmAAAAZAAAABYAAABMAAAAAAAAAAAAAAAEAAAAAAAAAAEAAAAsPEMKAAAAACgAAAAoAAAAZAAAAGQAAAAAAAAAzMzMAAAAAABQAAAAUAAAAGQAAABkAAAAAAAAABcAAAAUAAAAAAAAAAAAAAD/fwAA/38AAAAAAAAJAAAABAAAAAAAAAAMAAAAEAAAAAAAAAAAAAAAAAAAAAAAAAAeAAAAaAAAAAAAAAAAAAAAAAAAAAAAAAAAAAAAECcAABAnAAAAAAAAAAAAAAAAAAAAAAAAAAAAAAAAAAAAAAAAAAAAABQAAAAAAAAAwMD/AAAAAABkAAAAMgAAAAAAAABkAAAAAAAAAH9/fwAKAAAAHwAAAFQAAAAAAAAFAAAAAQAAAAAAAAAAAAAAAAAAAAAAAAAAAAAAAAAAAAAAAAAAAAAAAn9/fwAAAAADzMzMAMDA/wB/f38AAAAAAAAAAAAAAAAAAAAAAAAAAAAhAAAAGAAAABQAAADZNAAAKiUAAA05AABpJwAAEAAAACYAAAAIAAAAPLAAAP8fAAA="/>
+                <pr:smNativeData xmlns:pr="smNativeData" xmlns:p14="http://schemas.microsoft.com/office/powerpoint/2010/main" xmlns="" val="SMDATA_13_w78LXxMAAAAlAAAAZAAAAA0AAAAAkAAAAEgAAACQAAAASAAAAAAAAAABAAAAAAAAAAEAAABQAAAAAAAAAAAA4D8AAAAAAADgPwAAAAAAAOA/AAAAAAAA4D8AAAAAAADgPwAAAAAAAOA/AAAAAAAA4D8AAAAAAADgPwAAAAAAAOA/AAAAAAAA4D8CAAAAjAAAAAAAAAAAAAAAkMImDP///wgAAAAAAAAAAAAAAAAAAAAAAAAAAAAAAAAAAAAAZAAAAAEAAABAAAAAAAAAAAAAAAAAAAAAAAAAAAAAAAAAAAAAAAAAAAAAAAAAAAAAAAAAAAAAAAAAAAAAAAAAAAAAAAAAAAAAAAAAAAAAAAAAAAAAAAAAAAAAAAAAAAAAFAAAADwAAAAAAAAAAAAAAAAAAAkUAAAAAQAAABQAAAAUAAAAFAAAAAEAAAAAAAAAZAAAAGQAAAAAAAAAZAAAAGQAAAAVAAAAYAAAAAAAAAAAAAAADwAAACADAAAAAAAAAAAAAAEAAACgMgAAVgcAAKr4//8BAAAAf39/AAEAAABkAAAAAAAAABQAAABAHwAAAAAAACYAAAAAAAAAwOD//wAAAAAmAAAAZAAAABYAAABMAAAAAAAAAAAAAAAEAAAAAAAAAAEAAAAsPEMKAAAAACgAAAAoAAAAZAAAAGQAAAAAAAAAzMzMAAAAAABQAAAAUAAAAGQAAABkAAAAAAAAABcAAAAUAAAAAAAAAAAAAAD/fwAA/38AAAAAAAAJAAAABAAAAAAAAAAMAAAAEAAAAAAAAAAAAAAAAAAAAAAAAAAeAAAAaAAAAAAAAAAAAAAAAAAAAAAAAAAAAAAAECcAABAnAAAAAAAAAAAAAAAAAAAAAAAAAAAAAAAAAAAAAAAAAAAAABQAAAAAAAAAwMD/AAAAAABkAAAAMgAAAAAAAABkAAAAAAAAAH9/fwAKAAAAHwAAAFQAAAAAAAAFAAAAAQAAAAAAAAAAAAAAAAAAAAAAAAAAAAAAAAAAAAAAAAAAAAAAAn9/fwAAAAADzMzMAMDA/wB/f38AAAAAAAAAAAAAAAAAAAAAAAAAAAAhAAAAGAAAABQAAADZNAAAKiUAAA05AABpJwAAEAAAACYAAAAIAAAAPLAAAP8fAAA="/>
               </a:ext>
             </a:extLst>
           </p:cNvSpPr>
@@ -11729,7 +11734,7 @@
             <a:spLocks noGrp="1" noChangeArrowheads="1"/>
             <a:extLst>
               <a:ext uri="smNativeData">
-                <pr:smNativeData xmlns="" xmlns:p14="http://schemas.microsoft.com/office/powerpoint/2010/main" xmlns:pr="smNativeData" val="SMDATA_13_w78LXxMAAAAlAAAAZAAAAA0AAAAAkAAAAJAAAACQAAAAkAAAAAAAAAAAAAAAAAAAAAEAAABQAAAAAAAAAAAA4D8AAAAAAADgPwAAAAAAAOA/AAAAAAAA4D8AAAAAAADgPwAAAAAAAOA/AAAAAAAA4D8AAAAAAADgPwAAAAAAAOA/AAAAAAAA4D8CAAAAjAAAAAAAAAAAAAAAkMImDP///wgAAAAAAAAAAAAAAAAAAAAAAAAAAAAAAAAAAAAAZAAAAAEAAABAAAAAAAAAAAAAAAAAAAAAAAAAAAAAAAAAAAAAAAAAAAAAAAAAAAAAAAAAAAAAAAAAAAAAAAAAAAAAAAAAAAAAAAAAAAAAAAAAAAAAAAAAAAAAAAAAAAAAFAAAADwAAAAAAAAAAAAAAAAAAAkUAAAAAQAAABQAAAAUAAAAFAAAAAEAAAAAAAAAZAAAAGQAAAAAAAAAZAAAAGQAAAAVAAAAYAAAAAAAAAAAAAAADwAAACADAAAAAAAAAAAAAAEAAACgMgAAVgcAAKr4//8BAAAAf39/AAEAAABkAAAAAAAAABQAAABAHwAAAAAAACYAAAAAAAAAwOD//wAAAAAmAAAAZAAAABYAAABMAAAAAAAAAAAAAAAEAAAAAAAAAAEAAAAsPEMKAAAAACgAAAAoAAAAZAAAAGQAAAAAAAAAzMzMAAAAAABQAAAAUAAAAGQAAABkAAAAAAAAABcAAAAUAAAAAAAAAAAAAAD/fwAA/38AAAAAAAAJAAAABAAAAAAAAAAMAAAAEAAAAAAAAAAAAAAAAAAAAAAAAAAeAAAAaAAAAAAAAAAAAAAAAAAAAAAAAAAAAAAAECcAABAnAAAAAAAAAAAAAAAAAAAAAAAAAAAAAAAAAAAAAAAAAAAAABQAAAAAAAAAwMD/AAAAAABkAAAAMgAAAAAAAABkAAAAAAAAAH9/fwAKAAAAHwAAAFQAAAAAAAAFAAAAAQAAAAAAAAAAAAAAAAAAAAAAAAAAAAAAAAAAAAAAAAAAAAAAAn9/fwAAAAADzMzMAMDA/wB/f38AAAAAAAAAAAAAAAAAAAAAAAAAAAAhAAAAGAAAABQAAAArBAAAwAMAAA05AADgCwAAEAAAACYAAAAIAAAAPJAAAP8fAAA="/>
+                <pr:smNativeData xmlns:pr="smNativeData" xmlns:p14="http://schemas.microsoft.com/office/powerpoint/2010/main" xmlns="" val="SMDATA_13_w78LXxMAAAAlAAAAZAAAAA0AAAAAkAAAAJAAAACQAAAAkAAAAAAAAAAAAAAAAAAAAAEAAABQAAAAAAAAAAAA4D8AAAAAAADgPwAAAAAAAOA/AAAAAAAA4D8AAAAAAADgPwAAAAAAAOA/AAAAAAAA4D8AAAAAAADgPwAAAAAAAOA/AAAAAAAA4D8CAAAAjAAAAAAAAAAAAAAAkMImDP///wgAAAAAAAAAAAAAAAAAAAAAAAAAAAAAAAAAAAAAZAAAAAEAAABAAAAAAAAAAAAAAAAAAAAAAAAAAAAAAAAAAAAAAAAAAAAAAAAAAAAAAAAAAAAAAAAAAAAAAAAAAAAAAAAAAAAAAAAAAAAAAAAAAAAAAAAAAAAAAAAAAAAAFAAAADwAAAAAAAAAAAAAAAAAAAkUAAAAAQAAABQAAAAUAAAAFAAAAAEAAAAAAAAAZAAAAGQAAAAAAAAAZAAAAGQAAAAVAAAAYAAAAAAAAAAAAAAADwAAACADAAAAAAAAAAAAAAEAAACgMgAAVgcAAKr4//8BAAAAf39/AAEAAABkAAAAAAAAABQAAABAHwAAAAAAACYAAAAAAAAAwOD//wAAAAAmAAAAZAAAABYAAABMAAAAAAAAAAAAAAAEAAAAAAAAAAEAAAAsPEMKAAAAACgAAAAoAAAAZAAAAGQAAAAAAAAAzMzMAAAAAABQAAAAUAAAAGQAAABkAAAAAAAAABcAAAAUAAAAAAAAAAAAAAD/fwAA/38AAAAAAAAJAAAABAAAAAAAAAAMAAAAEAAAAAAAAAAAAAAAAAAAAAAAAAAeAAAAaAAAAAAAAAAAAAAAAAAAAAAAAAAAAAAAECcAABAnAAAAAAAAAAAAAAAAAAAAAAAAAAAAAAAAAAAAAAAAAAAAABQAAAAAAAAAwMD/AAAAAABkAAAAMgAAAAAAAABkAAAAAAAAAH9/fwAKAAAAHwAAAFQAAAAAAAAFAAAAAQAAAAAAAAAAAAAAAAAAAAAAAAAAAAAAAAAAAAAAAAAAAAAAAn9/fwAAAAADzMzMAMDA/wB/f38AAAAAAAAAAAAAAAAAAAAAAAAAAAAhAAAAGAAAABQAAAArBAAAwAMAAA05AADgCwAAEAAAACYAAAAIAAAAPJAAAP8fAAA="/>
               </a:ext>
             </a:extLst>
           </p:cNvSpPr>
@@ -11892,7 +11897,7 @@
             <a:spLocks noGrp="1" noChangeArrowheads="1"/>
             <a:extLst>
               <a:ext uri="smNativeData">
-                <pr:smNativeData xmlns="" xmlns:p14="http://schemas.microsoft.com/office/powerpoint/2010/main" xmlns:pr="smNativeData" val="SMDATA_13_w78LXxMAAAAlAAAAZAAAAA0AAAAAkAAAAJAAAACQAAAAkAAAAAAAAAAAAAAAAAAAAAEAAABQAAAAAAAAAAAA4D8AAAAAAADgPwAAAAAAAOA/AAAAAAAA4D8AAAAAAADgPwAAAAAAAOA/AAAAAAAA4D8AAAAAAADgPwAAAAAAAOA/AAAAAAAA4D8CAAAAjAAAAAAAAAAAAAAAkMImDP///wgAAAAAAAAAAAAAAAAAAAAAAAAAAAAAAAAAAAAAZAAAAAEAAABAAAAAAAAAAAAAAAAAAAAAAAAAAAAAAAAAAAAAAAAAAAAAAAAAAAAAAAAAAAAAAAAAAAAAAAAAAAAAAAAAAAAAAAAAAAAAAAAAAAAAAAAAAAAAAAAAAAAAFAAAADwAAAAAAAAAAAAAAAAAAAkUAAAAAQAAABQAAAAUAAAAFAAAAAEAAAAAAAAAZAAAAGQAAAAAAAAAZAAAAGQAAAAVAAAAYAAAAAAAAAAAAAAADwAAACADAAAAAAAAAAAAAAEAAACgMgAAVgcAAKr4//8BAAAAf39/AAEAAABkAAAAAAAAABQAAABAHwAAAAAAACYAAAAAAAAAwOD//wAAAAAmAAAAZAAAABYAAABMAAAAAAAAAAAAAAAEAAAAAAAAAAEAAAAsPEMKAAAAACgAAAAoAAAAZAAAAGQAAAAAAAAAzMzMAAAAAABQAAAAUAAAAGQAAABkAAAAAAAAABcAAAAUAAAAAAAAAAAAAAD/fwAA/38AAAAAAAAJAAAABAAAAAAAAAAMAAAAEAAAAAAAAAAAAAAAAAAAAAAAAAAeAAAAaAAAAAAAAAAAAAAAAAAAAAAAAAAAAAAAECcAABAnAAAAAAAAAAAAAAAAAAAAAAAAAAAAAAAAAAAAAAAAAAAAABQAAAAAAAAAwMD/AAAAAABkAAAAMgAAAAAAAABkAAAAAAAAAH9/fwAKAAAAHwAAAFQAAAAAAAAFAAAAAQAAAAAAAAAAAAAAAAAAAAAAAAAAAAAAAAAAAAAAAAAAAAAAAn9/fwAAAAADzMzMAMDA/wB/f38AAAAAAAAAAAAAAAAAAAAAAAAAAAAhAAAAGAAAABQAAAArBAAASw0AAA05AAAqJQAAEAAAACYAAAAIAAAAPJIAAP8fAAA="/>
+                <pr:smNativeData xmlns:pr="smNativeData" xmlns:p14="http://schemas.microsoft.com/office/powerpoint/2010/main" xmlns="" val="SMDATA_13_w78LXxMAAAAlAAAAZAAAAA0AAAAAkAAAAJAAAACQAAAAkAAAAAAAAAAAAAAAAAAAAAEAAABQAAAAAAAAAAAA4D8AAAAAAADgPwAAAAAAAOA/AAAAAAAA4D8AAAAAAADgPwAAAAAAAOA/AAAAAAAA4D8AAAAAAADgPwAAAAAAAOA/AAAAAAAA4D8CAAAAjAAAAAAAAAAAAAAAkMImDP///wgAAAAAAAAAAAAAAAAAAAAAAAAAAAAAAAAAAAAAZAAAAAEAAABAAAAAAAAAAAAAAAAAAAAAAAAAAAAAAAAAAAAAAAAAAAAAAAAAAAAAAAAAAAAAAAAAAAAAAAAAAAAAAAAAAAAAAAAAAAAAAAAAAAAAAAAAAAAAAAAAAAAAFAAAADwAAAAAAAAAAAAAAAAAAAkUAAAAAQAAABQAAAAUAAAAFAAAAAEAAAAAAAAAZAAAAGQAAAAAAAAAZAAAAGQAAAAVAAAAYAAAAAAAAAAAAAAADwAAACADAAAAAAAAAAAAAAEAAACgMgAAVgcAAKr4//8BAAAAf39/AAEAAABkAAAAAAAAABQAAABAHwAAAAAAACYAAAAAAAAAwOD//wAAAAAmAAAAZAAAABYAAABMAAAAAAAAAAAAAAAEAAAAAAAAAAEAAAAsPEMKAAAAACgAAAAoAAAAZAAAAGQAAAAAAAAAzMzMAAAAAABQAAAAUAAAAGQAAABkAAAAAAAAABcAAAAUAAAAAAAAAAAAAAD/fwAA/38AAAAAAAAJAAAABAAAAAAAAAAMAAAAEAAAAAAAAAAAAAAAAAAAAAAAAAAeAAAAaAAAAAAAAAAAAAAAAAAAAAAAAAAAAAAAECcAABAnAAAAAAAAAAAAAAAAAAAAAAAAAAAAAAAAAAAAAAAAAAAAABQAAAAAAAAAwMD/AAAAAABkAAAAMgAAAAAAAABkAAAAAAAAAH9/fwAKAAAAHwAAAFQAAAAAAAAFAAAAAQAAAAAAAAAAAAAAAAAAAAAAAAAAAAAAAAAAAAAAAAAAAAAAAn9/fwAAAAADzMzMAMDA/wB/f38AAAAAAAAAAAAAAAAAAAAAAAAAAAAhAAAAGAAAABQAAAArBAAASw0AAA05AAAqJQAAEAAAACYAAAAIAAAAPJIAAP8fAAA="/>
               </a:ext>
             </a:extLst>
           </p:cNvSpPr>
@@ -12128,7 +12133,7 @@
             <a:spLocks noGrp="1" noChangeArrowheads="1"/>
             <a:extLst>
               <a:ext uri="smNativeData">
-                <pr:smNativeData xmlns="" xmlns:p14="http://schemas.microsoft.com/office/powerpoint/2010/main" xmlns:pr="smNativeData" val="SMDATA_13_w78LXxMAAAAlAAAAZAAAAA0AAAAAkAAAAJAAAACQAAAAkAAAAAAAAAABAAAAAAAAAAEAAABQAAAAAAAAAAAA4D8AAAAAAADgPwAAAAAAAOA/AAAAAAAA4D8AAAAAAADgPwAAAAAAAOA/AAAAAAAA4D8AAAAAAADgPwAAAAAAAOA/AAAAAAAA4D8CAAAAjAAAAAAAAAAAAAAAkMImDP///wgAAAAAAAAAAAAAAAAAAAAAAAAAAAAAAAAAAAAAZAAAAAEAAABAAAAAAAAAAAAAAAAAAAAAAAAAAAAAAAAAAAAAAAAAAAAAAAAAAAAAAAAAAAAAAAAAAAAAAAAAAAAAAAAAAAAAAAAAAAAAAAAAAAAAAAAAAAAAAAAAAAAAFAAAADwAAAAAAAAAAAAAAAAAAAkUAAAAAQAAABQAAAAUAAAAFAAAAAEAAAAAAAAAZAAAAGQAAAAAAAAAZAAAAGQAAAAVAAAAYAAAAAAAAAAAAAAADwAAACADAAAAAAAAAAAAAAEAAACgMgAAVgcAAKr4//8BAAAAf39/AAEAAABkAAAAAAAAABQAAABAHwAAAAAAACYAAAAAAAAAwOD//wAAAAAmAAAAZAAAABYAAABMAAAAAAAAAAAAAAAEAAAAAAAAAAEAAAAsPEMKAAAAACgAAAAoAAAAZAAAAGQAAAAAAAAAzMzMAAAAAABQAAAAUAAAAGQAAABkAAAAAAAAABcAAAAUAAAAAAAAAAAAAAD/fwAA/38AAAAAAAAJAAAABAAAAAAAAAAMAAAAEAAAAAAAAAAAAAAAAAAAAAAAAAAeAAAAaAAAAAAAAAAAAAAAAAAAAAAAAAAAAAAAECcAABAnAAAAAAAAAAAAAAAAAAAAAAAAAAAAAAAAAAAAAAAAAAAAABQAAAAAAAAAwMD/AAAAAABkAAAAMgAAAAAAAABkAAAAAAAAAH9/fwAKAAAAHwAAAFQAAAAAAAAFAAAAAQAAAAAAAAAAAAAAAAAAAAAAAAAAAAAAAAAAAAAAAAAAAAAAAn9/fwAAAAADzMzMAMDA/wB/f38AAAAAAAAAAAAAAAAAAAAAAAAAAAAhAAAAGAAAABQAAABTLAAAKiUAAO8xAABpJwAAEAAAACYAAAAIAAAAPJAAAP8fAAA="/>
+                <pr:smNativeData xmlns:pr="smNativeData" xmlns:p14="http://schemas.microsoft.com/office/powerpoint/2010/main" xmlns="" val="SMDATA_13_w78LXxMAAAAlAAAAZAAAAA0AAAAAkAAAAJAAAACQAAAAkAAAAAAAAAABAAAAAAAAAAEAAABQAAAAAAAAAAAA4D8AAAAAAADgPwAAAAAAAOA/AAAAAAAA4D8AAAAAAADgPwAAAAAAAOA/AAAAAAAA4D8AAAAAAADgPwAAAAAAAOA/AAAAAAAA4D8CAAAAjAAAAAAAAAAAAAAAkMImDP///wgAAAAAAAAAAAAAAAAAAAAAAAAAAAAAAAAAAAAAZAAAAAEAAABAAAAAAAAAAAAAAAAAAAAAAAAAAAAAAAAAAAAAAAAAAAAAAAAAAAAAAAAAAAAAAAAAAAAAAAAAAAAAAAAAAAAAAAAAAAAAAAAAAAAAAAAAAAAAAAAAAAAAFAAAADwAAAAAAAAAAAAAAAAAAAkUAAAAAQAAABQAAAAUAAAAFAAAAAEAAAAAAAAAZAAAAGQAAAAAAAAAZAAAAGQAAAAVAAAAYAAAAAAAAAAAAAAADwAAACADAAAAAAAAAAAAAAEAAACgMgAAVgcAAKr4//8BAAAAf39/AAEAAABkAAAAAAAAABQAAABAHwAAAAAAACYAAAAAAAAAwOD//wAAAAAmAAAAZAAAABYAAABMAAAAAAAAAAAAAAAEAAAAAAAAAAEAAAAsPEMKAAAAACgAAAAoAAAAZAAAAGQAAAAAAAAAzMzMAAAAAABQAAAAUAAAAGQAAABkAAAAAAAAABcAAAAUAAAAAAAAAAAAAAD/fwAA/38AAAAAAAAJAAAABAAAAAAAAAAMAAAAEAAAAAAAAAAAAAAAAAAAAAAAAAAeAAAAaAAAAAAAAAAAAAAAAAAAAAAAAAAAAAAAECcAABAnAAAAAAAAAAAAAAAAAAAAAAAAAAAAAAAAAAAAAAAAAAAAABQAAAAAAAAAwMD/AAAAAABkAAAAMgAAAAAAAABkAAAAAAAAAH9/fwAKAAAAHwAAAFQAAAAAAAAFAAAAAQAAAAAAAAAAAAAAAAAAAAAAAAAAAAAAAAAAAAAAAAAAAAAAAn9/fwAAAAADzMzMAMDA/wB/f38AAAAAAAAAAAAAAAAAAAAAAAAAAAAhAAAAGAAAABQAAABTLAAAKiUAAO8xAABpJwAAEAAAACYAAAAIAAAAPJAAAP8fAAA="/>
               </a:ext>
             </a:extLst>
           </p:cNvSpPr>
@@ -12315,7 +12320,7 @@
             <a:spLocks noGrp="1" noChangeArrowheads="1"/>
             <a:extLst>
               <a:ext uri="smNativeData">
-                <pr:smNativeData xmlns="" xmlns:p14="http://schemas.microsoft.com/office/powerpoint/2010/main" xmlns:pr="smNativeData" val="SMDATA_13_w78LXxMAAAAlAAAAZAAAAA0AAAAAkAAAAJAAAACQAAAAkAAAAAAAAAABAAAAAAAAAAEAAABQAAAAAAAAAAAA4D8AAAAAAADgPwAAAAAAAOA/AAAAAAAA4D8AAAAAAADgPwAAAAAAAOA/AAAAAAAA4D8AAAAAAADgPwAAAAAAAOA/AAAAAAAA4D8CAAAAjAAAAAAAAAAAAAAAkMImDP///wgAAAAAAAAAAAAAAAAAAAAAAAAAAAAAAAAAAAAAZAAAAAEAAABAAAAAAAAAAAAAAAAAAAAAAAAAAAAAAAAAAAAAAAAAAAAAAAAAAAAAAAAAAAAAAAAAAAAAAAAAAAAAAAAAAAAAAAAAAAAAAAAAAAAAAAAAAAAAAAAAAAAAFAAAADwAAAAAAAAAAAAAAAAAAAkUAAAAAQAAABQAAAAUAAAAFAAAAAEAAAAAAAAAZAAAAGQAAAAAAAAAZAAAAGQAAAAVAAAAYAAAAAAAAAAAAAAADwAAACADAAAAAAAAAAAAAAEAAACgMgAAVgcAAKr4//8BAAAAf39/AAEAAABkAAAAAAAAABQAAABAHwAAAAAAACYAAAAAAAAAwOD//wAAAAAmAAAAZAAAABYAAABMAAAAAAAAAAAAAAAEAAAAAAAAAAEAAAAsPEMKAAAAACgAAAAoAAAAZAAAAGQAAAAAAAAAzMzMAAAAAABQAAAAUAAAAGQAAABkAAAAAAAAABcAAAAUAAAAAAAAAAAAAAD/fwAA/38AAAAAAAAJAAAABAAAAAAAAAAMAAAAEAAAAAAAAAAAAAAAAAAAAAAAAAAeAAAAaAAAAAAAAAAAAAAAAAAAAAAAAAAAAAAAECcAABAnAAAAAAAAAAAAAAAAAAAAAAAAAAAAAAAAAAAAAAAAAAAAABQAAAAAAAAAwMD/AAAAAABkAAAAMgAAAAAAAABkAAAAAAAAAH9/fwAKAAAAHwAAAFQAAAAAAAAFAAAAAQAAAAAAAAAAAAAAAAAAAAAAAAAAAAAAAAAAAAAAAAAAAAAAAn9/fwAAAAADzMzMAMDA/wB/f38AAAAAAAAAAAAAAAAAAAAAAAAAAAAhAAAAGAAAABQAAAArBAAAKiUAAOgqAABpJwAAEAAAACYAAAAIAAAAPJAAAP8fAAA="/>
+                <pr:smNativeData xmlns:pr="smNativeData" xmlns:p14="http://schemas.microsoft.com/office/powerpoint/2010/main" xmlns="" val="SMDATA_13_w78LXxMAAAAlAAAAZAAAAA0AAAAAkAAAAJAAAACQAAAAkAAAAAAAAAABAAAAAAAAAAEAAABQAAAAAAAAAAAA4D8AAAAAAADgPwAAAAAAAOA/AAAAAAAA4D8AAAAAAADgPwAAAAAAAOA/AAAAAAAA4D8AAAAAAADgPwAAAAAAAOA/AAAAAAAA4D8CAAAAjAAAAAAAAAAAAAAAkMImDP///wgAAAAAAAAAAAAAAAAAAAAAAAAAAAAAAAAAAAAAZAAAAAEAAABAAAAAAAAAAAAAAAAAAAAAAAAAAAAAAAAAAAAAAAAAAAAAAAAAAAAAAAAAAAAAAAAAAAAAAAAAAAAAAAAAAAAAAAAAAAAAAAAAAAAAAAAAAAAAAAAAAAAAFAAAADwAAAAAAAAAAAAAAAAAAAkUAAAAAQAAABQAAAAUAAAAFAAAAAEAAAAAAAAAZAAAAGQAAAAAAAAAZAAAAGQAAAAVAAAAYAAAAAAAAAAAAAAADwAAACADAAAAAAAAAAAAAAEAAACgMgAAVgcAAKr4//8BAAAAf39/AAEAAABkAAAAAAAAABQAAABAHwAAAAAAACYAAAAAAAAAwOD//wAAAAAmAAAAZAAAABYAAABMAAAAAAAAAAAAAAAEAAAAAAAAAAEAAAAsPEMKAAAAACgAAAAoAAAAZAAAAGQAAAAAAAAAzMzMAAAAAABQAAAAUAAAAGQAAABkAAAAAAAAABcAAAAUAAAAAAAAAAAAAAD/fwAA/38AAAAAAAAJAAAABAAAAAAAAAAMAAAAEAAAAAAAAAAAAAAAAAAAAAAAAAAeAAAAaAAAAAAAAAAAAAAAAAAAAAAAAAAAAAAAECcAABAnAAAAAAAAAAAAAAAAAAAAAAAAAAAAAAAAAAAAAAAAAAAAABQAAAAAAAAAwMD/AAAAAABkAAAAMgAAAAAAAABkAAAAAAAAAH9/fwAKAAAAHwAAAFQAAAAAAAAFAAAAAQAAAAAAAAAAAAAAAAAAAAAAAAAAAAAAAAAAAAAAAAAAAAAAAn9/fwAAAAADzMzMAMDA/wB/f38AAAAAAAAAAAAAAAAAAAAAAAAAAAAhAAAAGAAAABQAAAArBAAAKiUAAOgqAABpJwAAEAAAACYAAAAIAAAAPJAAAP8fAAA="/>
               </a:ext>
             </a:extLst>
           </p:cNvSpPr>
@@ -12502,7 +12507,7 @@
             <a:spLocks noGrp="1" noChangeArrowheads="1"/>
             <a:extLst>
               <a:ext uri="smNativeData">
-                <pr:smNativeData xmlns="" xmlns:p14="http://schemas.microsoft.com/office/powerpoint/2010/main" xmlns:pr="smNativeData" val="SMDATA_13_w78LXxMAAAAlAAAAZAAAAA0AAAAAkAAAAEgAAACQAAAASAAAAAAAAAABAAAAAAAAAAEAAABQAAAAAAAAAAAA4D8AAAAAAADgPwAAAAAAAOA/AAAAAAAA4D8AAAAAAADgPwAAAAAAAOA/AAAAAAAA4D8AAAAAAADgPwAAAAAAAOA/AAAAAAAA4D8CAAAAjAAAAAAAAAAAAAAAkMImDP///wgAAAAAAAAAAAAAAAAAAAAAAAAAAAAAAAAAAAAAZAAAAAEAAABAAAAAAAAAAAAAAAAAAAAAAAAAAAAAAAAAAAAAAAAAAAAAAAAAAAAAAAAAAAAAAAAAAAAAAAAAAAAAAAAAAAAAAAAAAAAAAAAAAAAAAAAAAAAAAAAAAAAAFAAAADwAAAAAAAAAAAAAAAAAAAkUAAAAAQAAABQAAAAUAAAAFAAAAAEAAAAAAAAAZAAAAGQAAAAAAAAAZAAAAGQAAAAVAAAAYAAAAAAAAAAAAAAADwAAACADAAAAAAAAAAAAAAEAAACgMgAAVgcAAKr4//8BAAAAf39/AAEAAABkAAAAAAAAABQAAABAHwAAAAAAACYAAAAAAAAAwOD//wAAAAAmAAAAZAAAABYAAABMAAAAAAAAAAAAAAAEAAAAAAAAAAEAAAAsPEMKAAAAACgAAAAoAAAAZAAAAGQAAAAAAAAAzMzMAAAAAABQAAAAUAAAAGQAAABkAAAAAAAAABcAAAAUAAAAAAAAAAAAAAD/fwAA/38AAAAAAAAJAAAABAAAAAAAAAAMAAAAEAAAAAAAAAAAAAAAAAAAAAAAAAAeAAAAaAAAAAAAAAAAAAAAAAAAAAAAAAAAAAAAECcAABAnAAAAAAAAAAAAAAAAAAAAAAAAAAAAAAAAAAAAAAAAAAAAABQAAAAAAAAAwMD/AAAAAABkAAAAMgAAAAAAAABkAAAAAAAAAH9/fwAKAAAAHwAAAFQAAAAAAAAFAAAAAQAAAAAAAAAAAAAAAAAAAAAAAAAAAAAAAAAAAAAAAAAAAAAAAn9/fwAAAAADzMzMAMDA/wB/f38AAAAAAAAAAAAAAAAAAAAAAAAAAAAhAAAAGAAAABQAAADZNAAAKiUAAA05AABpJwAAEAAAACYAAAAIAAAAPLAAAP8fAAA="/>
+                <pr:smNativeData xmlns:pr="smNativeData" xmlns:p14="http://schemas.microsoft.com/office/powerpoint/2010/main" xmlns="" val="SMDATA_13_w78LXxMAAAAlAAAAZAAAAA0AAAAAkAAAAEgAAACQAAAASAAAAAAAAAABAAAAAAAAAAEAAABQAAAAAAAAAAAA4D8AAAAAAADgPwAAAAAAAOA/AAAAAAAA4D8AAAAAAADgPwAAAAAAAOA/AAAAAAAA4D8AAAAAAADgPwAAAAAAAOA/AAAAAAAA4D8CAAAAjAAAAAAAAAAAAAAAkMImDP///wgAAAAAAAAAAAAAAAAAAAAAAAAAAAAAAAAAAAAAZAAAAAEAAABAAAAAAAAAAAAAAAAAAAAAAAAAAAAAAAAAAAAAAAAAAAAAAAAAAAAAAAAAAAAAAAAAAAAAAAAAAAAAAAAAAAAAAAAAAAAAAAAAAAAAAAAAAAAAAAAAAAAAFAAAADwAAAAAAAAAAAAAAAAAAAkUAAAAAQAAABQAAAAUAAAAFAAAAAEAAAAAAAAAZAAAAGQAAAAAAAAAZAAAAGQAAAAVAAAAYAAAAAAAAAAAAAAADwAAACADAAAAAAAAAAAAAAEAAACgMgAAVgcAAKr4//8BAAAAf39/AAEAAABkAAAAAAAAABQAAABAHwAAAAAAACYAAAAAAAAAwOD//wAAAAAmAAAAZAAAABYAAABMAAAAAAAAAAAAAAAEAAAAAAAAAAEAAAAsPEMKAAAAACgAAAAoAAAAZAAAAGQAAAAAAAAAzMzMAAAAAABQAAAAUAAAAGQAAABkAAAAAAAAABcAAAAUAAAAAAAAAAAAAAD/fwAA/38AAAAAAAAJAAAABAAAAAAAAAAMAAAAEAAAAAAAAAAAAAAAAAAAAAAAAAAeAAAAaAAAAAAAAAAAAAAAAAAAAAAAAAAAAAAAECcAABAnAAAAAAAAAAAAAAAAAAAAAAAAAAAAAAAAAAAAAAAAAAAAABQAAAAAAAAAwMD/AAAAAABkAAAAMgAAAAAAAABkAAAAAAAAAH9/fwAKAAAAHwAAAFQAAAAAAAAFAAAAAQAAAAAAAAAAAAAAAAAAAAAAAAAAAAAAAAAAAAAAAAAAAAAAAn9/fwAAAAADzMzMAMDA/wB/f38AAAAAAAAAAAAAAAAAAAAAAAAAAAAhAAAAGAAAABQAAADZNAAAKiUAAA05AABpJwAAEAAAACYAAAAIAAAAPLAAAP8fAAA="/>
               </a:ext>
             </a:extLst>
           </p:cNvSpPr>
@@ -12694,7 +12699,7 @@
             <a:spLocks noGrp="1" noChangeArrowheads="1"/>
             <a:extLst>
               <a:ext uri="smNativeData">
-                <pr:smNativeData xmlns="" xmlns:p14="http://schemas.microsoft.com/office/powerpoint/2010/main" xmlns:pr="smNativeData" val="SMDATA_13_w78LXxMAAAAlAAAAZAAAAA0AAAAAkAAAAJAAAACQAAAAkAAAAAAAAAABAAAAAAAAAAEAAABQAAAAAAAAAAAA4D8AAAAAAADgPwAAAAAAAOA/AAAAAAAA4D8AAAAAAADgPwAAAAAAAOA/AAAAAAAA4D8AAAAAAADgPwAAAAAAAOA/AAAAAAAA4D8CAAAAjAAAAAAAAAAAAAAAkMImDP///wgAAAAAAAAAAAAAAAAAAAAAAAAAAAAAAAAAAAAAZAAAAAEAAABAAAAAAAAAAAAAAAAAAAAAAAAAAAAAAAAAAAAAAAAAAAAAAAAAAAAAAAAAAAAAAAAAAAAAAAAAAAAAAAAAAAAAAAAAAAAAAAAAAAAAAAAAAAAAAAAAAAAAFAAAADwAAAAAAAAAAAAAAAAAAAkUAAAAAQAAABQAAAAUAAAAFAAAAAEAAAAAAAAAZAAAAGQAAAAAAAAAZAAAAGQAAAAVAAAAYAAAAAAAAAAAAAAADwAAACADAAAAAAAAAAAAAAEAAACgMgAAVgcAAKr4//8BAAAAf39/AAEAAABkAAAAAAAAABQAAABAHwAAAAAAACYAAAAAAAAAwOD//wAAAAAmAAAAZAAAABYAAABMAAAAAAAAAAAAAAAEAAAAAAAAAAEAAAAsPEMKAAAAACgAAAAoAAAAZAAAAGQAAAAAAAAAzMzMAAAAAABQAAAAUAAAAGQAAABkAAAAAAAAABcAAAAUAAAAAAAAAAAAAAD/fwAA/38AAAAAAAAJAAAABAAAAAAAAAAMAAAAEAAAAAAAAAAAAAAAAAAAAAAAAAAeAAAAaAAAAAAAAAAAAAAAAAAAAAAAAAAAAAAAECcAABAnAAAAAAAAAAAAAAAAAAAAAAAAAAAAAAAAAAAAAAAAAAAAABQAAAAAAAAAwMD/AAAAAABkAAAAMgAAAAAAAABkAAAAAAAAAH9/fwAKAAAAHwAAAFQAAAAAAAAFAAAAAQAAAAAAAAAAAAAAAAAAAAAAAAAAAAAAAAAAAAAAAAAAAAAAAn9/fwAAAAADzMzMAMDA/wB/f38AAAAAAAAAAAAAAAAAAAAAAAAAAAAhAAAAGAAAABQAAAAEMQAAwAMAAAo5AAAOJAAAEAAAACYAAAAIAAAAvZIAAP8fAAA="/>
+                <pr:smNativeData xmlns:pr="smNativeData" xmlns:p14="http://schemas.microsoft.com/office/powerpoint/2010/main" xmlns="" val="SMDATA_13_w78LXxMAAAAlAAAAZAAAAA0AAAAAkAAAAJAAAACQAAAAkAAAAAAAAAABAAAAAAAAAAEAAABQAAAAAAAAAAAA4D8AAAAAAADgPwAAAAAAAOA/AAAAAAAA4D8AAAAAAADgPwAAAAAAAOA/AAAAAAAA4D8AAAAAAADgPwAAAAAAAOA/AAAAAAAA4D8CAAAAjAAAAAAAAAAAAAAAkMImDP///wgAAAAAAAAAAAAAAAAAAAAAAAAAAAAAAAAAAAAAZAAAAAEAAABAAAAAAAAAAAAAAAAAAAAAAAAAAAAAAAAAAAAAAAAAAAAAAAAAAAAAAAAAAAAAAAAAAAAAAAAAAAAAAAAAAAAAAAAAAAAAAAAAAAAAAAAAAAAAAAAAAAAAFAAAADwAAAAAAAAAAAAAAAAAAAkUAAAAAQAAABQAAAAUAAAAFAAAAAEAAAAAAAAAZAAAAGQAAAAAAAAAZAAAAGQAAAAVAAAAYAAAAAAAAAAAAAAADwAAACADAAAAAAAAAAAAAAEAAACgMgAAVgcAAKr4//8BAAAAf39/AAEAAABkAAAAAAAAABQAAABAHwAAAAAAACYAAAAAAAAAwOD//wAAAAAmAAAAZAAAABYAAABMAAAAAAAAAAAAAAAEAAAAAAAAAAEAAAAsPEMKAAAAACgAAAAoAAAAZAAAAGQAAAAAAAAAzMzMAAAAAABQAAAAUAAAAGQAAABkAAAAAAAAABcAAAAUAAAAAAAAAAAAAAD/fwAA/38AAAAAAAAJAAAABAAAAAAAAAAMAAAAEAAAAAAAAAAAAAAAAAAAAAAAAAAeAAAAaAAAAAAAAAAAAAAAAAAAAAAAAAAAAAAAECcAABAnAAAAAAAAAAAAAAAAAAAAAAAAAAAAAAAAAAAAAAAAAAAAABQAAAAAAAAAwMD/AAAAAABkAAAAMgAAAAAAAABkAAAAAAAAAH9/fwAKAAAAHwAAAFQAAAAAAAAFAAAAAQAAAAAAAAAAAAAAAAAAAAAAAAAAAAAAAAAAAAAAAAAAAAAAAn9/fwAAAAADzMzMAMDA/wB/f38AAAAAAAAAAAAAAAAAAAAAAAAAAAAhAAAAGAAAABQAAAAEMQAAwAMAAAo5AAAOJAAAEAAAACYAAAAIAAAAvZIAAP8fAAA="/>
               </a:ext>
             </a:extLst>
           </p:cNvSpPr>
@@ -12861,7 +12866,7 @@
             <a:spLocks noGrp="1" noChangeArrowheads="1"/>
             <a:extLst>
               <a:ext uri="smNativeData">
-                <pr:smNativeData xmlns="" xmlns:p14="http://schemas.microsoft.com/office/powerpoint/2010/main" xmlns:pr="smNativeData" val="SMDATA_13_w78LXxMAAAAlAAAAZAAAAA0AAAAAkAAAAJAAAACQAAAAkAAAAAAAAAAAAAAAAAAAAAEAAABQAAAAAAAAAAAA4D8AAAAAAADgPwAAAAAAAOA/AAAAAAAA4D8AAAAAAADgPwAAAAAAAOA/AAAAAAAA4D8AAAAAAADgPwAAAAAAAOA/AAAAAAAA4D8CAAAAjAAAAAAAAAAAAAAAkMImDP///wgAAAAAAAAAAAAAAAAAAAAAAAAAAAAAAAAAAAAAZAAAAAEAAABAAAAAAAAAAAAAAAAAAAAAAAAAAAAAAAAAAAAAAAAAAAAAAAAAAAAAAAAAAAAAAAAAAAAAAAAAAAAAAAAAAAAAAAAAAAAAAAAAAAAAAAAAAAAAAAAAAAAAFAAAADwAAAAAAAAAAAAAAAAAAAkUAAAAAQAAABQAAAAUAAAAFAAAAAEAAAAAAAAAZAAAAGQAAAAAAAAAZAAAAGQAAAAVAAAAYAAAAAAAAAAAAAAADwAAACADAAAAAAAAAAAAAAEAAACgMgAAVgcAAKr4//8BAAAAf39/AAEAAABkAAAAAAAAABQAAABAHwAAAAAAACYAAAAAAAAAwOD//wAAAAAmAAAAZAAAABYAAABMAAAAAAAAAAAAAAAEAAAAAAAAAAEAAAAsPEMKAAAAACgAAAAoAAAAZAAAAGQAAAAAAAAAzMzMAAAAAABQAAAAUAAAAGQAAABkAAAAAAAAABcAAAAUAAAAAAAAAAAAAAD/fwAA/38AAAAAAAAJAAAABAAAAAAAAAAMAAAAEAAAAAAAAAAAAAAAAAAAAAAAAAAeAAAAaAAAAAAAAAAAAAAAAAAAAAAAAAAAAAAAECcAABAnAAAAAAAAAAAAAAAAAAAAAAAAAAAAAAAAAAAAAAAAAAAAABQAAAAAAAAAwMD/AAAAAABkAAAAMgAAAAAAAABkAAAAAAAAAH9/fwAKAAAAHwAAAFQAAAAAAAAFAAAAAQAAAAAAAAAAAAAAAAAAAAAAAAAAAAAAAAAAAAAAAAAAAAAAAn9/fwAAAAADzMzMAMDA/wB/f38AAAAAAAAAAAAAAAAAAAAAAAAAAAAhAAAAGAAAABQAAAArBAAAwAMAAJkvAAAOJAAAEAAAACYAAAAIAAAAPZIAAP8fAAA="/>
+                <pr:smNativeData xmlns:pr="smNativeData" xmlns:p14="http://schemas.microsoft.com/office/powerpoint/2010/main" xmlns="" val="SMDATA_13_w78LXxMAAAAlAAAAZAAAAA0AAAAAkAAAAJAAAACQAAAAkAAAAAAAAAAAAAAAAAAAAAEAAABQAAAAAAAAAAAA4D8AAAAAAADgPwAAAAAAAOA/AAAAAAAA4D8AAAAAAADgPwAAAAAAAOA/AAAAAAAA4D8AAAAAAADgPwAAAAAAAOA/AAAAAAAA4D8CAAAAjAAAAAAAAAAAAAAAkMImDP///wgAAAAAAAAAAAAAAAAAAAAAAAAAAAAAAAAAAAAAZAAAAAEAAABAAAAAAAAAAAAAAAAAAAAAAAAAAAAAAAAAAAAAAAAAAAAAAAAAAAAAAAAAAAAAAAAAAAAAAAAAAAAAAAAAAAAAAAAAAAAAAAAAAAAAAAAAAAAAAAAAAAAAFAAAADwAAAAAAAAAAAAAAAAAAAkUAAAAAQAAABQAAAAUAAAAFAAAAAEAAAAAAAAAZAAAAGQAAAAAAAAAZAAAAGQAAAAVAAAAYAAAAAAAAAAAAAAADwAAACADAAAAAAAAAAAAAAEAAACgMgAAVgcAAKr4//8BAAAAf39/AAEAAABkAAAAAAAAABQAAABAHwAAAAAAACYAAAAAAAAAwOD//wAAAAAmAAAAZAAAABYAAABMAAAAAAAAAAAAAAAEAAAAAAAAAAEAAAAsPEMKAAAAACgAAAAoAAAAZAAAAGQAAAAAAAAAzMzMAAAAAABQAAAAUAAAAGQAAABkAAAAAAAAABcAAAAUAAAAAAAAAAAAAAD/fwAA/38AAAAAAAAJAAAABAAAAAAAAAAMAAAAEAAAAAAAAAAAAAAAAAAAAAAAAAAeAAAAaAAAAAAAAAAAAAAAAAAAAAAAAAAAAAAAECcAABAnAAAAAAAAAAAAAAAAAAAAAAAAAAAAAAAAAAAAAAAAAAAAABQAAAAAAAAAwMD/AAAAAABkAAAAMgAAAAAAAABkAAAAAAAAAH9/fwAKAAAAHwAAAFQAAAAAAAAFAAAAAQAAAAAAAAAAAAAAAAAAAAAAAAAAAAAAAAAAAAAAAAAAAAAAAn9/fwAAAAADzMzMAMDA/wB/f38AAAAAAAAAAAAAAAAAAAAAAAAAAAAhAAAAGAAAABQAAAArBAAAwAMAAJkvAAAOJAAAEAAAACYAAAAIAAAAPZIAAP8fAAA="/>
               </a:ext>
             </a:extLst>
           </p:cNvSpPr>
@@ -13097,7 +13102,7 @@
             <a:spLocks noGrp="1" noChangeArrowheads="1"/>
             <a:extLst>
               <a:ext uri="smNativeData">
-                <pr:smNativeData xmlns="" xmlns:p14="http://schemas.microsoft.com/office/powerpoint/2010/main" xmlns:pr="smNativeData" val="SMDATA_13_w78LXxMAAAAlAAAAZAAAAA0AAAAAkAAAAJAAAACQAAAAkAAAAAAAAAABAAAAAAAAAAEAAABQAAAAAAAAAAAA4D8AAAAAAADgPwAAAAAAAOA/AAAAAAAA4D8AAAAAAADgPwAAAAAAAOA/AAAAAAAA4D8AAAAAAADgPwAAAAAAAOA/AAAAAAAA4D8CAAAAjAAAAAAAAAAAAAAAkMImDP///wgAAAAAAAAAAAAAAAAAAAAAAAAAAAAAAAAAAAAAZAAAAAEAAABAAAAAAAAAAAAAAAAAAAAAAAAAAAAAAAAAAAAAAAAAAAAAAAAAAAAAAAAAAAAAAAAAAAAAAAAAAAAAAAAAAAAAAAAAAAAAAAAAAAAAAAAAAAAAAAAAAAAAFAAAADwAAAAAAAAAAAAAAAAAAAkUAAAAAQAAABQAAAAUAAAAFAAAAAEAAAAAAAAAZAAAAGQAAAAAAAAAZAAAAGQAAAAVAAAAYAAAAAAAAAAAAAAADwAAACADAAAAAAAAAAAAAAEAAACgMgAAVgcAAKr4//8BAAAAf39/AAEAAABkAAAAAAAAABQAAABAHwAAAAAAACYAAAAAAAAAwOD//wAAAAAmAAAAZAAAABYAAABMAAAAAAAAAAAAAAAEAAAAAAAAAAEAAAAsPEMKAAAAACgAAAAoAAAAZAAAAGQAAAAAAAAAzMzMAAAAAABQAAAAUAAAAGQAAABkAAAAAAAAABcAAAAUAAAAAAAAAAAAAAD/fwAA/38AAAAAAAAJAAAABAAAAAAAAAAMAAAAEAAAAAAAAAAAAAAAAAAAAAAAAAAeAAAAaAAAAAAAAAAAAAAAAAAAAAAAAAAAAAAAECcAABAnAAAAAAAAAAAAAAAAAAAAAAAAAAAAAAAAAAAAAAAAAAAAABQAAAAAAAAAwMD/AAAAAABkAAAAMgAAAAAAAABkAAAAAAAAAH9/fwAKAAAAHwAAAFQAAAAAAAAFAAAAAQAAAAAAAAAAAAAAAAAAAAAAAAAAAAAAAAAAAAAAAAAAAAAAAn9/fwAAAAADzMzMAMDA/wB/f38AAAAAAAAAAAAAAAAAAAAAAAAAAAAhAAAAGAAAABQAAABTLAAAKiUAAO8xAABpJwAAEAAAACYAAAAIAAAAPJAAAP8fAAA="/>
+                <pr:smNativeData xmlns:pr="smNativeData" xmlns:p14="http://schemas.microsoft.com/office/powerpoint/2010/main" xmlns="" val="SMDATA_13_w78LXxMAAAAlAAAAZAAAAA0AAAAAkAAAAJAAAACQAAAAkAAAAAAAAAABAAAAAAAAAAEAAABQAAAAAAAAAAAA4D8AAAAAAADgPwAAAAAAAOA/AAAAAAAA4D8AAAAAAADgPwAAAAAAAOA/AAAAAAAA4D8AAAAAAADgPwAAAAAAAOA/AAAAAAAA4D8CAAAAjAAAAAAAAAAAAAAAkMImDP///wgAAAAAAAAAAAAAAAAAAAAAAAAAAAAAAAAAAAAAZAAAAAEAAABAAAAAAAAAAAAAAAAAAAAAAAAAAAAAAAAAAAAAAAAAAAAAAAAAAAAAAAAAAAAAAAAAAAAAAAAAAAAAAAAAAAAAAAAAAAAAAAAAAAAAAAAAAAAAAAAAAAAAFAAAADwAAAAAAAAAAAAAAAAAAAkUAAAAAQAAABQAAAAUAAAAFAAAAAEAAAAAAAAAZAAAAGQAAAAAAAAAZAAAAGQAAAAVAAAAYAAAAAAAAAAAAAAADwAAACADAAAAAAAAAAAAAAEAAACgMgAAVgcAAKr4//8BAAAAf39/AAEAAABkAAAAAAAAABQAAABAHwAAAAAAACYAAAAAAAAAwOD//wAAAAAmAAAAZAAAABYAAABMAAAAAAAAAAAAAAAEAAAAAAAAAAEAAAAsPEMKAAAAACgAAAAoAAAAZAAAAGQAAAAAAAAAzMzMAAAAAABQAAAAUAAAAGQAAABkAAAAAAAAABcAAAAUAAAAAAAAAAAAAAD/fwAA/38AAAAAAAAJAAAABAAAAAAAAAAMAAAAEAAAAAAAAAAAAAAAAAAAAAAAAAAeAAAAaAAAAAAAAAAAAAAAAAAAAAAAAAAAAAAAECcAABAnAAAAAAAAAAAAAAAAAAAAAAAAAAAAAAAAAAAAAAAAAAAAABQAAAAAAAAAwMD/AAAAAABkAAAAMgAAAAAAAABkAAAAAAAAAH9/fwAKAAAAHwAAAFQAAAAAAAAFAAAAAQAAAAAAAAAAAAAAAAAAAAAAAAAAAAAAAAAAAAAAAAAAAAAAAn9/fwAAAAADzMzMAMDA/wB/f38AAAAAAAAAAAAAAAAAAAAAAAAAAAAhAAAAGAAAABQAAABTLAAAKiUAAO8xAABpJwAAEAAAACYAAAAIAAAAPJAAAP8fAAA="/>
               </a:ext>
             </a:extLst>
           </p:cNvSpPr>
@@ -13284,7 +13289,7 @@
             <a:spLocks noGrp="1" noChangeArrowheads="1"/>
             <a:extLst>
               <a:ext uri="smNativeData">
-                <pr:smNativeData xmlns="" xmlns:p14="http://schemas.microsoft.com/office/powerpoint/2010/main" xmlns:pr="smNativeData" val="SMDATA_13_w78LXxMAAAAlAAAAZAAAAA0AAAAAkAAAAJAAAACQAAAAkAAAAAAAAAABAAAAAAAAAAEAAABQAAAAAAAAAAAA4D8AAAAAAADgPwAAAAAAAOA/AAAAAAAA4D8AAAAAAADgPwAAAAAAAOA/AAAAAAAA4D8AAAAAAADgPwAAAAAAAOA/AAAAAAAA4D8CAAAAjAAAAAAAAAAAAAAAkMImDP///wgAAAAAAAAAAAAAAAAAAAAAAAAAAAAAAAAAAAAAZAAAAAEAAABAAAAAAAAAAAAAAAAAAAAAAAAAAAAAAAAAAAAAAAAAAAAAAAAAAAAAAAAAAAAAAAAAAAAAAAAAAAAAAAAAAAAAAAAAAAAAAAAAAAAAAAAAAAAAAAAAAAAAFAAAADwAAAAAAAAAAAAAAAAAAAkUAAAAAQAAABQAAAAUAAAAFAAAAAEAAAAAAAAAZAAAAGQAAAAAAAAAZAAAAGQAAAAVAAAAYAAAAAAAAAAAAAAADwAAACADAAAAAAAAAAAAAAEAAACgMgAAVgcAAKr4//8BAAAAf39/AAEAAABkAAAAAAAAABQAAABAHwAAAAAAACYAAAAAAAAAwOD//wAAAAAmAAAAZAAAABYAAABMAAAAAAAAAAAAAAAEAAAAAAAAAAEAAAAsPEMKAAAAACgAAAAoAAAAZAAAAGQAAAAAAAAAzMzMAAAAAABQAAAAUAAAAGQAAABkAAAAAAAAABcAAAAUAAAAAAAAAAAAAAD/fwAA/38AAAAAAAAJAAAABAAAAAAAAAAMAAAAEAAAAAAAAAAAAAAAAAAAAAAAAAAeAAAAaAAAAAAAAAAAAAAAAAAAAAAAAAAAAAAAECcAABAnAAAAAAAAAAAAAAAAAAAAAAAAAAAAAAAAAAAAAAAAAAAAABQAAAAAAAAAwMD/AAAAAABkAAAAMgAAAAAAAABkAAAAAAAAAH9/fwAKAAAAHwAAAFQAAAAAAAAFAAAAAQAAAAAAAAAAAAAAAAAAAAAAAAAAAAAAAAAAAAAAAAAAAAAAAn9/fwAAAAADzMzMAMDA/wB/f38AAAAAAAAAAAAAAAAAAAAAAAAAAAAhAAAAGAAAABQAAAArBAAAKiUAAOgqAABpJwAAEAAAACYAAAAIAAAAPJAAAP8fAAA="/>
+                <pr:smNativeData xmlns:pr="smNativeData" xmlns:p14="http://schemas.microsoft.com/office/powerpoint/2010/main" xmlns="" val="SMDATA_13_w78LXxMAAAAlAAAAZAAAAA0AAAAAkAAAAJAAAACQAAAAkAAAAAAAAAABAAAAAAAAAAEAAABQAAAAAAAAAAAA4D8AAAAAAADgPwAAAAAAAOA/AAAAAAAA4D8AAAAAAADgPwAAAAAAAOA/AAAAAAAA4D8AAAAAAADgPwAAAAAAAOA/AAAAAAAA4D8CAAAAjAAAAAAAAAAAAAAAkMImDP///wgAAAAAAAAAAAAAAAAAAAAAAAAAAAAAAAAAAAAAZAAAAAEAAABAAAAAAAAAAAAAAAAAAAAAAAAAAAAAAAAAAAAAAAAAAAAAAAAAAAAAAAAAAAAAAAAAAAAAAAAAAAAAAAAAAAAAAAAAAAAAAAAAAAAAAAAAAAAAAAAAAAAAFAAAADwAAAAAAAAAAAAAAAAAAAkUAAAAAQAAABQAAAAUAAAAFAAAAAEAAAAAAAAAZAAAAGQAAAAAAAAAZAAAAGQAAAAVAAAAYAAAAAAAAAAAAAAADwAAACADAAAAAAAAAAAAAAEAAACgMgAAVgcAAKr4//8BAAAAf39/AAEAAABkAAAAAAAAABQAAABAHwAAAAAAACYAAAAAAAAAwOD//wAAAAAmAAAAZAAAABYAAABMAAAAAAAAAAAAAAAEAAAAAAAAAAEAAAAsPEMKAAAAACgAAAAoAAAAZAAAAGQAAAAAAAAAzMzMAAAAAABQAAAAUAAAAGQAAABkAAAAAAAAABcAAAAUAAAAAAAAAAAAAAD/fwAA/38AAAAAAAAJAAAABAAAAAAAAAAMAAAAEAAAAAAAAAAAAAAAAAAAAAAAAAAeAAAAaAAAAAAAAAAAAAAAAAAAAAAAAAAAAAAAECcAABAnAAAAAAAAAAAAAAAAAAAAAAAAAAAAAAAAAAAAAAAAAAAAABQAAAAAAAAAwMD/AAAAAABkAAAAMgAAAAAAAABkAAAAAAAAAH9/fwAKAAAAHwAAAFQAAAAAAAAFAAAAAQAAAAAAAAAAAAAAAAAAAAAAAAAAAAAAAAAAAAAAAAAAAAAAAn9/fwAAAAADzMzMAMDA/wB/f38AAAAAAAAAAAAAAAAAAAAAAAAAAAAhAAAAGAAAABQAAAArBAAAKiUAAOgqAABpJwAAEAAAACYAAAAIAAAAPJAAAP8fAAA="/>
               </a:ext>
             </a:extLst>
           </p:cNvSpPr>
@@ -13471,7 +13476,7 @@
             <a:spLocks noGrp="1" noChangeArrowheads="1"/>
             <a:extLst>
               <a:ext uri="smNativeData">
-                <pr:smNativeData xmlns="" xmlns:p14="http://schemas.microsoft.com/office/powerpoint/2010/main" xmlns:pr="smNativeData" val="SMDATA_13_w78LXxMAAAAlAAAAZAAAAA0AAAAAkAAAAEgAAACQAAAASAAAAAAAAAABAAAAAAAAAAEAAABQAAAAAAAAAAAA4D8AAAAAAADgPwAAAAAAAOA/AAAAAAAA4D8AAAAAAADgPwAAAAAAAOA/AAAAAAAA4D8AAAAAAADgPwAAAAAAAOA/AAAAAAAA4D8CAAAAjAAAAAAAAAAAAAAAkMImDP///wgAAAAAAAAAAAAAAAAAAAAAAAAAAAAAAAAAAAAAZAAAAAEAAABAAAAAAAAAAAAAAAAAAAAAAAAAAAAAAAAAAAAAAAAAAAAAAAAAAAAAAAAAAAAAAAAAAAAAAAAAAAAAAAAAAAAAAAAAAAAAAAAAAAAAAAAAAAAAAAAAAAAAFAAAADwAAAAAAAAAAAAAAAAAAAkUAAAAAQAAABQAAAAUAAAAFAAAAAEAAAAAAAAAZAAAAGQAAAAAAAAAZAAAAGQAAAAVAAAAYAAAAAAAAAAAAAAADwAAACADAAAAAAAAAAAAAAEAAACgMgAAVgcAAKr4//8BAAAAf39/AAEAAABkAAAAAAAAABQAAABAHwAAAAAAACYAAAAAAAAAwOD//wAAAAAmAAAAZAAAABYAAABMAAAAAAAAAAAAAAAEAAAAAAAAAAEAAAAsPEMKAAAAACgAAAAoAAAAZAAAAGQAAAAAAAAAzMzMAAAAAABQAAAAUAAAAGQAAABkAAAAAAAAABcAAAAUAAAAAAAAAAAAAAD/fwAA/38AAAAAAAAJAAAABAAAAAAAAAAMAAAAEAAAAAAAAAAAAAAAAAAAAAAAAAAeAAAAaAAAAAAAAAAAAAAAAAAAAAAAAAAAAAAAECcAABAnAAAAAAAAAAAAAAAAAAAAAAAAAAAAAAAAAAAAAAAAAAAAABQAAAAAAAAAwMD/AAAAAABkAAAAMgAAAAAAAABkAAAAAAAAAH9/fwAKAAAAHwAAAFQAAAAAAAAFAAAAAQAAAAAAAAAAAAAAAAAAAAAAAAAAAAAAAAAAAAAAAAAAAAAAAn9/fwAAAAADzMzMAMDA/wB/f38AAAAAAAAAAAAAAAAAAAAAAAAAAAAhAAAAGAAAABQAAADZNAAAKiUAAA05AABpJwAAEAAAACYAAAAIAAAAPLAAAP8fAAA="/>
+                <pr:smNativeData xmlns:pr="smNativeData" xmlns:p14="http://schemas.microsoft.com/office/powerpoint/2010/main" xmlns="" val="SMDATA_13_w78LXxMAAAAlAAAAZAAAAA0AAAAAkAAAAEgAAACQAAAASAAAAAAAAAABAAAAAAAAAAEAAABQAAAAAAAAAAAA4D8AAAAAAADgPwAAAAAAAOA/AAAAAAAA4D8AAAAAAADgPwAAAAAAAOA/AAAAAAAA4D8AAAAAAADgPwAAAAAAAOA/AAAAAAAA4D8CAAAAjAAAAAAAAAAAAAAAkMImDP///wgAAAAAAAAAAAAAAAAAAAAAAAAAAAAAAAAAAAAAZAAAAAEAAABAAAAAAAAAAAAAAAAAAAAAAAAAAAAAAAAAAAAAAAAAAAAAAAAAAAAAAAAAAAAAAAAAAAAAAAAAAAAAAAAAAAAAAAAAAAAAAAAAAAAAAAAAAAAAAAAAAAAAFAAAADwAAAAAAAAAAAAAAAAAAAkUAAAAAQAAABQAAAAUAAAAFAAAAAEAAAAAAAAAZAAAAGQAAAAAAAAAZAAAAGQAAAAVAAAAYAAAAAAAAAAAAAAADwAAACADAAAAAAAAAAAAAAEAAACgMgAAVgcAAKr4//8BAAAAf39/AAEAAABkAAAAAAAAABQAAABAHwAAAAAAACYAAAAAAAAAwOD//wAAAAAmAAAAZAAAABYAAABMAAAAAAAAAAAAAAAEAAAAAAAAAAEAAAAsPEMKAAAAACgAAAAoAAAAZAAAAGQAAAAAAAAAzMzMAAAAAABQAAAAUAAAAGQAAABkAAAAAAAAABcAAAAUAAAAAAAAAAAAAAD/fwAA/38AAAAAAAAJAAAABAAAAAAAAAAMAAAAEAAAAAAAAAAAAAAAAAAAAAAAAAAeAAAAaAAAAAAAAAAAAAAAAAAAAAAAAAAAAAAAECcAABAnAAAAAAAAAAAAAAAAAAAAAAAAAAAAAAAAAAAAAAAAAAAAABQAAAAAAAAAwMD/AAAAAABkAAAAMgAAAAAAAABkAAAAAAAAAH9/fwAKAAAAHwAAAFQAAAAAAAAFAAAAAQAAAAAAAAAAAAAAAAAAAAAAAAAAAAAAAAAAAAAAAAAAAAAAAn9/fwAAAAADzMzMAMDA/wB/f38AAAAAAAAAAAAAAAAAAAAAAAAAAAAhAAAAGAAAABQAAADZNAAAKiUAAA05AABpJwAAEAAAACYAAAAIAAAAPLAAAP8fAAA="/>
               </a:ext>
             </a:extLst>
           </p:cNvSpPr>
@@ -13663,7 +13668,7 @@
             <a:spLocks noGrp="1" noChangeArrowheads="1"/>
             <a:extLst>
               <a:ext uri="smNativeData">
-                <pr:smNativeData xmlns="" xmlns:p14="http://schemas.microsoft.com/office/powerpoint/2010/main" xmlns:pr="smNativeData" val="SMDATA_13_w78LXxMAAAAlAAAAZAAAAA0AAAAAkAAAAJAAAACQAAAAkAAAAAAAAAAAAAAAAAAAAAEAAABQAAAAAAAAAAAA4D8AAAAAAADgPwAAAAAAAOA/AAAAAAAA4D8AAAAAAADgPwAAAAAAAOA/AAAAAAAA4D8AAAAAAADgPwAAAAAAAOA/AAAAAAAA4D8CAAAAjAAAAAAAAAAAAAAAkMImDP///wgAAAAAAAAAAAAAAAAAAAAAAAAAAAAAAAAAAAAAZAAAAAEAAABAAAAAAAAAAAAAAAAAAAAAAAAAAAAAAAAAAAAAAAAAAAAAAAAAAAAAAAAAAAAAAAAAAAAAAAAAAAAAAAAAAAAAAAAAAAAAAAAAAAAAAAAAAAAAAAAAAAAAFAAAADwAAAAAAAAAAAAAAAAAAAkUAAAAAQAAABQAAAAUAAAAFAAAAAEAAAAAAAAAZAAAAGQAAAAAAAAAZAAAAGQAAAAVAAAAYAAAAAAAAAAAAAAADwAAACADAAAAAAAAAAAAAAEAAACgMgAAVgcAAKr4//8BAAAAf39/AAEAAABkAAAAAAAAABQAAABAHwAAAAAAACYAAAAAAAAAwOD//wAAAAAmAAAAZAAAABYAAABMAAAAAAAAAAAAAAAEAAAAAAAAAAEAAAAsPEMKAAAAACgAAAAoAAAAZAAAAGQAAAAAAAAAzMzMAAAAAABQAAAAUAAAAGQAAABkAAAAAAAAABcAAAAUAAAAAAAAAAAAAAD/fwAA/38AAAAAAAAJAAAABAAAAAUBAAAMAAAAEAAAAAAAAAAAAAAAAAAAAAAAAAAeAAAAaAAAAAAAAAAAAAAAAAAAAAAAAAAAAAAAECcAABAnAAAAAAAAAAAAAAAAAAAAAAAAAAAAAAAAAAAAAAAAAAAAABQAAAAAAAAAwMD/AAAAAABkAAAAMgAAAAAAAABkAAAAAAAAAH9/fwAKAAAAHwAAAFQAAAAAAAAFAAAAAQAAAAAAAAAAAAAAAAAAAAAAAAAAAAAAAAAAAAAAAAAAAAAAAn9/fwAAAAADzMzMAMDA/wB/f38AAAAAAAAAAAAAAAAAAAAAAAAAAAAhAAAAGAAAABQAAAArBAAAwAMAAA05AADgCwAAEAAAACYAAAAIAAAAPJAAAP8fAAA="/>
+                <pr:smNativeData xmlns:pr="smNativeData" xmlns:p14="http://schemas.microsoft.com/office/powerpoint/2010/main" xmlns="" val="SMDATA_13_w78LXxMAAAAlAAAAZAAAAA0AAAAAkAAAAJAAAACQAAAAkAAAAAAAAAAAAAAAAAAAAAEAAABQAAAAAAAAAAAA4D8AAAAAAADgPwAAAAAAAOA/AAAAAAAA4D8AAAAAAADgPwAAAAAAAOA/AAAAAAAA4D8AAAAAAADgPwAAAAAAAOA/AAAAAAAA4D8CAAAAjAAAAAAAAAAAAAAAkMImDP///wgAAAAAAAAAAAAAAAAAAAAAAAAAAAAAAAAAAAAAZAAAAAEAAABAAAAAAAAAAAAAAAAAAAAAAAAAAAAAAAAAAAAAAAAAAAAAAAAAAAAAAAAAAAAAAAAAAAAAAAAAAAAAAAAAAAAAAAAAAAAAAAAAAAAAAAAAAAAAAAAAAAAAFAAAADwAAAAAAAAAAAAAAAAAAAkUAAAAAQAAABQAAAAUAAAAFAAAAAEAAAAAAAAAZAAAAGQAAAAAAAAAZAAAAGQAAAAVAAAAYAAAAAAAAAAAAAAADwAAACADAAAAAAAAAAAAAAEAAACgMgAAVgcAAKr4//8BAAAAf39/AAEAAABkAAAAAAAAABQAAABAHwAAAAAAACYAAAAAAAAAwOD//wAAAAAmAAAAZAAAABYAAABMAAAAAAAAAAAAAAAEAAAAAAAAAAEAAAAsPEMKAAAAACgAAAAoAAAAZAAAAGQAAAAAAAAAzMzMAAAAAABQAAAAUAAAAGQAAABkAAAAAAAAABcAAAAUAAAAAAAAAAAAAAD/fwAA/38AAAAAAAAJAAAABAAAAAUBAAAMAAAAEAAAAAAAAAAAAAAAAAAAAAAAAAAeAAAAaAAAAAAAAAAAAAAAAAAAAAAAAAAAAAAAECcAABAnAAAAAAAAAAAAAAAAAAAAAAAAAAAAAAAAAAAAAAAAAAAAABQAAAAAAAAAwMD/AAAAAABkAAAAMgAAAAAAAABkAAAAAAAAAH9/fwAKAAAAHwAAAFQAAAAAAAAFAAAAAQAAAAAAAAAAAAAAAAAAAAAAAAAAAAAAAAAAAAAAAAAAAAAAAn9/fwAAAAADzMzMAMDA/wB/f38AAAAAAAAAAAAAAAAAAAAAAAAAAAAhAAAAGAAAABQAAAArBAAAwAMAAA05AADgCwAAEAAAACYAAAAIAAAAPJAAAP8fAAA="/>
               </a:ext>
             </a:extLst>
           </p:cNvSpPr>
@@ -13826,7 +13831,7 @@
             <a:spLocks noGrp="1" noChangeArrowheads="1"/>
             <a:extLst>
               <a:ext uri="smNativeData">
-                <pr:smNativeData xmlns="" xmlns:p14="http://schemas.microsoft.com/office/powerpoint/2010/main" xmlns:pr="smNativeData" val="SMDATA_13_w78LXxMAAAAlAAAAZAAAAA0AAAAAkAAAAJAAAACQAAAAkAAAAAAAAAAAAAAAAAAAAAEAAABQAAAAAAAAAAAA4D8AAAAAAADgPwAAAAAAAOA/AAAAAAAA4D8AAAAAAADgPwAAAAAAAOA/AAAAAAAA4D8AAAAAAADgPwAAAAAAAOA/AAAAAAAA4D8CAAAAjAAAAAAAAAAAAAAAkMImDP///wgAAAAAAAAAAAAAAAAAAAAAAAAAAAAAAAAAAAAAZAAAAAEAAABAAAAAAAAAAAAAAAAAAAAAAAAAAAAAAAAAAAAAAAAAAAAAAAAAAAAAAAAAAAAAAAAAAAAAAAAAAAAAAAAAAAAAAAAAAAAAAAAAAAAAAAAAAAAAAAAAAAAAFAAAADwAAAAAAAAAAAAAAAAAAAkUAAAAAQAAABQAAAAUAAAAFAAAAAEAAAAAAAAAZAAAAGQAAAAAAAAAZAAAAGQAAAAVAAAAYAAAAAAAAAAAAAAADwAAACADAAAAAAAAAAAAAAEAAACgMgAAVgcAAKr4//8BAAAAf39/AAEAAABkAAAAAAAAABQAAABAHwAAAAAAACYAAAAAAAAAwOD//wAAAAAmAAAAZAAAABYAAABMAAAAAAAAAAAAAAAEAAAAAAAAAAEAAAAsPEMKAAAAACgAAAAoAAAAZAAAAGQAAAAAAAAAzMzMAAAAAABQAAAAUAAAAGQAAABkAAAAAAAAABcAAAAUAAAAAAAAAAAAAAD/fwAA/38AAAAAAAAJAAAABAAAAAAAAAAMAAAAEAAAAAAAAAAAAAAAAAAAAAAAAAAeAAAAaAAAAAAAAAAAAAAAAAAAAAAAAAAAAAAAECcAABAnAAAAAAAAAAAAAAAAAAAAAAAAAAAAAAAAAAAAAAAAAAAAABQAAAAAAAAAwMD/AAAAAABkAAAAMgAAAAAAAABkAAAAAAAAAH9/fwAKAAAAHwAAAFQAAAAAAAAFAAAAAQAAAAAAAAAAAAAAAAAAAAAAAAAAAAAAAAAAAAAAAAAAAAAAAn9/fwAAAAADzMzMAMDA/wB/f38AAAAAAAAAAAAAAAAAAAAAAAAAAAAhAAAAGAAAABQAAAArBAAASw0AAA05AAAqJQAAEAAAACYAAAAIAAAAPJAAAP8fAAA="/>
+                <pr:smNativeData xmlns:pr="smNativeData" xmlns:p14="http://schemas.microsoft.com/office/powerpoint/2010/main" xmlns="" val="SMDATA_13_w78LXxMAAAAlAAAAZAAAAA0AAAAAkAAAAJAAAACQAAAAkAAAAAAAAAAAAAAAAAAAAAEAAABQAAAAAAAAAAAA4D8AAAAAAADgPwAAAAAAAOA/AAAAAAAA4D8AAAAAAADgPwAAAAAAAOA/AAAAAAAA4D8AAAAAAADgPwAAAAAAAOA/AAAAAAAA4D8CAAAAjAAAAAAAAAAAAAAAkMImDP///wgAAAAAAAAAAAAAAAAAAAAAAAAAAAAAAAAAAAAAZAAAAAEAAABAAAAAAAAAAAAAAAAAAAAAAAAAAAAAAAAAAAAAAAAAAAAAAAAAAAAAAAAAAAAAAAAAAAAAAAAAAAAAAAAAAAAAAAAAAAAAAAAAAAAAAAAAAAAAAAAAAAAAFAAAADwAAAAAAAAAAAAAAAAAAAkUAAAAAQAAABQAAAAUAAAAFAAAAAEAAAAAAAAAZAAAAGQAAAAAAAAAZAAAAGQAAAAVAAAAYAAAAAAAAAAAAAAADwAAACADAAAAAAAAAAAAAAEAAACgMgAAVgcAAKr4//8BAAAAf39/AAEAAABkAAAAAAAAABQAAABAHwAAAAAAACYAAAAAAAAAwOD//wAAAAAmAAAAZAAAABYAAABMAAAAAAAAAAAAAAAEAAAAAAAAAAEAAAAsPEMKAAAAACgAAAAoAAAAZAAAAGQAAAAAAAAAzMzMAAAAAABQAAAAUAAAAGQAAABkAAAAAAAAABcAAAAUAAAAAAAAAAAAAAD/fwAA/38AAAAAAAAJAAAABAAAAAAAAAAMAAAAEAAAAAAAAAAAAAAAAAAAAAAAAAAeAAAAaAAAAAAAAAAAAAAAAAAAAAAAAAAAAAAAECcAABAnAAAAAAAAAAAAAAAAAAAAAAAAAAAAAAAAAAAAAAAAAAAAABQAAAAAAAAAwMD/AAAAAABkAAAAMgAAAAAAAABkAAAAAAAAAH9/fwAKAAAAHwAAAFQAAAAAAAAFAAAAAQAAAAAAAAAAAAAAAAAAAAAAAAAAAAAAAAAAAAAAAAAAAAAAAn9/fwAAAAADzMzMAMDA/wB/f38AAAAAAAAAAAAAAAAAAAAAAAAAAAAhAAAAGAAAABQAAAArBAAASw0AAA05AAAqJQAAEAAAACYAAAAIAAAAPJAAAP8fAAA="/>
               </a:ext>
             </a:extLst>
           </p:cNvSpPr>
@@ -14058,7 +14063,7 @@
             <a:spLocks noGrp="1" noChangeArrowheads="1"/>
             <a:extLst>
               <a:ext uri="smNativeData">
-                <pr:smNativeData xmlns="" xmlns:p14="http://schemas.microsoft.com/office/powerpoint/2010/main" xmlns:pr="smNativeData" val="SMDATA_13_w78LXxMAAAAlAAAAZAAAAA0AAAAAkAAAAJAAAACQAAAAkAAAAAAAAAABAAAAAAAAAAEAAABQAAAAAAAAAAAA4D8AAAAAAADgPwAAAAAAAOA/AAAAAAAA4D8AAAAAAADgPwAAAAAAAOA/AAAAAAAA4D8AAAAAAADgPwAAAAAAAOA/AAAAAAAA4D8CAAAAjAAAAAAAAAAAAAAAkMImDP///wgAAAAAAAAAAAAAAAAAAAAAAAAAAAAAAAAAAAAAZAAAAAEAAABAAAAAAAAAAAAAAAAAAAAAAAAAAAAAAAAAAAAAAAAAAAAAAAAAAAAAAAAAAAAAAAAAAAAAAAAAAAAAAAAAAAAAAAAAAAAAAAAAAAAAAAAAAAAAAAAAAAAAFAAAADwAAAAAAAAAAAAAAAAAAAkUAAAAAQAAABQAAAAUAAAAFAAAAAEAAAAAAAAAZAAAAGQAAAAAAAAAZAAAAGQAAAAVAAAAYAAAAAAAAAAAAAAADwAAACADAAAAAAAAAAAAAAEAAACgMgAAVgcAAKr4//8BAAAAf39/AAEAAABkAAAAAAAAABQAAABAHwAAAAAAACYAAAAAAAAAwOD//wAAAAAmAAAAZAAAABYAAABMAAAAAAAAAAAAAAAEAAAAAAAAAAEAAAAsPEMKAAAAACgAAAAoAAAAZAAAAGQAAAAAAAAAzMzMAAAAAABQAAAAUAAAAGQAAABkAAAAAAAAABcAAAAUAAAAAAAAAAAAAAD/fwAA/38AAAAAAAAJAAAABAAAAAAAAAAMAAAAEAAAAAAAAAAAAAAAAAAAAAAAAAAeAAAAaAAAAAAAAAAAAAAAAAAAAAAAAAAAAAAAECcAABAnAAAAAAAAAAAAAAAAAAAAAAAAAAAAAAAAAAAAAAAAAAAAABQAAAAAAAAAwMD/AAAAAABkAAAAMgAAAAAAAABkAAAAAAAAAH9/fwAKAAAAHwAAAFQAAAAAAAAFAAAAAQAAAAAAAAAAAAAAAAAAAAAAAAAAAAAAAAAAAAAAAAAAAAAAAn9/fwAAAAADzMzMAMDA/wB/f38AAAAAAAAAAAAAAAAAAAAAAAAAAAAhAAAAGAAAABQAAABTLAAAKiUAAO8xAABpJwAAEAAAACYAAAAIAAAAPJAAAP8fAAA="/>
+                <pr:smNativeData xmlns:pr="smNativeData" xmlns:p14="http://schemas.microsoft.com/office/powerpoint/2010/main" xmlns="" val="SMDATA_13_w78LXxMAAAAlAAAAZAAAAA0AAAAAkAAAAJAAAACQAAAAkAAAAAAAAAABAAAAAAAAAAEAAABQAAAAAAAAAAAA4D8AAAAAAADgPwAAAAAAAOA/AAAAAAAA4D8AAAAAAADgPwAAAAAAAOA/AAAAAAAA4D8AAAAAAADgPwAAAAAAAOA/AAAAAAAA4D8CAAAAjAAAAAAAAAAAAAAAkMImDP///wgAAAAAAAAAAAAAAAAAAAAAAAAAAAAAAAAAAAAAZAAAAAEAAABAAAAAAAAAAAAAAAAAAAAAAAAAAAAAAAAAAAAAAAAAAAAAAAAAAAAAAAAAAAAAAAAAAAAAAAAAAAAAAAAAAAAAAAAAAAAAAAAAAAAAAAAAAAAAAAAAAAAAFAAAADwAAAAAAAAAAAAAAAAAAAkUAAAAAQAAABQAAAAUAAAAFAAAAAEAAAAAAAAAZAAAAGQAAAAAAAAAZAAAAGQAAAAVAAAAYAAAAAAAAAAAAAAADwAAACADAAAAAAAAAAAAAAEAAACgMgAAVgcAAKr4//8BAAAAf39/AAEAAABkAAAAAAAAABQAAABAHwAAAAAAACYAAAAAAAAAwOD//wAAAAAmAAAAZAAAABYAAABMAAAAAAAAAAAAAAAEAAAAAAAAAAEAAAAsPEMKAAAAACgAAAAoAAAAZAAAAGQAAAAAAAAAzMzMAAAAAABQAAAAUAAAAGQAAABkAAAAAAAAABcAAAAUAAAAAAAAAAAAAAD/fwAA/38AAAAAAAAJAAAABAAAAAAAAAAMAAAAEAAAAAAAAAAAAAAAAAAAAAAAAAAeAAAAaAAAAAAAAAAAAAAAAAAAAAAAAAAAAAAAECcAABAnAAAAAAAAAAAAAAAAAAAAAAAAAAAAAAAAAAAAAAAAAAAAABQAAAAAAAAAwMD/AAAAAABkAAAAMgAAAAAAAABkAAAAAAAAAH9/fwAKAAAAHwAAAFQAAAAAAAAFAAAAAQAAAAAAAAAAAAAAAAAAAAAAAAAAAAAAAAAAAAAAAAAAAAAAAn9/fwAAAAADzMzMAMDA/wB/f38AAAAAAAAAAAAAAAAAAAAAAAAAAAAhAAAAGAAAABQAAABTLAAAKiUAAO8xAABpJwAAEAAAACYAAAAIAAAAPJAAAP8fAAA="/>
               </a:ext>
             </a:extLst>
           </p:cNvSpPr>
@@ -14245,7 +14250,7 @@
             <a:spLocks noGrp="1" noChangeArrowheads="1"/>
             <a:extLst>
               <a:ext uri="smNativeData">
-                <pr:smNativeData xmlns="" xmlns:p14="http://schemas.microsoft.com/office/powerpoint/2010/main" xmlns:pr="smNativeData" val="SMDATA_13_w78LXxMAAAAlAAAAZAAAAA0AAAAAkAAAAJAAAACQAAAAkAAAAAAAAAABAAAAAAAAAAEAAABQAAAAAAAAAAAA4D8AAAAAAADgPwAAAAAAAOA/AAAAAAAA4D8AAAAAAADgPwAAAAAAAOA/AAAAAAAA4D8AAAAAAADgPwAAAAAAAOA/AAAAAAAA4D8CAAAAjAAAAAAAAAAAAAAAkMImDP///wgAAAAAAAAAAAAAAAAAAAAAAAAAAAAAAAAAAAAAZAAAAAEAAABAAAAAAAAAAAAAAAAAAAAAAAAAAAAAAAAAAAAAAAAAAAAAAAAAAAAAAAAAAAAAAAAAAAAAAAAAAAAAAAAAAAAAAAAAAAAAAAAAAAAAAAAAAAAAAAAAAAAAFAAAADwAAAAAAAAAAAAAAAAAAAkUAAAAAQAAABQAAAAUAAAAFAAAAAEAAAAAAAAAZAAAAGQAAAAAAAAAZAAAAGQAAAAVAAAAYAAAAAAAAAAAAAAADwAAACADAAAAAAAAAAAAAAEAAACgMgAAVgcAAKr4//8BAAAAf39/AAEAAABkAAAAAAAAABQAAABAHwAAAAAAACYAAAAAAAAAwOD//wAAAAAmAAAAZAAAABYAAABMAAAAAAAAAAAAAAAEAAAAAAAAAAEAAAAsPEMKAAAAACgAAAAoAAAAZAAAAGQAAAAAAAAAzMzMAAAAAABQAAAAUAAAAGQAAABkAAAAAAAAABcAAAAUAAAAAAAAAAAAAAD/fwAA/38AAAAAAAAJAAAABAAAAAAAAAAMAAAAEAAAAAAAAAAAAAAAAAAAAAAAAAAeAAAAaAAAAAAAAAAAAAAAAAAAAAAAAAAAAAAAECcAABAnAAAAAAAAAAAAAAAAAAAAAAAAAAAAAAAAAAAAAAAAAAAAABQAAAAAAAAAwMD/AAAAAABkAAAAMgAAAAAAAABkAAAAAAAAAH9/fwAKAAAAHwAAAFQAAAAAAAAFAAAAAQAAAAAAAAAAAAAAAAAAAAAAAAAAAAAAAAAAAAAAAAAAAAAAAn9/fwAAAAADzMzMAMDA/wB/f38AAAAAAAAAAAAAAAAAAAAAAAAAAAAhAAAAGAAAABQAAAArBAAAKiUAAOgqAABpJwAAEAAAACYAAAAIAAAAPJAAAP8fAAA="/>
+                <pr:smNativeData xmlns:pr="smNativeData" xmlns:p14="http://schemas.microsoft.com/office/powerpoint/2010/main" xmlns="" val="SMDATA_13_w78LXxMAAAAlAAAAZAAAAA0AAAAAkAAAAJAAAACQAAAAkAAAAAAAAAABAAAAAAAAAAEAAABQAAAAAAAAAAAA4D8AAAAAAADgPwAAAAAAAOA/AAAAAAAA4D8AAAAAAADgPwAAAAAAAOA/AAAAAAAA4D8AAAAAAADgPwAAAAAAAOA/AAAAAAAA4D8CAAAAjAAAAAAAAAAAAAAAkMImDP///wgAAAAAAAAAAAAAAAAAAAAAAAAAAAAAAAAAAAAAZAAAAAEAAABAAAAAAAAAAAAAAAAAAAAAAAAAAAAAAAAAAAAAAAAAAAAAAAAAAAAAAAAAAAAAAAAAAAAAAAAAAAAAAAAAAAAAAAAAAAAAAAAAAAAAAAAAAAAAAAAAAAAAFAAAADwAAAAAAAAAAAAAAAAAAAkUAAAAAQAAABQAAAAUAAAAFAAAAAEAAAAAAAAAZAAAAGQAAAAAAAAAZAAAAGQAAAAVAAAAYAAAAAAAAAAAAAAADwAAACADAAAAAAAAAAAAAAEAAACgMgAAVgcAAKr4//8BAAAAf39/AAEAAABkAAAAAAAAABQAAABAHwAAAAAAACYAAAAAAAAAwOD//wAAAAAmAAAAZAAAABYAAABMAAAAAAAAAAAAAAAEAAAAAAAAAAEAAAAsPEMKAAAAACgAAAAoAAAAZAAAAGQAAAAAAAAAzMzMAAAAAABQAAAAUAAAAGQAAABkAAAAAAAAABcAAAAUAAAAAAAAAAAAAAD/fwAA/38AAAAAAAAJAAAABAAAAAAAAAAMAAAAEAAAAAAAAAAAAAAAAAAAAAAAAAAeAAAAaAAAAAAAAAAAAAAAAAAAAAAAAAAAAAAAECcAABAnAAAAAAAAAAAAAAAAAAAAAAAAAAAAAAAAAAAAAAAAAAAAABQAAAAAAAAAwMD/AAAAAABkAAAAMgAAAAAAAABkAAAAAAAAAH9/fwAKAAAAHwAAAFQAAAAAAAAFAAAAAQAAAAAAAAAAAAAAAAAAAAAAAAAAAAAAAAAAAAAAAAAAAAAAAn9/fwAAAAADzMzMAMDA/wB/f38AAAAAAAAAAAAAAAAAAAAAAAAAAAAhAAAAGAAAABQAAAArBAAAKiUAAOgqAABpJwAAEAAAACYAAAAIAAAAPJAAAP8fAAA="/>
               </a:ext>
             </a:extLst>
           </p:cNvSpPr>
@@ -14432,7 +14437,7 @@
             <a:spLocks noGrp="1" noChangeArrowheads="1"/>
             <a:extLst>
               <a:ext uri="smNativeData">
-                <pr:smNativeData xmlns="" xmlns:p14="http://schemas.microsoft.com/office/powerpoint/2010/main" xmlns:pr="smNativeData" val="SMDATA_13_w78LXxMAAAAlAAAAZAAAAA0AAAAAkAAAAEgAAACQAAAASAAAAAAAAAABAAAAAAAAAAEAAABQAAAAAAAAAAAA4D8AAAAAAADgPwAAAAAAAOA/AAAAAAAA4D8AAAAAAADgPwAAAAAAAOA/AAAAAAAA4D8AAAAAAADgPwAAAAAAAOA/AAAAAAAA4D8CAAAAjAAAAAAAAAAAAAAAkMImDP///wgAAAAAAAAAAAAAAAAAAAAAAAAAAAAAAAAAAAAAZAAAAAEAAABAAAAAAAAAAAAAAAAAAAAAAAAAAAAAAAAAAAAAAAAAAAAAAAAAAAAAAAAAAAAAAAAAAAAAAAAAAAAAAAAAAAAAAAAAAAAAAAAAAAAAAAAAAAAAAAAAAAAAFAAAADwAAAAAAAAAAAAAAAAAAAkUAAAAAQAAABQAAAAUAAAAFAAAAAEAAAAAAAAAZAAAAGQAAAAAAAAAZAAAAGQAAAAVAAAAYAAAAAAAAAAAAAAADwAAACADAAAAAAAAAAAAAAEAAACgMgAAVgcAAKr4//8BAAAAf39/AAEAAABkAAAAAAAAABQAAABAHwAAAAAAACYAAAAAAAAAwOD//wAAAAAmAAAAZAAAABYAAABMAAAAAAAAAAAAAAAEAAAAAAAAAAEAAAAsPEMKAAAAACgAAAAoAAAAZAAAAGQAAAAAAAAAzMzMAAAAAABQAAAAUAAAAGQAAABkAAAAAAAAABcAAAAUAAAAAAAAAAAAAAD/fwAA/38AAAAAAAAJAAAABAAAAAAAAAAMAAAAEAAAAAAAAAAAAAAAAAAAAAAAAAAeAAAAaAAAAAAAAAAAAAAAAAAAAAAAAAAAAAAAECcAABAnAAAAAAAAAAAAAAAAAAAAAAAAAAAAAAAAAAAAAAAAAAAAABQAAAAAAAAAwMD/AAAAAABkAAAAMgAAAAAAAABkAAAAAAAAAH9/fwAKAAAAHwAAAFQAAAAAAAAFAAAAAQAAAAAAAAAAAAAAAAAAAAAAAAAAAAAAAAAAAAAAAAAAAAAAAn9/fwAAAAADzMzMAMDA/wB/f38AAAAAAAAAAAAAAAAAAAAAAAAAAAAhAAAAGAAAABQAAADZNAAAKiUAAA05AABpJwAAEAAAACYAAAAIAAAAPLAAAP8fAAA="/>
+                <pr:smNativeData xmlns:pr="smNativeData" xmlns:p14="http://schemas.microsoft.com/office/powerpoint/2010/main" xmlns="" val="SMDATA_13_w78LXxMAAAAlAAAAZAAAAA0AAAAAkAAAAEgAAACQAAAASAAAAAAAAAABAAAAAAAAAAEAAABQAAAAAAAAAAAA4D8AAAAAAADgPwAAAAAAAOA/AAAAAAAA4D8AAAAAAADgPwAAAAAAAOA/AAAAAAAA4D8AAAAAAADgPwAAAAAAAOA/AAAAAAAA4D8CAAAAjAAAAAAAAAAAAAAAkMImDP///wgAAAAAAAAAAAAAAAAAAAAAAAAAAAAAAAAAAAAAZAAAAAEAAABAAAAAAAAAAAAAAAAAAAAAAAAAAAAAAAAAAAAAAAAAAAAAAAAAAAAAAAAAAAAAAAAAAAAAAAAAAAAAAAAAAAAAAAAAAAAAAAAAAAAAAAAAAAAAAAAAAAAAFAAAADwAAAAAAAAAAAAAAAAAAAkUAAAAAQAAABQAAAAUAAAAFAAAAAEAAAAAAAAAZAAAAGQAAAAAAAAAZAAAAGQAAAAVAAAAYAAAAAAAAAAAAAAADwAAACADAAAAAAAAAAAAAAEAAACgMgAAVgcAAKr4//8BAAAAf39/AAEAAABkAAAAAAAAABQAAABAHwAAAAAAACYAAAAAAAAAwOD//wAAAAAmAAAAZAAAABYAAABMAAAAAAAAAAAAAAAEAAAAAAAAAAEAAAAsPEMKAAAAACgAAAAoAAAAZAAAAGQAAAAAAAAAzMzMAAAAAABQAAAAUAAAAGQAAABkAAAAAAAAABcAAAAUAAAAAAAAAAAAAAD/fwAA/38AAAAAAAAJAAAABAAAAAAAAAAMAAAAEAAAAAAAAAAAAAAAAAAAAAAAAAAeAAAAaAAAAAAAAAAAAAAAAAAAAAAAAAAAAAAAECcAABAnAAAAAAAAAAAAAAAAAAAAAAAAAAAAAAAAAAAAAAAAAAAAABQAAAAAAAAAwMD/AAAAAABkAAAAMgAAAAAAAABkAAAAAAAAAH9/fwAKAAAAHwAAAFQAAAAAAAAFAAAAAQAAAAAAAAAAAAAAAAAAAAAAAAAAAAAAAAAAAAAAAAAAAAAAAn9/fwAAAAADzMzMAMDA/wB/f38AAAAAAAAAAAAAAAAAAAAAAAAAAAAhAAAAGAAAABQAAADZNAAAKiUAAA05AABpJwAAEAAAACYAAAAIAAAAPLAAAP8fAAA="/>
               </a:ext>
             </a:extLst>
           </p:cNvSpPr>
@@ -14624,7 +14629,7 @@
             <a:spLocks noGrp="1" noChangeArrowheads="1"/>
             <a:extLst>
               <a:ext uri="smNativeData">
-                <pr:smNativeData xmlns="" xmlns:p14="http://schemas.microsoft.com/office/powerpoint/2010/main" xmlns:pr="smNativeData" val="SMDATA_13_w78LXxMAAAAlAAAAZAAAAA0AAAAAkAAAAJAAAACQAAAAkAAAAAAAAAACAAAAAAAAAAEAAABQAAAAAAAAAAAA4D8AAAAAAADgPwAAAAAAAOA/AAAAAAAA4D8AAAAAAADgPwAAAAAAAOA/AAAAAAAA4D8AAAAAAADgPwAAAAAAAOA/AAAAAAAA4D8CAAAAjAAAAAAAAAAAAAAAkMImDP///wgAAAAAAAAAAAAAAAAAAAAAAAAAAAAAAAAAAAAAZAAAAAEAAABAAAAAAAAAAAAAAAAAAAAAAAAAAAAAAAAAAAAAAAAAAAAAAAAAAAAAAAAAAAAAAAAAAAAAAAAAAAAAAAAAAAAAAAAAAAAAAAAAAAAAAAAAAAAAAAAAAAAAFAAAADwAAAAAAAAAAAAAAAAAAAkUAAAAAQAAABQAAAAUAAAAFAAAAAEAAAAAAAAAZAAAAGQAAAAAAAAAZAAAAGQAAAAVAAAAYAAAAAAAAAAAAAAADwAAACADAAAAAAAAAAAAAAEAAACgMgAAVgcAAKr4//8BAAAAf39/AAEAAABkAAAAAAAAABQAAABAHwAAAAAAACYAAAAAAAAAwOD//wAAAAAmAAAAZAAAABYAAABMAAAAAAAAAAAAAAAEAAAAAAAAAAEAAAAsPEMKAAAAACgAAAAoAAAAZAAAAGQAAAAAAAAAzMzMAAAAAABQAAAAUAAAAGQAAABkAAAAAAAAABcAAAAUAAAAAAAAAAAAAAD/fwAA/38AAAAAAAAJAAAABAAAAAAAAAAMAAAAEAAAAAAAAAAAAAAAAAAAAAAAAAAeAAAAaAAAAAAAAAAAAAAAAAAAAAAAAAAAAAAAECcAABAnAAAAAAAAAAAAAAAAAAAAAAAAAAAAAAAAAAAAAAAAAAAAABQAAAAAAAAAwMD/AAAAAABkAAAAMgAAAAAAAABkAAAAAAAAAH9/fwAKAAAAHwAAAFQAAAAAAAAFAAAAAQAAAAAAAAAAAAAAAAAAAAAAAAAAAAAAAAAAAAAAAAAAAAAAAn9/fwAAAAADzMzMAMDA/wB/f38AAAAAAAAAAAAAAAAAAAAAAAAAAAAhAAAAGAAAABQAAAArBAAAnRAAAA05AADaGwAAEAAAACYAAAAIAAAAvZAAAP8fAAA="/>
+                <pr:smNativeData xmlns:pr="smNativeData" xmlns:p14="http://schemas.microsoft.com/office/powerpoint/2010/main" xmlns="" val="SMDATA_13_w78LXxMAAAAlAAAAZAAAAA0AAAAAkAAAAJAAAACQAAAAkAAAAAAAAAACAAAAAAAAAAEAAABQAAAAAAAAAAAA4D8AAAAAAADgPwAAAAAAAOA/AAAAAAAA4D8AAAAAAADgPwAAAAAAAOA/AAAAAAAA4D8AAAAAAADgPwAAAAAAAOA/AAAAAAAA4D8CAAAAjAAAAAAAAAAAAAAAkMImDP///wgAAAAAAAAAAAAAAAAAAAAAAAAAAAAAAAAAAAAAZAAAAAEAAABAAAAAAAAAAAAAAAAAAAAAAAAAAAAAAAAAAAAAAAAAAAAAAAAAAAAAAAAAAAAAAAAAAAAAAAAAAAAAAAAAAAAAAAAAAAAAAAAAAAAAAAAAAAAAAAAAAAAAFAAAADwAAAAAAAAAAAAAAAAAAAkUAAAAAQAAABQAAAAUAAAAFAAAAAEAAAAAAAAAZAAAAGQAAAAAAAAAZAAAAGQAAAAVAAAAYAAAAAAAAAAAAAAADwAAACADAAAAAAAAAAAAAAEAAACgMgAAVgcAAKr4//8BAAAAf39/AAEAAABkAAAAAAAAABQAAABAHwAAAAAAACYAAAAAAAAAwOD//wAAAAAmAAAAZAAAABYAAABMAAAAAAAAAAAAAAAEAAAAAAAAAAEAAAAsPEMKAAAAACgAAAAoAAAAZAAAAGQAAAAAAAAAzMzMAAAAAABQAAAAUAAAAGQAAABkAAAAAAAAABcAAAAUAAAAAAAAAAAAAAD/fwAA/38AAAAAAAAJAAAABAAAAAAAAAAMAAAAEAAAAAAAAAAAAAAAAAAAAAAAAAAeAAAAaAAAAAAAAAAAAAAAAAAAAAAAAAAAAAAAECcAABAnAAAAAAAAAAAAAAAAAAAAAAAAAAAAAAAAAAAAAAAAAAAAABQAAAAAAAAAwMD/AAAAAABkAAAAMgAAAAAAAABkAAAAAAAAAH9/fwAKAAAAHwAAAFQAAAAAAAAFAAAAAQAAAAAAAAAAAAAAAAAAAAAAAAAAAAAAAAAAAAAAAAAAAAAAAn9/fwAAAAADzMzMAMDA/wB/f38AAAAAAAAAAAAAAAAAAAAAAAAAAAAhAAAAGAAAABQAAAArBAAAnRAAAA05AADaGwAAEAAAACYAAAAIAAAAvZAAAP8fAAA="/>
               </a:ext>
             </a:extLst>
           </p:cNvSpPr>
@@ -14791,7 +14796,7 @@
             <a:spLocks noGrp="1" noChangeArrowheads="1"/>
             <a:extLst>
               <a:ext uri="smNativeData">
-                <pr:smNativeData xmlns="" xmlns:p14="http://schemas.microsoft.com/office/powerpoint/2010/main" xmlns:pr="smNativeData" val="SMDATA_13_w78LXxMAAAAlAAAAZAAAAA0AAAAAkAAAAJAAAACQAAAAkAAAAAAAAAAAAAAAAAAAAAEAAABQAAAAAAAAAAAA4D8AAAAAAADgPwAAAAAAAOA/AAAAAAAA4D8AAAAAAADgPwAAAAAAAOA/AAAAAAAA4D8AAAAAAADgPwAAAAAAAOA/AAAAAAAA4D8CAAAAjAAAAAAAAAAAAAAAkMImDP///wgAAAAAAAAAAAAAAAAAAAAAAAAAAAAAAAAAAAAAZAAAAAEAAABAAAAAAAAAAAAAAAAAAAAAAAAAAAAAAAAAAAAAAAAAAAAAAAAAAAAAAAAAAAAAAAAAAAAAAAAAAAAAAAAAAAAAAAAAAAAAAAAAAAAAAAAAAAAAAAAAAAAAFAAAADwAAAAAAAAAAAAAAAAAAAkUAAAAAQAAABQAAAAUAAAAFAAAAAEAAAAAAAAAZAAAAGQAAAAAAAAAZAAAAGQAAAAVAAAAYAAAAAAAAAAAAAAADwAAACADAAAAAAAAAAAAAAEAAACgMgAAVgcAAKr4//8BAAAAf39/AAEAAABkAAAAAAAAABQAAABAHwAAAAAAACYAAAAAAAAAwOD//wAAAAAmAAAAZAAAABYAAABMAAAAAAAAAAAAAAAEAAAAAAAAAAEAAAAsPEMKAAAAACgAAAAoAAAAZAAAAGQAAAAAAAAAzMzMAAAAAABQAAAAUAAAAGQAAABkAAAAAAAAABcAAAAUAAAAAAAAAAAAAAD/fwAA/38AAAAAAAAJAAAABAAAAAAAAAAMAAAAEAAAAAAAAAAAAAAAAAAAAAAAAAAeAAAAaAAAAAAAAAAAAAAAAAAAAAAAAAAAAAAAECcAABAnAAAAAAAAAAAAAAAAAAAAAAAAAAAAAAAAAAAAAAAAAAAAABQAAAAAAAAAwMD/AAAAAABkAAAAMgAAAAAAAABkAAAAAAAAAH9/fwAKAAAAHwAAAFQAAAAAAAAFAAAAAQAAAAAAAAAAAAAAAAAAAAAAAAAAAAAAAAAAAAAAAAAAAAAAAn9/fwAAAAADzMzMAMDA/wB/f38AAAAAAAAAAAAAAAAAAAAAAAAAAAAhAAAAGAAAABQAAAArBAAA2hsAAA05AAAlIQAAEAAAACYAAAAIAAAAPZAAAP8fAAA="/>
+                <pr:smNativeData xmlns:pr="smNativeData" xmlns:p14="http://schemas.microsoft.com/office/powerpoint/2010/main" xmlns="" val="SMDATA_13_w78LXxMAAAAlAAAAZAAAAA0AAAAAkAAAAJAAAACQAAAAkAAAAAAAAAAAAAAAAAAAAAEAAABQAAAAAAAAAAAA4D8AAAAAAADgPwAAAAAAAOA/AAAAAAAA4D8AAAAAAADgPwAAAAAAAOA/AAAAAAAA4D8AAAAAAADgPwAAAAAAAOA/AAAAAAAA4D8CAAAAjAAAAAAAAAAAAAAAkMImDP///wgAAAAAAAAAAAAAAAAAAAAAAAAAAAAAAAAAAAAAZAAAAAEAAABAAAAAAAAAAAAAAAAAAAAAAAAAAAAAAAAAAAAAAAAAAAAAAAAAAAAAAAAAAAAAAAAAAAAAAAAAAAAAAAAAAAAAAAAAAAAAAAAAAAAAAAAAAAAAAAAAAAAAFAAAADwAAAAAAAAAAAAAAAAAAAkUAAAAAQAAABQAAAAUAAAAFAAAAAEAAAAAAAAAZAAAAGQAAAAAAAAAZAAAAGQAAAAVAAAAYAAAAAAAAAAAAAAADwAAACADAAAAAAAAAAAAAAEAAACgMgAAVgcAAKr4//8BAAAAf39/AAEAAABkAAAAAAAAABQAAABAHwAAAAAAACYAAAAAAAAAwOD//wAAAAAmAAAAZAAAABYAAABMAAAAAAAAAAAAAAAEAAAAAAAAAAEAAAAsPEMKAAAAACgAAAAoAAAAZAAAAGQAAAAAAAAAzMzMAAAAAABQAAAAUAAAAGQAAABkAAAAAAAAABcAAAAUAAAAAAAAAAAAAAD/fwAA/38AAAAAAAAJAAAABAAAAAAAAAAMAAAAEAAAAAAAAAAAAAAAAAAAAAAAAAAeAAAAaAAAAAAAAAAAAAAAAAAAAAAAAAAAAAAAECcAABAnAAAAAAAAAAAAAAAAAAAAAAAAAAAAAAAAAAAAAAAAAAAAABQAAAAAAAAAwMD/AAAAAABkAAAAMgAAAAAAAABkAAAAAAAAAH9/fwAKAAAAHwAAAFQAAAAAAAAFAAAAAQAAAAAAAAAAAAAAAAAAAAAAAAAAAAAAAAAAAAAAAAAAAAAAAn9/fwAAAAADzMzMAMDA/wB/f38AAAAAAAAAAAAAAAAAAAAAAAAAAAAhAAAAGAAAABQAAAArBAAA2hsAAA05AAAlIQAAEAAAACYAAAAIAAAAPZAAAP8fAAA="/>
               </a:ext>
             </a:extLst>
           </p:cNvSpPr>
@@ -14982,7 +14987,7 @@
             <a:spLocks noGrp="1" noChangeArrowheads="1"/>
             <a:extLst>
               <a:ext uri="smNativeData">
-                <pr:smNativeData xmlns="" xmlns:p14="http://schemas.microsoft.com/office/powerpoint/2010/main" xmlns:pr="smNativeData" val="SMDATA_13_w78LXxMAAAAlAAAAZAAAAA0AAAAAkAAAAJAAAACQAAAAkAAAAAAAAAABAAAAAAAAAAEAAABQAAAAAAAAAAAA4D8AAAAAAADgPwAAAAAAAOA/AAAAAAAA4D8AAAAAAADgPwAAAAAAAOA/AAAAAAAA4D8AAAAAAADgPwAAAAAAAOA/AAAAAAAA4D8CAAAAjAAAAAAAAAAAAAAAkMImDP///wgAAAAAAAAAAAAAAAAAAAAAAAAAAAAAAAAAAAAAZAAAAAEAAABAAAAAAAAAAAAAAAAAAAAAAAAAAAAAAAAAAAAAAAAAAAAAAAAAAAAAAAAAAAAAAAAAAAAAAAAAAAAAAAAAAAAAAAAAAAAAAAAAAAAAAAAAAAAAAAAAAAAAFAAAADwAAAAAAAAAAAAAAAAAAAkUAAAAAQAAABQAAAAUAAAAFAAAAAEAAAAAAAAAZAAAAGQAAAAAAAAAZAAAAGQAAAAVAAAAYAAAAAAAAAAAAAAADwAAACADAAAAAAAAAAAAAAEAAACgMgAAVgcAAKr4//8BAAAAf39/AAEAAABkAAAAAAAAABQAAABAHwAAAAAAACYAAAAAAAAAwOD//wAAAAAmAAAAZAAAABYAAABMAAAAAAAAAAAAAAAEAAAAAAAAAAEAAAAsPEMKAAAAACgAAAAoAAAAZAAAAGQAAAAAAAAAzMzMAAAAAABQAAAAUAAAAGQAAABkAAAAAAAAABcAAAAUAAAAAAAAAAAAAAD/fwAA/38AAAAAAAAJAAAABAAAAAAAAAAMAAAAEAAAAAAAAAAAAAAAAAAAAAAAAAAeAAAAaAAAAAAAAAAAAAAAAAAAAAAAAAAAAAAAECcAABAnAAAAAAAAAAAAAAAAAAAAAAAAAAAAAAAAAAAAAAAAAAAAABQAAAAAAAAAwMD/AAAAAABkAAAAMgAAAAAAAABkAAAAAAAAAH9/fwAKAAAAHwAAAFQAAAAAAAAFAAAAAQAAAAAAAAAAAAAAAAAAAAAAAAAAAAAAAAAAAAAAAAAAAAAAAn9/fwAAAAADzMzMAMDA/wB/f38AAAAAAAAAAAAAAAAAAAAAAAAAAAAhAAAAGAAAABQAAABTLAAAKiUAAO8xAABpJwAAEAAAACYAAAAIAAAAPJAAAP8fAAA="/>
+                <pr:smNativeData xmlns:pr="smNativeData" xmlns:p14="http://schemas.microsoft.com/office/powerpoint/2010/main" xmlns="" val="SMDATA_13_w78LXxMAAAAlAAAAZAAAAA0AAAAAkAAAAJAAAACQAAAAkAAAAAAAAAABAAAAAAAAAAEAAABQAAAAAAAAAAAA4D8AAAAAAADgPwAAAAAAAOA/AAAAAAAA4D8AAAAAAADgPwAAAAAAAOA/AAAAAAAA4D8AAAAAAADgPwAAAAAAAOA/AAAAAAAA4D8CAAAAjAAAAAAAAAAAAAAAkMImDP///wgAAAAAAAAAAAAAAAAAAAAAAAAAAAAAAAAAAAAAZAAAAAEAAABAAAAAAAAAAAAAAAAAAAAAAAAAAAAAAAAAAAAAAAAAAAAAAAAAAAAAAAAAAAAAAAAAAAAAAAAAAAAAAAAAAAAAAAAAAAAAAAAAAAAAAAAAAAAAAAAAAAAAFAAAADwAAAAAAAAAAAAAAAAAAAkUAAAAAQAAABQAAAAUAAAAFAAAAAEAAAAAAAAAZAAAAGQAAAAAAAAAZAAAAGQAAAAVAAAAYAAAAAAAAAAAAAAADwAAACADAAAAAAAAAAAAAAEAAACgMgAAVgcAAKr4//8BAAAAf39/AAEAAABkAAAAAAAAABQAAABAHwAAAAAAACYAAAAAAAAAwOD//wAAAAAmAAAAZAAAABYAAABMAAAAAAAAAAAAAAAEAAAAAAAAAAEAAAAsPEMKAAAAACgAAAAoAAAAZAAAAGQAAAAAAAAAzMzMAAAAAABQAAAAUAAAAGQAAABkAAAAAAAAABcAAAAUAAAAAAAAAAAAAAD/fwAA/38AAAAAAAAJAAAABAAAAAAAAAAMAAAAEAAAAAAAAAAAAAAAAAAAAAAAAAAeAAAAaAAAAAAAAAAAAAAAAAAAAAAAAAAAAAAAECcAABAnAAAAAAAAAAAAAAAAAAAAAAAAAAAAAAAAAAAAAAAAAAAAABQAAAAAAAAAwMD/AAAAAABkAAAAMgAAAAAAAABkAAAAAAAAAH9/fwAKAAAAHwAAAFQAAAAAAAAFAAAAAQAAAAAAAAAAAAAAAAAAAAAAAAAAAAAAAAAAAAAAAAAAAAAAAn9/fwAAAAADzMzMAMDA/wB/f38AAAAAAAAAAAAAAAAAAAAAAAAAAAAhAAAAGAAAABQAAABTLAAAKiUAAO8xAABpJwAAEAAAACYAAAAIAAAAPJAAAP8fAAA="/>
               </a:ext>
             </a:extLst>
           </p:cNvSpPr>
@@ -15169,7 +15174,7 @@
             <a:spLocks noGrp="1" noChangeArrowheads="1"/>
             <a:extLst>
               <a:ext uri="smNativeData">
-                <pr:smNativeData xmlns="" xmlns:p14="http://schemas.microsoft.com/office/powerpoint/2010/main" xmlns:pr="smNativeData" val="SMDATA_13_w78LXxMAAAAlAAAAZAAAAA0AAAAAkAAAAJAAAACQAAAAkAAAAAAAAAABAAAAAAAAAAEAAABQAAAAAAAAAAAA4D8AAAAAAADgPwAAAAAAAOA/AAAAAAAA4D8AAAAAAADgPwAAAAAAAOA/AAAAAAAA4D8AAAAAAADgPwAAAAAAAOA/AAAAAAAA4D8CAAAAjAAAAAAAAAAAAAAAkMImDP///wgAAAAAAAAAAAAAAAAAAAAAAAAAAAAAAAAAAAAAZAAAAAEAAABAAAAAAAAAAAAAAAAAAAAAAAAAAAAAAAAAAAAAAAAAAAAAAAAAAAAAAAAAAAAAAAAAAAAAAAAAAAAAAAAAAAAAAAAAAAAAAAAAAAAAAAAAAAAAAAAAAAAAFAAAADwAAAAAAAAAAAAAAAAAAAkUAAAAAQAAABQAAAAUAAAAFAAAAAEAAAAAAAAAZAAAAGQAAAAAAAAAZAAAAGQAAAAVAAAAYAAAAAAAAAAAAAAADwAAACADAAAAAAAAAAAAAAEAAACgMgAAVgcAAKr4//8BAAAAf39/AAEAAABkAAAAAAAAABQAAABAHwAAAAAAACYAAAAAAAAAwOD//wAAAAAmAAAAZAAAABYAAABMAAAAAAAAAAAAAAAEAAAAAAAAAAEAAAAsPEMKAAAAACgAAAAoAAAAZAAAAGQAAAAAAAAAzMzMAAAAAABQAAAAUAAAAGQAAABkAAAAAAAAABcAAAAUAAAAAAAAAAAAAAD/fwAA/38AAAAAAAAJAAAABAAAAAAAAAAMAAAAEAAAAAAAAAAAAAAAAAAAAAAAAAAeAAAAaAAAAAAAAAAAAAAAAAAAAAAAAAAAAAAAECcAABAnAAAAAAAAAAAAAAAAAAAAAAAAAAAAAAAAAAAAAAAAAAAAABQAAAAAAAAAwMD/AAAAAABkAAAAMgAAAAAAAABkAAAAAAAAAH9/fwAKAAAAHwAAAFQAAAAAAAAFAAAAAQAAAAAAAAAAAAAAAAAAAAAAAAAAAAAAAAAAAAAAAAAAAAAAAn9/fwAAAAADzMzMAMDA/wB/f38AAAAAAAAAAAAAAAAAAAAAAAAAAAAhAAAAGAAAABQAAAArBAAAKiUAAOgqAABpJwAAEAAAACYAAAAIAAAAPJAAAP8fAAA="/>
+                <pr:smNativeData xmlns:pr="smNativeData" xmlns:p14="http://schemas.microsoft.com/office/powerpoint/2010/main" xmlns="" val="SMDATA_13_w78LXxMAAAAlAAAAZAAAAA0AAAAAkAAAAJAAAACQAAAAkAAAAAAAAAABAAAAAAAAAAEAAABQAAAAAAAAAAAA4D8AAAAAAADgPwAAAAAAAOA/AAAAAAAA4D8AAAAAAADgPwAAAAAAAOA/AAAAAAAA4D8AAAAAAADgPwAAAAAAAOA/AAAAAAAA4D8CAAAAjAAAAAAAAAAAAAAAkMImDP///wgAAAAAAAAAAAAAAAAAAAAAAAAAAAAAAAAAAAAAZAAAAAEAAABAAAAAAAAAAAAAAAAAAAAAAAAAAAAAAAAAAAAAAAAAAAAAAAAAAAAAAAAAAAAAAAAAAAAAAAAAAAAAAAAAAAAAAAAAAAAAAAAAAAAAAAAAAAAAAAAAAAAAFAAAADwAAAAAAAAAAAAAAAAAAAkUAAAAAQAAABQAAAAUAAAAFAAAAAEAAAAAAAAAZAAAAGQAAAAAAAAAZAAAAGQAAAAVAAAAYAAAAAAAAAAAAAAADwAAACADAAAAAAAAAAAAAAEAAACgMgAAVgcAAKr4//8BAAAAf39/AAEAAABkAAAAAAAAABQAAABAHwAAAAAAACYAAAAAAAAAwOD//wAAAAAmAAAAZAAAABYAAABMAAAAAAAAAAAAAAAEAAAAAAAAAAEAAAAsPEMKAAAAACgAAAAoAAAAZAAAAGQAAAAAAAAAzMzMAAAAAABQAAAAUAAAAGQAAABkAAAAAAAAABcAAAAUAAAAAAAAAAAAAAD/fwAA/38AAAAAAAAJAAAABAAAAAAAAAAMAAAAEAAAAAAAAAAAAAAAAAAAAAAAAAAeAAAAaAAAAAAAAAAAAAAAAAAAAAAAAAAAAAAAECcAABAnAAAAAAAAAAAAAAAAAAAAAAAAAAAAAAAAAAAAAAAAAAAAABQAAAAAAAAAwMD/AAAAAABkAAAAMgAAAAAAAABkAAAAAAAAAH9/fwAKAAAAHwAAAFQAAAAAAAAFAAAAAQAAAAAAAAAAAAAAAAAAAAAAAAAAAAAAAAAAAAAAAAAAAAAAAn9/fwAAAAADzMzMAMDA/wB/f38AAAAAAAAAAAAAAAAAAAAAAAAAAAAhAAAAGAAAABQAAAArBAAAKiUAAOgqAABpJwAAEAAAACYAAAAIAAAAPJAAAP8fAAA="/>
               </a:ext>
             </a:extLst>
           </p:cNvSpPr>
@@ -15356,7 +15361,7 @@
             <a:spLocks noGrp="1" noChangeArrowheads="1"/>
             <a:extLst>
               <a:ext uri="smNativeData">
-                <pr:smNativeData xmlns="" xmlns:p14="http://schemas.microsoft.com/office/powerpoint/2010/main" xmlns:pr="smNativeData" val="SMDATA_13_w78LXxMAAAAlAAAAZAAAAA0AAAAAkAAAAEgAAACQAAAASAAAAAAAAAABAAAAAAAAAAEAAABQAAAAAAAAAAAA4D8AAAAAAADgPwAAAAAAAOA/AAAAAAAA4D8AAAAAAADgPwAAAAAAAOA/AAAAAAAA4D8AAAAAAADgPwAAAAAAAOA/AAAAAAAA4D8CAAAAjAAAAAAAAAAAAAAAkMImDP///wgAAAAAAAAAAAAAAAAAAAAAAAAAAAAAAAAAAAAAZAAAAAEAAABAAAAAAAAAAAAAAAAAAAAAAAAAAAAAAAAAAAAAAAAAAAAAAAAAAAAAAAAAAAAAAAAAAAAAAAAAAAAAAAAAAAAAAAAAAAAAAAAAAAAAAAAAAAAAAAAAAAAAFAAAADwAAAAAAAAAAAAAAAAAAAkUAAAAAQAAABQAAAAUAAAAFAAAAAEAAAAAAAAAZAAAAGQAAAAAAAAAZAAAAGQAAAAVAAAAYAAAAAAAAAAAAAAADwAAACADAAAAAAAAAAAAAAEAAACgMgAAVgcAAKr4//8BAAAAf39/AAEAAABkAAAAAAAAABQAAABAHwAAAAAAACYAAAAAAAAAwOD//wAAAAAmAAAAZAAAABYAAABMAAAAAAAAAAAAAAAEAAAAAAAAAAEAAAAsPEMKAAAAACgAAAAoAAAAZAAAAGQAAAAAAAAAzMzMAAAAAABQAAAAUAAAAGQAAABkAAAAAAAAABcAAAAUAAAAAAAAAAAAAAD/fwAA/38AAAAAAAAJAAAABAAAAAAAAAAMAAAAEAAAAAAAAAAAAAAAAAAAAAAAAAAeAAAAaAAAAAAAAAAAAAAAAAAAAAAAAAAAAAAAECcAABAnAAAAAAAAAAAAAAAAAAAAAAAAAAAAAAAAAAAAAAAAAAAAABQAAAAAAAAAwMD/AAAAAABkAAAAMgAAAAAAAABkAAAAAAAAAH9/fwAKAAAAHwAAAFQAAAAAAAAFAAAAAQAAAAAAAAAAAAAAAAAAAAAAAAAAAAAAAAAAAAAAAAAAAAAAAn9/fwAAAAADzMzMAMDA/wB/f38AAAAAAAAAAAAAAAAAAAAAAAAAAAAhAAAAGAAAABQAAADZNAAAKiUAAA05AABpJwAAEAAAACYAAAAIAAAAPLAAAP8fAAA="/>
+                <pr:smNativeData xmlns:pr="smNativeData" xmlns:p14="http://schemas.microsoft.com/office/powerpoint/2010/main" xmlns="" val="SMDATA_13_w78LXxMAAAAlAAAAZAAAAA0AAAAAkAAAAEgAAACQAAAASAAAAAAAAAABAAAAAAAAAAEAAABQAAAAAAAAAAAA4D8AAAAAAADgPwAAAAAAAOA/AAAAAAAA4D8AAAAAAADgPwAAAAAAAOA/AAAAAAAA4D8AAAAAAADgPwAAAAAAAOA/AAAAAAAA4D8CAAAAjAAAAAAAAAAAAAAAkMImDP///wgAAAAAAAAAAAAAAAAAAAAAAAAAAAAAAAAAAAAAZAAAAAEAAABAAAAAAAAAAAAAAAAAAAAAAAAAAAAAAAAAAAAAAAAAAAAAAAAAAAAAAAAAAAAAAAAAAAAAAAAAAAAAAAAAAAAAAAAAAAAAAAAAAAAAAAAAAAAAAAAAAAAAFAAAADwAAAAAAAAAAAAAAAAAAAkUAAAAAQAAABQAAAAUAAAAFAAAAAEAAAAAAAAAZAAAAGQAAAAAAAAAZAAAAGQAAAAVAAAAYAAAAAAAAAAAAAAADwAAACADAAAAAAAAAAAAAAEAAACgMgAAVgcAAKr4//8BAAAAf39/AAEAAABkAAAAAAAAABQAAABAHwAAAAAAACYAAAAAAAAAwOD//wAAAAAmAAAAZAAAABYAAABMAAAAAAAAAAAAAAAEAAAAAAAAAAEAAAAsPEMKAAAAACgAAAAoAAAAZAAAAGQAAAAAAAAAzMzMAAAAAABQAAAAUAAAAGQAAABkAAAAAAAAABcAAAAUAAAAAAAAAAAAAAD/fwAA/38AAAAAAAAJAAAABAAAAAAAAAAMAAAAEAAAAAAAAAAAAAAAAAAAAAAAAAAeAAAAaAAAAAAAAAAAAAAAAAAAAAAAAAAAAAAAECcAABAnAAAAAAAAAAAAAAAAAAAAAAAAAAAAAAAAAAAAAAAAAAAAABQAAAAAAAAAwMD/AAAAAABkAAAAMgAAAAAAAABkAAAAAAAAAH9/fwAKAAAAHwAAAFQAAAAAAAAFAAAAAQAAAAAAAAAAAAAAAAAAAAAAAAAAAAAAAAAAAAAAAAAAAAAAAn9/fwAAAAADzMzMAMDA/wB/f38AAAAAAAAAAAAAAAAAAAAAAAAAAAAhAAAAGAAAABQAAADZNAAAKiUAAA05AABpJwAAEAAAACYAAAAIAAAAPLAAAP8fAAA="/>
               </a:ext>
             </a:extLst>
           </p:cNvSpPr>
@@ -15548,7 +15553,7 @@
             <a:spLocks noGrp="1" noChangeArrowheads="1"/>
             <a:extLst>
               <a:ext uri="smNativeData">
-                <pr:smNativeData xmlns="" xmlns:p14="http://schemas.microsoft.com/office/powerpoint/2010/main" xmlns:pr="smNativeData" val="SMDATA_13_w78LXxMAAAAlAAAAZAAAAA0AAAAAkAAAAJAAAACQAAAAkAAAAAAAAAAAAAAAAAAAAAEAAABQAAAAAAAAAAAA4D8AAAAAAADgPwAAAAAAAOA/AAAAAAAA4D8AAAAAAADgPwAAAAAAAOA/AAAAAAAA4D8AAAAAAADgPwAAAAAAAOA/AAAAAAAA4D8CAAAAjAAAAAAAAAAAAAAAkMImDP///wgAAAAAAAAAAAAAAAAAAAAAAAAAAAAAAAAAAAAAZAAAAAEAAABAAAAAAAAAAAAAAAAAAAAAAAAAAAAAAAAAAAAAAAAAAAAAAAAAAAAAAAAAAAAAAAAAAAAAAAAAAAAAAAAAAAAAAAAAAAAAAAAAAAAAAAAAAAAAAAAAAAAAFAAAADwAAAAAAAAAAAAAAAAAAAkUAAAAAQAAABQAAAAUAAAAFAAAAAEAAAAAAAAAZAAAAGQAAAAAAAAAZAAAAGQAAAAVAAAAYAAAAAAAAAAAAAAADwAAACADAAAAAAAAAAAAAAEAAACgMgAAVgcAAKr4//8BAAAAf39/AAEAAABkAAAAAAAAABQAAABAHwAAAAAAACYAAAAAAAAAwOD//wAAAAAmAAAAZAAAABYAAABMAAAAAAAAAAAAAAAEAAAAAAAAAAEAAAAsPEMKAAAAACgAAAAoAAAAZAAAAGQAAAAAAAAAzMzMAAAAAABQAAAAUAAAAGQAAABkAAAAAAAAABcAAAAUAAAAAAAAAAAAAAD/fwAA/38AAAAAAAAJAAAABAAAAAAAAAAMAAAAEAAAAAAAAAAAAAAAAAAAAAAAAAAeAAAAaAAAAAAAAAAAAAAAAAAAAAAAAAAAAAAAECcAABAnAAAAAAAAAAAAAAAAAAAAAAAAAAAAAAAAAAAAAAAAAAAAABQAAAAAAAAAwMD/AAAAAABkAAAAMgAAAAAAAABkAAAAAAAAAH9/fwAKAAAAHwAAAFQAAAAAAAAFAAAAAQAAAAAAAAAAAAAAAAAAAAAAAAAAAAAAAAAAAAAAAAAAAAAAAn9/fwAAAAADzMzMAMDA/wB/f38AAAAAAAAAAAAAAAAAAAAAAAAAAAAhAAAAGAAAABQAAAArBAAAwAMAAA05AADgCwAAEAAAACYAAAAIAAAAPJAAAP8fAAA="/>
+                <pr:smNativeData xmlns:pr="smNativeData" xmlns:p14="http://schemas.microsoft.com/office/powerpoint/2010/main" xmlns="" val="SMDATA_13_w78LXxMAAAAlAAAAZAAAAA0AAAAAkAAAAJAAAACQAAAAkAAAAAAAAAAAAAAAAAAAAAEAAABQAAAAAAAAAAAA4D8AAAAAAADgPwAAAAAAAOA/AAAAAAAA4D8AAAAAAADgPwAAAAAAAOA/AAAAAAAA4D8AAAAAAADgPwAAAAAAAOA/AAAAAAAA4D8CAAAAjAAAAAAAAAAAAAAAkMImDP///wgAAAAAAAAAAAAAAAAAAAAAAAAAAAAAAAAAAAAAZAAAAAEAAABAAAAAAAAAAAAAAAAAAAAAAAAAAAAAAAAAAAAAAAAAAAAAAAAAAAAAAAAAAAAAAAAAAAAAAAAAAAAAAAAAAAAAAAAAAAAAAAAAAAAAAAAAAAAAAAAAAAAAFAAAADwAAAAAAAAAAAAAAAAAAAkUAAAAAQAAABQAAAAUAAAAFAAAAAEAAAAAAAAAZAAAAGQAAAAAAAAAZAAAAGQAAAAVAAAAYAAAAAAAAAAAAAAADwAAACADAAAAAAAAAAAAAAEAAACgMgAAVgcAAKr4//8BAAAAf39/AAEAAABkAAAAAAAAABQAAABAHwAAAAAAACYAAAAAAAAAwOD//wAAAAAmAAAAZAAAABYAAABMAAAAAAAAAAAAAAAEAAAAAAAAAAEAAAAsPEMKAAAAACgAAAAoAAAAZAAAAGQAAAAAAAAAzMzMAAAAAABQAAAAUAAAAGQAAABkAAAAAAAAABcAAAAUAAAAAAAAAAAAAAD/fwAA/38AAAAAAAAJAAAABAAAAAAAAAAMAAAAEAAAAAAAAAAAAAAAAAAAAAAAAAAeAAAAaAAAAAAAAAAAAAAAAAAAAAAAAAAAAAAAECcAABAnAAAAAAAAAAAAAAAAAAAAAAAAAAAAAAAAAAAAAAAAAAAAABQAAAAAAAAAwMD/AAAAAABkAAAAMgAAAAAAAABkAAAAAAAAAH9/fwAKAAAAHwAAAFQAAAAAAAAFAAAAAQAAAAAAAAAAAAAAAAAAAAAAAAAAAAAAAAAAAAAAAAAAAAAAAn9/fwAAAAADzMzMAMDA/wB/f38AAAAAAAAAAAAAAAAAAAAAAAAAAAAhAAAAGAAAABQAAAArBAAAwAMAAA05AADgCwAAEAAAACYAAAAIAAAAPJAAAP8fAAA="/>
               </a:ext>
             </a:extLst>
           </p:cNvSpPr>
@@ -15711,7 +15716,7 @@
             <a:spLocks noGrp="1" noChangeArrowheads="1"/>
             <a:extLst>
               <a:ext uri="smNativeData">
-                <pr:smNativeData xmlns="" xmlns:p14="http://schemas.microsoft.com/office/powerpoint/2010/main" xmlns:pr="smNativeData" val="SMDATA_13_w78LXxMAAAAlAAAAZAAAAA0AAAAAkAAAAJAAAACQAAAAkAAAAAAAAAAAAAAAAAAAAAEAAABQAAAAAAAAAAAA4D8AAAAAAADgPwAAAAAAAOA/AAAAAAAA4D8AAAAAAADgPwAAAAAAAOA/AAAAAAAA4D8AAAAAAADgPwAAAAAAAOA/AAAAAAAA4D8CAAAAjAAAAAAAAAAAAAAAkMImDP///wgAAAAAAAAAAAAAAAAAAAAAAAAAAAAAAAAAAAAAZAAAAAEAAABAAAAAAAAAAAAAAAAAAAAAAAAAAAAAAAAAAAAAAAAAAAAAAAAAAAAAAAAAAAAAAAAAAAAAAAAAAAAAAAAAAAAAAAAAAAAAAAAAAAAAAAAAAAAAAAAAAAAAFAAAADwAAAAAAAAAAAAAAAAAAAkUAAAAAQAAABQAAAAUAAAAFAAAAAEAAAAAAAAAZAAAAGQAAAAAAAAAZAAAAGQAAAAVAAAAYAAAAAAAAAAAAAAADwAAACADAAAAAAAAAAAAAAEAAACgMgAAVgcAAKr4//8BAAAAf39/AAEAAABkAAAAAAAAABQAAABAHwAAAAAAACYAAAAAAAAAwOD//wAAAAAmAAAAZAAAABYAAABMAAAAAAAAAAAAAAAEAAAAAAAAAAEAAAAsPEMKAAAAACgAAAAoAAAAZAAAAGQAAAAAAAAAzMzMAAAAAABQAAAAUAAAAGQAAABkAAAAAAAAABcAAAAUAAAAAAAAAAAAAAD/fwAA/38AAAAAAAAJAAAABAAAAAAAAAAMAAAAEAAAAAAAAAAAAAAAAAAAAAAAAAAeAAAAaAAAAAAAAAAAAAAAAAAAAAAAAAAAAAAAECcAABAnAAAAAAAAAAAAAAAAAAAAAAAAAAAAAAAAAAAAAAAAAAAAABQAAAAAAAAAwMD/AAAAAABkAAAAMgAAAAAAAABkAAAAAAAAAH9/fwAKAAAAHwAAAFQAAAAAAAAFAAAAAQAAAAAAAAAAAAAAAAAAAAAAAAAAAAAAAAAAAAAAAAAAAAAAAn9/fwAAAAADzMzMAMDA/wB/f38AAAAAAAAAAAAAAAAAAAAAAAAAAAAhAAAAGAAAABQAAAArBAAASw0AAOgdAAAqJQAAEAAAACYAAAAIAAAAPZAAAP8fAAA="/>
+                <pr:smNativeData xmlns:pr="smNativeData" xmlns:p14="http://schemas.microsoft.com/office/powerpoint/2010/main" xmlns="" val="SMDATA_13_w78LXxMAAAAlAAAAZAAAAA0AAAAAkAAAAJAAAACQAAAAkAAAAAAAAAAAAAAAAAAAAAEAAABQAAAAAAAAAAAA4D8AAAAAAADgPwAAAAAAAOA/AAAAAAAA4D8AAAAAAADgPwAAAAAAAOA/AAAAAAAA4D8AAAAAAADgPwAAAAAAAOA/AAAAAAAA4D8CAAAAjAAAAAAAAAAAAAAAkMImDP///wgAAAAAAAAAAAAAAAAAAAAAAAAAAAAAAAAAAAAAZAAAAAEAAABAAAAAAAAAAAAAAAAAAAAAAAAAAAAAAAAAAAAAAAAAAAAAAAAAAAAAAAAAAAAAAAAAAAAAAAAAAAAAAAAAAAAAAAAAAAAAAAAAAAAAAAAAAAAAAAAAAAAAFAAAADwAAAAAAAAAAAAAAAAAAAkUAAAAAQAAABQAAAAUAAAAFAAAAAEAAAAAAAAAZAAAAGQAAAAAAAAAZAAAAGQAAAAVAAAAYAAAAAAAAAAAAAAADwAAACADAAAAAAAAAAAAAAEAAACgMgAAVgcAAKr4//8BAAAAf39/AAEAAABkAAAAAAAAABQAAABAHwAAAAAAACYAAAAAAAAAwOD//wAAAAAmAAAAZAAAABYAAABMAAAAAAAAAAAAAAAEAAAAAAAAAAEAAAAsPEMKAAAAACgAAAAoAAAAZAAAAGQAAAAAAAAAzMzMAAAAAABQAAAAUAAAAGQAAABkAAAAAAAAABcAAAAUAAAAAAAAAAAAAAD/fwAA/38AAAAAAAAJAAAABAAAAAAAAAAMAAAAEAAAAAAAAAAAAAAAAAAAAAAAAAAeAAAAaAAAAAAAAAAAAAAAAAAAAAAAAAAAAAAAECcAABAnAAAAAAAAAAAAAAAAAAAAAAAAAAAAAAAAAAAAAAAAAAAAABQAAAAAAAAAwMD/AAAAAABkAAAAMgAAAAAAAABkAAAAAAAAAH9/fwAKAAAAHwAAAFQAAAAAAAAFAAAAAQAAAAAAAAAAAAAAAAAAAAAAAAAAAAAAAAAAAAAAAAAAAAAAAn9/fwAAAAADzMzMAMDA/wB/f38AAAAAAAAAAAAAAAAAAAAAAAAAAAAhAAAAGAAAABQAAAArBAAASw0AAOgdAAAqJQAAEAAAACYAAAAIAAAAPZAAAP8fAAA="/>
               </a:ext>
             </a:extLst>
           </p:cNvSpPr>
@@ -15947,7 +15952,7 @@
             <a:spLocks noGrp="1" noChangeArrowheads="1"/>
             <a:extLst>
               <a:ext uri="smNativeData">
-                <pr:smNativeData xmlns="" xmlns:p14="http://schemas.microsoft.com/office/powerpoint/2010/main" xmlns:pr="smNativeData" val="SMDATA_13_w78LXxMAAAAlAAAAZAAAAA0AAAAAkAAAAJAAAACQAAAAkAAAAAAAAAAAAAAAAAAAAAEAAABQAAAAAAAAAAAA4D8AAAAAAADgPwAAAAAAAOA/AAAAAAAA4D8AAAAAAADgPwAAAAAAAOA/AAAAAAAA4D8AAAAAAADgPwAAAAAAAOA/AAAAAAAA4D8CAAAAjAAAAAAAAAAAAAAAkMImDP///wgAAAAAAAAAAAAAAAAAAAAAAAAAAAAAAAAAAAAAZAAAAAEAAABAAAAAAAAAAAAAAAAAAAAAAAAAAAAAAAAAAAAAAAAAAAAAAAAAAAAAAAAAAAAAAAAAAAAAAAAAAAAAAAAAAAAAAAAAAAAAAAAAAAAAAAAAAAAAAAAAAAAAFAAAADwAAAAAAAAAAAAAAAAAAAkUAAAAAQAAABQAAAAUAAAAFAAAAAEAAAAAAAAAZAAAAGQAAAAAAAAAZAAAAGQAAAAVAAAAYAAAAAAAAAAAAAAADwAAACADAAAAAAAAAAAAAAEAAACgMgAAVgcAAKr4//8BAAAAf39/AAEAAABkAAAAAAAAABQAAABAHwAAAAAAACYAAAAAAAAAwOD//wAAAAAmAAAAZAAAABYAAABMAAAAAAAAAAAAAAAEAAAAAAAAAAEAAAAsPEMKAAAAACgAAAAoAAAAZAAAAGQAAAAAAAAAzMzMAAAAAABQAAAAUAAAAGQAAABkAAAAAAAAABcAAAAUAAAAAAAAAAAAAAD/fwAA/38AAAAAAAAJAAAABAAAAAAAAAAMAAAAEAAAAAAAAAAAAAAAAAAAAAAAAAAeAAAAaAAAAAAAAAAAAAAAAAAAAAAAAAAAAAAAECcAABAnAAAAAAAAAAAAAAAAAAAAAAAAAAAAAAAAAAAAAAAAAAAAABQAAAAAAAAAwMD/AAAAAABkAAAAMgAAAAAAAABkAAAAAAAAAH9/fwAKAAAAHwAAAFQAAAAAAAAFAAAAAQAAAAAAAAAAAAAAAAAAAAAAAAAAAAAAAAAAAAAAAAAAAAAAAn9/fwAAAAADzMzMAMDA/wB/f38AAAAAAAAAAAAAAAAAAAAAAAAAAAAhAAAAGAAAABQAAABQHwAASw0AAA05AAAqJQAAEAAAACYAAAAIAAAAPZAAAP8fAAA="/>
+                <pr:smNativeData xmlns:pr="smNativeData" xmlns:p14="http://schemas.microsoft.com/office/powerpoint/2010/main" xmlns="" val="SMDATA_13_w78LXxMAAAAlAAAAZAAAAA0AAAAAkAAAAJAAAACQAAAAkAAAAAAAAAAAAAAAAAAAAAEAAABQAAAAAAAAAAAA4D8AAAAAAADgPwAAAAAAAOA/AAAAAAAA4D8AAAAAAADgPwAAAAAAAOA/AAAAAAAA4D8AAAAAAADgPwAAAAAAAOA/AAAAAAAA4D8CAAAAjAAAAAAAAAAAAAAAkMImDP///wgAAAAAAAAAAAAAAAAAAAAAAAAAAAAAAAAAAAAAZAAAAAEAAABAAAAAAAAAAAAAAAAAAAAAAAAAAAAAAAAAAAAAAAAAAAAAAAAAAAAAAAAAAAAAAAAAAAAAAAAAAAAAAAAAAAAAAAAAAAAAAAAAAAAAAAAAAAAAAAAAAAAAFAAAADwAAAAAAAAAAAAAAAAAAAkUAAAAAQAAABQAAAAUAAAAFAAAAAEAAAAAAAAAZAAAAGQAAAAAAAAAZAAAAGQAAAAVAAAAYAAAAAAAAAAAAAAADwAAACADAAAAAAAAAAAAAAEAAACgMgAAVgcAAKr4//8BAAAAf39/AAEAAABkAAAAAAAAABQAAABAHwAAAAAAACYAAAAAAAAAwOD//wAAAAAmAAAAZAAAABYAAABMAAAAAAAAAAAAAAAEAAAAAAAAAAEAAAAsPEMKAAAAACgAAAAoAAAAZAAAAGQAAAAAAAAAzMzMAAAAAABQAAAAUAAAAGQAAABkAAAAAAAAABcAAAAUAAAAAAAAAAAAAAD/fwAA/38AAAAAAAAJAAAABAAAAAAAAAAMAAAAEAAAAAAAAAAAAAAAAAAAAAAAAAAeAAAAaAAAAAAAAAAAAAAAAAAAAAAAAAAAAAAAECcAABAnAAAAAAAAAAAAAAAAAAAAAAAAAAAAAAAAAAAAAAAAAAAAABQAAAAAAAAAwMD/AAAAAABkAAAAMgAAAAAAAABkAAAAAAAAAH9/fwAKAAAAHwAAAFQAAAAAAAAFAAAAAQAAAAAAAAAAAAAAAAAAAAAAAAAAAAAAAAAAAAAAAAAAAAAAAn9/fwAAAAADzMzMAMDA/wB/f38AAAAAAAAAAAAAAAAAAAAAAAAAAAAhAAAAGAAAABQAAABQHwAASw0AAA05AAAqJQAAEAAAACYAAAAIAAAAPZAAAP8fAAA="/>
               </a:ext>
             </a:extLst>
           </p:cNvSpPr>
@@ -16183,7 +16188,7 @@
             <a:spLocks noGrp="1" noChangeArrowheads="1"/>
             <a:extLst>
               <a:ext uri="smNativeData">
-                <pr:smNativeData xmlns="" xmlns:p14="http://schemas.microsoft.com/office/powerpoint/2010/main" xmlns:pr="smNativeData" val="SMDATA_13_w78LXxMAAAAlAAAAZAAAAA0AAAAAkAAAAJAAAACQAAAAkAAAAAAAAAABAAAAAAAAAAEAAABQAAAAAAAAAAAA4D8AAAAAAADgPwAAAAAAAOA/AAAAAAAA4D8AAAAAAADgPwAAAAAAAOA/AAAAAAAA4D8AAAAAAADgPwAAAAAAAOA/AAAAAAAA4D8CAAAAjAAAAAAAAAAAAAAAkMImDP///wgAAAAAAAAAAAAAAAAAAAAAAAAAAAAAAAAAAAAAZAAAAAEAAABAAAAAAAAAAAAAAAAAAAAAAAAAAAAAAAAAAAAAAAAAAAAAAAAAAAAAAAAAAAAAAAAAAAAAAAAAAAAAAAAAAAAAAAAAAAAAAAAAAAAAAAAAAAAAAAAAAAAAFAAAADwAAAAAAAAAAAAAAAAAAAkUAAAAAQAAABQAAAAUAAAAFAAAAAEAAAAAAAAAZAAAAGQAAAAAAAAAZAAAAGQAAAAVAAAAYAAAAAAAAAAAAAAADwAAACADAAAAAAAAAAAAAAEAAACgMgAAVgcAAKr4//8BAAAAf39/AAEAAABkAAAAAAAAABQAAABAHwAAAAAAACYAAAAAAAAAwOD//wAAAAAmAAAAZAAAABYAAABMAAAAAAAAAAAAAAAEAAAAAAAAAAEAAAAsPEMKAAAAACgAAAAoAAAAZAAAAGQAAAAAAAAAzMzMAAAAAABQAAAAUAAAAGQAAABkAAAAAAAAABcAAAAUAAAAAAAAAAAAAAD/fwAA/38AAAAAAAAJAAAABAAAAAAAAAAMAAAAEAAAAAAAAAAAAAAAAAAAAAAAAAAeAAAAaAAAAAAAAAAAAAAAAAAAAAAAAAAAAAAAECcAABAnAAAAAAAAAAAAAAAAAAAAAAAAAAAAAAAAAAAAAAAAAAAAABQAAAAAAAAAwMD/AAAAAABkAAAAMgAAAAAAAABkAAAAAAAAAH9/fwAKAAAAHwAAAFQAAAAAAAAFAAAAAQAAAAAAAAAAAAAAAAAAAAAAAAAAAAAAAAAAAAAAAAAAAAAAAn9/fwAAAAADzMzMAMDA/wB/f38AAAAAAAAAAAAAAAAAAAAAAAAAAAAhAAAAGAAAABQAAABTLAAAKiUAAO8xAABpJwAAEAAAACYAAAAIAAAAPJAAAP8fAAA="/>
+                <pr:smNativeData xmlns:pr="smNativeData" xmlns:p14="http://schemas.microsoft.com/office/powerpoint/2010/main" xmlns="" val="SMDATA_13_w78LXxMAAAAlAAAAZAAAAA0AAAAAkAAAAJAAAACQAAAAkAAAAAAAAAABAAAAAAAAAAEAAABQAAAAAAAAAAAA4D8AAAAAAADgPwAAAAAAAOA/AAAAAAAA4D8AAAAAAADgPwAAAAAAAOA/AAAAAAAA4D8AAAAAAADgPwAAAAAAAOA/AAAAAAAA4D8CAAAAjAAAAAAAAAAAAAAAkMImDP///wgAAAAAAAAAAAAAAAAAAAAAAAAAAAAAAAAAAAAAZAAAAAEAAABAAAAAAAAAAAAAAAAAAAAAAAAAAAAAAAAAAAAAAAAAAAAAAAAAAAAAAAAAAAAAAAAAAAAAAAAAAAAAAAAAAAAAAAAAAAAAAAAAAAAAAAAAAAAAAAAAAAAAFAAAADwAAAAAAAAAAAAAAAAAAAkUAAAAAQAAABQAAAAUAAAAFAAAAAEAAAAAAAAAZAAAAGQAAAAAAAAAZAAAAGQAAAAVAAAAYAAAAAAAAAAAAAAADwAAACADAAAAAAAAAAAAAAEAAACgMgAAVgcAAKr4//8BAAAAf39/AAEAAABkAAAAAAAAABQAAABAHwAAAAAAACYAAAAAAAAAwOD//wAAAAAmAAAAZAAAABYAAABMAAAAAAAAAAAAAAAEAAAAAAAAAAEAAAAsPEMKAAAAACgAAAAoAAAAZAAAAGQAAAAAAAAAzMzMAAAAAABQAAAAUAAAAGQAAABkAAAAAAAAABcAAAAUAAAAAAAAAAAAAAD/fwAA/38AAAAAAAAJAAAABAAAAAAAAAAMAAAAEAAAAAAAAAAAAAAAAAAAAAAAAAAeAAAAaAAAAAAAAAAAAAAAAAAAAAAAAAAAAAAAECcAABAnAAAAAAAAAAAAAAAAAAAAAAAAAAAAAAAAAAAAAAAAAAAAABQAAAAAAAAAwMD/AAAAAABkAAAAMgAAAAAAAABkAAAAAAAAAH9/fwAKAAAAHwAAAFQAAAAAAAAFAAAAAQAAAAAAAAAAAAAAAAAAAAAAAAAAAAAAAAAAAAAAAAAAAAAAAn9/fwAAAAADzMzMAMDA/wB/f38AAAAAAAAAAAAAAAAAAAAAAAAAAAAhAAAAGAAAABQAAABTLAAAKiUAAO8xAABpJwAAEAAAACYAAAAIAAAAPJAAAP8fAAA="/>
               </a:ext>
             </a:extLst>
           </p:cNvSpPr>
@@ -16370,7 +16375,7 @@
             <a:spLocks noGrp="1" noChangeArrowheads="1"/>
             <a:extLst>
               <a:ext uri="smNativeData">
-                <pr:smNativeData xmlns="" xmlns:p14="http://schemas.microsoft.com/office/powerpoint/2010/main" xmlns:pr="smNativeData" val="SMDATA_13_w78LXxMAAAAlAAAAZAAAAA0AAAAAkAAAAJAAAACQAAAAkAAAAAAAAAABAAAAAAAAAAEAAABQAAAAAAAAAAAA4D8AAAAAAADgPwAAAAAAAOA/AAAAAAAA4D8AAAAAAADgPwAAAAAAAOA/AAAAAAAA4D8AAAAAAADgPwAAAAAAAOA/AAAAAAAA4D8CAAAAjAAAAAAAAAAAAAAAkMImDP///wgAAAAAAAAAAAAAAAAAAAAAAAAAAAAAAAAAAAAAZAAAAAEAAABAAAAAAAAAAAAAAAAAAAAAAAAAAAAAAAAAAAAAAAAAAAAAAAAAAAAAAAAAAAAAAAAAAAAAAAAAAAAAAAAAAAAAAAAAAAAAAAAAAAAAAAAAAAAAAAAAAAAAFAAAADwAAAAAAAAAAAAAAAAAAAkUAAAAAQAAABQAAAAUAAAAFAAAAAEAAAAAAAAAZAAAAGQAAAAAAAAAZAAAAGQAAAAVAAAAYAAAAAAAAAAAAAAADwAAACADAAAAAAAAAAAAAAEAAACgMgAAVgcAAKr4//8BAAAAf39/AAEAAABkAAAAAAAAABQAAABAHwAAAAAAACYAAAAAAAAAwOD//wAAAAAmAAAAZAAAABYAAABMAAAAAAAAAAAAAAAEAAAAAAAAAAEAAAAsPEMKAAAAACgAAAAoAAAAZAAAAGQAAAAAAAAAzMzMAAAAAABQAAAAUAAAAGQAAABkAAAAAAAAABcAAAAUAAAAAAAAAAAAAAD/fwAA/38AAAAAAAAJAAAABAAAAAAAAAAMAAAAEAAAAAAAAAAAAAAAAAAAAAAAAAAeAAAAaAAAAAAAAAAAAAAAAAAAAAAAAAAAAAAAECcAABAnAAAAAAAAAAAAAAAAAAAAAAAAAAAAAAAAAAAAAAAAAAAAABQAAAAAAAAAwMD/AAAAAABkAAAAMgAAAAAAAABkAAAAAAAAAH9/fwAKAAAAHwAAAFQAAAAAAAAFAAAAAQAAAAAAAAAAAAAAAAAAAAAAAAAAAAAAAAAAAAAAAAAAAAAAAn9/fwAAAAADzMzMAMDA/wB/f38AAAAAAAAAAAAAAAAAAAAAAAAAAAAhAAAAGAAAABQAAAArBAAAKiUAAOgqAABpJwAAEAAAACYAAAAIAAAAPJAAAP8fAAA="/>
+                <pr:smNativeData xmlns:pr="smNativeData" xmlns:p14="http://schemas.microsoft.com/office/powerpoint/2010/main" xmlns="" val="SMDATA_13_w78LXxMAAAAlAAAAZAAAAA0AAAAAkAAAAJAAAACQAAAAkAAAAAAAAAABAAAAAAAAAAEAAABQAAAAAAAAAAAA4D8AAAAAAADgPwAAAAAAAOA/AAAAAAAA4D8AAAAAAADgPwAAAAAAAOA/AAAAAAAA4D8AAAAAAADgPwAAAAAAAOA/AAAAAAAA4D8CAAAAjAAAAAAAAAAAAAAAkMImDP///wgAAAAAAAAAAAAAAAAAAAAAAAAAAAAAAAAAAAAAZAAAAAEAAABAAAAAAAAAAAAAAAAAAAAAAAAAAAAAAAAAAAAAAAAAAAAAAAAAAAAAAAAAAAAAAAAAAAAAAAAAAAAAAAAAAAAAAAAAAAAAAAAAAAAAAAAAAAAAAAAAAAAAFAAAADwAAAAAAAAAAAAAAAAAAAkUAAAAAQAAABQAAAAUAAAAFAAAAAEAAAAAAAAAZAAAAGQAAAAAAAAAZAAAAGQAAAAVAAAAYAAAAAAAAAAAAAAADwAAACADAAAAAAAAAAAAAAEAAACgMgAAVgcAAKr4//8BAAAAf39/AAEAAABkAAAAAAAAABQAAABAHwAAAAAAACYAAAAAAAAAwOD//wAAAAAmAAAAZAAAABYAAABMAAAAAAAAAAAAAAAEAAAAAAAAAAEAAAAsPEMKAAAAACgAAAAoAAAAZAAAAGQAAAAAAAAAzMzMAAAAAABQAAAAUAAAAGQAAABkAAAAAAAAABcAAAAUAAAAAAAAAAAAAAD/fwAA/38AAAAAAAAJAAAABAAAAAAAAAAMAAAAEAAAAAAAAAAAAAAAAAAAAAAAAAAeAAAAaAAAAAAAAAAAAAAAAAAAAAAAAAAAAAAAECcAABAnAAAAAAAAAAAAAAAAAAAAAAAAAAAAAAAAAAAAAAAAAAAAABQAAAAAAAAAwMD/AAAAAABkAAAAMgAAAAAAAABkAAAAAAAAAH9/fwAKAAAAHwAAAFQAAAAAAAAFAAAAAQAAAAAAAAAAAAAAAAAAAAAAAAAAAAAAAAAAAAAAAAAAAAAAAn9/fwAAAAADzMzMAMDA/wB/f38AAAAAAAAAAAAAAAAAAAAAAAAAAAAhAAAAGAAAABQAAAArBAAAKiUAAOgqAABpJwAAEAAAACYAAAAIAAAAPJAAAP8fAAA="/>
               </a:ext>
             </a:extLst>
           </p:cNvSpPr>
@@ -16557,7 +16562,7 @@
             <a:spLocks noGrp="1" noChangeArrowheads="1"/>
             <a:extLst>
               <a:ext uri="smNativeData">
-                <pr:smNativeData xmlns="" xmlns:p14="http://schemas.microsoft.com/office/powerpoint/2010/main" xmlns:pr="smNativeData" val="SMDATA_13_w78LXxMAAAAlAAAAZAAAAA0AAAAAkAAAAEgAAACQAAAASAAAAAAAAAABAAAAAAAAAAEAAABQAAAAAAAAAAAA4D8AAAAAAADgPwAAAAAAAOA/AAAAAAAA4D8AAAAAAADgPwAAAAAAAOA/AAAAAAAA4D8AAAAAAADgPwAAAAAAAOA/AAAAAAAA4D8CAAAAjAAAAAAAAAAAAAAAkMImDP///wgAAAAAAAAAAAAAAAAAAAAAAAAAAAAAAAAAAAAAZAAAAAEAAABAAAAAAAAAAAAAAAAAAAAAAAAAAAAAAAAAAAAAAAAAAAAAAAAAAAAAAAAAAAAAAAAAAAAAAAAAAAAAAAAAAAAAAAAAAAAAAAAAAAAAAAAAAAAAAAAAAAAAFAAAADwAAAAAAAAAAAAAAAAAAAkUAAAAAQAAABQAAAAUAAAAFAAAAAEAAAAAAAAAZAAAAGQAAAAAAAAAZAAAAGQAAAAVAAAAYAAAAAAAAAAAAAAADwAAACADAAAAAAAAAAAAAAEAAACgMgAAVgcAAKr4//8BAAAAf39/AAEAAABkAAAAAAAAABQAAABAHwAAAAAAACYAAAAAAAAAwOD//wAAAAAmAAAAZAAAABYAAABMAAAAAAAAAAAAAAAEAAAAAAAAAAEAAAAsPEMKAAAAACgAAAAoAAAAZAAAAGQAAAAAAAAAzMzMAAAAAABQAAAAUAAAAGQAAABkAAAAAAAAABcAAAAUAAAAAAAAAAAAAAD/fwAA/38AAAAAAAAJAAAABAAAAAAAAAAMAAAAEAAAAAAAAAAAAAAAAAAAAAAAAAAeAAAAaAAAAAAAAAAAAAAAAAAAAAAAAAAAAAAAECcAABAnAAAAAAAAAAAAAAAAAAAAAAAAAAAAAAAAAAAAAAAAAAAAABQAAAAAAAAAwMD/AAAAAABkAAAAMgAAAAAAAABkAAAAAAAAAH9/fwAKAAAAHwAAAFQAAAAAAAAFAAAAAQAAAAAAAAAAAAAAAAAAAAAAAAAAAAAAAAAAAAAAAAAAAAAAAn9/fwAAAAADzMzMAMDA/wB/f38AAAAAAAAAAAAAAAAAAAAAAAAAAAAhAAAAGAAAABQAAADZNAAAKiUAAA05AABpJwAAEAAAACYAAAAIAAAAPLAAAP8fAAA="/>
+                <pr:smNativeData xmlns:pr="smNativeData" xmlns:p14="http://schemas.microsoft.com/office/powerpoint/2010/main" xmlns="" val="SMDATA_13_w78LXxMAAAAlAAAAZAAAAA0AAAAAkAAAAEgAAACQAAAASAAAAAAAAAABAAAAAAAAAAEAAABQAAAAAAAAAAAA4D8AAAAAAADgPwAAAAAAAOA/AAAAAAAA4D8AAAAAAADgPwAAAAAAAOA/AAAAAAAA4D8AAAAAAADgPwAAAAAAAOA/AAAAAAAA4D8CAAAAjAAAAAAAAAAAAAAAkMImDP///wgAAAAAAAAAAAAAAAAAAAAAAAAAAAAAAAAAAAAAZAAAAAEAAABAAAAAAAAAAAAAAAAAAAAAAAAAAAAAAAAAAAAAAAAAAAAAAAAAAAAAAAAAAAAAAAAAAAAAAAAAAAAAAAAAAAAAAAAAAAAAAAAAAAAAAAAAAAAAAAAAAAAAFAAAADwAAAAAAAAAAAAAAAAAAAkUAAAAAQAAABQAAAAUAAAAFAAAAAEAAAAAAAAAZAAAAGQAAAAAAAAAZAAAAGQAAAAVAAAAYAAAAAAAAAAAAAAADwAAACADAAAAAAAAAAAAAAEAAACgMgAAVgcAAKr4//8BAAAAf39/AAEAAABkAAAAAAAAABQAAABAHwAAAAAAACYAAAAAAAAAwOD//wAAAAAmAAAAZAAAABYAAABMAAAAAAAAAAAAAAAEAAAAAAAAAAEAAAAsPEMKAAAAACgAAAAoAAAAZAAAAGQAAAAAAAAAzMzMAAAAAABQAAAAUAAAAGQAAABkAAAAAAAAABcAAAAUAAAAAAAAAAAAAAD/fwAA/38AAAAAAAAJAAAABAAAAAAAAAAMAAAAEAAAAAAAAAAAAAAAAAAAAAAAAAAeAAAAaAAAAAAAAAAAAAAAAAAAAAAAAAAAAAAAECcAABAnAAAAAAAAAAAAAAAAAAAAAAAAAAAAAAAAAAAAAAAAAAAAABQAAAAAAAAAwMD/AAAAAABkAAAAMgAAAAAAAABkAAAAAAAAAH9/fwAKAAAAHwAAAFQAAAAAAAAFAAAAAQAAAAAAAAAAAAAAAAAAAAAAAAAAAAAAAAAAAAAAAAAAAAAAAn9/fwAAAAADzMzMAMDA/wB/f38AAAAAAAAAAAAAAAAAAAAAAAAAAAAhAAAAGAAAABQAAADZNAAAKiUAAA05AABpJwAAEAAAACYAAAAIAAAAPLAAAP8fAAA="/>
               </a:ext>
             </a:extLst>
           </p:cNvSpPr>
@@ -16749,7 +16754,7 @@
             <a:spLocks noGrp="1" noChangeArrowheads="1"/>
             <a:extLst>
               <a:ext uri="smNativeData">
-                <pr:smNativeData xmlns="" xmlns:p14="http://schemas.microsoft.com/office/powerpoint/2010/main" xmlns:pr="smNativeData" val="SMDATA_13_w78LXxMAAAAlAAAAZAAAAA0AAAAAkAAAAJAAAACQAAAAkAAAAAAAAAAAAAAAAAAAAAEAAABQAAAAAAAAAAAA4D8AAAAAAADgPwAAAAAAAOA/AAAAAAAA4D8AAAAAAADgPwAAAAAAAOA/AAAAAAAA4D8AAAAAAADgPwAAAAAAAOA/AAAAAAAA4D8CAAAAjAAAAAAAAAAAAAAAkMImDP///wgAAAAAAAAAAAAAAAAAAAAAAAAAAAAAAAAAAAAAZAAAAAEAAABAAAAAAAAAAAAAAAAAAAAAAAAAAAAAAAAAAAAAAAAAAAAAAAAAAAAAAAAAAAAAAAAAAAAAAAAAAAAAAAAAAAAAAAAAAAAAAAAAAAAAAAAAAAAAAAAAAAAAFAAAADwAAAAAAAAAAAAAAAAAAAkUAAAAAQAAABQAAAAUAAAAFAAAAAEAAAAAAAAAZAAAAGQAAAAAAAAAZAAAAGQAAAAVAAAAYAAAAAAAAAAAAAAADwAAACADAAAAAAAAAAAAAAEAAACgMgAAVgcAAKr4//8BAAAAf39/AAEAAABkAAAAAAAAABQAAABAHwAAAAAAACYAAAAAAAAAwOD//wAAAAAmAAAAZAAAABYAAABMAAAAAAAAAAAAAAAEAAAAAAAAAAEAAAAsPEMKAAAAACgAAAAoAAAAZAAAAGQAAAAAAAAAzMzMAAAAAABQAAAAUAAAAGQAAABkAAAAAAAAABcAAAAUAAAAAAAAAAAAAAD/fwAA/38AAAAAAAAJAAAABAAAAAAAAAAMAAAAEAAAAAAAAAAAAAAAAAAAAAAAAAAeAAAAaAAAAAAAAAAAAAAAAAAAAAAAAAAAAAAAECcAABAnAAAAAAAAAAAAAAAAAAAAAAAAAAAAAAAAAAAAAAAAAAAAABQAAAAAAAAAwMD/AAAAAABkAAAAMgAAAAAAAABkAAAAAAAAAH9/fwAKAAAAHwAAAFQAAAAAAAAFAAAAAQAAAAAAAAAAAAAAAAAAAAAAAAAAAAAAAAAAAAAAAAAAAAAAAn9/fwAAAAADzMzMAMDA/wB/f38AAAAAAAAAAAAAAAAAAAAAAAAAAAAhAAAAGAAAABQAAAArBAAAwAMAAA05AADgCwAAEAAAACYAAAAIAAAAPJAAAP8fAAA="/>
+                <pr:smNativeData xmlns:pr="smNativeData" xmlns:p14="http://schemas.microsoft.com/office/powerpoint/2010/main" xmlns="" val="SMDATA_13_w78LXxMAAAAlAAAAZAAAAA0AAAAAkAAAAJAAAACQAAAAkAAAAAAAAAAAAAAAAAAAAAEAAABQAAAAAAAAAAAA4D8AAAAAAADgPwAAAAAAAOA/AAAAAAAA4D8AAAAAAADgPwAAAAAAAOA/AAAAAAAA4D8AAAAAAADgPwAAAAAAAOA/AAAAAAAA4D8CAAAAjAAAAAAAAAAAAAAAkMImDP///wgAAAAAAAAAAAAAAAAAAAAAAAAAAAAAAAAAAAAAZAAAAAEAAABAAAAAAAAAAAAAAAAAAAAAAAAAAAAAAAAAAAAAAAAAAAAAAAAAAAAAAAAAAAAAAAAAAAAAAAAAAAAAAAAAAAAAAAAAAAAAAAAAAAAAAAAAAAAAAAAAAAAAFAAAADwAAAAAAAAAAAAAAAAAAAkUAAAAAQAAABQAAAAUAAAAFAAAAAEAAAAAAAAAZAAAAGQAAAAAAAAAZAAAAGQAAAAVAAAAYAAAAAAAAAAAAAAADwAAACADAAAAAAAAAAAAAAEAAACgMgAAVgcAAKr4//8BAAAAf39/AAEAAABkAAAAAAAAABQAAABAHwAAAAAAACYAAAAAAAAAwOD//wAAAAAmAAAAZAAAABYAAABMAAAAAAAAAAAAAAAEAAAAAAAAAAEAAAAsPEMKAAAAACgAAAAoAAAAZAAAAGQAAAAAAAAAzMzMAAAAAABQAAAAUAAAAGQAAABkAAAAAAAAABcAAAAUAAAAAAAAAAAAAAD/fwAA/38AAAAAAAAJAAAABAAAAAAAAAAMAAAAEAAAAAAAAAAAAAAAAAAAAAAAAAAeAAAAaAAAAAAAAAAAAAAAAAAAAAAAAAAAAAAAECcAABAnAAAAAAAAAAAAAAAAAAAAAAAAAAAAAAAAAAAAAAAAAAAAABQAAAAAAAAAwMD/AAAAAABkAAAAMgAAAAAAAABkAAAAAAAAAH9/fwAKAAAAHwAAAFQAAAAAAAAFAAAAAQAAAAAAAAAAAAAAAAAAAAAAAAAAAAAAAAAAAAAAAAAAAAAAAn9/fwAAAAADzMzMAMDA/wB/f38AAAAAAAAAAAAAAAAAAAAAAAAAAAAhAAAAGAAAABQAAAArBAAAwAMAAA05AADgCwAAEAAAACYAAAAIAAAAPJAAAP8fAAA="/>
               </a:ext>
             </a:extLst>
           </p:cNvSpPr>
@@ -16912,7 +16917,7 @@
             <a:spLocks noGrp="1" noChangeArrowheads="1"/>
             <a:extLst>
               <a:ext uri="smNativeData">
-                <pr:smNativeData xmlns="" xmlns:p14="http://schemas.microsoft.com/office/powerpoint/2010/main" xmlns:pr="smNativeData" val="SMDATA_13_w78LXxMAAAAlAAAAZAAAAA0AAAAAkAAAAJAAAACQAAAAkAAAAAAAAAACAAAAAAAAAAEAAABQAAAAAAAAAAAA4D8AAAAAAADgPwAAAAAAAOA/AAAAAAAA4D8AAAAAAADgPwAAAAAAAOA/AAAAAAAA4D8AAAAAAADgPwAAAAAAAOA/AAAAAAAA4D8CAAAAjAAAAAAAAAAAAAAAkMImDP///wgAAAAAAAAAAAAAAAAAAAAAAAAAAAAAAAAAAAAAZAAAAAEAAABAAAAAAAAAAAAAAAAAAAAAAAAAAAAAAAAAAAAAAAAAAAAAAAAAAAAAAAAAAAAAAAAAAAAAAAAAAAAAAAAAAAAAAAAAAAAAAAAAAAAAAAAAAAAAAAAAAAAAFAAAADwAAAAAAAAAAAAAAAAAAAkUAAAAAQAAABQAAAAUAAAAFAAAAAEAAAAAAAAAZAAAAGQAAAAAAAAAZAAAAGQAAAAVAAAAYAAAAAAAAAAAAAAADwAAACADAAAAAAAAAAAAAAEAAACgMgAAVgcAAKr4//8BAAAAf39/AAEAAABkAAAAAAAAABQAAABAHwAAAAAAACYAAAAAAAAAwOD//wAAAAAmAAAAZAAAABYAAABMAAAAAAAAAAAAAAAEAAAAAAAAAAEAAAAsPEMKAAAAACgAAAAoAAAAZAAAAGQAAAAAAAAAzMzMAAAAAABQAAAAUAAAAGQAAABkAAAAAAAAABcAAAAUAAAAAAAAAAAAAAD/fwAA/38AAAAAAAAJAAAABAAAAAAAAAAMAAAAEAAAAAAAAAAAAAAAAAAAAAAAAAAeAAAAaAAAAAAAAAAAAAAAAAAAAAAAAAAAAAAAECcAABAnAAAAAAAAAAAAAAAAAAAAAAAAAAAAAAAAAAAAAAAAAAAAABQAAAAAAAAAwMD/AAAAAABkAAAAMgAAAAAAAABkAAAAAAAAAH9/fwAKAAAAHwAAAFQAAAAAAAAFAAAAAQAAAAAAAAAAAAAAAAAAAAAAAAAAAAAAAAAAAAAAAAAAAAAAAn9/fwAAAAADzMzMAMDA/wB/f38AAAAAAAAAAAAAAAAAAAAAAAAAAAAhAAAAGAAAABQAAAAoBAAASw0AAOgdAADXEAAAEAAAACYAAAAIAAAAvZAAAP8fAAA="/>
+                <pr:smNativeData xmlns:pr="smNativeData" xmlns:p14="http://schemas.microsoft.com/office/powerpoint/2010/main" xmlns="" val="SMDATA_13_w78LXxMAAAAlAAAAZAAAAA0AAAAAkAAAAJAAAACQAAAAkAAAAAAAAAACAAAAAAAAAAEAAABQAAAAAAAAAAAA4D8AAAAAAADgPwAAAAAAAOA/AAAAAAAA4D8AAAAAAADgPwAAAAAAAOA/AAAAAAAA4D8AAAAAAADgPwAAAAAAAOA/AAAAAAAA4D8CAAAAjAAAAAAAAAAAAAAAkMImDP///wgAAAAAAAAAAAAAAAAAAAAAAAAAAAAAAAAAAAAAZAAAAAEAAABAAAAAAAAAAAAAAAAAAAAAAAAAAAAAAAAAAAAAAAAAAAAAAAAAAAAAAAAAAAAAAAAAAAAAAAAAAAAAAAAAAAAAAAAAAAAAAAAAAAAAAAAAAAAAAAAAAAAAFAAAADwAAAAAAAAAAAAAAAAAAAkUAAAAAQAAABQAAAAUAAAAFAAAAAEAAAAAAAAAZAAAAGQAAAAAAAAAZAAAAGQAAAAVAAAAYAAAAAAAAAAAAAAADwAAACADAAAAAAAAAAAAAAEAAACgMgAAVgcAAKr4//8BAAAAf39/AAEAAABkAAAAAAAAABQAAABAHwAAAAAAACYAAAAAAAAAwOD//wAAAAAmAAAAZAAAABYAAABMAAAAAAAAAAAAAAAEAAAAAAAAAAEAAAAsPEMKAAAAACgAAAAoAAAAZAAAAGQAAAAAAAAAzMzMAAAAAABQAAAAUAAAAGQAAABkAAAAAAAAABcAAAAUAAAAAAAAAAAAAAD/fwAA/38AAAAAAAAJAAAABAAAAAAAAAAMAAAAEAAAAAAAAAAAAAAAAAAAAAAAAAAeAAAAaAAAAAAAAAAAAAAAAAAAAAAAAAAAAAAAECcAABAnAAAAAAAAAAAAAAAAAAAAAAAAAAAAAAAAAAAAAAAAAAAAABQAAAAAAAAAwMD/AAAAAABkAAAAMgAAAAAAAABkAAAAAAAAAH9/fwAKAAAAHwAAAFQAAAAAAAAFAAAAAQAAAAAAAAAAAAAAAAAAAAAAAAAAAAAAAAAAAAAAAAAAAAAAAn9/fwAAAAADzMzMAMDA/wB/f38AAAAAAAAAAAAAAAAAAAAAAAAAAAAhAAAAGAAAABQAAAAoBAAASw0AAOgdAADXEAAAEAAAACYAAAAIAAAAvZAAAP8fAAA="/>
               </a:ext>
             </a:extLst>
           </p:cNvSpPr>
@@ -17103,7 +17108,7 @@
             <a:spLocks noGrp="1" noChangeArrowheads="1"/>
             <a:extLst>
               <a:ext uri="smNativeData">
-                <pr:smNativeData xmlns="" xmlns:p14="http://schemas.microsoft.com/office/powerpoint/2010/main" xmlns:pr="smNativeData" val="SMDATA_13_w78LXxMAAAAlAAAAZAAAAA0AAAAAkAAAAJAAAACQAAAAkAAAAAAAAAAAAAAAAAAAAAEAAABQAAAAAAAAAAAA4D8AAAAAAADgPwAAAAAAAOA/AAAAAAAA4D8AAAAAAADgPwAAAAAAAOA/AAAAAAAA4D8AAAAAAADgPwAAAAAAAOA/AAAAAAAA4D8CAAAAjAAAAAAAAAAAAAAAkMImDP///wgAAAAAAAAAAAAAAAAAAAAAAAAAAAAAAAAAAAAAZAAAAAEAAABAAAAAAAAAAAAAAAAAAAAAAAAAAAAAAAAAAAAAAAAAAAAAAAAAAAAAAAAAAAAAAAAAAAAAAAAAAAAAAAAAAAAAAAAAAAAAAAAAAAAAAAAAAAAAAAAAAAAAFAAAADwAAAAAAAAAAAAAAAAAAAkUAAAAAQAAABQAAAAUAAAAFAAAAAEAAAAAAAAAZAAAAGQAAAAAAAAAZAAAAGQAAAAVAAAAYAAAAAAAAAAAAAAADwAAACADAAAAAAAAAAAAAAEAAACgMgAAVgcAAKr4//8BAAAAf39/AAEAAABkAAAAAAAAABQAAABAHwAAAAAAACYAAAAAAAAAwOD//wAAAAAmAAAAZAAAABYAAABMAAAAAAAAAAAAAAAEAAAAAAAAAAEAAAAsPEMKAAAAACgAAAAoAAAAZAAAAGQAAAAAAAAAzMzMAAAAAABQAAAAUAAAAGQAAABkAAAAAAAAABcAAAAUAAAAAAAAAAAAAAD/fwAA/38AAAAAAAAJAAAABAAAAAAAAAAMAAAAEAAAAAAAAAAAAAAAAAAAAAAAAAAeAAAAaAAAAAAAAAAAAAAAAAAAAAAAAAAAAAAAECcAABAnAAAAAAAAAAAAAAAAAAAAAAAAAAAAAAAAAAAAAAAAAAAAABQAAAAAAAAAwMD/AAAAAABkAAAAMgAAAAAAAABkAAAAAAAAAH9/fwAKAAAAHwAAAFQAAAAAAAAFAAAAAQAAAAAAAAAAAAAAAAAAAAAAAAAAAAAAAAAAAAAAAAAAAAAAAn9/fwAAAAADzMzMAMDA/wB/f38AAAAAAAAAAAAAAAAAAAAAAAAAAAAhAAAAGAAAABQAAAAoBAAA1xAAAOgdAAAqJQAAEAAAACYAAAAIAAAAPZAAAP8fAAA="/>
+                <pr:smNativeData xmlns:pr="smNativeData" xmlns:p14="http://schemas.microsoft.com/office/powerpoint/2010/main" xmlns="" val="SMDATA_13_w78LXxMAAAAlAAAAZAAAAA0AAAAAkAAAAJAAAACQAAAAkAAAAAAAAAAAAAAAAAAAAAEAAABQAAAAAAAAAAAA4D8AAAAAAADgPwAAAAAAAOA/AAAAAAAA4D8AAAAAAADgPwAAAAAAAOA/AAAAAAAA4D8AAAAAAADgPwAAAAAAAOA/AAAAAAAA4D8CAAAAjAAAAAAAAAAAAAAAkMImDP///wgAAAAAAAAAAAAAAAAAAAAAAAAAAAAAAAAAAAAAZAAAAAEAAABAAAAAAAAAAAAAAAAAAAAAAAAAAAAAAAAAAAAAAAAAAAAAAAAAAAAAAAAAAAAAAAAAAAAAAAAAAAAAAAAAAAAAAAAAAAAAAAAAAAAAAAAAAAAAAAAAAAAAFAAAADwAAAAAAAAAAAAAAAAAAAkUAAAAAQAAABQAAAAUAAAAFAAAAAEAAAAAAAAAZAAAAGQAAAAAAAAAZAAAAGQAAAAVAAAAYAAAAAAAAAAAAAAADwAAACADAAAAAAAAAAAAAAEAAACgMgAAVgcAAKr4//8BAAAAf39/AAEAAABkAAAAAAAAABQAAABAHwAAAAAAACYAAAAAAAAAwOD//wAAAAAmAAAAZAAAABYAAABMAAAAAAAAAAAAAAAEAAAAAAAAAAEAAAAsPEMKAAAAACgAAAAoAAAAZAAAAGQAAAAAAAAAzMzMAAAAAABQAAAAUAAAAGQAAABkAAAAAAAAABcAAAAUAAAAAAAAAAAAAAD/fwAA/38AAAAAAAAJAAAABAAAAAAAAAAMAAAAEAAAAAAAAAAAAAAAAAAAAAAAAAAeAAAAaAAAAAAAAAAAAAAAAAAAAAAAAAAAAAAAECcAABAnAAAAAAAAAAAAAAAAAAAAAAAAAAAAAAAAAAAAAAAAAAAAABQAAAAAAAAAwMD/AAAAAABkAAAAMgAAAAAAAABkAAAAAAAAAH9/fwAKAAAAHwAAAFQAAAAAAAAFAAAAAQAAAAAAAAAAAAAAAAAAAAAAAAAAAAAAAAAAAAAAAAAAAAAAAn9/fwAAAAADzMzMAMDA/wB/f38AAAAAAAAAAAAAAAAAAAAAAAAAAAAhAAAAGAAAABQAAAAoBAAA1xAAAOgdAAAqJQAAEAAAACYAAAAIAAAAPZAAAP8fAAA="/>
               </a:ext>
             </a:extLst>
           </p:cNvSpPr>
@@ -17339,7 +17344,7 @@
             <a:spLocks noGrp="1" noChangeArrowheads="1"/>
             <a:extLst>
               <a:ext uri="smNativeData">
-                <pr:smNativeData xmlns="" xmlns:p14="http://schemas.microsoft.com/office/powerpoint/2010/main" xmlns:pr="smNativeData" val="SMDATA_13_w78LXxMAAAAlAAAAZAAAAA0AAAAAkAAAAJAAAACQAAAAkAAAAAAAAAACAAAAAAAAAAEAAABQAAAAAAAAAAAA4D8AAAAAAADgPwAAAAAAAOA/AAAAAAAA4D8AAAAAAADgPwAAAAAAAOA/AAAAAAAA4D8AAAAAAADgPwAAAAAAAOA/AAAAAAAA4D8CAAAAjAAAAAAAAAAAAAAAkMImDP///wgAAAAAAAAAAAAAAAAAAAAAAAAAAAAAAAAAAAAAZAAAAAEAAABAAAAAAAAAAAAAAAAAAAAAAAAAAAAAAAAAAAAAAAAAAAAAAAAAAAAAAAAAAAAAAAAAAAAAAAAAAAAAAAAAAAAAAAAAAAAAAAAAAAAAAAAAAAAAAAAAAAAAFAAAADwAAAAAAAAAAAAAAAAAAAkUAAAAAQAAABQAAAAUAAAAFAAAAAEAAAAAAAAAZAAAAGQAAAAAAAAAZAAAAGQAAAAVAAAAYAAAAAAAAAAAAAAADwAAACADAAAAAAAAAAAAAAEAAACgMgAAVgcAAKr4//8BAAAAf39/AAEAAABkAAAAAAAAABQAAABAHwAAAAAAACYAAAAAAAAAwOD//wAAAAAmAAAAZAAAABYAAABMAAAAAAAAAAAAAAAEAAAAAAAAAAEAAAAsPEMKAAAAACgAAAAoAAAAZAAAAGQAAAAAAAAAzMzMAAAAAABQAAAAUAAAAGQAAABkAAAAAAAAABcAAAAUAAAAAAAAAAAAAAD/fwAA/38AAAAAAAAJAAAABAAAAAAAAAAMAAAAEAAAAAAAAAAAAAAAAAAAAAAAAAAeAAAAaAAAAAAAAAAAAAAAAAAAAAAAAAAAAAAAECcAABAnAAAAAAAAAAAAAAAAAAAAAAAAAAAAAAAAAAAAAAAAAAAAABQAAAAAAAAAwMD/AAAAAABkAAAAMgAAAAAAAABkAAAAAAAAAH9/fwAKAAAAHwAAAFQAAAAAAAAFAAAAAQAAAAAAAAAAAAAAAAAAAAAAAAAAAAAAAAAAAAAAAAAAAAAAAn9/fwAAAAADzMzMAMDA/wB/f38AAAAAAAAAAAAAAAAAAAAAAAAAAAAhAAAAGAAAABQAAABNHwAASw0AAA05AADXEAAAEAAAACYAAAAIAAAAvZAAAP8fAAA="/>
+                <pr:smNativeData xmlns:pr="smNativeData" xmlns:p14="http://schemas.microsoft.com/office/powerpoint/2010/main" xmlns="" val="SMDATA_13_w78LXxMAAAAlAAAAZAAAAA0AAAAAkAAAAJAAAACQAAAAkAAAAAAAAAACAAAAAAAAAAEAAABQAAAAAAAAAAAA4D8AAAAAAADgPwAAAAAAAOA/AAAAAAAA4D8AAAAAAADgPwAAAAAAAOA/AAAAAAAA4D8AAAAAAADgPwAAAAAAAOA/AAAAAAAA4D8CAAAAjAAAAAAAAAAAAAAAkMImDP///wgAAAAAAAAAAAAAAAAAAAAAAAAAAAAAAAAAAAAAZAAAAAEAAABAAAAAAAAAAAAAAAAAAAAAAAAAAAAAAAAAAAAAAAAAAAAAAAAAAAAAAAAAAAAAAAAAAAAAAAAAAAAAAAAAAAAAAAAAAAAAAAAAAAAAAAAAAAAAAAAAAAAAFAAAADwAAAAAAAAAAAAAAAAAAAkUAAAAAQAAABQAAAAUAAAAFAAAAAEAAAAAAAAAZAAAAGQAAAAAAAAAZAAAAGQAAAAVAAAAYAAAAAAAAAAAAAAADwAAACADAAAAAAAAAAAAAAEAAACgMgAAVgcAAKr4//8BAAAAf39/AAEAAABkAAAAAAAAABQAAABAHwAAAAAAACYAAAAAAAAAwOD//wAAAAAmAAAAZAAAABYAAABMAAAAAAAAAAAAAAAEAAAAAAAAAAEAAAAsPEMKAAAAACgAAAAoAAAAZAAAAGQAAAAAAAAAzMzMAAAAAABQAAAAUAAAAGQAAABkAAAAAAAAABcAAAAUAAAAAAAAAAAAAAD/fwAA/38AAAAAAAAJAAAABAAAAAAAAAAMAAAAEAAAAAAAAAAAAAAAAAAAAAAAAAAeAAAAaAAAAAAAAAAAAAAAAAAAAAAAAAAAAAAAECcAABAnAAAAAAAAAAAAAAAAAAAAAAAAAAAAAAAAAAAAAAAAAAAAABQAAAAAAAAAwMD/AAAAAABkAAAAMgAAAAAAAABkAAAAAAAAAH9/fwAKAAAAHwAAAFQAAAAAAAAFAAAAAQAAAAAAAAAAAAAAAAAAAAAAAAAAAAAAAAAAAAAAAAAAAAAAAn9/fwAAAAADzMzMAMDA/wB/f38AAAAAAAAAAAAAAAAAAAAAAAAAAAAhAAAAGAAAABQAAABNHwAASw0AAA05AADXEAAAEAAAACYAAAAIAAAAvZAAAP8fAAA="/>
               </a:ext>
             </a:extLst>
           </p:cNvSpPr>
@@ -17530,7 +17535,7 @@
             <a:spLocks noGrp="1" noChangeArrowheads="1"/>
             <a:extLst>
               <a:ext uri="smNativeData">
-                <pr:smNativeData xmlns="" xmlns:p14="http://schemas.microsoft.com/office/powerpoint/2010/main" xmlns:pr="smNativeData" val="SMDATA_13_w78LXxMAAAAlAAAAZAAAAA0AAAAAkAAAAJAAAACQAAAAkAAAAAAAAAAAAAAAAAAAAAEAAABQAAAAAAAAAAAA4D8AAAAAAADgPwAAAAAAAOA/AAAAAAAA4D8AAAAAAADgPwAAAAAAAOA/AAAAAAAA4D8AAAAAAADgPwAAAAAAAOA/AAAAAAAA4D8CAAAAjAAAAAAAAAAAAAAAkMImDP///wgAAAAAAAAAAAAAAAAAAAAAAAAAAAAAAAAAAAAAZAAAAAEAAABAAAAAAAAAAAAAAAAAAAAAAAAAAAAAAAAAAAAAAAAAAAAAAAAAAAAAAAAAAAAAAAAAAAAAAAAAAAAAAAAAAAAAAAAAAAAAAAAAAAAAAAAAAAAAAAAAAAAAFAAAADwAAAAAAAAAAAAAAAAAAAkUAAAAAQAAABQAAAAUAAAAFAAAAAEAAAAAAAAAZAAAAGQAAAAAAAAAZAAAAGQAAAAVAAAAYAAAAAAAAAAAAAAADwAAACADAAAAAAAAAAAAAAEAAACgMgAAVgcAAKr4//8BAAAAf39/AAEAAABkAAAAAAAAABQAAABAHwAAAAAAACYAAAAAAAAAwOD//wAAAAAmAAAAZAAAABYAAABMAAAAAAAAAAAAAAAEAAAAAAAAAAEAAAAsPEMKAAAAACgAAAAoAAAAZAAAAGQAAAAAAAAAzMzMAAAAAABQAAAAUAAAAGQAAABkAAAAAAAAABcAAAAUAAAAAAAAAAAAAAD/fwAA/38AAAAAAAAJAAAABAAAAAAAAAAMAAAAEAAAAAAAAAAAAAAAAAAAAAAAAAAeAAAAaAAAAAAAAAAAAAAAAAAAAAAAAAAAAAAAECcAABAnAAAAAAAAAAAAAAAAAAAAAAAAAAAAAAAAAAAAAAAAAAAAABQAAAAAAAAAwMD/AAAAAABkAAAAMgAAAAAAAABkAAAAAAAAAH9/fwAKAAAAHwAAAFQAAAAAAAAFAAAAAQAAAAAAAAAAAAAAAAAAAAAAAAAAAAAAAAAAAAAAAAAAAAAAAn9/fwAAAAADzMzMAMDA/wB/f38AAAAAAAAAAAAAAAAAAAAAAAAAAAAhAAAAGAAAABQAAABNHwAA1xAAAA05AAAqJQAAEAAAACYAAAAIAAAAPZAAAP8fAAA="/>
+                <pr:smNativeData xmlns:pr="smNativeData" xmlns:p14="http://schemas.microsoft.com/office/powerpoint/2010/main" xmlns="" val="SMDATA_13_w78LXxMAAAAlAAAAZAAAAA0AAAAAkAAAAJAAAACQAAAAkAAAAAAAAAAAAAAAAAAAAAEAAABQAAAAAAAAAAAA4D8AAAAAAADgPwAAAAAAAOA/AAAAAAAA4D8AAAAAAADgPwAAAAAAAOA/AAAAAAAA4D8AAAAAAADgPwAAAAAAAOA/AAAAAAAA4D8CAAAAjAAAAAAAAAAAAAAAkMImDP///wgAAAAAAAAAAAAAAAAAAAAAAAAAAAAAAAAAAAAAZAAAAAEAAABAAAAAAAAAAAAAAAAAAAAAAAAAAAAAAAAAAAAAAAAAAAAAAAAAAAAAAAAAAAAAAAAAAAAAAAAAAAAAAAAAAAAAAAAAAAAAAAAAAAAAAAAAAAAAAAAAAAAAFAAAADwAAAAAAAAAAAAAAAAAAAkUAAAAAQAAABQAAAAUAAAAFAAAAAEAAAAAAAAAZAAAAGQAAAAAAAAAZAAAAGQAAAAVAAAAYAAAAAAAAAAAAAAADwAAACADAAAAAAAAAAAAAAEAAACgMgAAVgcAAKr4//8BAAAAf39/AAEAAABkAAAAAAAAABQAAABAHwAAAAAAACYAAAAAAAAAwOD//wAAAAAmAAAAZAAAABYAAABMAAAAAAAAAAAAAAAEAAAAAAAAAAEAAAAsPEMKAAAAACgAAAAoAAAAZAAAAGQAAAAAAAAAzMzMAAAAAABQAAAAUAAAAGQAAABkAAAAAAAAABcAAAAUAAAAAAAAAAAAAAD/fwAA/38AAAAAAAAJAAAABAAAAAAAAAAMAAAAEAAAAAAAAAAAAAAAAAAAAAAAAAAeAAAAaAAAAAAAAAAAAAAAAAAAAAAAAAAAAAAAECcAABAnAAAAAAAAAAAAAAAAAAAAAAAAAAAAAAAAAAAAAAAAAAAAABQAAAAAAAAAwMD/AAAAAABkAAAAMgAAAAAAAABkAAAAAAAAAH9/fwAKAAAAHwAAAFQAAAAAAAAFAAAAAQAAAAAAAAAAAAAAAAAAAAAAAAAAAAAAAAAAAAAAAAAAAAAAAn9/fwAAAAADzMzMAMDA/wB/f38AAAAAAAAAAAAAAAAAAAAAAAAAAAAhAAAAGAAAABQAAABNHwAA1xAAAA05AAAqJQAAEAAAACYAAAAIAAAAPZAAAP8fAAA="/>
               </a:ext>
             </a:extLst>
           </p:cNvSpPr>
@@ -17766,7 +17771,7 @@
             <a:spLocks noGrp="1" noChangeArrowheads="1"/>
             <a:extLst>
               <a:ext uri="smNativeData">
-                <pr:smNativeData xmlns="" xmlns:p14="http://schemas.microsoft.com/office/powerpoint/2010/main" xmlns:pr="smNativeData" val="SMDATA_13_w78LXxMAAAAlAAAAZAAAAA0AAAAAkAAAAJAAAACQAAAAkAAAAAAAAAABAAAAAAAAAAEAAABQAAAAAAAAAAAA4D8AAAAAAADgPwAAAAAAAOA/AAAAAAAA4D8AAAAAAADgPwAAAAAAAOA/AAAAAAAA4D8AAAAAAADgPwAAAAAAAOA/AAAAAAAA4D8CAAAAjAAAAAAAAAAAAAAAkMImDP///wgAAAAAAAAAAAAAAAAAAAAAAAAAAAAAAAAAAAAAZAAAAAEAAABAAAAAAAAAAAAAAAAAAAAAAAAAAAAAAAAAAAAAAAAAAAAAAAAAAAAAAAAAAAAAAAAAAAAAAAAAAAAAAAAAAAAAAAAAAAAAAAAAAAAAAAAAAAAAAAAAAAAAFAAAADwAAAAAAAAAAAAAAAAAAAkUAAAAAQAAABQAAAAUAAAAFAAAAAEAAAAAAAAAZAAAAGQAAAAAAAAAZAAAAGQAAAAVAAAAYAAAAAAAAAAAAAAADwAAACADAAAAAAAAAAAAAAEAAACgMgAAVgcAAKr4//8BAAAAf39/AAEAAABkAAAAAAAAABQAAABAHwAAAAAAACYAAAAAAAAAwOD//wAAAAAmAAAAZAAAABYAAABMAAAAAAAAAAAAAAAEAAAAAAAAAAEAAAAsPEMKAAAAACgAAAAoAAAAZAAAAGQAAAAAAAAAzMzMAAAAAABQAAAAUAAAAGQAAABkAAAAAAAAABcAAAAUAAAAAAAAAAAAAAD/fwAA/38AAAAAAAAJAAAABAAAAAAAAAAMAAAAEAAAAAAAAAAAAAAAAAAAAAAAAAAeAAAAaAAAAAAAAAAAAAAAAAAAAAAAAAAAAAAAECcAABAnAAAAAAAAAAAAAAAAAAAAAAAAAAAAAAAAAAAAAAAAAAAAABQAAAAAAAAAwMD/AAAAAABkAAAAMgAAAAAAAABkAAAAAAAAAH9/fwAKAAAAHwAAAFQAAAAAAAAFAAAAAQAAAAAAAAAAAAAAAAAAAAAAAAAAAAAAAAAAAAAAAAAAAAAAAn9/fwAAAAADzMzMAMDA/wB/f38AAAAAAAAAAAAAAAAAAAAAAAAAAAAhAAAAGAAAABQAAABTLAAAKiUAAO8xAABpJwAAEAAAACYAAAAIAAAAPJAAAP8fAAA="/>
+                <pr:smNativeData xmlns:pr="smNativeData" xmlns:p14="http://schemas.microsoft.com/office/powerpoint/2010/main" xmlns="" val="SMDATA_13_w78LXxMAAAAlAAAAZAAAAA0AAAAAkAAAAJAAAACQAAAAkAAAAAAAAAABAAAAAAAAAAEAAABQAAAAAAAAAAAA4D8AAAAAAADgPwAAAAAAAOA/AAAAAAAA4D8AAAAAAADgPwAAAAAAAOA/AAAAAAAA4D8AAAAAAADgPwAAAAAAAOA/AAAAAAAA4D8CAAAAjAAAAAAAAAAAAAAAkMImDP///wgAAAAAAAAAAAAAAAAAAAAAAAAAAAAAAAAAAAAAZAAAAAEAAABAAAAAAAAAAAAAAAAAAAAAAAAAAAAAAAAAAAAAAAAAAAAAAAAAAAAAAAAAAAAAAAAAAAAAAAAAAAAAAAAAAAAAAAAAAAAAAAAAAAAAAAAAAAAAAAAAAAAAFAAAADwAAAAAAAAAAAAAAAAAAAkUAAAAAQAAABQAAAAUAAAAFAAAAAEAAAAAAAAAZAAAAGQAAAAAAAAAZAAAAGQAAAAVAAAAYAAAAAAAAAAAAAAADwAAACADAAAAAAAAAAAAAAEAAACgMgAAVgcAAKr4//8BAAAAf39/AAEAAABkAAAAAAAAABQAAABAHwAAAAAAACYAAAAAAAAAwOD//wAAAAAmAAAAZAAAABYAAABMAAAAAAAAAAAAAAAEAAAAAAAAAAEAAAAsPEMKAAAAACgAAAAoAAAAZAAAAGQAAAAAAAAAzMzMAAAAAABQAAAAUAAAAGQAAABkAAAAAAAAABcAAAAUAAAAAAAAAAAAAAD/fwAA/38AAAAAAAAJAAAABAAAAAAAAAAMAAAAEAAAAAAAAAAAAAAAAAAAAAAAAAAeAAAAaAAAAAAAAAAAAAAAAAAAAAAAAAAAAAAAECcAABAnAAAAAAAAAAAAAAAAAAAAAAAAAAAAAAAAAAAAAAAAAAAAABQAAAAAAAAAwMD/AAAAAABkAAAAMgAAAAAAAABkAAAAAAAAAH9/fwAKAAAAHwAAAFQAAAAAAAAFAAAAAQAAAAAAAAAAAAAAAAAAAAAAAAAAAAAAAAAAAAAAAAAAAAAAAn9/fwAAAAADzMzMAMDA/wB/f38AAAAAAAAAAAAAAAAAAAAAAAAAAAAhAAAAGAAAABQAAABTLAAAKiUAAO8xAABpJwAAEAAAACYAAAAIAAAAPJAAAP8fAAA="/>
               </a:ext>
             </a:extLst>
           </p:cNvSpPr>
@@ -17953,7 +17958,7 @@
             <a:spLocks noGrp="1" noChangeArrowheads="1"/>
             <a:extLst>
               <a:ext uri="smNativeData">
-                <pr:smNativeData xmlns="" xmlns:p14="http://schemas.microsoft.com/office/powerpoint/2010/main" xmlns:pr="smNativeData" val="SMDATA_13_w78LXxMAAAAlAAAAZAAAAA0AAAAAkAAAAJAAAACQAAAAkAAAAAAAAAABAAAAAAAAAAEAAABQAAAAAAAAAAAA4D8AAAAAAADgPwAAAAAAAOA/AAAAAAAA4D8AAAAAAADgPwAAAAAAAOA/AAAAAAAA4D8AAAAAAADgPwAAAAAAAOA/AAAAAAAA4D8CAAAAjAAAAAAAAAAAAAAAkMImDP///wgAAAAAAAAAAAAAAAAAAAAAAAAAAAAAAAAAAAAAZAAAAAEAAABAAAAAAAAAAAAAAAAAAAAAAAAAAAAAAAAAAAAAAAAAAAAAAAAAAAAAAAAAAAAAAAAAAAAAAAAAAAAAAAAAAAAAAAAAAAAAAAAAAAAAAAAAAAAAAAAAAAAAFAAAADwAAAAAAAAAAAAAAAAAAAkUAAAAAQAAABQAAAAUAAAAFAAAAAEAAAAAAAAAZAAAAGQAAAAAAAAAZAAAAGQAAAAVAAAAYAAAAAAAAAAAAAAADwAAACADAAAAAAAAAAAAAAEAAACgMgAAVgcAAKr4//8BAAAAf39/AAEAAABkAAAAAAAAABQAAABAHwAAAAAAACYAAAAAAAAAwOD//wAAAAAmAAAAZAAAABYAAABMAAAAAAAAAAAAAAAEAAAAAAAAAAEAAAAsPEMKAAAAACgAAAAoAAAAZAAAAGQAAAAAAAAAzMzMAAAAAABQAAAAUAAAAGQAAABkAAAAAAAAABcAAAAUAAAAAAAAAAAAAAD/fwAA/38AAAAAAAAJAAAABAAAAAAAAAAMAAAAEAAAAAAAAAAAAAAAAAAAAAAAAAAeAAAAaAAAAAAAAAAAAAAAAAAAAAAAAAAAAAAAECcAABAnAAAAAAAAAAAAAAAAAAAAAAAAAAAAAAAAAAAAAAAAAAAAABQAAAAAAAAAwMD/AAAAAABkAAAAMgAAAAAAAABkAAAAAAAAAH9/fwAKAAAAHwAAAFQAAAAAAAAFAAAAAQAAAAAAAAAAAAAAAAAAAAAAAAAAAAAAAAAAAAAAAAAAAAAAAn9/fwAAAAADzMzMAMDA/wB/f38AAAAAAAAAAAAAAAAAAAAAAAAAAAAhAAAAGAAAABQAAAArBAAAKiUAAOgqAABpJwAAEAAAACYAAAAIAAAAPJAAAP8fAAA="/>
+                <pr:smNativeData xmlns:pr="smNativeData" xmlns:p14="http://schemas.microsoft.com/office/powerpoint/2010/main" xmlns="" val="SMDATA_13_w78LXxMAAAAlAAAAZAAAAA0AAAAAkAAAAJAAAACQAAAAkAAAAAAAAAABAAAAAAAAAAEAAABQAAAAAAAAAAAA4D8AAAAAAADgPwAAAAAAAOA/AAAAAAAA4D8AAAAAAADgPwAAAAAAAOA/AAAAAAAA4D8AAAAAAADgPwAAAAAAAOA/AAAAAAAA4D8CAAAAjAAAAAAAAAAAAAAAkMImDP///wgAAAAAAAAAAAAAAAAAAAAAAAAAAAAAAAAAAAAAZAAAAAEAAABAAAAAAAAAAAAAAAAAAAAAAAAAAAAAAAAAAAAAAAAAAAAAAAAAAAAAAAAAAAAAAAAAAAAAAAAAAAAAAAAAAAAAAAAAAAAAAAAAAAAAAAAAAAAAAAAAAAAAFAAAADwAAAAAAAAAAAAAAAAAAAkUAAAAAQAAABQAAAAUAAAAFAAAAAEAAAAAAAAAZAAAAGQAAAAAAAAAZAAAAGQAAAAVAAAAYAAAAAAAAAAAAAAADwAAACADAAAAAAAAAAAAAAEAAACgMgAAVgcAAKr4//8BAAAAf39/AAEAAABkAAAAAAAAABQAAABAHwAAAAAAACYAAAAAAAAAwOD//wAAAAAmAAAAZAAAABYAAABMAAAAAAAAAAAAAAAEAAAAAAAAAAEAAAAsPEMKAAAAACgAAAAoAAAAZAAAAGQAAAAAAAAAzMzMAAAAAABQAAAAUAAAAGQAAABkAAAAAAAAABcAAAAUAAAAAAAAAAAAAAD/fwAA/38AAAAAAAAJAAAABAAAAAAAAAAMAAAAEAAAAAAAAAAAAAAAAAAAAAAAAAAeAAAAaAAAAAAAAAAAAAAAAAAAAAAAAAAAAAAAECcAABAnAAAAAAAAAAAAAAAAAAAAAAAAAAAAAAAAAAAAAAAAAAAAABQAAAAAAAAAwMD/AAAAAABkAAAAMgAAAAAAAABkAAAAAAAAAH9/fwAKAAAAHwAAAFQAAAAAAAAFAAAAAQAAAAAAAAAAAAAAAAAAAAAAAAAAAAAAAAAAAAAAAAAAAAAAAn9/fwAAAAADzMzMAMDA/wB/f38AAAAAAAAAAAAAAAAAAAAAAAAAAAAhAAAAGAAAABQAAAArBAAAKiUAAOgqAABpJwAAEAAAACYAAAAIAAAAPJAAAP8fAAA="/>
               </a:ext>
             </a:extLst>
           </p:cNvSpPr>
@@ -18140,7 +18145,7 @@
             <a:spLocks noGrp="1" noChangeArrowheads="1"/>
             <a:extLst>
               <a:ext uri="smNativeData">
-                <pr:smNativeData xmlns="" xmlns:p14="http://schemas.microsoft.com/office/powerpoint/2010/main" xmlns:pr="smNativeData" val="SMDATA_13_w78LXxMAAAAlAAAAZAAAAA0AAAAAkAAAAEgAAACQAAAASAAAAAAAAAABAAAAAAAAAAEAAABQAAAAAAAAAAAA4D8AAAAAAADgPwAAAAAAAOA/AAAAAAAA4D8AAAAAAADgPwAAAAAAAOA/AAAAAAAA4D8AAAAAAADgPwAAAAAAAOA/AAAAAAAA4D8CAAAAjAAAAAAAAAAAAAAAkMImDP///wgAAAAAAAAAAAAAAAAAAAAAAAAAAAAAAAAAAAAAZAAAAAEAAABAAAAAAAAAAAAAAAAAAAAAAAAAAAAAAAAAAAAAAAAAAAAAAAAAAAAAAAAAAAAAAAAAAAAAAAAAAAAAAAAAAAAAAAAAAAAAAAAAAAAAAAAAAAAAAAAAAAAAFAAAADwAAAAAAAAAAAAAAAAAAAkUAAAAAQAAABQAAAAUAAAAFAAAAAEAAAAAAAAAZAAAAGQAAAAAAAAAZAAAAGQAAAAVAAAAYAAAAAAAAAAAAAAADwAAACADAAAAAAAAAAAAAAEAAACgMgAAVgcAAKr4//8BAAAAf39/AAEAAABkAAAAAAAAABQAAABAHwAAAAAAACYAAAAAAAAAwOD//wAAAAAmAAAAZAAAABYAAABMAAAAAAAAAAAAAAAEAAAAAAAAAAEAAAAsPEMKAAAAACgAAAAoAAAAZAAAAGQAAAAAAAAAzMzMAAAAAABQAAAAUAAAAGQAAABkAAAAAAAAABcAAAAUAAAAAAAAAAAAAAD/fwAA/38AAAAAAAAJAAAABAAAAAAAAAAMAAAAEAAAAAAAAAAAAAAAAAAAAAAAAAAeAAAAaAAAAAAAAAAAAAAAAAAAAAAAAAAAAAAAECcAABAnAAAAAAAAAAAAAAAAAAAAAAAAAAAAAAAAAAAAAAAAAAAAABQAAAAAAAAAwMD/AAAAAABkAAAAMgAAAAAAAABkAAAAAAAAAH9/fwAKAAAAHwAAAFQAAAAAAAAFAAAAAQAAAAAAAAAAAAAAAAAAAAAAAAAAAAAAAAAAAAAAAAAAAAAAAn9/fwAAAAADzMzMAMDA/wB/f38AAAAAAAAAAAAAAAAAAAAAAAAAAAAhAAAAGAAAABQAAADZNAAAKiUAAA05AABpJwAAEAAAACYAAAAIAAAAPLAAAP8fAAA="/>
+                <pr:smNativeData xmlns:pr="smNativeData" xmlns:p14="http://schemas.microsoft.com/office/powerpoint/2010/main" xmlns="" val="SMDATA_13_w78LXxMAAAAlAAAAZAAAAA0AAAAAkAAAAEgAAACQAAAASAAAAAAAAAABAAAAAAAAAAEAAABQAAAAAAAAAAAA4D8AAAAAAADgPwAAAAAAAOA/AAAAAAAA4D8AAAAAAADgPwAAAAAAAOA/AAAAAAAA4D8AAAAAAADgPwAAAAAAAOA/AAAAAAAA4D8CAAAAjAAAAAAAAAAAAAAAkMImDP///wgAAAAAAAAAAAAAAAAAAAAAAAAAAAAAAAAAAAAAZAAAAAEAAABAAAAAAAAAAAAAAAAAAAAAAAAAAAAAAAAAAAAAAAAAAAAAAAAAAAAAAAAAAAAAAAAAAAAAAAAAAAAAAAAAAAAAAAAAAAAAAAAAAAAAAAAAAAAAAAAAAAAAFAAAADwAAAAAAAAAAAAAAAAAAAkUAAAAAQAAABQAAAAUAAAAFAAAAAEAAAAAAAAAZAAAAGQAAAAAAAAAZAAAAGQAAAAVAAAAYAAAAAAAAAAAAAAADwAAACADAAAAAAAAAAAAAAEAAACgMgAAVgcAAKr4//8BAAAAf39/AAEAAABkAAAAAAAAABQAAABAHwAAAAAAACYAAAAAAAAAwOD//wAAAAAmAAAAZAAAABYAAABMAAAAAAAAAAAAAAAEAAAAAAAAAAEAAAAsPEMKAAAAACgAAAAoAAAAZAAAAGQAAAAAAAAAzMzMAAAAAABQAAAAUAAAAGQAAABkAAAAAAAAABcAAAAUAAAAAAAAAAAAAAD/fwAA/38AAAAAAAAJAAAABAAAAAAAAAAMAAAAEAAAAAAAAAAAAAAAAAAAAAAAAAAeAAAAaAAAAAAAAAAAAAAAAAAAAAAAAAAAAAAAECcAABAnAAAAAAAAAAAAAAAAAAAAAAAAAAAAAAAAAAAAAAAAAAAAABQAAAAAAAAAwMD/AAAAAABkAAAAMgAAAAAAAABkAAAAAAAAAH9/fwAKAAAAHwAAAFQAAAAAAAAFAAAAAQAAAAAAAAAAAAAAAAAAAAAAAAAAAAAAAAAAAAAAAAAAAAAAAn9/fwAAAAADzMzMAMDA/wB/f38AAAAAAAAAAAAAAAAAAAAAAAAAAAAhAAAAGAAAABQAAADZNAAAKiUAAA05AABpJwAAEAAAACYAAAAIAAAAPLAAAP8fAAA="/>
               </a:ext>
             </a:extLst>
           </p:cNvSpPr>
@@ -18332,7 +18337,7 @@
             <a:spLocks noGrp="1" noChangeArrowheads="1"/>
             <a:extLst>
               <a:ext uri="smNativeData">
-                <pr:smNativeData xmlns="" xmlns:p14="http://schemas.microsoft.com/office/powerpoint/2010/main" xmlns:pr="smNativeData" val="SMDATA_13_w78LXxMAAAAlAAAAZAAAAA0AAAAAkAAAAJAAAACQAAAAkAAAAAAAAAAAAAAAAAAAAAEAAABQAAAAAAAAAAAA4D8AAAAAAADgPwAAAAAAAOA/AAAAAAAA4D8AAAAAAADgPwAAAAAAAOA/AAAAAAAA4D8AAAAAAADgPwAAAAAAAOA/AAAAAAAA4D8CAAAAjAAAAAAAAAAAAAAAkMImDP///wgAAAAAAAAAAAAAAAAAAAAAAAAAAAAAAAAAAAAAZAAAAAEAAABAAAAAAAAAAAAAAAAAAAAAAAAAAAAAAAAAAAAAAAAAAAAAAAAAAAAAAAAAAAAAAAAAAAAAAAAAAAAAAAAAAAAAAAAAAAAAAAAAAAAAAAAAAAAAAAAAAAAAFAAAADwAAAAAAAAAAAAAAAAAAAkUAAAAAQAAABQAAAAUAAAAFAAAAAEAAAAAAAAAZAAAAGQAAAAAAAAAZAAAAGQAAAAVAAAAYAAAAAAAAAAAAAAADwAAACADAAAAAAAAAAAAAAEAAACgMgAAVgcAAKr4//8BAAAAf39/AAEAAABkAAAAAAAAABQAAABAHwAAAAAAACYAAAAAAAAAwOD//wAAAAAmAAAAZAAAABYAAABMAAAAAAAAAAAAAAAEAAAAAAAAAAEAAAAsPEMKAAAAACgAAAAoAAAAZAAAAGQAAAAAAAAAzMzMAAAAAABQAAAAUAAAAGQAAABkAAAAAAAAABcAAAAUAAAAAAAAAAAAAAD/fwAA/38AAAAAAAAJAAAABAAAAAAAAAAMAAAAEAAAAAAAAAAAAAAAAAAAAAAAAAAeAAAAaAAAAAAAAAAAAAAAAAAAAAAAAAAAAAAAECcAABAnAAAAAAAAAAAAAAAAAAAAAAAAAAAAAAAAAAAAAAAAAAAAABQAAAAAAAAAwMD/AAAAAABkAAAAMgAAAAAAAABkAAAAAAAAAH9/fwAKAAAAHwAAAFQAAAAAAAAFAAAAAQAAAAAAAAAAAAAAAAAAAAAAAAAAAAAAAAAAAAAAAAAAAAAAAn9/fwAAAAADzMzMAMDA/wB/f38AAAAAAAAAAAAAAAAAAAAAAAAAAAAhAAAAGAAAABQAAAArBAAAwAMAAA05AADgCwAAEAAAACYAAAAIAAAAPJAAAP8fAAA="/>
+                <pr:smNativeData xmlns:pr="smNativeData" xmlns:p14="http://schemas.microsoft.com/office/powerpoint/2010/main" xmlns="" val="SMDATA_13_w78LXxMAAAAlAAAAZAAAAA0AAAAAkAAAAJAAAACQAAAAkAAAAAAAAAAAAAAAAAAAAAEAAABQAAAAAAAAAAAA4D8AAAAAAADgPwAAAAAAAOA/AAAAAAAA4D8AAAAAAADgPwAAAAAAAOA/AAAAAAAA4D8AAAAAAADgPwAAAAAAAOA/AAAAAAAA4D8CAAAAjAAAAAAAAAAAAAAAkMImDP///wgAAAAAAAAAAAAAAAAAAAAAAAAAAAAAAAAAAAAAZAAAAAEAAABAAAAAAAAAAAAAAAAAAAAAAAAAAAAAAAAAAAAAAAAAAAAAAAAAAAAAAAAAAAAAAAAAAAAAAAAAAAAAAAAAAAAAAAAAAAAAAAAAAAAAAAAAAAAAAAAAAAAAFAAAADwAAAAAAAAAAAAAAAAAAAkUAAAAAQAAABQAAAAUAAAAFAAAAAEAAAAAAAAAZAAAAGQAAAAAAAAAZAAAAGQAAAAVAAAAYAAAAAAAAAAAAAAADwAAACADAAAAAAAAAAAAAAEAAACgMgAAVgcAAKr4//8BAAAAf39/AAEAAABkAAAAAAAAABQAAABAHwAAAAAAACYAAAAAAAAAwOD//wAAAAAmAAAAZAAAABYAAABMAAAAAAAAAAAAAAAEAAAAAAAAAAEAAAAsPEMKAAAAACgAAAAoAAAAZAAAAGQAAAAAAAAAzMzMAAAAAABQAAAAUAAAAGQAAABkAAAAAAAAABcAAAAUAAAAAAAAAAAAAAD/fwAA/38AAAAAAAAJAAAABAAAAAAAAAAMAAAAEAAAAAAAAAAAAAAAAAAAAAAAAAAeAAAAaAAAAAAAAAAAAAAAAAAAAAAAAAAAAAAAECcAABAnAAAAAAAAAAAAAAAAAAAAAAAAAAAAAAAAAAAAAAAAAAAAABQAAAAAAAAAwMD/AAAAAABkAAAAMgAAAAAAAABkAAAAAAAAAH9/fwAKAAAAHwAAAFQAAAAAAAAFAAAAAQAAAAAAAAAAAAAAAAAAAAAAAAAAAAAAAAAAAAAAAAAAAAAAAn9/fwAAAAADzMzMAMDA/wB/f38AAAAAAAAAAAAAAAAAAAAAAAAAAAAhAAAAGAAAABQAAAArBAAAwAMAAA05AADgCwAAEAAAACYAAAAIAAAAPJAAAP8fAAA="/>
               </a:ext>
             </a:extLst>
           </p:cNvSpPr>
@@ -18495,7 +18500,7 @@
             <a:spLocks noGrp="1" noChangeArrowheads="1"/>
             <a:extLst>
               <a:ext uri="smNativeData">
-                <pr:smNativeData xmlns="" xmlns:p14="http://schemas.microsoft.com/office/powerpoint/2010/main" xmlns:pr="smNativeData" val="SMDATA_13_w78LXxMAAAAlAAAAZAAAAA0AAAAAkAAAAJAAAACQAAAAkAAAAAAAAAABAAAAAAAAAAEAAABQAAAAAAAAAAAA4D8AAAAAAADgPwAAAAAAAOA/AAAAAAAA4D8AAAAAAADgPwAAAAAAAOA/AAAAAAAA4D8AAAAAAADgPwAAAAAAAOA/AAAAAAAA4D8CAAAAjAAAAAAAAAAAAAAAkMImDP///wgAAAAAAAAAAAAAAAAAAAAAAAAAAAAAAAAAAAAAZAAAAAEAAABAAAAAAAAAAAAAAAAAAAAAAAAAAAAAAAAAAAAAAAAAAAAAAAAAAAAAAAAAAAAAAAAAAAAAAAAAAAAAAAAAAAAAAAAAAAAAAAAAAAAAAAAAAAAAAAAAAAAAFAAAADwAAAAAAAAAAAAAAAAAAAkUAAAAAQAAABQAAAAUAAAAFAAAAAEAAAAAAAAAZAAAAGQAAAAAAAAAZAAAAGQAAAAVAAAAYAAAAAAAAAAAAAAADwAAACADAAAAAAAAAAAAAAEAAACgMgAAVgcAAKr4//8BAAAAf39/AAEAAABkAAAAAAAAABQAAABAHwAAAAAAACYAAAAAAAAAwOD//wAAAAAmAAAAZAAAABYAAABMAAAAAAAAAAAAAAAEAAAAAAAAAAEAAAAsPEMKAAAAACgAAAAoAAAAZAAAAGQAAAAAAAAAzMzMAAAAAABQAAAAUAAAAGQAAABkAAAAAAAAABcAAAAUAAAAAAAAAAAAAAD/fwAA/38AAAAAAAAJAAAABAAAAAAAAAAMAAAAEAAAAAAAAAAAAAAAAAAAAAAAAAAeAAAAaAAAAAAAAAAAAAAAAAAAAAAAAAAAAAAAECcAABAnAAAAAAAAAAAAAAAAAAAAAAAAAAAAAAAAAAAAAAAAAAAAABQAAAAAAAAAwMD/AAAAAABkAAAAMgAAAAAAAABkAAAAAAAAAH9/fwAKAAAAHwAAAFQAAAAAAAAFAAAAAQAAAAAAAAAAAAAAAAAAAAAAAAAAAAAAAAAAAAAAAAAAAAAAAn9/fwAAAAADzMzMAMDA/wB/f38AAAAAAAAAAAAAAAAAAAAAAAAAAAAhAAAAGAAAABQAAABTLAAAKiUAAO8xAABpJwAAEAAAACYAAAAIAAAAPJAAAP8fAAA="/>
+                <pr:smNativeData xmlns:pr="smNativeData" xmlns:p14="http://schemas.microsoft.com/office/powerpoint/2010/main" xmlns="" val="SMDATA_13_w78LXxMAAAAlAAAAZAAAAA0AAAAAkAAAAJAAAACQAAAAkAAAAAAAAAABAAAAAAAAAAEAAABQAAAAAAAAAAAA4D8AAAAAAADgPwAAAAAAAOA/AAAAAAAA4D8AAAAAAADgPwAAAAAAAOA/AAAAAAAA4D8AAAAAAADgPwAAAAAAAOA/AAAAAAAA4D8CAAAAjAAAAAAAAAAAAAAAkMImDP///wgAAAAAAAAAAAAAAAAAAAAAAAAAAAAAAAAAAAAAZAAAAAEAAABAAAAAAAAAAAAAAAAAAAAAAAAAAAAAAAAAAAAAAAAAAAAAAAAAAAAAAAAAAAAAAAAAAAAAAAAAAAAAAAAAAAAAAAAAAAAAAAAAAAAAAAAAAAAAAAAAAAAAFAAAADwAAAAAAAAAAAAAAAAAAAkUAAAAAQAAABQAAAAUAAAAFAAAAAEAAAAAAAAAZAAAAGQAAAAAAAAAZAAAAGQAAAAVAAAAYAAAAAAAAAAAAAAADwAAACADAAAAAAAAAAAAAAEAAACgMgAAVgcAAKr4//8BAAAAf39/AAEAAABkAAAAAAAAABQAAABAHwAAAAAAACYAAAAAAAAAwOD//wAAAAAmAAAAZAAAABYAAABMAAAAAAAAAAAAAAAEAAAAAAAAAAEAAAAsPEMKAAAAACgAAAAoAAAAZAAAAGQAAAAAAAAAzMzMAAAAAABQAAAAUAAAAGQAAABkAAAAAAAAABcAAAAUAAAAAAAAAAAAAAD/fwAA/38AAAAAAAAJAAAABAAAAAAAAAAMAAAAEAAAAAAAAAAAAAAAAAAAAAAAAAAeAAAAaAAAAAAAAAAAAAAAAAAAAAAAAAAAAAAAECcAABAnAAAAAAAAAAAAAAAAAAAAAAAAAAAAAAAAAAAAAAAAAAAAABQAAAAAAAAAwMD/AAAAAABkAAAAMgAAAAAAAABkAAAAAAAAAH9/fwAKAAAAHwAAAFQAAAAAAAAFAAAAAQAAAAAAAAAAAAAAAAAAAAAAAAAAAAAAAAAAAAAAAAAAAAAAAn9/fwAAAAADzMzMAMDA/wB/f38AAAAAAAAAAAAAAAAAAAAAAAAAAAAhAAAAGAAAABQAAABTLAAAKiUAAO8xAABpJwAAEAAAACYAAAAIAAAAPJAAAP8fAAA="/>
               </a:ext>
             </a:extLst>
           </p:cNvSpPr>
@@ -18682,7 +18687,7 @@
             <a:spLocks noGrp="1" noChangeArrowheads="1"/>
             <a:extLst>
               <a:ext uri="smNativeData">
-                <pr:smNativeData xmlns="" xmlns:p14="http://schemas.microsoft.com/office/powerpoint/2010/main" xmlns:pr="smNativeData" val="SMDATA_13_w78LXxMAAAAlAAAAZAAAAA0AAAAAkAAAAJAAAACQAAAAkAAAAAAAAAABAAAAAAAAAAEAAABQAAAAAAAAAAAA4D8AAAAAAADgPwAAAAAAAOA/AAAAAAAA4D8AAAAAAADgPwAAAAAAAOA/AAAAAAAA4D8AAAAAAADgPwAAAAAAAOA/AAAAAAAA4D8CAAAAjAAAAAAAAAAAAAAAkMImDP///wgAAAAAAAAAAAAAAAAAAAAAAAAAAAAAAAAAAAAAZAAAAAEAAABAAAAAAAAAAAAAAAAAAAAAAAAAAAAAAAAAAAAAAAAAAAAAAAAAAAAAAAAAAAAAAAAAAAAAAAAAAAAAAAAAAAAAAAAAAAAAAAAAAAAAAAAAAAAAAAAAAAAAFAAAADwAAAAAAAAAAAAAAAAAAAkUAAAAAQAAABQAAAAUAAAAFAAAAAEAAAAAAAAAZAAAAGQAAAAAAAAAZAAAAGQAAAAVAAAAYAAAAAAAAAAAAAAADwAAACADAAAAAAAAAAAAAAEAAACgMgAAVgcAAKr4//8BAAAAf39/AAEAAABkAAAAAAAAABQAAABAHwAAAAAAACYAAAAAAAAAwOD//wAAAAAmAAAAZAAAABYAAABMAAAAAAAAAAAAAAAEAAAAAAAAAAEAAAAsPEMKAAAAACgAAAAoAAAAZAAAAGQAAAAAAAAAzMzMAAAAAABQAAAAUAAAAGQAAABkAAAAAAAAABcAAAAUAAAAAAAAAAAAAAD/fwAA/38AAAAAAAAJAAAABAAAAAAAAAAMAAAAEAAAAAAAAAAAAAAAAAAAAAAAAAAeAAAAaAAAAAAAAAAAAAAAAAAAAAAAAAAAAAAAECcAABAnAAAAAAAAAAAAAAAAAAAAAAAAAAAAAAAAAAAAAAAAAAAAABQAAAAAAAAAwMD/AAAAAABkAAAAMgAAAAAAAABkAAAAAAAAAH9/fwAKAAAAHwAAAFQAAAAAAAAFAAAAAQAAAAAAAAAAAAAAAAAAAAAAAAAAAAAAAAAAAAAAAAAAAAAAAn9/fwAAAAADzMzMAMDA/wB/f38AAAAAAAAAAAAAAAAAAAAAAAAAAAAhAAAAGAAAABQAAAArBAAAKiUAAOgqAABpJwAAEAAAACYAAAAIAAAAPJAAAP8fAAA="/>
+                <pr:smNativeData xmlns:pr="smNativeData" xmlns:p14="http://schemas.microsoft.com/office/powerpoint/2010/main" xmlns="" val="SMDATA_13_w78LXxMAAAAlAAAAZAAAAA0AAAAAkAAAAJAAAACQAAAAkAAAAAAAAAABAAAAAAAAAAEAAABQAAAAAAAAAAAA4D8AAAAAAADgPwAAAAAAAOA/AAAAAAAA4D8AAAAAAADgPwAAAAAAAOA/AAAAAAAA4D8AAAAAAADgPwAAAAAAAOA/AAAAAAAA4D8CAAAAjAAAAAAAAAAAAAAAkMImDP///wgAAAAAAAAAAAAAAAAAAAAAAAAAAAAAAAAAAAAAZAAAAAEAAABAAAAAAAAAAAAAAAAAAAAAAAAAAAAAAAAAAAAAAAAAAAAAAAAAAAAAAAAAAAAAAAAAAAAAAAAAAAAAAAAAAAAAAAAAAAAAAAAAAAAAAAAAAAAAAAAAAAAAFAAAADwAAAAAAAAAAAAAAAAAAAkUAAAAAQAAABQAAAAUAAAAFAAAAAEAAAAAAAAAZAAAAGQAAAAAAAAAZAAAAGQAAAAVAAAAYAAAAAAAAAAAAAAADwAAACADAAAAAAAAAAAAAAEAAACgMgAAVgcAAKr4//8BAAAAf39/AAEAAABkAAAAAAAAABQAAABAHwAAAAAAACYAAAAAAAAAwOD//wAAAAAmAAAAZAAAABYAAABMAAAAAAAAAAAAAAAEAAAAAAAAAAEAAAAsPEMKAAAAACgAAAAoAAAAZAAAAGQAAAAAAAAAzMzMAAAAAABQAAAAUAAAAGQAAABkAAAAAAAAABcAAAAUAAAAAAAAAAAAAAD/fwAA/38AAAAAAAAJAAAABAAAAAAAAAAMAAAAEAAAAAAAAAAAAAAAAAAAAAAAAAAeAAAAaAAAAAAAAAAAAAAAAAAAAAAAAAAAAAAAECcAABAnAAAAAAAAAAAAAAAAAAAAAAAAAAAAAAAAAAAAAAAAAAAAABQAAAAAAAAAwMD/AAAAAABkAAAAMgAAAAAAAABkAAAAAAAAAH9/fwAKAAAAHwAAAFQAAAAAAAAFAAAAAQAAAAAAAAAAAAAAAAAAAAAAAAAAAAAAAAAAAAAAAAAAAAAAAn9/fwAAAAADzMzMAMDA/wB/f38AAAAAAAAAAAAAAAAAAAAAAAAAAAAhAAAAGAAAABQAAAArBAAAKiUAAOgqAABpJwAAEAAAACYAAAAIAAAAPJAAAP8fAAA="/>
               </a:ext>
             </a:extLst>
           </p:cNvSpPr>
@@ -18869,7 +18874,7 @@
             <a:spLocks noGrp="1" noChangeArrowheads="1"/>
             <a:extLst>
               <a:ext uri="smNativeData">
-                <pr:smNativeData xmlns="" xmlns:p14="http://schemas.microsoft.com/office/powerpoint/2010/main" xmlns:pr="smNativeData" val="SMDATA_13_w78LXxMAAAAlAAAAZAAAAA0AAAAAkAAAAEgAAACQAAAASAAAAAAAAAABAAAAAAAAAAEAAABQAAAAAAAAAAAA4D8AAAAAAADgPwAAAAAAAOA/AAAAAAAA4D8AAAAAAADgPwAAAAAAAOA/AAAAAAAA4D8AAAAAAADgPwAAAAAAAOA/AAAAAAAA4D8CAAAAjAAAAAAAAAAAAAAAkMImDP///wgAAAAAAAAAAAAAAAAAAAAAAAAAAAAAAAAAAAAAZAAAAAEAAABAAAAAAAAAAAAAAAAAAAAAAAAAAAAAAAAAAAAAAAAAAAAAAAAAAAAAAAAAAAAAAAAAAAAAAAAAAAAAAAAAAAAAAAAAAAAAAAAAAAAAAAAAAAAAAAAAAAAAFAAAADwAAAAAAAAAAAAAAAAAAAkUAAAAAQAAABQAAAAUAAAAFAAAAAEAAAAAAAAAZAAAAGQAAAAAAAAAZAAAAGQAAAAVAAAAYAAAAAAAAAAAAAAADwAAACADAAAAAAAAAAAAAAEAAACgMgAAVgcAAKr4//8BAAAAf39/AAEAAABkAAAAAAAAABQAAABAHwAAAAAAACYAAAAAAAAAwOD//wAAAAAmAAAAZAAAABYAAABMAAAAAAAAAAAAAAAEAAAAAAAAAAEAAAAsPEMKAAAAACgAAAAoAAAAZAAAAGQAAAAAAAAAzMzMAAAAAABQAAAAUAAAAGQAAABkAAAAAAAAABcAAAAUAAAAAAAAAAAAAAD/fwAA/38AAAAAAAAJAAAABAAAAAAAAAAMAAAAEAAAAAAAAAAAAAAAAAAAAAAAAAAeAAAAaAAAAAAAAAAAAAAAAAAAAAAAAAAAAAAAECcAABAnAAAAAAAAAAAAAAAAAAAAAAAAAAAAAAAAAAAAAAAAAAAAABQAAAAAAAAAwMD/AAAAAABkAAAAMgAAAAAAAABkAAAAAAAAAH9/fwAKAAAAHwAAAFQAAAAAAAAFAAAAAQAAAAAAAAAAAAAAAAAAAAAAAAAAAAAAAAAAAAAAAAAAAAAAAn9/fwAAAAADzMzMAMDA/wB/f38AAAAAAAAAAAAAAAAAAAAAAAAAAAAhAAAAGAAAABQAAADZNAAAKiUAAA05AABpJwAAEAAAACYAAAAIAAAAPLAAAP8fAAA="/>
+                <pr:smNativeData xmlns:pr="smNativeData" xmlns:p14="http://schemas.microsoft.com/office/powerpoint/2010/main" xmlns="" val="SMDATA_13_w78LXxMAAAAlAAAAZAAAAA0AAAAAkAAAAEgAAACQAAAASAAAAAAAAAABAAAAAAAAAAEAAABQAAAAAAAAAAAA4D8AAAAAAADgPwAAAAAAAOA/AAAAAAAA4D8AAAAAAADgPwAAAAAAAOA/AAAAAAAA4D8AAAAAAADgPwAAAAAAAOA/AAAAAAAA4D8CAAAAjAAAAAAAAAAAAAAAkMImDP///wgAAAAAAAAAAAAAAAAAAAAAAAAAAAAAAAAAAAAAZAAAAAEAAABAAAAAAAAAAAAAAAAAAAAAAAAAAAAAAAAAAAAAAAAAAAAAAAAAAAAAAAAAAAAAAAAAAAAAAAAAAAAAAAAAAAAAAAAAAAAAAAAAAAAAAAAAAAAAAAAAAAAAFAAAADwAAAAAAAAAAAAAAAAAAAkUAAAAAQAAABQAAAAUAAAAFAAAAAEAAAAAAAAAZAAAAGQAAAAAAAAAZAAAAGQAAAAVAAAAYAAAAAAAAAAAAAAADwAAACADAAAAAAAAAAAAAAEAAACgMgAAVgcAAKr4//8BAAAAf39/AAEAAABkAAAAAAAAABQAAABAHwAAAAAAACYAAAAAAAAAwOD//wAAAAAmAAAAZAAAABYAAABMAAAAAAAAAAAAAAAEAAAAAAAAAAEAAAAsPEMKAAAAACgAAAAoAAAAZAAAAGQAAAAAAAAAzMzMAAAAAABQAAAAUAAAAGQAAABkAAAAAAAAABcAAAAUAAAAAAAAAAAAAAD/fwAA/38AAAAAAAAJAAAABAAAAAAAAAAMAAAAEAAAAAAAAAAAAAAAAAAAAAAAAAAeAAAAaAAAAAAAAAAAAAAAAAAAAAAAAAAAAAAAECcAABAnAAAAAAAAAAAAAAAAAAAAAAAAAAAAAAAAAAAAAAAAAAAAABQAAAAAAAAAwMD/AAAAAABkAAAAMgAAAAAAAABkAAAAAAAAAH9/fwAKAAAAHwAAAFQAAAAAAAAFAAAAAQAAAAAAAAAAAAAAAAAAAAAAAAAAAAAAAAAAAAAAAAAAAAAAAn9/fwAAAAADzMzMAMDA/wB/f38AAAAAAAAAAAAAAAAAAAAAAAAAAAAhAAAAGAAAABQAAADZNAAAKiUAAA05AABpJwAAEAAAACYAAAAIAAAAPLAAAP8fAAA="/>
               </a:ext>
             </a:extLst>
           </p:cNvSpPr>
@@ -19061,7 +19066,7 @@
             <a:spLocks noGrp="1" noChangeArrowheads="1"/>
             <a:extLst>
               <a:ext uri="smNativeData">
-                <pr:smNativeData xmlns="" xmlns:p14="http://schemas.microsoft.com/office/powerpoint/2010/main" xmlns:pr="smNativeData" val="SMDATA_13_w78LXxMAAAAlAAAAZAAAAA0AAAAAkAAAAJAAAACQAAAAkAAAAAAAAAABAAAAAAAAAAEAAABQAAAAAAAAAAAA4D8AAAAAAADgPwAAAAAAAOA/AAAAAAAA4D8AAAAAAADgPwAAAAAAAOA/AAAAAAAA4D8AAAAAAADgPwAAAAAAAOA/AAAAAAAA4D8CAAAAjAAAAAAAAAAAAAAAkMImDP///wgAAAAAAAAAAAAAAAAAAAAAAAAAAAAAAAAAAAAAZAAAAAEAAABAAAAAAAAAAAAAAAAAAAAAAAAAAAAAAAAAAAAAAAAAAAAAAAAAAAAAAAAAAAAAAAAAAAAAAAAAAAAAAAAAAAAAAAAAAAAAAAAAAAAAAAAAAAAAAAAAAAAAFAAAADwAAAAAAAAAAAAAAAAAAAkUAAAAAQAAABQAAAAUAAAAFAAAAAEAAAAAAAAAZAAAAGQAAAAAAAAAZAAAAGQAAAAVAAAAYAAAAAAAAAAAAAAADwAAACADAAAAAAAAAAAAAAEAAACgMgAAVgcAAKr4//8BAAAAf39/AAEAAABkAAAAAAAAABQAAABAHwAAAAAAACYAAAAAAAAAwOD//wAAAAAmAAAAZAAAABYAAABMAAAAAAAAAAAAAAAEAAAAAAAAAAEAAAAsPEMKAAAAACgAAAAoAAAAZAAAAGQAAAAAAAAAzMzMAAAAAABQAAAAUAAAAGQAAABkAAAAAAAAABcAAAAUAAAAAAAAAAAAAAD/fwAA/38AAAAAAAAJAAAABAAAAAAAAAAMAAAAEAAAAAAAAAAAAAAAAAAAAAAAAAAeAAAAaAAAAAAAAAAAAAAAAAAAAAAAAAAAAAAAECcAABAnAAAAAAAAAAAAAAAAAAAAAAAAAAAAAAAAAAAAAAAAAAAAABQAAAAAAAAAwMD/AAAAAABkAAAAMgAAAAAAAABkAAAAAAAAAH9/fwAKAAAAHwAAAFQAAAAAAAAFAAAAAQAAAAAAAAAAAAAAAAAAAAAAAAAAAAAAAAAAAAAAAAAAAAAAAn9/fwAAAAADzMzMAMDA/wB/f38AAAAAAAAAAAAAAAAAAAAAAAAAAAAhAAAAGAAAABQAAABTLAAAKiUAAO8xAABpJwAAEAAAACYAAAAIAAAAPJAAAP8fAAA="/>
+                <pr:smNativeData xmlns:pr="smNativeData" xmlns:p14="http://schemas.microsoft.com/office/powerpoint/2010/main" xmlns="" val="SMDATA_13_w78LXxMAAAAlAAAAZAAAAA0AAAAAkAAAAJAAAACQAAAAkAAAAAAAAAABAAAAAAAAAAEAAABQAAAAAAAAAAAA4D8AAAAAAADgPwAAAAAAAOA/AAAAAAAA4D8AAAAAAADgPwAAAAAAAOA/AAAAAAAA4D8AAAAAAADgPwAAAAAAAOA/AAAAAAAA4D8CAAAAjAAAAAAAAAAAAAAAkMImDP///wgAAAAAAAAAAAAAAAAAAAAAAAAAAAAAAAAAAAAAZAAAAAEAAABAAAAAAAAAAAAAAAAAAAAAAAAAAAAAAAAAAAAAAAAAAAAAAAAAAAAAAAAAAAAAAAAAAAAAAAAAAAAAAAAAAAAAAAAAAAAAAAAAAAAAAAAAAAAAAAAAAAAAFAAAADwAAAAAAAAAAAAAAAAAAAkUAAAAAQAAABQAAAAUAAAAFAAAAAEAAAAAAAAAZAAAAGQAAAAAAAAAZAAAAGQAAAAVAAAAYAAAAAAAAAAAAAAADwAAACADAAAAAAAAAAAAAAEAAACgMgAAVgcAAKr4//8BAAAAf39/AAEAAABkAAAAAAAAABQAAABAHwAAAAAAACYAAAAAAAAAwOD//wAAAAAmAAAAZAAAABYAAABMAAAAAAAAAAAAAAAEAAAAAAAAAAEAAAAsPEMKAAAAACgAAAAoAAAAZAAAAGQAAAAAAAAAzMzMAAAAAABQAAAAUAAAAGQAAABkAAAAAAAAABcAAAAUAAAAAAAAAAAAAAD/fwAA/38AAAAAAAAJAAAABAAAAAAAAAAMAAAAEAAAAAAAAAAAAAAAAAAAAAAAAAAeAAAAaAAAAAAAAAAAAAAAAAAAAAAAAAAAAAAAECcAABAnAAAAAAAAAAAAAAAAAAAAAAAAAAAAAAAAAAAAAAAAAAAAABQAAAAAAAAAwMD/AAAAAABkAAAAMgAAAAAAAABkAAAAAAAAAH9/fwAKAAAAHwAAAFQAAAAAAAAFAAAAAQAAAAAAAAAAAAAAAAAAAAAAAAAAAAAAAAAAAAAAAAAAAAAAAn9/fwAAAAADzMzMAMDA/wB/f38AAAAAAAAAAAAAAAAAAAAAAAAAAAAhAAAAGAAAABQAAABTLAAAKiUAAO8xAABpJwAAEAAAACYAAAAIAAAAPJAAAP8fAAA="/>
               </a:ext>
             </a:extLst>
           </p:cNvSpPr>
@@ -19248,7 +19253,7 @@
             <a:spLocks noGrp="1" noChangeArrowheads="1"/>
             <a:extLst>
               <a:ext uri="smNativeData">
-                <pr:smNativeData xmlns="" xmlns:p14="http://schemas.microsoft.com/office/powerpoint/2010/main" xmlns:pr="smNativeData" val="SMDATA_13_w78LXxMAAAAlAAAAZAAAAA0AAAAAkAAAAJAAAACQAAAAkAAAAAAAAAABAAAAAAAAAAEAAABQAAAAAAAAAAAA4D8AAAAAAADgPwAAAAAAAOA/AAAAAAAA4D8AAAAAAADgPwAAAAAAAOA/AAAAAAAA4D8AAAAAAADgPwAAAAAAAOA/AAAAAAAA4D8CAAAAjAAAAAAAAAAAAAAAkMImDP///wgAAAAAAAAAAAAAAAAAAAAAAAAAAAAAAAAAAAAAZAAAAAEAAABAAAAAAAAAAAAAAAAAAAAAAAAAAAAAAAAAAAAAAAAAAAAAAAAAAAAAAAAAAAAAAAAAAAAAAAAAAAAAAAAAAAAAAAAAAAAAAAAAAAAAAAAAAAAAAAAAAAAAFAAAADwAAAAAAAAAAAAAAAAAAAkUAAAAAQAAABQAAAAUAAAAFAAAAAEAAAAAAAAAZAAAAGQAAAAAAAAAZAAAAGQAAAAVAAAAYAAAAAAAAAAAAAAADwAAACADAAAAAAAAAAAAAAEAAACgMgAAVgcAAKr4//8BAAAAf39/AAEAAABkAAAAAAAAABQAAABAHwAAAAAAACYAAAAAAAAAwOD//wAAAAAmAAAAZAAAABYAAABMAAAAAAAAAAAAAAAEAAAAAAAAAAEAAAAsPEMKAAAAACgAAAAoAAAAZAAAAGQAAAAAAAAAzMzMAAAAAABQAAAAUAAAAGQAAABkAAAAAAAAABcAAAAUAAAAAAAAAAAAAAD/fwAA/38AAAAAAAAJAAAABAAAAAAAAAAMAAAAEAAAAAAAAAAAAAAAAAAAAAAAAAAeAAAAaAAAAAAAAAAAAAAAAAAAAAAAAAAAAAAAECcAABAnAAAAAAAAAAAAAAAAAAAAAAAAAAAAAAAAAAAAAAAAAAAAABQAAAAAAAAAwMD/AAAAAABkAAAAMgAAAAAAAABkAAAAAAAAAH9/fwAKAAAAHwAAAFQAAAAAAAAFAAAAAQAAAAAAAAAAAAAAAAAAAAAAAAAAAAAAAAAAAAAAAAAAAAAAAn9/fwAAAAADzMzMAMDA/wB/f38AAAAAAAAAAAAAAAAAAAAAAAAAAAAhAAAAGAAAABQAAAArBAAAKiUAAOgqAABpJwAAEAAAACYAAAAIAAAAPJAAAP8fAAA="/>
+                <pr:smNativeData xmlns:pr="smNativeData" xmlns:p14="http://schemas.microsoft.com/office/powerpoint/2010/main" xmlns="" val="SMDATA_13_w78LXxMAAAAlAAAAZAAAAA0AAAAAkAAAAJAAAACQAAAAkAAAAAAAAAABAAAAAAAAAAEAAABQAAAAAAAAAAAA4D8AAAAAAADgPwAAAAAAAOA/AAAAAAAA4D8AAAAAAADgPwAAAAAAAOA/AAAAAAAA4D8AAAAAAADgPwAAAAAAAOA/AAAAAAAA4D8CAAAAjAAAAAAAAAAAAAAAkMImDP///wgAAAAAAAAAAAAAAAAAAAAAAAAAAAAAAAAAAAAAZAAAAAEAAABAAAAAAAAAAAAAAAAAAAAAAAAAAAAAAAAAAAAAAAAAAAAAAAAAAAAAAAAAAAAAAAAAAAAAAAAAAAAAAAAAAAAAAAAAAAAAAAAAAAAAAAAAAAAAAAAAAAAAFAAAADwAAAAAAAAAAAAAAAAAAAkUAAAAAQAAABQAAAAUAAAAFAAAAAEAAAAAAAAAZAAAAGQAAAAAAAAAZAAAAGQAAAAVAAAAYAAAAAAAAAAAAAAADwAAACADAAAAAAAAAAAAAAEAAACgMgAAVgcAAKr4//8BAAAAf39/AAEAAABkAAAAAAAAABQAAABAHwAAAAAAACYAAAAAAAAAwOD//wAAAAAmAAAAZAAAABYAAABMAAAAAAAAAAAAAAAEAAAAAAAAAAEAAAAsPEMKAAAAACgAAAAoAAAAZAAAAGQAAAAAAAAAzMzMAAAAAABQAAAAUAAAAGQAAABkAAAAAAAAABcAAAAUAAAAAAAAAAAAAAD/fwAA/38AAAAAAAAJAAAABAAAAAAAAAAMAAAAEAAAAAAAAAAAAAAAAAAAAAAAAAAeAAAAaAAAAAAAAAAAAAAAAAAAAAAAAAAAAAAAECcAABAnAAAAAAAAAAAAAAAAAAAAAAAAAAAAAAAAAAAAAAAAAAAAABQAAAAAAAAAwMD/AAAAAABkAAAAMgAAAAAAAABkAAAAAAAAAH9/fwAKAAAAHwAAAFQAAAAAAAAFAAAAAQAAAAAAAAAAAAAAAAAAAAAAAAAAAAAAAAAAAAAAAAAAAAAAAn9/fwAAAAADzMzMAMDA/wB/f38AAAAAAAAAAAAAAAAAAAAAAAAAAAAhAAAAGAAAABQAAAArBAAAKiUAAOgqAABpJwAAEAAAACYAAAAIAAAAPJAAAP8fAAA="/>
               </a:ext>
             </a:extLst>
           </p:cNvSpPr>
@@ -19435,7 +19440,7 @@
             <a:spLocks noGrp="1" noChangeArrowheads="1"/>
             <a:extLst>
               <a:ext uri="smNativeData">
-                <pr:smNativeData xmlns="" xmlns:p14="http://schemas.microsoft.com/office/powerpoint/2010/main" xmlns:pr="smNativeData" val="SMDATA_13_w78LXxMAAAAlAAAAZAAAAA0AAAAAkAAAAEgAAACQAAAASAAAAAAAAAABAAAAAAAAAAEAAABQAAAAAAAAAAAA4D8AAAAAAADgPwAAAAAAAOA/AAAAAAAA4D8AAAAAAADgPwAAAAAAAOA/AAAAAAAA4D8AAAAAAADgPwAAAAAAAOA/AAAAAAAA4D8CAAAAjAAAAAAAAAAAAAAAkMImDP///wgAAAAAAAAAAAAAAAAAAAAAAAAAAAAAAAAAAAAAZAAAAAEAAABAAAAAAAAAAAAAAAAAAAAAAAAAAAAAAAAAAAAAAAAAAAAAAAAAAAAAAAAAAAAAAAAAAAAAAAAAAAAAAAAAAAAAAAAAAAAAAAAAAAAAAAAAAAAAAAAAAAAAFAAAADwAAAAAAAAAAAAAAAAAAAkUAAAAAQAAABQAAAAUAAAAFAAAAAEAAAAAAAAAZAAAAGQAAAAAAAAAZAAAAGQAAAAVAAAAYAAAAAAAAAAAAAAADwAAACADAAAAAAAAAAAAAAEAAACgMgAAVgcAAKr4//8BAAAAf39/AAEAAABkAAAAAAAAABQAAABAHwAAAAAAACYAAAAAAAAAwOD//wAAAAAmAAAAZAAAABYAAABMAAAAAAAAAAAAAAAEAAAAAAAAAAEAAAAsPEMKAAAAACgAAAAoAAAAZAAAAGQAAAAAAAAAzMzMAAAAAABQAAAAUAAAAGQAAABkAAAAAAAAABcAAAAUAAAAAAAAAAAAAAD/fwAA/38AAAAAAAAJAAAABAAAAAAAAAAMAAAAEAAAAAAAAAAAAAAAAAAAAAAAAAAeAAAAaAAAAAAAAAAAAAAAAAAAAAAAAAAAAAAAECcAABAnAAAAAAAAAAAAAAAAAAAAAAAAAAAAAAAAAAAAAAAAAAAAABQAAAAAAAAAwMD/AAAAAABkAAAAMgAAAAAAAABkAAAAAAAAAH9/fwAKAAAAHwAAAFQAAAAAAAAFAAAAAQAAAAAAAAAAAAAAAAAAAAAAAAAAAAAAAAAAAAAAAAAAAAAAAn9/fwAAAAADzMzMAMDA/wB/f38AAAAAAAAAAAAAAAAAAAAAAAAAAAAhAAAAGAAAABQAAADZNAAAKiUAAA05AABpJwAAEAAAACYAAAAIAAAAPLAAAP8fAAA="/>
+                <pr:smNativeData xmlns:pr="smNativeData" xmlns:p14="http://schemas.microsoft.com/office/powerpoint/2010/main" xmlns="" val="SMDATA_13_w78LXxMAAAAlAAAAZAAAAA0AAAAAkAAAAEgAAACQAAAASAAAAAAAAAABAAAAAAAAAAEAAABQAAAAAAAAAAAA4D8AAAAAAADgPwAAAAAAAOA/AAAAAAAA4D8AAAAAAADgPwAAAAAAAOA/AAAAAAAA4D8AAAAAAADgPwAAAAAAAOA/AAAAAAAA4D8CAAAAjAAAAAAAAAAAAAAAkMImDP///wgAAAAAAAAAAAAAAAAAAAAAAAAAAAAAAAAAAAAAZAAAAAEAAABAAAAAAAAAAAAAAAAAAAAAAAAAAAAAAAAAAAAAAAAAAAAAAAAAAAAAAAAAAAAAAAAAAAAAAAAAAAAAAAAAAAAAAAAAAAAAAAAAAAAAAAAAAAAAAAAAAAAAFAAAADwAAAAAAAAAAAAAAAAAAAkUAAAAAQAAABQAAAAUAAAAFAAAAAEAAAAAAAAAZAAAAGQAAAAAAAAAZAAAAGQAAAAVAAAAYAAAAAAAAAAAAAAADwAAACADAAAAAAAAAAAAAAEAAACgMgAAVgcAAKr4//8BAAAAf39/AAEAAABkAAAAAAAAABQAAABAHwAAAAAAACYAAAAAAAAAwOD//wAAAAAmAAAAZAAAABYAAABMAAAAAAAAAAAAAAAEAAAAAAAAAAEAAAAsPEMKAAAAACgAAAAoAAAAZAAAAGQAAAAAAAAAzMzMAAAAAABQAAAAUAAAAGQAAABkAAAAAAAAABcAAAAUAAAAAAAAAAAAAAD/fwAA/38AAAAAAAAJAAAABAAAAAAAAAAMAAAAEAAAAAAAAAAAAAAAAAAAAAAAAAAeAAAAaAAAAAAAAAAAAAAAAAAAAAAAAAAAAAAAECcAABAnAAAAAAAAAAAAAAAAAAAAAAAAAAAAAAAAAAAAAAAAAAAAABQAAAAAAAAAwMD/AAAAAABkAAAAMgAAAAAAAABkAAAAAAAAAH9/fwAKAAAAHwAAAFQAAAAAAAAFAAAAAQAAAAAAAAAAAAAAAAAAAAAAAAAAAAAAAAAAAAAAAAAAAAAAAn9/fwAAAAADzMzMAMDA/wB/f38AAAAAAAAAAAAAAAAAAAAAAAAAAAAhAAAAGAAAABQAAADZNAAAKiUAAA05AABpJwAAEAAAACYAAAAIAAAAPLAAAP8fAAA="/>
               </a:ext>
             </a:extLst>
           </p:cNvSpPr>
@@ -19627,7 +19632,7 @@
             <a:spLocks noGrp="1" noChangeArrowheads="1"/>
             <a:extLst>
               <a:ext uri="smNativeData">
-                <pr:smNativeData xmlns="" xmlns:p14="http://schemas.microsoft.com/office/powerpoint/2010/main" xmlns:pr="smNativeData" val="SMDATA_13_w78LXxMAAAAlAAAAZAAAAA0AAAAAkAAAAJAAAACQAAAAkAAAAAAAAAACAAAAAAAAAAEAAABQAAAAAAAAAAAA4D8AAAAAAADgPwAAAAAAAOA/AAAAAAAA4D8AAAAAAADgPwAAAAAAAOA/AAAAAAAA4D8AAAAAAADgPwAAAAAAAOA/AAAAAAAA4D8CAAAAjAAAAAAAAAAAAAAAkMImDP///wgAAAAAAAAAAAAAAAAAAAAAAAAAAAAAAAAAAAAAZAAAAAEAAABAAAAAAAAAAAAAAAAAAAAAAAAAAAAAAAAAAAAAAAAAAAAAAAAAAAAAAAAAAAAAAAAAAAAAAAAAAAAAAAAAAAAAAAAAAAAAAAAAAAAAAAAAAAAAAAAAAAAAFAAAADwAAAAAAAAAAAAAAAAAAAkUAAAAAQAAABQAAAAUAAAAFAAAAAEAAAAAAAAAZAAAAGQAAAAAAAAAZAAAAGQAAAAVAAAAYAAAAAAAAAAAAAAADwAAACADAAAAAAAAAAAAAAEAAACgMgAAVgcAAKr4//8BAAAAf39/AAEAAABkAAAAAAAAABQAAABAHwAAAAAAACYAAAAAAAAAwOD//wAAAAAmAAAAZAAAABYAAABMAAAAAAAAAAAAAAAEAAAAAAAAAAEAAAAsPEMKAAAAACgAAAAoAAAAZAAAAGQAAAAAAAAAzMzMAAAAAABQAAAAUAAAAGQAAABkAAAAAAAAABcAAAAUAAAAAAAAAAAAAAD/fwAA/38AAAAAAAAJAAAABAAAAAAAAAAMAAAAEAAAAAAAAAAAAAAAAAAAAAAAAAAeAAAAaAAAAAAAAAAAAAAAAAAAAAAAAAAAAAAAECcAABAnAAAAAAAAAAAAAAAAAAAAAAAAAAAAAAAAAAAAAAAAAAAAABQAAAAAAAAAwMD/AAAAAABkAAAAMgAAAAAAAABkAAAAAAAAAH9/fwAKAAAAHwAAAFQAAAAAAAAFAAAAAQAAAAAAAAAAAAAAAAAAAAAAAAAAAAAAAAAAAAAAAAAAAAAAAn9/fwAAAAADzMzMAMDA/wB/f38AAAAAAAAAAAAAAAAAAAAAAAAAAAAhAAAAGAAAABQAAAArBAAAOAkAAOEbAAAVEQAAEAAAACYAAAAIAAAAvZAAAP8fAAA="/>
+                <pr:smNativeData xmlns:pr="smNativeData" xmlns:p14="http://schemas.microsoft.com/office/powerpoint/2010/main" xmlns="" val="SMDATA_13_w78LXxMAAAAlAAAAZAAAAA0AAAAAkAAAAJAAAACQAAAAkAAAAAAAAAACAAAAAAAAAAEAAABQAAAAAAAAAAAA4D8AAAAAAADgPwAAAAAAAOA/AAAAAAAA4D8AAAAAAADgPwAAAAAAAOA/AAAAAAAA4D8AAAAAAADgPwAAAAAAAOA/AAAAAAAA4D8CAAAAjAAAAAAAAAAAAAAAkMImDP///wgAAAAAAAAAAAAAAAAAAAAAAAAAAAAAAAAAAAAAZAAAAAEAAABAAAAAAAAAAAAAAAAAAAAAAAAAAAAAAAAAAAAAAAAAAAAAAAAAAAAAAAAAAAAAAAAAAAAAAAAAAAAAAAAAAAAAAAAAAAAAAAAAAAAAAAAAAAAAAAAAAAAAFAAAADwAAAAAAAAAAAAAAAAAAAkUAAAAAQAAABQAAAAUAAAAFAAAAAEAAAAAAAAAZAAAAGQAAAAAAAAAZAAAAGQAAAAVAAAAYAAAAAAAAAAAAAAADwAAACADAAAAAAAAAAAAAAEAAACgMgAAVgcAAKr4//8BAAAAf39/AAEAAABkAAAAAAAAABQAAABAHwAAAAAAACYAAAAAAAAAwOD//wAAAAAmAAAAZAAAABYAAABMAAAAAAAAAAAAAAAEAAAAAAAAAAEAAAAsPEMKAAAAACgAAAAoAAAAZAAAAGQAAAAAAAAAzMzMAAAAAABQAAAAUAAAAGQAAABkAAAAAAAAABcAAAAUAAAAAAAAAAAAAAD/fwAA/38AAAAAAAAJAAAABAAAAAAAAAAMAAAAEAAAAAAAAAAAAAAAAAAAAAAAAAAeAAAAaAAAAAAAAAAAAAAAAAAAAAAAAAAAAAAAECcAABAnAAAAAAAAAAAAAAAAAAAAAAAAAAAAAAAAAAAAAAAAAAAAABQAAAAAAAAAwMD/AAAAAABkAAAAMgAAAAAAAABkAAAAAAAAAH9/fwAKAAAAHwAAAFQAAAAAAAAFAAAAAQAAAAAAAAAAAAAAAAAAAAAAAAAAAAAAAAAAAAAAAAAAAAAAAn9/fwAAAAADzMzMAMDA/wB/f38AAAAAAAAAAAAAAAAAAAAAAAAAAAAhAAAAGAAAABQAAAArBAAAOAkAAOEbAAAVEQAAEAAAACYAAAAIAAAAvZAAAP8fAAA="/>
               </a:ext>
             </a:extLst>
           </p:cNvSpPr>
@@ -19794,7 +19799,7 @@
             <a:spLocks noGrp="1" noChangeArrowheads="1"/>
             <a:extLst>
               <a:ext uri="smNativeData">
-                <pr:smNativeData xmlns="" xmlns:p14="http://schemas.microsoft.com/office/powerpoint/2010/main" xmlns:pr="smNativeData" val="SMDATA_13_w78LXxMAAAAlAAAAZAAAAA0AAAAAkAAAAJAAAACQAAAAkAAAAAAAAAAAAAAAAAAAAAEAAABQAAAAAAAAAAAA4D8AAAAAAADgPwAAAAAAAOA/AAAAAAAA4D8AAAAAAADgPwAAAAAAAOA/AAAAAAAA4D8AAAAAAADgPwAAAAAAAOA/AAAAAAAA4D8CAAAAjAAAAAAAAAAAAAAAkMImDP///wgAAAAAAAAAAAAAAAAAAAAAAAAAAAAAAAAAAAAAZAAAAAEAAABAAAAAAAAAAAAAAAAAAAAAAAAAAAAAAAAAAAAAAAAAAAAAAAAAAAAAAAAAAAAAAAAAAAAAAAAAAAAAAAAAAAAAAAAAAAAAAAAAAAAAAAAAAAAAAAAAAAAAFAAAADwAAAAAAAAAAAAAAAAAAAkUAAAAAQAAABQAAAAUAAAAFAAAAAEAAAAAAAAAZAAAAGQAAAAAAAAAZAAAAGQAAAAVAAAAYAAAAAAAAAAAAAAADwAAACADAAAAAAAAAAAAAAEAAACgMgAAVgcAAKr4//8BAAAAf39/AAEAAABkAAAAAAAAABQAAABAHwAAAAAAACYAAAAAAAAAwOD//wAAAAAmAAAAZAAAABYAAABMAAAAAAAAAAAAAAAEAAAAAAAAAAEAAAAsPEMKAAAAACgAAAAoAAAAZAAAAGQAAAAAAAAAzMzMAAAAAABQAAAAUAAAAGQAAABkAAAAAAAAABcAAAAUAAAAAAAAAAAAAAD/fwAA/38AAAAAAAAJAAAABAAAAAAAAAAMAAAAEAAAAAAAAAAAAAAAAAAAAAAAAAAeAAAAaAAAAAAAAAAAAAAAAAAAAAAAAAAAAAAAECcAABAnAAAAAAAAAAAAAAAAAAAAAAAAAAAAAAAAAAAAAAAAAAAAABQAAAAAAAAAwMD/AAAAAABkAAAAMgAAAAAAAABkAAAAAAAAAH9/fwAKAAAAHwAAAFQAAAAAAAAFAAAAAQAAAAAAAAAAAAAAAAAAAAAAAAAAAAAAAAAAAAAAAAAAAAAAAn9/fwAAAAADzMzMAMDA/wB/f38AAAAAAAAAAAAAAAAAAAAAAAAAAAAhAAAAGAAAABQAAABJHQAAKwMAAA05AAAqJQAAEAAAACYAAAAIAAAAPZAAAP8fAAA="/>
+                <pr:smNativeData xmlns:pr="smNativeData" xmlns:p14="http://schemas.microsoft.com/office/powerpoint/2010/main" xmlns="" val="SMDATA_13_w78LXxMAAAAlAAAAZAAAAA0AAAAAkAAAAJAAAACQAAAAkAAAAAAAAAAAAAAAAAAAAAEAAABQAAAAAAAAAAAA4D8AAAAAAADgPwAAAAAAAOA/AAAAAAAA4D8AAAAAAADgPwAAAAAAAOA/AAAAAAAA4D8AAAAAAADgPwAAAAAAAOA/AAAAAAAA4D8CAAAAjAAAAAAAAAAAAAAAkMImDP///wgAAAAAAAAAAAAAAAAAAAAAAAAAAAAAAAAAAAAAZAAAAAEAAABAAAAAAAAAAAAAAAAAAAAAAAAAAAAAAAAAAAAAAAAAAAAAAAAAAAAAAAAAAAAAAAAAAAAAAAAAAAAAAAAAAAAAAAAAAAAAAAAAAAAAAAAAAAAAAAAAAAAAFAAAADwAAAAAAAAAAAAAAAAAAAkUAAAAAQAAABQAAAAUAAAAFAAAAAEAAAAAAAAAZAAAAGQAAAAAAAAAZAAAAGQAAAAVAAAAYAAAAAAAAAAAAAAADwAAACADAAAAAAAAAAAAAAEAAACgMgAAVgcAAKr4//8BAAAAf39/AAEAAABkAAAAAAAAABQAAABAHwAAAAAAACYAAAAAAAAAwOD//wAAAAAmAAAAZAAAABYAAABMAAAAAAAAAAAAAAAEAAAAAAAAAAEAAAAsPEMKAAAAACgAAAAoAAAAZAAAAGQAAAAAAAAAzMzMAAAAAABQAAAAUAAAAGQAAABkAAAAAAAAABcAAAAUAAAAAAAAAAAAAAD/fwAA/38AAAAAAAAJAAAABAAAAAAAAAAMAAAAEAAAAAAAAAAAAAAAAAAAAAAAAAAeAAAAaAAAAAAAAAAAAAAAAAAAAAAAAAAAAAAAECcAABAnAAAAAAAAAAAAAAAAAAAAAAAAAAAAAAAAAAAAAAAAAAAAABQAAAAAAAAAwMD/AAAAAABkAAAAMgAAAAAAAABkAAAAAAAAAH9/fwAKAAAAHwAAAFQAAAAAAAAFAAAAAQAAAAAAAAAAAAAAAAAAAAAAAAAAAAAAAAAAAAAAAAAAAAAAAn9/fwAAAAADzMzMAMDA/wB/f38AAAAAAAAAAAAAAAAAAAAAAAAAAAAhAAAAGAAAABQAAABJHQAAKwMAAA05AAAqJQAAEAAAACYAAAAIAAAAPZAAAP8fAAA="/>
               </a:ext>
             </a:extLst>
           </p:cNvSpPr>
@@ -20030,7 +20035,7 @@
             <a:spLocks noGrp="1" noChangeArrowheads="1"/>
             <a:extLst>
               <a:ext uri="smNativeData">
-                <pr:smNativeData xmlns="" xmlns:p14="http://schemas.microsoft.com/office/powerpoint/2010/main" xmlns:pr="smNativeData" val="SMDATA_13_w78LXxMAAAAlAAAAZAAAAA0AAAAAkAAAAJAAAACQAAAAkAAAAAAAAAAAAAAAAAAAAAEAAABQAAAAAAAAAAAA4D8AAAAAAADgPwAAAAAAAOA/AAAAAAAA4D8AAAAAAADgPwAAAAAAAOA/AAAAAAAA4D8AAAAAAADgPwAAAAAAAOA/AAAAAAAA4D8CAAAAjAAAAAAAAAAAAAAAkMImDP///wgAAAAAAAAAAAAAAAAAAAAAAAAAAAAAAAAAAAAAZAAAAAEAAABAAAAAAAAAAAAAAAAAAAAAAAAAAAAAAAAAAAAAAAAAAAAAAAAAAAAAAAAAAAAAAAAAAAAAAAAAAAAAAAAAAAAAAAAAAAAAAAAAAAAAAAAAAAAAAAAAAAAAFAAAADwAAAAAAAAAAAAAAAAAAAkUAAAAAQAAABQAAAAUAAAAFAAAAAEAAAAAAAAAZAAAAGQAAAAAAAAAZAAAAGQAAAAVAAAAYAAAAAAAAAAAAAAADwAAACADAAAAAAAAAAAAAAEAAACgMgAAVgcAAKr4//8BAAAAf39/AAEAAABkAAAAAAAAABQAAABAHwAAAAAAACYAAAAAAAAAwOD//wAAAAAmAAAAZAAAABYAAABMAAAAAAAAAAAAAAAEAAAAAAAAAAEAAAAsPEMKAAAAACgAAAAoAAAAZAAAAGQAAAAAAAAAzMzMAAAAAABQAAAAUAAAAGQAAABkAAAAAAAAABcAAAAUAAAAAAAAAAAAAAD/fwAA/38AAAAAAAAJAAAABAAAAAAAAAAMAAAAEAAAAAAAAAAAAAAAAAAAAAAAAAAeAAAAaAAAAAAAAAAAAAAAAAAAAAAAAAAAAAAAECcAABAnAAAAAAAAAAAAAAAAAAAAAAAAAAAAAAAAAAAAAAAAAAAAABQAAAAAAAAAwMD/AAAAAABkAAAAMgAAAAAAAABkAAAAAAAAAH9/fwAKAAAAHwAAAFQAAAAAAAAFAAAAAQAAAAAAAAAAAAAAAAAAAAAAAAAAAAAAAAAAAAAAAAAAAAAAAn9/fwAAAAADzMzMAMDA/wB/f38AAAAAAAAAAAAAAAAAAAAAAAAAAAAhAAAAGAAAABQAAAArBAAAFREAAOEbAAD7IAAAEAAAACYAAAAIAAAAPZAAAP8fAAA="/>
+                <pr:smNativeData xmlns:pr="smNativeData" xmlns:p14="http://schemas.microsoft.com/office/powerpoint/2010/main" xmlns="" val="SMDATA_13_w78LXxMAAAAlAAAAZAAAAA0AAAAAkAAAAJAAAACQAAAAkAAAAAAAAAAAAAAAAAAAAAEAAABQAAAAAAAAAAAA4D8AAAAAAADgPwAAAAAAAOA/AAAAAAAA4D8AAAAAAADgPwAAAAAAAOA/AAAAAAAA4D8AAAAAAADgPwAAAAAAAOA/AAAAAAAA4D8CAAAAjAAAAAAAAAAAAAAAkMImDP///wgAAAAAAAAAAAAAAAAAAAAAAAAAAAAAAAAAAAAAZAAAAAEAAABAAAAAAAAAAAAAAAAAAAAAAAAAAAAAAAAAAAAAAAAAAAAAAAAAAAAAAAAAAAAAAAAAAAAAAAAAAAAAAAAAAAAAAAAAAAAAAAAAAAAAAAAAAAAAAAAAAAAAFAAAADwAAAAAAAAAAAAAAAAAAAkUAAAAAQAAABQAAAAUAAAAFAAAAAEAAAAAAAAAZAAAAGQAAAAAAAAAZAAAAGQAAAAVAAAAYAAAAAAAAAAAAAAADwAAACADAAAAAAAAAAAAAAEAAACgMgAAVgcAAKr4//8BAAAAf39/AAEAAABkAAAAAAAAABQAAABAHwAAAAAAACYAAAAAAAAAwOD//wAAAAAmAAAAZAAAABYAAABMAAAAAAAAAAAAAAAEAAAAAAAAAAEAAAAsPEMKAAAAACgAAAAoAAAAZAAAAGQAAAAAAAAAzMzMAAAAAABQAAAAUAAAAGQAAABkAAAAAAAAABcAAAAUAAAAAAAAAAAAAAD/fwAA/38AAAAAAAAJAAAABAAAAAAAAAAMAAAAEAAAAAAAAAAAAAAAAAAAAAAAAAAeAAAAaAAAAAAAAAAAAAAAAAAAAAAAAAAAAAAAECcAABAnAAAAAAAAAAAAAAAAAAAAAAAAAAAAAAAAAAAAAAAAAAAAABQAAAAAAAAAwMD/AAAAAABkAAAAMgAAAAAAAABkAAAAAAAAAH9/fwAKAAAAHwAAAFQAAAAAAAAFAAAAAQAAAAAAAAAAAAAAAAAAAAAAAAAAAAAAAAAAAAAAAAAAAAAAAn9/fwAAAAADzMzMAMDA/wB/f38AAAAAAAAAAAAAAAAAAAAAAAAAAAAhAAAAGAAAABQAAAArBAAAFREAAOEbAAD7IAAAEAAAACYAAAAIAAAAPZAAAP8fAAA="/>
               </a:ext>
             </a:extLst>
           </p:cNvSpPr>
@@ -20221,7 +20226,7 @@
             <a:spLocks noGrp="1" noChangeArrowheads="1"/>
             <a:extLst>
               <a:ext uri="smNativeData">
-                <pr:smNativeData xmlns="" xmlns:p14="http://schemas.microsoft.com/office/powerpoint/2010/main" xmlns:pr="smNativeData" val="SMDATA_13_w78LXxMAAAAlAAAAZAAAAA0AAAAAkAAAAJAAAACQAAAAkAAAAAAAAAABAAAAAAAAAAEAAABQAAAAAAAAAAAA4D8AAAAAAADgPwAAAAAAAOA/AAAAAAAA4D8AAAAAAADgPwAAAAAAAOA/AAAAAAAA4D8AAAAAAADgPwAAAAAAAOA/AAAAAAAA4D8CAAAAjAAAAAAAAAAAAAAAkMImDP///wgAAAAAAAAAAAAAAAAAAAAAAAAAAAAAAAAAAAAAZAAAAAEAAABAAAAAAAAAAAAAAAAAAAAAAAAAAAAAAAAAAAAAAAAAAAAAAAAAAAAAAAAAAAAAAAAAAAAAAAAAAAAAAAAAAAAAAAAAAAAAAAAAAAAAAAAAAAAAAAAAAAAAFAAAADwAAAAAAAAAAAAAAAAAAAkUAAAAAQAAABQAAAAUAAAAFAAAAAEAAAAAAAAAZAAAAGQAAAAAAAAAZAAAAGQAAAAVAAAAYAAAAAAAAAAAAAAADwAAACADAAAAAAAAAAAAAAEAAACgMgAAVgcAAKr4//8BAAAAf39/AAEAAABkAAAAAAAAABQAAABAHwAAAAAAACYAAAAAAAAAwOD//wAAAAAmAAAAZAAAABYAAABMAAAAAAAAAAAAAAAEAAAAAAAAAAEAAAAsPEMKAAAAACgAAAAoAAAAZAAAAGQAAAAAAAAAzMzMAAAAAABQAAAAUAAAAGQAAABkAAAAAAAAABcAAAAUAAAAAAAAAAAAAAD/fwAA/38AAAAAAAAJAAAABAAAAAAAAAAMAAAAEAAAAAAAAAAAAAAAAAAAAAAAAAAeAAAAaAAAAAAAAAAAAAAAAAAAAAAAAAAAAAAAECcAABAnAAAAAAAAAAAAAAAAAAAAAAAAAAAAAAAAAAAAAAAAAAAAABQAAAAAAAAAwMD/AAAAAABkAAAAMgAAAAAAAABkAAAAAAAAAH9/fwAKAAAAHwAAAFQAAAAAAAAFAAAAAQAAAAAAAAAAAAAAAAAAAAAAAAAAAAAAAAAAAAAAAAAAAAAAAn9/fwAAAAADzMzMAMDA/wB/f38AAAAAAAAAAAAAAAAAAAAAAAAAAAAhAAAAGAAAABQAAABTLAAAKiUAAO8xAABpJwAAEAAAACYAAAAIAAAAPJAAAP8fAAA="/>
+                <pr:smNativeData xmlns:pr="smNativeData" xmlns:p14="http://schemas.microsoft.com/office/powerpoint/2010/main" xmlns="" val="SMDATA_13_w78LXxMAAAAlAAAAZAAAAA0AAAAAkAAAAJAAAACQAAAAkAAAAAAAAAABAAAAAAAAAAEAAABQAAAAAAAAAAAA4D8AAAAAAADgPwAAAAAAAOA/AAAAAAAA4D8AAAAAAADgPwAAAAAAAOA/AAAAAAAA4D8AAAAAAADgPwAAAAAAAOA/AAAAAAAA4D8CAAAAjAAAAAAAAAAAAAAAkMImDP///wgAAAAAAAAAAAAAAAAAAAAAAAAAAAAAAAAAAAAAZAAAAAEAAABAAAAAAAAAAAAAAAAAAAAAAAAAAAAAAAAAAAAAAAAAAAAAAAAAAAAAAAAAAAAAAAAAAAAAAAAAAAAAAAAAAAAAAAAAAAAAAAAAAAAAAAAAAAAAAAAAAAAAFAAAADwAAAAAAAAAAAAAAAAAAAkUAAAAAQAAABQAAAAUAAAAFAAAAAEAAAAAAAAAZAAAAGQAAAAAAAAAZAAAAGQAAAAVAAAAYAAAAAAAAAAAAAAADwAAACADAAAAAAAAAAAAAAEAAACgMgAAVgcAAKr4//8BAAAAf39/AAEAAABkAAAAAAAAABQAAABAHwAAAAAAACYAAAAAAAAAwOD//wAAAAAmAAAAZAAAABYAAABMAAAAAAAAAAAAAAAEAAAAAAAAAAEAAAAsPEMKAAAAACgAAAAoAAAAZAAAAGQAAAAAAAAAzMzMAAAAAABQAAAAUAAAAGQAAABkAAAAAAAAABcAAAAUAAAAAAAAAAAAAAD/fwAA/38AAAAAAAAJAAAABAAAAAAAAAAMAAAAEAAAAAAAAAAAAAAAAAAAAAAAAAAeAAAAaAAAAAAAAAAAAAAAAAAAAAAAAAAAAAAAECcAABAnAAAAAAAAAAAAAAAAAAAAAAAAAAAAAAAAAAAAAAAAAAAAABQAAAAAAAAAwMD/AAAAAABkAAAAMgAAAAAAAABkAAAAAAAAAH9/fwAKAAAAHwAAAFQAAAAAAAAFAAAAAQAAAAAAAAAAAAAAAAAAAAAAAAAAAAAAAAAAAAAAAAAAAAAAAn9/fwAAAAADzMzMAMDA/wB/f38AAAAAAAAAAAAAAAAAAAAAAAAAAAAhAAAAGAAAABQAAABTLAAAKiUAAO8xAABpJwAAEAAAACYAAAAIAAAAPJAAAP8fAAA="/>
               </a:ext>
             </a:extLst>
           </p:cNvSpPr>
@@ -20408,7 +20413,7 @@
             <a:spLocks noGrp="1" noChangeArrowheads="1"/>
             <a:extLst>
               <a:ext uri="smNativeData">
-                <pr:smNativeData xmlns="" xmlns:p14="http://schemas.microsoft.com/office/powerpoint/2010/main" xmlns:pr="smNativeData" val="SMDATA_13_w78LXxMAAAAlAAAAZAAAAA0AAAAAkAAAAJAAAACQAAAAkAAAAAAAAAABAAAAAAAAAAEAAABQAAAAAAAAAAAA4D8AAAAAAADgPwAAAAAAAOA/AAAAAAAA4D8AAAAAAADgPwAAAAAAAOA/AAAAAAAA4D8AAAAAAADgPwAAAAAAAOA/AAAAAAAA4D8CAAAAjAAAAAAAAAAAAAAAkMImDP///wgAAAAAAAAAAAAAAAAAAAAAAAAAAAAAAAAAAAAAZAAAAAEAAABAAAAAAAAAAAAAAAAAAAAAAAAAAAAAAAAAAAAAAAAAAAAAAAAAAAAAAAAAAAAAAAAAAAAAAAAAAAAAAAAAAAAAAAAAAAAAAAAAAAAAAAAAAAAAAAAAAAAAFAAAADwAAAAAAAAAAAAAAAAAAAkUAAAAAQAAABQAAAAUAAAAFAAAAAEAAAAAAAAAZAAAAGQAAAAAAAAAZAAAAGQAAAAVAAAAYAAAAAAAAAAAAAAADwAAACADAAAAAAAAAAAAAAEAAACgMgAAVgcAAKr4//8BAAAAf39/AAEAAABkAAAAAAAAABQAAABAHwAAAAAAACYAAAAAAAAAwOD//wAAAAAmAAAAZAAAABYAAABMAAAAAAAAAAAAAAAEAAAAAAAAAAEAAAAsPEMKAAAAACgAAAAoAAAAZAAAAGQAAAAAAAAAzMzMAAAAAABQAAAAUAAAAGQAAABkAAAAAAAAABcAAAAUAAAAAAAAAAAAAAD/fwAA/38AAAAAAAAJAAAABAAAAAAAAAAMAAAAEAAAAAAAAAAAAAAAAAAAAAAAAAAeAAAAaAAAAAAAAAAAAAAAAAAAAAAAAAAAAAAAECcAABAnAAAAAAAAAAAAAAAAAAAAAAAAAAAAAAAAAAAAAAAAAAAAABQAAAAAAAAAwMD/AAAAAABkAAAAMgAAAAAAAABkAAAAAAAAAH9/fwAKAAAAHwAAAFQAAAAAAAAFAAAAAQAAAAAAAAAAAAAAAAAAAAAAAAAAAAAAAAAAAAAAAAAAAAAAAn9/fwAAAAADzMzMAMDA/wB/f38AAAAAAAAAAAAAAAAAAAAAAAAAAAAhAAAAGAAAABQAAAArBAAAKiUAAOgqAABpJwAAEAAAACYAAAAIAAAAPJAAAP8fAAA="/>
+                <pr:smNativeData xmlns:pr="smNativeData" xmlns:p14="http://schemas.microsoft.com/office/powerpoint/2010/main" xmlns="" val="SMDATA_13_w78LXxMAAAAlAAAAZAAAAA0AAAAAkAAAAJAAAACQAAAAkAAAAAAAAAABAAAAAAAAAAEAAABQAAAAAAAAAAAA4D8AAAAAAADgPwAAAAAAAOA/AAAAAAAA4D8AAAAAAADgPwAAAAAAAOA/AAAAAAAA4D8AAAAAAADgPwAAAAAAAOA/AAAAAAAA4D8CAAAAjAAAAAAAAAAAAAAAkMImDP///wgAAAAAAAAAAAAAAAAAAAAAAAAAAAAAAAAAAAAAZAAAAAEAAABAAAAAAAAAAAAAAAAAAAAAAAAAAAAAAAAAAAAAAAAAAAAAAAAAAAAAAAAAAAAAAAAAAAAAAAAAAAAAAAAAAAAAAAAAAAAAAAAAAAAAAAAAAAAAAAAAAAAAFAAAADwAAAAAAAAAAAAAAAAAAAkUAAAAAQAAABQAAAAUAAAAFAAAAAEAAAAAAAAAZAAAAGQAAAAAAAAAZAAAAGQAAAAVAAAAYAAAAAAAAAAAAAAADwAAACADAAAAAAAAAAAAAAEAAACgMgAAVgcAAKr4//8BAAAAf39/AAEAAABkAAAAAAAAABQAAABAHwAAAAAAACYAAAAAAAAAwOD//wAAAAAmAAAAZAAAABYAAABMAAAAAAAAAAAAAAAEAAAAAAAAAAEAAAAsPEMKAAAAACgAAAAoAAAAZAAAAGQAAAAAAAAAzMzMAAAAAABQAAAAUAAAAGQAAABkAAAAAAAAABcAAAAUAAAAAAAAAAAAAAD/fwAA/38AAAAAAAAJAAAABAAAAAAAAAAMAAAAEAAAAAAAAAAAAAAAAAAAAAAAAAAeAAAAaAAAAAAAAAAAAAAAAAAAAAAAAAAAAAAAECcAABAnAAAAAAAAAAAAAAAAAAAAAAAAAAAAAAAAAAAAAAAAAAAAABQAAAAAAAAAwMD/AAAAAABkAAAAMgAAAAAAAABkAAAAAAAAAH9/fwAKAAAAHwAAAFQAAAAAAAAFAAAAAQAAAAAAAAAAAAAAAAAAAAAAAAAAAAAAAAAAAAAAAAAAAAAAAn9/fwAAAAADzMzMAMDA/wB/f38AAAAAAAAAAAAAAAAAAAAAAAAAAAAhAAAAGAAAABQAAAArBAAAKiUAAOgqAABpJwAAEAAAACYAAAAIAAAAPJAAAP8fAAA="/>
               </a:ext>
             </a:extLst>
           </p:cNvSpPr>
@@ -20595,7 +20600,7 @@
             <a:spLocks noGrp="1" noChangeArrowheads="1"/>
             <a:extLst>
               <a:ext uri="smNativeData">
-                <pr:smNativeData xmlns="" xmlns:p14="http://schemas.microsoft.com/office/powerpoint/2010/main" xmlns:pr="smNativeData" val="SMDATA_13_w78LXxMAAAAlAAAAZAAAAA0AAAAAkAAAAEgAAACQAAAASAAAAAAAAAABAAAAAAAAAAEAAABQAAAAAAAAAAAA4D8AAAAAAADgPwAAAAAAAOA/AAAAAAAA4D8AAAAAAADgPwAAAAAAAOA/AAAAAAAA4D8AAAAAAADgPwAAAAAAAOA/AAAAAAAA4D8CAAAAjAAAAAAAAAAAAAAAkMImDP///wgAAAAAAAAAAAAAAAAAAAAAAAAAAAAAAAAAAAAAZAAAAAEAAABAAAAAAAAAAAAAAAAAAAAAAAAAAAAAAAAAAAAAAAAAAAAAAAAAAAAAAAAAAAAAAAAAAAAAAAAAAAAAAAAAAAAAAAAAAAAAAAAAAAAAAAAAAAAAAAAAAAAAFAAAADwAAAAAAAAAAAAAAAAAAAkUAAAAAQAAABQAAAAUAAAAFAAAAAEAAAAAAAAAZAAAAGQAAAAAAAAAZAAAAGQAAAAVAAAAYAAAAAAAAAAAAAAADwAAACADAAAAAAAAAAAAAAEAAACgMgAAVgcAAKr4//8BAAAAf39/AAEAAABkAAAAAAAAABQAAABAHwAAAAAAACYAAAAAAAAAwOD//wAAAAAmAAAAZAAAABYAAABMAAAAAAAAAAAAAAAEAAAAAAAAAAEAAAAsPEMKAAAAACgAAAAoAAAAZAAAAGQAAAAAAAAAzMzMAAAAAABQAAAAUAAAAGQAAABkAAAAAAAAABcAAAAUAAAAAAAAAAAAAAD/fwAA/38AAAAAAAAJAAAABAAAAAAAAAAMAAAAEAAAAAAAAAAAAAAAAAAAAAAAAAAeAAAAaAAAAAAAAAAAAAAAAAAAAAAAAAAAAAAAECcAABAnAAAAAAAAAAAAAAAAAAAAAAAAAAAAAAAAAAAAAAAAAAAAABQAAAAAAAAAwMD/AAAAAABkAAAAMgAAAAAAAABkAAAAAAAAAH9/fwAKAAAAHwAAAFQAAAAAAAAFAAAAAQAAAAAAAAAAAAAAAAAAAAAAAAAAAAAAAAAAAAAAAAAAAAAAAn9/fwAAAAADzMzMAMDA/wB/f38AAAAAAAAAAAAAAAAAAAAAAAAAAAAhAAAAGAAAABQAAADZNAAAKiUAAA05AABpJwAAEAAAACYAAAAIAAAAPLAAAP8fAAA="/>
+                <pr:smNativeData xmlns:pr="smNativeData" xmlns:p14="http://schemas.microsoft.com/office/powerpoint/2010/main" xmlns="" val="SMDATA_13_w78LXxMAAAAlAAAAZAAAAA0AAAAAkAAAAEgAAACQAAAASAAAAAAAAAABAAAAAAAAAAEAAABQAAAAAAAAAAAA4D8AAAAAAADgPwAAAAAAAOA/AAAAAAAA4D8AAAAAAADgPwAAAAAAAOA/AAAAAAAA4D8AAAAAAADgPwAAAAAAAOA/AAAAAAAA4D8CAAAAjAAAAAAAAAAAAAAAkMImDP///wgAAAAAAAAAAAAAAAAAAAAAAAAAAAAAAAAAAAAAZAAAAAEAAABAAAAAAAAAAAAAAAAAAAAAAAAAAAAAAAAAAAAAAAAAAAAAAAAAAAAAAAAAAAAAAAAAAAAAAAAAAAAAAAAAAAAAAAAAAAAAAAAAAAAAAAAAAAAAAAAAAAAAFAAAADwAAAAAAAAAAAAAAAAAAAkUAAAAAQAAABQAAAAUAAAAFAAAAAEAAAAAAAAAZAAAAGQAAAAAAAAAZAAAAGQAAAAVAAAAYAAAAAAAAAAAAAAADwAAACADAAAAAAAAAAAAAAEAAACgMgAAVgcAAKr4//8BAAAAf39/AAEAAABkAAAAAAAAABQAAABAHwAAAAAAACYAAAAAAAAAwOD//wAAAAAmAAAAZAAAABYAAABMAAAAAAAAAAAAAAAEAAAAAAAAAAEAAAAsPEMKAAAAACgAAAAoAAAAZAAAAGQAAAAAAAAAzMzMAAAAAABQAAAAUAAAAGQAAABkAAAAAAAAABcAAAAUAAAAAAAAAAAAAAD/fwAA/38AAAAAAAAJAAAABAAAAAAAAAAMAAAAEAAAAAAAAAAAAAAAAAAAAAAAAAAeAAAAaAAAAAAAAAAAAAAAAAAAAAAAAAAAAAAAECcAABAnAAAAAAAAAAAAAAAAAAAAAAAAAAAAAAAAAAAAAAAAAAAAABQAAAAAAAAAwMD/AAAAAABkAAAAMgAAAAAAAABkAAAAAAAAAH9/fwAKAAAAHwAAAFQAAAAAAAAFAAAAAQAAAAAAAAAAAAAAAAAAAAAAAAAAAAAAAAAAAAAAAAAAAAAAAn9/fwAAAAADzMzMAMDA/wB/f38AAAAAAAAAAAAAAAAAAAAAAAAAAAAhAAAAGAAAABQAAADZNAAAKiUAAA05AABpJwAAEAAAACYAAAAIAAAAPLAAAP8fAAA="/>
               </a:ext>
             </a:extLst>
           </p:cNvSpPr>
@@ -20787,7 +20792,7 @@
             <a:spLocks noGrp="1" noChangeArrowheads="1"/>
             <a:extLst>
               <a:ext uri="smNativeData">
-                <pr:smNativeData xmlns="" xmlns:p14="http://schemas.microsoft.com/office/powerpoint/2010/main" xmlns:pr="smNativeData" val="SMDATA_13_w78LXxMAAAAlAAAAZAAAAA0AAAAAkAAAAJAAAACQAAAAkAAAAAAAAAACAAAAAAAAAAEAAABQAAAAAAAAAAAA4D8AAAAAAADgPwAAAAAAAOA/AAAAAAAA4D8AAAAAAADgPwAAAAAAAOA/AAAAAAAA4D8AAAAAAADgPwAAAAAAAOA/AAAAAAAA4D8CAAAAjAAAAAAAAAAAAAAAkMImDP///wgAAAAAAAAAAAAAAAAAAAAAAAAAAAAAAAAAAAAAZAAAAAEAAABAAAAAAAAAAAAAAAAAAAAAAAAAAAAAAAAAAAAAAAAAAAAAAAAAAAAAAAAAAAAAAAAAAAAAAAAAAAAAAAAAAAAAAAAAAAAAAAAAAAAAAAAAAAAAAAAAAAAAFAAAADwAAAAAAAAAAAAAAAAAAAkUAAAAAQAAABQAAAAUAAAAFAAAAAEAAAAAAAAAZAAAAGQAAAAAAAAAZAAAAGQAAAAVAAAAYAAAAAAAAAAAAAAADwAAACADAAAAAAAAAAAAAAEAAACgMgAAVgcAAKr4//8BAAAAf39/AAEAAABkAAAAAAAAABQAAABAHwAAAAAAACYAAAAAAAAAwOD//wAAAAAmAAAAZAAAABYAAABMAAAAAAAAAAAAAAAEAAAAAAAAAAEAAAAsPEMKAAAAACgAAAAoAAAAZAAAAGQAAAAAAAAAzMzMAAAAAABQAAAAUAAAAGQAAABkAAAAAAAAABcAAAAUAAAAAAAAAAAAAAD/fwAA/38AAAAAAAAJAAAABAAAAAAAAAAMAAAAEAAAAAAAAAAAAAAAAAAAAAAAAAAeAAAAaAAAAAAAAAAAAAAAAAAAAAAAAAAAAAAAECcAABAnAAAAAAAAAAAAAAAAAAAAAAAAAAAAAAAAAAAAAAAAAAAAABQAAAAAAAAAwMD/AAAAAABkAAAAMgAAAAAAAABkAAAAAAAAAH9/fwAKAAAAHwAAAFQAAAAAAAAFAAAAAQAAAAAAAAAAAAAAAAAAAAAAAAAAAAAAAAAAAAAAAAAAAAAAAn9/fwAAAAADzMzMAMDA/wB/f38AAAAAAAAAAAAAAAAAAAAAAAAAAAAhAAAAGAAAABQAAAArBAAAiB0AAA05AAAFIQAAEAAAACYAAAAIAAAAvZAAAP8fAAA="/>
+                <pr:smNativeData xmlns:pr="smNativeData" xmlns:p14="http://schemas.microsoft.com/office/powerpoint/2010/main" xmlns="" val="SMDATA_13_w78LXxMAAAAlAAAAZAAAAA0AAAAAkAAAAJAAAACQAAAAkAAAAAAAAAACAAAAAAAAAAEAAABQAAAAAAAAAAAA4D8AAAAAAADgPwAAAAAAAOA/AAAAAAAA4D8AAAAAAADgPwAAAAAAAOA/AAAAAAAA4D8AAAAAAADgPwAAAAAAAOA/AAAAAAAA4D8CAAAAjAAAAAAAAAAAAAAAkMImDP///wgAAAAAAAAAAAAAAAAAAAAAAAAAAAAAAAAAAAAAZAAAAAEAAABAAAAAAAAAAAAAAAAAAAAAAAAAAAAAAAAAAAAAAAAAAAAAAAAAAAAAAAAAAAAAAAAAAAAAAAAAAAAAAAAAAAAAAAAAAAAAAAAAAAAAAAAAAAAAAAAAAAAAFAAAADwAAAAAAAAAAAAAAAAAAAkUAAAAAQAAABQAAAAUAAAAFAAAAAEAAAAAAAAAZAAAAGQAAAAAAAAAZAAAAGQAAAAVAAAAYAAAAAAAAAAAAAAADwAAACADAAAAAAAAAAAAAAEAAACgMgAAVgcAAKr4//8BAAAAf39/AAEAAABkAAAAAAAAABQAAABAHwAAAAAAACYAAAAAAAAAwOD//wAAAAAmAAAAZAAAABYAAABMAAAAAAAAAAAAAAAEAAAAAAAAAAEAAAAsPEMKAAAAACgAAAAoAAAAZAAAAGQAAAAAAAAAzMzMAAAAAABQAAAAUAAAAGQAAABkAAAAAAAAABcAAAAUAAAAAAAAAAAAAAD/fwAA/38AAAAAAAAJAAAABAAAAAAAAAAMAAAAEAAAAAAAAAAAAAAAAAAAAAAAAAAeAAAAaAAAAAAAAAAAAAAAAAAAAAAAAAAAAAAAECcAABAnAAAAAAAAAAAAAAAAAAAAAAAAAAAAAAAAAAAAAAAAAAAAABQAAAAAAAAAwMD/AAAAAABkAAAAMgAAAAAAAABkAAAAAAAAAH9/fwAKAAAAHwAAAFQAAAAAAAAFAAAAAQAAAAAAAAAAAAAAAAAAAAAAAAAAAAAAAAAAAAAAAAAAAAAAAn9/fwAAAAADzMzMAMDA/wB/f38AAAAAAAAAAAAAAAAAAAAAAAAAAAAhAAAAGAAAABQAAAArBAAAiB0AAA05AAAFIQAAEAAAACYAAAAIAAAAvZAAAP8fAAA="/>
               </a:ext>
             </a:extLst>
           </p:cNvSpPr>
@@ -20954,7 +20959,7 @@
             <a:spLocks noGrp="1" noChangeArrowheads="1"/>
             <a:extLst>
               <a:ext uri="smNativeData">
-                <pr:smNativeData xmlns="" xmlns:p14="http://schemas.microsoft.com/office/powerpoint/2010/main" xmlns:pr="smNativeData" val="SMDATA_13_w78LXxMAAAAlAAAAZAAAAA0AAAAAkAAAAJAAAACQAAAAkAAAAAAAAAAAAAAAAAAAAAEAAABQAAAAAAAAAAAA4D8AAAAAAADgPwAAAAAAAOA/AAAAAAAA4D8AAAAAAADgPwAAAAAAAOA/AAAAAAAA4D8AAAAAAADgPwAAAAAAAOA/AAAAAAAA4D8CAAAAjAAAAAAAAAAAAAAAkMImDP///wgAAAAAAAAAAAAAAAAAAAAAAAAAAAAAAAAAAAAAZAAAAAEAAABAAAAAAAAAAAAAAAAAAAAAAAAAAAAAAAAAAAAAAAAAAAAAAAAAAAAAAAAAAAAAAAAAAAAAAAAAAAAAAAAAAAAAAAAAAAAAAAAAAAAAAAAAAAAAAAAAAAAAFAAAADwAAAAAAAAAAAAAAAAAAAkUAAAAAQAAABQAAAAUAAAAFAAAAAEAAAAAAAAAZAAAAGQAAAAAAAAAZAAAAGQAAAAVAAAAYAAAAAAAAAAAAAAADwAAACADAAAAAAAAAAAAAAEAAACgMgAAVgcAAKr4//8BAAAAf39/AAEAAABkAAAAAAAAABQAAABAHwAAAAAAACYAAAAAAAAAwOD//wAAAAAmAAAAZAAAABYAAABMAAAAAAAAAAAAAAAEAAAAAAAAAAEAAAAsPEMKAAAAACgAAAAoAAAAZAAAAGQAAAAAAAAAzMzMAAAAAABQAAAAUAAAAGQAAABkAAAAAAAAABcAAAAUAAAAAAAAAAAAAAD/fwAA/38AAAAAAAAJAAAABAAAAAAAAAAMAAAAEAAAAAAAAAAAAAAAAAAAAAAAAAAeAAAAaAAAAAAAAAAAAAAAAAAAAAAAAAAAAAAAECcAABAnAAAAAAAAAAAAAAAAAAAAAAAAAAAAAAAAAAAAAAAAAAAAABQAAAAAAAAAwMD/AAAAAABkAAAAMgAAAAAAAABkAAAAAAAAAH9/fwAKAAAAHwAAAFQAAAAAAAAFAAAAAQAAAAAAAAAAAAAAAAAAAAAAAAAAAAAAAAAAAAAAAAAAAAAAAn9/fwAAAAADzMzMAMDA/wB/f38AAAAAAAAAAAAAAAAAAAAAAAAAAAAhAAAAGAAAABQAAAArBAAAwAMAAA05AABoGwAAEAAAACYAAAAIAAAAPZAAAP8fAAA="/>
+                <pr:smNativeData xmlns:pr="smNativeData" xmlns:p14="http://schemas.microsoft.com/office/powerpoint/2010/main" xmlns="" val="SMDATA_13_w78LXxMAAAAlAAAAZAAAAA0AAAAAkAAAAJAAAACQAAAAkAAAAAAAAAAAAAAAAAAAAAEAAABQAAAAAAAAAAAA4D8AAAAAAADgPwAAAAAAAOA/AAAAAAAA4D8AAAAAAADgPwAAAAAAAOA/AAAAAAAA4D8AAAAAAADgPwAAAAAAAOA/AAAAAAAA4D8CAAAAjAAAAAAAAAAAAAAAkMImDP///wgAAAAAAAAAAAAAAAAAAAAAAAAAAAAAAAAAAAAAZAAAAAEAAABAAAAAAAAAAAAAAAAAAAAAAAAAAAAAAAAAAAAAAAAAAAAAAAAAAAAAAAAAAAAAAAAAAAAAAAAAAAAAAAAAAAAAAAAAAAAAAAAAAAAAAAAAAAAAAAAAAAAAFAAAADwAAAAAAAAAAAAAAAAAAAkUAAAAAQAAABQAAAAUAAAAFAAAAAEAAAAAAAAAZAAAAGQAAAAAAAAAZAAAAGQAAAAVAAAAYAAAAAAAAAAAAAAADwAAACADAAAAAAAAAAAAAAEAAACgMgAAVgcAAKr4//8BAAAAf39/AAEAAABkAAAAAAAAABQAAABAHwAAAAAAACYAAAAAAAAAwOD//wAAAAAmAAAAZAAAABYAAABMAAAAAAAAAAAAAAAEAAAAAAAAAAEAAAAsPEMKAAAAACgAAAAoAAAAZAAAAGQAAAAAAAAAzMzMAAAAAABQAAAAUAAAAGQAAABkAAAAAAAAABcAAAAUAAAAAAAAAAAAAAD/fwAA/38AAAAAAAAJAAAABAAAAAAAAAAMAAAAEAAAAAAAAAAAAAAAAAAAAAAAAAAeAAAAaAAAAAAAAAAAAAAAAAAAAAAAAAAAAAAAECcAABAnAAAAAAAAAAAAAAAAAAAAAAAAAAAAAAAAAAAAAAAAAAAAABQAAAAAAAAAwMD/AAAAAABkAAAAMgAAAAAAAABkAAAAAAAAAH9/fwAKAAAAHwAAAFQAAAAAAAAFAAAAAQAAAAAAAAAAAAAAAAAAAAAAAAAAAAAAAAAAAAAAAAAAAAAAAn9/fwAAAAADzMzMAMDA/wB/f38AAAAAAAAAAAAAAAAAAAAAAAAAAAAhAAAAGAAAABQAAAArBAAAwAMAAA05AABoGwAAEAAAACYAAAAIAAAAPZAAAP8fAAA="/>
               </a:ext>
             </a:extLst>
           </p:cNvSpPr>
@@ -21145,7 +21150,7 @@
             <a:spLocks noGrp="1" noChangeArrowheads="1"/>
             <a:extLst>
               <a:ext uri="smNativeData">
-                <pr:smNativeData xmlns="" xmlns:p14="http://schemas.microsoft.com/office/powerpoint/2010/main" xmlns:pr="smNativeData" val="SMDATA_13_w78LXxMAAAAlAAAAZAAAAA0AAAAAkAAAAJAAAACQAAAAkAAAAAAAAAAAAAAAAAAAAAEAAABQAAAAAAAAAAAA4D8AAAAAAADgPwAAAAAAAOA/AAAAAAAA4D8AAAAAAADgPwAAAAAAAOA/AAAAAAAA4D8AAAAAAADgPwAAAAAAAOA/AAAAAAAA4D8CAAAAjAAAAAAAAAAAAAAAkMImDP///wgAAAAAAAAAAAAAAAAAAAAAAAAAAAAAAAAAAAAAZAAAAAEAAABAAAAAAAAAAAAAAAAAAAAAAAAAAAAAAAAAAAAAAAAAAAAAAAAAAAAAAAAAAAAAAAAAAAAAAAAAAAAAAAAAAAAAAAAAAAAAAAAAAAAAAAAAAAAAAAAAAAAAFAAAADwAAAAAAAAAAAAAAAAAAAkUAAAAAQAAABQAAAAUAAAAFAAAAAEAAAAAAAAAZAAAAGQAAAAAAAAAZAAAAGQAAAAVAAAAYAAAAAAAAAAAAAAADwAAACADAAAAAAAAAAAAAAEAAACgMgAAVgcAAKr4//8BAAAAf39/AAEAAABkAAAAAAAAABQAAABAHwAAAAAAACYAAAAAAAAAwOD//wAAAAAmAAAAZAAAABYAAABMAAAAAAAAAAAAAAAEAAAAAAAAAAEAAAAsPEMKAAAAACgAAAAoAAAAZAAAAGQAAAAAAAAAzMzMAAAAAABQAAAAUAAAAGQAAABkAAAAAAAAABcAAAAUAAAAAAAAAAAAAAD/fwAA/38AAAAAAAAJAAAABAAAAAAAAAAMAAAAEAAAAAAAAAAAAAAAAAAAAAAAAAAeAAAAaAAAAAAAAAAAAAAAAAAAAAAAAAAAAAAAECcAABAnAAAAAAAAAAAAAAAAAAAAAAAAAAAAAAAAAAAAAAAAAAAAABQAAAAAAAAAwMD/AAAAAABkAAAAMgAAAAAAAABkAAAAAAAAAH9/fwAKAAAAHwAAAFQAAAAAAAAFAAAAAQAAAAAAAAAAAAAAAAAAAAAAAAAAAAAAAAAAAAAAAAAAAAAAAn9/fwAAAAADzMzMAMDA/wB/f38AAAAAAAAAAAAAAAAAAAAAAAAAAAAhAAAAGAAAABQAAAArBAAABSEAAA05AAAqJQAAEAAAACYAAAAIAAAAPZAAAP8fAAA="/>
+                <pr:smNativeData xmlns:pr="smNativeData" xmlns:p14="http://schemas.microsoft.com/office/powerpoint/2010/main" xmlns="" val="SMDATA_13_w78LXxMAAAAlAAAAZAAAAA0AAAAAkAAAAJAAAACQAAAAkAAAAAAAAAAAAAAAAAAAAAEAAABQAAAAAAAAAAAA4D8AAAAAAADgPwAAAAAAAOA/AAAAAAAA4D8AAAAAAADgPwAAAAAAAOA/AAAAAAAA4D8AAAAAAADgPwAAAAAAAOA/AAAAAAAA4D8CAAAAjAAAAAAAAAAAAAAAkMImDP///wgAAAAAAAAAAAAAAAAAAAAAAAAAAAAAAAAAAAAAZAAAAAEAAABAAAAAAAAAAAAAAAAAAAAAAAAAAAAAAAAAAAAAAAAAAAAAAAAAAAAAAAAAAAAAAAAAAAAAAAAAAAAAAAAAAAAAAAAAAAAAAAAAAAAAAAAAAAAAAAAAAAAAFAAAADwAAAAAAAAAAAAAAAAAAAkUAAAAAQAAABQAAAAUAAAAFAAAAAEAAAAAAAAAZAAAAGQAAAAAAAAAZAAAAGQAAAAVAAAAYAAAAAAAAAAAAAAADwAAACADAAAAAAAAAAAAAAEAAACgMgAAVgcAAKr4//8BAAAAf39/AAEAAABkAAAAAAAAABQAAABAHwAAAAAAACYAAAAAAAAAwOD//wAAAAAmAAAAZAAAABYAAABMAAAAAAAAAAAAAAAEAAAAAAAAAAEAAAAsPEMKAAAAACgAAAAoAAAAZAAAAGQAAAAAAAAAzMzMAAAAAABQAAAAUAAAAGQAAABkAAAAAAAAABcAAAAUAAAAAAAAAAAAAAD/fwAA/38AAAAAAAAJAAAABAAAAAAAAAAMAAAAEAAAAAAAAAAAAAAAAAAAAAAAAAAeAAAAaAAAAAAAAAAAAAAAAAAAAAAAAAAAAAAAECcAABAnAAAAAAAAAAAAAAAAAAAAAAAAAAAAAAAAAAAAAAAAAAAAABQAAAAAAAAAwMD/AAAAAABkAAAAMgAAAAAAAABkAAAAAAAAAH9/fwAKAAAAHwAAAFQAAAAAAAAFAAAAAQAAAAAAAAAAAAAAAAAAAAAAAAAAAAAAAAAAAAAAAAAAAAAAAn9/fwAAAAADzMzMAMDA/wB/f38AAAAAAAAAAAAAAAAAAAAAAAAAAAAhAAAAGAAAABQAAAArBAAABSEAAA05AAAqJQAAEAAAACYAAAAIAAAAPZAAAP8fAAA="/>
               </a:ext>
             </a:extLst>
           </p:cNvSpPr>
@@ -21336,7 +21341,7 @@
             <a:spLocks noGrp="1" noChangeArrowheads="1"/>
             <a:extLst>
               <a:ext uri="smNativeData">
-                <pr:smNativeData xmlns="" xmlns:p14="http://schemas.microsoft.com/office/powerpoint/2010/main" xmlns:pr="smNativeData" val="SMDATA_13_w78LXxMAAAAlAAAAZAAAAA0AAAAAkAAAAJAAAACQAAAAkAAAAAAAAAABAAAAAAAAAAEAAABQAAAAAAAAAAAA4D8AAAAAAADgPwAAAAAAAOA/AAAAAAAA4D8AAAAAAADgPwAAAAAAAOA/AAAAAAAA4D8AAAAAAADgPwAAAAAAAOA/AAAAAAAA4D8CAAAAjAAAAAAAAAAAAAAAkMImDP///wgAAAAAAAAAAAAAAAAAAAAAAAAAAAAAAAAAAAAAZAAAAAEAAABAAAAAAAAAAAAAAAAAAAAAAAAAAAAAAAAAAAAAAAAAAAAAAAAAAAAAAAAAAAAAAAAAAAAAAAAAAAAAAAAAAAAAAAAAAAAAAAAAAAAAAAAAAAAAAAAAAAAAFAAAADwAAAAAAAAAAAAAAAAAAAkUAAAAAQAAABQAAAAUAAAAFAAAAAEAAAAAAAAAZAAAAGQAAAAAAAAAZAAAAGQAAAAVAAAAYAAAAAAAAAAAAAAADwAAACADAAAAAAAAAAAAAAEAAACgMgAAVgcAAKr4//8BAAAAf39/AAEAAABkAAAAAAAAABQAAABAHwAAAAAAACYAAAAAAAAAwOD//wAAAAAmAAAAZAAAABYAAABMAAAAAAAAAAAAAAAEAAAAAAAAAAEAAAAsPEMKAAAAACgAAAAoAAAAZAAAAGQAAAAAAAAAzMzMAAAAAABQAAAAUAAAAGQAAABkAAAAAAAAABcAAAAUAAAAAAAAAAAAAAD/fwAA/38AAAAAAAAJAAAABAAAAAAAAAAMAAAAEAAAAAAAAAAAAAAAAAAAAAAAAAAeAAAAaAAAAAAAAAAAAAAAAAAAAAAAAAAAAAAAECcAABAnAAAAAAAAAAAAAAAAAAAAAAAAAAAAAAAAAAAAAAAAAAAAABQAAAAAAAAAwMD/AAAAAABkAAAAMgAAAAAAAABkAAAAAAAAAH9/fwAKAAAAHwAAAFQAAAAAAAAFAAAAAQAAAAAAAAAAAAAAAAAAAAAAAAAAAAAAAAAAAAAAAAAAAAAAAn9/fwAAAAADzMzMAMDA/wB/f38AAAAAAAAAAAAAAAAAAAAAAAAAAAAhAAAAGAAAABQAAABTLAAAKiUAAO8xAABpJwAAEAAAACYAAAAIAAAAPJAAAP8fAAA="/>
+                <pr:smNativeData xmlns:pr="smNativeData" xmlns:p14="http://schemas.microsoft.com/office/powerpoint/2010/main" xmlns="" val="SMDATA_13_w78LXxMAAAAlAAAAZAAAAA0AAAAAkAAAAJAAAACQAAAAkAAAAAAAAAABAAAAAAAAAAEAAABQAAAAAAAAAAAA4D8AAAAAAADgPwAAAAAAAOA/AAAAAAAA4D8AAAAAAADgPwAAAAAAAOA/AAAAAAAA4D8AAAAAAADgPwAAAAAAAOA/AAAAAAAA4D8CAAAAjAAAAAAAAAAAAAAAkMImDP///wgAAAAAAAAAAAAAAAAAAAAAAAAAAAAAAAAAAAAAZAAAAAEAAABAAAAAAAAAAAAAAAAAAAAAAAAAAAAAAAAAAAAAAAAAAAAAAAAAAAAAAAAAAAAAAAAAAAAAAAAAAAAAAAAAAAAAAAAAAAAAAAAAAAAAAAAAAAAAAAAAAAAAFAAAADwAAAAAAAAAAAAAAAAAAAkUAAAAAQAAABQAAAAUAAAAFAAAAAEAAAAAAAAAZAAAAGQAAAAAAAAAZAAAAGQAAAAVAAAAYAAAAAAAAAAAAAAADwAAACADAAAAAAAAAAAAAAEAAACgMgAAVgcAAKr4//8BAAAAf39/AAEAAABkAAAAAAAAABQAAABAHwAAAAAAACYAAAAAAAAAwOD//wAAAAAmAAAAZAAAABYAAABMAAAAAAAAAAAAAAAEAAAAAAAAAAEAAAAsPEMKAAAAACgAAAAoAAAAZAAAAGQAAAAAAAAAzMzMAAAAAABQAAAAUAAAAGQAAABkAAAAAAAAABcAAAAUAAAAAAAAAAAAAAD/fwAA/38AAAAAAAAJAAAABAAAAAAAAAAMAAAAEAAAAAAAAAAAAAAAAAAAAAAAAAAeAAAAaAAAAAAAAAAAAAAAAAAAAAAAAAAAAAAAECcAABAnAAAAAAAAAAAAAAAAAAAAAAAAAAAAAAAAAAAAAAAAAAAAABQAAAAAAAAAwMD/AAAAAABkAAAAMgAAAAAAAABkAAAAAAAAAH9/fwAKAAAAHwAAAFQAAAAAAAAFAAAAAQAAAAAAAAAAAAAAAAAAAAAAAAAAAAAAAAAAAAAAAAAAAAAAAn9/fwAAAAADzMzMAMDA/wB/f38AAAAAAAAAAAAAAAAAAAAAAAAAAAAhAAAAGAAAABQAAABTLAAAKiUAAO8xAABpJwAAEAAAACYAAAAIAAAAPJAAAP8fAAA="/>
               </a:ext>
             </a:extLst>
           </p:cNvSpPr>
@@ -21523,7 +21528,7 @@
             <a:spLocks noGrp="1" noChangeArrowheads="1"/>
             <a:extLst>
               <a:ext uri="smNativeData">
-                <pr:smNativeData xmlns="" xmlns:p14="http://schemas.microsoft.com/office/powerpoint/2010/main" xmlns:pr="smNativeData" val="SMDATA_13_w78LXxMAAAAlAAAAZAAAAA0AAAAAkAAAAJAAAACQAAAAkAAAAAAAAAABAAAAAAAAAAEAAABQAAAAAAAAAAAA4D8AAAAAAADgPwAAAAAAAOA/AAAAAAAA4D8AAAAAAADgPwAAAAAAAOA/AAAAAAAA4D8AAAAAAADgPwAAAAAAAOA/AAAAAAAA4D8CAAAAjAAAAAAAAAAAAAAAkMImDP///wgAAAAAAAAAAAAAAAAAAAAAAAAAAAAAAAAAAAAAZAAAAAEAAABAAAAAAAAAAAAAAAAAAAAAAAAAAAAAAAAAAAAAAAAAAAAAAAAAAAAAAAAAAAAAAAAAAAAAAAAAAAAAAAAAAAAAAAAAAAAAAAAAAAAAAAAAAAAAAAAAAAAAFAAAADwAAAAAAAAAAAAAAAAAAAkUAAAAAQAAABQAAAAUAAAAFAAAAAEAAAAAAAAAZAAAAGQAAAAAAAAAZAAAAGQAAAAVAAAAYAAAAAAAAAAAAAAADwAAACADAAAAAAAAAAAAAAEAAACgMgAAVgcAAKr4//8BAAAAf39/AAEAAABkAAAAAAAAABQAAABAHwAAAAAAACYAAAAAAAAAwOD//wAAAAAmAAAAZAAAABYAAABMAAAAAAAAAAAAAAAEAAAAAAAAAAEAAAAsPEMKAAAAACgAAAAoAAAAZAAAAGQAAAAAAAAAzMzMAAAAAABQAAAAUAAAAGQAAABkAAAAAAAAABcAAAAUAAAAAAAAAAAAAAD/fwAA/38AAAAAAAAJAAAABAAAAAAAAAAMAAAAEAAAAAAAAAAAAAAAAAAAAAAAAAAeAAAAaAAAAAAAAAAAAAAAAAAAAAAAAAAAAAAAECcAABAnAAAAAAAAAAAAAAAAAAAAAAAAAAAAAAAAAAAAAAAAAAAAABQAAAAAAAAAwMD/AAAAAABkAAAAMgAAAAAAAABkAAAAAAAAAH9/fwAKAAAAHwAAAFQAAAAAAAAFAAAAAQAAAAAAAAAAAAAAAAAAAAAAAAAAAAAAAAAAAAAAAAAAAAAAAn9/fwAAAAADzMzMAMDA/wB/f38AAAAAAAAAAAAAAAAAAAAAAAAAAAAhAAAAGAAAABQAAAArBAAAKiUAAOgqAABpJwAAEAAAACYAAAAIAAAAPJAAAP8fAAA="/>
+                <pr:smNativeData xmlns:pr="smNativeData" xmlns:p14="http://schemas.microsoft.com/office/powerpoint/2010/main" xmlns="" val="SMDATA_13_w78LXxMAAAAlAAAAZAAAAA0AAAAAkAAAAJAAAACQAAAAkAAAAAAAAAABAAAAAAAAAAEAAABQAAAAAAAAAAAA4D8AAAAAAADgPwAAAAAAAOA/AAAAAAAA4D8AAAAAAADgPwAAAAAAAOA/AAAAAAAA4D8AAAAAAADgPwAAAAAAAOA/AAAAAAAA4D8CAAAAjAAAAAAAAAAAAAAAkMImDP///wgAAAAAAAAAAAAAAAAAAAAAAAAAAAAAAAAAAAAAZAAAAAEAAABAAAAAAAAAAAAAAAAAAAAAAAAAAAAAAAAAAAAAAAAAAAAAAAAAAAAAAAAAAAAAAAAAAAAAAAAAAAAAAAAAAAAAAAAAAAAAAAAAAAAAAAAAAAAAAAAAAAAAFAAAADwAAAAAAAAAAAAAAAAAAAkUAAAAAQAAABQAAAAUAAAAFAAAAAEAAAAAAAAAZAAAAGQAAAAAAAAAZAAAAGQAAAAVAAAAYAAAAAAAAAAAAAAADwAAACADAAAAAAAAAAAAAAEAAACgMgAAVgcAAKr4//8BAAAAf39/AAEAAABkAAAAAAAAABQAAABAHwAAAAAAACYAAAAAAAAAwOD//wAAAAAmAAAAZAAAABYAAABMAAAAAAAAAAAAAAAEAAAAAAAAAAEAAAAsPEMKAAAAACgAAAAoAAAAZAAAAGQAAAAAAAAAzMzMAAAAAABQAAAAUAAAAGQAAABkAAAAAAAAABcAAAAUAAAAAAAAAAAAAAD/fwAA/38AAAAAAAAJAAAABAAAAAAAAAAMAAAAEAAAAAAAAAAAAAAAAAAAAAAAAAAeAAAAaAAAAAAAAAAAAAAAAAAAAAAAAAAAAAAAECcAABAnAAAAAAAAAAAAAAAAAAAAAAAAAAAAAAAAAAAAAAAAAAAAABQAAAAAAAAAwMD/AAAAAABkAAAAMgAAAAAAAABkAAAAAAAAAH9/fwAKAAAAHwAAAFQAAAAAAAAFAAAAAQAAAAAAAAAAAAAAAAAAAAAAAAAAAAAAAAAAAAAAAAAAAAAAAn9/fwAAAAADzMzMAMDA/wB/f38AAAAAAAAAAAAAAAAAAAAAAAAAAAAhAAAAGAAAABQAAAArBAAAKiUAAOgqAABpJwAAEAAAACYAAAAIAAAAPJAAAP8fAAA="/>
               </a:ext>
             </a:extLst>
           </p:cNvSpPr>
@@ -21710,7 +21715,7 @@
             <a:spLocks noGrp="1" noChangeArrowheads="1"/>
             <a:extLst>
               <a:ext uri="smNativeData">
-                <pr:smNativeData xmlns="" xmlns:p14="http://schemas.microsoft.com/office/powerpoint/2010/main" xmlns:pr="smNativeData" val="SMDATA_13_w78LXxMAAAAlAAAAZAAAAA0AAAAAkAAAAEgAAACQAAAASAAAAAAAAAABAAAAAAAAAAEAAABQAAAAAAAAAAAA4D8AAAAAAADgPwAAAAAAAOA/AAAAAAAA4D8AAAAAAADgPwAAAAAAAOA/AAAAAAAA4D8AAAAAAADgPwAAAAAAAOA/AAAAAAAA4D8CAAAAjAAAAAAAAAAAAAAAkMImDP///wgAAAAAAAAAAAAAAAAAAAAAAAAAAAAAAAAAAAAAZAAAAAEAAABAAAAAAAAAAAAAAAAAAAAAAAAAAAAAAAAAAAAAAAAAAAAAAAAAAAAAAAAAAAAAAAAAAAAAAAAAAAAAAAAAAAAAAAAAAAAAAAAAAAAAAAAAAAAAAAAAAAAAFAAAADwAAAAAAAAAAAAAAAAAAAkUAAAAAQAAABQAAAAUAAAAFAAAAAEAAAAAAAAAZAAAAGQAAAAAAAAAZAAAAGQAAAAVAAAAYAAAAAAAAAAAAAAADwAAACADAAAAAAAAAAAAAAEAAACgMgAAVgcAAKr4//8BAAAAf39/AAEAAABkAAAAAAAAABQAAABAHwAAAAAAACYAAAAAAAAAwOD//wAAAAAmAAAAZAAAABYAAABMAAAAAAAAAAAAAAAEAAAAAAAAAAEAAAAsPEMKAAAAACgAAAAoAAAAZAAAAGQAAAAAAAAAzMzMAAAAAABQAAAAUAAAAGQAAABkAAAAAAAAABcAAAAUAAAAAAAAAAAAAAD/fwAA/38AAAAAAAAJAAAABAAAAAAAAAAMAAAAEAAAAAAAAAAAAAAAAAAAAAAAAAAeAAAAaAAAAAAAAAAAAAAAAAAAAAAAAAAAAAAAECcAABAnAAAAAAAAAAAAAAAAAAAAAAAAAAAAAAAAAAAAAAAAAAAAABQAAAAAAAAAwMD/AAAAAABkAAAAMgAAAAAAAABkAAAAAAAAAH9/fwAKAAAAHwAAAFQAAAAAAAAFAAAAAQAAAAAAAAAAAAAAAAAAAAAAAAAAAAAAAAAAAAAAAAAAAAAAAn9/fwAAAAADzMzMAMDA/wB/f38AAAAAAAAAAAAAAAAAAAAAAAAAAAAhAAAAGAAAABQAAADZNAAAKiUAAA05AABpJwAAEAAAACYAAAAIAAAAPLAAAP8fAAA="/>
+                <pr:smNativeData xmlns:pr="smNativeData" xmlns:p14="http://schemas.microsoft.com/office/powerpoint/2010/main" xmlns="" val="SMDATA_13_w78LXxMAAAAlAAAAZAAAAA0AAAAAkAAAAEgAAACQAAAASAAAAAAAAAABAAAAAAAAAAEAAABQAAAAAAAAAAAA4D8AAAAAAADgPwAAAAAAAOA/AAAAAAAA4D8AAAAAAADgPwAAAAAAAOA/AAAAAAAA4D8AAAAAAADgPwAAAAAAAOA/AAAAAAAA4D8CAAAAjAAAAAAAAAAAAAAAkMImDP///wgAAAAAAAAAAAAAAAAAAAAAAAAAAAAAAAAAAAAAZAAAAAEAAABAAAAAAAAAAAAAAAAAAAAAAAAAAAAAAAAAAAAAAAAAAAAAAAAAAAAAAAAAAAAAAAAAAAAAAAAAAAAAAAAAAAAAAAAAAAAAAAAAAAAAAAAAAAAAAAAAAAAAFAAAADwAAAAAAAAAAAAAAAAAAAkUAAAAAQAAABQAAAAUAAAAFAAAAAEAAAAAAAAAZAAAAGQAAAAAAAAAZAAAAGQAAAAVAAAAYAAAAAAAAAAAAAAADwAAACADAAAAAAAAAAAAAAEAAACgMgAAVgcAAKr4//8BAAAAf39/AAEAAABkAAAAAAAAABQAAABAHwAAAAAAACYAAAAAAAAAwOD//wAAAAAmAAAAZAAAABYAAABMAAAAAAAAAAAAAAAEAAAAAAAAAAEAAAAsPEMKAAAAACgAAAAoAAAAZAAAAGQAAAAAAAAAzMzMAAAAAABQAAAAUAAAAGQAAABkAAAAAAAAABcAAAAUAAAAAAAAAAAAAAD/fwAA/38AAAAAAAAJAAAABAAAAAAAAAAMAAAAEAAAAAAAAAAAAAAAAAAAAAAAAAAeAAAAaAAAAAAAAAAAAAAAAAAAAAAAAAAAAAAAECcAABAnAAAAAAAAAAAAAAAAAAAAAAAAAAAAAAAAAAAAAAAAAAAAABQAAAAAAAAAwMD/AAAAAABkAAAAMgAAAAAAAABkAAAAAAAAAH9/fwAKAAAAHwAAAFQAAAAAAAAFAAAAAQAAAAAAAAAAAAAAAAAAAAAAAAAAAAAAAAAAAAAAAAAAAAAAAn9/fwAAAAADzMzMAMDA/wB/f38AAAAAAAAAAAAAAAAAAAAAAAAAAAAhAAAAGAAAABQAAADZNAAAKiUAAA05AABpJwAAEAAAACYAAAAIAAAAPLAAAP8fAAA="/>
               </a:ext>
             </a:extLst>
           </p:cNvSpPr>
@@ -21909,7 +21914,7 @@
           <p:cNvGrpSpPr>
             <a:extLst>
               <a:ext uri="smNativeData">
-                <pr:smNativeData xmlns="" xmlns:p14="http://schemas.microsoft.com/office/powerpoint/2010/main" xmlns:pr="smNativeData" val="SMDATA_7_w78LXxMAAAAlAAAAAQAAAA8BAAAAkAAAAEgAAACQAAAASAAAAAAAAAAAAAAAAAAAABcAAAAUAAAAAAAAAAAAAAD/fwAA/38AAAAAAAAJAAAABAAAAAAAAAAMAAAAEAAAAAAAAAAAAAAAAAAAAAAAAAAfAAAAVAAAAAAAAAAAAAAAAAAAAAAAAAAAAAAAAAAAAAAAAAAAAAAAAAAAAAAAAAAAAAAAAAAAAAAAAAAAAAAAAAAAAAAAAAAAAAAAAAAAAAAAAAAAAAAAAAAAACEAAAAYAAAAFAAAAAAAAADz////AEsAADAqAAAQAAAAJgAAAAgAAAD/////AAAAAA=="/>
+                <pr:smNativeData xmlns:pr="smNativeData" xmlns:p14="http://schemas.microsoft.com/office/powerpoint/2010/main" xmlns="" val="SMDATA_7_w78LXxMAAAAlAAAAAQAAAA8BAAAAkAAAAEgAAACQAAAASAAAAAAAAAAAAAAAAAAAABcAAAAUAAAAAAAAAAAAAAD/fwAA/38AAAAAAAAJAAAABAAAAAAAAAAMAAAAEAAAAAAAAAAAAAAAAAAAAAAAAAAfAAAAVAAAAAAAAAAAAAAAAAAAAAAAAAAAAAAAAAAAAAAAAAAAAAAAAAAAAAAAAAAAAAAAAAAAAAAAAAAAAAAAAAAAAAAAAAAAAAAAAAAAAAAAAAAAAAAAAAAAACEAAAAYAAAAFAAAAAAAAADz////AEsAADAqAAAQAAAAJgAAAAgAAAD/////AAAAAA=="/>
               </a:ext>
             </a:extLst>
           </p:cNvGrpSpPr>
@@ -21929,7 +21934,7 @@
             <p:cNvCxnSpPr>
               <a:extLst>
                 <a:ext uri="smNativeData">
-                  <pr:smNativeData xmlns="" xmlns:p14="http://schemas.microsoft.com/office/powerpoint/2010/main" xmlns:pr="smNativeData" val="SMDATA_13_w78LXxMAAAAlAAAADQAAAA0AAAAAkAAAAEgAAACQAAAASAAAAAAAAAAAAAAAAAAAAAEAAABQAAAAAAAAAAAA8L8AAAAAAAAAAAAAAAAAAPA/AAAAAAAA4D8AAAAAAADgPwAAAAAAAOA/AAAAAAAA4D8AAAAAAADgPwAAAAAAAOA/AAAAAAAA4D8CAAAAjAAAAAAAAAAAAAAAkMImDP///wgAAAAAAAAAAAAAAAAAAAAAAAAAAAAAAAAAAAAAZAAAAAEAAABAAAAAAAAAAAAAAAAAAAAAAAAAAAAAAAAAAAAAAAAAAAAAAAAAAAAAAAAAAAAAAAAAAAAAAAAAAAAAAAAAAAAAAAAAAAAAAAAAAAAAAAAAAAAAAAAAAAAAFAAAADwAAAABAAAAAAAAAL+/vwAPAAAAAQAAACMAAAAjAAAAIwAAAB4AAAAAAAAASwAAAEsAAAAAAAAASwAAAEsAAAAVAAAAYAAAAAAAAAAAAAAADwAAACADAAAAAAAAAAAAAAEAAACgMgAAVgcAAKr4//8BAAAAf39/AAEAAABkAAAAAAAAABQAAABAHwAAAAAAACYAAAAAAAAAwOD//wAAAAAmAAAAZAAAABYAAABMAAAAAAAAAAAAAAAEAAAAAAAAAAEAAAAsPEMKAAAAACgAAAAoAAAAZAAAAGQAAAAAAAAAzMzMAAAAAABQAAAAUAAAAGQAAABkAAAAAAAAABcAAAAUAAAAAAAAAAAAAAD/fwAA/38AAAAAAAAJAAAABAAAAJCf+wMMAAAAEAAAAAAAAAAAAAAAAAAAAAAAAAAeAAAAaAAAAAAAAAAAAAAAAAAAAAAAAAAAAAAAECcAABAnAAAAAAAAAAAAAAAAAAAAAAAAAAAAAAAAAAAAAAAAAAAAABQAAAAAAAAAwMD/AAAAAABkAAAAMgAAAAAAAABkAAAAAAAAAH9/fwAKAAAAHwAAAFQAAACQwiYF////AQAAAAAAAAAAAAAAAAAAAAAAAAAAAAAAAAAAAAAAAAAAv7+/AH9/fwAsPEMDzMzMAMDA/wB/f38AAAAAAAAAAAAAAAAAAAAAAAAAAAAhAAAAGAAAABQAAAClOQAAAAAAACVBAAAwKgAAAAAAACYAAAAIAAAA//////////8="/>
+                  <pr:smNativeData xmlns:pr="smNativeData" xmlns:p14="http://schemas.microsoft.com/office/powerpoint/2010/main" xmlns="" val="SMDATA_13_w78LXxMAAAAlAAAADQAAAA0AAAAAkAAAAEgAAACQAAAASAAAAAAAAAAAAAAAAAAAAAEAAABQAAAAAAAAAAAA8L8AAAAAAAAAAAAAAAAAAPA/AAAAAAAA4D8AAAAAAADgPwAAAAAAAOA/AAAAAAAA4D8AAAAAAADgPwAAAAAAAOA/AAAAAAAA4D8CAAAAjAAAAAAAAAAAAAAAkMImDP///wgAAAAAAAAAAAAAAAAAAAAAAAAAAAAAAAAAAAAAZAAAAAEAAABAAAAAAAAAAAAAAAAAAAAAAAAAAAAAAAAAAAAAAAAAAAAAAAAAAAAAAAAAAAAAAAAAAAAAAAAAAAAAAAAAAAAAAAAAAAAAAAAAAAAAAAAAAAAAAAAAAAAAFAAAADwAAAABAAAAAAAAAL+/vwAPAAAAAQAAACMAAAAjAAAAIwAAAB4AAAAAAAAASwAAAEsAAAAAAAAASwAAAEsAAAAVAAAAYAAAAAAAAAAAAAAADwAAACADAAAAAAAAAAAAAAEAAACgMgAAVgcAAKr4//8BAAAAf39/AAEAAABkAAAAAAAAABQAAABAHwAAAAAAACYAAAAAAAAAwOD//wAAAAAmAAAAZAAAABYAAABMAAAAAAAAAAAAAAAEAAAAAAAAAAEAAAAsPEMKAAAAACgAAAAoAAAAZAAAAGQAAAAAAAAAzMzMAAAAAABQAAAAUAAAAGQAAABkAAAAAAAAABcAAAAUAAAAAAAAAAAAAAD/fwAA/38AAAAAAAAJAAAABAAAAJCf+wMMAAAAEAAAAAAAAAAAAAAAAAAAAAAAAAAeAAAAaAAAAAAAAAAAAAAAAAAAAAAAAAAAAAAAECcAABAnAAAAAAAAAAAAAAAAAAAAAAAAAAAAAAAAAAAAAAAAAAAAABQAAAAAAAAAwMD/AAAAAABkAAAAMgAAAAAAAABkAAAAAAAAAH9/fwAKAAAAHwAAAFQAAACQwiYF////AQAAAAAAAAAAAAAAAAAAAAAAAAAAAAAAAAAAAAAAAAAAv7+/AH9/fwAsPEMDzMzMAMDA/wB/f38AAAAAAAAAAAAAAAAAAAAAAAAAAAAhAAAAGAAAABQAAAClOQAAAAAAACVBAAAwKgAAAAAAACYAAAAIAAAA//////////8="/>
                 </a:ext>
               </a:extLst>
             </p:cNvCxnSpPr>
@@ -21961,7 +21966,7 @@
             <p:cNvCxnSpPr>
               <a:extLst>
                 <a:ext uri="smNativeData">
-                  <pr:smNativeData xmlns="" xmlns:p14="http://schemas.microsoft.com/office/powerpoint/2010/main" xmlns:pr="smNativeData" val="SMDATA_13_w78LXxMAAAAlAAAADQAAAA0AAAAAkAAAAEgAAACQAAAASAAAAAAAAAAAAAAAAAAAAAEAAABQAAAAAAAAAAAA8L8AAAAAAAAAAAAAAAAAAPA/AAAAAAAA4D8AAAAAAADgPwAAAAAAAOA/AAAAAAAA4D8AAAAAAADgPwAAAAAAAOA/AAAAAAAA4D8CAAAAjAAAAAAAAAAAAAAAkMImDP///wgAAAAAAAAAAAAAAAAAAAAAAAAAAAAAAAAAAAAAZAAAAAEAAABAAAAAAAAAAAAAAAAAAAAAAAAAAAAAAAAAAAAAAAAAAAAAAAAAAAAAAAAAAAAAAAAAAAAAAAAAAAAAAAAAAAAAAAAAAAAAAAAAAAAAAAAAAAAAAAAAAAAAFAAAADwAAAABAAAAAAAAANjY2AAPAAAAAQAAACMAAAAjAAAAIwAAAB4AAAAAAAAASwAAAEsAAAAAAAAASwAAAEsAAAAVAAAAYAAAAAAAAAAAAAAADwAAACADAAAAAAAAAAAAAAEAAACgMgAAVgcAAKr4//8BAAAAf39/AAEAAABkAAAAAAAAABQAAABAHwAAAAAAACYAAAAAAAAAwOD//wAAAAAmAAAAZAAAABYAAABMAAAAAAAAAAAAAAAEAAAAAAAAAAEAAAAsPEMKAAAAACgAAAAoAAAAZAAAAGQAAAAAAAAAzMzMAAAAAABQAAAAUAAAAGQAAABkAAAAAAAAABcAAAAUAAAAAAAAAAAAAAD/fwAA/38AAAAAAAAJAAAABAAAAC4AAAAMAAAAEAAAAAAAAAAAAAAAAAAAAAAAAAAeAAAAaAAAAAAAAAAAAAAAAAAAAAAAAAAAAAAAECcAABAnAAAAAAAAAAAAAAAAAAAAAAAAAAAAAAAAAAAAAAAAAAAAABQAAAAAAAAAwMD/AAAAAABkAAAAMgAAAAAAAABkAAAAAAAAAH9/fwAKAAAAHwAAAFQAAACQwiYF////AQAAAAAAAAAAAAAAAAAAAAAAAAAAAAAAAAAAAAAAAAAA2NjYAH9/fwAsPEMDzMzMAMDA/wB/f38AAAAAAAAAAAAAAAAAAAAAAAAAAAAhAAAAGAAAABQAAACtLQAAphYAAPtKAAAwKgAAAAAAACYAAAAIAAAA//////////8="/>
+                  <pr:smNativeData xmlns:pr="smNativeData" xmlns:p14="http://schemas.microsoft.com/office/powerpoint/2010/main" xmlns="" val="SMDATA_13_w78LXxMAAAAlAAAADQAAAA0AAAAAkAAAAEgAAACQAAAASAAAAAAAAAAAAAAAAAAAAAEAAABQAAAAAAAAAAAA8L8AAAAAAAAAAAAAAAAAAPA/AAAAAAAA4D8AAAAAAADgPwAAAAAAAOA/AAAAAAAA4D8AAAAAAADgPwAAAAAAAOA/AAAAAAAA4D8CAAAAjAAAAAAAAAAAAAAAkMImDP///wgAAAAAAAAAAAAAAAAAAAAAAAAAAAAAAAAAAAAAZAAAAAEAAABAAAAAAAAAAAAAAAAAAAAAAAAAAAAAAAAAAAAAAAAAAAAAAAAAAAAAAAAAAAAAAAAAAAAAAAAAAAAAAAAAAAAAAAAAAAAAAAAAAAAAAAAAAAAAAAAAAAAAFAAAADwAAAABAAAAAAAAANjY2AAPAAAAAQAAACMAAAAjAAAAIwAAAB4AAAAAAAAASwAAAEsAAAAAAAAASwAAAEsAAAAVAAAAYAAAAAAAAAAAAAAADwAAACADAAAAAAAAAAAAAAEAAACgMgAAVgcAAKr4//8BAAAAf39/AAEAAABkAAAAAAAAABQAAABAHwAAAAAAACYAAAAAAAAAwOD//wAAAAAmAAAAZAAAABYAAABMAAAAAAAAAAAAAAAEAAAAAAAAAAEAAAAsPEMKAAAAACgAAAAoAAAAZAAAAGQAAAAAAAAAzMzMAAAAAABQAAAAUAAAAGQAAABkAAAAAAAAABcAAAAUAAAAAAAAAAAAAAD/fwAA/38AAAAAAAAJAAAABAAAAC4AAAAMAAAAEAAAAAAAAAAAAAAAAAAAAAAAAAAeAAAAaAAAAAAAAAAAAAAAAAAAAAAAAAAAAAAAECcAABAnAAAAAAAAAAAAAAAAAAAAAAAAAAAAAAAAAAAAAAAAAAAAABQAAAAAAAAAwMD/AAAAAABkAAAAMgAAAAAAAABkAAAAAAAAAH9/fwAKAAAAHwAAAFQAAACQwiYF////AQAAAAAAAAAAAAAAAAAAAAAAAAAAAAAAAAAAAAAAAAAA2NjYAH9/fwAsPEMDzMzMAMDA/wB/f38AAAAAAAAAAAAAAAAAAAAAAAAAAAAhAAAAGAAAABQAAACtLQAAphYAAPtKAAAwKgAAAAAAACYAAAAIAAAA//////////8="/>
                 </a:ext>
               </a:extLst>
             </p:cNvCxnSpPr>
@@ -21993,7 +21998,7 @@
             <p:cNvSpPr>
               <a:extLst>
                 <a:ext uri="smNativeData">
-                  <pr:smNativeData xmlns="" xmlns:p14="http://schemas.microsoft.com/office/powerpoint/2010/main" xmlns:pr="smNativeData" val="SMDATA_13_w78LXxMAAAAlAAAACwAAAA0AAAAAAAAAAAAAAAAAAAAAAAAAAAAAAAAAAAAAAAAAAAEAAABQAAAAAAAAAAAA4D8AAAAAAADgPwAAAAAAAOA/AAAAAAAA4D8AAAAAAADgPwAAAAAAAOA/AAAAAAAA4D8AAAAAAADgPwAAAAAAAOA/AAAAAAAA4D8CAAAAjAAAAAEAAAAAAAAAkMImDP///whIAAAAAAAAAAAAAAAAAAAAAAAAAAAAAAAAAAAAeAAAAAEAAABAAAAAAAAAAAAAAABaAAAAAAAAAAAAAAAAAAAAAAAAAAAAAAAAAAAAAAAAAAAAAAAAAAAAAAAAAAAAAAAAAAAAAAAAAAAAAAAAAAAAAAAAAAAAAAAAAAAAFAAAADwAAAAAAAAAAAAAAAAAAAkUAAAAAQAAABQAAAAUAAAAFAAAAAEAAAAAAAAAZAAAAGQAAAAAAAAAZAAAAGQAAAAVAAAAYAAAAAAAAAAAAAAADwAAACADAAAAAAAAAAAAAAEAAACgMgAAVgcAAKr4//8BAAAAf39/AAEAAABkAAAAAAAAABQAAABAHwAAAAAAACYAAAAAAAAAwOD//wAAAAAmAAAAZAAAABYAAABMAAAAAAAAAAAAAAAEAAAAAAAAAAEAAAAsPEMKAAAAACgAAAAoAAAAZAAAAGQAAAAAAAAAzMzMAAAAAABQAAAAUAAAAGQAAABkAAAAAAAAABcAAAAUAAAAAAAAAAAAAAD/fwAA/38AAAAAAAAJAAAABAAAAAAAAAAMAAAAEAAAAAAAAAAAAAAAAAAAAAAAAAAeAAAAaAAAAAAAAAAAAAAAAAAAAAAAAAAAAAAAECcAABAnAAAAAAAAAAAAAAAAAAAAAAAAAAAAAAAAAAAAAAAAAAAAABQAAAAAAAAAwMD/AAAAAABkAAAAMgAAAAAAAABkAAAAAAAAAH9/fwAKAAAAHwAAAFQAAACQwiYF////AQAAAAAAAAAAAAAAAAAAAAAAAAAAAAAAAAAAAAAAAAAAAAAAAn9/fwAsPEMDzMzMAMDA/wB/f38AAAAAAAAAAAAAAAAAAAAAAAAAAAAhAAAAGAAAABQAAAB7OAAA8/////tKAAAwKgAAAAAAACYAAAAIAAAA//////////8="/>
+                  <pr:smNativeData xmlns:pr="smNativeData" xmlns:p14="http://schemas.microsoft.com/office/powerpoint/2010/main" xmlns="" val="SMDATA_13_w78LXxMAAAAlAAAACwAAAA0AAAAAAAAAAAAAAAAAAAAAAAAAAAAAAAAAAAAAAAAAAAEAAABQAAAAAAAAAAAA4D8AAAAAAADgPwAAAAAAAOA/AAAAAAAA4D8AAAAAAADgPwAAAAAAAOA/AAAAAAAA4D8AAAAAAADgPwAAAAAAAOA/AAAAAAAA4D8CAAAAjAAAAAEAAAAAAAAAkMImDP///whIAAAAAAAAAAAAAAAAAAAAAAAAAAAAAAAAAAAAeAAAAAEAAABAAAAAAAAAAAAAAABaAAAAAAAAAAAAAAAAAAAAAAAAAAAAAAAAAAAAAAAAAAAAAAAAAAAAAAAAAAAAAAAAAAAAAAAAAAAAAAAAAAAAAAAAAAAAAAAAAAAAFAAAADwAAAAAAAAAAAAAAAAAAAkUAAAAAQAAABQAAAAUAAAAFAAAAAEAAAAAAAAAZAAAAGQAAAAAAAAAZAAAAGQAAAAVAAAAYAAAAAAAAAAAAAAADwAAACADAAAAAAAAAAAAAAEAAACgMgAAVgcAAKr4//8BAAAAf39/AAEAAABkAAAAAAAAABQAAABAHwAAAAAAACYAAAAAAAAAwOD//wAAAAAmAAAAZAAAABYAAABMAAAAAAAAAAAAAAAEAAAAAAAAAAEAAAAsPEMKAAAAACgAAAAoAAAAZAAAAGQAAAAAAAAAzMzMAAAAAABQAAAAUAAAAGQAAABkAAAAAAAAABcAAAAUAAAAAAAAAAAAAAD/fwAA/38AAAAAAAAJAAAABAAAAAAAAAAMAAAAEAAAAAAAAAAAAAAAAAAAAAAAAAAeAAAAaAAAAAAAAAAAAAAAAAAAAAAAAAAAAAAAECcAABAnAAAAAAAAAAAAAAAAAAAAAAAAAAAAAAAAAAAAAAAAAAAAABQAAAAAAAAAwMD/AAAAAABkAAAAMgAAAAAAAABkAAAAAAAAAH9/fwAKAAAAHwAAAFQAAACQwiYF////AQAAAAAAAAAAAAAAAAAAAAAAAAAAAAAAAAAAAAAAAAAAAAAAAn9/fwAsPEMDzMzMAMDA/wB/f38AAAAAAAAAAAAAAAAAAAAAAAAAAAAhAAAAGAAAABQAAAB7OAAA8/////tKAAAwKgAAAAAAACYAAAAIAAAA//////////8="/>
                 </a:ext>
               </a:extLst>
             </p:cNvSpPr>
@@ -22048,7 +22053,7 @@
             <p:cNvSpPr>
               <a:extLst>
                 <a:ext uri="smNativeData">
-                  <pr:smNativeData xmlns="" xmlns:p14="http://schemas.microsoft.com/office/powerpoint/2010/main" xmlns:pr="smNativeData" val="SMDATA_13_w78LXxMAAAAlAAAACwAAAA0AAAAAAAAAAAAAAAAAAAAAAAAAAAAAAAAAAAAAAAAAAAEAAABQAAAAAAAAAAAA4D8AAAAAAADgPwAAAAAAAOA/AAAAAAAA4D8AAAAAAADgPwAAAAAAAOA/AAAAAAAA4D8AAAAAAADgPwAAAAAAAOA/AAAAAAAA4D8CAAAAjAAAAAEAAAAAAAAAkMImDP///whRAAAAAAAAAAAAAAAAAAAAAAAAAAAAAAAAAAAAeAAAAAEAAABAAAAAAAAAAAAAAABaAAAAAAAAAAAAAAAAAAAAAAAAAAAAAAAAAAAAAAAAAAAAAAAAAAAAAAAAAAAAAAAAAAAAAAAAAAAAAAAAAAAAAAAAAAAAAAAAAAAAFAAAADwAAAAAAAAAAAAAAAAAAAkUAAAAAQAAABQAAAAUAAAAFAAAAAEAAAAAAAAAZAAAAGQAAAAAAAAAZAAAAGQAAAAVAAAAYAAAAAAAAAAAAAAADwAAACADAAAAAAAAAAAAAAEAAACgMgAAVgcAAKr4//8BAAAAf39/AAEAAABkAAAAAAAAABQAAABAHwAAAAAAACYAAAAAAAAAwOD//wAAAAAmAAAAZAAAABYAAABMAAAAAAAAAAAAAAAEAAAAAAAAAAEAAAAsPEMKAAAAACgAAAAoAAAAZAAAAGQAAAAAAAAAzMzMAAAAAABQAAAAUAAAAGQAAABkAAAAAAAAABcAAAAUAAAAAAAAAAAAAAD/fwAA/38AAAAAAAAJAAAABAAAAAAAAAAMAAAAEAAAAAAAAAAAAAAAAAAAAAAAAAAeAAAAaAAAAAAAAAAAAAAAAAAAAAAAAAAAAAAAECcAABAnAAAAAAAAAAAAAAAAAAAAAAAAAAAAAAAAAAAAAAAAAAAAABQAAAAAAAAAwMD/AAAAAABkAAAAMgAAAAAAAABkAAAAAAAAAH9/fwAKAAAAHwAAAFQAAACQwiYF////AQAAAAAAAAAAAAAAAAAAAAAAAAAAAAAAAAAAAAAAAAAAAAAAAn9/fwAsPEMDzMzMAMDA/wB/f38AAAAAAAAAAAAAAAAAAAAAAAAAAAAhAAAAGAAAABQAAAAUOwAA8////wBLAAAwKgAAAAAAACYAAAAIAAAA//////////8="/>
+                  <pr:smNativeData xmlns:pr="smNativeData" xmlns:p14="http://schemas.microsoft.com/office/powerpoint/2010/main" xmlns="" val="SMDATA_13_w78LXxMAAAAlAAAACwAAAA0AAAAAAAAAAAAAAAAAAAAAAAAAAAAAAAAAAAAAAAAAAAEAAABQAAAAAAAAAAAA4D8AAAAAAADgPwAAAAAAAOA/AAAAAAAA4D8AAAAAAADgPwAAAAAAAOA/AAAAAAAA4D8AAAAAAADgPwAAAAAAAOA/AAAAAAAA4D8CAAAAjAAAAAEAAAAAAAAAkMImDP///whRAAAAAAAAAAAAAAAAAAAAAAAAAAAAAAAAAAAAeAAAAAEAAABAAAAAAAAAAAAAAABaAAAAAAAAAAAAAAAAAAAAAAAAAAAAAAAAAAAAAAAAAAAAAAAAAAAAAAAAAAAAAAAAAAAAAAAAAAAAAAAAAAAAAAAAAAAAAAAAAAAAFAAAADwAAAAAAAAAAAAAAAAAAAkUAAAAAQAAABQAAAAUAAAAFAAAAAEAAAAAAAAAZAAAAGQAAAAAAAAAZAAAAGQAAAAVAAAAYAAAAAAAAAAAAAAADwAAACADAAAAAAAAAAAAAAEAAACgMgAAVgcAAKr4//8BAAAAf39/AAEAAABkAAAAAAAAABQAAABAHwAAAAAAACYAAAAAAAAAwOD//wAAAAAmAAAAZAAAABYAAABMAAAAAAAAAAAAAAAEAAAAAAAAAAEAAAAsPEMKAAAAACgAAAAoAAAAZAAAAGQAAAAAAAAAzMzMAAAAAABQAAAAUAAAAGQAAABkAAAAAAAAABcAAAAUAAAAAAAAAAAAAAD/fwAA/38AAAAAAAAJAAAABAAAAAAAAAAMAAAAEAAAAAAAAAAAAAAAAAAAAAAAAAAeAAAAaAAAAAAAAAAAAAAAAAAAAAAAAAAAAAAAECcAABAnAAAAAAAAAAAAAAAAAAAAAAAAAAAAAAAAAAAAAAAAAAAAABQAAAAAAAAAwMD/AAAAAABkAAAAMgAAAAAAAABkAAAAAAAAAH9/fwAKAAAAHwAAAFQAAACQwiYF////AQAAAAAAAAAAAAAAAAAAAAAAAAAAAAAAAAAAAAAAAAAAAAAAAn9/fwAsPEMDzMzMAMDA/wB/f38AAAAAAAAAAAAAAAAAAAAAAAAAAAAhAAAAGAAAABQAAAAUOwAA8////wBLAAAwKgAAAAAAACYAAAAIAAAA//////////8="/>
                 </a:ext>
               </a:extLst>
             </p:cNvSpPr>
@@ -22103,7 +22108,7 @@
             <p:cNvSpPr>
               <a:extLst>
                 <a:ext uri="smNativeData">
-                  <pr:smNativeData xmlns="" xmlns:p14="http://schemas.microsoft.com/office/powerpoint/2010/main" xmlns:pr="smNativeData" val="SMDATA_13_w78LXxMAAAAlAAAAagAAAA0AAAAAkAAAAJAAAACQAAAAkAAAAAAAAAABAAAAAAAAAAEAAABQAAAAAAAAAAAA8D8AAAAAAADgPwAAAAAAAOA/AAAAAAAA4D8AAAAAAADgPwAAAAAAAOA/AAAAAAAA4D8AAAAAAADgPwAAAAAAAOA/AAAAAAAA4D8CAAAAjAAAAAEAAAAAAAAAVKAhDf///wgeAAAAAAAAAAAAAAAAAAAAAAAAAAAAAAAAAAAAeAAAAAEAAABAAAAAAAAAAAAAAABaAAAAAAAAAAAAAAAAAAAAAAAAAAAAAAAAAAAAAAAAAAAAAAAAAAAAAAAAAAAAAAAAAAAAAAAAAAAAAAAAAAAAAAAAAAAAAAAAAAAAFAAAADwAAAAAAAAAAAAAAAAAAAkUAAAAAQAAABQAAAAUAAAAFAAAAAEAAAAAAAAAZAAAAGQAAAAAAAAAZAAAAGQAAAAVAAAAYAAAAAAAAAAAAAAADwAAACADAAAAAAAAAAAAAAEAAACgMgAAVgcAAKr4//8BAAAAf39/AAEAAABkAAAAAAAAABQAAABAHwAAAAAAACYAAAAAAAAAwOD//wAAAAAmAAAAZAAAABYAAABMAAAAAAAAAAAAAAAEAAAAAAAAAAEAAAAsPEMKAAAAACgAAAAoAAAAZAAAAGQAAAAAAAAAzMzMAAAAAABQAAAAUAAAAGQAAABkAAAAAAAAABcAAAAUAAAAAAAAAAAAAAD/fwAA/38AAAAAAAAJAAAABAAAACAgCSIMAAAAEAAAAAAAAAAAAAAAAAAAAAAAAAAeAAAAaAAAAAAAAAAAAAAAAAAAAAAAAAAAAAAAECcAABAnAAAAAAAAAAAAAAAAAAAAAAAAAAAAAAAAAAAAAAAAAAAAABQAAAAAAAAAwMD/AAAAAABkAAAAMgAAAAAAAABkAAAAAAAAAH9/fwAKAAAAHwAAAFQAAABUoCEG////AQAAAAAAAAAAAAAAAAAAAAAAAAAAAAAAAAAAAAAAAAAAAAAAAn9/fwAsPEMDzMzMAMDA/wB/f38AAAAAAAAAAAAAAAAAAAAAAAAAAAAhAAAAGAAAABQAAADzNgAAwBIAAABLAAAwKgAAAAAAACYAAAAIAAAA//////////8="/>
+                  <pr:smNativeData xmlns:pr="smNativeData" xmlns:p14="http://schemas.microsoft.com/office/powerpoint/2010/main" xmlns="" val="SMDATA_13_w78LXxMAAAAlAAAAagAAAA0AAAAAkAAAAJAAAACQAAAAkAAAAAAAAAABAAAAAAAAAAEAAABQAAAAAAAAAAAA8D8AAAAAAADgPwAAAAAAAOA/AAAAAAAA4D8AAAAAAADgPwAAAAAAAOA/AAAAAAAA4D8AAAAAAADgPwAAAAAAAOA/AAAAAAAA4D8CAAAAjAAAAAEAAAAAAAAAVKAhDf///wgeAAAAAAAAAAAAAAAAAAAAAAAAAAAAAAAAAAAAeAAAAAEAAABAAAAAAAAAAAAAAABaAAAAAAAAAAAAAAAAAAAAAAAAAAAAAAAAAAAAAAAAAAAAAAAAAAAAAAAAAAAAAAAAAAAAAAAAAAAAAAAAAAAAAAAAAAAAAAAAAAAAFAAAADwAAAAAAAAAAAAAAAAAAAkUAAAAAQAAABQAAAAUAAAAFAAAAAEAAAAAAAAAZAAAAGQAAAAAAAAAZAAAAGQAAAAVAAAAYAAAAAAAAAAAAAAADwAAACADAAAAAAAAAAAAAAEAAACgMgAAVgcAAKr4//8BAAAAf39/AAEAAABkAAAAAAAAABQAAABAHwAAAAAAACYAAAAAAAAAwOD//wAAAAAmAAAAZAAAABYAAABMAAAAAAAAAAAAAAAEAAAAAAAAAAEAAAAsPEMKAAAAACgAAAAoAAAAZAAAAGQAAAAAAAAAzMzMAAAAAABQAAAAUAAAAGQAAABkAAAAAAAAABcAAAAUAAAAAAAAAAAAAAD/fwAA/38AAAAAAAAJAAAABAAAACAgCSIMAAAAEAAAAAAAAAAAAAAAAAAAAAAAAAAeAAAAaAAAAAAAAAAAAAAAAAAAAAAAAAAAAAAAECcAABAnAAAAAAAAAAAAAAAAAAAAAAAAAAAAAAAAAAAAAAAAAAAAABQAAAAAAAAAwMD/AAAAAABkAAAAMgAAAAAAAABkAAAAAAAAAH9/fwAKAAAAHwAAAFQAAABUoCEG////AQAAAAAAAAAAAAAAAAAAAAAAAAAAAAAAAAAAAAAAAAAAAAAAAn9/fwAsPEMDzMzMAMDA/wB/f38AAAAAAAAAAAAAAAAAAAAAAAAAAAAhAAAAGAAAABQAAADzNgAAwBIAAABLAAAwKgAAAAAAACYAAAAIAAAA//////////8="/>
                 </a:ext>
               </a:extLst>
             </p:cNvSpPr>
@@ -22152,7 +22157,7 @@
             <p:cNvSpPr>
               <a:extLst>
                 <a:ext uri="smNativeData">
-                  <pr:smNativeData xmlns="" xmlns:p14="http://schemas.microsoft.com/office/powerpoint/2010/main" xmlns:pr="smNativeData" val="SMDATA_13_w78LXxMAAAAlAAAACwAAAA0AAAAAAAAAAAAAAAAAAAAAAAAAAAAAAAAAAAAAAAAAAAEAAABQAAAAAAAAAAAA4D8AAAAAAADgPwAAAAAAAOA/AAAAAAAA4D8AAAAAAADgPwAAAAAAAOA/AAAAAAAA4D8AAAAAAADgPwAAAAAAAOA/AAAAAAAA4D8CAAAAjAAAAAEAAAAAAAAAP3gYAP///wggAAAAAAAAAAAAAAAAAAAAAAAAAAAAAAAAAAAAeAAAAAEAAABAAAAAAAAAAAAAAABaAAAAAAAAAAAAAAAAAAAAAAAAAAAAAAAAAAAAAAAAAAAAAAAAAAAAAAAAAAAAAAAAAAAAAAAAAAAAAAAAAAAAAAAAAAAAAAAAAAAAFAAAADwAAAAAAAAAAAAAAAAAAAkUAAAAAQAAABQAAAAUAAAAFAAAAAEAAAAAAAAAZAAAAGQAAAAAAAAAZAAAAGQAAAAVAAAAYAAAAAAAAAAAAAAADwAAACADAAAAAAAAAAAAAAEAAACgMgAAVgcAAKr4//8BAAAAf39/AAEAAABkAAAAAAAAABQAAABAHwAAAAAAACYAAAAAAAAAwOD//wAAAAAmAAAAZAAAABYAAABMAAAAAAAAAAAAAAAEAAAAAAAAAAEAAAAsPEMKAAAAACgAAAAoAAAAZAAAAGQAAAAAAAAAzMzMAAAAAABQAAAAUAAAAGQAAABkAAAAAAAAABcAAAAUAAAAAAAAAAAAAAD/fwAA/38AAAAAAAAJAAAABAAAAAAAAAAMAAAAEAAAAAAAAAAAAAAAAAAAAAAAAAAeAAAAaAAAAAAAAAAAAAAAAAAAAAAAAAAAAAAAECcAABAnAAAAAAAAAAAAAAAAAAAAAAAAAAAAAAAAAAAAAAAAAAAAABQAAAAAAAAAwMD/AAAAAABkAAAAMgAAAAAAAABkAAAAAAAAAH9/fwAKAAAAHwAAAFQAAAA/eBgA////AQAAAAAAAAAAAAAAAAAAAAAAAAAAAAAAAAAAAAAAAAAAAAAAAn9/fwAsPEMDzMzMAMDA/wB/f38AAAAAAAAAAAAAAAAAAAAAAAAAAAAhAAAAGAAAABQAAABsOQAA8/////tKAAAwKgAAAAAAACYAAAAIAAAA//////////8="/>
+                  <pr:smNativeData xmlns:pr="smNativeData" xmlns:p14="http://schemas.microsoft.com/office/powerpoint/2010/main" xmlns="" val="SMDATA_13_w78LXxMAAAAlAAAACwAAAA0AAAAAAAAAAAAAAAAAAAAAAAAAAAAAAAAAAAAAAAAAAAEAAABQAAAAAAAAAAAA4D8AAAAAAADgPwAAAAAAAOA/AAAAAAAA4D8AAAAAAADgPwAAAAAAAOA/AAAAAAAA4D8AAAAAAADgPwAAAAAAAOA/AAAAAAAA4D8CAAAAjAAAAAEAAAAAAAAAP3gYAP///wggAAAAAAAAAAAAAAAAAAAAAAAAAAAAAAAAAAAAeAAAAAEAAABAAAAAAAAAAAAAAABaAAAAAAAAAAAAAAAAAAAAAAAAAAAAAAAAAAAAAAAAAAAAAAAAAAAAAAAAAAAAAAAAAAAAAAAAAAAAAAAAAAAAAAAAAAAAAAAAAAAAFAAAADwAAAAAAAAAAAAAAAAAAAkUAAAAAQAAABQAAAAUAAAAFAAAAAEAAAAAAAAAZAAAAGQAAAAAAAAAZAAAAGQAAAAVAAAAYAAAAAAAAAAAAAAADwAAACADAAAAAAAAAAAAAAEAAACgMgAAVgcAAKr4//8BAAAAf39/AAEAAABkAAAAAAAAABQAAABAHwAAAAAAACYAAAAAAAAAwOD//wAAAAAmAAAAZAAAABYAAABMAAAAAAAAAAAAAAAEAAAAAAAAAAEAAAAsPEMKAAAAACgAAAAoAAAAZAAAAGQAAAAAAAAAzMzMAAAAAABQAAAAUAAAAGQAAABkAAAAAAAAABcAAAAUAAAAAAAAAAAAAAD/fwAA/38AAAAAAAAJAAAABAAAAAAAAAAMAAAAEAAAAAAAAAAAAAAAAAAAAAAAAAAeAAAAaAAAAAAAAAAAAAAAAAAAAAAAAAAAAAAAECcAABAnAAAAAAAAAAAAAAAAAAAAAAAAAAAAAAAAAAAAAAAAAAAAABQAAAAAAAAAwMD/AAAAAABkAAAAMgAAAAAAAABkAAAAAAAAAH9/fwAKAAAAHwAAAFQAAAA/eBgA////AQAAAAAAAAAAAAAAAAAAAAAAAAAAAAAAAAAAAAAAAAAAAAAAAn9/fwAsPEMDzMzMAMDA/wB/f38AAAAAAAAAAAAAAAAAAAAAAAAAAAAhAAAAGAAAABQAAABsOQAA8/////tKAAAwKgAAAAAAACYAAAAIAAAA//////////8="/>
                 </a:ext>
               </a:extLst>
             </p:cNvSpPr>
@@ -22207,7 +22212,7 @@
             <p:cNvSpPr>
               <a:extLst>
                 <a:ext uri="smNativeData">
-                  <pr:smNativeData xmlns="" xmlns:p14="http://schemas.microsoft.com/office/powerpoint/2010/main" xmlns:pr="smNativeData" val="SMDATA_13_w78LXxMAAAAlAAAACwAAAA0AAAAAAAAAAAAAAAAAAAAAAAAAAAAAAAAAAAAAAAAAAAEAAABQAAAAAAAAAAAA4D8AAAAAAADgPwAAAAAAAOA/AAAAAAAA4D8AAAAAAADgPwAAAAAAAOA/AAAAAAAA4D8AAAAAAADgPwAAAAAAAOA/AAAAAAAA4D8CAAAAjAAAAAEAAAAAAAAAv+RxAP///wggAAAAAAAAAAAAAAAAAAAAAAAAAAAAAAAAAAAAeAAAAAEAAABAAAAAAAAAAAAAAABaAAAAAAAAAAAAAAAAAAAAAAAAAAAAAAAAAAAAAAAAAAAAAAAAAAAAAAAAAAAAAAAAAAAAAAAAAAAAAAAAAAAAAAAAAAAAAAAAAAAAFAAAADwAAAAAAAAAAAAAAAAAAAkUAAAAAQAAABQAAAAUAAAAFAAAAAEAAAAAAAAAZAAAAGQAAAAAAAAAZAAAAGQAAAAVAAAAYAAAAAAAAAAAAAAADwAAACADAAAAAAAAAAAAAAEAAACgMgAAVgcAAKr4//8BAAAAf39/AAEAAABkAAAAAAAAABQAAABAHwAAAAAAACYAAAAAAAAAwOD//wAAAAAmAAAAZAAAABYAAABMAAAAAAAAAAAAAAAEAAAAAAAAAAEAAAAsPEMKAAAAACgAAAAoAAAAZAAAAGQAAAAAAAAAzMzMAAAAAABQAAAAUAAAAGQAAABkAAAAAAAAABcAAAAUAAAAAAAAAAAAAAD/fwAA/38AAAAAAAAJAAAABAAAALDpOAMMAAAAEAAAAAAAAAAAAAAAAAAAAAAAAAAeAAAAaAAAAAAAAAAAAAAAAAAAAAAAAAAAAAAAECcAABAnAAAAAAAAAAAAAAAAAAAAAAAAAAAAAAAAAAAAAAAAAAAAABQAAAAAAAAAwMD/AAAAAABkAAAAMgAAAAAAAABkAAAAAAAAAH9/fwAKAAAAHwAAAFQAAAC/5HEA////AQAAAAAAAAAAAAAAAAAAAAAAAAAAAAAAAAAAAAAAAAAAAAAAAn9/fwAsPEMDzMzMAMDA/wB/f38AAAAAAAAAAAAAAAAAAAAAAAAAAAAhAAAAGAAAABQAAAALQwAA8/////tKAAAwKgAAAAAAACYAAAAIAAAA//////////8="/>
+                  <pr:smNativeData xmlns:pr="smNativeData" xmlns:p14="http://schemas.microsoft.com/office/powerpoint/2010/main" xmlns="" val="SMDATA_13_w78LXxMAAAAlAAAACwAAAA0AAAAAAAAAAAAAAAAAAAAAAAAAAAAAAAAAAAAAAAAAAAEAAABQAAAAAAAAAAAA4D8AAAAAAADgPwAAAAAAAOA/AAAAAAAA4D8AAAAAAADgPwAAAAAAAOA/AAAAAAAA4D8AAAAAAADgPwAAAAAAAOA/AAAAAAAA4D8CAAAAjAAAAAEAAAAAAAAAv+RxAP///wggAAAAAAAAAAAAAAAAAAAAAAAAAAAAAAAAAAAAeAAAAAEAAABAAAAAAAAAAAAAAABaAAAAAAAAAAAAAAAAAAAAAAAAAAAAAAAAAAAAAAAAAAAAAAAAAAAAAAAAAAAAAAAAAAAAAAAAAAAAAAAAAAAAAAAAAAAAAAAAAAAAFAAAADwAAAAAAAAAAAAAAAAAAAkUAAAAAQAAABQAAAAUAAAAFAAAAAEAAAAAAAAAZAAAAGQAAAAAAAAAZAAAAGQAAAAVAAAAYAAAAAAAAAAAAAAADwAAACADAAAAAAAAAAAAAAEAAACgMgAAVgcAAKr4//8BAAAAf39/AAEAAABkAAAAAAAAABQAAABAHwAAAAAAACYAAAAAAAAAwOD//wAAAAAmAAAAZAAAABYAAABMAAAAAAAAAAAAAAAEAAAAAAAAAAEAAAAsPEMKAAAAACgAAAAoAAAAZAAAAGQAAAAAAAAAzMzMAAAAAABQAAAAUAAAAGQAAABkAAAAAAAAABcAAAAUAAAAAAAAAAAAAAD/fwAA/38AAAAAAAAJAAAABAAAALDpOAMMAAAAEAAAAAAAAAAAAAAAAAAAAAAAAAAeAAAAaAAAAAAAAAAAAAAAAAAAAAAAAAAAAAAAECcAABAnAAAAAAAAAAAAAAAAAAAAAAAAAAAAAAAAAAAAAAAAAAAAABQAAAAAAAAAwMD/AAAAAABkAAAAMgAAAAAAAABkAAAAAAAAAH9/fwAKAAAAHwAAAFQAAAC/5HEA////AQAAAAAAAAAAAAAAAAAAAAAAAAAAAAAAAAAAAAAAAAAAAAAAAn9/fwAsPEMDzMzMAMDA/wB/f38AAAAAAAAAAAAAAAAAAAAAAAAAAAAhAAAAGAAAABQAAAALQwAA8/////tKAAAwKgAAAAAAACYAAAAIAAAA//////////8="/>
                 </a:ext>
               </a:extLst>
             </p:cNvSpPr>
@@ -22262,7 +22267,7 @@
             <p:cNvSpPr>
               <a:extLst>
                 <a:ext uri="smNativeData">
-                  <pr:smNativeData xmlns="" xmlns:p14="http://schemas.microsoft.com/office/powerpoint/2010/main" xmlns:pr="smNativeData" val="SMDATA_13_w78LXxMAAAAlAAAACwAAAA0AAAAAAAAAAAAAAAAAAAAAAAAAAAAAAAAAAAAAAAAAAAEAAABQAAAAAAAAAAAA4D8AAAAAAADgPwAAAAAAAOA/AAAAAAAA4D8AAAAAAADgPwAAAAAAAOA/AAAAAAAA4D8AAAAAAADgPwAAAAAAAOA/AAAAAAAA4D8CAAAAjAAAAAEAAAAAAAAAkMImDP///wglAAAAAAAAAAAAAAAAAAAAAAAAAAAAAAAAAAAAeAAAAAEAAABAAAAAAAAAAAAAAABaAAAAAAAAAAAAAAAAAAAAAAAAAAAAAAAAAAAAAAAAAAAAAAAAAAAAAAAAAAAAAAAAAAAAAAAAAAAAAAAAAAAAAAAAAAAAAAAAAAAAFAAAADwAAAAAAAAAAAAAAAAAAAkUAAAAAQAAABQAAAAUAAAAFAAAAAEAAAAAAAAAZAAAAGQAAAAAAAAAZAAAAGQAAAAVAAAAYAAAAAAAAAAAAAAADwAAACADAAAAAAAAAAAAAAEAAACgMgAAVgcAAKr4//8BAAAAf39/AAEAAABkAAAAAAAAABQAAABAHwAAAAAAACYAAAAAAAAAwOD//wAAAAAmAAAAZAAAABYAAABMAAAAAAAAAAAAAAAEAAAAAAAAAAEAAAAsPEMKAAAAACgAAAAoAAAAZAAAAGQAAAAAAAAAzMzMAAAAAABQAAAAUAAAAGQAAABkAAAAAAAAABcAAAAUAAAAAAAAAAAAAAD/fwAA/38AAAAAAAAJAAAABAAAAAAAAAAMAAAAEAAAAAAAAAAAAAAAAAAAAAAAAAAeAAAAaAAAAAAAAAAAAAAAAAAAAAAAAAAAAAAAECcAABAnAAAAAAAAAAAAAAAAAAAAAAAAAAAAAAAAAAAAAAAAAAAAABQAAAAAAAAAwMD/AAAAAABkAAAAMgAAAAAAAABkAAAAAAAAAH9/fwAKAAAAHwAAAFQAAACQwiYF////AQAAAAAAAAAAAAAAAAAAAAAAAAAAAAAAAAAAAAAAAAAAAAAAAn9/fwAsPEMDzMzMAMDA/wB/f38AAAAAAAAAAAAAAAAAAAAAAAAAAAAhAAAAGAAAABQAAABLQwAA8/////tKAAAwKgAAAAAAACYAAAAIAAAA//////////8="/>
+                  <pr:smNativeData xmlns:pr="smNativeData" xmlns:p14="http://schemas.microsoft.com/office/powerpoint/2010/main" xmlns="" val="SMDATA_13_w78LXxMAAAAlAAAACwAAAA0AAAAAAAAAAAAAAAAAAAAAAAAAAAAAAAAAAAAAAAAAAAEAAABQAAAAAAAAAAAA4D8AAAAAAADgPwAAAAAAAOA/AAAAAAAA4D8AAAAAAADgPwAAAAAAAOA/AAAAAAAA4D8AAAAAAADgPwAAAAAAAOA/AAAAAAAA4D8CAAAAjAAAAAEAAAAAAAAAkMImDP///wglAAAAAAAAAAAAAAAAAAAAAAAAAAAAAAAAAAAAeAAAAAEAAABAAAAAAAAAAAAAAABaAAAAAAAAAAAAAAAAAAAAAAAAAAAAAAAAAAAAAAAAAAAAAAAAAAAAAAAAAAAAAAAAAAAAAAAAAAAAAAAAAAAAAAAAAAAAAAAAAAAAFAAAADwAAAAAAAAAAAAAAAAAAAkUAAAAAQAAABQAAAAUAAAAFAAAAAEAAAAAAAAAZAAAAGQAAAAAAAAAZAAAAGQAAAAVAAAAYAAAAAAAAAAAAAAADwAAACADAAAAAAAAAAAAAAEAAACgMgAAVgcAAKr4//8BAAAAf39/AAEAAABkAAAAAAAAABQAAABAHwAAAAAAACYAAAAAAAAAwOD//wAAAAAmAAAAZAAAABYAAABMAAAAAAAAAAAAAAAEAAAAAAAAAAEAAAAsPEMKAAAAACgAAAAoAAAAZAAAAGQAAAAAAAAAzMzMAAAAAABQAAAAUAAAAGQAAABkAAAAAAAAABcAAAAUAAAAAAAAAAAAAAD/fwAA/38AAAAAAAAJAAAABAAAAAAAAAAMAAAAEAAAAAAAAAAAAAAAAAAAAAAAAAAeAAAAaAAAAAAAAAAAAAAAAAAAAAAAAAAAAAAAECcAABAnAAAAAAAAAAAAAAAAAAAAAAAAAAAAAAAAAAAAAAAAAAAAABQAAAAAAAAAwMD/AAAAAABkAAAAMgAAAAAAAABkAAAAAAAAAH9/fwAKAAAAHwAAAFQAAACQwiYF////AQAAAAAAAAAAAAAAAAAAAAAAAAAAAAAAAAAAAAAAAAAAAAAAAn9/fwAsPEMDzMzMAMDA/wB/f38AAAAAAAAAAAAAAAAAAAAAAAAAAAAhAAAAGAAAABQAAABLQwAA8/////tKAAAwKgAAAAAAACYAAAAIAAAA//////////8="/>
                 </a:ext>
               </a:extLst>
             </p:cNvSpPr>
@@ -22317,7 +22322,7 @@
             <p:cNvSpPr>
               <a:extLst>
                 <a:ext uri="smNativeData">
-                  <pr:smNativeData xmlns="" xmlns:p14="http://schemas.microsoft.com/office/powerpoint/2010/main" xmlns:pr="smNativeData" val="SMDATA_13_w78LXxMAAAAlAAAAagAAAA0AAAAAkAAAAJAAAACQAAAAkAAAAAAAAAABAAAAAAAAAAEAAABQAAAAAAAAAAAA8D8AAAAAAADgPwAAAAAAAOA/AAAAAAAA4D8AAAAAAADgPwAAAAAAAOA/AAAAAAAA4D8AAAAAAADgPwAAAAAAAOA/AAAAAAAA4D8CAAAAjAAAAAEAAAAAAAAAkMImDP///wgVAAAAAAAAAAAAAAAAAAAAAAAAAAAAAAAAAAAAeAAAAAEAAABAAAAAAAAAAAAAAABaAAAAAAAAAAAAAAAAAAAAAAAAAAAAAAAAAAAAAAAAAAAAAAAAAAAAAAAAAAAAAAAAAAAAAAAAAAAAAAAAAAAAAAAAAAAAAAAAAAAAFAAAADwAAAAAAAAAAAAAAAAAAAkUAAAAAQAAABQAAAAUAAAAFAAAAAEAAAAAAAAAZAAAAGQAAAAAAAAAZAAAAGQAAAAVAAAAYAAAAAAAAAAAAAAADwAAACADAAAAAAAAAAAAAAEAAACgMgAAVgcAAKr4//8BAAAAf39/AAEAAABkAAAAAAAAABQAAABAHwAAAAAAACYAAAAAAAAAwOD//wAAAAAmAAAAZAAAABYAAABMAAAAAAAAAAAAAAAEAAAAAAAAAAEAAAAsPEMKAAAAACgAAAAoAAAAZAAAAGQAAAAAAAAAzMzMAAAAAABQAAAAUAAAAGQAAABkAAAAAAAAABcAAAAUAAAAAAAAAAAAAAD/fwAA/38AAAAAAAAJAAAABAAAAEilMAMMAAAAEAAAAAAAAAAAAAAAAAAAAAAAAAAeAAAAaAAAAAAAAAAAAAAAAAAAAAAAAAAAAAAAECcAABAnAAAAAAAAAAAAAAAAAAAAAAAAAAAAAAAAAAAAAAAAAAAAABQAAAAAAAAAwMD/AAAAAABkAAAAMgAAAAAAAABkAAAAAAAAAH9/fwAKAAAAHwAAAFQAAACQwiYF////AQAAAAAAAAAAAAAAAAAAAAAAAAAAAAAAAAAAAAAAAAAAAAAAAn9/fwAsPEMDzMzMAMDA/wB/f38AAAAAAAAAAAAAAAAAAAAAAAAAAAAhAAAAGAAAABQAAADNPwAAFRYAAPtKAAAwKgAAAAAAACYAAAAIAAAA//////////8="/>
+                  <pr:smNativeData xmlns:pr="smNativeData" xmlns:p14="http://schemas.microsoft.com/office/powerpoint/2010/main" xmlns="" val="SMDATA_13_w78LXxMAAAAlAAAAagAAAA0AAAAAkAAAAJAAAACQAAAAkAAAAAAAAAABAAAAAAAAAAEAAABQAAAAAAAAAAAA8D8AAAAAAADgPwAAAAAAAOA/AAAAAAAA4D8AAAAAAADgPwAAAAAAAOA/AAAAAAAA4D8AAAAAAADgPwAAAAAAAOA/AAAAAAAA4D8CAAAAjAAAAAEAAAAAAAAAkMImDP///wgVAAAAAAAAAAAAAAAAAAAAAAAAAAAAAAAAAAAAeAAAAAEAAABAAAAAAAAAAAAAAABaAAAAAAAAAAAAAAAAAAAAAAAAAAAAAAAAAAAAAAAAAAAAAAAAAAAAAAAAAAAAAAAAAAAAAAAAAAAAAAAAAAAAAAAAAAAAAAAAAAAAFAAAADwAAAAAAAAAAAAAAAAAAAkUAAAAAQAAABQAAAAUAAAAFAAAAAEAAAAAAAAAZAAAAGQAAAAAAAAAZAAAAGQAAAAVAAAAYAAAAAAAAAAAAAAADwAAACADAAAAAAAAAAAAAAEAAACgMgAAVgcAAKr4//8BAAAAf39/AAEAAABkAAAAAAAAABQAAABAHwAAAAAAACYAAAAAAAAAwOD//wAAAAAmAAAAZAAAABYAAABMAAAAAAAAAAAAAAAEAAAAAAAAAAEAAAAsPEMKAAAAACgAAAAoAAAAZAAAAGQAAAAAAAAAzMzMAAAAAABQAAAAUAAAAGQAAABkAAAAAAAAABcAAAAUAAAAAAAAAAAAAAD/fwAA/38AAAAAAAAJAAAABAAAAEilMAMMAAAAEAAAAAAAAAAAAAAAAAAAAAAAAAAeAAAAaAAAAAAAAAAAAAAAAAAAAAAAAAAAAAAAECcAABAnAAAAAAAAAAAAAAAAAAAAAAAAAAAAAAAAAAAAAAAAAAAAABQAAAAAAAAAwMD/AAAAAABkAAAAMgAAAAAAAABkAAAAAAAAAH9/fwAKAAAAHwAAAFQAAACQwiYF////AQAAAAAAAAAAAAAAAAAAAAAAAAAAAAAAAAAAAAAAAAAAAAAAAn9/fwAsPEMDzMzMAMDA/wB/f38AAAAAAAAAAAAAAAAAAAAAAAAAAAAhAAAAGAAAABQAAADNPwAAFRYAAPtKAAAwKgAAAAAAACYAAAAIAAAA//////////8="/>
                 </a:ext>
               </a:extLst>
             </p:cNvSpPr>
@@ -22366,7 +22371,7 @@
             <p:cNvSpPr>
               <a:extLst>
                 <a:ext uri="smNativeData">
-                  <pr:smNativeData xmlns="" xmlns:p14="http://schemas.microsoft.com/office/powerpoint/2010/main" xmlns:pr="smNativeData" val="SMDATA_13_w78LXxMAAAAlAAAAagAAAA0AAAAAkAAAAJAAAACQAAAAkAAAAAAAAAABAAAAAAAAAAEAAABQAAAAAAAAAAAAAAAAAAAAAADgPwAAAAAAAOA/AAAAAAAA4D8AAAAAAADgPwAAAAAAAOA/AAAAAAAA4D8AAAAAAADgPwAAAAAAAOA/AAAAAAAA4D8CAAAAjAAAAAEAAAAAAAAAkMImDP///wgRAAAAAAAAAAAAAAAAAAAAAAAAAAAAAAAAAAAAeAAAAAEAAABAAAAAAAAAAAAAAABaAAAAAAAAAAAAAAAAAAAAAAAAAAAAAAAAAAAAAAAAAAAAAAAAAAAAAAAAAAAAAAAAAAAAAAAAAAAAAAAAAAAAAAAAAAAAAAAAAAAAFAAAADwAAAAAAAAAAAAAAAAAAAkUAAAAAQAAABQAAAAUAAAAFAAAAAEAAAAAAAAAZAAAAGQAAAAAAAAAZAAAAGQAAAAVAAAAYAAAAAAAAAAAAAAADwAAACADAAAAAAAAAAAAAAEAAACgMgAAVgcAAKr4//8BAAAAf39/AAEAAABkAAAAAAAAABQAAABAHwAAAAAAACYAAAAAAAAAwOD//wAAAAAmAAAAZAAAABYAAABMAAAAAAAAAAAAAAAEAAAAAAAAAAEAAAAsPEMKAAAAACgAAAAoAAAAZAAAAGQAAAAAAAAAzMzMAAAAAABQAAAAUAAAAGQAAABkAAAAAAAAABcAAAAUAAAAAAAAAAAAAAD/fwAA/38AAAAAAAAJAAAABAAAAAAAAAAMAAAAEAAAAAAAAAAAAAAAAAAAAAAAAAAeAAAAaAAAAAAAAAAAAAAAAAAAAAAAAAAAAAAAECcAABAnAAAAAAAAAAAAAAAAAAAAAAAAAAAAAAAAAAAAAAAAAAAAABQAAAAAAAAAwMD/AAAAAABkAAAAMgAAAAAAAABkAAAAAAAAAH9/fwAKAAAAHwAAAFQAAACQwiYF////AQAAAAAAAAAAAAAAAAAAAAAAAAAAAAAAAAAAAAAAAAAAAAAAAn9/fwAsPEMDzMzMAMDA/wB/f38AAAAAAAAAAAAAAAAAAAAAAAAAAAAhAAAAGAAAABQAAAAAAAAAsBgAAMMCAAAwKgAAAAAAACYAAAAIAAAA//////////8="/>
+                  <pr:smNativeData xmlns:pr="smNativeData" xmlns:p14="http://schemas.microsoft.com/office/powerpoint/2010/main" xmlns="" val="SMDATA_13_w78LXxMAAAAlAAAAagAAAA0AAAAAkAAAAJAAAACQAAAAkAAAAAAAAAABAAAAAAAAAAEAAABQAAAAAAAAAAAAAAAAAAAAAADgPwAAAAAAAOA/AAAAAAAA4D8AAAAAAADgPwAAAAAAAOA/AAAAAAAA4D8AAAAAAADgPwAAAAAAAOA/AAAAAAAA4D8CAAAAjAAAAAEAAAAAAAAAkMImDP///wgRAAAAAAAAAAAAAAAAAAAAAAAAAAAAAAAAAAAAeAAAAAEAAABAAAAAAAAAAAAAAABaAAAAAAAAAAAAAAAAAAAAAAAAAAAAAAAAAAAAAAAAAAAAAAAAAAAAAAAAAAAAAAAAAAAAAAAAAAAAAAAAAAAAAAAAAAAAAAAAAAAAFAAAADwAAAAAAAAAAAAAAAAAAAkUAAAAAQAAABQAAAAUAAAAFAAAAAEAAAAAAAAAZAAAAGQAAAAAAAAAZAAAAGQAAAAVAAAAYAAAAAAAAAAAAAAADwAAACADAAAAAAAAAAAAAAEAAACgMgAAVgcAAKr4//8BAAAAf39/AAEAAABkAAAAAAAAABQAAABAHwAAAAAAACYAAAAAAAAAwOD//wAAAAAmAAAAZAAAABYAAABMAAAAAAAAAAAAAAAEAAAAAAAAAAEAAAAsPEMKAAAAACgAAAAoAAAAZAAAAGQAAAAAAAAAzMzMAAAAAABQAAAAUAAAAGQAAABkAAAAAAAAABcAAAAUAAAAAAAAAAAAAAD/fwAA/38AAAAAAAAJAAAABAAAAAAAAAAMAAAAEAAAAAAAAAAAAAAAAAAAAAAAAAAeAAAAaAAAAAAAAAAAAAAAAAAAAAAAAAAAAAAAECcAABAnAAAAAAAAAAAAAAAAAAAAAAAAAAAAAAAAAAAAAAAAAAAAABQAAAAAAAAAwMD/AAAAAABkAAAAMgAAAAAAAABkAAAAAAAAAH9/fwAKAAAAHwAAAFQAAACQwiYF////AQAAAAAAAAAAAAAAAAAAAAAAAAAAAAAAAAAAAAAAAAAAAAAAAn9/fwAsPEMDzMzMAMDA/wB/f38AAAAAAAAAAAAAAAAAAAAAAAAAAAAhAAAAGAAAABQAAAAAAAAAsBgAAMMCAAAwKgAAAAAAACYAAAAIAAAA//////////8="/>
                 </a:ext>
               </a:extLst>
             </p:cNvSpPr>
@@ -22417,7 +22422,7 @@
             <a:spLocks noGrp="1" noChangeArrowheads="1"/>
             <a:extLst>
               <a:ext uri="smNativeData">
-                <pr:smNativeData xmlns="" xmlns:p14="http://schemas.microsoft.com/office/powerpoint/2010/main" xmlns:pr="smNativeData" val="SMDATA_13_w78LXxMAAAAlAAAAZAAAAA0AAAAAkAAAAJAAAACQAAAAkAAAAAAAAAAAAAAAAAAAAAEAAABQAAAAAAAAAAAA4D8AAAAAAADgPwAAAAAAAOA/AAAAAAAA4D8AAAAAAADgPwAAAAAAAOA/AAAAAAAA4D8AAAAAAADgPwAAAAAAAOA/AAAAAAAA4D8CAAAAjAAAAAAAAAAAAAAAkMImDP///wgAAAAAAAAAAAAAAAAAAAAAAAAAAAAAAAAAAAAAZAAAAAEAAABAAAAAAAAAAAAAAAAAAAAAAAAAAAAAAAAAAAAAAAAAAAAAAAAAAAAAAAAAAAAAAAAAAAAAAAAAAAAAAAAAAAAAAAAAAAAAAAAAAAAAAAAAAAAAAAAAAAAAFAAAADwAAAAAAAAAAAAAAAAAAAkUAAAAAQAAABQAAAAUAAAAFAAAAAEAAAAAAAAAZAAAAGQAAAAAAAAAZAAAAGQAAAAVAAAAYAAAAAAAAAAAAAAADwAAACADAAAAAAAAAAAAAAEAAACgMgAAVgcAAKr4//8BAAAAf39/AAEAAABkAAAAAAAAABQAAABAHwAAAAAAACYAAAAAAAAAwOD//wAAAAAmAAAAZAAAABYAAABMAAAAAAAAAAAAAAAEAAAAAAAAAAEAAAAsPEMKAAAAACgAAAAoAAAAZAAAAGQAAAAAAAAAzMzMAAAAAABQAAAAUAAAAGQAAABkAAAAAAAAABcAAAAUAAAAAAAAAAAAAAD/fwAA/38AAAAAAAAJAAAABAAAAAAAAAAMAAAAEAAAAAAAAAAAAAAAAAAAAAAAAAAeAAAAaAAAAAAAAAAAAAAAAAAAAAAAAAAAAAAAECcAABAnAAAAAAAAAAAAAAAAAAAAAAAAAAAAAAAAAAAAAAAAAAAAABQAAAAAAAAAwMD/AAAAAABkAAAAMgAAAAAAAABkAAAAAAAAAH9/fwAKAAAAHwAAAFQAAAAAAAAFAAAAAQAAAAAAAAAAAAAAAAAAAAAAAAAAAAAAAAAAAAAAAAAAAAAAAn9/fwAAAAADzMzMAMDA/wB/f38AAAAAAAAAAAAAAAAAAAAAAAAAAAAhAAAAGAAAABQAAAArBAAAwAMAAA05AADgCwAAEAAAACYAAAAIAAAAvZ8AAP8fAAA="/>
+                <pr:smNativeData xmlns:pr="smNativeData" xmlns:p14="http://schemas.microsoft.com/office/powerpoint/2010/main" xmlns="" val="SMDATA_13_w78LXxMAAAAlAAAAZAAAAA0AAAAAkAAAAJAAAACQAAAAkAAAAAAAAAAAAAAAAAAAAAEAAABQAAAAAAAAAAAA4D8AAAAAAADgPwAAAAAAAOA/AAAAAAAA4D8AAAAAAADgPwAAAAAAAOA/AAAAAAAA4D8AAAAAAADgPwAAAAAAAOA/AAAAAAAA4D8CAAAAjAAAAAAAAAAAAAAAkMImDP///wgAAAAAAAAAAAAAAAAAAAAAAAAAAAAAAAAAAAAAZAAAAAEAAABAAAAAAAAAAAAAAAAAAAAAAAAAAAAAAAAAAAAAAAAAAAAAAAAAAAAAAAAAAAAAAAAAAAAAAAAAAAAAAAAAAAAAAAAAAAAAAAAAAAAAAAAAAAAAAAAAAAAAFAAAADwAAAAAAAAAAAAAAAAAAAkUAAAAAQAAABQAAAAUAAAAFAAAAAEAAAAAAAAAZAAAAGQAAAAAAAAAZAAAAGQAAAAVAAAAYAAAAAAAAAAAAAAADwAAACADAAAAAAAAAAAAAAEAAACgMgAAVgcAAKr4//8BAAAAf39/AAEAAABkAAAAAAAAABQAAABAHwAAAAAAACYAAAAAAAAAwOD//wAAAAAmAAAAZAAAABYAAABMAAAAAAAAAAAAAAAEAAAAAAAAAAEAAAAsPEMKAAAAACgAAAAoAAAAZAAAAGQAAAAAAAAAzMzMAAAAAABQAAAAUAAAAGQAAABkAAAAAAAAABcAAAAUAAAAAAAAAAAAAAD/fwAA/38AAAAAAAAJAAAABAAAAAAAAAAMAAAAEAAAAAAAAAAAAAAAAAAAAAAAAAAeAAAAaAAAAAAAAAAAAAAAAAAAAAAAAAAAAAAAECcAABAnAAAAAAAAAAAAAAAAAAAAAAAAAAAAAAAAAAAAAAAAAAAAABQAAAAAAAAAwMD/AAAAAABkAAAAMgAAAAAAAABkAAAAAAAAAH9/fwAKAAAAHwAAAFQAAAAAAAAFAAAAAQAAAAAAAAAAAAAAAAAAAAAAAAAAAAAAAAAAAAAAAAAAAAAAAn9/fwAAAAADzMzMAMDA/wB/f38AAAAAAAAAAAAAAAAAAAAAAAAAAAAhAAAAGAAAABQAAAArBAAAwAMAAA05AADgCwAAEAAAACYAAAAIAAAAvZ8AAP8fAAA="/>
               </a:ext>
             </a:extLst>
           </p:cNvSpPr>
@@ -22587,7 +22592,7 @@
             <a:spLocks noGrp="1" noChangeArrowheads="1"/>
             <a:extLst>
               <a:ext uri="smNativeData">
-                <pr:smNativeData xmlns="" xmlns:p14="http://schemas.microsoft.com/office/powerpoint/2010/main" xmlns:pr="smNativeData" val="SMDATA_13_w78LXxMAAAAlAAAAZAAAAA0AAAAAkAAAAJAAAACQAAAAkAAAAAAAAAAAAAAAAAAAAAEAAABQAAAAAAAAAAAA4D8AAAAAAADgPwAAAAAAAOA/AAAAAAAA4D8AAAAAAADgPwAAAAAAAOA/AAAAAAAA4D8AAAAAAADgPwAAAAAAAOA/AAAAAAAA4D8CAAAAjAAAAAAAAAAAAAAAkMImDP///wgAAAAAAAAAAAAAAAAAAAAAAAAAAAAAAAAAAAAAZAAAAAEAAABAAAAAAAAAAAAAAAAAAAAAAAAAAAAAAAAAAAAAAAAAAAAAAAAAAAAAAAAAAAAAAAAAAAAAAAAAAAAAAAAAAAAAAAAAAAAAAAAAAAAAAAAAAAAAAAAAAAAAFAAAADwAAAAAAAAAAAAAAAAAAAkUAAAAAQAAABQAAAAUAAAAFAAAAAEAAAAAAAAAZAAAAGQAAAAAAAAAZAAAAGQAAAAVAAAAYAAAAAAAAAAAAAAADwAAACADAAAAAAAAAAAAAAEAAACgMgAAVgcAAKr4//8BAAAAf39/AAEAAABkAAAAAAAAABQAAABAHwAAAAAAACYAAAAAAAAAwOD//wAAAAAmAAAAZAAAABYAAABMAAAAAAAAAAAAAAAEAAAAAAAAAAEAAAAsPEMKAAAAACgAAAAoAAAAZAAAAGQAAAAAAAAAzMzMAAAAAABQAAAAUAAAAGQAAABkAAAAAAAAABcAAAAUAAAAAAAAAAAAAAD/fwAA/38AAAAAAAAJAAAABAAAAAAAAAAMAAAAEAAAAAAAAAAAAAAAAAAAAAAAAAAeAAAAaAAAAAAAAAAAAAAAAAAAAAAAAAAAAAAAECcAABAnAAAAAAAAAAAAAAAAAAAAAAAAAAAAAAAAAAAAAAAAAAAAABQAAAAAAAAAwMD/AAAAAABkAAAAMgAAAAAAAABkAAAAAAAAAH9/fwAKAAAAHwAAAFQAAAAAAAAFAAAAAQAAAAAAAAAAAAAAAAAAAAAAAAAAAAAAAAAAAAAAAAAAAAAAAn9/fwAAAAADzMzMAMDA/wB/f38AAAAAAAAAAAAAAAAAAAAAAAAAAAAhAAAAGAAAABQAAAArBAAASw0AAA05AAAqJQAAEAAAACYAAAAIAAAAvZ8AAP8fAAA="/>
+                <pr:smNativeData xmlns:pr="smNativeData" xmlns:p14="http://schemas.microsoft.com/office/powerpoint/2010/main" xmlns="" val="SMDATA_13_w78LXxMAAAAlAAAAZAAAAA0AAAAAkAAAAJAAAACQAAAAkAAAAAAAAAAAAAAAAAAAAAEAAABQAAAAAAAAAAAA4D8AAAAAAADgPwAAAAAAAOA/AAAAAAAA4D8AAAAAAADgPwAAAAAAAOA/AAAAAAAA4D8AAAAAAADgPwAAAAAAAOA/AAAAAAAA4D8CAAAAjAAAAAAAAAAAAAAAkMImDP///wgAAAAAAAAAAAAAAAAAAAAAAAAAAAAAAAAAAAAAZAAAAAEAAABAAAAAAAAAAAAAAAAAAAAAAAAAAAAAAAAAAAAAAAAAAAAAAAAAAAAAAAAAAAAAAAAAAAAAAAAAAAAAAAAAAAAAAAAAAAAAAAAAAAAAAAAAAAAAAAAAAAAAFAAAADwAAAAAAAAAAAAAAAAAAAkUAAAAAQAAABQAAAAUAAAAFAAAAAEAAAAAAAAAZAAAAGQAAAAAAAAAZAAAAGQAAAAVAAAAYAAAAAAAAAAAAAAADwAAACADAAAAAAAAAAAAAAEAAACgMgAAVgcAAKr4//8BAAAAf39/AAEAAABkAAAAAAAAABQAAABAHwAAAAAAACYAAAAAAAAAwOD//wAAAAAmAAAAZAAAABYAAABMAAAAAAAAAAAAAAAEAAAAAAAAAAEAAAAsPEMKAAAAACgAAAAoAAAAZAAAAGQAAAAAAAAAzMzMAAAAAABQAAAAUAAAAGQAAABkAAAAAAAAABcAAAAUAAAAAAAAAAAAAAD/fwAA/38AAAAAAAAJAAAABAAAAAAAAAAMAAAAEAAAAAAAAAAAAAAAAAAAAAAAAAAeAAAAaAAAAAAAAAAAAAAAAAAAAAAAAAAAAAAAECcAABAnAAAAAAAAAAAAAAAAAAAAAAAAAAAAAAAAAAAAAAAAAAAAABQAAAAAAAAAwMD/AAAAAABkAAAAMgAAAAAAAABkAAAAAAAAAH9/fwAKAAAAHwAAAFQAAAAAAAAFAAAAAQAAAAAAAAAAAAAAAAAAAAAAAAAAAAAAAAAAAAAAAAAAAAAAAn9/fwAAAAADzMzMAMDA/wB/f38AAAAAAAAAAAAAAAAAAAAAAAAAAAAhAAAAGAAAABQAAAArBAAASw0AAA05AAAqJQAAEAAAACYAAAAIAAAAvZ8AAP8fAAA="/>
               </a:ext>
             </a:extLst>
           </p:cNvSpPr>
@@ -22826,7 +22831,7 @@
             <a:spLocks noGrp="1" noChangeArrowheads="1"/>
             <a:extLst>
               <a:ext uri="smNativeData">
-                <pr:smNativeData xmlns="" xmlns:p14="http://schemas.microsoft.com/office/powerpoint/2010/main" xmlns:pr="smNativeData" val="SMDATA_13_w78LXxMAAAAlAAAAZAAAAA0AAAAAkAAAAJAAAACQAAAAkAAAAAAAAAABAAAAAAAAAAEAAABQAAAAAAAAAAAA4D8AAAAAAADgPwAAAAAAAOA/AAAAAAAA4D8AAAAAAADgPwAAAAAAAOA/AAAAAAAA4D8AAAAAAADgPwAAAAAAAOA/AAAAAAAA4D8CAAAAjAAAAAAAAAAAAAAAkMImDP///wgAAAAAAAAAAAAAAAAAAAAAAAAAAAAAAAAAAAAAZAAAAAEAAABAAAAAAAAAAAAAAAAAAAAAAAAAAAAAAAAAAAAAAAAAAAAAAAAAAAAAAAAAAAAAAAAAAAAAAAAAAAAAAAAAAAAAAAAAAAAAAAAAAAAAAAAAAAAAAAAAAAAAFAAAADwAAAAAAAAAAAAAAAAAAAkUAAAAAQAAABQAAAAUAAAAFAAAAAEAAAAAAAAAZAAAAGQAAAAAAAAAZAAAAGQAAAAVAAAAYAAAAAAAAAAAAAAADwAAACADAAAAAAAAAAAAAAEAAACgMgAAVgcAAKr4//8BAAAAf39/AAEAAABkAAAAAAAAABQAAABAHwAAAAAAACYAAAAAAAAAwOD//wAAAAAmAAAAZAAAABYAAABMAAAAAAAAAAAAAAAEAAAAAAAAAAEAAAAsPEMKAAAAACgAAAAoAAAAZAAAAGQAAAAAAAAAzMzMAAAAAABQAAAAUAAAAGQAAABkAAAAAAAAABcAAAAUAAAAAAAAAAAAAAD/fwAA/38AAAAAAAAJAAAABAAAAAAAAAAMAAAAEAAAAAAAAAAAAAAAAAAAAAAAAAAeAAAAaAAAAAAAAAAAAAAAAAAAAAAAAAAAAAAAECcAABAnAAAAAAAAAAAAAAAAAAAAAAAAAAAAAAAAAAAAAAAAAAAAABQAAAAAAAAAwMD/AAAAAABkAAAAMgAAAAAAAABkAAAAAAAAAH9/fwAKAAAAHwAAAFQAAAAAAAAFAAAAAQAAAAAAAAAAAAAAAAAAAAAAAAAAAAAAAAAAAAAAAAAAAAAAAn9/fwAAAAADzMzMAMDA/wB/f38AAAAAAAAAAAAAAAAAAAAAAAAAAAAhAAAAGAAAABQAAABTLAAAKiUAAO8xAABpJwAAEAAAACYAAAAIAAAAvZ8AAP8fAAA="/>
+                <pr:smNativeData xmlns:pr="smNativeData" xmlns:p14="http://schemas.microsoft.com/office/powerpoint/2010/main" xmlns="" val="SMDATA_13_w78LXxMAAAAlAAAAZAAAAA0AAAAAkAAAAJAAAACQAAAAkAAAAAAAAAABAAAAAAAAAAEAAABQAAAAAAAAAAAA4D8AAAAAAADgPwAAAAAAAOA/AAAAAAAA4D8AAAAAAADgPwAAAAAAAOA/AAAAAAAA4D8AAAAAAADgPwAAAAAAAOA/AAAAAAAA4D8CAAAAjAAAAAAAAAAAAAAAkMImDP///wgAAAAAAAAAAAAAAAAAAAAAAAAAAAAAAAAAAAAAZAAAAAEAAABAAAAAAAAAAAAAAAAAAAAAAAAAAAAAAAAAAAAAAAAAAAAAAAAAAAAAAAAAAAAAAAAAAAAAAAAAAAAAAAAAAAAAAAAAAAAAAAAAAAAAAAAAAAAAAAAAAAAAFAAAADwAAAAAAAAAAAAAAAAAAAkUAAAAAQAAABQAAAAUAAAAFAAAAAEAAAAAAAAAZAAAAGQAAAAAAAAAZAAAAGQAAAAVAAAAYAAAAAAAAAAAAAAADwAAACADAAAAAAAAAAAAAAEAAACgMgAAVgcAAKr4//8BAAAAf39/AAEAAABkAAAAAAAAABQAAABAHwAAAAAAACYAAAAAAAAAwOD//wAAAAAmAAAAZAAAABYAAABMAAAAAAAAAAAAAAAEAAAAAAAAAAEAAAAsPEMKAAAAACgAAAAoAAAAZAAAAGQAAAAAAAAAzMzMAAAAAABQAAAAUAAAAGQAAABkAAAAAAAAABcAAAAUAAAAAAAAAAAAAAD/fwAA/38AAAAAAAAJAAAABAAAAAAAAAAMAAAAEAAAAAAAAAAAAAAAAAAAAAAAAAAeAAAAaAAAAAAAAAAAAAAAAAAAAAAAAAAAAAAAECcAABAnAAAAAAAAAAAAAAAAAAAAAAAAAAAAAAAAAAAAAAAAAAAAABQAAAAAAAAAwMD/AAAAAABkAAAAMgAAAAAAAABkAAAAAAAAAH9/fwAKAAAAHwAAAFQAAAAAAAAFAAAAAQAAAAAAAAAAAAAAAAAAAAAAAAAAAAAAAAAAAAAAAAAAAAAAAn9/fwAAAAADzMzMAMDA/wB/f38AAAAAAAAAAAAAAAAAAAAAAAAAAAAhAAAAGAAAABQAAABTLAAAKiUAAO8xAABpJwAAEAAAACYAAAAIAAAAvZ8AAP8fAAA="/>
               </a:ext>
             </a:extLst>
           </p:cNvSpPr>
@@ -23020,7 +23025,7 @@
             <a:spLocks noGrp="1" noChangeArrowheads="1"/>
             <a:extLst>
               <a:ext uri="smNativeData">
-                <pr:smNativeData xmlns="" xmlns:p14="http://schemas.microsoft.com/office/powerpoint/2010/main" xmlns:pr="smNativeData" val="SMDATA_13_w78LXxMAAAAlAAAAZAAAAA0AAAAAkAAAAJAAAACQAAAAkAAAAAAAAAABAAAAAAAAAAEAAABQAAAAAAAAAAAA4D8AAAAAAADgPwAAAAAAAOA/AAAAAAAA4D8AAAAAAADgPwAAAAAAAOA/AAAAAAAA4D8AAAAAAADgPwAAAAAAAOA/AAAAAAAA4D8CAAAAjAAAAAAAAAAAAAAAkMImDP///wgAAAAAAAAAAAAAAAAAAAAAAAAAAAAAAAAAAAAAZAAAAAEAAABAAAAAAAAAAAAAAAAAAAAAAAAAAAAAAAAAAAAAAAAAAAAAAAAAAAAAAAAAAAAAAAAAAAAAAAAAAAAAAAAAAAAAAAAAAAAAAAAAAAAAAAAAAAAAAAAAAAAAFAAAADwAAAAAAAAAAAAAAAAAAAkUAAAAAQAAABQAAAAUAAAAFAAAAAEAAAAAAAAAZAAAAGQAAAAAAAAAZAAAAGQAAAAVAAAAYAAAAAAAAAAAAAAADwAAACADAAAAAAAAAAAAAAEAAACgMgAAVgcAAKr4//8BAAAAf39/AAEAAABkAAAAAAAAABQAAABAHwAAAAAAACYAAAAAAAAAwOD//wAAAAAmAAAAZAAAABYAAABMAAAAAAAAAAAAAAAEAAAAAAAAAAEAAAAsPEMKAAAAACgAAAAoAAAAZAAAAGQAAAAAAAAAzMzMAAAAAABQAAAAUAAAAGQAAABkAAAAAAAAABcAAAAUAAAAAAAAAAAAAAD/fwAA/38AAAAAAAAJAAAABAAAAAAAAAAMAAAAEAAAAAAAAAAAAAAAAAAAAAAAAAAeAAAAaAAAAAAAAAAAAAAAAAAAAAAAAAAAAAAAECcAABAnAAAAAAAAAAAAAAAAAAAAAAAAAAAAAAAAAAAAAAAAAAAAABQAAAAAAAAAwMD/AAAAAABkAAAAMgAAAAAAAABkAAAAAAAAAH9/fwAKAAAAHwAAAFQAAAAAAAAFAAAAAQAAAAAAAAAAAAAAAAAAAAAAAAAAAAAAAAAAAAAAAAAAAAAAAn9/fwAAAAADzMzMAMDA/wB/f38AAAAAAAAAAAAAAAAAAAAAAAAAAAAhAAAAGAAAABQAAAArBAAAKiUAAOgqAABpJwAAEAAAACYAAAAIAAAAvZ8AAP8fAAA="/>
+                <pr:smNativeData xmlns:pr="smNativeData" xmlns:p14="http://schemas.microsoft.com/office/powerpoint/2010/main" xmlns="" val="SMDATA_13_w78LXxMAAAAlAAAAZAAAAA0AAAAAkAAAAJAAAACQAAAAkAAAAAAAAAABAAAAAAAAAAEAAABQAAAAAAAAAAAA4D8AAAAAAADgPwAAAAAAAOA/AAAAAAAA4D8AAAAAAADgPwAAAAAAAOA/AAAAAAAA4D8AAAAAAADgPwAAAAAAAOA/AAAAAAAA4D8CAAAAjAAAAAAAAAAAAAAAkMImDP///wgAAAAAAAAAAAAAAAAAAAAAAAAAAAAAAAAAAAAAZAAAAAEAAABAAAAAAAAAAAAAAAAAAAAAAAAAAAAAAAAAAAAAAAAAAAAAAAAAAAAAAAAAAAAAAAAAAAAAAAAAAAAAAAAAAAAAAAAAAAAAAAAAAAAAAAAAAAAAAAAAAAAAFAAAADwAAAAAAAAAAAAAAAAAAAkUAAAAAQAAABQAAAAUAAAAFAAAAAEAAAAAAAAAZAAAAGQAAAAAAAAAZAAAAGQAAAAVAAAAYAAAAAAAAAAAAAAADwAAACADAAAAAAAAAAAAAAEAAACgMgAAVgcAAKr4//8BAAAAf39/AAEAAABkAAAAAAAAABQAAABAHwAAAAAAACYAAAAAAAAAwOD//wAAAAAmAAAAZAAAABYAAABMAAAAAAAAAAAAAAAEAAAAAAAAAAEAAAAsPEMKAAAAACgAAAAoAAAAZAAAAGQAAAAAAAAAzMzMAAAAAABQAAAAUAAAAGQAAABkAAAAAAAAABcAAAAUAAAAAAAAAAAAAAD/fwAA/38AAAAAAAAJAAAABAAAAAAAAAAMAAAAEAAAAAAAAAAAAAAAAAAAAAAAAAAeAAAAaAAAAAAAAAAAAAAAAAAAAAAAAAAAAAAAECcAABAnAAAAAAAAAAAAAAAAAAAAAAAAAAAAAAAAAAAAAAAAAAAAABQAAAAAAAAAwMD/AAAAAABkAAAAMgAAAAAAAABkAAAAAAAAAH9/fwAKAAAAHwAAAFQAAAAAAAAFAAAAAQAAAAAAAAAAAAAAAAAAAAAAAAAAAAAAAAAAAAAAAAAAAAAAAn9/fwAAAAADzMzMAMDA/wB/f38AAAAAAAAAAAAAAAAAAAAAAAAAAAAhAAAAGAAAABQAAAArBAAAKiUAAOgqAABpJwAAEAAAACYAAAAIAAAAvZ8AAP8fAAA="/>
               </a:ext>
             </a:extLst>
           </p:cNvSpPr>
@@ -23214,7 +23219,7 @@
             <a:spLocks noGrp="1" noChangeArrowheads="1"/>
             <a:extLst>
               <a:ext uri="smNativeData">
-                <pr:smNativeData xmlns="" xmlns:p14="http://schemas.microsoft.com/office/powerpoint/2010/main" xmlns:pr="smNativeData" val="SMDATA_13_w78LXxMAAAAlAAAAZAAAAA0AAAAAkAAAAEgAAACQAAAASAAAAAAAAAABAAAAAAAAAAEAAABQAAAAAAAAAAAA4D8AAAAAAADgPwAAAAAAAOA/AAAAAAAA4D8AAAAAAADgPwAAAAAAAOA/AAAAAAAA4D8AAAAAAADgPwAAAAAAAOA/AAAAAAAA4D8CAAAAjAAAAAAAAAAAAAAAkMImDP///wgAAAAAAAAAAAAAAAAAAAAAAAAAAAAAAAAAAAAAZAAAAAEAAABAAAAAAAAAAAAAAAAAAAAAAAAAAAAAAAAAAAAAAAAAAAAAAAAAAAAAAAAAAAAAAAAAAAAAAAAAAAAAAAAAAAAAAAAAAAAAAAAAAAAAAAAAAAAAAAAAAAAAFAAAADwAAAAAAAAAAAAAAAAAAAkUAAAAAQAAABQAAAAUAAAAFAAAAAEAAAAAAAAAZAAAAGQAAAAAAAAAZAAAAGQAAAAVAAAAYAAAAAAAAAAAAAAADwAAACADAAAAAAAAAAAAAAEAAACgMgAAVgcAAKr4//8BAAAAf39/AAEAAABkAAAAAAAAABQAAABAHwAAAAAAACYAAAAAAAAAwOD//wAAAAAmAAAAZAAAABYAAABMAAAAAAAAAAAAAAAEAAAAAAAAAAEAAAAsPEMKAAAAACgAAAAoAAAAZAAAAGQAAAAAAAAAzMzMAAAAAABQAAAAUAAAAGQAAABkAAAAAAAAABcAAAAUAAAAAAAAAAAAAAD/fwAA/38AAAAAAAAJAAAABAAAABAAAAAMAAAAEAAAAAAAAAAAAAAAAAAAAAAAAAAeAAAAaAAAAAAAAAAAAAAAAAAAAAAAAAAAAAAAECcAABAnAAAAAAAAAAAAAAAAAAAAAAAAAAAAAAAAAAAAAAAAAAAAABQAAAAAAAAAwMD/AAAAAABkAAAAMgAAAAAAAABkAAAAAAAAAH9/fwAKAAAAHwAAAFQAAAAAAAAFAAAAAQAAAAAAAAAAAAAAAAAAAAAAAAAAAAAAAAAAAAAAAAAAAAAAAn9/fwAAAAADzMzMAMDA/wB/f38AAAAAAAAAAAAAAAAAAAAAAAAAAAAhAAAAGAAAABQAAADZNAAAKiUAAA05AABpJwAAEAAAACYAAAAIAAAAvb8AAP8fAAA="/>
+                <pr:smNativeData xmlns:pr="smNativeData" xmlns:p14="http://schemas.microsoft.com/office/powerpoint/2010/main" xmlns="" val="SMDATA_13_w78LXxMAAAAlAAAAZAAAAA0AAAAAkAAAAEgAAACQAAAASAAAAAAAAAABAAAAAAAAAAEAAABQAAAAAAAAAAAA4D8AAAAAAADgPwAAAAAAAOA/AAAAAAAA4D8AAAAAAADgPwAAAAAAAOA/AAAAAAAA4D8AAAAAAADgPwAAAAAAAOA/AAAAAAAA4D8CAAAAjAAAAAAAAAAAAAAAkMImDP///wgAAAAAAAAAAAAAAAAAAAAAAAAAAAAAAAAAAAAAZAAAAAEAAABAAAAAAAAAAAAAAAAAAAAAAAAAAAAAAAAAAAAAAAAAAAAAAAAAAAAAAAAAAAAAAAAAAAAAAAAAAAAAAAAAAAAAAAAAAAAAAAAAAAAAAAAAAAAAAAAAAAAAFAAAADwAAAAAAAAAAAAAAAAAAAkUAAAAAQAAABQAAAAUAAAAFAAAAAEAAAAAAAAAZAAAAGQAAAAAAAAAZAAAAGQAAAAVAAAAYAAAAAAAAAAAAAAADwAAACADAAAAAAAAAAAAAAEAAACgMgAAVgcAAKr4//8BAAAAf39/AAEAAABkAAAAAAAAABQAAABAHwAAAAAAACYAAAAAAAAAwOD//wAAAAAmAAAAZAAAABYAAABMAAAAAAAAAAAAAAAEAAAAAAAAAAEAAAAsPEMKAAAAACgAAAAoAAAAZAAAAGQAAAAAAAAAzMzMAAAAAABQAAAAUAAAAGQAAABkAAAAAAAAABcAAAAUAAAAAAAAAAAAAAD/fwAA/38AAAAAAAAJAAAABAAAABAAAAAMAAAAEAAAAAAAAAAAAAAAAAAAAAAAAAAeAAAAaAAAAAAAAAAAAAAAAAAAAAAAAAAAAAAAECcAABAnAAAAAAAAAAAAAAAAAAAAAAAAAAAAAAAAAAAAAAAAAAAAABQAAAAAAAAAwMD/AAAAAABkAAAAMgAAAAAAAABkAAAAAAAAAH9/fwAKAAAAHwAAAFQAAAAAAAAFAAAAAQAAAAAAAAAAAAAAAAAAAAAAAAAAAAAAAAAAAAAAAAAAAAAAAn9/fwAAAAADzMzMAMDA/wB/f38AAAAAAAAAAAAAAAAAAAAAAAAAAAAhAAAAGAAAABQAAADZNAAAKiUAAA05AABpJwAAEAAAACYAAAAIAAAAvb8AAP8fAAA="/>
               </a:ext>
             </a:extLst>
           </p:cNvSpPr>
@@ -24032,7 +24037,7 @@
             <a:spLocks noGrp="1" noChangeArrowheads="1"/>
             <a:extLst>
               <a:ext uri="smNativeData">
-                <pr:smNativeData xmlns="" xmlns:p14="http://schemas.microsoft.com/office/powerpoint/2010/main" xmlns:pr="smNativeData" val="SMDATA_13_w78LXxMAAAAlAAAAZAAAAA0AAAAAkAAAAEgAAACQAAAASAAAAAAAAAACAAAAAAAAAAEAAABQAAAAAAAAAAAA4D8AAAAAAADgPwAAAAAAAOA/AAAAAAAA4D8AAAAAAADgPwAAAAAAAOA/AAAAAAAA4D8AAAAAAADgPwAAAAAAAOA/AAAAAAAA4D8CAAAAjAAAAAAAAAAAAAAAkMImDP///wgAAAAAAAAAAAAAAAAAAAAAAAAAAAAAAAAAAAAAZAAAAAEAAABAAAAAAAAAAAAAAAAAAAAAAAAAAAAAAAAAAAAAAAAAAAAAAAAAAAAAAAAAAAAAAAAAAAAAAAAAAAAAAAAAAAAAAAAAAAAAAAAAAAAAAAAAAAAAAAAAAAAAFAAAADwAAAAAAAAAAAAAAAAAAAkUAAAAAQAAABQAAAAUAAAAFAAAAAEAAAAAAAAAZAAAAGQAAAAAAAAAZAAAAGQAAAAVAAAAYAAAAAAAAAAAAAAADwAAACADAAAAAAAAAAAAAAEAAACgMgAAVgcAAKr4//8BAAAAf39/AAEAAABkAAAAAAAAABQAAABAHwAAAAAAACYAAAAAAAAAwOD//wAAAAAmAAAAZAAAABYAAABMAAAAAAAAAAAAAAAEAAAAAAAAAAEAAAAsPEMKAAAAACgAAAAoAAAAZAAAAGQAAAAAAAAAzMzMAAAAAABQAAAAUAAAAGQAAABkAAAAAAAAABcAAAAUAAAAAAAAAAAAAAD/fwAA/38AAAAAAAAJAAAABAAAAAAAAAAMAAAAEAAAAAAAAAAAAAAAAAAAAAAAAAAeAAAAaAAAAAAAAAAAAAAAAAAAAAAAAAAAAAAAECcAABAnAAAAAAAAAAAAAAAAAAAAAAAAAAAAAAAAAAAAAAAAAAAAABQAAAAAAAAAwMD/AAAAAABkAAAAMgAAAAAAAABkAAAAAAAAAH9/fwAKAAAAHwAAAFQAAACQwiYF////AQAAAAAAAAAAAAAAAAAAAAAAAAAAAAAAAAAAAAAAAAAAAAAAAn9/fwAsPEMDzMzMAMDA/wB/f38AAAAAAAAAAAAAAAAAAAAAAAAAAAAhAAAAGAAAABQAAAC9CQAAQw8AAIU5AABjGQAAEAAAACYAAAAIAAAAPTAAAP8fAAA="/>
+                <pr:smNativeData xmlns:pr="smNativeData" xmlns:p14="http://schemas.microsoft.com/office/powerpoint/2010/main" xmlns="" val="SMDATA_13_w78LXxMAAAAlAAAAZAAAAA0AAAAAkAAAAEgAAACQAAAASAAAAAAAAAACAAAAAAAAAAEAAABQAAAAAAAAAAAA4D8AAAAAAADgPwAAAAAAAOA/AAAAAAAA4D8AAAAAAADgPwAAAAAAAOA/AAAAAAAA4D8AAAAAAADgPwAAAAAAAOA/AAAAAAAA4D8CAAAAjAAAAAAAAAAAAAAAkMImDP///wgAAAAAAAAAAAAAAAAAAAAAAAAAAAAAAAAAAAAAZAAAAAEAAABAAAAAAAAAAAAAAAAAAAAAAAAAAAAAAAAAAAAAAAAAAAAAAAAAAAAAAAAAAAAAAAAAAAAAAAAAAAAAAAAAAAAAAAAAAAAAAAAAAAAAAAAAAAAAAAAAAAAAFAAAADwAAAAAAAAAAAAAAAAAAAkUAAAAAQAAABQAAAAUAAAAFAAAAAEAAAAAAAAAZAAAAGQAAAAAAAAAZAAAAGQAAAAVAAAAYAAAAAAAAAAAAAAADwAAACADAAAAAAAAAAAAAAEAAACgMgAAVgcAAKr4//8BAAAAf39/AAEAAABkAAAAAAAAABQAAABAHwAAAAAAACYAAAAAAAAAwOD//wAAAAAmAAAAZAAAABYAAABMAAAAAAAAAAAAAAAEAAAAAAAAAAEAAAAsPEMKAAAAACgAAAAoAAAAZAAAAGQAAAAAAAAAzMzMAAAAAABQAAAAUAAAAGQAAABkAAAAAAAAABcAAAAUAAAAAAAAAAAAAAD/fwAA/38AAAAAAAAJAAAABAAAAAAAAAAMAAAAEAAAAAAAAAAAAAAAAAAAAAAAAAAeAAAAaAAAAAAAAAAAAAAAAAAAAAAAAAAAAAAAECcAABAnAAAAAAAAAAAAAAAAAAAAAAAAAAAAAAAAAAAAAAAAAAAAABQAAAAAAAAAwMD/AAAAAABkAAAAMgAAAAAAAABkAAAAAAAAAH9/fwAKAAAAHwAAAFQAAACQwiYF////AQAAAAAAAAAAAAAAAAAAAAAAAAAAAAAAAAAAAAAAAAAAAAAAAn9/fwAsPEMDzMzMAMDA/wB/f38AAAAAAAAAAAAAAAAAAAAAAAAAAAAhAAAAGAAAABQAAAC9CQAAQw8AAIU5AABjGQAAEAAAACYAAAAIAAAAPTAAAP8fAAA="/>
               </a:ext>
             </a:extLst>
           </p:cNvSpPr>
@@ -24081,7 +24086,7 @@
             <a:spLocks noGrp="1" noChangeArrowheads="1"/>
             <a:extLst>
               <a:ext uri="smNativeData">
-                <pr:smNativeData xmlns="" xmlns:p14="http://schemas.microsoft.com/office/powerpoint/2010/main" xmlns:pr="smNativeData" val="SMDATA_13_w78LXxMAAAAlAAAAZAAAAA0AAAAAkAAAAEgAAACQAAAASAAAAAAAAAAAAAAAAAAAAAEAAABQAAAAAAAAAAAA4D8AAAAAAADgPwAAAAAAAOA/AAAAAAAA4D8AAAAAAADgPwAAAAAAAOA/AAAAAAAA4D8AAAAAAADgPwAAAAAAAOA/AAAAAAAA4D8CAAAAjAAAAAAAAAAAAAAAkMImDP///wgAAAAAAAAAAAAAAAAAAAAAAAAAAAAAAAAAAAAAZAAAAAEAAABAAAAAAAAAAAAAAAAAAAAAAAAAAAAAAAAAAAAAAAAAAAAAAAAAAAAAAAAAAAAAAAAAAAAAAAAAAAAAAAAAAAAAAAAAAAAAAAAAAAAAAAAAAAAAAAAAAAAAFAAAADwAAAAAAAAAAAAAAAAAAAkUAAAAAQAAABQAAAAUAAAAFAAAAAEAAAAAAAAAZAAAAGQAAAAAAAAAZAAAAGQAAAAVAAAAYAAAAAAAAAAAAAAADwAAACADAAAAAAAAAAAAAAEAAACgMgAAVgcAAKr4//8BAAAAf39/AAEAAABkAAAAAAAAABQAAABAHwAAAAAAACYAAAAAAAAAwOD//wAAAAAmAAAAZAAAABYAAABMAAAAAAAAAAAAAAAEAAAAAAAAAAEAAAAsPEMKAAAAACgAAAAoAAAAZAAAAGQAAAAAAAAAzMzMAAAAAABQAAAAUAAAAGQAAABkAAAAAAAAABcAAAAUAAAAAAAAAAAAAAD/fwAA/38AAAAAAAAJAAAABAAAAAAAAAAMAAAAEAAAAAAAAAAAAAAAAAAAAAAAAAAeAAAAaAAAAAAAAAAAAAAAAAAAAAAAAAAAAAAAECcAABAnAAAAAAAAAAAAAAAAAAAAAAAAAAAAAAAAAAAAAAAAAAAAABQAAAAAAAAAwMD/AAAAAABkAAAAMgAAAAAAAABkAAAAAAAAAH9/fwAKAAAAHwAAAFQAAACQwiYF////AQAAAAAAAAAAAAAAAAAAAAAAAAAAAAAAAAAAAAAAAAAAAAAAAn9/fwAsPEMDzMzMAMDA/wB/f38AAAAAAAAAAAAAAAAAAAAAAAAAAAAhAAAAGAAAABQAAABFCQAA6xgAAA05AACrHwAAEAAAACYAAAAIAAAAPDAAAP8fAAA="/>
+                <pr:smNativeData xmlns:pr="smNativeData" xmlns:p14="http://schemas.microsoft.com/office/powerpoint/2010/main" xmlns="" val="SMDATA_13_w78LXxMAAAAlAAAAZAAAAA0AAAAAkAAAAEgAAACQAAAASAAAAAAAAAAAAAAAAAAAAAEAAABQAAAAAAAAAAAA4D8AAAAAAADgPwAAAAAAAOA/AAAAAAAA4D8AAAAAAADgPwAAAAAAAOA/AAAAAAAA4D8AAAAAAADgPwAAAAAAAOA/AAAAAAAA4D8CAAAAjAAAAAAAAAAAAAAAkMImDP///wgAAAAAAAAAAAAAAAAAAAAAAAAAAAAAAAAAAAAAZAAAAAEAAABAAAAAAAAAAAAAAAAAAAAAAAAAAAAAAAAAAAAAAAAAAAAAAAAAAAAAAAAAAAAAAAAAAAAAAAAAAAAAAAAAAAAAAAAAAAAAAAAAAAAAAAAAAAAAAAAAAAAAFAAAADwAAAAAAAAAAAAAAAAAAAkUAAAAAQAAABQAAAAUAAAAFAAAAAEAAAAAAAAAZAAAAGQAAAAAAAAAZAAAAGQAAAAVAAAAYAAAAAAAAAAAAAAADwAAACADAAAAAAAAAAAAAAEAAACgMgAAVgcAAKr4//8BAAAAf39/AAEAAABkAAAAAAAAABQAAABAHwAAAAAAACYAAAAAAAAAwOD//wAAAAAmAAAAZAAAABYAAABMAAAAAAAAAAAAAAAEAAAAAAAAAAEAAAAsPEMKAAAAACgAAAAoAAAAZAAAAGQAAAAAAAAAzMzMAAAAAABQAAAAUAAAAGQAAABkAAAAAAAAABcAAAAUAAAAAAAAAAAAAAD/fwAA/38AAAAAAAAJAAAABAAAAAAAAAAMAAAAEAAAAAAAAAAAAAAAAAAAAAAAAAAeAAAAaAAAAAAAAAAAAAAAAAAAAAAAAAAAAAAAECcAABAnAAAAAAAAAAAAAAAAAAAAAAAAAAAAAAAAAAAAAAAAAAAAABQAAAAAAAAAwMD/AAAAAABkAAAAMgAAAAAAAABkAAAAAAAAAH9/fwAKAAAAHwAAAFQAAACQwiYF////AQAAAAAAAAAAAAAAAAAAAAAAAAAAAAAAAAAAAAAAAAAAAAAAAn9/fwAsPEMDzMzMAMDA/wB/f38AAAAAAAAAAAAAAAAAAAAAAAAAAAAhAAAAGAAAABQAAABFCQAA6xgAAA05AACrHwAAEAAAACYAAAAIAAAAPDAAAP8fAAA="/>
               </a:ext>
             </a:extLst>
           </p:cNvSpPr>
@@ -24125,7 +24130,7 @@
           <p:cNvPicPr>
             <a:extLst>
               <a:ext uri="smNativeData">
-                <pr:smNativeData xmlns="" xmlns:p14="http://schemas.microsoft.com/office/powerpoint/2010/main" xmlns:pr="smNativeData" val="SMDATA_15_w78LXxMAAAAlAAAAEQAAAA0AAAAAkAAAAEgAAACQAAAASAAAAAAAAAAAAAAAAAAAAAEAAABQAAAAAAAAAAAA4D8AAAAAAADgPwAAAAAAAOA/AAAAAAAA4D8AAAAAAADgPwAAAAAAAOA/AAAAAAAA4D8AAAAAAADgPwAAAAAAAOA/AAAAAAAA4D8CAAAAjAAAAAAAAAAAAAAAkMImDP///wgAAAAAAAAAAAAAAAAAAAAAAAAAAAAAAAAAAAAAZAAAAAEAAABAAAAAAAAAAAAAAAAAAAAAAAAAAAAAAAAAAAAAAAAAAAAAAAAAAAAAAAAAAAAAAAAAAAAAAAAAAAAAAAAAAAAAAAAAAAAAAAAAAAAAAAAAAAAAAAAAAAAAFAAAADwAAAAAAAAAAAAAAAAAAAkUAAAAAQAAABQAAAAUAAAAFAAAAAEAAAAAAAAAZAAAAGQAAAAAAAAAZAAAAGQAAAAVAAAAYAAAAAAAAAAAAAAADwAAACADAAAAAAAAAAAAAAEAAACgMgAAVgcAAKr4//8BAAAAf39/AAEAAABkAAAAAAAAABQAAABAHwAAAAAAACYAAAAAAAAAwOD//wAAAAAmAAAAZAAAABYAAABMAAAAAAAAAAAAAAAEAAAAAAAAAAEAAAAsPEMKAAAAACgAAAAoAAAAZAAAAGQAAAAAAAAAzMzMAAAAAABQAAAAUAAAAGQAAABkAAAAAAAAAAcAAAA4AAAAAAAAAAAAAAAAAAAA////AAAAAAAAAAAAAAAAAAAAAAAAAAAAAAAAAAAAAABkAAAAZAAAAAAAAAAjAAAABAAAAGQAAAAXAAAAFAAAAAAAAAAAAAAA/38AAP9/AAAAAAAACQAAAAQAAAAKAAoADAAAABAAAAAAAAAAAAAAAAAAAAAAAAAAHgAAAGgAAAAAAAAAAAAAAAAAAAAAAAAAAAAAABAnAAAQJwAAAAAAAAAAAAAAAAAAAAAAAAAAAAAAAAAAAAAAAAAAAAAUAAAAAAAAAMDA/wAAAAAAZAAAADIAAAAAAAAAZAAAAAAAAAB/f38ACgAAAB8AAABUAAAAkMImBf///wEAAAAAAAAAAAAAAAAAAAAAAAAAAAAAAAAAAAAAAAAAAAAAAAJ/f38ALDxDA8zMzADAwP8Af39/AAAAAAAAAAAAAAAAAP///wAAAAAAIQAAABgAAAAUAAAANi4AAAsIAAANOQAASxMAABAAAAAmAAAACAAAAP//////////"/>
+                <pr:smNativeData xmlns:pr="smNativeData" xmlns:p14="http://schemas.microsoft.com/office/powerpoint/2010/main" xmlns="" val="SMDATA_15_w78LXxMAAAAlAAAAEQAAAA0AAAAAkAAAAEgAAACQAAAASAAAAAAAAAAAAAAAAAAAAAEAAABQAAAAAAAAAAAA4D8AAAAAAADgPwAAAAAAAOA/AAAAAAAA4D8AAAAAAADgPwAAAAAAAOA/AAAAAAAA4D8AAAAAAADgPwAAAAAAAOA/AAAAAAAA4D8CAAAAjAAAAAAAAAAAAAAAkMImDP///wgAAAAAAAAAAAAAAAAAAAAAAAAAAAAAAAAAAAAAZAAAAAEAAABAAAAAAAAAAAAAAAAAAAAAAAAAAAAAAAAAAAAAAAAAAAAAAAAAAAAAAAAAAAAAAAAAAAAAAAAAAAAAAAAAAAAAAAAAAAAAAAAAAAAAAAAAAAAAAAAAAAAAFAAAADwAAAAAAAAAAAAAAAAAAAkUAAAAAQAAABQAAAAUAAAAFAAAAAEAAAAAAAAAZAAAAGQAAAAAAAAAZAAAAGQAAAAVAAAAYAAAAAAAAAAAAAAADwAAACADAAAAAAAAAAAAAAEAAACgMgAAVgcAAKr4//8BAAAAf39/AAEAAABkAAAAAAAAABQAAABAHwAAAAAAACYAAAAAAAAAwOD//wAAAAAmAAAAZAAAABYAAABMAAAAAAAAAAAAAAAEAAAAAAAAAAEAAAAsPEMKAAAAACgAAAAoAAAAZAAAAGQAAAAAAAAAzMzMAAAAAABQAAAAUAAAAGQAAABkAAAAAAAAAAcAAAA4AAAAAAAAAAAAAAAAAAAA////AAAAAAAAAAAAAAAAAAAAAAAAAAAAAAAAAAAAAABkAAAAZAAAAAAAAAAjAAAABAAAAGQAAAAXAAAAFAAAAAAAAAAAAAAA/38AAP9/AAAAAAAACQAAAAQAAAAKAAoADAAAABAAAAAAAAAAAAAAAAAAAAAAAAAAHgAAAGgAAAAAAAAAAAAAAAAAAAAAAAAAAAAAABAnAAAQJwAAAAAAAAAAAAAAAAAAAAAAAAAAAAAAAAAAAAAAAAAAAAAUAAAAAAAAAMDA/wAAAAAAZAAAADIAAAAAAAAAZAAAAAAAAAB/f38ACgAAAB8AAABUAAAAkMImBf///wEAAAAAAAAAAAAAAAAAAAAAAAAAAAAAAAAAAAAAAAAAAAAAAAJ/f38ALDxDA8zMzADAwP8Af39/AAAAAAAAAAAAAAAAAP///wAAAAAAIQAAABgAAAAUAAAANi4AAAsIAAANOQAASxMAABAAAAAmAAAACAAAAP//////////"/>
               </a:ext>
             </a:extLst>
           </p:cNvPicPr>
@@ -24184,7 +24189,7 @@
             <a:spLocks noGrp="1" noChangeArrowheads="1"/>
             <a:extLst>
               <a:ext uri="smNativeData">
-                <pr:smNativeData xmlns="" xmlns:p14="http://schemas.microsoft.com/office/powerpoint/2010/main" xmlns:pr="smNativeData" val="SMDATA_13_w78LXxMAAAAlAAAAZAAAAA0AAAAAkAAAAJAAAACQAAAAkAAAAAAAAAAAAAAAAAAAAAEAAABQAAAAAAAAAAAA4D8AAAAAAADgPwAAAAAAAOA/AAAAAAAA4D8AAAAAAADgPwAAAAAAAOA/AAAAAAAA4D8AAAAAAADgPwAAAAAAAOA/AAAAAAAA4D8CAAAAjAAAAAAAAAAAAAAAkMImDP///wgAAAAAAAAAAAAAAAAAAAAAAAAAAAAAAAAAAAAAZAAAAAEAAABAAAAAAAAAAAAAAAAAAAAAAAAAAAAAAAAAAAAAAAAAAAAAAAAAAAAAAAAAAAAAAAAAAAAAAAAAAAAAAAAAAAAAAAAAAAAAAAAAAAAAAAAAAAAAAAAAAAAAFAAAADwAAAAAAAAAAAAAAAAAAAkUAAAAAQAAABQAAAAUAAAAFAAAAAEAAAAAAAAAZAAAAGQAAAAAAAAAZAAAAGQAAAAVAAAAYAAAAAAAAAAAAAAADwAAACADAAAAAAAAAAAAAAEAAACgMgAAVgcAAKr4//8BAAAAf39/AAEAAABkAAAAAAAAABQAAABAHwAAAAAAACYAAAAAAAAAwOD//wAAAAAmAAAAZAAAABYAAABMAAAAAAAAAAAAAAAEAAAAAAAAAAEAAAAsPEMKAAAAACgAAAAoAAAAZAAAAGQAAAAAAAAAzMzMAAAAAABQAAAAUAAAAGQAAABkAAAAAAAAABcAAAAUAAAAAAAAAAAAAAD/fwAA/38AAAAAAAAJAAAABAAAAAAAAAAMAAAAEAAAAAAAAAAAAAAAAAAAAAAAAAAeAAAAaAAAAAAAAAAAAAAAAAAAAAAAAAAAAAAAECcAABAnAAAAAAAAAAAAAAAAAAAAAAAAAAAAAAAAAAAAAAAAAAAAABQAAAAAAAAAwMD/AAAAAABkAAAAMgAAAAAAAABkAAAAAAAAAH9/fwAKAAAAHwAAAFQAAACQwiYF////AQAAAAAAAAAAAAAAAAAAAAAAAAAAAAAAAAAAAAAAAAAAAAAAAn9/fwAsPEMDzMzMAMDA/wB/f38AAAAAAAAAAAAAAAAAAAAAAAAAAAAhAAAAGAAAABQAAAArBAAAwAMAAA05AADgCwAAEAAAACYAAAAIAAAAAAAAAAAAAAA="/>
+                <pr:smNativeData xmlns:pr="smNativeData" xmlns:p14="http://schemas.microsoft.com/office/powerpoint/2010/main" xmlns="" val="SMDATA_13_w78LXxMAAAAlAAAAZAAAAA0AAAAAkAAAAJAAAACQAAAAkAAAAAAAAAAAAAAAAAAAAAEAAABQAAAAAAAAAAAA4D8AAAAAAADgPwAAAAAAAOA/AAAAAAAA4D8AAAAAAADgPwAAAAAAAOA/AAAAAAAA4D8AAAAAAADgPwAAAAAAAOA/AAAAAAAA4D8CAAAAjAAAAAAAAAAAAAAAkMImDP///wgAAAAAAAAAAAAAAAAAAAAAAAAAAAAAAAAAAAAAZAAAAAEAAABAAAAAAAAAAAAAAAAAAAAAAAAAAAAAAAAAAAAAAAAAAAAAAAAAAAAAAAAAAAAAAAAAAAAAAAAAAAAAAAAAAAAAAAAAAAAAAAAAAAAAAAAAAAAAAAAAAAAAFAAAADwAAAAAAAAAAAAAAAAAAAkUAAAAAQAAABQAAAAUAAAAFAAAAAEAAAAAAAAAZAAAAGQAAAAAAAAAZAAAAGQAAAAVAAAAYAAAAAAAAAAAAAAADwAAACADAAAAAAAAAAAAAAEAAACgMgAAVgcAAKr4//8BAAAAf39/AAEAAABkAAAAAAAAABQAAABAHwAAAAAAACYAAAAAAAAAwOD//wAAAAAmAAAAZAAAABYAAABMAAAAAAAAAAAAAAAEAAAAAAAAAAEAAAAsPEMKAAAAACgAAAAoAAAAZAAAAGQAAAAAAAAAzMzMAAAAAABQAAAAUAAAAGQAAABkAAAAAAAAABcAAAAUAAAAAAAAAAAAAAD/fwAA/38AAAAAAAAJAAAABAAAAAAAAAAMAAAAEAAAAAAAAAAAAAAAAAAAAAAAAAAeAAAAaAAAAAAAAAAAAAAAAAAAAAAAAAAAAAAAECcAABAnAAAAAAAAAAAAAAAAAAAAAAAAAAAAAAAAAAAAAAAAAAAAABQAAAAAAAAAwMD/AAAAAABkAAAAMgAAAAAAAABkAAAAAAAAAH9/fwAKAAAAHwAAAFQAAACQwiYF////AQAAAAAAAAAAAAAAAAAAAAAAAAAAAAAAAAAAAAAAAAAAAAAAAn9/fwAsPEMDzMzMAMDA/wB/f38AAAAAAAAAAAAAAAAAAAAAAAAAAAAhAAAAGAAAABQAAAArBAAAwAMAAA05AADgCwAAEAAAACYAAAAIAAAAAAAAAAAAAAA="/>
               </a:ext>
             </a:extLst>
           </p:cNvSpPr>
@@ -24211,7 +24216,7 @@
             <a:spLocks noGrp="1" noChangeArrowheads="1"/>
             <a:extLst>
               <a:ext uri="smNativeData">
-                <pr:smNativeData xmlns="" xmlns:p14="http://schemas.microsoft.com/office/powerpoint/2010/main" xmlns:pr="smNativeData" val="SMDATA_13_w78LXxMAAAAlAAAAZAAAAA0AAAAAkAAAAJAAAACQAAAAkAAAAAAAAAAAAAAAAAAAAAEAAABQAAAAAAAAAAAA4D8AAAAAAADgPwAAAAAAAOA/AAAAAAAA4D8AAAAAAADgPwAAAAAAAOA/AAAAAAAA4D8AAAAAAADgPwAAAAAAAOA/AAAAAAAA4D8CAAAAjAAAAAAAAAAAAAAAkMImDP///wgAAAAAAAAAAAAAAAAAAAAAAAAAAAAAAAAAAAAAZAAAAAEAAABAAAAAAAAAAAAAAAAAAAAAAAAAAAAAAAAAAAAAAAAAAAAAAAAAAAAAAAAAAAAAAAAAAAAAAAAAAAAAAAAAAAAAAAAAAAAAAAAAAAAAAAAAAAAAAAAAAAAAFAAAADwAAAAAAAAAAAAAAAAAAAkUAAAAAQAAABQAAAAUAAAAFAAAAAEAAAAAAAAAZAAAAGQAAAAAAAAAZAAAAGQAAAAVAAAAYAAAAAAAAAAAAAAADwAAACADAAAAAAAAAAAAAAEAAACgMgAAVgcAAKr4//8BAAAAf39/AAEAAABkAAAAAAAAABQAAABAHwAAAAAAACYAAAAAAAAAwOD//wAAAAAmAAAAZAAAABYAAABMAAAAAAAAAAAAAAAEAAAAAAAAAAEAAAAsPEMKAAAAACgAAAAoAAAAZAAAAGQAAAAAAAAAzMzMAAAAAABQAAAAUAAAAGQAAABkAAAAAAAAABcAAAAUAAAAAAAAAAAAAAD/fwAA/38AAAAAAAAJAAAABAAAAAAAAAAMAAAAEAAAAAAAAAAAAAAAAAAAAAAAAAAeAAAAaAAAAAAAAAAAAAAAAAAAAAAAAAAAAAAAECcAABAnAAAAAAAAAAAAAAAAAAAAAAAAAAAAAAAAAAAAAAAAAAAAABQAAAAAAAAAwMD/AAAAAABkAAAAMgAAAAAAAABkAAAAAAAAAH9/fwAKAAAAHwAAAFQAAACQwiYF////AQAAAAAAAAAAAAAAAAAAAAAAAAAAAAAAAAAAAAAAAAAAAAAAAn9/fwAsPEMDzMzMAMDA/wB/f38AAAAAAAAAAAAAAAAAAAAAAAAAAAAhAAAAGAAAABQAAAArBAAASw0AAA05AAAqJQAAEAAAACYAAAAIAAAAAAAAAAAAAAA="/>
+                <pr:smNativeData xmlns:pr="smNativeData" xmlns:p14="http://schemas.microsoft.com/office/powerpoint/2010/main" xmlns="" val="SMDATA_13_w78LXxMAAAAlAAAAZAAAAA0AAAAAkAAAAJAAAACQAAAAkAAAAAAAAAAAAAAAAAAAAAEAAABQAAAAAAAAAAAA4D8AAAAAAADgPwAAAAAAAOA/AAAAAAAA4D8AAAAAAADgPwAAAAAAAOA/AAAAAAAA4D8AAAAAAADgPwAAAAAAAOA/AAAAAAAA4D8CAAAAjAAAAAAAAAAAAAAAkMImDP///wgAAAAAAAAAAAAAAAAAAAAAAAAAAAAAAAAAAAAAZAAAAAEAAABAAAAAAAAAAAAAAAAAAAAAAAAAAAAAAAAAAAAAAAAAAAAAAAAAAAAAAAAAAAAAAAAAAAAAAAAAAAAAAAAAAAAAAAAAAAAAAAAAAAAAAAAAAAAAAAAAAAAAFAAAADwAAAAAAAAAAAAAAAAAAAkUAAAAAQAAABQAAAAUAAAAFAAAAAEAAAAAAAAAZAAAAGQAAAAAAAAAZAAAAGQAAAAVAAAAYAAAAAAAAAAAAAAADwAAACADAAAAAAAAAAAAAAEAAACgMgAAVgcAAKr4//8BAAAAf39/AAEAAABkAAAAAAAAABQAAABAHwAAAAAAACYAAAAAAAAAwOD//wAAAAAmAAAAZAAAABYAAABMAAAAAAAAAAAAAAAEAAAAAAAAAAEAAAAsPEMKAAAAACgAAAAoAAAAZAAAAGQAAAAAAAAAzMzMAAAAAABQAAAAUAAAAGQAAABkAAAAAAAAABcAAAAUAAAAAAAAAAAAAAD/fwAA/38AAAAAAAAJAAAABAAAAAAAAAAMAAAAEAAAAAAAAAAAAAAAAAAAAAAAAAAeAAAAaAAAAAAAAAAAAAAAAAAAAAAAAAAAAAAAECcAABAnAAAAAAAAAAAAAAAAAAAAAAAAAAAAAAAAAAAAAAAAAAAAABQAAAAAAAAAwMD/AAAAAABkAAAAMgAAAAAAAABkAAAAAAAAAH9/fwAKAAAAHwAAAFQAAACQwiYF////AQAAAAAAAAAAAAAAAAAAAAAAAAAAAAAAAAAAAAAAAAAAAAAAAn9/fwAsPEMDzMzMAMDA/wB/f38AAAAAAAAAAAAAAAAAAAAAAAAAAAAhAAAAGAAAABQAAAArBAAASw0AAA05AAAqJQAAEAAAACYAAAAIAAAAAAAAAAAAAAA="/>
               </a:ext>
             </a:extLst>
           </p:cNvSpPr>
@@ -24295,7 +24300,7 @@
             <a:picLocks noChangeAspect="1"/>
             <a:extLst>
               <a:ext uri="smNativeData">
-                <pr:smNativeData xmlns="" xmlns:p14="http://schemas.microsoft.com/office/powerpoint/2010/main" xmlns:pr="smNativeData" val="SMDATA_15_w78LXxMAAAAlAAAAEQAAAC0AAAAAkAAAAEgAAACQAAAASAAAAAAAAAAAAAAAAAAAAAEAAABQAAAAAAAAAAAA4D8AAAAAAADgPwAAAAAAAOA/AAAAAAAA4D8AAAAAAADgPwAAAAAAAOA/AAAAAAAA4D8AAAAAAADgPwAAAAAAAOA/AAAAAAAA4D8CAAAAjAAAAAAAAAAAAAAAkMImDP///wgAAAAAAAAAAAAAAAAAAAAAAAAAAAAAAAAAAAAAZAAAAAEAAABAAAAAAAAAAAAAAAAAAAAAAAAAAAAAAAAAAAAAAAAAAAAAAAAAAAAAAAAAAAAAAAAAAAAAAAAAAAAAAAAAAAAAAAAAAAAAAAAAAAAAAAAAAAAAAAAAAAAAFAAAADwAAAAAAAAAAAAAAAAAAAkUAAAAAQAAABQAAAAUAAAAFAAAAAEAAAAAAAAAZAAAAGQAAAAAAAAAZAAAAGQAAAAVAAAAYAAAAAAAAAAAAAAADwAAACADAAAAAAAAAAAAAAEAAACgMgAAVgcAAKr4//8BAAAAf39/AAEAAABkAAAAAAAAABQAAABAHwAAAAAAACYAAAAAAAAAwOD//wAAAAAmAAAAZAAAABYAAABMAAAAAAAAAAAAAAAEAAAAAAAAAAEAAAAsPEMKAAAAACgAAAAoAAAAZAAAAGQAAAAAAAAAzMzMAAAAAABQAAAAUAAAAGQAAABkAAAAAAAAAAcAAAA4AAAAAAAAAAAAAAAAAAAA////AAAAAAAAAAAAAAAAAAAAAAAAAAAAAAAAAAAAAABkAAAAZAAAAAAAAAAjAAAABAAAAGQAAAAXAAAAFAAAAAAAAAAAAAAA/38AAP9/AAAAAAAACQAAAAQAAADo8ejhDAAAABAAAAAAAAAAAAAAAAAAAAAAAAAAHgAAAGgAAAAAAAAAAAAAAAAAAAAAAAAAAAAAABAnAAAQJwAAAAAAAAAAAAAAAAAAAAAAAAAAAAAAAAAAAAAAAAAAAAAUAAAAAAAAAMDA/wAAAAAAZAAAADIAAAAAAAAAZAAAAAAAAAB/f38ACgAAAB8AAABUAAAAkMImBf///wEAAAAAAAAAAAAAAAAAAAAAAAAAAAAAAAAAAAAAAAAAAAAAAAJ/f38ALDxDA8zMzADAwP8Af39/AAAAAAAAAAAAAAAAAP///wAAAAAAIQAAABgAAAAUAAAANxkAAB8TAADXPAAA8yMAABAAAAAmAAAACAAAAP//////////"/>
+                <pr:smNativeData xmlns:pr="smNativeData" xmlns:p14="http://schemas.microsoft.com/office/powerpoint/2010/main" xmlns="" val="SMDATA_15_w78LXxMAAAAlAAAAEQAAAC0AAAAAkAAAAEgAAACQAAAASAAAAAAAAAAAAAAAAAAAAAEAAABQAAAAAAAAAAAA4D8AAAAAAADgPwAAAAAAAOA/AAAAAAAA4D8AAAAAAADgPwAAAAAAAOA/AAAAAAAA4D8AAAAAAADgPwAAAAAAAOA/AAAAAAAA4D8CAAAAjAAAAAAAAAAAAAAAkMImDP///wgAAAAAAAAAAAAAAAAAAAAAAAAAAAAAAAAAAAAAZAAAAAEAAABAAAAAAAAAAAAAAAAAAAAAAAAAAAAAAAAAAAAAAAAAAAAAAAAAAAAAAAAAAAAAAAAAAAAAAAAAAAAAAAAAAAAAAAAAAAAAAAAAAAAAAAAAAAAAAAAAAAAAFAAAADwAAAAAAAAAAAAAAAAAAAkUAAAAAQAAABQAAAAUAAAAFAAAAAEAAAAAAAAAZAAAAGQAAAAAAAAAZAAAAGQAAAAVAAAAYAAAAAAAAAAAAAAADwAAACADAAAAAAAAAAAAAAEAAACgMgAAVgcAAKr4//8BAAAAf39/AAEAAABkAAAAAAAAABQAAABAHwAAAAAAACYAAAAAAAAAwOD//wAAAAAmAAAAZAAAABYAAABMAAAAAAAAAAAAAAAEAAAAAAAAAAEAAAAsPEMKAAAAACgAAAAoAAAAZAAAAGQAAAAAAAAAzMzMAAAAAABQAAAAUAAAAGQAAABkAAAAAAAAAAcAAAA4AAAAAAAAAAAAAAAAAAAA////AAAAAAAAAAAAAAAAAAAAAAAAAAAAAAAAAAAAAABkAAAAZAAAAAAAAAAjAAAABAAAAGQAAAAXAAAAFAAAAAAAAAAAAAAA/38AAP9/AAAAAAAACQAAAAQAAADo8ejhDAAAABAAAAAAAAAAAAAAAAAAAAAAAAAAHgAAAGgAAAAAAAAAAAAAAAAAAAAAAAAAAAAAABAnAAAQJwAAAAAAAAAAAAAAAAAAAAAAAAAAAAAAAAAAAAAAAAAAAAAUAAAAAAAAAMDA/wAAAAAAZAAAADIAAAAAAAAAZAAAAAAAAAB/f38ACgAAAB8AAABUAAAAkMImBf///wEAAAAAAAAAAAAAAAAAAAAAAAAAAAAAAAAAAAAAAAAAAAAAAAJ/f38ALDxDA8zMzADAwP8Af39/AAAAAAAAAAAAAAAAAP///wAAAAAAIQAAABgAAAAUAAAANxkAAB8TAADXPAAA8yMAABAAAAAmAAAACAAAAP//////////"/>
               </a:ext>
             </a:extLst>
           </p:cNvPicPr>
@@ -24876,31 +24881,35 @@
           </a:p>
         </p:txBody>
       </p:sp>
-      <p:sp>
-        <p:nvSpPr>
-          <p:cNvPr id="3" name="Marcador de contenido 2">
+      <p:pic>
+        <p:nvPicPr>
+          <p:cNvPr id="5" name="Marcador de contenido 4">
             <a:extLst>
               <a:ext uri="{FF2B5EF4-FFF2-40B4-BE49-F238E27FC236}">
-                <a16:creationId xmlns:a16="http://schemas.microsoft.com/office/drawing/2014/main" id="{A9D27C05-D9A9-3F3C-1253-1203A65EB597}"/>
+                <a16:creationId xmlns:a16="http://schemas.microsoft.com/office/drawing/2014/main" id="{2DDB64DD-4125-35E3-CB18-C6C4050A064D}"/>
               </a:ext>
             </a:extLst>
           </p:cNvPr>
-          <p:cNvSpPr>
-            <a:spLocks noGrp="1"/>
-          </p:cNvSpPr>
+          <p:cNvPicPr>
+            <a:picLocks noGrp="1" noChangeAspect="1"/>
+          </p:cNvPicPr>
           <p:nvPr>
             <p:ph idx="1"/>
           </p:nvPr>
-        </p:nvSpPr>
-        <p:spPr/>
-        <p:txBody>
-          <a:bodyPr/>
-          <a:lstStyle/>
-          <a:p>
-            <a:endParaRPr lang="es-AR"/>
-          </a:p>
-        </p:txBody>
-      </p:sp>
+        </p:nvPicPr>
+        <p:blipFill>
+          <a:blip r:embed="rId2"/>
+          <a:stretch>
+            <a:fillRect/>
+          </a:stretch>
+        </p:blipFill>
+        <p:spPr>
+          <a:xfrm>
+            <a:off x="349536" y="292729"/>
+            <a:ext cx="9252647" cy="5432425"/>
+          </a:xfrm>
+        </p:spPr>
+      </p:pic>
     </p:spTree>
     <p:extLst>
       <p:ext uri="{BB962C8B-B14F-4D97-AF65-F5344CB8AC3E}">
@@ -24933,12 +24942,671 @@
       </p:grpSpPr>
       <p:sp>
         <p:nvSpPr>
+          <p:cNvPr id="2" name="Título 1">
+            <a:extLst>
+              <a:ext uri="{FF2B5EF4-FFF2-40B4-BE49-F238E27FC236}">
+                <a16:creationId xmlns:a16="http://schemas.microsoft.com/office/drawing/2014/main" id="{02ED66D7-A54F-5C0A-2AEF-8C21F7B739D8}"/>
+              </a:ext>
+            </a:extLst>
+          </p:cNvPr>
+          <p:cNvSpPr>
+            <a:spLocks noGrp="1"/>
+          </p:cNvSpPr>
+          <p:nvPr>
+            <p:ph type="title"/>
+          </p:nvPr>
+        </p:nvSpPr>
+        <p:spPr/>
+        <p:txBody>
+          <a:bodyPr/>
+          <a:lstStyle/>
+          <a:p>
+            <a:endParaRPr lang="es-AR"/>
+          </a:p>
+        </p:txBody>
+      </p:sp>
+      <p:sp>
+        <p:nvSpPr>
+          <p:cNvPr id="3" name="Marcador de contenido 2">
+            <a:extLst>
+              <a:ext uri="{FF2B5EF4-FFF2-40B4-BE49-F238E27FC236}">
+                <a16:creationId xmlns:a16="http://schemas.microsoft.com/office/drawing/2014/main" id="{0F5DB2EB-8EB5-2176-261F-F457E08722E7}"/>
+              </a:ext>
+            </a:extLst>
+          </p:cNvPr>
+          <p:cNvSpPr>
+            <a:spLocks noGrp="1"/>
+          </p:cNvSpPr>
+          <p:nvPr>
+            <p:ph idx="1"/>
+          </p:nvPr>
+        </p:nvSpPr>
+        <p:spPr/>
+        <p:txBody>
+          <a:bodyPr/>
+          <a:lstStyle/>
+          <a:p>
+            <a:endParaRPr lang="es-AR"/>
+          </a:p>
+        </p:txBody>
+      </p:sp>
+      <p:pic>
+        <p:nvPicPr>
+          <p:cNvPr id="5" name="Imagen 4">
+            <a:extLst>
+              <a:ext uri="{FF2B5EF4-FFF2-40B4-BE49-F238E27FC236}">
+                <a16:creationId xmlns:a16="http://schemas.microsoft.com/office/drawing/2014/main" id="{46B017D5-108D-C196-792D-EC8BBCF2151E}"/>
+              </a:ext>
+            </a:extLst>
+          </p:cNvPr>
+          <p:cNvPicPr>
+            <a:picLocks noChangeAspect="1"/>
+          </p:cNvPicPr>
+          <p:nvPr/>
+        </p:nvPicPr>
+        <p:blipFill>
+          <a:blip r:embed="rId2"/>
+          <a:stretch>
+            <a:fillRect/>
+          </a:stretch>
+        </p:blipFill>
+        <p:spPr>
+          <a:xfrm>
+            <a:off x="159798" y="545053"/>
+            <a:ext cx="9956961" cy="5496337"/>
+          </a:xfrm>
+          <a:prstGeom prst="rect">
+            <a:avLst/>
+          </a:prstGeom>
+        </p:spPr>
+      </p:pic>
+      <p:pic>
+        <p:nvPicPr>
+          <p:cNvPr id="7" name="Imagen 6">
+            <a:extLst>
+              <a:ext uri="{FF2B5EF4-FFF2-40B4-BE49-F238E27FC236}">
+                <a16:creationId xmlns:a16="http://schemas.microsoft.com/office/drawing/2014/main" id="{DD3E5FAE-6D7A-9DA8-5E0D-E235CD3AB674}"/>
+              </a:ext>
+            </a:extLst>
+          </p:cNvPr>
+          <p:cNvPicPr>
+            <a:picLocks noChangeAspect="1"/>
+          </p:cNvPicPr>
+          <p:nvPr/>
+        </p:nvPicPr>
+        <p:blipFill>
+          <a:blip r:embed="rId3"/>
+          <a:stretch>
+            <a:fillRect/>
+          </a:stretch>
+        </p:blipFill>
+        <p:spPr>
+          <a:xfrm>
+            <a:off x="327011" y="5591083"/>
+            <a:ext cx="4648849" cy="657317"/>
+          </a:xfrm>
+          <a:prstGeom prst="rect">
+            <a:avLst/>
+          </a:prstGeom>
+        </p:spPr>
+      </p:pic>
+      <p:sp>
+        <p:nvSpPr>
+          <p:cNvPr id="8" name="CuadroTexto 7">
+            <a:extLst>
+              <a:ext uri="{FF2B5EF4-FFF2-40B4-BE49-F238E27FC236}">
+                <a16:creationId xmlns:a16="http://schemas.microsoft.com/office/drawing/2014/main" id="{6E038215-F9A2-C259-4744-B98127D7F189}"/>
+              </a:ext>
+            </a:extLst>
+          </p:cNvPr>
+          <p:cNvSpPr txBox="1"/>
+          <p:nvPr/>
+        </p:nvSpPr>
+        <p:spPr>
+          <a:xfrm>
+            <a:off x="4975860" y="5141872"/>
+            <a:ext cx="5140899" cy="954107"/>
+          </a:xfrm>
+          <a:prstGeom prst="rect">
+            <a:avLst/>
+          </a:prstGeom>
+          <a:noFill/>
+        </p:spPr>
+        <p:txBody>
+          <a:bodyPr wrap="square" rtlCol="0">
+            <a:spAutoFit/>
+          </a:bodyPr>
+          <a:lstStyle/>
+          <a:p>
+            <a:r>
+              <a:rPr lang="es-ES" dirty="0"/>
+              <a:t>Durante 5 segundos, </a:t>
+            </a:r>
+            <a:r>
+              <a:rPr lang="es-ES" dirty="0" err="1"/>
+              <a:t>Selenuim</a:t>
+            </a:r>
+            <a:r>
+              <a:rPr lang="es-ES" dirty="0"/>
+              <a:t> verifica cada 0,25 segundos si se </a:t>
+            </a:r>
+            <a:r>
+              <a:rPr lang="es-ES" dirty="0" err="1"/>
+              <a:t>complio</a:t>
+            </a:r>
+            <a:r>
+              <a:rPr lang="es-ES" dirty="0"/>
+              <a:t> cierta condición, para continuar. Si luego de 5 segundos no se cumplió la condición-&gt;</a:t>
+            </a:r>
+            <a:r>
+              <a:rPr lang="es-ES" dirty="0" err="1"/>
+              <a:t>NoSuchElementException</a:t>
+            </a:r>
+            <a:r>
+              <a:rPr lang="es-ES" dirty="0"/>
+              <a:t> </a:t>
+            </a:r>
+            <a:endParaRPr lang="es-AR" dirty="0"/>
+          </a:p>
+        </p:txBody>
+      </p:sp>
+      <p:pic>
+        <p:nvPicPr>
+          <p:cNvPr id="10" name="Imagen 9">
+            <a:extLst>
+              <a:ext uri="{FF2B5EF4-FFF2-40B4-BE49-F238E27FC236}">
+                <a16:creationId xmlns:a16="http://schemas.microsoft.com/office/drawing/2014/main" id="{A7155960-3219-4D63-5B00-042E1ECEE0E0}"/>
+              </a:ext>
+            </a:extLst>
+          </p:cNvPr>
+          <p:cNvPicPr>
+            <a:picLocks noChangeAspect="1"/>
+          </p:cNvPicPr>
+          <p:nvPr/>
+        </p:nvPicPr>
+        <p:blipFill>
+          <a:blip r:embed="rId4"/>
+          <a:stretch>
+            <a:fillRect/>
+          </a:stretch>
+        </p:blipFill>
+        <p:spPr>
+          <a:xfrm>
+            <a:off x="483490" y="6105937"/>
+            <a:ext cx="11526859" cy="704948"/>
+          </a:xfrm>
+          <a:prstGeom prst="rect">
+            <a:avLst/>
+          </a:prstGeom>
+        </p:spPr>
+      </p:pic>
+    </p:spTree>
+    <p:extLst>
+      <p:ext uri="{BB962C8B-B14F-4D97-AF65-F5344CB8AC3E}">
+        <p14:creationId xmlns:p14="http://schemas.microsoft.com/office/powerpoint/2010/main" val="146252122"/>
+      </p:ext>
+    </p:extLst>
+  </p:cSld>
+  <p:clrMapOvr>
+    <a:masterClrMapping/>
+  </p:clrMapOvr>
+</p:sld>
+</file>
+
+<file path=ppt/slides/slide19.xml><?xml version="1.0" encoding="utf-8"?>
+<p:sld xmlns:a="http://schemas.openxmlformats.org/drawingml/2006/main" xmlns:r="http://schemas.openxmlformats.org/officeDocument/2006/relationships" xmlns:p="http://schemas.openxmlformats.org/presentationml/2006/main">
+  <p:cSld>
+    <p:spTree>
+      <p:nvGrpSpPr>
+        <p:cNvPr id="1" name=""/>
+        <p:cNvGrpSpPr/>
+        <p:nvPr/>
+      </p:nvGrpSpPr>
+      <p:grpSpPr>
+        <a:xfrm>
+          <a:off x="0" y="0"/>
+          <a:ext cx="0" cy="0"/>
+          <a:chOff x="0" y="0"/>
+          <a:chExt cx="0" cy="0"/>
+        </a:xfrm>
+      </p:grpSpPr>
+      <p:sp>
+        <p:nvSpPr>
+          <p:cNvPr id="2" name="Título 1">
+            <a:extLst>
+              <a:ext uri="{FF2B5EF4-FFF2-40B4-BE49-F238E27FC236}">
+                <a16:creationId xmlns:a16="http://schemas.microsoft.com/office/drawing/2014/main" id="{F20C4F51-97FD-83EC-CCAE-1F5EC773C98A}"/>
+              </a:ext>
+            </a:extLst>
+          </p:cNvPr>
+          <p:cNvSpPr>
+            <a:spLocks noGrp="1"/>
+          </p:cNvSpPr>
+          <p:nvPr>
+            <p:ph type="title"/>
+          </p:nvPr>
+        </p:nvSpPr>
+        <p:spPr/>
+        <p:txBody>
+          <a:bodyPr/>
+          <a:lstStyle/>
+          <a:p>
+            <a:endParaRPr lang="es-AR"/>
+          </a:p>
+        </p:txBody>
+      </p:sp>
+      <p:sp>
+        <p:nvSpPr>
+          <p:cNvPr id="3" name="Marcador de contenido 2">
+            <a:extLst>
+              <a:ext uri="{FF2B5EF4-FFF2-40B4-BE49-F238E27FC236}">
+                <a16:creationId xmlns:a16="http://schemas.microsoft.com/office/drawing/2014/main" id="{BBB11D7A-50C3-F31F-848E-3AB9DAA3A5A5}"/>
+              </a:ext>
+            </a:extLst>
+          </p:cNvPr>
+          <p:cNvSpPr>
+            <a:spLocks noGrp="1"/>
+          </p:cNvSpPr>
+          <p:nvPr>
+            <p:ph idx="1"/>
+          </p:nvPr>
+        </p:nvSpPr>
+        <p:spPr/>
+        <p:txBody>
+          <a:bodyPr/>
+          <a:lstStyle/>
+          <a:p>
+            <a:endParaRPr lang="es-AR"/>
+          </a:p>
+        </p:txBody>
+      </p:sp>
+      <p:pic>
+        <p:nvPicPr>
+          <p:cNvPr id="5" name="Imagen 4">
+            <a:extLst>
+              <a:ext uri="{FF2B5EF4-FFF2-40B4-BE49-F238E27FC236}">
+                <a16:creationId xmlns:a16="http://schemas.microsoft.com/office/drawing/2014/main" id="{34304B2A-27FA-A3D8-6933-20C9902CA96A}"/>
+              </a:ext>
+            </a:extLst>
+          </p:cNvPr>
+          <p:cNvPicPr>
+            <a:picLocks noChangeAspect="1"/>
+          </p:cNvPicPr>
+          <p:nvPr/>
+        </p:nvPicPr>
+        <p:blipFill>
+          <a:blip r:embed="rId2"/>
+          <a:stretch>
+            <a:fillRect/>
+          </a:stretch>
+        </p:blipFill>
+        <p:spPr>
+          <a:xfrm>
+            <a:off x="240087" y="215662"/>
+            <a:ext cx="9471545" cy="6426675"/>
+          </a:xfrm>
+          <a:prstGeom prst="rect">
+            <a:avLst/>
+          </a:prstGeom>
+        </p:spPr>
+      </p:pic>
+    </p:spTree>
+    <p:extLst>
+      <p:ext uri="{BB962C8B-B14F-4D97-AF65-F5344CB8AC3E}">
+        <p14:creationId xmlns:p14="http://schemas.microsoft.com/office/powerpoint/2010/main" val="4037986446"/>
+      </p:ext>
+    </p:extLst>
+  </p:cSld>
+  <p:clrMapOvr>
+    <a:masterClrMapping/>
+  </p:clrMapOvr>
+</p:sld>
+</file>
+
+<file path=ppt/slides/slide2.xml><?xml version="1.0" encoding="utf-8"?>
+<p:sld xmlns:a="http://schemas.openxmlformats.org/drawingml/2006/main" xmlns:r="http://schemas.openxmlformats.org/officeDocument/2006/relationships" xmlns:p="http://schemas.openxmlformats.org/presentationml/2006/main">
+  <p:cSld>
+    <p:spTree>
+      <p:nvGrpSpPr>
+        <p:cNvPr id="1" name=""/>
+        <p:cNvGrpSpPr/>
+        <p:nvPr/>
+      </p:nvGrpSpPr>
+      <p:grpSpPr>
+        <a:xfrm>
+          <a:off x="0" y="0"/>
+          <a:ext cx="0" cy="0"/>
+          <a:chOff x="0" y="0"/>
+          <a:chExt cx="0" cy="0"/>
+        </a:xfrm>
+      </p:grpSpPr>
+      <p:sp>
+        <p:nvSpPr>
+          <p:cNvPr id="2" name="Shape 150"/>
+          <p:cNvSpPr>
+            <a:spLocks noGrp="1" noChangeArrowheads="1"/>
+            <a:extLst>
+              <a:ext uri="smNativeData">
+                <pr:smNativeData xmlns:pr="smNativeData" xmlns:p14="http://schemas.microsoft.com/office/powerpoint/2010/main" xmlns="" val="SMDATA_13_w78LXxMAAAAlAAAAZAAAAA0AAAAAkAAAAEgAAACQAAAASAAAAAAAAAAAAAAAAAAAAAEAAABQAAAAAAAAAAAA4D8AAAAAAADgPwAAAAAAAOA/AAAAAAAA4D8AAAAAAADgPwAAAAAAAOA/AAAAAAAA4D8AAAAAAADgPwAAAAAAAOA/AAAAAAAA4D8CAAAAjAAAAAAAAAAAAAAAkMImDP///wgAAAAAAAAAAAAAAAAAAAAAAAAAAAAAAAAAAAAAZAAAAAEAAABAAAAAAAAAAAAAAAAAAAAAAAAAAAAAAAAAAAAAAAAAAAAAAAAAAAAAAAAAAAAAAAAAAAAAAAAAAAAAAAAAAAAAAAAAAAAAAAAAAAAAAAAAAAAAAAAAAAAAFAAAADwAAAAAAAAAAAAAAAAAAAkUAAAAAQAAABQAAAAUAAAAFAAAAAEAAAAAAAAAZAAAAGQAAAAAAAAAZAAAAGQAAAAVAAAAYAAAAAAAAAAAAAAADwAAACADAAAAAAAAAAAAAAEAAACgMgAAVgcAAKr4//8BAAAAf39/AAEAAABkAAAAAAAAABQAAABAHwAAAAAAACYAAAAAAAAAwOD//wAAAAAmAAAAZAAAABYAAABMAAAAAAAAAAAAAAAEAAAAAAAAAAEAAAAsPEMKAAAAACgAAAAoAAAAZAAAAGQAAAAAAAAAzMzMAAAAAABQAAAAUAAAAGQAAABkAAAAAAAAABcAAAAUAAAAAAAAAAAAAAD/fwAA/38AAAAAAAAJAAAABAAAALMPAAAMAAAAEAAAAAAAAAAAAAAAAAAAAAAAAAAeAAAAaAAAAAAAAAAAAAAAAAAAAAAAAAAAAAAAECcAABAnAAAAAAAAAAAAAAAAAAAAAAAAAAAAAAAAAAAAAAAAAAAAABQAAAAAAAAAwMD/AAAAAABkAAAAMgAAAAAAAABkAAAAAAAAAH9/fwAKAAAAHwAAAFQAAACQwiYF////AQAAAAAAAAAAAAAAAAAAAAAAAAAAAAAAAAAAAAAAAAAAAAAAAn9/fwAsPEMDzMzMAMDA/wB/f38AAAAAAAAAAAAAAAAAAAAAAAAAAAAhAAAAGAAAABQAAAArBAAAwAMAAA05AADgCwAAEAAAACYAAAAIAAAAPDAAAP8fAAA="/>
+              </a:ext>
+            </a:extLst>
+          </p:cNvSpPr>
+          <p:nvPr>
+            <p:ph type="title"/>
+          </p:nvPr>
+        </p:nvSpPr>
+        <p:spPr>
+          <a:noFill/>
+          <a:ln>
+            <a:noFill/>
+          </a:ln>
+        </p:spPr>
+        <p:txBody>
+          <a:bodyPr vert="horz" wrap="square" lIns="91440" tIns="45720" rIns="91440" bIns="45720" numCol="1" spcCol="215900" anchor="t">
+            <a:prstTxWarp prst="textNoShape">
+              <a:avLst/>
+            </a:prstTxWarp>
+          </a:bodyPr>
+          <a:lstStyle/>
+          <a:p>
+            <a:pPr marL="0" marR="0" indent="0" algn="l">
+              <a:spcBef>
+                <a:spcPts val="0"/>
+              </a:spcBef>
+              <a:spcAft>
+                <a:spcPts val="0"/>
+              </a:spcAft>
+              <a:buNone/>
+            </a:pPr>
+            <a:r>
+              <a:rPr lang="es-es"/>
+              <a:t>Locators</a:t>
+            </a:r>
+            <a:endParaRPr/>
+          </a:p>
+        </p:txBody>
+      </p:sp>
+      <p:graphicFrame>
+        <p:nvGraphicFramePr>
+          <p:cNvPr id="3" name="Diagram 1"/>
+          <p:cNvGraphicFramePr/>
+          <p:nvPr/>
+        </p:nvGraphicFramePr>
+        <p:xfrm>
+          <a:off x="1359535" y="1360805"/>
+          <a:ext cx="8128000" cy="5418455"/>
+        </p:xfrm>
+        <a:graphic>
+          <a:graphicData uri="http://schemas.openxmlformats.org/drawingml/2006/diagram">
+            <dgm:relIds xmlns:dgm="http://schemas.openxmlformats.org/drawingml/2006/diagram" xmlns:r="http://schemas.openxmlformats.org/officeDocument/2006/relationships" r:dm="rId3" r:lo="rId4" r:qs="rId5" r:cs="rId6"/>
+          </a:graphicData>
+        </a:graphic>
+      </p:graphicFrame>
+    </p:spTree>
+  </p:cSld>
+  <p:clrMapOvr>
+    <a:masterClrMapping/>
+  </p:clrMapOvr>
+</p:sld>
+</file>
+
+<file path=ppt/slides/slide20.xml><?xml version="1.0" encoding="utf-8"?>
+<p:sld xmlns:a="http://schemas.openxmlformats.org/drawingml/2006/main" xmlns:r="http://schemas.openxmlformats.org/officeDocument/2006/relationships" xmlns:p="http://schemas.openxmlformats.org/presentationml/2006/main">
+  <p:cSld>
+    <p:spTree>
+      <p:nvGrpSpPr>
+        <p:cNvPr id="1" name=""/>
+        <p:cNvGrpSpPr/>
+        <p:nvPr/>
+      </p:nvGrpSpPr>
+      <p:grpSpPr>
+        <a:xfrm>
+          <a:off x="0" y="0"/>
+          <a:ext cx="0" cy="0"/>
+          <a:chOff x="0" y="0"/>
+          <a:chExt cx="0" cy="0"/>
+        </a:xfrm>
+      </p:grpSpPr>
+      <p:sp>
+        <p:nvSpPr>
+          <p:cNvPr id="3" name="Marcador de contenido 2">
+            <a:extLst>
+              <a:ext uri="{FF2B5EF4-FFF2-40B4-BE49-F238E27FC236}">
+                <a16:creationId xmlns:a16="http://schemas.microsoft.com/office/drawing/2014/main" id="{9BA5C346-BC32-EA97-DD5C-95E7E5DEC39B}"/>
+              </a:ext>
+            </a:extLst>
+          </p:cNvPr>
+          <p:cNvSpPr>
+            <a:spLocks noGrp="1"/>
+          </p:cNvSpPr>
+          <p:nvPr>
+            <p:ph idx="1"/>
+          </p:nvPr>
+        </p:nvSpPr>
+        <p:spPr/>
+        <p:txBody>
+          <a:bodyPr/>
+          <a:lstStyle/>
+          <a:p>
+            <a:r>
+              <a:rPr lang="es-ES" dirty="0"/>
+              <a:t>Cuando este elemento esta presente, no suele verse nada de la pagina, entonces a veces necesito que ese elemento NO este presente para continuar. Aquí se usa la PAUSA EXPLICITA. No solamente el elemento, sino además que cumpla cierta condición. Hay que poner la espera, la condición y el localizador del elemento.</a:t>
+            </a:r>
+            <a:endParaRPr lang="es-AR" dirty="0"/>
+          </a:p>
+        </p:txBody>
+      </p:sp>
+      <p:pic>
+        <p:nvPicPr>
+          <p:cNvPr id="5" name="Imagen 4">
+            <a:extLst>
+              <a:ext uri="{FF2B5EF4-FFF2-40B4-BE49-F238E27FC236}">
+                <a16:creationId xmlns:a16="http://schemas.microsoft.com/office/drawing/2014/main" id="{99628DBA-D021-3832-A201-35F7E832C974}"/>
+              </a:ext>
+            </a:extLst>
+          </p:cNvPr>
+          <p:cNvPicPr>
+            <a:picLocks noChangeAspect="1"/>
+          </p:cNvPicPr>
+          <p:nvPr/>
+        </p:nvPicPr>
+        <p:blipFill>
+          <a:blip r:embed="rId2"/>
+          <a:stretch>
+            <a:fillRect/>
+          </a:stretch>
+        </p:blipFill>
+        <p:spPr>
+          <a:xfrm>
+            <a:off x="3791562" y="330107"/>
+            <a:ext cx="1667108" cy="1724266"/>
+          </a:xfrm>
+          <a:prstGeom prst="rect">
+            <a:avLst/>
+          </a:prstGeom>
+        </p:spPr>
+      </p:pic>
+    </p:spTree>
+    <p:extLst>
+      <p:ext uri="{BB962C8B-B14F-4D97-AF65-F5344CB8AC3E}">
+        <p14:creationId xmlns:p14="http://schemas.microsoft.com/office/powerpoint/2010/main" val="1783059354"/>
+      </p:ext>
+    </p:extLst>
+  </p:cSld>
+  <p:clrMapOvr>
+    <a:masterClrMapping/>
+  </p:clrMapOvr>
+</p:sld>
+</file>
+
+<file path=ppt/slides/slide21.xml><?xml version="1.0" encoding="utf-8"?>
+<p:sld xmlns:a="http://schemas.openxmlformats.org/drawingml/2006/main" xmlns:r="http://schemas.openxmlformats.org/officeDocument/2006/relationships" xmlns:p="http://schemas.openxmlformats.org/presentationml/2006/main">
+  <p:cSld>
+    <p:spTree>
+      <p:nvGrpSpPr>
+        <p:cNvPr id="1" name=""/>
+        <p:cNvGrpSpPr/>
+        <p:nvPr/>
+      </p:nvGrpSpPr>
+      <p:grpSpPr>
+        <a:xfrm>
+          <a:off x="0" y="0"/>
+          <a:ext cx="0" cy="0"/>
+          <a:chOff x="0" y="0"/>
+          <a:chExt cx="0" cy="0"/>
+        </a:xfrm>
+      </p:grpSpPr>
+      <p:pic>
+        <p:nvPicPr>
+          <p:cNvPr id="5" name="Marcador de contenido 4">
+            <a:extLst>
+              <a:ext uri="{FF2B5EF4-FFF2-40B4-BE49-F238E27FC236}">
+                <a16:creationId xmlns:a16="http://schemas.microsoft.com/office/drawing/2014/main" id="{DF86D05B-8EB0-9721-8C25-AF29607EF5F9}"/>
+              </a:ext>
+            </a:extLst>
+          </p:cNvPr>
+          <p:cNvPicPr>
+            <a:picLocks noGrp="1" noChangeAspect="1"/>
+          </p:cNvPicPr>
+          <p:nvPr>
+            <p:ph idx="1"/>
+          </p:nvPr>
+        </p:nvPicPr>
+        <p:blipFill>
+          <a:blip r:embed="rId2"/>
+          <a:stretch>
+            <a:fillRect/>
+          </a:stretch>
+        </p:blipFill>
+        <p:spPr>
+          <a:xfrm>
+            <a:off x="1100833" y="661894"/>
+            <a:ext cx="8994712" cy="5534211"/>
+          </a:xfrm>
+        </p:spPr>
+      </p:pic>
+    </p:spTree>
+    <p:extLst>
+      <p:ext uri="{BB962C8B-B14F-4D97-AF65-F5344CB8AC3E}">
+        <p14:creationId xmlns:p14="http://schemas.microsoft.com/office/powerpoint/2010/main" val="2566466695"/>
+      </p:ext>
+    </p:extLst>
+  </p:cSld>
+  <p:clrMapOvr>
+    <a:masterClrMapping/>
+  </p:clrMapOvr>
+</p:sld>
+</file>
+
+<file path=ppt/slides/slide22.xml><?xml version="1.0" encoding="utf-8"?>
+<p:sld xmlns:a="http://schemas.openxmlformats.org/drawingml/2006/main" xmlns:r="http://schemas.openxmlformats.org/officeDocument/2006/relationships" xmlns:p="http://schemas.openxmlformats.org/presentationml/2006/main">
+  <p:cSld>
+    <p:spTree>
+      <p:nvGrpSpPr>
+        <p:cNvPr id="1" name=""/>
+        <p:cNvGrpSpPr/>
+        <p:nvPr/>
+      </p:nvGrpSpPr>
+      <p:grpSpPr>
+        <a:xfrm>
+          <a:off x="0" y="0"/>
+          <a:ext cx="0" cy="0"/>
+          <a:chOff x="0" y="0"/>
+          <a:chExt cx="0" cy="0"/>
+        </a:xfrm>
+      </p:grpSpPr>
+      <p:sp>
+        <p:nvSpPr>
+          <p:cNvPr id="2" name="Título 1">
+            <a:extLst>
+              <a:ext uri="{FF2B5EF4-FFF2-40B4-BE49-F238E27FC236}">
+                <a16:creationId xmlns:a16="http://schemas.microsoft.com/office/drawing/2014/main" id="{2F1D2D50-23EA-75EA-33DB-CE9329547E27}"/>
+              </a:ext>
+            </a:extLst>
+          </p:cNvPr>
+          <p:cNvSpPr>
+            <a:spLocks noGrp="1"/>
+          </p:cNvSpPr>
+          <p:nvPr>
+            <p:ph type="title"/>
+          </p:nvPr>
+        </p:nvSpPr>
+        <p:spPr/>
+        <p:txBody>
+          <a:bodyPr/>
+          <a:lstStyle/>
+          <a:p>
+            <a:endParaRPr lang="es-AR"/>
+          </a:p>
+        </p:txBody>
+      </p:sp>
+      <p:pic>
+        <p:nvPicPr>
+          <p:cNvPr id="5" name="Marcador de contenido 4">
+            <a:extLst>
+              <a:ext uri="{FF2B5EF4-FFF2-40B4-BE49-F238E27FC236}">
+                <a16:creationId xmlns:a16="http://schemas.microsoft.com/office/drawing/2014/main" id="{20B42485-623B-4981-5070-D49CA41B31C8}"/>
+              </a:ext>
+            </a:extLst>
+          </p:cNvPr>
+          <p:cNvPicPr>
+            <a:picLocks noGrp="1" noChangeAspect="1"/>
+          </p:cNvPicPr>
+          <p:nvPr>
+            <p:ph idx="1"/>
+          </p:nvPr>
+        </p:nvPicPr>
+        <p:blipFill>
+          <a:blip r:embed="rId2"/>
+          <a:stretch>
+            <a:fillRect/>
+          </a:stretch>
+        </p:blipFill>
+        <p:spPr>
+          <a:xfrm>
+            <a:off x="677545" y="686264"/>
+            <a:ext cx="9422318" cy="5544875"/>
+          </a:xfrm>
+        </p:spPr>
+      </p:pic>
+    </p:spTree>
+    <p:extLst>
+      <p:ext uri="{BB962C8B-B14F-4D97-AF65-F5344CB8AC3E}">
+        <p14:creationId xmlns:p14="http://schemas.microsoft.com/office/powerpoint/2010/main" val="1179760110"/>
+      </p:ext>
+    </p:extLst>
+  </p:cSld>
+  <p:clrMapOvr>
+    <a:masterClrMapping/>
+  </p:clrMapOvr>
+</p:sld>
+</file>
+
+<file path=ppt/slides/slide23.xml><?xml version="1.0" encoding="utf-8"?>
+<p:sld xmlns:a="http://schemas.openxmlformats.org/drawingml/2006/main" xmlns:r="http://schemas.openxmlformats.org/officeDocument/2006/relationships" xmlns:p="http://schemas.openxmlformats.org/presentationml/2006/main">
+  <p:cSld>
+    <p:spTree>
+      <p:nvGrpSpPr>
+        <p:cNvPr id="1" name=""/>
+        <p:cNvGrpSpPr/>
+        <p:nvPr/>
+      </p:nvGrpSpPr>
+      <p:grpSpPr>
+        <a:xfrm>
+          <a:off x="0" y="0"/>
+          <a:ext cx="0" cy="0"/>
+          <a:chOff x="0" y="0"/>
+          <a:chExt cx="0" cy="0"/>
+        </a:xfrm>
+      </p:grpSpPr>
+      <p:sp>
+        <p:nvSpPr>
           <p:cNvPr id="2" name="Title 1"/>
           <p:cNvSpPr>
             <a:spLocks noGrp="1" noChangeArrowheads="1"/>
             <a:extLst>
               <a:ext uri="smNativeData">
-                <pr:smNativeData xmlns="" xmlns:p14="http://schemas.microsoft.com/office/powerpoint/2010/main" xmlns:pr="smNativeData" val="SMDATA_13_w78LXxMAAAAlAAAAZAAAAA0AAAAAkAAAAJAAAACQAAAAkAAAAAAAAAAAAAAAAAAAAAEAAABQAAAAAAAAAAAA4D8AAAAAAADgPwAAAAAAAOA/AAAAAAAA4D8AAAAAAADgPwAAAAAAAOA/AAAAAAAA4D8AAAAAAADgPwAAAAAAAOA/AAAAAAAA4D8CAAAAjAAAAAAAAAAAAAAAkMImDP///wgAAAAAAAAAAAAAAAAAAAAAAAAAAAAAAAAAAAAAZAAAAAEAAABAAAAAAAAAAAAAAAAAAAAAAAAAAAAAAAAAAAAAAAAAAAAAAAAAAAAAAAAAAAAAAAAAAAAAAAAAAAAAAAAAAAAAAAAAAAAAAAAAAAAAAAAAAAAAAAAAAAAAFAAAADwAAAAAAAAAAAAAAAAAAAkUAAAAAQAAABQAAAAUAAAAFAAAAAEAAAAAAAAAZAAAAGQAAAAAAAAAZAAAAGQAAAAVAAAAYAAAAAAAAAAAAAAADwAAACADAAAAAAAAAAAAAAEAAACgMgAAVgcAAKr4//8BAAAAf39/AAEAAABkAAAAAAAAABQAAABAHwAAAAAAACYAAAAAAAAAwOD//wAAAAAmAAAAZAAAABYAAABMAAAAAAAAAAAAAAAEAAAAAAAAAAEAAAAsPEMKAAAAACgAAAAoAAAAZAAAAGQAAAAAAAAAzMzMAAAAAABQAAAAUAAAAGQAAABkAAAAAAAAABcAAAAUAAAAAAAAAAAAAAD/fwAA/38AAAAAAAAJAAAABAAAAEwAaQAMAAAAEAAAAAAAAAAAAAAAAAAAAAAAAAAeAAAAaAAAAAAAAAAAAAAAAAAAAAAAAAAAAAAAECcAABAnAAAAAAAAAAAAAAAAAAAAAAAAAAAAAAAAAAAAAAAAAAAAABQAAAAAAAAAwMD/AAAAAABkAAAAMgAAAAAAAABkAAAAAAAAAH9/fwAKAAAAHwAAAFQAAACQwiYF////AQAAAAAAAAAAAAAAAAAAAAAAAAAAAAAAAAAAAAAAAAAAAAAAAn9/fwAsPEMDzMzMAMDA/wB/f38AAAAAAAAAAAAAAAAAAAAAAAAAAAAhAAAAGAAAABQAAAArBAAAwAMAAA05AADgCwAAEAAAACYAAAAIAAAAAAAAAAAAAAA="/>
+                <pr:smNativeData xmlns:pr="smNativeData" xmlns:p14="http://schemas.microsoft.com/office/powerpoint/2010/main" xmlns="" val="SMDATA_13_w78LXxMAAAAlAAAAZAAAAA0AAAAAkAAAAJAAAACQAAAAkAAAAAAAAAAAAAAAAAAAAAEAAABQAAAAAAAAAAAA4D8AAAAAAADgPwAAAAAAAOA/AAAAAAAA4D8AAAAAAADgPwAAAAAAAOA/AAAAAAAA4D8AAAAAAADgPwAAAAAAAOA/AAAAAAAA4D8CAAAAjAAAAAAAAAAAAAAAkMImDP///wgAAAAAAAAAAAAAAAAAAAAAAAAAAAAAAAAAAAAAZAAAAAEAAABAAAAAAAAAAAAAAAAAAAAAAAAAAAAAAAAAAAAAAAAAAAAAAAAAAAAAAAAAAAAAAAAAAAAAAAAAAAAAAAAAAAAAAAAAAAAAAAAAAAAAAAAAAAAAAAAAAAAAFAAAADwAAAAAAAAAAAAAAAAAAAkUAAAAAQAAABQAAAAUAAAAFAAAAAEAAAAAAAAAZAAAAGQAAAAAAAAAZAAAAGQAAAAVAAAAYAAAAAAAAAAAAAAADwAAACADAAAAAAAAAAAAAAEAAACgMgAAVgcAAKr4//8BAAAAf39/AAEAAABkAAAAAAAAABQAAABAHwAAAAAAACYAAAAAAAAAwOD//wAAAAAmAAAAZAAAABYAAABMAAAAAAAAAAAAAAAEAAAAAAAAAAEAAAAsPEMKAAAAACgAAAAoAAAAZAAAAGQAAAAAAAAAzMzMAAAAAABQAAAAUAAAAGQAAABkAAAAAAAAABcAAAAUAAAAAAAAAAAAAAD/fwAA/38AAAAAAAAJAAAABAAAAEwAaQAMAAAAEAAAAAAAAAAAAAAAAAAAAAAAAAAeAAAAaAAAAAAAAAAAAAAAAAAAAAAAAAAAAAAAECcAABAnAAAAAAAAAAAAAAAAAAAAAAAAAAAAAAAAAAAAAAAAAAAAABQAAAAAAAAAwMD/AAAAAABkAAAAMgAAAAAAAABkAAAAAAAAAH9/fwAKAAAAHwAAAFQAAACQwiYF////AQAAAAAAAAAAAAAAAAAAAAAAAAAAAAAAAAAAAAAAAAAAAAAAAn9/fwAsPEMDzMzMAMDA/wB/f38AAAAAAAAAAAAAAAAAAAAAAAAAAAAhAAAAGAAAABQAAAArBAAAwAMAAA05AADgCwAAEAAAACYAAAAIAAAAAAAAAAAAAAA="/>
               </a:ext>
             </a:extLst>
           </p:cNvSpPr>
@@ -24965,7 +25633,7 @@
             <a:spLocks noGrp="1" noChangeArrowheads="1"/>
             <a:extLst>
               <a:ext uri="smNativeData">
-                <pr:smNativeData xmlns="" xmlns:p14="http://schemas.microsoft.com/office/powerpoint/2010/main" xmlns:pr="smNativeData" val="SMDATA_13_w78LXxMAAAAlAAAAZAAAAA0AAAAAkAAAAJAAAACQAAAAkAAAAAAAAAAAAAAAAAAAAAEAAABQAAAAAAAAAAAA4D8AAAAAAADgPwAAAAAAAOA/AAAAAAAA4D8AAAAAAADgPwAAAAAAAOA/AAAAAAAA4D8AAAAAAADgPwAAAAAAAOA/AAAAAAAA4D8CAAAAjAAAAAAAAAAAAAAAkMImDP///wgAAAAAAAAAAAAAAAAAAAAAAAAAAAAAAAAAAAAAZAAAAAEAAABAAAAAAAAAAAAAAAAAAAAAAAAAAAAAAAAAAAAAAAAAAAAAAAAAAAAAAAAAAAAAAAAAAAAAAAAAAAAAAAAAAAAAAAAAAAAAAAAAAAAAAAAAAAAAAAAAAAAAFAAAADwAAAAAAAAAAAAAAAAAAAkUAAAAAQAAABQAAAAUAAAAFAAAAAEAAAAAAAAAZAAAAGQAAAAAAAAAZAAAAGQAAAAVAAAAYAAAAAAAAAAAAAAADwAAACADAAAAAAAAAAAAAAEAAACgMgAAVgcAAKr4//8BAAAAf39/AAEAAABkAAAAAAAAABQAAABAHwAAAAAAACYAAAAAAAAAwOD//wAAAAAmAAAAZAAAABYAAABMAAAAAAAAAAAAAAAEAAAAAAAAAAEAAAAsPEMKAAAAACgAAAAoAAAAZAAAAGQAAAAAAAAAzMzMAAAAAABQAAAAUAAAAGQAAABkAAAAAAAAABcAAAAUAAAAAAAAAAAAAAD/fwAA/38AAAAAAAAJAAAABAAAAIcyAAAMAAAAEAAAAAAAAAAAAAAAAAAAAAAAAAAeAAAAaAAAAAAAAAAAAAAAAAAAAAAAAAAAAAAAECcAABAnAAAAAAAAAAAAAAAAAAAAAAAAAAAAAAAAAAAAAAAAAAAAABQAAAAAAAAAwMD/AAAAAABkAAAAMgAAAAAAAABkAAAAAAAAAH9/fwAKAAAAHwAAAFQAAACQwiYF////AQAAAAAAAAAAAAAAAAAAAAAAAAAAAAAAAAAAAAAAAAAAAAAAAn9/fwAsPEMDzMzMAMDA/wB/f38AAAAAAAAAAAAAAAAAAAAAAAAAAAAhAAAAGAAAABQAAAArBAAASw0AAA05AAAqJQAAEAAAACYAAAAIAAAAAAAAAAAAAAA="/>
+                <pr:smNativeData xmlns:pr="smNativeData" xmlns:p14="http://schemas.microsoft.com/office/powerpoint/2010/main" xmlns="" val="SMDATA_13_w78LXxMAAAAlAAAAZAAAAA0AAAAAkAAAAJAAAACQAAAAkAAAAAAAAAAAAAAAAAAAAAEAAABQAAAAAAAAAAAA4D8AAAAAAADgPwAAAAAAAOA/AAAAAAAA4D8AAAAAAADgPwAAAAAAAOA/AAAAAAAA4D8AAAAAAADgPwAAAAAAAOA/AAAAAAAA4D8CAAAAjAAAAAAAAAAAAAAAkMImDP///wgAAAAAAAAAAAAAAAAAAAAAAAAAAAAAAAAAAAAAZAAAAAEAAABAAAAAAAAAAAAAAAAAAAAAAAAAAAAAAAAAAAAAAAAAAAAAAAAAAAAAAAAAAAAAAAAAAAAAAAAAAAAAAAAAAAAAAAAAAAAAAAAAAAAAAAAAAAAAAAAAAAAAFAAAADwAAAAAAAAAAAAAAAAAAAkUAAAAAQAAABQAAAAUAAAAFAAAAAEAAAAAAAAAZAAAAGQAAAAAAAAAZAAAAGQAAAAVAAAAYAAAAAAAAAAAAAAADwAAACADAAAAAAAAAAAAAAEAAACgMgAAVgcAAKr4//8BAAAAf39/AAEAAABkAAAAAAAAABQAAABAHwAAAAAAACYAAAAAAAAAwOD//wAAAAAmAAAAZAAAABYAAABMAAAAAAAAAAAAAAAEAAAAAAAAAAEAAAAsPEMKAAAAACgAAAAoAAAAZAAAAGQAAAAAAAAAzMzMAAAAAABQAAAAUAAAAGQAAABkAAAAAAAAABcAAAAUAAAAAAAAAAAAAAD/fwAA/38AAAAAAAAJAAAABAAAAIcyAAAMAAAAEAAAAAAAAAAAAAAAAAAAAAAAAAAeAAAAaAAAAAAAAAAAAAAAAAAAAAAAAAAAAAAAECcAABAnAAAAAAAAAAAAAAAAAAAAAAAAAAAAAAAAAAAAAAAAAAAAABQAAAAAAAAAwMD/AAAAAABkAAAAMgAAAAAAAABkAAAAAAAAAH9/fwAKAAAAHwAAAFQAAACQwiYF////AQAAAAAAAAAAAAAAAAAAAAAAAAAAAAAAAAAAAAAAAAAAAAAAAn9/fwAsPEMDzMzMAMDA/wB/f38AAAAAAAAAAAAAAAAAAAAAAAAAAAAhAAAAGAAAABQAAAArBAAASw0AAA05AAAqJQAAEAAAACYAAAAIAAAAAAAAAAAAAAA="/>
               </a:ext>
             </a:extLst>
           </p:cNvSpPr>
@@ -25063,7 +25731,7 @@
 </p:sld>
 </file>
 
-<file path=ppt/slides/slide19.xml><?xml version="1.0" encoding="utf-8"?>
+<file path=ppt/slides/slide24.xml><?xml version="1.0" encoding="utf-8"?>
 <p:sld xmlns:a="http://schemas.openxmlformats.org/drawingml/2006/main" xmlns:r="http://schemas.openxmlformats.org/officeDocument/2006/relationships" xmlns:p="http://schemas.openxmlformats.org/presentationml/2006/main">
   <p:cSld>
     <p:spTree>
@@ -25087,7 +25755,7 @@
             <a:spLocks noGrp="1" noChangeArrowheads="1"/>
             <a:extLst>
               <a:ext uri="smNativeData">
-                <pr:smNativeData xmlns="" xmlns:p14="http://schemas.microsoft.com/office/powerpoint/2010/main" xmlns:pr="smNativeData" val="SMDATA_13_w78LXxMAAAAlAAAAZAAAAA0AAAAAkAAAAJAAAACQAAAAkAAAAAAAAAAAAAAAAAAAAAEAAABQAAAAAAAAAAAA4D8AAAAAAADgPwAAAAAAAOA/AAAAAAAA4D8AAAAAAADgPwAAAAAAAOA/AAAAAAAA4D8AAAAAAADgPwAAAAAAAOA/AAAAAAAA4D8CAAAAjAAAAAAAAAAAAAAAkMImDP///wgAAAAAAAAAAAAAAAAAAAAAAAAAAAAAAAAAAAAAZAAAAAEAAABAAAAAAAAAAAAAAAAAAAAAAAAAAAAAAAAAAAAAAAAAAAAAAAAAAAAAAAAAAAAAAAAAAAAAAAAAAAAAAAAAAAAAAAAAAAAAAAAAAAAAAAAAAAAAAAAAAAAAFAAAADwAAAAAAAAAAAAAAAAAAAkUAAAAAQAAABQAAAAUAAAAFAAAAAEAAAAAAAAAZAAAAGQAAAAAAAAAZAAAAGQAAAAVAAAAYAAAAAAAAAAAAAAADwAAACADAAAAAAAAAAAAAAEAAACgMgAAVgcAAKr4//8BAAAAf39/AAEAAABkAAAAAAAAABQAAABAHwAAAAAAACYAAAAAAAAAwOD//wAAAAAmAAAAZAAAABYAAABMAAAAAAAAAAAAAAAEAAAAAAAAAAEAAAAsPEMKAAAAACgAAAAoAAAAZAAAAGQAAAAAAAAAzMzMAAAAAABQAAAAUAAAAGQAAABkAAAAAAAAABcAAAAUAAAAAAAAAAAAAAD/fwAA/38AAAAAAAAJAAAABAAAAEwAaQAMAAAAEAAAAAAAAAAAAAAAAAAAAAAAAAAeAAAAaAAAAAAAAAAAAAAAAAAAAAAAAAAAAAAAECcAABAnAAAAAAAAAAAAAAAAAAAAAAAAAAAAAAAAAAAAAAAAAAAAABQAAAAAAAAAwMD/AAAAAABkAAAAMgAAAAAAAABkAAAAAAAAAH9/fwAKAAAAHwAAAFQAAACQwiYF////AQAAAAAAAAAAAAAAAAAAAAAAAAAAAAAAAAAAAAAAAAAAAAAAAn9/fwAsPEMDzMzMAMDA/wB/f38AAAAAAAAAAAAAAAAAAAAAAAAAAAAhAAAAGAAAABQAAAArBAAAwAMAAA05AADgCwAAEAAAACYAAAAIAAAAAAAAAAAAAAA="/>
+                <pr:smNativeData xmlns:pr="smNativeData" xmlns:p14="http://schemas.microsoft.com/office/powerpoint/2010/main" xmlns="" val="SMDATA_13_w78LXxMAAAAlAAAAZAAAAA0AAAAAkAAAAJAAAACQAAAAkAAAAAAAAAAAAAAAAAAAAAEAAABQAAAAAAAAAAAA4D8AAAAAAADgPwAAAAAAAOA/AAAAAAAA4D8AAAAAAADgPwAAAAAAAOA/AAAAAAAA4D8AAAAAAADgPwAAAAAAAOA/AAAAAAAA4D8CAAAAjAAAAAAAAAAAAAAAkMImDP///wgAAAAAAAAAAAAAAAAAAAAAAAAAAAAAAAAAAAAAZAAAAAEAAABAAAAAAAAAAAAAAAAAAAAAAAAAAAAAAAAAAAAAAAAAAAAAAAAAAAAAAAAAAAAAAAAAAAAAAAAAAAAAAAAAAAAAAAAAAAAAAAAAAAAAAAAAAAAAAAAAAAAAFAAAADwAAAAAAAAAAAAAAAAAAAkUAAAAAQAAABQAAAAUAAAAFAAAAAEAAAAAAAAAZAAAAGQAAAAAAAAAZAAAAGQAAAAVAAAAYAAAAAAAAAAAAAAADwAAACADAAAAAAAAAAAAAAEAAACgMgAAVgcAAKr4//8BAAAAf39/AAEAAABkAAAAAAAAABQAAABAHwAAAAAAACYAAAAAAAAAwOD//wAAAAAmAAAAZAAAABYAAABMAAAAAAAAAAAAAAAEAAAAAAAAAAEAAAAsPEMKAAAAACgAAAAoAAAAZAAAAGQAAAAAAAAAzMzMAAAAAABQAAAAUAAAAGQAAABkAAAAAAAAABcAAAAUAAAAAAAAAAAAAAD/fwAA/38AAAAAAAAJAAAABAAAAEwAaQAMAAAAEAAAAAAAAAAAAAAAAAAAAAAAAAAeAAAAaAAAAAAAAAAAAAAAAAAAAAAAAAAAAAAAECcAABAnAAAAAAAAAAAAAAAAAAAAAAAAAAAAAAAAAAAAAAAAAAAAABQAAAAAAAAAwMD/AAAAAABkAAAAMgAAAAAAAABkAAAAAAAAAH9/fwAKAAAAHwAAAFQAAACQwiYF////AQAAAAAAAAAAAAAAAAAAAAAAAAAAAAAAAAAAAAAAAAAAAAAAAn9/fwAsPEMDzMzMAMDA/wB/f38AAAAAAAAAAAAAAAAAAAAAAAAAAAAhAAAAGAAAABQAAAArBAAAwAMAAA05AADgCwAAEAAAACYAAAAIAAAAAAAAAAAAAAA="/>
               </a:ext>
             </a:extLst>
           </p:cNvSpPr>
@@ -25114,7 +25782,7 @@
             <a:spLocks noGrp="1" noChangeArrowheads="1"/>
             <a:extLst>
               <a:ext uri="smNativeData">
-                <pr:smNativeData xmlns="" xmlns:p14="http://schemas.microsoft.com/office/powerpoint/2010/main" xmlns:pr="smNativeData" val="SMDATA_13_w78LXxMAAAAlAAAAZAAAAA0AAAAAkAAAAJAAAACQAAAAkAAAAAAAAAAAAAAAAAAAAAEAAABQAAAAAAAAAAAA4D8AAAAAAADgPwAAAAAAAOA/AAAAAAAA4D8AAAAAAADgPwAAAAAAAOA/AAAAAAAA4D8AAAAAAADgPwAAAAAAAOA/AAAAAAAA4D8CAAAAjAAAAAAAAAAAAAAAkMImDP///wgAAAAAAAAAAAAAAAAAAAAAAAAAAAAAAAAAAAAAZAAAAAEAAABAAAAAAAAAAAAAAAAAAAAAAAAAAAAAAAAAAAAAAAAAAAAAAAAAAAAAAAAAAAAAAAAAAAAAAAAAAAAAAAAAAAAAAAAAAAAAAAAAAAAAAAAAAAAAAAAAAAAAFAAAADwAAAAAAAAAAAAAAAAAAAkUAAAAAQAAABQAAAAUAAAAFAAAAAEAAAAAAAAAZAAAAGQAAAAAAAAAZAAAAGQAAAAVAAAAYAAAAAAAAAAAAAAADwAAACADAAAAAAAAAAAAAAEAAACgMgAAVgcAAKr4//8BAAAAf39/AAEAAABkAAAAAAAAABQAAABAHwAAAAAAACYAAAAAAAAAwOD//wAAAAAmAAAAZAAAABYAAABMAAAAAAAAAAAAAAAEAAAAAAAAAAEAAAAsPEMKAAAAACgAAAAoAAAAZAAAAGQAAAAAAAAAzMzMAAAAAABQAAAAUAAAAGQAAABkAAAAAAAAABcAAAAUAAAAAAAAAAAAAAD/fwAA/38AAAAAAAAJAAAABAAAAAAAAAAMAAAAEAAAAAAAAAAAAAAAAAAAAAAAAAAeAAAAaAAAAAAAAAAAAAAAAAAAAAAAAAAAAAAAECcAABAnAAAAAAAAAAAAAAAAAAAAAAAAAAAAAAAAAAAAAAAAAAAAABQAAAAAAAAAwMD/AAAAAABkAAAAMgAAAAAAAABkAAAAAAAAAH9/fwAKAAAAHwAAAFQAAACQwiYF////AQAAAAAAAAAAAAAAAAAAAAAAAAAAAAAAAAAAAAAAAAAAAAAAAn9/fwAsPEMDzMzMAMDA/wB/f38AAAAAAAAAAAAAAAAAAAAAAAAAAAAhAAAAGAAAABQAAAArBAAASw0AAA05AAAqJQAAEAAAACYAAAAIAAAAAAAAAAAAAAA="/>
+                <pr:smNativeData xmlns:pr="smNativeData" xmlns:p14="http://schemas.microsoft.com/office/powerpoint/2010/main" xmlns="" val="SMDATA_13_w78LXxMAAAAlAAAAZAAAAA0AAAAAkAAAAJAAAACQAAAAkAAAAAAAAAAAAAAAAAAAAAEAAABQAAAAAAAAAAAA4D8AAAAAAADgPwAAAAAAAOA/AAAAAAAA4D8AAAAAAADgPwAAAAAAAOA/AAAAAAAA4D8AAAAAAADgPwAAAAAAAOA/AAAAAAAA4D8CAAAAjAAAAAAAAAAAAAAAkMImDP///wgAAAAAAAAAAAAAAAAAAAAAAAAAAAAAAAAAAAAAZAAAAAEAAABAAAAAAAAAAAAAAAAAAAAAAAAAAAAAAAAAAAAAAAAAAAAAAAAAAAAAAAAAAAAAAAAAAAAAAAAAAAAAAAAAAAAAAAAAAAAAAAAAAAAAAAAAAAAAAAAAAAAAFAAAADwAAAAAAAAAAAAAAAAAAAkUAAAAAQAAABQAAAAUAAAAFAAAAAEAAAAAAAAAZAAAAGQAAAAAAAAAZAAAAGQAAAAVAAAAYAAAAAAAAAAAAAAADwAAACADAAAAAAAAAAAAAAEAAACgMgAAVgcAAKr4//8BAAAAf39/AAEAAABkAAAAAAAAABQAAABAHwAAAAAAACYAAAAAAAAAwOD//wAAAAAmAAAAZAAAABYAAABMAAAAAAAAAAAAAAAEAAAAAAAAAAEAAAAsPEMKAAAAACgAAAAoAAAAZAAAAGQAAAAAAAAAzMzMAAAAAABQAAAAUAAAAGQAAABkAAAAAAAAABcAAAAUAAAAAAAAAAAAAAD/fwAA/38AAAAAAAAJAAAABAAAAAAAAAAMAAAAEAAAAAAAAAAAAAAAAAAAAAAAAAAeAAAAaAAAAAAAAAAAAAAAAAAAAAAAAAAAAAAAECcAABAnAAAAAAAAAAAAAAAAAAAAAAAAAAAAAAAAAAAAAAAAAAAAABQAAAAAAAAAwMD/AAAAAABkAAAAMgAAAAAAAABkAAAAAAAAAH9/fwAKAAAAHwAAAFQAAACQwiYF////AQAAAAAAAAAAAAAAAAAAAAAAAAAAAAAAAAAAAAAAAAAAAAAAAn9/fwAsPEMDzMzMAMDA/wB/f38AAAAAAAAAAAAAAAAAAAAAAAAAAAAhAAAAGAAAABQAAAArBAAASw0AAA05AAAqJQAAEAAAACYAAAAIAAAAAAAAAAAAAAA="/>
               </a:ext>
             </a:extLst>
           </p:cNvSpPr>
@@ -25206,94 +25874,7 @@
 </p:sld>
 </file>
 
-<file path=ppt/slides/slide2.xml><?xml version="1.0" encoding="utf-8"?>
-<p:sld xmlns:a="http://schemas.openxmlformats.org/drawingml/2006/main" xmlns:r="http://schemas.openxmlformats.org/officeDocument/2006/relationships" xmlns:p="http://schemas.openxmlformats.org/presentationml/2006/main">
-  <p:cSld>
-    <p:spTree>
-      <p:nvGrpSpPr>
-        <p:cNvPr id="1" name=""/>
-        <p:cNvGrpSpPr/>
-        <p:nvPr/>
-      </p:nvGrpSpPr>
-      <p:grpSpPr>
-        <a:xfrm>
-          <a:off x="0" y="0"/>
-          <a:ext cx="0" cy="0"/>
-          <a:chOff x="0" y="0"/>
-          <a:chExt cx="0" cy="0"/>
-        </a:xfrm>
-      </p:grpSpPr>
-      <p:sp>
-        <p:nvSpPr>
-          <p:cNvPr id="2" name="Shape 150"/>
-          <p:cNvSpPr>
-            <a:spLocks noGrp="1" noChangeArrowheads="1"/>
-            <a:extLst>
-              <a:ext uri="smNativeData">
-                <pr:smNativeData xmlns="" xmlns:p14="http://schemas.microsoft.com/office/powerpoint/2010/main" xmlns:pr="smNativeData" val="SMDATA_13_w78LXxMAAAAlAAAAZAAAAA0AAAAAkAAAAEgAAACQAAAASAAAAAAAAAAAAAAAAAAAAAEAAABQAAAAAAAAAAAA4D8AAAAAAADgPwAAAAAAAOA/AAAAAAAA4D8AAAAAAADgPwAAAAAAAOA/AAAAAAAA4D8AAAAAAADgPwAAAAAAAOA/AAAAAAAA4D8CAAAAjAAAAAAAAAAAAAAAkMImDP///wgAAAAAAAAAAAAAAAAAAAAAAAAAAAAAAAAAAAAAZAAAAAEAAABAAAAAAAAAAAAAAAAAAAAAAAAAAAAAAAAAAAAAAAAAAAAAAAAAAAAAAAAAAAAAAAAAAAAAAAAAAAAAAAAAAAAAAAAAAAAAAAAAAAAAAAAAAAAAAAAAAAAAFAAAADwAAAAAAAAAAAAAAAAAAAkUAAAAAQAAABQAAAAUAAAAFAAAAAEAAAAAAAAAZAAAAGQAAAAAAAAAZAAAAGQAAAAVAAAAYAAAAAAAAAAAAAAADwAAACADAAAAAAAAAAAAAAEAAACgMgAAVgcAAKr4//8BAAAAf39/AAEAAABkAAAAAAAAABQAAABAHwAAAAAAACYAAAAAAAAAwOD//wAAAAAmAAAAZAAAABYAAABMAAAAAAAAAAAAAAAEAAAAAAAAAAEAAAAsPEMKAAAAACgAAAAoAAAAZAAAAGQAAAAAAAAAzMzMAAAAAABQAAAAUAAAAGQAAABkAAAAAAAAABcAAAAUAAAAAAAAAAAAAAD/fwAA/38AAAAAAAAJAAAABAAAALMPAAAMAAAAEAAAAAAAAAAAAAAAAAAAAAAAAAAeAAAAaAAAAAAAAAAAAAAAAAAAAAAAAAAAAAAAECcAABAnAAAAAAAAAAAAAAAAAAAAAAAAAAAAAAAAAAAAAAAAAAAAABQAAAAAAAAAwMD/AAAAAABkAAAAMgAAAAAAAABkAAAAAAAAAH9/fwAKAAAAHwAAAFQAAACQwiYF////AQAAAAAAAAAAAAAAAAAAAAAAAAAAAAAAAAAAAAAAAAAAAAAAAn9/fwAsPEMDzMzMAMDA/wB/f38AAAAAAAAAAAAAAAAAAAAAAAAAAAAhAAAAGAAAABQAAAArBAAAwAMAAA05AADgCwAAEAAAACYAAAAIAAAAPDAAAP8fAAA="/>
-              </a:ext>
-            </a:extLst>
-          </p:cNvSpPr>
-          <p:nvPr>
-            <p:ph type="title"/>
-          </p:nvPr>
-        </p:nvSpPr>
-        <p:spPr>
-          <a:noFill/>
-          <a:ln>
-            <a:noFill/>
-          </a:ln>
-        </p:spPr>
-        <p:txBody>
-          <a:bodyPr vert="horz" wrap="square" lIns="91440" tIns="45720" rIns="91440" bIns="45720" numCol="1" spcCol="215900" anchor="t">
-            <a:prstTxWarp prst="textNoShape">
-              <a:avLst/>
-            </a:prstTxWarp>
-          </a:bodyPr>
-          <a:lstStyle/>
-          <a:p>
-            <a:pPr marL="0" marR="0" indent="0" algn="l">
-              <a:spcBef>
-                <a:spcPts val="0"/>
-              </a:spcBef>
-              <a:spcAft>
-                <a:spcPts val="0"/>
-              </a:spcAft>
-              <a:buNone/>
-            </a:pPr>
-            <a:r>
-              <a:rPr lang="es-es"/>
-              <a:t>Locators</a:t>
-            </a:r>
-            <a:endParaRPr/>
-          </a:p>
-        </p:txBody>
-      </p:sp>
-      <p:graphicFrame>
-        <p:nvGraphicFramePr>
-          <p:cNvPr id="3" name="Diagram 1"/>
-          <p:cNvGraphicFramePr/>
-          <p:nvPr/>
-        </p:nvGraphicFramePr>
-        <p:xfrm>
-          <a:off x="1359535" y="1360805"/>
-          <a:ext cx="8128000" cy="5418455"/>
-        </p:xfrm>
-        <a:graphic>
-          <a:graphicData uri="http://schemas.openxmlformats.org/drawingml/2006/diagram">
-            <dgm:relIds xmlns:dgm="http://schemas.openxmlformats.org/drawingml/2006/diagram" xmlns:r="http://schemas.openxmlformats.org/officeDocument/2006/relationships" r:dm="rId3" r:lo="rId4" r:qs="rId5" r:cs="rId6"/>
-          </a:graphicData>
-        </a:graphic>
-      </p:graphicFrame>
-    </p:spTree>
-  </p:cSld>
-  <p:clrMapOvr>
-    <a:masterClrMapping/>
-  </p:clrMapOvr>
-</p:sld>
-</file>
-
-<file path=ppt/slides/slide20.xml><?xml version="1.0" encoding="utf-8"?>
+<file path=ppt/slides/slide25.xml><?xml version="1.0" encoding="utf-8"?>
 <p:sld xmlns:a="http://schemas.openxmlformats.org/drawingml/2006/main" xmlns:r="http://schemas.openxmlformats.org/officeDocument/2006/relationships" xmlns:p="http://schemas.openxmlformats.org/presentationml/2006/main">
   <p:cSld>
     <p:spTree>
@@ -25317,7 +25898,7 @@
             <a:spLocks noGrp="1" noChangeArrowheads="1"/>
             <a:extLst>
               <a:ext uri="smNativeData">
-                <pr:smNativeData xmlns="" xmlns:p14="http://schemas.microsoft.com/office/powerpoint/2010/main" xmlns:pr="smNativeData" val="SMDATA_13_w78LXxMAAAAlAAAAZAAAAA0AAAAAkAAAAJAAAACQAAAAkAAAAAAAAAAAAAAAAAAAAAEAAABQAAAAAAAAAAAA4D8AAAAAAADgPwAAAAAAAOA/AAAAAAAA4D8AAAAAAADgPwAAAAAAAOA/AAAAAAAA4D8AAAAAAADgPwAAAAAAAOA/AAAAAAAA4D8CAAAAjAAAAAAAAAAAAAAAkMImDP///wgAAAAAAAAAAAAAAAAAAAAAAAAAAAAAAAAAAAAAZAAAAAEAAABAAAAAAAAAAAAAAAAAAAAAAAAAAAAAAAAAAAAAAAAAAAAAAAAAAAAAAAAAAAAAAAAAAAAAAAAAAAAAAAAAAAAAAAAAAAAAAAAAAAAAAAAAAAAAAAAAAAAAFAAAADwAAAAAAAAAAAAAAAAAAAkUAAAAAQAAABQAAAAUAAAAFAAAAAEAAAAAAAAAZAAAAGQAAAAAAAAAZAAAAGQAAAAVAAAAYAAAAAAAAAAAAAAADwAAACADAAAAAAAAAAAAAAEAAACgMgAAVgcAAKr4//8BAAAAf39/AAEAAABkAAAAAAAAABQAAABAHwAAAAAAACYAAAAAAAAAwOD//wAAAAAmAAAAZAAAABYAAABMAAAAAAAAAAAAAAAEAAAAAAAAAAEAAAAsPEMKAAAAACgAAAAoAAAAZAAAAGQAAAAAAAAAzMzMAAAAAABQAAAAUAAAAGQAAABkAAAAAAAAABcAAAAUAAAAAAAAAAAAAAD/fwAA/38AAAAAAAAJAAAABAAAAIBDAAAMAAAAEAAAAAAAAAAAAAAAAAAAAAAAAAAeAAAAaAAAAAAAAAAAAAAAAAAAAAAAAAAAAAAAECcAABAnAAAAAAAAAAAAAAAAAAAAAAAAAAAAAAAAAAAAAAAAAAAAABQAAAAAAAAAwMD/AAAAAABkAAAAMgAAAAAAAABkAAAAAAAAAH9/fwAKAAAAHwAAAFQAAACQwiYF////AQAAAAAAAAAAAAAAAAAAAAAAAAAAAAAAAAAAAAAAAAAAAAAAAn9/fwAsPEMDzMzMAMDA/wB/f38AAAAAAAAAAAAAAAAAAAAAAAAAAAAhAAAAGAAAABQAAAArBAAAwAMAAA05AADgCwAAEAAAACYAAAAIAAAAAAAAAAAAAAA="/>
+                <pr:smNativeData xmlns:pr="smNativeData" xmlns:p14="http://schemas.microsoft.com/office/powerpoint/2010/main" xmlns="" val="SMDATA_13_w78LXxMAAAAlAAAAZAAAAA0AAAAAkAAAAJAAAACQAAAAkAAAAAAAAAAAAAAAAAAAAAEAAABQAAAAAAAAAAAA4D8AAAAAAADgPwAAAAAAAOA/AAAAAAAA4D8AAAAAAADgPwAAAAAAAOA/AAAAAAAA4D8AAAAAAADgPwAAAAAAAOA/AAAAAAAA4D8CAAAAjAAAAAAAAAAAAAAAkMImDP///wgAAAAAAAAAAAAAAAAAAAAAAAAAAAAAAAAAAAAAZAAAAAEAAABAAAAAAAAAAAAAAAAAAAAAAAAAAAAAAAAAAAAAAAAAAAAAAAAAAAAAAAAAAAAAAAAAAAAAAAAAAAAAAAAAAAAAAAAAAAAAAAAAAAAAAAAAAAAAAAAAAAAAFAAAADwAAAAAAAAAAAAAAAAAAAkUAAAAAQAAABQAAAAUAAAAFAAAAAEAAAAAAAAAZAAAAGQAAAAAAAAAZAAAAGQAAAAVAAAAYAAAAAAAAAAAAAAADwAAACADAAAAAAAAAAAAAAEAAACgMgAAVgcAAKr4//8BAAAAf39/AAEAAABkAAAAAAAAABQAAABAHwAAAAAAACYAAAAAAAAAwOD//wAAAAAmAAAAZAAAABYAAABMAAAAAAAAAAAAAAAEAAAAAAAAAAEAAAAsPEMKAAAAACgAAAAoAAAAZAAAAGQAAAAAAAAAzMzMAAAAAABQAAAAUAAAAGQAAABkAAAAAAAAABcAAAAUAAAAAAAAAAAAAAD/fwAA/38AAAAAAAAJAAAABAAAAIBDAAAMAAAAEAAAAAAAAAAAAAAAAAAAAAAAAAAeAAAAaAAAAAAAAAAAAAAAAAAAAAAAAAAAAAAAECcAABAnAAAAAAAAAAAAAAAAAAAAAAAAAAAAAAAAAAAAAAAAAAAAABQAAAAAAAAAwMD/AAAAAABkAAAAMgAAAAAAAABkAAAAAAAAAH9/fwAKAAAAHwAAAFQAAACQwiYF////AQAAAAAAAAAAAAAAAAAAAAAAAAAAAAAAAAAAAAAAAAAAAAAAAn9/fwAsPEMDzMzMAMDA/wB/f38AAAAAAAAAAAAAAAAAAAAAAAAAAAAhAAAAGAAAABQAAAArBAAAwAMAAA05AADgCwAAEAAAACYAAAAIAAAAAAAAAAAAAAA="/>
               </a:ext>
             </a:extLst>
           </p:cNvSpPr>
@@ -25344,7 +25925,7 @@
             <a:spLocks noGrp="1" noChangeArrowheads="1"/>
             <a:extLst>
               <a:ext uri="smNativeData">
-                <pr:smNativeData xmlns="" xmlns:p14="http://schemas.microsoft.com/office/powerpoint/2010/main" xmlns:pr="smNativeData" val="SMDATA_13_w78LXxMAAAAlAAAAZAAAAA0AAAAAkAAAAJAAAACQAAAAkAAAAAAAAAAAAAAAAAAAAAEAAABQAAAAAAAAAAAA4D8AAAAAAADgPwAAAAAAAOA/AAAAAAAA4D8AAAAAAADgPwAAAAAAAOA/AAAAAAAA4D8AAAAAAADgPwAAAAAAAOA/AAAAAAAA4D8CAAAAjAAAAAAAAAAAAAAAkMImDP///wgAAAAAAAAAAAAAAAAAAAAAAAAAAAAAAAAAAAAAZAAAAAEAAABAAAAAAAAAAAAAAAAAAAAAAAAAAAAAAAAAAAAAAAAAAAAAAAAAAAAAAAAAAAAAAAAAAAAAAAAAAAAAAAAAAAAAAAAAAAAAAAAAAAAAAAAAAAAAAAAAAAAAFAAAADwAAAAAAAAAAAAAAAAAAAkUAAAAAQAAABQAAAAUAAAAFAAAAAEAAAAAAAAAZAAAAGQAAAAAAAAAZAAAAGQAAAAVAAAAYAAAAAAAAAAAAAAADwAAACADAAAAAAAAAAAAAAEAAACgMgAAVgcAAKr4//8BAAAAf39/AAEAAABkAAAAAAAAABQAAABAHwAAAAAAACYAAAAAAAAAwOD//wAAAAAmAAAAZAAAABYAAABMAAAAAAAAAAAAAAAEAAAAAAAAAAEAAAAsPEMKAAAAACgAAAAoAAAAZAAAAGQAAAAAAAAAzMzMAAAAAABQAAAAUAAAAGQAAABkAAAAAAAAABcAAAAUAAAAAAAAAAAAAAD/fwAA/38AAAAAAAAJAAAABAAAAAB/AAAMAAAAEAAAAAAAAAAAAAAAAAAAAAAAAAAeAAAAaAAAAAAAAAAAAAAAAAAAAAAAAAAAAAAAECcAABAnAAAAAAAAAAAAAAAAAAAAAAAAAAAAAAAAAAAAAAAAAAAAABQAAAAAAAAAwMD/AAAAAABkAAAAMgAAAAAAAABkAAAAAAAAAH9/fwAKAAAAHwAAAFQAAACQwiYF////AQAAAAAAAAAAAAAAAAAAAAAAAAAAAAAAAAAAAAAAAAAAAAAAAn9/fwAsPEMDzMzMAMDA/wB/f38AAAAAAAAAAAAAAAAAAAAAAAAAAAAhAAAAGAAAABQAAAArBAAAxQoAAA05AACkIgAAEAAAACYAAAAIAAAAAQAAAAAAAAA="/>
+                <pr:smNativeData xmlns:pr="smNativeData" xmlns:p14="http://schemas.microsoft.com/office/powerpoint/2010/main" xmlns="" val="SMDATA_13_w78LXxMAAAAlAAAAZAAAAA0AAAAAkAAAAJAAAACQAAAAkAAAAAAAAAAAAAAAAAAAAAEAAABQAAAAAAAAAAAA4D8AAAAAAADgPwAAAAAAAOA/AAAAAAAA4D8AAAAAAADgPwAAAAAAAOA/AAAAAAAA4D8AAAAAAADgPwAAAAAAAOA/AAAAAAAA4D8CAAAAjAAAAAAAAAAAAAAAkMImDP///wgAAAAAAAAAAAAAAAAAAAAAAAAAAAAAAAAAAAAAZAAAAAEAAABAAAAAAAAAAAAAAAAAAAAAAAAAAAAAAAAAAAAAAAAAAAAAAAAAAAAAAAAAAAAAAAAAAAAAAAAAAAAAAAAAAAAAAAAAAAAAAAAAAAAAAAAAAAAAAAAAAAAAFAAAADwAAAAAAAAAAAAAAAAAAAkUAAAAAQAAABQAAAAUAAAAFAAAAAEAAAAAAAAAZAAAAGQAAAAAAAAAZAAAAGQAAAAVAAAAYAAAAAAAAAAAAAAADwAAACADAAAAAAAAAAAAAAEAAACgMgAAVgcAAKr4//8BAAAAf39/AAEAAABkAAAAAAAAABQAAABAHwAAAAAAACYAAAAAAAAAwOD//wAAAAAmAAAAZAAAABYAAABMAAAAAAAAAAAAAAAEAAAAAAAAAAEAAAAsPEMKAAAAACgAAAAoAAAAZAAAAGQAAAAAAAAAzMzMAAAAAABQAAAAUAAAAGQAAABkAAAAAAAAABcAAAAUAAAAAAAAAAAAAAD/fwAA/38AAAAAAAAJAAAABAAAAAB/AAAMAAAAEAAAAAAAAAAAAAAAAAAAAAAAAAAeAAAAaAAAAAAAAAAAAAAAAAAAAAAAAAAAAAAAECcAABAnAAAAAAAAAAAAAAAAAAAAAAAAAAAAAAAAAAAAAAAAAAAAABQAAAAAAAAAwMD/AAAAAABkAAAAMgAAAAAAAABkAAAAAAAAAH9/fwAKAAAAHwAAAFQAAACQwiYF////AQAAAAAAAAAAAAAAAAAAAAAAAAAAAAAAAAAAAAAAAAAAAAAAAn9/fwAsPEMDzMzMAMDA/wB/f38AAAAAAAAAAAAAAAAAAAAAAAAAAAAhAAAAGAAAABQAAAArBAAAxQoAAA05AACkIgAAEAAAACYAAAAIAAAAAQAAAAAAAAA="/>
               </a:ext>
             </a:extLst>
           </p:cNvSpPr>
@@ -25462,7 +26043,7 @@
 </p:sld>
 </file>
 
-<file path=ppt/slides/slide21.xml><?xml version="1.0" encoding="utf-8"?>
+<file path=ppt/slides/slide26.xml><?xml version="1.0" encoding="utf-8"?>
 <p:sld xmlns:a="http://schemas.openxmlformats.org/drawingml/2006/main" xmlns:r="http://schemas.openxmlformats.org/officeDocument/2006/relationships" xmlns:p="http://schemas.openxmlformats.org/presentationml/2006/main">
   <p:cSld>
     <p:spTree>
@@ -25486,7 +26067,7 @@
             <a:spLocks noGrp="1" noChangeArrowheads="1"/>
             <a:extLst>
               <a:ext uri="smNativeData">
-                <pr:smNativeData xmlns="" xmlns:p14="http://schemas.microsoft.com/office/powerpoint/2010/main" xmlns:pr="smNativeData" val="SMDATA_13_w78LXxMAAAAlAAAAZAAAAA0AAAAAkAAAAJAAAACQAAAAkAAAAAAAAAAAAAAAAAAAAAEAAABQAAAAAAAAAAAA4D8AAAAAAADgPwAAAAAAAOA/AAAAAAAA4D8AAAAAAADgPwAAAAAAAOA/AAAAAAAA4D8AAAAAAADgPwAAAAAAAOA/AAAAAAAA4D8CAAAAjAAAAAAAAAAAAAAAkMImDP///wgAAAAAAAAAAAAAAAAAAAAAAAAAAAAAAAAAAAAAZAAAAAEAAABAAAAAAAAAAAAAAAAAAAAAAAAAAAAAAAAAAAAAAAAAAAAAAAAAAAAAAAAAAAAAAAAAAAAAAAAAAAAAAAAAAAAAAAAAAAAAAAAAAAAAAAAAAAAAAAAAAAAAFAAAADwAAAAAAAAAAAAAAAAAAAkUAAAAAQAAABQAAAAUAAAAFAAAAAEAAAAAAAAAZAAAAGQAAAAAAAAAZAAAAGQAAAAVAAAAYAAAAAAAAAAAAAAADwAAACADAAAAAAAAAAAAAAEAAACgMgAAVgcAAKr4//8BAAAAf39/AAEAAABkAAAAAAAAABQAAABAHwAAAAAAACYAAAAAAAAAwOD//wAAAAAmAAAAZAAAABYAAABMAAAAAAAAAAAAAAAEAAAAAAAAAAEAAAAsPEMKAAAAACgAAAAoAAAAZAAAAGQAAAAAAAAAzMzMAAAAAABQAAAAUAAAAGQAAABkAAAAAAAAABcAAAAUAAAAAAAAAAAAAAD/fwAA/38AAAAAAAAJAAAABAAAAE8AAAAMAAAAEAAAAAAAAAAAAAAAAAAAAAAAAAAeAAAAaAAAAAAAAAAAAAAAAAAAAAAAAAAAAAAAECcAABAnAAAAAAAAAAAAAAAAAAAAAAAAAAAAAAAAAAAAAAAAAAAAABQAAAAAAAAAwMD/AAAAAABkAAAAMgAAAAAAAABkAAAAAAAAAH9/fwAKAAAAHwAAAFQAAACQwiYF////AQAAAAAAAAAAAAAAAAAAAAAAAAAAAAAAAAAAAAAAAAAAAAAAAn9/fwAsPEMDzMzMAMDA/wB/f38AAAAAAAAAAAAAAAAAAAAAAAAAAAAhAAAAGAAAABQAAAArBAAAwAMAAA05AADgCwAAEAAAACYAAAAIAAAAAAAAAAAAAAA="/>
+                <pr:smNativeData xmlns:pr="smNativeData" xmlns:p14="http://schemas.microsoft.com/office/powerpoint/2010/main" xmlns="" val="SMDATA_13_w78LXxMAAAAlAAAAZAAAAA0AAAAAkAAAAJAAAACQAAAAkAAAAAAAAAAAAAAAAAAAAAEAAABQAAAAAAAAAAAA4D8AAAAAAADgPwAAAAAAAOA/AAAAAAAA4D8AAAAAAADgPwAAAAAAAOA/AAAAAAAA4D8AAAAAAADgPwAAAAAAAOA/AAAAAAAA4D8CAAAAjAAAAAAAAAAAAAAAkMImDP///wgAAAAAAAAAAAAAAAAAAAAAAAAAAAAAAAAAAAAAZAAAAAEAAABAAAAAAAAAAAAAAAAAAAAAAAAAAAAAAAAAAAAAAAAAAAAAAAAAAAAAAAAAAAAAAAAAAAAAAAAAAAAAAAAAAAAAAAAAAAAAAAAAAAAAAAAAAAAAAAAAAAAAFAAAADwAAAAAAAAAAAAAAAAAAAkUAAAAAQAAABQAAAAUAAAAFAAAAAEAAAAAAAAAZAAAAGQAAAAAAAAAZAAAAGQAAAAVAAAAYAAAAAAAAAAAAAAADwAAACADAAAAAAAAAAAAAAEAAACgMgAAVgcAAKr4//8BAAAAf39/AAEAAABkAAAAAAAAABQAAABAHwAAAAAAACYAAAAAAAAAwOD//wAAAAAmAAAAZAAAABYAAABMAAAAAAAAAAAAAAAEAAAAAAAAAAEAAAAsPEMKAAAAACgAAAAoAAAAZAAAAGQAAAAAAAAAzMzMAAAAAABQAAAAUAAAAGQAAABkAAAAAAAAABcAAAAUAAAAAAAAAAAAAAD/fwAA/38AAAAAAAAJAAAABAAAAE8AAAAMAAAAEAAAAAAAAAAAAAAAAAAAAAAAAAAeAAAAaAAAAAAAAAAAAAAAAAAAAAAAAAAAAAAAECcAABAnAAAAAAAAAAAAAAAAAAAAAAAAAAAAAAAAAAAAAAAAAAAAABQAAAAAAAAAwMD/AAAAAABkAAAAMgAAAAAAAABkAAAAAAAAAH9/fwAKAAAAHwAAAFQAAACQwiYF////AQAAAAAAAAAAAAAAAAAAAAAAAAAAAAAAAAAAAAAAAAAAAAAAAn9/fwAsPEMDzMzMAMDA/wB/f38AAAAAAAAAAAAAAAAAAAAAAAAAAAAhAAAAGAAAABQAAAArBAAAwAMAAA05AADgCwAAEAAAACYAAAAIAAAAAAAAAAAAAAA="/>
               </a:ext>
             </a:extLst>
           </p:cNvSpPr>
@@ -25513,7 +26094,7 @@
             <a:spLocks noGrp="1" noChangeArrowheads="1"/>
             <a:extLst>
               <a:ext uri="smNativeData">
-                <pr:smNativeData xmlns="" xmlns:p14="http://schemas.microsoft.com/office/powerpoint/2010/main" xmlns:pr="smNativeData" val="SMDATA_13_w78LXxMAAAAlAAAAZAAAAA0AAAAAkAAAAJAAAACQAAAAkAAAAAAAAAAAAAAAAAAAAAEAAABQAAAAAAAAAAAA4D8AAAAAAADgPwAAAAAAAOA/AAAAAAAA4D8AAAAAAADgPwAAAAAAAOA/AAAAAAAA4D8AAAAAAADgPwAAAAAAAOA/AAAAAAAA4D8CAAAAjAAAAAAAAAAAAAAAkMImDP///wgAAAAAAAAAAAAAAAAAAAAAAAAAAAAAAAAAAAAAZAAAAAEAAABAAAAAAAAAAAAAAAAAAAAAAAAAAAAAAAAAAAAAAAAAAAAAAAAAAAAAAAAAAAAAAAAAAAAAAAAAAAAAAAAAAAAAAAAAAAAAAAAAAAAAAAAAAAAAAAAAAAAAFAAAADwAAAAAAAAAAAAAAAAAAAkUAAAAAQAAABQAAAAUAAAAFAAAAAEAAAAAAAAAZAAAAGQAAAAAAAAAZAAAAGQAAAAVAAAAYAAAAAAAAAAAAAAADwAAACADAAAAAAAAAAAAAAEAAACgMgAAVgcAAKr4//8BAAAAf39/AAEAAABkAAAAAAAAABQAAABAHwAAAAAAACYAAAAAAAAAwOD//wAAAAAmAAAAZAAAABYAAABMAAAAAAAAAAAAAAAEAAAAAAAAAAEAAAAsPEMKAAAAACgAAAAoAAAAZAAAAGQAAAAAAAAAzMzMAAAAAABQAAAAUAAAAGQAAABkAAAAAAAAABcAAAAUAAAAAAAAAAAAAAD/fwAA/38AAAAAAAAJAAAABAAAAALYAt8MAAAAEAAAAAAAAAAAAAAAAAAAAAAAAAAeAAAAaAAAAAAAAAAAAAAAAAAAAAAAAAAAAAAAECcAABAnAAAAAAAAAAAAAAAAAAAAAAAAAAAAAAAAAAAAAAAAAAAAABQAAAAAAAAAwMD/AAAAAABkAAAAMgAAAAAAAABkAAAAAAAAAH9/fwAKAAAAHwAAAFQAAACQwiYF////AQAAAAAAAAAAAAAAAAAAAAAAAAAAAAAAAAAAAAAAAAAAAAAAAn9/fwAsPEMDzMzMAMDA/wB/f38AAAAAAAAAAAAAAAAAAAAAAAAAAAAhAAAAGAAAABQAAAArBAAAxQoAAA05AACkIgAAEAAAACYAAAAIAAAAAQAAAAAAAAA="/>
+                <pr:smNativeData xmlns:pr="smNativeData" xmlns:p14="http://schemas.microsoft.com/office/powerpoint/2010/main" xmlns="" val="SMDATA_13_w78LXxMAAAAlAAAAZAAAAA0AAAAAkAAAAJAAAACQAAAAkAAAAAAAAAAAAAAAAAAAAAEAAABQAAAAAAAAAAAA4D8AAAAAAADgPwAAAAAAAOA/AAAAAAAA4D8AAAAAAADgPwAAAAAAAOA/AAAAAAAA4D8AAAAAAADgPwAAAAAAAOA/AAAAAAAA4D8CAAAAjAAAAAAAAAAAAAAAkMImDP///wgAAAAAAAAAAAAAAAAAAAAAAAAAAAAAAAAAAAAAZAAAAAEAAABAAAAAAAAAAAAAAAAAAAAAAAAAAAAAAAAAAAAAAAAAAAAAAAAAAAAAAAAAAAAAAAAAAAAAAAAAAAAAAAAAAAAAAAAAAAAAAAAAAAAAAAAAAAAAAAAAAAAAFAAAADwAAAAAAAAAAAAAAAAAAAkUAAAAAQAAABQAAAAUAAAAFAAAAAEAAAAAAAAAZAAAAGQAAAAAAAAAZAAAAGQAAAAVAAAAYAAAAAAAAAAAAAAADwAAACADAAAAAAAAAAAAAAEAAACgMgAAVgcAAKr4//8BAAAAf39/AAEAAABkAAAAAAAAABQAAABAHwAAAAAAACYAAAAAAAAAwOD//wAAAAAmAAAAZAAAABYAAABMAAAAAAAAAAAAAAAEAAAAAAAAAAEAAAAsPEMKAAAAACgAAAAoAAAAZAAAAGQAAAAAAAAAzMzMAAAAAABQAAAAUAAAAGQAAABkAAAAAAAAABcAAAAUAAAAAAAAAAAAAAD/fwAA/38AAAAAAAAJAAAABAAAAALYAt8MAAAAEAAAAAAAAAAAAAAAAAAAAAAAAAAeAAAAaAAAAAAAAAAAAAAAAAAAAAAAAAAAAAAAECcAABAnAAAAAAAAAAAAAAAAAAAAAAAAAAAAAAAAAAAAAAAAAAAAABQAAAAAAAAAwMD/AAAAAABkAAAAMgAAAAAAAABkAAAAAAAAAH9/fwAKAAAAHwAAAFQAAACQwiYF////AQAAAAAAAAAAAAAAAAAAAAAAAAAAAAAAAAAAAAAAAAAAAAAAAn9/fwAsPEMDzMzMAMDA/wB/f38AAAAAAAAAAAAAAAAAAAAAAAAAAAAhAAAAGAAAABQAAAArBAAAxQoAAA05AACkIgAAEAAAACYAAAAIAAAAAQAAAAAAAAA="/>
               </a:ext>
             </a:extLst>
           </p:cNvSpPr>
@@ -25636,7 +26217,7 @@
 </p:sld>
 </file>
 
-<file path=ppt/slides/slide22.xml><?xml version="1.0" encoding="utf-8"?>
+<file path=ppt/slides/slide27.xml><?xml version="1.0" encoding="utf-8"?>
 <p:sld xmlns:a="http://schemas.openxmlformats.org/drawingml/2006/main" xmlns:r="http://schemas.openxmlformats.org/officeDocument/2006/relationships" xmlns:p="http://schemas.openxmlformats.org/presentationml/2006/main">
   <p:cSld>
     <p:spTree>
@@ -25660,7 +26241,7 @@
             <a:spLocks noGrp="1" noChangeArrowheads="1"/>
             <a:extLst>
               <a:ext uri="smNativeData">
-                <pr:smNativeData xmlns="" xmlns:p14="http://schemas.microsoft.com/office/powerpoint/2010/main" xmlns:pr="smNativeData" val="SMDATA_13_w78LXxMAAAAlAAAAZAAAAA0AAAAAkAAAAJAAAACQAAAAkAAAAAAAAAAAAAAAAAAAAAEAAABQAAAAAAAAAAAA4D8AAAAAAADgPwAAAAAAAOA/AAAAAAAA4D8AAAAAAADgPwAAAAAAAOA/AAAAAAAA4D8AAAAAAADgPwAAAAAAAOA/AAAAAAAA4D8CAAAAjAAAAAAAAAAAAAAAkMImDP///wgAAAAAAAAAAAAAAAAAAAAAAAAAAAAAAAAAAAAAZAAAAAEAAABAAAAAAAAAAAAAAAAAAAAAAAAAAAAAAAAAAAAAAAAAAAAAAAAAAAAAAAAAAAAAAAAAAAAAAAAAAAAAAAAAAAAAAAAAAAAAAAAAAAAAAAAAAAAAAAAAAAAAFAAAADwAAAAAAAAAAAAAAAAAAAkUAAAAAQAAABQAAAAUAAAAFAAAAAEAAAAAAAAAZAAAAGQAAAAAAAAAZAAAAGQAAAAVAAAAYAAAAAAAAAAAAAAADwAAACADAAAAAAAAAAAAAAEAAACgMgAAVgcAAKr4//8BAAAAf39/AAEAAABkAAAAAAAAABQAAABAHwAAAAAAACYAAAAAAAAAwOD//wAAAAAmAAAAZAAAABYAAABMAAAAAAAAAAAAAAAEAAAAAAAAAAEAAAAsPEMKAAAAACgAAAAoAAAAZAAAAGQAAAAAAAAAzMzMAAAAAABQAAAAUAAAAGQAAABkAAAAAAAAABcAAAAUAAAAAAAAAAAAAAD/fwAA/38AAAAAAAAJAAAABAAAAAwBDAsMAAAAEAAAAAAAAAAAAAAAAAAAAAAAAAAeAAAAaAAAAAAAAAAAAAAAAAAAAAAAAAAAAAAAECcAABAnAAAAAAAAAAAAAAAAAAAAAAAAAAAAAAAAAAAAAAAAAAAAABQAAAAAAAAAwMD/AAAAAABkAAAAMgAAAAAAAABkAAAAAAAAAH9/fwAKAAAAHwAAAFQAAACQwiYF////AQAAAAAAAAAAAAAAAAAAAAAAAAAAAAAAAAAAAAAAAAAAAAAAAn9/fwAsPEMDzMzMAMDA/wB/f38AAAAAAAAAAAAAAAAAAAAAAAAAAAAhAAAAGAAAABQAAAArBAAAwAMAAA05AADgCwAAEAAAACYAAAAIAAAAAAAAAAAAAAA="/>
+                <pr:smNativeData xmlns:pr="smNativeData" xmlns:p14="http://schemas.microsoft.com/office/powerpoint/2010/main" xmlns="" val="SMDATA_13_w78LXxMAAAAlAAAAZAAAAA0AAAAAkAAAAJAAAACQAAAAkAAAAAAAAAAAAAAAAAAAAAEAAABQAAAAAAAAAAAA4D8AAAAAAADgPwAAAAAAAOA/AAAAAAAA4D8AAAAAAADgPwAAAAAAAOA/AAAAAAAA4D8AAAAAAADgPwAAAAAAAOA/AAAAAAAA4D8CAAAAjAAAAAAAAAAAAAAAkMImDP///wgAAAAAAAAAAAAAAAAAAAAAAAAAAAAAAAAAAAAAZAAAAAEAAABAAAAAAAAAAAAAAAAAAAAAAAAAAAAAAAAAAAAAAAAAAAAAAAAAAAAAAAAAAAAAAAAAAAAAAAAAAAAAAAAAAAAAAAAAAAAAAAAAAAAAAAAAAAAAAAAAAAAAFAAAADwAAAAAAAAAAAAAAAAAAAkUAAAAAQAAABQAAAAUAAAAFAAAAAEAAAAAAAAAZAAAAGQAAAAAAAAAZAAAAGQAAAAVAAAAYAAAAAAAAAAAAAAADwAAACADAAAAAAAAAAAAAAEAAACgMgAAVgcAAKr4//8BAAAAf39/AAEAAABkAAAAAAAAABQAAABAHwAAAAAAACYAAAAAAAAAwOD//wAAAAAmAAAAZAAAABYAAABMAAAAAAAAAAAAAAAEAAAAAAAAAAEAAAAsPEMKAAAAACgAAAAoAAAAZAAAAGQAAAAAAAAAzMzMAAAAAABQAAAAUAAAAGQAAABkAAAAAAAAABcAAAAUAAAAAAAAAAAAAAD/fwAA/38AAAAAAAAJAAAABAAAAAwBDAsMAAAAEAAAAAAAAAAAAAAAAAAAAAAAAAAeAAAAaAAAAAAAAAAAAAAAAAAAAAAAAAAAAAAAECcAABAnAAAAAAAAAAAAAAAAAAAAAAAAAAAAAAAAAAAAAAAAAAAAABQAAAAAAAAAwMD/AAAAAABkAAAAMgAAAAAAAABkAAAAAAAAAH9/fwAKAAAAHwAAAFQAAACQwiYF////AQAAAAAAAAAAAAAAAAAAAAAAAAAAAAAAAAAAAAAAAAAAAAAAAn9/fwAsPEMDzMzMAMDA/wB/f38AAAAAAAAAAAAAAAAAAAAAAAAAAAAhAAAAGAAAABQAAAArBAAAwAMAAA05AADgCwAAEAAAACYAAAAIAAAAAAAAAAAAAAA="/>
               </a:ext>
             </a:extLst>
           </p:cNvSpPr>
@@ -25687,7 +26268,7 @@
             <a:spLocks noGrp="1" noChangeArrowheads="1"/>
             <a:extLst>
               <a:ext uri="smNativeData">
-                <pr:smNativeData xmlns="" xmlns:p14="http://schemas.microsoft.com/office/powerpoint/2010/main" xmlns:pr="smNativeData" val="SMDATA_13_w78LXxMAAAAlAAAAZAAAAA0AAAAAkAAAAJAAAACQAAAAkAAAAAAAAAAAAAAAAAAAAAEAAABQAAAAAAAAAAAA4D8AAAAAAADgPwAAAAAAAOA/AAAAAAAA4D8AAAAAAADgPwAAAAAAAOA/AAAAAAAA4D8AAAAAAADgPwAAAAAAAOA/AAAAAAAA4D8CAAAAjAAAAAAAAAAAAAAAkMImDP///wgAAAAAAAAAAAAAAAAAAAAAAAAAAAAAAAAAAAAAZAAAAAEAAABAAAAAAAAAAAAAAAAAAAAAAAAAAAAAAAAAAAAAAAAAAAAAAAAAAAAAAAAAAAAAAAAAAAAAAAAAAAAAAAAAAAAAAAAAAAAAAAAAAAAAAAAAAAAAAAAAAAAAFAAAADwAAAAAAAAAAAAAAAAAAAkUAAAAAQAAABQAAAAUAAAAFAAAAAEAAAAAAAAAZAAAAGQAAAAAAAAAZAAAAGQAAAAVAAAAYAAAAAAAAAAAAAAADwAAACADAAAAAAAAAAAAAAEAAACgMgAAVgcAAKr4//8BAAAAf39/AAEAAABkAAAAAAAAABQAAABAHwAAAAAAACYAAAAAAAAAwOD//wAAAAAmAAAAZAAAABYAAABMAAAAAAAAAAAAAAAEAAAAAAAAAAEAAAAsPEMKAAAAACgAAAAoAAAAZAAAAGQAAAAAAAAAzMzMAAAAAABQAAAAUAAAAGQAAABkAAAAAAAAABcAAAAUAAAAAAAAAAAAAAD/fwAA/38AAAAAAAAJAAAABAAAAADnAB8MAAAAEAAAAAAAAAAAAAAAAAAAAAAAAAAeAAAAaAAAAAAAAAAAAAAAAAAAAAAAAAAAAAAAECcAABAnAAAAAAAAAAAAAAAAAAAAAAAAAAAAAAAAAAAAAAAAAAAAABQAAAAAAAAAwMD/AAAAAABkAAAAMgAAAAAAAABkAAAAAAAAAH9/fwAKAAAAHwAAAFQAAACQwiYF////AQAAAAAAAAAAAAAAAAAAAAAAAAAAAAAAAAAAAAAAAAAAAAAAAn9/fwAsPEMDzMzMAMDA/wB/f38AAAAAAAAAAAAAAAAAAAAAAAAAAAAhAAAAGAAAABQAAACFAwAAswgAAGc4AACTIAAAEAAAACYAAAAIAAAAAQAAAAAAAAA="/>
+                <pr:smNativeData xmlns:pr="smNativeData" xmlns:p14="http://schemas.microsoft.com/office/powerpoint/2010/main" xmlns="" val="SMDATA_13_w78LXxMAAAAlAAAAZAAAAA0AAAAAkAAAAJAAAACQAAAAkAAAAAAAAAAAAAAAAAAAAAEAAABQAAAAAAAAAAAA4D8AAAAAAADgPwAAAAAAAOA/AAAAAAAA4D8AAAAAAADgPwAAAAAAAOA/AAAAAAAA4D8AAAAAAADgPwAAAAAAAOA/AAAAAAAA4D8CAAAAjAAAAAAAAAAAAAAAkMImDP///wgAAAAAAAAAAAAAAAAAAAAAAAAAAAAAAAAAAAAAZAAAAAEAAABAAAAAAAAAAAAAAAAAAAAAAAAAAAAAAAAAAAAAAAAAAAAAAAAAAAAAAAAAAAAAAAAAAAAAAAAAAAAAAAAAAAAAAAAAAAAAAAAAAAAAAAAAAAAAAAAAAAAAFAAAADwAAAAAAAAAAAAAAAAAAAkUAAAAAQAAABQAAAAUAAAAFAAAAAEAAAAAAAAAZAAAAGQAAAAAAAAAZAAAAGQAAAAVAAAAYAAAAAAAAAAAAAAADwAAACADAAAAAAAAAAAAAAEAAACgMgAAVgcAAKr4//8BAAAAf39/AAEAAABkAAAAAAAAABQAAABAHwAAAAAAACYAAAAAAAAAwOD//wAAAAAmAAAAZAAAABYAAABMAAAAAAAAAAAAAAAEAAAAAAAAAAEAAAAsPEMKAAAAACgAAAAoAAAAZAAAAGQAAAAAAAAAzMzMAAAAAABQAAAAUAAAAGQAAABkAAAAAAAAABcAAAAUAAAAAAAAAAAAAAD/fwAA/38AAAAAAAAJAAAABAAAAADnAB8MAAAAEAAAAAAAAAAAAAAAAAAAAAAAAAAeAAAAaAAAAAAAAAAAAAAAAAAAAAAAAAAAAAAAECcAABAnAAAAAAAAAAAAAAAAAAAAAAAAAAAAAAAAAAAAAAAAAAAAABQAAAAAAAAAwMD/AAAAAABkAAAAMgAAAAAAAABkAAAAAAAAAH9/fwAKAAAAHwAAAFQAAACQwiYF////AQAAAAAAAAAAAAAAAAAAAAAAAAAAAAAAAAAAAAAAAAAAAAAAAn9/fwAsPEMDzMzMAMDA/wB/f38AAAAAAAAAAAAAAAAAAAAAAAAAAAAhAAAAGAAAABQAAACFAwAAswgAAGc4AACTIAAAEAAAACYAAAAIAAAAAQAAAAAAAAA="/>
               </a:ext>
             </a:extLst>
           </p:cNvSpPr>
@@ -25791,7 +26372,7 @@
 </p:sld>
 </file>
 
-<file path=ppt/slides/slide23.xml><?xml version="1.0" encoding="utf-8"?>
+<file path=ppt/slides/slide28.xml><?xml version="1.0" encoding="utf-8"?>
 <p:sld xmlns:a="http://schemas.openxmlformats.org/drawingml/2006/main" xmlns:r="http://schemas.openxmlformats.org/officeDocument/2006/relationships" xmlns:p="http://schemas.openxmlformats.org/presentationml/2006/main">
   <p:cSld>
     <p:spTree>
@@ -25815,7 +26396,7 @@
             <a:spLocks noGrp="1" noChangeArrowheads="1"/>
             <a:extLst>
               <a:ext uri="smNativeData">
-                <pr:smNativeData xmlns="" xmlns:p14="http://schemas.microsoft.com/office/powerpoint/2010/main" xmlns:pr="smNativeData" val="SMDATA_13_w78LXxMAAAAlAAAAZAAAAA0AAAAAkAAAAJAAAACQAAAAkAAAAAAAAAAAAAAAAAAAAAEAAABQAAAAAAAAAAAA4D8AAAAAAADgPwAAAAAAAOA/AAAAAAAA4D8AAAAAAADgPwAAAAAAAOA/AAAAAAAA4D8AAAAAAADgPwAAAAAAAOA/AAAAAAAA4D8CAAAAjAAAAAAAAAAAAAAAkMImDP///wgAAAAAAAAAAAAAAAAAAAAAAAAAAAAAAAAAAAAAZAAAAAEAAABAAAAAAAAAAAAAAAAAAAAAAAAAAAAAAAAAAAAAAAAAAAAAAAAAAAAAAAAAAAAAAAAAAAAAAAAAAAAAAAAAAAAAAAAAAAAAAAAAAAAAAAAAAAAAAAAAAAAAFAAAADwAAAAAAAAAAAAAAAAAAAkUAAAAAQAAABQAAAAUAAAAFAAAAAEAAAAAAAAAZAAAAGQAAAAAAAAAZAAAAGQAAAAVAAAAYAAAAAAAAAAAAAAADwAAACADAAAAAAAAAAAAAAEAAACgMgAAVgcAAKr4//8BAAAAf39/AAEAAABkAAAAAAAAABQAAABAHwAAAAAAACYAAAAAAAAAwOD//wAAAAAmAAAAZAAAABYAAABMAAAAAAAAAAAAAAAEAAAAAAAAAAEAAAAsPEMKAAAAACgAAAAoAAAAZAAAAGQAAAAAAAAAzMzMAAAAAABQAAAAUAAAAGQAAABkAAAAAAAAABcAAAAUAAAAAAAAAAAAAAD/fwAA/38AAAAAAAAJAAAABAAAAAAAAAAMAAAAEAAAAAAAAAAAAAAAAAAAAAAAAAAeAAAAaAAAAAAAAAAAAAAAAAAAAAAAAAAAAAAAECcAABAnAAAAAAAAAAAAAAAAAAAAAAAAAAAAAAAAAAAAAAAAAAAAABQAAAAAAAAAwMD/AAAAAABkAAAAMgAAAAAAAABkAAAAAAAAAH9/fwAKAAAAHwAAAFQAAACQwiYF////AQAAAAAAAAAAAAAAAAAAAAAAAAAAAAAAAAAAAAAAAAAAAAAAAn9/fwAsPEMDzMzMAMDA/wB/f38AAAAAAAAAAAAAAAAAAAAAAAAAAAAhAAAAGAAAABQAAAArBAAAwAMAAA05AADgCwAAEAAAACYAAAAIAAAAAAAAAAAAAAA="/>
+                <pr:smNativeData xmlns:pr="smNativeData" xmlns:p14="http://schemas.microsoft.com/office/powerpoint/2010/main" xmlns="" val="SMDATA_13_w78LXxMAAAAlAAAAZAAAAA0AAAAAkAAAAJAAAACQAAAAkAAAAAAAAAAAAAAAAAAAAAEAAABQAAAAAAAAAAAA4D8AAAAAAADgPwAAAAAAAOA/AAAAAAAA4D8AAAAAAADgPwAAAAAAAOA/AAAAAAAA4D8AAAAAAADgPwAAAAAAAOA/AAAAAAAA4D8CAAAAjAAAAAAAAAAAAAAAkMImDP///wgAAAAAAAAAAAAAAAAAAAAAAAAAAAAAAAAAAAAAZAAAAAEAAABAAAAAAAAAAAAAAAAAAAAAAAAAAAAAAAAAAAAAAAAAAAAAAAAAAAAAAAAAAAAAAAAAAAAAAAAAAAAAAAAAAAAAAAAAAAAAAAAAAAAAAAAAAAAAAAAAAAAAFAAAADwAAAAAAAAAAAAAAAAAAAkUAAAAAQAAABQAAAAUAAAAFAAAAAEAAAAAAAAAZAAAAGQAAAAAAAAAZAAAAGQAAAAVAAAAYAAAAAAAAAAAAAAADwAAACADAAAAAAAAAAAAAAEAAACgMgAAVgcAAKr4//8BAAAAf39/AAEAAABkAAAAAAAAABQAAABAHwAAAAAAACYAAAAAAAAAwOD//wAAAAAmAAAAZAAAABYAAABMAAAAAAAAAAAAAAAEAAAAAAAAAAEAAAAsPEMKAAAAACgAAAAoAAAAZAAAAGQAAAAAAAAAzMzMAAAAAABQAAAAUAAAAGQAAABkAAAAAAAAABcAAAAUAAAAAAAAAAAAAAD/fwAA/38AAAAAAAAJAAAABAAAAAAAAAAMAAAAEAAAAAAAAAAAAAAAAAAAAAAAAAAeAAAAaAAAAAAAAAAAAAAAAAAAAAAAAAAAAAAAECcAABAnAAAAAAAAAAAAAAAAAAAAAAAAAAAAAAAAAAAAAAAAAAAAABQAAAAAAAAAwMD/AAAAAABkAAAAMgAAAAAAAABkAAAAAAAAAH9/fwAKAAAAHwAAAFQAAACQwiYF////AQAAAAAAAAAAAAAAAAAAAAAAAAAAAAAAAAAAAAAAAAAAAAAAAn9/fwAsPEMDzMzMAMDA/wB/f38AAAAAAAAAAAAAAAAAAAAAAAAAAAAhAAAAGAAAABQAAAArBAAAwAMAAA05AADgCwAAEAAAACYAAAAIAAAAAAAAAAAAAAA="/>
               </a:ext>
             </a:extLst>
           </p:cNvSpPr>
@@ -25842,7 +26423,7 @@
             <a:spLocks noGrp="1" noChangeArrowheads="1"/>
             <a:extLst>
               <a:ext uri="smNativeData">
-                <pr:smNativeData xmlns="" xmlns:p14="http://schemas.microsoft.com/office/powerpoint/2010/main" xmlns:pr="smNativeData" val="SMDATA_13_w78LXxMAAAAlAAAAZAAAAA0AAAAAkAAAAJAAAACQAAAAkAAAAAAAAAAAAAAAAAAAAAEAAABQAAAAAAAAAAAA4D8AAAAAAADgPwAAAAAAAOA/AAAAAAAA4D8AAAAAAADgPwAAAAAAAOA/AAAAAAAA4D8AAAAAAADgPwAAAAAAAOA/AAAAAAAA4D8CAAAAjAAAAAAAAAAAAAAAkMImDP///wgAAAAAAAAAAAAAAAAAAAAAAAAAAAAAAAAAAAAAZAAAAAEAAABAAAAAAAAAAAAAAAAAAAAAAAAAAAAAAAAAAAAAAAAAAAAAAAAAAAAAAAAAAAAAAAAAAAAAAAAAAAAAAAAAAAAAAAAAAAAAAAAAAAAAAAAAAAAAAAAAAAAAFAAAADwAAAAAAAAAAAAAAAAAAAkUAAAAAQAAABQAAAAUAAAAFAAAAAEAAAAAAAAAZAAAAGQAAAAAAAAAZAAAAGQAAAAVAAAAYAAAAAAAAAAAAAAADwAAACADAAAAAAAAAAAAAAEAAACgMgAAVgcAAKr4//8BAAAAf39/AAEAAABkAAAAAAAAABQAAABAHwAAAAAAACYAAAAAAAAAwOD//wAAAAAmAAAAZAAAABYAAABMAAAAAAAAAAAAAAAEAAAAAAAAAAEAAAAsPEMKAAAAACgAAAAoAAAAZAAAAGQAAAAAAAAAzMzMAAAAAABQAAAAUAAAAGQAAABkAAAAAAAAABcAAAAUAAAAAAAAAAAAAAD/fwAA/38AAAAAAAAJAAAABAAAAAAAAAAMAAAAEAAAAAAAAAAAAAAAAAAAAAAAAAAeAAAAaAAAAAAAAAAAAAAAAAAAAAAAAAAAAAAAECcAABAnAAAAAAAAAAAAAAAAAAAAAAAAAAAAAAAAAAAAAAAAAAAAABQAAAAAAAAAwMD/AAAAAABkAAAAMgAAAAAAAABkAAAAAAAAAH9/fwAKAAAAHwAAAFQAAACQwiYF////AQAAAAAAAAAAAAAAAAAAAAAAAAAAAAAAAAAAAAAAAAAAAAAAAn9/fwAsPEMDzMzMAMDA/wB/f38AAAAAAAAAAAAAAAAAAAAAAAAAAAAhAAAAGAAAABQAAAArBAAAxQoAAA05AACkIgAAEAAAACYAAAAIAAAAAQAAAAAAAAA="/>
+                <pr:smNativeData xmlns:pr="smNativeData" xmlns:p14="http://schemas.microsoft.com/office/powerpoint/2010/main" xmlns="" val="SMDATA_13_w78LXxMAAAAlAAAAZAAAAA0AAAAAkAAAAJAAAACQAAAAkAAAAAAAAAAAAAAAAAAAAAEAAABQAAAAAAAAAAAA4D8AAAAAAADgPwAAAAAAAOA/AAAAAAAA4D8AAAAAAADgPwAAAAAAAOA/AAAAAAAA4D8AAAAAAADgPwAAAAAAAOA/AAAAAAAA4D8CAAAAjAAAAAAAAAAAAAAAkMImDP///wgAAAAAAAAAAAAAAAAAAAAAAAAAAAAAAAAAAAAAZAAAAAEAAABAAAAAAAAAAAAAAAAAAAAAAAAAAAAAAAAAAAAAAAAAAAAAAAAAAAAAAAAAAAAAAAAAAAAAAAAAAAAAAAAAAAAAAAAAAAAAAAAAAAAAAAAAAAAAAAAAAAAAFAAAADwAAAAAAAAAAAAAAAAAAAkUAAAAAQAAABQAAAAUAAAAFAAAAAEAAAAAAAAAZAAAAGQAAAAAAAAAZAAAAGQAAAAVAAAAYAAAAAAAAAAAAAAADwAAACADAAAAAAAAAAAAAAEAAACgMgAAVgcAAKr4//8BAAAAf39/AAEAAABkAAAAAAAAABQAAABAHwAAAAAAACYAAAAAAAAAwOD//wAAAAAmAAAAZAAAABYAAABMAAAAAAAAAAAAAAAEAAAAAAAAAAEAAAAsPEMKAAAAACgAAAAoAAAAZAAAAGQAAAAAAAAAzMzMAAAAAABQAAAAUAAAAGQAAABkAAAAAAAAABcAAAAUAAAAAAAAAAAAAAD/fwAA/38AAAAAAAAJAAAABAAAAAAAAAAMAAAAEAAAAAAAAAAAAAAAAAAAAAAAAAAeAAAAaAAAAAAAAAAAAAAAAAAAAAAAAAAAAAAAECcAABAnAAAAAAAAAAAAAAAAAAAAAAAAAAAAAAAAAAAAAAAAAAAAABQAAAAAAAAAwMD/AAAAAABkAAAAMgAAAAAAAABkAAAAAAAAAH9/fwAKAAAAHwAAAFQAAACQwiYF////AQAAAAAAAAAAAAAAAAAAAAAAAAAAAAAAAAAAAAAAAAAAAAAAAn9/fwAsPEMDzMzMAMDA/wB/f38AAAAAAAAAAAAAAAAAAAAAAAAAAAAhAAAAGAAAABQAAAArBAAAxQoAAA05AACkIgAAEAAAACYAAAAIAAAAAQAAAAAAAAA="/>
               </a:ext>
             </a:extLst>
           </p:cNvSpPr>
@@ -25957,7 +26538,7 @@
 </p:sld>
 </file>
 
-<file path=ppt/slides/slide24.xml><?xml version="1.0" encoding="utf-8"?>
+<file path=ppt/slides/slide29.xml><?xml version="1.0" encoding="utf-8"?>
 <p:sld xmlns:a="http://schemas.openxmlformats.org/drawingml/2006/main" xmlns:r="http://schemas.openxmlformats.org/officeDocument/2006/relationships" xmlns:p="http://schemas.openxmlformats.org/presentationml/2006/main">
   <p:cSld>
     <p:spTree>
@@ -25981,7 +26562,7 @@
             <a:spLocks noGrp="1" noChangeArrowheads="1"/>
             <a:extLst>
               <a:ext uri="smNativeData">
-                <pr:smNativeData xmlns="" xmlns:p14="http://schemas.microsoft.com/office/powerpoint/2010/main" xmlns:pr="smNativeData" val="SMDATA_13_w78LXxMAAAAlAAAAZAAAAA0AAAAAkAAAAJAAAACQAAAAkAAAAAAAAAAAAAAAAAAAAAEAAABQAAAAAAAAAAAA4D8AAAAAAADgPwAAAAAAAOA/AAAAAAAA4D8AAAAAAADgPwAAAAAAAOA/AAAAAAAA4D8AAAAAAADgPwAAAAAAAOA/AAAAAAAA4D8CAAAAjAAAAAAAAAAAAAAAkMImDP///wgAAAAAAAAAAAAAAAAAAAAAAAAAAAAAAAAAAAAAZAAAAAEAAABAAAAAAAAAAAAAAAAAAAAAAAAAAAAAAAAAAAAAAAAAAAAAAAAAAAAAAAAAAAAAAAAAAAAAAAAAAAAAAAAAAAAAAAAAAAAAAAAAAAAAAAAAAAAAAAAAAAAAFAAAADwAAAAAAAAAAAAAAAAAAAkUAAAAAQAAABQAAAAUAAAAFAAAAAEAAAAAAAAAZAAAAGQAAAAAAAAAZAAAAGQAAAAVAAAAYAAAAAAAAAAAAAAADwAAACADAAAAAAAAAAAAAAEAAACgMgAAVgcAAKr4//8BAAAAf39/AAEAAABkAAAAAAAAABQAAABAHwAAAAAAACYAAAAAAAAAwOD//wAAAAAmAAAAZAAAABYAAABMAAAAAAAAAAAAAAAEAAAAAAAAAAEAAAAsPEMKAAAAACgAAAAoAAAAZAAAAGQAAAAAAAAAzMzMAAAAAABQAAAAUAAAAGQAAABkAAAAAAAAABcAAAAUAAAAAAAAAAAAAAD/fwAA/38AAAAAAAAJAAAABAAAAAAAAAAMAAAAEAAAAAAAAAAAAAAAAAAAAAAAAAAeAAAAaAAAAAAAAAAAAAAAAAAAAAAAAAAAAAAAECcAABAnAAAAAAAAAAAAAAAAAAAAAAAAAAAAAAAAAAAAAAAAAAAAABQAAAAAAAAAwMD/AAAAAABkAAAAMgAAAAAAAABkAAAAAAAAAH9/fwAKAAAAHwAAAFQAAACQwiYF////AQAAAAAAAAAAAAAAAAAAAAAAAAAAAAAAAAAAAAAAAAAAAAAAAn9/fwAsPEMDzMzMAMDA/wB/f38AAAAAAAAAAAAAAAAAAAAAAAAAAAAhAAAAGAAAABQAAAArBAAAwAMAAA05AADgCwAAEAAAACYAAAAIAAAAAAAAAAAAAAA="/>
+                <pr:smNativeData xmlns:pr="smNativeData" xmlns:p14="http://schemas.microsoft.com/office/powerpoint/2010/main" xmlns="" val="SMDATA_13_w78LXxMAAAAlAAAAZAAAAA0AAAAAkAAAAJAAAACQAAAAkAAAAAAAAAAAAAAAAAAAAAEAAABQAAAAAAAAAAAA4D8AAAAAAADgPwAAAAAAAOA/AAAAAAAA4D8AAAAAAADgPwAAAAAAAOA/AAAAAAAA4D8AAAAAAADgPwAAAAAAAOA/AAAAAAAA4D8CAAAAjAAAAAAAAAAAAAAAkMImDP///wgAAAAAAAAAAAAAAAAAAAAAAAAAAAAAAAAAAAAAZAAAAAEAAABAAAAAAAAAAAAAAAAAAAAAAAAAAAAAAAAAAAAAAAAAAAAAAAAAAAAAAAAAAAAAAAAAAAAAAAAAAAAAAAAAAAAAAAAAAAAAAAAAAAAAAAAAAAAAAAAAAAAAFAAAADwAAAAAAAAAAAAAAAAAAAkUAAAAAQAAABQAAAAUAAAAFAAAAAEAAAAAAAAAZAAAAGQAAAAAAAAAZAAAAGQAAAAVAAAAYAAAAAAAAAAAAAAADwAAACADAAAAAAAAAAAAAAEAAACgMgAAVgcAAKr4//8BAAAAf39/AAEAAABkAAAAAAAAABQAAABAHwAAAAAAACYAAAAAAAAAwOD//wAAAAAmAAAAZAAAABYAAABMAAAAAAAAAAAAAAAEAAAAAAAAAAEAAAAsPEMKAAAAACgAAAAoAAAAZAAAAGQAAAAAAAAAzMzMAAAAAABQAAAAUAAAAGQAAABkAAAAAAAAABcAAAAUAAAAAAAAAAAAAAD/fwAA/38AAAAAAAAJAAAABAAAAAAAAAAMAAAAEAAAAAAAAAAAAAAAAAAAAAAAAAAeAAAAaAAAAAAAAAAAAAAAAAAAAAAAAAAAAAAAECcAABAnAAAAAAAAAAAAAAAAAAAAAAAAAAAAAAAAAAAAAAAAAAAAABQAAAAAAAAAwMD/AAAAAABkAAAAMgAAAAAAAABkAAAAAAAAAH9/fwAKAAAAHwAAAFQAAACQwiYF////AQAAAAAAAAAAAAAAAAAAAAAAAAAAAAAAAAAAAAAAAAAAAAAAAn9/fwAsPEMDzMzMAMDA/wB/f38AAAAAAAAAAAAAAAAAAAAAAAAAAAAhAAAAGAAAABQAAAArBAAAwAMAAA05AADgCwAAEAAAACYAAAAIAAAAAAAAAAAAAAA="/>
               </a:ext>
             </a:extLst>
           </p:cNvSpPr>
@@ -26008,7 +26589,7 @@
             <a:spLocks noGrp="1" noChangeArrowheads="1"/>
             <a:extLst>
               <a:ext uri="smNativeData">
-                <pr:smNativeData xmlns="" xmlns:p14="http://schemas.microsoft.com/office/powerpoint/2010/main" xmlns:pr="smNativeData" val="SMDATA_13_w78LXxMAAAAlAAAAZAAAAA0AAAAAkAAAAJAAAACQAAAAkAAAAAAAAAAAAAAAAAAAAAEAAABQAAAAAAAAAAAA4D8AAAAAAADgPwAAAAAAAOA/AAAAAAAA4D8AAAAAAADgPwAAAAAAAOA/AAAAAAAA4D8AAAAAAADgPwAAAAAAAOA/AAAAAAAA4D8CAAAAjAAAAAAAAAAAAAAAkMImDP///wgAAAAAAAAAAAAAAAAAAAAAAAAAAAAAAAAAAAAAZAAAAAEAAABAAAAAAAAAAAAAAAAAAAAAAAAAAAAAAAAAAAAAAAAAAAAAAAAAAAAAAAAAAAAAAAAAAAAAAAAAAAAAAAAAAAAAAAAAAAAAAAAAAAAAAAAAAAAAAAAAAAAAFAAAADwAAAAAAAAAAAAAAAAAAAkUAAAAAQAAABQAAAAUAAAAFAAAAAEAAAAAAAAAZAAAAGQAAAAAAAAAZAAAAGQAAAAVAAAAYAAAAAAAAAAAAAAADwAAACADAAAAAAAAAAAAAAEAAACgMgAAVgcAAKr4//8BAAAAf39/AAEAAABkAAAAAAAAABQAAABAHwAAAAAAACYAAAAAAAAAwOD//wAAAAAmAAAAZAAAABYAAABMAAAAAAAAAAAAAAAEAAAAAAAAAAEAAAAsPEMKAAAAACgAAAAoAAAAZAAAAGQAAAAAAAAAzMzMAAAAAABQAAAAUAAAAGQAAABkAAAAAAAAABcAAAAUAAAAAAAAAAAAAAD/fwAA/38AAAAAAAAJAAAABAAAAAAAAAAMAAAAEAAAAAAAAAAAAAAAAAAAAAAAAAAeAAAAaAAAAAAAAAAAAAAAAAAAAAAAAAAAAAAAECcAABAnAAAAAAAAAAAAAAAAAAAAAAAAAAAAAAAAAAAAAAAAAAAAABQAAAAAAAAAwMD/AAAAAABkAAAAMgAAAAAAAABkAAAAAAAAAH9/fwAKAAAAHwAAAFQAAACQwiYF////AQAAAAAAAAAAAAAAAAAAAAAAAAAAAAAAAAAAAAAAAAAAAAAAAn9/fwAsPEMDzMzMAMDA/wB/f38AAAAAAAAAAAAAAAAAAAAAAAAAAAAhAAAAGAAAABQAAAArBAAAEAoAAA05AADvIQAAEAAAACYAAAAIAAAAAQAAAAAAAAA="/>
+                <pr:smNativeData xmlns:pr="smNativeData" xmlns:p14="http://schemas.microsoft.com/office/powerpoint/2010/main" xmlns="" val="SMDATA_13_w78LXxMAAAAlAAAAZAAAAA0AAAAAkAAAAJAAAACQAAAAkAAAAAAAAAAAAAAAAAAAAAEAAABQAAAAAAAAAAAA4D8AAAAAAADgPwAAAAAAAOA/AAAAAAAA4D8AAAAAAADgPwAAAAAAAOA/AAAAAAAA4D8AAAAAAADgPwAAAAAAAOA/AAAAAAAA4D8CAAAAjAAAAAAAAAAAAAAAkMImDP///wgAAAAAAAAAAAAAAAAAAAAAAAAAAAAAAAAAAAAAZAAAAAEAAABAAAAAAAAAAAAAAAAAAAAAAAAAAAAAAAAAAAAAAAAAAAAAAAAAAAAAAAAAAAAAAAAAAAAAAAAAAAAAAAAAAAAAAAAAAAAAAAAAAAAAAAAAAAAAAAAAAAAAFAAAADwAAAAAAAAAAAAAAAAAAAkUAAAAAQAAABQAAAAUAAAAFAAAAAEAAAAAAAAAZAAAAGQAAAAAAAAAZAAAAGQAAAAVAAAAYAAAAAAAAAAAAAAADwAAACADAAAAAAAAAAAAAAEAAACgMgAAVgcAAKr4//8BAAAAf39/AAEAAABkAAAAAAAAABQAAABAHwAAAAAAACYAAAAAAAAAwOD//wAAAAAmAAAAZAAAABYAAABMAAAAAAAAAAAAAAAEAAAAAAAAAAEAAAAsPEMKAAAAACgAAAAoAAAAZAAAAGQAAAAAAAAAzMzMAAAAAABQAAAAUAAAAGQAAABkAAAAAAAAABcAAAAUAAAAAAAAAAAAAAD/fwAA/38AAAAAAAAJAAAABAAAAAAAAAAMAAAAEAAAAAAAAAAAAAAAAAAAAAAAAAAeAAAAaAAAAAAAAAAAAAAAAAAAAAAAAAAAAAAAECcAABAnAAAAAAAAAAAAAAAAAAAAAAAAAAAAAAAAAAAAAAAAAAAAABQAAAAAAAAAwMD/AAAAAABkAAAAMgAAAAAAAABkAAAAAAAAAH9/fwAKAAAAHwAAAFQAAACQwiYF////AQAAAAAAAAAAAAAAAAAAAAAAAAAAAAAAAAAAAAAAAAAAAAAAAn9/fwAsPEMDzMzMAMDA/wB/f38AAAAAAAAAAAAAAAAAAAAAAAAAAAAhAAAAGAAAABQAAAArBAAAEAoAAA05AADvIQAAEAAAACYAAAAIAAAAAQAAAAAAAAA="/>
               </a:ext>
             </a:extLst>
           </p:cNvSpPr>
@@ -26126,7 +26707,105 @@
 </p:sld>
 </file>
 
-<file path=ppt/slides/slide25.xml><?xml version="1.0" encoding="utf-8"?>
+<file path=ppt/slides/slide3.xml><?xml version="1.0" encoding="utf-8"?>
+<p:sld xmlns:a="http://schemas.openxmlformats.org/drawingml/2006/main" xmlns:r="http://schemas.openxmlformats.org/officeDocument/2006/relationships" xmlns:p="http://schemas.openxmlformats.org/presentationml/2006/main">
+  <p:cSld>
+    <p:spTree>
+      <p:nvGrpSpPr>
+        <p:cNvPr id="1" name=""/>
+        <p:cNvGrpSpPr/>
+        <p:nvPr/>
+      </p:nvGrpSpPr>
+      <p:grpSpPr>
+        <a:xfrm>
+          <a:off x="0" y="0"/>
+          <a:ext cx="0" cy="0"/>
+          <a:chOff x="0" y="0"/>
+          <a:chExt cx="0" cy="0"/>
+        </a:xfrm>
+      </p:grpSpPr>
+      <p:sp>
+        <p:nvSpPr>
+          <p:cNvPr id="2" name="Shape 164"/>
+          <p:cNvSpPr>
+            <a:spLocks noGrp="1" noChangeArrowheads="1"/>
+            <a:extLst>
+              <a:ext uri="smNativeData">
+                <pr:smNativeData xmlns:pr="smNativeData" xmlns:p14="http://schemas.microsoft.com/office/powerpoint/2010/main" xmlns="" val="SMDATA_13_w78LXxMAAAAlAAAAZAAAAA0AAAAAkAAAAJAAAACQAAAAkAAAAAAAAAAAAAAAAAAAAAEAAABQAAAAAAAAAAAA4D8AAAAAAADgPwAAAAAAAOA/AAAAAAAA4D8AAAAAAADgPwAAAAAAAOA/AAAAAAAA4D8AAAAAAADgPwAAAAAAAOA/AAAAAAAA4D8CAAAAjAAAAAAAAAAAAAAAkMImDP///wgAAAAAAAAAAAAAAAAAAAAAAAAAAAAAAAAAAAAAZAAAAAEAAABAAAAAAAAAAAAAAAAAAAAAAAAAAAAAAAAAAAAAAAAAAAAAAAAAAAAAAAAAAAAAAAAAAAAAAAAAAAAAAAAAAAAAAAAAAAAAAAAAAAAAAAAAAAAAAAAAAAAAFAAAADwAAAAAAAAAAAAAAAAAAAkUAAAAAQAAABQAAAAUAAAAFAAAAAEAAAAAAAAAZAAAAGQAAAAAAAAAZAAAAGQAAAAVAAAAYAAAAAAAAAAAAAAADwAAACADAAAAAAAAAAAAAAEAAACgMgAAVgcAAKr4//8BAAAAf39/AAEAAABkAAAAAAAAABQAAABAHwAAAAAAACYAAAAAAAAAwOD//wAAAAAmAAAAZAAAABYAAABMAAAAAAAAAAAAAAAEAAAAAAAAAAEAAAAsPEMKAAAAACgAAAAoAAAAZAAAAGQAAAAAAAAAzMzMAAAAAABQAAAAUAAAAGQAAABkAAAAAAAAABcAAAAUAAAAAAAAAAAAAAD/fwAA/38AAAAAAAAJAAAABAAAAAAAAAAMAAAAEAAAAAAAAAAAAAAAAAAAAAAAAAAeAAAAaAAAAAAAAAAAAAAAAAAAAAAAAAAAAAAAECcAABAnAAAAAAAAAAAAAAAAAAAAAAAAAAAAAAAAAAAAAAAAAAAAABQAAAAAAAAAwMD/AAAAAABkAAAAMgAAAAAAAABkAAAAAAAAAH9/fwAKAAAAHwAAAFQAAACQwiYF////AQAAAAAAAAAAAAAAAAAAAAAAAAAAAAAAAAAAAAAAAAAAAAAAAn9/fwAsPEMDzMzMAMDA/wB/f38AAAAAAAAAAAAAAAAAAAAAAAAAAAAhAAAAGAAAABQAAAArBAAAwAMAAA05AADgCwAAEAAAACYAAAAIAAAAPDAAAAAAAAA="/>
+              </a:ext>
+            </a:extLst>
+          </p:cNvSpPr>
+          <p:nvPr>
+            <p:ph type="title"/>
+          </p:nvPr>
+        </p:nvSpPr>
+        <p:spPr/>
+        <p:txBody>
+          <a:bodyPr vert="horz" wrap="square" lIns="91440" tIns="91440" rIns="91440" bIns="91440" numCol="1" spcCol="215900" anchor="t">
+            <a:prstTxWarp prst="textNoShape">
+              <a:avLst/>
+            </a:prstTxWarp>
+          </a:bodyPr>
+          <a:lstStyle/>
+          <a:p>
+            <a:pPr marL="0" indent="0">
+              <a:spcBef>
+                <a:spcPts val="0"/>
+              </a:spcBef>
+              <a:spcAft>
+                <a:spcPts val="0"/>
+              </a:spcAft>
+              <a:buNone/>
+            </a:pPr>
+            <a:r>
+              <a:rPr lang="es-es"/>
+              <a:t>DOM (Document Object Model)</a:t>
+            </a:r>
+          </a:p>
+        </p:txBody>
+      </p:sp>
+      <p:pic>
+        <p:nvPicPr>
+          <p:cNvPr id="3" name="Shape 165"/>
+          <p:cNvPicPr>
+            <a:extLst>
+              <a:ext uri="smNativeData">
+                <pr:smNativeData xmlns:pr="smNativeData" xmlns:p14="http://schemas.microsoft.com/office/powerpoint/2010/main" xmlns="" val="SMDATA_15_w78LXxMAAAAlAAAAEQAAAA0AAAAAkAAAAEgAAACQAAAASAAAAAAAAAAAAAAAAAAAAAEAAABQAAAAAAAAAAAA4D8AAAAAAADgPwAAAAAAAOA/AAAAAAAA4D8AAAAAAADgPwAAAAAAAOA/AAAAAAAA4D8AAAAAAADgPwAAAAAAAOA/AAAAAAAA4D8CAAAAjAAAAAAAAAAAAAAAkMImDP///wgAAAAAAAAAAAAAAAAAAAAAAAAAAAAAAAAAAAAAZAAAAAEAAABAAAAAAAAAAAAAAAAAAAAAAAAAAAAAAAAAAAAAAAAAAAAAAAAAAAAAAAAAAAAAAAAAAAAAAAAAAAAAAAAAAAAAAAAAAAAAAAAAAAAAAAAAAAAAAAAAAAAAFAAAADwAAAAAAAAAAAAAAAAAAAkUAAAAAQAAABQAAAAUAAAAFAAAAAEAAAAAAAAAZAAAAGQAAAAAAAAAZAAAAGQAAAAVAAAAYAAAAAAAAAAAAAAADwAAACADAAAAAAAAAAAAAAEAAACgMgAAVgcAAKr4//8BAAAAf39/AAEAAABkAAAAAAAAABQAAABAHwAAAAAAACYAAAAAAAAAwOD//wAAAAAmAAAAZAAAABYAAABMAAAAAAAAAAAAAAAEAAAAAAAAAAEAAAAsPEMKAAAAACgAAAAoAAAAZAAAAGQAAAAAAAAAzMzMAAAAAABQAAAAUAAAAGQAAABkAAAAAAAAAAcAAAA4AAAAAAAAAAAAAAAAAAAA////AAAAAAAAAAAAAAAAAAAAAAAAAAAAAAAAAAAAAABkAAAAZAAAAAAAAAAjAAAABAAAAGQAAAAXAAAAFAAAAAAAAAAAAAAA/38AAP9/AAAAAAAACQAAAAQAAAAAAAAADAAAABAAAAAAAAAAAAAAAAAAAAAAAAAAHgAAAGgAAAAAAAAAAAAAAAAAAAAAAAAAAAAAABAnAAAQJwAAAAAAAAAAAAAAAAAAAAAAAAAAAAAAAAAAAAAAAAAAAAAUAAAAAAAAAMDA/wAAAAAAZAAAADIAAAAAAAAAZAAAAAAAAAB/f38ACgAAAB8AAABUAAAAkMImBf///wEAAAAAAAAAAAAAAAAAAAAAAAAAAAAAAAAAAAAAAAAAAAAAAAJ/f38ALDxDA8zMzADAwP8Af39/AAAAAAAAAAAAAAAAAP///wAAAAAAIQAAABgAAAAUAAAANQcAADwIAACLOgAAkSgAABAAAAAmAAAACAAAAP//////////"/>
+              </a:ext>
+            </a:extLst>
+          </p:cNvPicPr>
+          <p:nvPr/>
+        </p:nvPicPr>
+        <p:blipFill>
+          <a:blip r:embed="rId3"/>
+          <a:stretch>
+            <a:fillRect/>
+          </a:stretch>
+        </p:blipFill>
+        <p:spPr>
+          <a:xfrm>
+            <a:off x="1171575" y="1338580"/>
+            <a:ext cx="8345170" cy="5255895"/>
+          </a:xfrm>
+          <a:prstGeom prst="rect">
+            <a:avLst/>
+          </a:prstGeom>
+          <a:noFill/>
+          <a:ln>
+            <a:noFill/>
+          </a:ln>
+          <a:effectLst/>
+        </p:spPr>
+      </p:pic>
+    </p:spTree>
+  </p:cSld>
+  <p:clrMapOvr>
+    <a:masterClrMapping/>
+  </p:clrMapOvr>
+</p:sld>
+</file>
+
+<file path=ppt/slides/slide30.xml><?xml version="1.0" encoding="utf-8"?>
 <p:sld xmlns:a="http://schemas.openxmlformats.org/drawingml/2006/main" xmlns:r="http://schemas.openxmlformats.org/officeDocument/2006/relationships" xmlns:p="http://schemas.openxmlformats.org/presentationml/2006/main">
   <p:cSld>
     <p:spTree>
@@ -26150,7 +26829,7 @@
             <a:spLocks noGrp="1" noChangeArrowheads="1"/>
             <a:extLst>
               <a:ext uri="smNativeData">
-                <pr:smNativeData xmlns="" xmlns:p14="http://schemas.microsoft.com/office/powerpoint/2010/main" xmlns:pr="smNativeData" val="SMDATA_13_w78LXxMAAAAlAAAAZAAAAA0AAAAAkAAAAJAAAACQAAAAkAAAAAAAAAAAAAAAAAAAAAEAAABQAAAAAAAAAAAA4D8AAAAAAADgPwAAAAAAAOA/AAAAAAAA4D8AAAAAAADgPwAAAAAAAOA/AAAAAAAA4D8AAAAAAADgPwAAAAAAAOA/AAAAAAAA4D8CAAAAjAAAAAAAAAAAAAAAkMImDP///wgAAAAAAAAAAAAAAAAAAAAAAAAAAAAAAAAAAAAAZAAAAAEAAABAAAAAAAAAAAAAAAAAAAAAAAAAAAAAAAAAAAAAAAAAAAAAAAAAAAAAAAAAAAAAAAAAAAAAAAAAAAAAAAAAAAAAAAAAAAAAAAAAAAAAAAAAAAAAAAAAAAAAFAAAADwAAAAAAAAAAAAAAAAAAAkUAAAAAQAAABQAAAAUAAAAFAAAAAEAAAAAAAAAZAAAAGQAAAAAAAAAZAAAAGQAAAAVAAAAYAAAAAAAAAAAAAAADwAAACADAAAAAAAAAAAAAAEAAACgMgAAVgcAAKr4//8BAAAAf39/AAEAAABkAAAAAAAAABQAAABAHwAAAAAAACYAAAAAAAAAwOD//wAAAAAmAAAAZAAAABYAAABMAAAAAAAAAAAAAAAEAAAAAAAAAAEAAAAsPEMKAAAAACgAAAAoAAAAZAAAAGQAAAAAAAAAzMzMAAAAAABQAAAAUAAAAGQAAABkAAAAAAAAABcAAAAUAAAAAAAAAAAAAAD/fwAA/38AAAAAAAAJAAAABAAAAAAAAAAMAAAAEAAAAAAAAAAAAAAAAAAAAAAAAAAeAAAAaAAAAAAAAAAAAAAAAAAAAAAAAAAAAAAAECcAABAnAAAAAAAAAAAAAAAAAAAAAAAAAAAAAAAAAAAAAAAAAAAAABQAAAAAAAAAwMD/AAAAAABkAAAAMgAAAAAAAABkAAAAAAAAAH9/fwAKAAAAHwAAAFQAAACQwiYF////AQAAAAAAAAAAAAAAAAAAAAAAAAAAAAAAAAAAAAAAAAAAAAAAAn9/fwAsPEMDzMzMAMDA/wB/f38AAAAAAAAAAAAAAAAAAAAAAAAAAAAhAAAAGAAAABQAAAArBAAAwAMAAA05AADgCwAAEAAAACYAAAAIAAAAAAAAAAAAAAA="/>
+                <pr:smNativeData xmlns:pr="smNativeData" xmlns:p14="http://schemas.microsoft.com/office/powerpoint/2010/main" xmlns="" val="SMDATA_13_w78LXxMAAAAlAAAAZAAAAA0AAAAAkAAAAJAAAACQAAAAkAAAAAAAAAAAAAAAAAAAAAEAAABQAAAAAAAAAAAA4D8AAAAAAADgPwAAAAAAAOA/AAAAAAAA4D8AAAAAAADgPwAAAAAAAOA/AAAAAAAA4D8AAAAAAADgPwAAAAAAAOA/AAAAAAAA4D8CAAAAjAAAAAAAAAAAAAAAkMImDP///wgAAAAAAAAAAAAAAAAAAAAAAAAAAAAAAAAAAAAAZAAAAAEAAABAAAAAAAAAAAAAAAAAAAAAAAAAAAAAAAAAAAAAAAAAAAAAAAAAAAAAAAAAAAAAAAAAAAAAAAAAAAAAAAAAAAAAAAAAAAAAAAAAAAAAAAAAAAAAAAAAAAAAFAAAADwAAAAAAAAAAAAAAAAAAAkUAAAAAQAAABQAAAAUAAAAFAAAAAEAAAAAAAAAZAAAAGQAAAAAAAAAZAAAAGQAAAAVAAAAYAAAAAAAAAAAAAAADwAAACADAAAAAAAAAAAAAAEAAACgMgAAVgcAAKr4//8BAAAAf39/AAEAAABkAAAAAAAAABQAAABAHwAAAAAAACYAAAAAAAAAwOD//wAAAAAmAAAAZAAAABYAAABMAAAAAAAAAAAAAAAEAAAAAAAAAAEAAAAsPEMKAAAAACgAAAAoAAAAZAAAAGQAAAAAAAAAzMzMAAAAAABQAAAAUAAAAGQAAABkAAAAAAAAABcAAAAUAAAAAAAAAAAAAAD/fwAA/38AAAAAAAAJAAAABAAAAAAAAAAMAAAAEAAAAAAAAAAAAAAAAAAAAAAAAAAeAAAAaAAAAAAAAAAAAAAAAAAAAAAAAAAAAAAAECcAABAnAAAAAAAAAAAAAAAAAAAAAAAAAAAAAAAAAAAAAAAAAAAAABQAAAAAAAAAwMD/AAAAAABkAAAAMgAAAAAAAABkAAAAAAAAAH9/fwAKAAAAHwAAAFQAAACQwiYF////AQAAAAAAAAAAAAAAAAAAAAAAAAAAAAAAAAAAAAAAAAAAAAAAAn9/fwAsPEMDzMzMAMDA/wB/f38AAAAAAAAAAAAAAAAAAAAAAAAAAAAhAAAAGAAAABQAAAArBAAAwAMAAA05AADgCwAAEAAAACYAAAAIAAAAAAAAAAAAAAA="/>
               </a:ext>
             </a:extLst>
           </p:cNvSpPr>
@@ -26177,7 +26856,7 @@
             <a:spLocks noGrp="1" noChangeArrowheads="1"/>
             <a:extLst>
               <a:ext uri="smNativeData">
-                <pr:smNativeData xmlns="" xmlns:p14="http://schemas.microsoft.com/office/powerpoint/2010/main" xmlns:pr="smNativeData" val="SMDATA_13_w78LXxMAAAAlAAAAZAAAAA0AAAAAkAAAAJAAAACQAAAAkAAAAAAAAAAAAAAAAAAAAAEAAABQAAAAAAAAAAAA4D8AAAAAAADgPwAAAAAAAOA/AAAAAAAA4D8AAAAAAADgPwAAAAAAAOA/AAAAAAAA4D8AAAAAAADgPwAAAAAAAOA/AAAAAAAA4D8CAAAAjAAAAAAAAAAAAAAAkMImDP///wgAAAAAAAAAAAAAAAAAAAAAAAAAAAAAAAAAAAAAZAAAAAEAAABAAAAAAAAAAAAAAAAAAAAAAAAAAAAAAAAAAAAAAAAAAAAAAAAAAAAAAAAAAAAAAAAAAAAAAAAAAAAAAAAAAAAAAAAAAAAAAAAAAAAAAAAAAAAAAAAAAAAAFAAAADwAAAAAAAAAAAAAAAAAAAkUAAAAAQAAABQAAAAUAAAAFAAAAAEAAAAAAAAAZAAAAGQAAAAAAAAAZAAAAGQAAAAVAAAAYAAAAAAAAAAAAAAADwAAACADAAAAAAAAAAAAAAEAAACgMgAAVgcAAKr4//8BAAAAf39/AAEAAABkAAAAAAAAABQAAABAHwAAAAAAACYAAAAAAAAAwOD//wAAAAAmAAAAZAAAABYAAABMAAAAAAAAAAAAAAAEAAAAAAAAAAEAAAAsPEMKAAAAACgAAAAoAAAAZAAAAGQAAAAAAAAAzMzMAAAAAABQAAAAUAAAAGQAAABkAAAAAAAAABcAAAAUAAAAAAAAAAAAAAD/fwAA/38AAAAAAAAJAAAABAAAAAAAAAAMAAAAEAAAAAAAAAAAAAAAAAAAAAAAAAAeAAAAaAAAAAAAAAAAAAAAAAAAAAAAAAAAAAAAECcAABAnAAAAAAAAAAAAAAAAAAAAAAAAAAAAAAAAAAAAAAAAAAAAABQAAAAAAAAAwMD/AAAAAABkAAAAMgAAAAAAAABkAAAAAAAAAH9/fwAKAAAAHwAAAFQAAACQwiYF////AQAAAAAAAAAAAAAAAAAAAAAAAAAAAAAAAAAAAAAAAAAAAAAAAn9/fwAsPEMDzMzMAMDA/wB/f38AAAAAAAAAAAAAAAAAAAAAAAAAAAAhAAAAGAAAABQAAAArBAAAxQoAAA05AACkIgAAEAAAACYAAAAIAAAAAQAAAAAAAAA="/>
+                <pr:smNativeData xmlns:pr="smNativeData" xmlns:p14="http://schemas.microsoft.com/office/powerpoint/2010/main" xmlns="" val="SMDATA_13_w78LXxMAAAAlAAAAZAAAAA0AAAAAkAAAAJAAAACQAAAAkAAAAAAAAAAAAAAAAAAAAAEAAABQAAAAAAAAAAAA4D8AAAAAAADgPwAAAAAAAOA/AAAAAAAA4D8AAAAAAADgPwAAAAAAAOA/AAAAAAAA4D8AAAAAAADgPwAAAAAAAOA/AAAAAAAA4D8CAAAAjAAAAAAAAAAAAAAAkMImDP///wgAAAAAAAAAAAAAAAAAAAAAAAAAAAAAAAAAAAAAZAAAAAEAAABAAAAAAAAAAAAAAAAAAAAAAAAAAAAAAAAAAAAAAAAAAAAAAAAAAAAAAAAAAAAAAAAAAAAAAAAAAAAAAAAAAAAAAAAAAAAAAAAAAAAAAAAAAAAAAAAAAAAAFAAAADwAAAAAAAAAAAAAAAAAAAkUAAAAAQAAABQAAAAUAAAAFAAAAAEAAAAAAAAAZAAAAGQAAAAAAAAAZAAAAGQAAAAVAAAAYAAAAAAAAAAAAAAADwAAACADAAAAAAAAAAAAAAEAAACgMgAAVgcAAKr4//8BAAAAf39/AAEAAABkAAAAAAAAABQAAABAHwAAAAAAACYAAAAAAAAAwOD//wAAAAAmAAAAZAAAABYAAABMAAAAAAAAAAAAAAAEAAAAAAAAAAEAAAAsPEMKAAAAACgAAAAoAAAAZAAAAGQAAAAAAAAAzMzMAAAAAABQAAAAUAAAAGQAAABkAAAAAAAAABcAAAAUAAAAAAAAAAAAAAD/fwAA/38AAAAAAAAJAAAABAAAAAAAAAAMAAAAEAAAAAAAAAAAAAAAAAAAAAAAAAAeAAAAaAAAAAAAAAAAAAAAAAAAAAAAAAAAAAAAECcAABAnAAAAAAAAAAAAAAAAAAAAAAAAAAAAAAAAAAAAAAAAAAAAABQAAAAAAAAAwMD/AAAAAABkAAAAMgAAAAAAAABkAAAAAAAAAH9/fwAKAAAAHwAAAFQAAACQwiYF////AQAAAAAAAAAAAAAAAAAAAAAAAAAAAAAAAAAAAAAAAAAAAAAAAn9/fwAsPEMDzMzMAMDA/wB/f38AAAAAAAAAAAAAAAAAAAAAAAAAAAAhAAAAGAAAABQAAAArBAAAxQoAAA05AACkIgAAEAAAACYAAAAIAAAAAQAAAAAAAAA="/>
               </a:ext>
             </a:extLst>
           </p:cNvSpPr>
@@ -26300,7 +26979,7 @@
 </p:sld>
 </file>
 
-<file path=ppt/slides/slide26.xml><?xml version="1.0" encoding="utf-8"?>
+<file path=ppt/slides/slide31.xml><?xml version="1.0" encoding="utf-8"?>
 <p:sld xmlns:a="http://schemas.openxmlformats.org/drawingml/2006/main" xmlns:r="http://schemas.openxmlformats.org/officeDocument/2006/relationships" xmlns:p="http://schemas.openxmlformats.org/presentationml/2006/main">
   <p:cSld>
     <p:spTree>
@@ -26324,7 +27003,7 @@
             <a:spLocks noGrp="1" noChangeArrowheads="1"/>
             <a:extLst>
               <a:ext uri="smNativeData">
-                <pr:smNativeData xmlns="" xmlns:p14="http://schemas.microsoft.com/office/powerpoint/2010/main" xmlns:pr="smNativeData" val="SMDATA_13_w78LXxMAAAAlAAAAZAAAAA0AAAAAkAAAAJAAAACQAAAAkAAAAAAAAAAAAAAAAAAAAAEAAABQAAAAAAAAAAAA4D8AAAAAAADgPwAAAAAAAOA/AAAAAAAA4D8AAAAAAADgPwAAAAAAAOA/AAAAAAAA4D8AAAAAAADgPwAAAAAAAOA/AAAAAAAA4D8CAAAAjAAAAAAAAAAAAAAAkMImDP///wgAAAAAAAAAAAAAAAAAAAAAAAAAAAAAAAAAAAAAZAAAAAEAAABAAAAAAAAAAAAAAAAAAAAAAAAAAAAAAAAAAAAAAAAAAAAAAAAAAAAAAAAAAAAAAAAAAAAAAAAAAAAAAAAAAAAAAAAAAAAAAAAAAAAAAAAAAAAAAAAAAAAAFAAAADwAAAAAAAAAAAAAAAAAAAkUAAAAAQAAABQAAAAUAAAAFAAAAAEAAAAAAAAAZAAAAGQAAAAAAAAAZAAAAGQAAAAVAAAAYAAAAAAAAAAAAAAADwAAACADAAAAAAAAAAAAAAEAAACgMgAAVgcAAKr4//8BAAAAf39/AAEAAABkAAAAAAAAABQAAABAHwAAAAAAACYAAAAAAAAAwOD//wAAAAAmAAAAZAAAABYAAABMAAAAAAAAAAAAAAAEAAAAAAAAAAEAAAAsPEMKAAAAACgAAAAoAAAAZAAAAGQAAAAAAAAAzMzMAAAAAABQAAAAUAAAAGQAAABkAAAAAAAAABcAAAAUAAAAAAAAAAAAAAD/fwAA/38AAAAAAAAJAAAABAAAAAAAAAAMAAAAEAAAAAAAAAAAAAAAAAAAAAAAAAAeAAAAaAAAAAAAAAAAAAAAAAAAAAAAAAAAAAAAECcAABAnAAAAAAAAAAAAAAAAAAAAAAAAAAAAAAAAAAAAAAAAAAAAABQAAAAAAAAAwMD/AAAAAABkAAAAMgAAAAAAAABkAAAAAAAAAH9/fwAKAAAAHwAAAFQAAACQwiYF////AQAAAAAAAAAAAAAAAAAAAAAAAAAAAAAAAAAAAAAAAAAAAAAAAn9/fwAsPEMDzMzMAMDA/wB/f38AAAAAAAAAAAAAAAAAAAAAAAAAAAAhAAAAGAAAABQAAAArBAAAwAMAAA05AADgCwAAEAAAACYAAAAIAAAAAAAAAAAAAAA="/>
+                <pr:smNativeData xmlns:pr="smNativeData" xmlns:p14="http://schemas.microsoft.com/office/powerpoint/2010/main" xmlns="" val="SMDATA_13_w78LXxMAAAAlAAAAZAAAAA0AAAAAkAAAAJAAAACQAAAAkAAAAAAAAAAAAAAAAAAAAAEAAABQAAAAAAAAAAAA4D8AAAAAAADgPwAAAAAAAOA/AAAAAAAA4D8AAAAAAADgPwAAAAAAAOA/AAAAAAAA4D8AAAAAAADgPwAAAAAAAOA/AAAAAAAA4D8CAAAAjAAAAAAAAAAAAAAAkMImDP///wgAAAAAAAAAAAAAAAAAAAAAAAAAAAAAAAAAAAAAZAAAAAEAAABAAAAAAAAAAAAAAAAAAAAAAAAAAAAAAAAAAAAAAAAAAAAAAAAAAAAAAAAAAAAAAAAAAAAAAAAAAAAAAAAAAAAAAAAAAAAAAAAAAAAAAAAAAAAAAAAAAAAAFAAAADwAAAAAAAAAAAAAAAAAAAkUAAAAAQAAABQAAAAUAAAAFAAAAAEAAAAAAAAAZAAAAGQAAAAAAAAAZAAAAGQAAAAVAAAAYAAAAAAAAAAAAAAADwAAACADAAAAAAAAAAAAAAEAAACgMgAAVgcAAKr4//8BAAAAf39/AAEAAABkAAAAAAAAABQAAABAHwAAAAAAACYAAAAAAAAAwOD//wAAAAAmAAAAZAAAABYAAABMAAAAAAAAAAAAAAAEAAAAAAAAAAEAAAAsPEMKAAAAACgAAAAoAAAAZAAAAGQAAAAAAAAAzMzMAAAAAABQAAAAUAAAAGQAAABkAAAAAAAAABcAAAAUAAAAAAAAAAAAAAD/fwAA/38AAAAAAAAJAAAABAAAAAAAAAAMAAAAEAAAAAAAAAAAAAAAAAAAAAAAAAAeAAAAaAAAAAAAAAAAAAAAAAAAAAAAAAAAAAAAECcAABAnAAAAAAAAAAAAAAAAAAAAAAAAAAAAAAAAAAAAAAAAAAAAABQAAAAAAAAAwMD/AAAAAABkAAAAMgAAAAAAAABkAAAAAAAAAH9/fwAKAAAAHwAAAFQAAACQwiYF////AQAAAAAAAAAAAAAAAAAAAAAAAAAAAAAAAAAAAAAAAAAAAAAAAn9/fwAsPEMDzMzMAMDA/wB/f38AAAAAAAAAAAAAAAAAAAAAAAAAAAAhAAAAGAAAABQAAAArBAAAwAMAAA05AADgCwAAEAAAACYAAAAIAAAAAAAAAAAAAAA="/>
               </a:ext>
             </a:extLst>
           </p:cNvSpPr>
@@ -26351,7 +27030,7 @@
             <a:spLocks noGrp="1" noChangeArrowheads="1"/>
             <a:extLst>
               <a:ext uri="smNativeData">
-                <pr:smNativeData xmlns="" xmlns:p14="http://schemas.microsoft.com/office/powerpoint/2010/main" xmlns:pr="smNativeData" val="SMDATA_13_w78LXxMAAAAlAAAAZAAAAA0AAAAAkAAAAJAAAACQAAAAkAAAAAAAAAAAAAAAAAAAAAEAAABQAAAAAAAAAAAA4D8AAAAAAADgPwAAAAAAAOA/AAAAAAAA4D8AAAAAAADgPwAAAAAAAOA/AAAAAAAA4D8AAAAAAADgPwAAAAAAAOA/AAAAAAAA4D8CAAAAjAAAAAAAAAAAAAAAkMImDP///wgAAAAAAAAAAAAAAAAAAAAAAAAAAAAAAAAAAAAAZAAAAAEAAABAAAAAAAAAAAAAAAAAAAAAAAAAAAAAAAAAAAAAAAAAAAAAAAAAAAAAAAAAAAAAAAAAAAAAAAAAAAAAAAAAAAAAAAAAAAAAAAAAAAAAAAAAAAAAAAAAAAAAFAAAADwAAAAAAAAAAAAAAAAAAAkUAAAAAQAAABQAAAAUAAAAFAAAAAEAAAAAAAAAZAAAAGQAAAAAAAAAZAAAAGQAAAAVAAAAYAAAAAAAAAAAAAAADwAAACADAAAAAAAAAAAAAAEAAACgMgAAVgcAAKr4//8BAAAAf39/AAEAAABkAAAAAAAAABQAAABAHwAAAAAAACYAAAAAAAAAwOD//wAAAAAmAAAAZAAAABYAAABMAAAAAAAAAAAAAAAEAAAAAAAAAAEAAAAsPEMKAAAAACgAAAAoAAAAZAAAAGQAAAAAAAAAzMzMAAAAAABQAAAAUAAAAGQAAABkAAAAAAAAABcAAAAUAAAAAAAAAAAAAAD/fwAA/38AAAAAAAAJAAAABAAAAAAAAAAMAAAAEAAAAAAAAAAAAAAAAAAAAAAAAAAeAAAAaAAAAAAAAAAAAAAAAAAAAAAAAAAAAAAAECcAABAnAAAAAAAAAAAAAAAAAAAAAAAAAAAAAAAAAAAAAAAAAAAAABQAAAAAAAAAwMD/AAAAAABkAAAAMgAAAAAAAABkAAAAAAAAAH9/fwAKAAAAHwAAAFQAAACQwiYF////AQAAAAAAAAAAAAAAAAAAAAAAAAAAAAAAAAAAAAAAAAAAAAAAAn9/fwAsPEMDzMzMAMDA/wB/f38AAAAAAAAAAAAAAAAAAAAAAAAAAAAhAAAAGAAAABQAAAArBAAAKwoAAA05AAALIgAAEAAAACYAAAAIAAAAAQAAAAAAAAA="/>
+                <pr:smNativeData xmlns:pr="smNativeData" xmlns:p14="http://schemas.microsoft.com/office/powerpoint/2010/main" xmlns="" val="SMDATA_13_w78LXxMAAAAlAAAAZAAAAA0AAAAAkAAAAJAAAACQAAAAkAAAAAAAAAAAAAAAAAAAAAEAAABQAAAAAAAAAAAA4D8AAAAAAADgPwAAAAAAAOA/AAAAAAAA4D8AAAAAAADgPwAAAAAAAOA/AAAAAAAA4D8AAAAAAADgPwAAAAAAAOA/AAAAAAAA4D8CAAAAjAAAAAAAAAAAAAAAkMImDP///wgAAAAAAAAAAAAAAAAAAAAAAAAAAAAAAAAAAAAAZAAAAAEAAABAAAAAAAAAAAAAAAAAAAAAAAAAAAAAAAAAAAAAAAAAAAAAAAAAAAAAAAAAAAAAAAAAAAAAAAAAAAAAAAAAAAAAAAAAAAAAAAAAAAAAAAAAAAAAAAAAAAAAFAAAADwAAAAAAAAAAAAAAAAAAAkUAAAAAQAAABQAAAAUAAAAFAAAAAEAAAAAAAAAZAAAAGQAAAAAAAAAZAAAAGQAAAAVAAAAYAAAAAAAAAAAAAAADwAAACADAAAAAAAAAAAAAAEAAACgMgAAVgcAAKr4//8BAAAAf39/AAEAAABkAAAAAAAAABQAAABAHwAAAAAAACYAAAAAAAAAwOD//wAAAAAmAAAAZAAAABYAAABMAAAAAAAAAAAAAAAEAAAAAAAAAAEAAAAsPEMKAAAAACgAAAAoAAAAZAAAAGQAAAAAAAAAzMzMAAAAAABQAAAAUAAAAGQAAABkAAAAAAAAABcAAAAUAAAAAAAAAAAAAAD/fwAA/38AAAAAAAAJAAAABAAAAAAAAAAMAAAAEAAAAAAAAAAAAAAAAAAAAAAAAAAeAAAAaAAAAAAAAAAAAAAAAAAAAAAAAAAAAAAAECcAABAnAAAAAAAAAAAAAAAAAAAAAAAAAAAAAAAAAAAAAAAAAAAAABQAAAAAAAAAwMD/AAAAAABkAAAAMgAAAAAAAABkAAAAAAAAAH9/fwAKAAAAHwAAAFQAAACQwiYF////AQAAAAAAAAAAAAAAAAAAAAAAAAAAAAAAAAAAAAAAAAAAAAAAAn9/fwAsPEMDzMzMAMDA/wB/f38AAAAAAAAAAAAAAAAAAAAAAAAAAAAhAAAAGAAAABQAAAArBAAAKwoAAA05AAALIgAAEAAAACYAAAAIAAAAAQAAAAAAAAA="/>
               </a:ext>
             </a:extLst>
           </p:cNvSpPr>
@@ -26468,7 +27147,7 @@
 </p:sld>
 </file>
 
-<file path=ppt/slides/slide27.xml><?xml version="1.0" encoding="utf-8"?>
+<file path=ppt/slides/slide32.xml><?xml version="1.0" encoding="utf-8"?>
 <p:sld xmlns:a="http://schemas.openxmlformats.org/drawingml/2006/main" xmlns:r="http://schemas.openxmlformats.org/officeDocument/2006/relationships" xmlns:p="http://schemas.openxmlformats.org/presentationml/2006/main">
   <p:cSld>
     <p:spTree>
@@ -26492,7 +27171,7 @@
             <a:spLocks noGrp="1" noChangeArrowheads="1"/>
             <a:extLst>
               <a:ext uri="smNativeData">
-                <pr:smNativeData xmlns="" xmlns:p14="http://schemas.microsoft.com/office/powerpoint/2010/main" xmlns:pr="smNativeData" val="SMDATA_13_w78LXxMAAAAlAAAAZAAAAA0AAAAAkAAAAJAAAACQAAAAkAAAAAAAAAAAAAAAAAAAAAEAAABQAAAAAAAAAAAA4D8AAAAAAADgPwAAAAAAAOA/AAAAAAAA4D8AAAAAAADgPwAAAAAAAOA/AAAAAAAA4D8AAAAAAADgPwAAAAAAAOA/AAAAAAAA4D8CAAAAjAAAAAAAAAAAAAAAkMImDP///wgAAAAAAAAAAAAAAAAAAAAAAAAAAAAAAAAAAAAAZAAAAAEAAABAAAAAAAAAAAAAAAAAAAAAAAAAAAAAAAAAAAAAAAAAAAAAAAAAAAAAAAAAAAAAAAAAAAAAAAAAAAAAAAAAAAAAAAAAAAAAAAAAAAAAAAAAAAAAAAAAAAAAFAAAADwAAAAAAAAAAAAAAAAAAAkUAAAAAQAAABQAAAAUAAAAFAAAAAEAAAAAAAAAZAAAAGQAAAAAAAAAZAAAAGQAAAAVAAAAYAAAAAAAAAAAAAAADwAAACADAAAAAAAAAAAAAAEAAACgMgAAVgcAAKr4//8BAAAAf39/AAEAAABkAAAAAAAAABQAAABAHwAAAAAAACYAAAAAAAAAwOD//wAAAAAmAAAAZAAAABYAAABMAAAAAAAAAAAAAAAEAAAAAAAAAAEAAAAsPEMKAAAAACgAAAAoAAAAZAAAAGQAAAAAAAAAzMzMAAAAAABQAAAAUAAAAGQAAABkAAAAAAAAABcAAAAUAAAAAAAAAAAAAAD/fwAA/38AAAAAAAAJAAAABAAAAAAAAAAMAAAAEAAAAAAAAAAAAAAAAAAAAAAAAAAeAAAAaAAAAAAAAAAAAAAAAAAAAAAAAAAAAAAAECcAABAnAAAAAAAAAAAAAAAAAAAAAAAAAAAAAAAAAAAAAAAAAAAAABQAAAAAAAAAwMD/AAAAAABkAAAAMgAAAAAAAABkAAAAAAAAAH9/fwAKAAAAHwAAAFQAAACQwiYF////AQAAAAAAAAAAAAAAAAAAAAAAAAAAAAAAAAAAAAAAAAAAAAAAAn9/fwAsPEMDzMzMAMDA/wB/f38AAAAAAAAAAAAAAAAAAAAAAAAAAAAhAAAAGAAAABQAAAArBAAAwAMAAA05AADgCwAAEAAAACYAAAAIAAAAAAAAAAAAAAA="/>
+                <pr:smNativeData xmlns:pr="smNativeData" xmlns:p14="http://schemas.microsoft.com/office/powerpoint/2010/main" xmlns="" val="SMDATA_13_w78LXxMAAAAlAAAAZAAAAA0AAAAAkAAAAJAAAACQAAAAkAAAAAAAAAAAAAAAAAAAAAEAAABQAAAAAAAAAAAA4D8AAAAAAADgPwAAAAAAAOA/AAAAAAAA4D8AAAAAAADgPwAAAAAAAOA/AAAAAAAA4D8AAAAAAADgPwAAAAAAAOA/AAAAAAAA4D8CAAAAjAAAAAAAAAAAAAAAkMImDP///wgAAAAAAAAAAAAAAAAAAAAAAAAAAAAAAAAAAAAAZAAAAAEAAABAAAAAAAAAAAAAAAAAAAAAAAAAAAAAAAAAAAAAAAAAAAAAAAAAAAAAAAAAAAAAAAAAAAAAAAAAAAAAAAAAAAAAAAAAAAAAAAAAAAAAAAAAAAAAAAAAAAAAFAAAADwAAAAAAAAAAAAAAAAAAAkUAAAAAQAAABQAAAAUAAAAFAAAAAEAAAAAAAAAZAAAAGQAAAAAAAAAZAAAAGQAAAAVAAAAYAAAAAAAAAAAAAAADwAAACADAAAAAAAAAAAAAAEAAACgMgAAVgcAAKr4//8BAAAAf39/AAEAAABkAAAAAAAAABQAAABAHwAAAAAAACYAAAAAAAAAwOD//wAAAAAmAAAAZAAAABYAAABMAAAAAAAAAAAAAAAEAAAAAAAAAAEAAAAsPEMKAAAAACgAAAAoAAAAZAAAAGQAAAAAAAAAzMzMAAAAAABQAAAAUAAAAGQAAABkAAAAAAAAABcAAAAUAAAAAAAAAAAAAAD/fwAA/38AAAAAAAAJAAAABAAAAAAAAAAMAAAAEAAAAAAAAAAAAAAAAAAAAAAAAAAeAAAAaAAAAAAAAAAAAAAAAAAAAAAAAAAAAAAAECcAABAnAAAAAAAAAAAAAAAAAAAAAAAAAAAAAAAAAAAAAAAAAAAAABQAAAAAAAAAwMD/AAAAAABkAAAAMgAAAAAAAABkAAAAAAAAAH9/fwAKAAAAHwAAAFQAAACQwiYF////AQAAAAAAAAAAAAAAAAAAAAAAAAAAAAAAAAAAAAAAAAAAAAAAAn9/fwAsPEMDzMzMAMDA/wB/f38AAAAAAAAAAAAAAAAAAAAAAAAAAAAhAAAAGAAAABQAAAArBAAAwAMAAA05AADgCwAAEAAAACYAAAAIAAAAAAAAAAAAAAA="/>
               </a:ext>
             </a:extLst>
           </p:cNvSpPr>
@@ -26519,7 +27198,7 @@
             <a:spLocks noGrp="1" noChangeArrowheads="1"/>
             <a:extLst>
               <a:ext uri="smNativeData">
-                <pr:smNativeData xmlns="" xmlns:p14="http://schemas.microsoft.com/office/powerpoint/2010/main" xmlns:pr="smNativeData" val="SMDATA_13_w78LXxMAAAAlAAAAZAAAAA0AAAAAkAAAAJAAAACQAAAAkAAAAAAAAAAAAAAAAAAAAAEAAABQAAAAAAAAAAAA4D8AAAAAAADgPwAAAAAAAOA/AAAAAAAA4D8AAAAAAADgPwAAAAAAAOA/AAAAAAAA4D8AAAAAAADgPwAAAAAAAOA/AAAAAAAA4D8CAAAAjAAAAAAAAAAAAAAAkMImDP///wgAAAAAAAAAAAAAAAAAAAAAAAAAAAAAAAAAAAAAZAAAAAEAAABAAAAAAAAAAAAAAAAAAAAAAAAAAAAAAAAAAAAAAAAAAAAAAAAAAAAAAAAAAAAAAAAAAAAAAAAAAAAAAAAAAAAAAAAAAAAAAAAAAAAAAAAAAAAAAAAAAAAAFAAAADwAAAAAAAAAAAAAAAAAAAkUAAAAAQAAABQAAAAUAAAAFAAAAAEAAAAAAAAAZAAAAGQAAAAAAAAAZAAAAGQAAAAVAAAAYAAAAAAAAAAAAAAADwAAACADAAAAAAAAAAAAAAEAAACgMgAAVgcAAKr4//8BAAAAf39/AAEAAABkAAAAAAAAABQAAABAHwAAAAAAACYAAAAAAAAAwOD//wAAAAAmAAAAZAAAABYAAABMAAAAAAAAAAAAAAAEAAAAAAAAAAEAAAAsPEMKAAAAACgAAAAoAAAAZAAAAGQAAAAAAAAAzMzMAAAAAABQAAAAUAAAAGQAAABkAAAAAAAAABcAAAAUAAAAAAAAAAAAAAD/fwAA/38AAAAAAAAJAAAABAAAAAAAAAAMAAAAEAAAAAAAAAAAAAAAAAAAAAAAAAAeAAAAaAAAAAAAAAAAAAAAAAAAAAAAAAAAAAAAECcAABAnAAAAAAAAAAAAAAAAAAAAAAAAAAAAAAAAAAAAAAAAAAAAABQAAAAAAAAAwMD/AAAAAABkAAAAMgAAAAAAAABkAAAAAAAAAH9/fwAKAAAAHwAAAFQAAACQwiYF////AQAAAAAAAAAAAAAAAAAAAAAAAAAAAAAAAAAAAAAAAAAAAAAAAn9/fwAsPEMDzMzMAMDA/wB/f38AAAAAAAAAAAAAAAAAAAAAAAAAAAAhAAAAGAAAABQAAAArBAAAxQoAAA05AACkIgAAEAAAACYAAAAIAAAAAQAAAAAAAAA="/>
+                <pr:smNativeData xmlns:pr="smNativeData" xmlns:p14="http://schemas.microsoft.com/office/powerpoint/2010/main" xmlns="" val="SMDATA_13_w78LXxMAAAAlAAAAZAAAAA0AAAAAkAAAAJAAAACQAAAAkAAAAAAAAAAAAAAAAAAAAAEAAABQAAAAAAAAAAAA4D8AAAAAAADgPwAAAAAAAOA/AAAAAAAA4D8AAAAAAADgPwAAAAAAAOA/AAAAAAAA4D8AAAAAAADgPwAAAAAAAOA/AAAAAAAA4D8CAAAAjAAAAAAAAAAAAAAAkMImDP///wgAAAAAAAAAAAAAAAAAAAAAAAAAAAAAAAAAAAAAZAAAAAEAAABAAAAAAAAAAAAAAAAAAAAAAAAAAAAAAAAAAAAAAAAAAAAAAAAAAAAAAAAAAAAAAAAAAAAAAAAAAAAAAAAAAAAAAAAAAAAAAAAAAAAAAAAAAAAAAAAAAAAAFAAAADwAAAAAAAAAAAAAAAAAAAkUAAAAAQAAABQAAAAUAAAAFAAAAAEAAAAAAAAAZAAAAGQAAAAAAAAAZAAAAGQAAAAVAAAAYAAAAAAAAAAAAAAADwAAACADAAAAAAAAAAAAAAEAAACgMgAAVgcAAKr4//8BAAAAf39/AAEAAABkAAAAAAAAABQAAABAHwAAAAAAACYAAAAAAAAAwOD//wAAAAAmAAAAZAAAABYAAABMAAAAAAAAAAAAAAAEAAAAAAAAAAEAAAAsPEMKAAAAACgAAAAoAAAAZAAAAGQAAAAAAAAAzMzMAAAAAABQAAAAUAAAAGQAAABkAAAAAAAAABcAAAAUAAAAAAAAAAAAAAD/fwAA/38AAAAAAAAJAAAABAAAAAAAAAAMAAAAEAAAAAAAAAAAAAAAAAAAAAAAAAAeAAAAaAAAAAAAAAAAAAAAAAAAAAAAAAAAAAAAECcAABAnAAAAAAAAAAAAAAAAAAAAAAAAAAAAAAAAAAAAAAAAAAAAABQAAAAAAAAAwMD/AAAAAABkAAAAMgAAAAAAAABkAAAAAAAAAH9/fwAKAAAAHwAAAFQAAACQwiYF////AQAAAAAAAAAAAAAAAAAAAAAAAAAAAAAAAAAAAAAAAAAAAAAAAn9/fwAsPEMDzMzMAMDA/wB/f38AAAAAAAAAAAAAAAAAAAAAAAAAAAAhAAAAGAAAABQAAAArBAAAxQoAAA05AACkIgAAEAAAACYAAAAIAAAAAQAAAAAAAAA="/>
               </a:ext>
             </a:extLst>
           </p:cNvSpPr>
@@ -26637,7 +27316,7 @@
 </p:sld>
 </file>
 
-<file path=ppt/slides/slide28.xml><?xml version="1.0" encoding="utf-8"?>
+<file path=ppt/slides/slide33.xml><?xml version="1.0" encoding="utf-8"?>
 <p:sld xmlns:a="http://schemas.openxmlformats.org/drawingml/2006/main" xmlns:r="http://schemas.openxmlformats.org/officeDocument/2006/relationships" xmlns:p="http://schemas.openxmlformats.org/presentationml/2006/main">
   <p:cSld>
     <p:spTree>
@@ -26661,7 +27340,7 @@
             <a:spLocks noGrp="1" noChangeArrowheads="1"/>
             <a:extLst>
               <a:ext uri="smNativeData">
-                <pr:smNativeData xmlns="" xmlns:p14="http://schemas.microsoft.com/office/powerpoint/2010/main" xmlns:pr="smNativeData" val="SMDATA_13_w78LXxMAAAAlAAAAZAAAAA0AAAAAkAAAAJAAAACQAAAAkAAAAAAAAAAAAAAAAAAAAAEAAABQAAAAAAAAAAAA4D8AAAAAAADgPwAAAAAAAOA/AAAAAAAA4D8AAAAAAADgPwAAAAAAAOA/AAAAAAAA4D8AAAAAAADgPwAAAAAAAOA/AAAAAAAA4D8CAAAAjAAAAAAAAAAAAAAAkMImDP///wgAAAAAAAAAAAAAAAAAAAAAAAAAAAAAAAAAAAAAZAAAAAEAAABAAAAAAAAAAAAAAAAAAAAAAAAAAAAAAAAAAAAAAAAAAAAAAAAAAAAAAAAAAAAAAAAAAAAAAAAAAAAAAAAAAAAAAAAAAAAAAAAAAAAAAAAAAAAAAAAAAAAAFAAAADwAAAAAAAAAAAAAAAAAAAkUAAAAAQAAABQAAAAUAAAAFAAAAAEAAAAAAAAAZAAAAGQAAAAAAAAAZAAAAGQAAAAVAAAAYAAAAAAAAAAAAAAADwAAACADAAAAAAAAAAAAAAEAAACgMgAAVgcAAKr4//8BAAAAf39/AAEAAABkAAAAAAAAABQAAABAHwAAAAAAACYAAAAAAAAAwOD//wAAAAAmAAAAZAAAABYAAABMAAAAAAAAAAAAAAAEAAAAAAAAAAEAAAAsPEMKAAAAACgAAAAoAAAAZAAAAGQAAAAAAAAAzMzMAAAAAABQAAAAUAAAAGQAAABkAAAAAAAAABcAAAAUAAAAAAAAAAAAAAD/fwAA/38AAAAAAAAJAAAABAAAAH4uAAAMAAAAEAAAAAAAAAAAAAAAAAAAAAAAAAAeAAAAaAAAAAAAAAAAAAAAAAAAAAAAAAAAAAAAECcAABAnAAAAAAAAAAAAAAAAAAAAAAAAAAAAAAAAAAAAAAAAAAAAABQAAAAAAAAAwMD/AAAAAABkAAAAMgAAAAAAAABkAAAAAAAAAH9/fwAKAAAAHwAAAFQAAACQwiYF////AQAAAAAAAAAAAAAAAAAAAAAAAAAAAAAAAAAAAAAAAAAAAAAAAn9/fwAsPEMDzMzMAMDA/wB/f38AAAAAAAAAAAAAAAAAAAAAAAAAAAAhAAAAGAAAABQAAAArBAAAwAMAAA05AADgCwAAEAAAACYAAAAIAAAAAAAAAAAAAAA="/>
+                <pr:smNativeData xmlns:pr="smNativeData" xmlns:p14="http://schemas.microsoft.com/office/powerpoint/2010/main" xmlns="" val="SMDATA_13_w78LXxMAAAAlAAAAZAAAAA0AAAAAkAAAAJAAAACQAAAAkAAAAAAAAAAAAAAAAAAAAAEAAABQAAAAAAAAAAAA4D8AAAAAAADgPwAAAAAAAOA/AAAAAAAA4D8AAAAAAADgPwAAAAAAAOA/AAAAAAAA4D8AAAAAAADgPwAAAAAAAOA/AAAAAAAA4D8CAAAAjAAAAAAAAAAAAAAAkMImDP///wgAAAAAAAAAAAAAAAAAAAAAAAAAAAAAAAAAAAAAZAAAAAEAAABAAAAAAAAAAAAAAAAAAAAAAAAAAAAAAAAAAAAAAAAAAAAAAAAAAAAAAAAAAAAAAAAAAAAAAAAAAAAAAAAAAAAAAAAAAAAAAAAAAAAAAAAAAAAAAAAAAAAAFAAAADwAAAAAAAAAAAAAAAAAAAkUAAAAAQAAABQAAAAUAAAAFAAAAAEAAAAAAAAAZAAAAGQAAAAAAAAAZAAAAGQAAAAVAAAAYAAAAAAAAAAAAAAADwAAACADAAAAAAAAAAAAAAEAAACgMgAAVgcAAKr4//8BAAAAf39/AAEAAABkAAAAAAAAABQAAABAHwAAAAAAACYAAAAAAAAAwOD//wAAAAAmAAAAZAAAABYAAABMAAAAAAAAAAAAAAAEAAAAAAAAAAEAAAAsPEMKAAAAACgAAAAoAAAAZAAAAGQAAAAAAAAAzMzMAAAAAABQAAAAUAAAAGQAAABkAAAAAAAAABcAAAAUAAAAAAAAAAAAAAD/fwAA/38AAAAAAAAJAAAABAAAAH4uAAAMAAAAEAAAAAAAAAAAAAAAAAAAAAAAAAAeAAAAaAAAAAAAAAAAAAAAAAAAAAAAAAAAAAAAECcAABAnAAAAAAAAAAAAAAAAAAAAAAAAAAAAAAAAAAAAAAAAAAAAABQAAAAAAAAAwMD/AAAAAABkAAAAMgAAAAAAAABkAAAAAAAAAH9/fwAKAAAAHwAAAFQAAACQwiYF////AQAAAAAAAAAAAAAAAAAAAAAAAAAAAAAAAAAAAAAAAAAAAAAAAn9/fwAsPEMDzMzMAMDA/wB/f38AAAAAAAAAAAAAAAAAAAAAAAAAAAAhAAAAGAAAABQAAAArBAAAwAMAAA05AADgCwAAEAAAACYAAAAIAAAAAAAAAAAAAAA="/>
               </a:ext>
             </a:extLst>
           </p:cNvSpPr>
@@ -26688,7 +27367,7 @@
             <a:spLocks noGrp="1" noChangeArrowheads="1"/>
             <a:extLst>
               <a:ext uri="smNativeData">
-                <pr:smNativeData xmlns="" xmlns:p14="http://schemas.microsoft.com/office/powerpoint/2010/main" xmlns:pr="smNativeData" val="SMDATA_13_w78LXxMAAAAlAAAAZAAAAA0AAAAAkAAAAJAAAACQAAAAkAAAAAAAAAAAAAAAAAAAAAEAAABQAAAAAAAAAAAA4D8AAAAAAADgPwAAAAAAAOA/AAAAAAAA4D8AAAAAAADgPwAAAAAAAOA/AAAAAAAA4D8AAAAAAADgPwAAAAAAAOA/AAAAAAAA4D8CAAAAjAAAAAAAAAAAAAAAkMImDP///wgAAAAAAAAAAAAAAAAAAAAAAAAAAAAAAAAAAAAAZAAAAAEAAABAAAAAAAAAAAAAAAAAAAAAAAAAAAAAAAAAAAAAAAAAAAAAAAAAAAAAAAAAAAAAAAAAAAAAAAAAAAAAAAAAAAAAAAAAAAAAAAAAAAAAAAAAAAAAAAAAAAAAFAAAADwAAAAAAAAAAAAAAAAAAAkUAAAAAQAAABQAAAAUAAAAFAAAAAEAAAAAAAAAZAAAAGQAAAAAAAAAZAAAAGQAAAAVAAAAYAAAAAAAAAAAAAAADwAAACADAAAAAAAAAAAAAAEAAACgMgAAVgcAAKr4//8BAAAAf39/AAEAAABkAAAAAAAAABQAAABAHwAAAAAAACYAAAAAAAAAwOD//wAAAAAmAAAAZAAAABYAAABMAAAAAAAAAAAAAAAEAAAAAAAAAAEAAAAsPEMKAAAAACgAAAAoAAAAZAAAAGQAAAAAAAAAzMzMAAAAAABQAAAAUAAAAGQAAABkAAAAAAAAABcAAAAUAAAAAAAAAAAAAAD/fwAA/38AAAAAAAAJAAAABAAAAAAAAAAMAAAAEAAAAAAAAAAAAAAAAAAAAAAAAAAeAAAAaAAAAAAAAAAAAAAAAAAAAAAAAAAAAAAAECcAABAnAAAAAAAAAAAAAAAAAAAAAAAAAAAAAAAAAAAAAAAAAAAAABQAAAAAAAAAwMD/AAAAAABkAAAAMgAAAAAAAABkAAAAAAAAAH9/fwAKAAAAHwAAAFQAAACQwiYF////AQAAAAAAAAAAAAAAAAAAAAAAAAAAAAAAAAAAAAAAAAAAAAAAAn9/fwAsPEMDzMzMAMDA/wB/f38AAAAAAAAAAAAAAAAAAAAAAAAAAAAhAAAAGAAAABQAAAArBAAAxQoAAA05AACkIgAAEAAAACYAAAAIAAAAAQAAAAAAAAA="/>
+                <pr:smNativeData xmlns:pr="smNativeData" xmlns:p14="http://schemas.microsoft.com/office/powerpoint/2010/main" xmlns="" val="SMDATA_13_w78LXxMAAAAlAAAAZAAAAA0AAAAAkAAAAJAAAACQAAAAkAAAAAAAAAAAAAAAAAAAAAEAAABQAAAAAAAAAAAA4D8AAAAAAADgPwAAAAAAAOA/AAAAAAAA4D8AAAAAAADgPwAAAAAAAOA/AAAAAAAA4D8AAAAAAADgPwAAAAAAAOA/AAAAAAAA4D8CAAAAjAAAAAAAAAAAAAAAkMImDP///wgAAAAAAAAAAAAAAAAAAAAAAAAAAAAAAAAAAAAAZAAAAAEAAABAAAAAAAAAAAAAAAAAAAAAAAAAAAAAAAAAAAAAAAAAAAAAAAAAAAAAAAAAAAAAAAAAAAAAAAAAAAAAAAAAAAAAAAAAAAAAAAAAAAAAAAAAAAAAAAAAAAAAFAAAADwAAAAAAAAAAAAAAAAAAAkUAAAAAQAAABQAAAAUAAAAFAAAAAEAAAAAAAAAZAAAAGQAAAAAAAAAZAAAAGQAAAAVAAAAYAAAAAAAAAAAAAAADwAAACADAAAAAAAAAAAAAAEAAACgMgAAVgcAAKr4//8BAAAAf39/AAEAAABkAAAAAAAAABQAAABAHwAAAAAAACYAAAAAAAAAwOD//wAAAAAmAAAAZAAAABYAAABMAAAAAAAAAAAAAAAEAAAAAAAAAAEAAAAsPEMKAAAAACgAAAAoAAAAZAAAAGQAAAAAAAAAzMzMAAAAAABQAAAAUAAAAGQAAABkAAAAAAAAABcAAAAUAAAAAAAAAAAAAAD/fwAA/38AAAAAAAAJAAAABAAAAAAAAAAMAAAAEAAAAAAAAAAAAAAAAAAAAAAAAAAeAAAAaAAAAAAAAAAAAAAAAAAAAAAAAAAAAAAAECcAABAnAAAAAAAAAAAAAAAAAAAAAAAAAAAAAAAAAAAAAAAAAAAAABQAAAAAAAAAwMD/AAAAAABkAAAAMgAAAAAAAABkAAAAAAAAAH9/fwAKAAAAHwAAAFQAAACQwiYF////AQAAAAAAAAAAAAAAAAAAAAAAAAAAAAAAAAAAAAAAAAAAAAAAAn9/fwAsPEMDzMzMAMDA/wB/f38AAAAAAAAAAAAAAAAAAAAAAAAAAAAhAAAAGAAAABQAAAArBAAAxQoAAA05AACkIgAAEAAAACYAAAAIAAAAAQAAAAAAAAA="/>
               </a:ext>
             </a:extLst>
           </p:cNvSpPr>
@@ -26812,104 +27491,6 @@
 </p:sld>
 </file>
 
-<file path=ppt/slides/slide3.xml><?xml version="1.0" encoding="utf-8"?>
-<p:sld xmlns:a="http://schemas.openxmlformats.org/drawingml/2006/main" xmlns:r="http://schemas.openxmlformats.org/officeDocument/2006/relationships" xmlns:p="http://schemas.openxmlformats.org/presentationml/2006/main">
-  <p:cSld>
-    <p:spTree>
-      <p:nvGrpSpPr>
-        <p:cNvPr id="1" name=""/>
-        <p:cNvGrpSpPr/>
-        <p:nvPr/>
-      </p:nvGrpSpPr>
-      <p:grpSpPr>
-        <a:xfrm>
-          <a:off x="0" y="0"/>
-          <a:ext cx="0" cy="0"/>
-          <a:chOff x="0" y="0"/>
-          <a:chExt cx="0" cy="0"/>
-        </a:xfrm>
-      </p:grpSpPr>
-      <p:sp>
-        <p:nvSpPr>
-          <p:cNvPr id="2" name="Shape 164"/>
-          <p:cNvSpPr>
-            <a:spLocks noGrp="1" noChangeArrowheads="1"/>
-            <a:extLst>
-              <a:ext uri="smNativeData">
-                <pr:smNativeData xmlns="" xmlns:p14="http://schemas.microsoft.com/office/powerpoint/2010/main" xmlns:pr="smNativeData" val="SMDATA_13_w78LXxMAAAAlAAAAZAAAAA0AAAAAkAAAAJAAAACQAAAAkAAAAAAAAAAAAAAAAAAAAAEAAABQAAAAAAAAAAAA4D8AAAAAAADgPwAAAAAAAOA/AAAAAAAA4D8AAAAAAADgPwAAAAAAAOA/AAAAAAAA4D8AAAAAAADgPwAAAAAAAOA/AAAAAAAA4D8CAAAAjAAAAAAAAAAAAAAAkMImDP///wgAAAAAAAAAAAAAAAAAAAAAAAAAAAAAAAAAAAAAZAAAAAEAAABAAAAAAAAAAAAAAAAAAAAAAAAAAAAAAAAAAAAAAAAAAAAAAAAAAAAAAAAAAAAAAAAAAAAAAAAAAAAAAAAAAAAAAAAAAAAAAAAAAAAAAAAAAAAAAAAAAAAAFAAAADwAAAAAAAAAAAAAAAAAAAkUAAAAAQAAABQAAAAUAAAAFAAAAAEAAAAAAAAAZAAAAGQAAAAAAAAAZAAAAGQAAAAVAAAAYAAAAAAAAAAAAAAADwAAACADAAAAAAAAAAAAAAEAAACgMgAAVgcAAKr4//8BAAAAf39/AAEAAABkAAAAAAAAABQAAABAHwAAAAAAACYAAAAAAAAAwOD//wAAAAAmAAAAZAAAABYAAABMAAAAAAAAAAAAAAAEAAAAAAAAAAEAAAAsPEMKAAAAACgAAAAoAAAAZAAAAGQAAAAAAAAAzMzMAAAAAABQAAAAUAAAAGQAAABkAAAAAAAAABcAAAAUAAAAAAAAAAAAAAD/fwAA/38AAAAAAAAJAAAABAAAAAAAAAAMAAAAEAAAAAAAAAAAAAAAAAAAAAAAAAAeAAAAaAAAAAAAAAAAAAAAAAAAAAAAAAAAAAAAECcAABAnAAAAAAAAAAAAAAAAAAAAAAAAAAAAAAAAAAAAAAAAAAAAABQAAAAAAAAAwMD/AAAAAABkAAAAMgAAAAAAAABkAAAAAAAAAH9/fwAKAAAAHwAAAFQAAACQwiYF////AQAAAAAAAAAAAAAAAAAAAAAAAAAAAAAAAAAAAAAAAAAAAAAAAn9/fwAsPEMDzMzMAMDA/wB/f38AAAAAAAAAAAAAAAAAAAAAAAAAAAAhAAAAGAAAABQAAAArBAAAwAMAAA05AADgCwAAEAAAACYAAAAIAAAAPDAAAAAAAAA="/>
-              </a:ext>
-            </a:extLst>
-          </p:cNvSpPr>
-          <p:nvPr>
-            <p:ph type="title"/>
-          </p:nvPr>
-        </p:nvSpPr>
-        <p:spPr/>
-        <p:txBody>
-          <a:bodyPr vert="horz" wrap="square" lIns="91440" tIns="91440" rIns="91440" bIns="91440" numCol="1" spcCol="215900" anchor="t">
-            <a:prstTxWarp prst="textNoShape">
-              <a:avLst/>
-            </a:prstTxWarp>
-          </a:bodyPr>
-          <a:lstStyle/>
-          <a:p>
-            <a:pPr marL="0" indent="0">
-              <a:spcBef>
-                <a:spcPts val="0"/>
-              </a:spcBef>
-              <a:spcAft>
-                <a:spcPts val="0"/>
-              </a:spcAft>
-              <a:buNone/>
-            </a:pPr>
-            <a:r>
-              <a:rPr lang="es-es"/>
-              <a:t>DOM (Document Object Model)</a:t>
-            </a:r>
-          </a:p>
-        </p:txBody>
-      </p:sp>
-      <p:pic>
-        <p:nvPicPr>
-          <p:cNvPr id="3" name="Shape 165"/>
-          <p:cNvPicPr>
-            <a:extLst>
-              <a:ext uri="smNativeData">
-                <pr:smNativeData xmlns="" xmlns:p14="http://schemas.microsoft.com/office/powerpoint/2010/main" xmlns:pr="smNativeData" val="SMDATA_15_w78LXxMAAAAlAAAAEQAAAA0AAAAAkAAAAEgAAACQAAAASAAAAAAAAAAAAAAAAAAAAAEAAABQAAAAAAAAAAAA4D8AAAAAAADgPwAAAAAAAOA/AAAAAAAA4D8AAAAAAADgPwAAAAAAAOA/AAAAAAAA4D8AAAAAAADgPwAAAAAAAOA/AAAAAAAA4D8CAAAAjAAAAAAAAAAAAAAAkMImDP///wgAAAAAAAAAAAAAAAAAAAAAAAAAAAAAAAAAAAAAZAAAAAEAAABAAAAAAAAAAAAAAAAAAAAAAAAAAAAAAAAAAAAAAAAAAAAAAAAAAAAAAAAAAAAAAAAAAAAAAAAAAAAAAAAAAAAAAAAAAAAAAAAAAAAAAAAAAAAAAAAAAAAAFAAAADwAAAAAAAAAAAAAAAAAAAkUAAAAAQAAABQAAAAUAAAAFAAAAAEAAAAAAAAAZAAAAGQAAAAAAAAAZAAAAGQAAAAVAAAAYAAAAAAAAAAAAAAADwAAACADAAAAAAAAAAAAAAEAAACgMgAAVgcAAKr4//8BAAAAf39/AAEAAABkAAAAAAAAABQAAABAHwAAAAAAACYAAAAAAAAAwOD//wAAAAAmAAAAZAAAABYAAABMAAAAAAAAAAAAAAAEAAAAAAAAAAEAAAAsPEMKAAAAACgAAAAoAAAAZAAAAGQAAAAAAAAAzMzMAAAAAABQAAAAUAAAAGQAAABkAAAAAAAAAAcAAAA4AAAAAAAAAAAAAAAAAAAA////AAAAAAAAAAAAAAAAAAAAAAAAAAAAAAAAAAAAAABkAAAAZAAAAAAAAAAjAAAABAAAAGQAAAAXAAAAFAAAAAAAAAAAAAAA/38AAP9/AAAAAAAACQAAAAQAAAAAAAAADAAAABAAAAAAAAAAAAAAAAAAAAAAAAAAHgAAAGgAAAAAAAAAAAAAAAAAAAAAAAAAAAAAABAnAAAQJwAAAAAAAAAAAAAAAAAAAAAAAAAAAAAAAAAAAAAAAAAAAAAUAAAAAAAAAMDA/wAAAAAAZAAAADIAAAAAAAAAZAAAAAAAAAB/f38ACgAAAB8AAABUAAAAkMImBf///wEAAAAAAAAAAAAAAAAAAAAAAAAAAAAAAAAAAAAAAAAAAAAAAAJ/f38ALDxDA8zMzADAwP8Af39/AAAAAAAAAAAAAAAAAP///wAAAAAAIQAAABgAAAAUAAAANQcAADwIAACLOgAAkSgAABAAAAAmAAAACAAAAP//////////"/>
-              </a:ext>
-            </a:extLst>
-          </p:cNvPicPr>
-          <p:nvPr/>
-        </p:nvPicPr>
-        <p:blipFill>
-          <a:blip r:embed="rId3"/>
-          <a:stretch>
-            <a:fillRect/>
-          </a:stretch>
-        </p:blipFill>
-        <p:spPr>
-          <a:xfrm>
-            <a:off x="1171575" y="1338580"/>
-            <a:ext cx="8345170" cy="5255895"/>
-          </a:xfrm>
-          <a:prstGeom prst="rect">
-            <a:avLst/>
-          </a:prstGeom>
-          <a:noFill/>
-          <a:ln>
-            <a:noFill/>
-          </a:ln>
-          <a:effectLst/>
-        </p:spPr>
-      </p:pic>
-    </p:spTree>
-  </p:cSld>
-  <p:clrMapOvr>
-    <a:masterClrMapping/>
-  </p:clrMapOvr>
-</p:sld>
-</file>
-
 <file path=ppt/slides/slide4.xml><?xml version="1.0" encoding="utf-8"?>
 <p:sld xmlns:a="http://schemas.openxmlformats.org/drawingml/2006/main" xmlns:r="http://schemas.openxmlformats.org/officeDocument/2006/relationships" xmlns:p="http://schemas.openxmlformats.org/presentationml/2006/main">
   <p:cSld>
@@ -26934,7 +27515,7 @@
             <a:spLocks noGrp="1" noChangeArrowheads="1"/>
             <a:extLst>
               <a:ext uri="smNativeData">
-                <pr:smNativeData xmlns="" xmlns:p14="http://schemas.microsoft.com/office/powerpoint/2010/main" xmlns:pr="smNativeData" val="SMDATA_13_w78LXxMAAAAlAAAAZAAAAA0AAAAAkAAAAJAAAACQAAAAkAAAAAAAAAAAAAAAAAAAAAEAAABQAAAAAAAAAAAA4D8AAAAAAADgPwAAAAAAAOA/AAAAAAAA4D8AAAAAAADgPwAAAAAAAOA/AAAAAAAA4D8AAAAAAADgPwAAAAAAAOA/AAAAAAAA4D8CAAAAjAAAAAAAAAAAAAAAkMImDP///wgAAAAAAAAAAAAAAAAAAAAAAAAAAAAAAAAAAAAAZAAAAAEAAABAAAAAAAAAAAAAAAAAAAAAAAAAAAAAAAAAAAAAAAAAAAAAAAAAAAAAAAAAAAAAAAAAAAAAAAAAAAAAAAAAAAAAAAAAAAAAAAAAAAAAAAAAAAAAAAAAAAAAFAAAADwAAAAAAAAAAAAAAAAAAAkUAAAAAQAAABQAAAAUAAAAFAAAAAEAAAAAAAAAZAAAAGQAAAAAAAAAZAAAAGQAAAAVAAAAYAAAAAAAAAAAAAAADwAAACADAAAAAAAAAAAAAAEAAACgMgAAVgcAAKr4//8BAAAAf39/AAEAAABkAAAAAAAAABQAAABAHwAAAAAAACYAAAAAAAAAwOD//wAAAAAmAAAAZAAAABYAAABMAAAAAAAAAAAAAAAEAAAAAAAAAAEAAAAsPEMKAAAAACgAAAAoAAAAZAAAAGQAAAAAAAAAzMzMAAAAAABQAAAAUAAAAGQAAABkAAAAAAAAABcAAAAUAAAAAAAAAAAAAAD/fwAA/38AAAAAAAAJAAAABAAAAAQVAAAMAAAAEAAAAAAAAAAAAAAAAAAAAAAAAAAeAAAAaAAAAAAAAAAAAAAAAAAAAAAAAAAAAAAAECcAABAnAAAAAAAAAAAAAAAAAAAAAAAAAAAAAAAAAAAAAAAAAAAAABQAAAAAAAAAwMD/AAAAAABkAAAAMgAAAAAAAABkAAAAAAAAAH9/fwAKAAAAHwAAAFQAAACQwiYF////AQAAAAAAAAAAAAAAAAAAAAAAAAAAAAAAAAAAAAAAAAAAAAAAAn9/fwAsPEMDzMzMAMDA/wB/f38AAAAAAAAAAAAAAAAAAAAAAAAAAAAhAAAAGAAAABQAAAArBAAAwAMAAA05AADgCwAAEAAAACYAAAAIAAAAPDAAAAAAAAA="/>
+                <pr:smNativeData xmlns:pr="smNativeData" xmlns:p14="http://schemas.microsoft.com/office/powerpoint/2010/main" xmlns="" val="SMDATA_13_w78LXxMAAAAlAAAAZAAAAA0AAAAAkAAAAJAAAACQAAAAkAAAAAAAAAAAAAAAAAAAAAEAAABQAAAAAAAAAAAA4D8AAAAAAADgPwAAAAAAAOA/AAAAAAAA4D8AAAAAAADgPwAAAAAAAOA/AAAAAAAA4D8AAAAAAADgPwAAAAAAAOA/AAAAAAAA4D8CAAAAjAAAAAAAAAAAAAAAkMImDP///wgAAAAAAAAAAAAAAAAAAAAAAAAAAAAAAAAAAAAAZAAAAAEAAABAAAAAAAAAAAAAAAAAAAAAAAAAAAAAAAAAAAAAAAAAAAAAAAAAAAAAAAAAAAAAAAAAAAAAAAAAAAAAAAAAAAAAAAAAAAAAAAAAAAAAAAAAAAAAAAAAAAAAFAAAADwAAAAAAAAAAAAAAAAAAAkUAAAAAQAAABQAAAAUAAAAFAAAAAEAAAAAAAAAZAAAAGQAAAAAAAAAZAAAAGQAAAAVAAAAYAAAAAAAAAAAAAAADwAAACADAAAAAAAAAAAAAAEAAACgMgAAVgcAAKr4//8BAAAAf39/AAEAAABkAAAAAAAAABQAAABAHwAAAAAAACYAAAAAAAAAwOD//wAAAAAmAAAAZAAAABYAAABMAAAAAAAAAAAAAAAEAAAAAAAAAAEAAAAsPEMKAAAAACgAAAAoAAAAZAAAAGQAAAAAAAAAzMzMAAAAAABQAAAAUAAAAGQAAABkAAAAAAAAABcAAAAUAAAAAAAAAAAAAAD/fwAA/38AAAAAAAAJAAAABAAAAAQVAAAMAAAAEAAAAAAAAAAAAAAAAAAAAAAAAAAeAAAAaAAAAAAAAAAAAAAAAAAAAAAAAAAAAAAAECcAABAnAAAAAAAAAAAAAAAAAAAAAAAAAAAAAAAAAAAAAAAAAAAAABQAAAAAAAAAwMD/AAAAAABkAAAAMgAAAAAAAABkAAAAAAAAAH9/fwAKAAAAHwAAAFQAAACQwiYF////AQAAAAAAAAAAAAAAAAAAAAAAAAAAAAAAAAAAAAAAAAAAAAAAAn9/fwAsPEMDzMzMAMDA/wB/f38AAAAAAAAAAAAAAAAAAAAAAAAAAAAhAAAAGAAAABQAAAArBAAAwAMAAA05AADgCwAAEAAAACYAAAAIAAAAPDAAAAAAAAA="/>
               </a:ext>
             </a:extLst>
           </p:cNvSpPr>
@@ -26973,7 +27554,7 @@
           <p:cNvSpPr>
             <a:extLst>
               <a:ext uri="smNativeData">
-                <pr:smNativeData xmlns="" xmlns:p14="http://schemas.microsoft.com/office/powerpoint/2010/main" xmlns:pr="smNativeData" val="SMDATA_13_w78LXxMAAAAlAAAAZAAAAA0AAAAAkAAAAJAAAACQAAAAkAAAAAAAAAABAAAAAAAAAAEAAABQAAAAAAAAAAAA4D8AAAAAAADgPwAAAAAAAOA/AAAAAAAA4D8AAAAAAADgPwAAAAAAAOA/AAAAAAAA4D8AAAAAAADgPwAAAAAAAOA/AAAAAAAA4D8CAAAAjAAAAAAAAAAAAAAAkMImDP///wgAAAAAAAAAAAAAAAAAAAAAAAAAAAAAAAAAAAAAZAAAAAEAAABAAAAAAAAAAAAAAAAAAAAAAAAAAAAAAAAAAAAAAAAAAAAAAAAAAAAAAAAAAAAAAAAAAAAAAAAAAAAAAAAAAAAAAAAAAAAAAAAAAAAAAAAAAAAAAAAAAAAAFAAAADwAAAAAAAAAAAAAAAAAAAkUAAAAAQAAABQAAAAUAAAAFAAAAAEAAAAAAAAAZAAAAGQAAAAAAAAAZAAAAGQAAAAVAAAAYAAAAAAAAAAAAAAADwAAACADAAAAAAAAAAAAAAEAAACgMgAAVgcAAKr4//8BAAAAf39/AAEAAABkAAAAAAAAABQAAABAHwAAAAAAACYAAAAAAAAAwOD//wAAAAAmAAAAZAAAABYAAABMAAAAAAAAAAAAAAAEAAAAAAAAAAEAAAAsPEMKAAAAACgAAAAoAAAAZAAAAGQAAAAAAAAAzMzMAAAAAABQAAAAUAAAAGQAAABkAAAAAAAAABcAAAAUAAAAAAAAAAAAAAD/fwAA/38AAAAAAAAJAAAABAAAANCjbBAMAAAAEAAAAAAAAAAAAAAAAAAAAAAAAAAeAAAAaAAAAAAAAAAAAAAAAAAAAAAAAAAAAAAAECcAABAnAAAAAAAAAAAAAAAAAAAAAAAAAAAAAAAAAAAAAAAAAAAAABQAAAAAAAAAwMD/AAAAAABkAAAAMgAAAAAAAABkAAAAAAAAAH9/fwAKAAAAHwAAAFQAAACQwiYF////AQAAAAAAAAAAAAAAAAAAAAAAAAAAAAAAAAAAAAAAAAAAAAAAAn9/fwAsPEMDzMzMAMDA/wB/f38AAAAAAAAAAAAAAAAAAAAAAAAAAAAhAAAAGAAAABQAAAByEQAABQkAAA03AADlJAAAEAAAACYAAAAIAAAA//////////8="/>
+                <pr:smNativeData xmlns:pr="smNativeData" xmlns:p14="http://schemas.microsoft.com/office/powerpoint/2010/main" xmlns="" val="SMDATA_13_w78LXxMAAAAlAAAAZAAAAA0AAAAAkAAAAJAAAACQAAAAkAAAAAAAAAABAAAAAAAAAAEAAABQAAAAAAAAAAAA4D8AAAAAAADgPwAAAAAAAOA/AAAAAAAA4D8AAAAAAADgPwAAAAAAAOA/AAAAAAAA4D8AAAAAAADgPwAAAAAAAOA/AAAAAAAA4D8CAAAAjAAAAAAAAAAAAAAAkMImDP///wgAAAAAAAAAAAAAAAAAAAAAAAAAAAAAAAAAAAAAZAAAAAEAAABAAAAAAAAAAAAAAAAAAAAAAAAAAAAAAAAAAAAAAAAAAAAAAAAAAAAAAAAAAAAAAAAAAAAAAAAAAAAAAAAAAAAAAAAAAAAAAAAAAAAAAAAAAAAAAAAAAAAAFAAAADwAAAAAAAAAAAAAAAAAAAkUAAAAAQAAABQAAAAUAAAAFAAAAAEAAAAAAAAAZAAAAGQAAAAAAAAAZAAAAGQAAAAVAAAAYAAAAAAAAAAAAAAADwAAACADAAAAAAAAAAAAAAEAAACgMgAAVgcAAKr4//8BAAAAf39/AAEAAABkAAAAAAAAABQAAABAHwAAAAAAACYAAAAAAAAAwOD//wAAAAAmAAAAZAAAABYAAABMAAAAAAAAAAAAAAAEAAAAAAAAAAEAAAAsPEMKAAAAACgAAAAoAAAAZAAAAGQAAAAAAAAAzMzMAAAAAABQAAAAUAAAAGQAAABkAAAAAAAAABcAAAAUAAAAAAAAAAAAAAD/fwAA/38AAAAAAAAJAAAABAAAANCjbBAMAAAAEAAAAAAAAAAAAAAAAAAAAAAAAAAeAAAAaAAAAAAAAAAAAAAAAAAAAAAAAAAAAAAAECcAABAnAAAAAAAAAAAAAAAAAAAAAAAAAAAAAAAAAAAAAAAAAAAAABQAAAAAAAAAwMD/AAAAAABkAAAAMgAAAAAAAABkAAAAAAAAAH9/fwAKAAAAHwAAAFQAAACQwiYF////AQAAAAAAAAAAAAAAAAAAAAAAAAAAAAAAAAAAAAAAAAAAAAAAAn9/fwAsPEMDzMzMAMDA/wB/f38AAAAAAAAAAAAAAAAAAAAAAAAAAAAhAAAAGAAAABQAAAByEQAABQkAAA03AADlJAAAEAAAACYAAAAIAAAA//////////8="/>
               </a:ext>
             </a:extLst>
           </p:cNvSpPr>
@@ -27282,7 +27863,7 @@
           <p:cNvSpPr>
             <a:extLst>
               <a:ext uri="smNativeData">
-                <pr:smNativeData xmlns="" xmlns:p14="http://schemas.microsoft.com/office/powerpoint/2010/main" xmlns:pr="smNativeData" val="SMDATA_13_w78LXxMAAAAlAAAAZAAAAA0AAAAAkAAAAJAAAACQAAAAkAAAAAAAAAAAAAAAAAAAAAEAAABQAAAAAAAAAAAA4D8AAAAAAADgPwAAAAAAAOA/AAAAAAAA4D8AAAAAAADgPwAAAAAAAOA/AAAAAAAA4D8AAAAAAADgPwAAAAAAAOA/AAAAAAAA4D8CAAAAjAAAAAAAAAAAAAAAkMImDP///wgAAAAAAAAAAAAAAAAAAAAAAAAAAAAAAAAAAAAAZAAAAAEAAABAAAAAAAAAAAAAAAAAAAAAAAAAAAAAAAAAAAAAAAAAAAAAAAAAAAAAAAAAAAAAAAAAAAAAAAAAAAAAAAAAAAAAAAAAAAAAAAAAAAAAAAAAAAAAAAAAAAAAFAAAADwAAAAAAAAAAAAAAAAAAAkUAAAAAQAAABQAAAAUAAAAFAAAAAEAAAAAAAAAZAAAAGQAAAAAAAAAZAAAAGQAAAAVAAAAYAAAAAAAAAAAAAAADwAAACADAAAAAAAAAAAAAAEAAACgMgAAVgcAAKr4//8BAAAAf39/AAEAAABkAAAAAAAAABQAAABAHwAAAAAAACYAAAAAAAAAwOD//wAAAAAmAAAAZAAAABYAAABMAAAAAAAAAAAAAAAEAAAAAAAAAAEAAAAsPEMKAAAAACgAAAAoAAAAZAAAAGQAAAAAAAAAzMzMAAAAAABQAAAAUAAAAGQAAABkAAAAAAAAABcAAAAUAAAAAAAAAAAAAAD/fwAA/38AAAAAAAAJAAAABAAAAD0sAAAMAAAAEAAAAAAAAAAAAAAAAAAAAAAAAAAeAAAAaAAAAAAAAAAAAAAAAAAAAAAAAAAAAAAAECcAABAnAAAAAAAAAAAAAAAAAAAAAAAAAAAAAAAAAAAAAAAAAAAAABQAAAAAAAAAwMD/AAAAAABkAAAAMgAAAAAAAABkAAAAAAAAAH9/fwAKAAAAHwAAAFQAAACQwiYF////AQAAAAAAAAAAAAAAAAAAAAAAAAAAAAAAAAAAAAAAAAAAAAAAAn9/fwAsPEMDzMzMAMDA/wB/f38AAAAAAAAAAAAAAAAAAAAAAAAAAAAhAAAAGAAAABQAAADsEQAAzBMAACoaAACBFgAAEAAAACYAAAAIAAAA//////////8="/>
+                <pr:smNativeData xmlns:pr="smNativeData" xmlns:p14="http://schemas.microsoft.com/office/powerpoint/2010/main" xmlns="" val="SMDATA_13_w78LXxMAAAAlAAAAZAAAAA0AAAAAkAAAAJAAAACQAAAAkAAAAAAAAAAAAAAAAAAAAAEAAABQAAAAAAAAAAAA4D8AAAAAAADgPwAAAAAAAOA/AAAAAAAA4D8AAAAAAADgPwAAAAAAAOA/AAAAAAAA4D8AAAAAAADgPwAAAAAAAOA/AAAAAAAA4D8CAAAAjAAAAAAAAAAAAAAAkMImDP///wgAAAAAAAAAAAAAAAAAAAAAAAAAAAAAAAAAAAAAZAAAAAEAAABAAAAAAAAAAAAAAAAAAAAAAAAAAAAAAAAAAAAAAAAAAAAAAAAAAAAAAAAAAAAAAAAAAAAAAAAAAAAAAAAAAAAAAAAAAAAAAAAAAAAAAAAAAAAAAAAAAAAAFAAAADwAAAAAAAAAAAAAAAAAAAkUAAAAAQAAABQAAAAUAAAAFAAAAAEAAAAAAAAAZAAAAGQAAAAAAAAAZAAAAGQAAAAVAAAAYAAAAAAAAAAAAAAADwAAACADAAAAAAAAAAAAAAEAAACgMgAAVgcAAKr4//8BAAAAf39/AAEAAABkAAAAAAAAABQAAABAHwAAAAAAACYAAAAAAAAAwOD//wAAAAAmAAAAZAAAABYAAABMAAAAAAAAAAAAAAAEAAAAAAAAAAEAAAAsPEMKAAAAACgAAAAoAAAAZAAAAGQAAAAAAAAAzMzMAAAAAABQAAAAUAAAAGQAAABkAAAAAAAAABcAAAAUAAAAAAAAAAAAAAD/fwAA/38AAAAAAAAJAAAABAAAAD0sAAAMAAAAEAAAAAAAAAAAAAAAAAAAAAAAAAAeAAAAaAAAAAAAAAAAAAAAAAAAAAAAAAAAAAAAECcAABAnAAAAAAAAAAAAAAAAAAAAAAAAAAAAAAAAAAAAAAAAAAAAABQAAAAAAAAAwMD/AAAAAABkAAAAMgAAAAAAAABkAAAAAAAAAH9/fwAKAAAAHwAAAFQAAACQwiYF////AQAAAAAAAAAAAAAAAAAAAAAAAAAAAAAAAAAAAAAAAAAAAAAAAn9/fwAsPEMDzMzMAMDA/wB/f38AAAAAAAAAAAAAAAAAAAAAAAAAAAAhAAAAGAAAABQAAADsEQAAzBMAACoaAACBFgAAEAAAACYAAAAIAAAA//////////8="/>
               </a:ext>
             </a:extLst>
           </p:cNvSpPr>
@@ -27349,7 +27930,7 @@
           <p:cNvCxnSpPr>
             <a:extLst>
               <a:ext uri="smNativeData">
-                <pr:smNativeData xmlns="" xmlns:p14="http://schemas.microsoft.com/office/powerpoint/2010/main" xmlns:pr="smNativeData" val="SMDATA_13_w78LXxMAAAAlAAAADQAAAA0AAAAAkAAAAEgAAACQAAAASAAAAAAAAAAAAAAAAAAAAAEAAABQAAAAAAAAAAAA8L8AAAAAAAAAAAAAAAAAAPA/AAAAAAAA4D8AAAAAAADgPwAAAAAAAOA/AAAAAAAA4D8AAAAAAADgPwAAAAAAAOA/AAAAAAAA4D8CAAAAjAAAAAAAAAAAAAAAkMImDP///wgAAAAAAAAAAAAAAAAAAAAAAAAAAAAAAAAAAAAAZAAAAAEAAABAAAAAAAAAAAAAAAAAAAAAAAAAAAAAAAAAAAAAAAAAAAAAAAAAAAAAAAAAAAAAAAAAAAAAAAAAAAAAAAAAAAAAAAAAAAAAAAAAAAAAAAAAAAAAAAAAAAAAFAAAADwAAAABAAAAAAAAALRfBgAPAAAAAQAAACMAAAAjAAAAIwAAAB4AAAAAAAAASwAAAEsAAAACAAAAlgAAAJYAAAAVAAAAYAAAAAAAAAAAAAAADwAAACADAAAAAAAAAAAAAAEAAACgMgAAVgcAAKr4//8BAAAAf39/AAEAAABkAAAAAAAAABQAAABAHwAAAAAAACYAAAAAAAAAwOD//wAAAAAmAAAAZAAAABYAAABMAAAAAAAAAAAAAAAEAAAAAAAAAAEAAAAsPEMKAAAAACgAAAAoAAAAZAAAAGQAAAAAAAAAzMzMAAAAAABQAAAAUAAAAGQAAABkAAAAAAAAABcAAAAUAAAAAAAAAAAAAAD/fwAA/38AAAAAAAAJAAAABAAAAAY3AAAMAAAAEAAAAAAAAAAAAAAAAAAAAAAAAAAeAAAAaAAAAAAAAAAAAAAAAAAAAAAAAAAAAAAAECcAABAnAAAAAAAAAAAAAAAAAAAAAAAAAAAAAAAAAAAAAAAAAAAAABQAAAAAAAAAwMD/AAAAAABkAAAAMgAAAAAAAABkAAAAAAAAAH9/fwAKAAAAHwAAAFQAAACQwiYF////AQAAAAAAAAAAAAAAAAAAAAAAAAAAAAAAAAAAAAAAAAAAtF8GAH9/fwAsPEMDzMzMAMDA/wB/f38AAAAAAAAAAAAAAAAAAAAAAAAAAAAhAAAAGAAAABQAAADyFAAAHhEAAAsWAADMEwAAEAAAACYAAAAIAAAA//////////8="/>
+                <pr:smNativeData xmlns:pr="smNativeData" xmlns:p14="http://schemas.microsoft.com/office/powerpoint/2010/main" xmlns="" val="SMDATA_13_w78LXxMAAAAlAAAADQAAAA0AAAAAkAAAAEgAAACQAAAASAAAAAAAAAAAAAAAAAAAAAEAAABQAAAAAAAAAAAA8L8AAAAAAAAAAAAAAAAAAPA/AAAAAAAA4D8AAAAAAADgPwAAAAAAAOA/AAAAAAAA4D8AAAAAAADgPwAAAAAAAOA/AAAAAAAA4D8CAAAAjAAAAAAAAAAAAAAAkMImDP///wgAAAAAAAAAAAAAAAAAAAAAAAAAAAAAAAAAAAAAZAAAAAEAAABAAAAAAAAAAAAAAAAAAAAAAAAAAAAAAAAAAAAAAAAAAAAAAAAAAAAAAAAAAAAAAAAAAAAAAAAAAAAAAAAAAAAAAAAAAAAAAAAAAAAAAAAAAAAAAAAAAAAAFAAAADwAAAABAAAAAAAAALRfBgAPAAAAAQAAACMAAAAjAAAAIwAAAB4AAAAAAAAASwAAAEsAAAACAAAAlgAAAJYAAAAVAAAAYAAAAAAAAAAAAAAADwAAACADAAAAAAAAAAAAAAEAAACgMgAAVgcAAKr4//8BAAAAf39/AAEAAABkAAAAAAAAABQAAABAHwAAAAAAACYAAAAAAAAAwOD//wAAAAAmAAAAZAAAABYAAABMAAAAAAAAAAAAAAAEAAAAAAAAAAEAAAAsPEMKAAAAACgAAAAoAAAAZAAAAGQAAAAAAAAAzMzMAAAAAABQAAAAUAAAAGQAAABkAAAAAAAAABcAAAAUAAAAAAAAAAAAAAD/fwAA/38AAAAAAAAJAAAABAAAAAY3AAAMAAAAEAAAAAAAAAAAAAAAAAAAAAAAAAAeAAAAaAAAAAAAAAAAAAAAAAAAAAAAAAAAAAAAECcAABAnAAAAAAAAAAAAAAAAAAAAAAAAAAAAAAAAAAAAAAAAAAAAABQAAAAAAAAAwMD/AAAAAABkAAAAMgAAAAAAAABkAAAAAAAAAH9/fwAKAAAAHwAAAFQAAACQwiYF////AQAAAAAAAAAAAAAAAAAAAAAAAAAAAAAAAAAAAAAAAAAAtF8GAH9/fwAsPEMDzMzMAMDA/wB/f38AAAAAAAAAAAAAAAAAAAAAAAAAAAAhAAAAGAAAABQAAADyFAAAHhEAAAsWAADMEwAAEAAAACYAAAAIAAAA//////////8="/>
               </a:ext>
             </a:extLst>
           </p:cNvCxnSpPr>
@@ -27387,7 +27968,7 @@
           <p:cNvCxnSpPr>
             <a:extLst>
               <a:ext uri="smNativeData">
-                <pr:smNativeData xmlns="" xmlns:p14="http://schemas.microsoft.com/office/powerpoint/2010/main" xmlns:pr="smNativeData" val="SMDATA_13_w78LXxMAAAAlAAAADQAAAA0AAAAAkAAAAEgAAACQAAAASAAAAAAAAAAAAAAAAAAAAAEAAABQAAAAAAAAAAAA8L8AAAAAAAAAAAAAAAAAAPA/AAAAAAAA4D8AAAAAAADgPwAAAAAAAOA/AAAAAAAA4D8AAAAAAADgPwAAAAAAAOA/AAAAAAAA4D8CAAAAjAAAAAAAAAAAAAAAkMImDP///wgAAAAAAAAAAAAAAAAAAAAAAAAAAAAAAAAAAAAAZAAAAAEAAABAAAAAAAAAAAAAAAAAAAAAAAAAAAAAAAAAAAAAAAAAAAAAAAAAAAAAAAAAAAAAAAAAAAAAAAAAAAAAAAAAAAAAAAAAAAAAAAAAAAAAAAAAAAAAAAAAAAAAFAAAADwAAAABAAAAAAAAALRfBgAPAAAAAQAAACMAAAAjAAAAIwAAAB4AAAAAAAAASwAAAEsAAAACAAAAlgAAAJYAAAAVAAAAYAAAAAAAAAAAAAAADwAAACADAAAAAAAAAAAAAAEAAACgMgAAVgcAAKr4//8BAAAAf39/AAEAAABkAAAAAAAAABQAAABAHwAAAAAAACYAAAAAAAAAwOD//wAAAAAmAAAAZAAAABYAAABMAAAAAAAAAAAAAAAEAAAAAAAAAAEAAAAsPEMKAAAAACgAAAAoAAAAZAAAAGQAAAAAAAAAzMzMAAAAAABQAAAAUAAAAGQAAABkAAAAAAAAABcAAAAUAAAAAAAAAAAAAAD/fwAA/38AAAAAAAAJAAAABAAAAAY3AAAMAAAAEAAAAAAAAAAAAAAAAAAAAAAAAAAeAAAAaAAAAAAAAAAAAAAAAAAAAAAAAAAAAAAAECcAABAnAAAAAAAAAAAAAAAAAAAAAAAAAAAAAAAAAAAAAAAAAAAAABQAAAAAAAAAwMD/AAAAAABkAAAAMgAAAAAAAABkAAAAAAAAAH9/fwAKAAAAHwAAAFQAAACQwiYF////AQAAAAAAAAAAAAAAAAAAAAAAAAAAAAAAAAAAAAAAAAAAtF8GAH9/fwAsPEMDzMzMAMDA/wB/f38AAAAAAAAAAAAAAAAAAAAAAAAAAAAhAAAAGAAAABQAAADyFAAAHhEAAAsWAADMEwAAEAAAACYAAAAIAAAA//////////8="/>
+                <pr:smNativeData xmlns:pr="smNativeData" xmlns:p14="http://schemas.microsoft.com/office/powerpoint/2010/main" xmlns="" val="SMDATA_13_w78LXxMAAAAlAAAADQAAAA0AAAAAkAAAAEgAAACQAAAASAAAAAAAAAAAAAAAAAAAAAEAAABQAAAAAAAAAAAA8L8AAAAAAAAAAAAAAAAAAPA/AAAAAAAA4D8AAAAAAADgPwAAAAAAAOA/AAAAAAAA4D8AAAAAAADgPwAAAAAAAOA/AAAAAAAA4D8CAAAAjAAAAAAAAAAAAAAAkMImDP///wgAAAAAAAAAAAAAAAAAAAAAAAAAAAAAAAAAAAAAZAAAAAEAAABAAAAAAAAAAAAAAAAAAAAAAAAAAAAAAAAAAAAAAAAAAAAAAAAAAAAAAAAAAAAAAAAAAAAAAAAAAAAAAAAAAAAAAAAAAAAAAAAAAAAAAAAAAAAAAAAAAAAAFAAAADwAAAABAAAAAAAAALRfBgAPAAAAAQAAACMAAAAjAAAAIwAAAB4AAAAAAAAASwAAAEsAAAACAAAAlgAAAJYAAAAVAAAAYAAAAAAAAAAAAAAADwAAACADAAAAAAAAAAAAAAEAAACgMgAAVgcAAKr4//8BAAAAf39/AAEAAABkAAAAAAAAABQAAABAHwAAAAAAACYAAAAAAAAAwOD//wAAAAAmAAAAZAAAABYAAABMAAAAAAAAAAAAAAAEAAAAAAAAAAEAAAAsPEMKAAAAACgAAAAoAAAAZAAAAGQAAAAAAAAAzMzMAAAAAABQAAAAUAAAAGQAAABkAAAAAAAAABcAAAAUAAAAAAAAAAAAAAD/fwAA/38AAAAAAAAJAAAABAAAAAY3AAAMAAAAEAAAAAAAAAAAAAAAAAAAAAAAAAAeAAAAaAAAAAAAAAAAAAAAAAAAAAAAAAAAAAAAECcAABAnAAAAAAAAAAAAAAAAAAAAAAAAAAAAAAAAAAAAAAAAAAAAABQAAAAAAAAAwMD/AAAAAABkAAAAMgAAAAAAAABkAAAAAAAAAH9/fwAKAAAAHwAAAFQAAACQwiYF////AQAAAAAAAAAAAAAAAAAAAAAAAAAAAAAAAAAAAAAAAAAAtF8GAH9/fwAsPEMDzMzMAMDA/wB/f38AAAAAAAAAAAAAAAAAAAAAAAAAAAAhAAAAGAAAABQAAADyFAAAHhEAAAsWAADMEwAAEAAAACYAAAAIAAAA//////////8="/>
               </a:ext>
             </a:extLst>
           </p:cNvCxnSpPr>
@@ -27425,7 +28006,7 @@
           <p:cNvSpPr>
             <a:extLst>
               <a:ext uri="smNativeData">
-                <pr:smNativeData xmlns="" xmlns:p14="http://schemas.microsoft.com/office/powerpoint/2010/main" xmlns:pr="smNativeData" val="SMDATA_13_w78LXxMAAAAlAAAAZAAAAA0AAAAAkAAAAJAAAACQAAAAkAAAAAAAAAAAAAAAAAAAAAEAAABQAAAAAAAAAAAA4D8AAAAAAADgPwAAAAAAAOA/AAAAAAAA4D8AAAAAAADgPwAAAAAAAOA/AAAAAAAA4D8AAAAAAADgPwAAAAAAAOA/AAAAAAAA4D8CAAAAjAAAAAAAAAAAAAAAkMImDP///wgAAAAAAAAAAAAAAAAAAAAAAAAAAAAAAAAAAAAAZAAAAAEAAABAAAAAAAAAAAAAAAAAAAAAAAAAAAAAAAAAAAAAAAAAAAAAAAAAAAAAAAAAAAAAAAAAAAAAAAAAAAAAAAAAAAAAAAAAAAAAAAAAAAAAAAAAAAAAAAAAAAAAFAAAADwAAAAAAAAAAAAAAAAAAAkUAAAAAQAAABQAAAAUAAAAFAAAAAEAAAAAAAAAZAAAAGQAAAAAAAAAZAAAAGQAAAAVAAAAYAAAAAAAAAAAAAAADwAAACADAAAAAAAAAAAAAAEAAACgMgAAVgcAAKr4//8BAAAAf39/AAEAAABkAAAAAAAAABQAAABAHwAAAAAAACYAAAAAAAAAwOD//wAAAAAmAAAAZAAAABYAAABMAAAAAAAAAAAAAAAEAAAAAAAAAAEAAAAsPEMKAAAAACgAAAAoAAAAZAAAAGQAAAAAAAAAzMzMAAAAAABQAAAAUAAAAGQAAABkAAAAAAAAABcAAAAUAAAAAAAAAAAAAAD/fwAA/38AAAAAAAAJAAAABAAAAD0sAAAMAAAAEAAAAAAAAAAAAAAAAAAAAAAAAAAeAAAAaAAAAAAAAAAAAAAAAAAAAAAAAAAAAAAAECcAABAnAAAAAAAAAAAAAAAAAAAAAAAAAAAAAAAAAAAAAAAAAAAAABQAAAAAAAAAwMD/AAAAAABkAAAAMgAAAAAAAABkAAAAAAAAAH9/fwAKAAAAHwAAAFQAAACQwiYF////AQAAAAAAAAAAAAAAAAAAAAAAAAAAAAAAAAAAAAAAAAAAAAAAAn9/fwAsPEMDzMzMAMDA/wB/f38AAAAAAAAAAAAAAAAAAAAAAAAAAAAhAAAAGAAAABQAAADsEQAAzBMAACoaAACBFgAAEAAAACYAAAAIAAAA//////////8="/>
+                <pr:smNativeData xmlns:pr="smNativeData" xmlns:p14="http://schemas.microsoft.com/office/powerpoint/2010/main" xmlns="" val="SMDATA_13_w78LXxMAAAAlAAAAZAAAAA0AAAAAkAAAAJAAAACQAAAAkAAAAAAAAAAAAAAAAAAAAAEAAABQAAAAAAAAAAAA4D8AAAAAAADgPwAAAAAAAOA/AAAAAAAA4D8AAAAAAADgPwAAAAAAAOA/AAAAAAAA4D8AAAAAAADgPwAAAAAAAOA/AAAAAAAA4D8CAAAAjAAAAAAAAAAAAAAAkMImDP///wgAAAAAAAAAAAAAAAAAAAAAAAAAAAAAAAAAAAAAZAAAAAEAAABAAAAAAAAAAAAAAAAAAAAAAAAAAAAAAAAAAAAAAAAAAAAAAAAAAAAAAAAAAAAAAAAAAAAAAAAAAAAAAAAAAAAAAAAAAAAAAAAAAAAAAAAAAAAAAAAAAAAAFAAAADwAAAAAAAAAAAAAAAAAAAkUAAAAAQAAABQAAAAUAAAAFAAAAAEAAAAAAAAAZAAAAGQAAAAAAAAAZAAAAGQAAAAVAAAAYAAAAAAAAAAAAAAADwAAACADAAAAAAAAAAAAAAEAAACgMgAAVgcAAKr4//8BAAAAf39/AAEAAABkAAAAAAAAABQAAABAHwAAAAAAACYAAAAAAAAAwOD//wAAAAAmAAAAZAAAABYAAABMAAAAAAAAAAAAAAAEAAAAAAAAAAEAAAAsPEMKAAAAACgAAAAoAAAAZAAAAGQAAAAAAAAAzMzMAAAAAABQAAAAUAAAAGQAAABkAAAAAAAAABcAAAAUAAAAAAAAAAAAAAD/fwAA/38AAAAAAAAJAAAABAAAAD0sAAAMAAAAEAAAAAAAAAAAAAAAAAAAAAAAAAAeAAAAaAAAAAAAAAAAAAAAAAAAAAAAAAAAAAAAECcAABAnAAAAAAAAAAAAAAAAAAAAAAAAAAAAAAAAAAAAAAAAAAAAABQAAAAAAAAAwMD/AAAAAABkAAAAMgAAAAAAAABkAAAAAAAAAH9/fwAKAAAAHwAAAFQAAACQwiYF////AQAAAAAAAAAAAAAAAAAAAAAAAAAAAAAAAAAAAAAAAAAAAAAAAn9/fwAsPEMDzMzMAMDA/wB/f38AAAAAAAAAAAAAAAAAAAAAAAAAAAAhAAAAGAAAABQAAADsEQAAzBMAACoaAACBFgAAEAAAACYAAAAIAAAA//////////8="/>
               </a:ext>
             </a:extLst>
           </p:cNvSpPr>
@@ -27509,7 +28090,7 @@
             <a:spLocks noGrp="1" noChangeArrowheads="1"/>
             <a:extLst>
               <a:ext uri="smNativeData">
-                <pr:smNativeData xmlns="" xmlns:p14="http://schemas.microsoft.com/office/powerpoint/2010/main" xmlns:pr="smNativeData" val="SMDATA_13_w78LXxMAAAAlAAAAZAAAAA0AAAAAkAAAAJAAAACQAAAAkAAAAAAAAAAAAAAAAAAAAAEAAABQAAAAAAAAAAAA4D8AAAAAAADgPwAAAAAAAOA/AAAAAAAA4D8AAAAAAADgPwAAAAAAAOA/AAAAAAAA4D8AAAAAAADgPwAAAAAAAOA/AAAAAAAA4D8CAAAAjAAAAAAAAAAAAAAAkMImDP///wgAAAAAAAAAAAAAAAAAAAAAAAAAAAAAAAAAAAAAZAAAAAEAAABAAAAAAAAAAAAAAAAAAAAAAAAAAAAAAAAAAAAAAAAAAAAAAAAAAAAAAAAAAAAAAAAAAAAAAAAAAAAAAAAAAAAAAAAAAAAAAAAAAAAAAAAAAAAAAAAAAAAAFAAAADwAAAAAAAAAAAAAAAAAAAkUAAAAAQAAABQAAAAUAAAAFAAAAAEAAAAAAAAAZAAAAGQAAAAAAAAAZAAAAGQAAAAVAAAAYAAAAAAAAAAAAAAADwAAACADAAAAAAAAAAAAAAEAAACgMgAAVgcAAKr4//8BAAAAf39/AAEAAABkAAAAAAAAABQAAABAHwAAAAAAACYAAAAAAAAAwOD//wAAAAAmAAAAZAAAABYAAABMAAAAAAAAAAAAAAAEAAAAAAAAAAEAAAAsPEMKAAAAACgAAAAoAAAAZAAAAGQAAAAAAAAAzMzMAAAAAABQAAAAUAAAAGQAAABkAAAAAAAAABcAAAAUAAAAAAAAAAAAAAD/fwAA/38AAAAAAAAJAAAABAAAAKc5AAAMAAAAEAAAAAAAAAAAAAAAAAAAAAAAAAAeAAAAaAAAAAAAAAAAAAAAAAAAAAAAAAAAAAAAECcAABAnAAAAAAAAAAAAAAAAAAAAAAAAAAAAAAAAAAAAAAAAAAAAABQAAAAAAAAAwMD/AAAAAABkAAAAMgAAAAAAAABkAAAAAAAAAH9/fwAKAAAAHwAAAFQAAACQwiYF////AQAAAAAAAAAAAAAAAAAAAAAAAAAAAAAAAAAAAAAAAAAAAAAAAn9/fwAsPEMDzMzMAMDA/wB/f38AAAAAAAAAAAAAAAAAAAAAAAAAAAAhAAAAGAAAABQAAAArBAAAwAMAAA05AADgCwAAEAAAACYAAAAIAAAAPDAAAAAAAAA="/>
+                <pr:smNativeData xmlns:pr="smNativeData" xmlns:p14="http://schemas.microsoft.com/office/powerpoint/2010/main" xmlns="" val="SMDATA_13_w78LXxMAAAAlAAAAZAAAAA0AAAAAkAAAAJAAAACQAAAAkAAAAAAAAAAAAAAAAAAAAAEAAABQAAAAAAAAAAAA4D8AAAAAAADgPwAAAAAAAOA/AAAAAAAA4D8AAAAAAADgPwAAAAAAAOA/AAAAAAAA4D8AAAAAAADgPwAAAAAAAOA/AAAAAAAA4D8CAAAAjAAAAAAAAAAAAAAAkMImDP///wgAAAAAAAAAAAAAAAAAAAAAAAAAAAAAAAAAAAAAZAAAAAEAAABAAAAAAAAAAAAAAAAAAAAAAAAAAAAAAAAAAAAAAAAAAAAAAAAAAAAAAAAAAAAAAAAAAAAAAAAAAAAAAAAAAAAAAAAAAAAAAAAAAAAAAAAAAAAAAAAAAAAAFAAAADwAAAAAAAAAAAAAAAAAAAkUAAAAAQAAABQAAAAUAAAAFAAAAAEAAAAAAAAAZAAAAGQAAAAAAAAAZAAAAGQAAAAVAAAAYAAAAAAAAAAAAAAADwAAACADAAAAAAAAAAAAAAEAAACgMgAAVgcAAKr4//8BAAAAf39/AAEAAABkAAAAAAAAABQAAABAHwAAAAAAACYAAAAAAAAAwOD//wAAAAAmAAAAZAAAABYAAABMAAAAAAAAAAAAAAAEAAAAAAAAAAEAAAAsPEMKAAAAACgAAAAoAAAAZAAAAGQAAAAAAAAAzMzMAAAAAABQAAAAUAAAAGQAAABkAAAAAAAAABcAAAAUAAAAAAAAAAAAAAD/fwAA/38AAAAAAAAJAAAABAAAAKc5AAAMAAAAEAAAAAAAAAAAAAAAAAAAAAAAAAAeAAAAaAAAAAAAAAAAAAAAAAAAAAAAAAAAAAAAECcAABAnAAAAAAAAAAAAAAAAAAAAAAAAAAAAAAAAAAAAAAAAAAAAABQAAAAAAAAAwMD/AAAAAABkAAAAMgAAAAAAAABkAAAAAAAAAH9/fwAKAAAAHwAAAFQAAACQwiYF////AQAAAAAAAAAAAAAAAAAAAAAAAAAAAAAAAAAAAAAAAAAAAAAAAn9/fwAsPEMDzMzMAMDA/wB/f38AAAAAAAAAAAAAAAAAAAAAAAAAAAAhAAAAGAAAABQAAAArBAAAwAMAAA05AADgCwAAEAAAACYAAAAIAAAAPDAAAAAAAAA="/>
               </a:ext>
             </a:extLst>
           </p:cNvSpPr>
@@ -27548,7 +28129,7 @@
           <p:cNvSpPr>
             <a:extLst>
               <a:ext uri="smNativeData">
-                <pr:smNativeData xmlns="" xmlns:p14="http://schemas.microsoft.com/office/powerpoint/2010/main" xmlns:pr="smNativeData" val="SMDATA_13_w78LXxMAAAAlAAAAZAAAAA0AAAAAkAAAAJAAAACQAAAAkAAAAAAAAAABAAAAAAAAAAEAAABQAAAAAAAAAAAA4D8AAAAAAADgPwAAAAAAAOA/AAAAAAAA4D8AAAAAAADgPwAAAAAAAOA/AAAAAAAA4D8AAAAAAADgPwAAAAAAAOA/AAAAAAAA4D8CAAAAjAAAAAAAAAAAAAAAkMImDP///wgAAAAAAAAAAAAAAAAAAAAAAAAAAAAAAAAAAAAAZAAAAAEAAABAAAAAAAAAAAAAAAAAAAAAAAAAAAAAAAAAAAAAAAAAAAAAAAAAAAAAAAAAAAAAAAAAAAAAAAAAAAAAAAAAAAAAAAAAAAAAAAAAAAAAAAAAAAAAAAAAAAAAFAAAADwAAAAAAAAAAAAAAAAAAAkUAAAAAQAAABQAAAAUAAAAFAAAAAEAAAAAAAAAZAAAAGQAAAAAAAAAZAAAAGQAAAAVAAAAYAAAAAAAAAAAAAAADwAAACADAAAAAAAAAAAAAAEAAACgMgAAVgcAAKr4//8BAAAAf39/AAEAAABkAAAAAAAAABQAAABAHwAAAAAAACYAAAAAAAAAwOD//wAAAAAmAAAAZAAAABYAAABMAAAAAAAAAAAAAAAEAAAAAAAAAAEAAAAsPEMKAAAAACgAAAAoAAAAZAAAAGQAAAAAAAAAzMzMAAAAAABQAAAAUAAAAGQAAABkAAAAAAAAABcAAAAUAAAAAAAAAAAAAAD/fwAA/38AAAAAAAAJAAAABAAAAAAMDeMMAAAAEAAAAAAAAAAAAAAAAAAAAAAAAAAeAAAAaAAAAAAAAAAAAAAAAAAAAAAAAAAAAAAAECcAABAnAAAAAAAAAAAAAAAAAAAAAAAAAAAAAAAAAAAAAAAAAAAAABQAAAAAAAAAwMD/AAAAAABkAAAAMgAAAAAAAABkAAAAAAAAAH9/fwAKAAAAHwAAAFQAAACQwiYF////AQAAAAAAAAAAAAAAAAAAAAAAAAAAAAAAAAAAAAAAAAAAAAAAAn9/fwAsPEMDzMzMAMDA/wB/f38AAAAAAAAAAAAAAAAAAAAAAAAAAAAhAAAAGAAAABQAAADZBAAArRkAAG88AAD3HQAAEAAAACYAAAAIAAAA//////////8="/>
+                <pr:smNativeData xmlns:pr="smNativeData" xmlns:p14="http://schemas.microsoft.com/office/powerpoint/2010/main" xmlns="" val="SMDATA_13_w78LXxMAAAAlAAAAZAAAAA0AAAAAkAAAAJAAAACQAAAAkAAAAAAAAAABAAAAAAAAAAEAAABQAAAAAAAAAAAA4D8AAAAAAADgPwAAAAAAAOA/AAAAAAAA4D8AAAAAAADgPwAAAAAAAOA/AAAAAAAA4D8AAAAAAADgPwAAAAAAAOA/AAAAAAAA4D8CAAAAjAAAAAAAAAAAAAAAkMImDP///wgAAAAAAAAAAAAAAAAAAAAAAAAAAAAAAAAAAAAAZAAAAAEAAABAAAAAAAAAAAAAAAAAAAAAAAAAAAAAAAAAAAAAAAAAAAAAAAAAAAAAAAAAAAAAAAAAAAAAAAAAAAAAAAAAAAAAAAAAAAAAAAAAAAAAAAAAAAAAAAAAAAAAFAAAADwAAAAAAAAAAAAAAAAAAAkUAAAAAQAAABQAAAAUAAAAFAAAAAEAAAAAAAAAZAAAAGQAAAAAAAAAZAAAAGQAAAAVAAAAYAAAAAAAAAAAAAAADwAAACADAAAAAAAAAAAAAAEAAACgMgAAVgcAAKr4//8BAAAAf39/AAEAAABkAAAAAAAAABQAAABAHwAAAAAAACYAAAAAAAAAwOD//wAAAAAmAAAAZAAAABYAAABMAAAAAAAAAAAAAAAEAAAAAAAAAAEAAAAsPEMKAAAAACgAAAAoAAAAZAAAAGQAAAAAAAAAzMzMAAAAAABQAAAAUAAAAGQAAABkAAAAAAAAABcAAAAUAAAAAAAAAAAAAAD/fwAA/38AAAAAAAAJAAAABAAAAAAMDeMMAAAAEAAAAAAAAAAAAAAAAAAAAAAAAAAeAAAAaAAAAAAAAAAAAAAAAAAAAAAAAAAAAAAAECcAABAnAAAAAAAAAAAAAAAAAAAAAAAAAAAAAAAAAAAAAAAAAAAAABQAAAAAAAAAwMD/AAAAAABkAAAAMgAAAAAAAABkAAAAAAAAAH9/fwAKAAAAHwAAAFQAAACQwiYF////AQAAAAAAAAAAAAAAAAAAAAAAAAAAAAAAAAAAAAAAAAAAAAAAAn9/fwAsPEMDzMzMAMDA/wB/f38AAAAAAAAAAAAAAAAAAAAAAAAAAAAhAAAAGAAAABQAAADZBAAArRkAAG88AAD3HQAAEAAAACYAAAAIAAAA//////////8="/>
               </a:ext>
             </a:extLst>
           </p:cNvSpPr>
@@ -27698,7 +28279,7 @@
           <p:cNvSpPr>
             <a:extLst>
               <a:ext uri="smNativeData">
-                <pr:smNativeData xmlns="" xmlns:p14="http://schemas.microsoft.com/office/powerpoint/2010/main" xmlns:pr="smNativeData" val="SMDATA_13_w78LXxMAAAAlAAAAZAAAAA0AAAAAkAAAAJAAAACQAAAAkAAAAAAAAAAAAAAAAAAAAAEAAABQAAAAAAAAAAAA4D8AAAAAAADgPwAAAAAAAOA/AAAAAAAA4D8AAAAAAADgPwAAAAAAAOA/AAAAAAAA4D8AAAAAAADgPwAAAAAAAOA/AAAAAAAA4D8CAAAAjAAAAAAAAAAAAAAAkMImDP///wgAAAAAAAAAAAAAAAAAAAAAAAAAAAAAAAAAAAAAZAAAAAEAAABAAAAAAAAAAAAAAAAAAAAAAAAAAAAAAAAAAAAAAAAAAAAAAAAAAAAAAAAAAAAAAAAAAAAAAAAAAAAAAAAAAAAAAAAAAAAAAAAAAAAAAAAAAAAAAAAAAAAAFAAAADwAAAAAAAAAAAAAAAAAAAkUAAAAAQAAABQAAAAUAAAAFAAAAAEAAAAAAAAAZAAAAGQAAAAAAAAAZAAAAGQAAAAVAAAAYAAAAAAAAAAAAAAADwAAACADAAAAAAAAAAAAAAEAAACgMgAAVgcAAKr4//8BAAAAf39/AAEAAABkAAAAAAAAABQAAABAHwAAAAAAACYAAAAAAAAAwOD//wAAAAAmAAAAZAAAABYAAABMAAAAAAAAAAAAAAAEAAAAAAAAAAEAAAAsPEMKAAAAACgAAAAoAAAAZAAAAGQAAAAAAAAAzMzMAAAAAABQAAAAUAAAAGQAAABkAAAAAAAAABcAAAAUAAAAAAAAAAAAAAD/fwAA/38AAAAAAAAJAAAABAAAAEYAaQAMAAAAEAAAAAAAAAAAAAAAAAAAAAAAAAAeAAAAaAAAAAAAAAAAAAAAAAAAAAAAAAAAAAAAECcAABAnAAAAAAAAAAAAAAAAAAAAAAAAAAAAAAAAAAAAAAAAAAAAABQAAAAAAAAAwMD/AAAAAABkAAAAMgAAAAAAAABkAAAAAAAAAH9/fwAKAAAAHwAAAFQAAACQwiYF////AQAAAAAAAAAAAAAAAAAAAAAAAAAAAAAAAAAAAAAAAAAAAAAAAn9/fwAsPEMDzMzMAMDA/wB/f38AAAAAAAAAAAAAAAAAAAAAAAAAAAAhAAAAGAAAABQAAADbFAAA6iAAABkdAACfIwAAEAAAACYAAAAIAAAA//////////8="/>
+                <pr:smNativeData xmlns:pr="smNativeData" xmlns:p14="http://schemas.microsoft.com/office/powerpoint/2010/main" xmlns="" val="SMDATA_13_w78LXxMAAAAlAAAAZAAAAA0AAAAAkAAAAJAAAACQAAAAkAAAAAAAAAAAAAAAAAAAAAEAAABQAAAAAAAAAAAA4D8AAAAAAADgPwAAAAAAAOA/AAAAAAAA4D8AAAAAAADgPwAAAAAAAOA/AAAAAAAA4D8AAAAAAADgPwAAAAAAAOA/AAAAAAAA4D8CAAAAjAAAAAAAAAAAAAAAkMImDP///wgAAAAAAAAAAAAAAAAAAAAAAAAAAAAAAAAAAAAAZAAAAAEAAABAAAAAAAAAAAAAAAAAAAAAAAAAAAAAAAAAAAAAAAAAAAAAAAAAAAAAAAAAAAAAAAAAAAAAAAAAAAAAAAAAAAAAAAAAAAAAAAAAAAAAAAAAAAAAAAAAAAAAFAAAADwAAAAAAAAAAAAAAAAAAAkUAAAAAQAAABQAAAAUAAAAFAAAAAEAAAAAAAAAZAAAAGQAAAAAAAAAZAAAAGQAAAAVAAAAYAAAAAAAAAAAAAAADwAAACADAAAAAAAAAAAAAAEAAACgMgAAVgcAAKr4//8BAAAAf39/AAEAAABkAAAAAAAAABQAAABAHwAAAAAAACYAAAAAAAAAwOD//wAAAAAmAAAAZAAAABYAAABMAAAAAAAAAAAAAAAEAAAAAAAAAAEAAAAsPEMKAAAAACgAAAAoAAAAZAAAAGQAAAAAAAAAzMzMAAAAAABQAAAAUAAAAGQAAABkAAAAAAAAABcAAAAUAAAAAAAAAAAAAAD/fwAA/38AAAAAAAAJAAAABAAAAEYAaQAMAAAAEAAAAAAAAAAAAAAAAAAAAAAAAAAeAAAAaAAAAAAAAAAAAAAAAAAAAAAAAAAAAAAAECcAABAnAAAAAAAAAAAAAAAAAAAAAAAAAAAAAAAAAAAAAAAAAAAAABQAAAAAAAAAwMD/AAAAAABkAAAAMgAAAAAAAABkAAAAAAAAAH9/fwAKAAAAHwAAAFQAAACQwiYF////AQAAAAAAAAAAAAAAAAAAAAAAAAAAAAAAAAAAAAAAAAAAAAAAAn9/fwAsPEMDzMzMAMDA/wB/f38AAAAAAAAAAAAAAAAAAAAAAAAAAAAhAAAAGAAAABQAAADbFAAA6iAAABkdAACfIwAAEAAAACYAAAAIAAAA//////////8="/>
               </a:ext>
             </a:extLst>
           </p:cNvSpPr>
@@ -27753,7 +28334,7 @@
             <a:stCxn id="4" idx="0"/>
             <a:extLst>
               <a:ext uri="smNativeData">
-                <pr:smNativeData xmlns="" xmlns:p14="http://schemas.microsoft.com/office/powerpoint/2010/main" xmlns:pr="smNativeData" val="SMDATA_13_w78LXxMAAAAlAAAADQAAAA0AAAAAkAAAAEgAAACQAAAASAAAAAAAAAAAAAAAAAAAAAEAAABQAAAAAAAAAAAA8L8AAAAAAAAAAAAAAAAAAPA/AAAAAAAA4D8AAAAAAADgPwAAAAAAAOA/AAAAAAAA4D8AAAAAAADgPwAAAAAAAOA/AAAAAAAA4D8CAAAAjAAAAAAAAAAAAAAAkMImDP///wgAAAAAAAAAAAAAAAAAAAAAAAAAAAAAAAAAAAAAZAAAAAEAAABAAAAAAAAAAAAAAAAAAAAAAAAAAAAAAAAAAAAAAAAAAAAAAAAAAAAAAAAAAAAAAAAAAAAAAAAAAAAAAAAAAAAAAAAAAAAAAAAAAAAAAAAAAAAAAAAAAAAAFAAAADwAAAABAAAAAAAAALRfBgAPAAAAAQAAACMAAAAjAAAAIwAAAB4AAAAAAAAASwAAAEsAAAACAAAAlgAAAJYAAAAVAAAAYAAAAAAAAAAAAAAADwAAACADAAAAAAAAAAAAAAEAAACgMgAAVgcAAKr4//8BAAAAf39/AAEAAABkAAAAAAAAABQAAABAHwAAAAAAACYAAAAAAAAAwOD//wAAAAAmAAAAZAAAABYAAABMAAAAAAAAAAAAAAAEAAAAAAAAAAEAAAAsPEMKAAAAACgAAAAoAAAAZAAAAGQAAAAAAAAAzMzMAAAAAABQAAAAUAAAAGQAAABkAAAAAAAAABcAAAAUAAAAAAAAAAAAAAD/fwAA/38AAAAAAAAJAAAABAAAAAAAAAAMAAAAEAAAAAAAAAAAAAAAAAAAAAAAAAAeAAAAaAAAAAAAAAAAAAAAAAAAAAAAAAAAAAAAECcAABAnAAAAAAAAAAAAAAAAAAAAAAAAAAAAAAAAAAAAAAAAAAAAABQAAAAAAAAAwMD/AAAAAABkAAAAMgAAAAAAAABkAAAAAAAAAH9/fwAKAAAAHwAAAFQAAACQwiYF////AQAAAAAAAAAAAAAAAAAAAAAAAAAAAAAAAAAAAAAAAAAAtF8GAH9/fwAsPEMDzMzMAMDA/wB/f38AAAAAAAAAAAAAAAAAAAAAAAAAAAAhAAAAGAAAABQAAAAiEAAAXhwAAPoYAADqIAAAEAAAACYAAAAIAAAA//////////8="/>
+                <pr:smNativeData xmlns:pr="smNativeData" xmlns:p14="http://schemas.microsoft.com/office/powerpoint/2010/main" xmlns="" val="SMDATA_13_w78LXxMAAAAlAAAADQAAAA0AAAAAkAAAAEgAAACQAAAASAAAAAAAAAAAAAAAAAAAAAEAAABQAAAAAAAAAAAA8L8AAAAAAAAAAAAAAAAAAPA/AAAAAAAA4D8AAAAAAADgPwAAAAAAAOA/AAAAAAAA4D8AAAAAAADgPwAAAAAAAOA/AAAAAAAA4D8CAAAAjAAAAAAAAAAAAAAAkMImDP///wgAAAAAAAAAAAAAAAAAAAAAAAAAAAAAAAAAAAAAZAAAAAEAAABAAAAAAAAAAAAAAAAAAAAAAAAAAAAAAAAAAAAAAAAAAAAAAAAAAAAAAAAAAAAAAAAAAAAAAAAAAAAAAAAAAAAAAAAAAAAAAAAAAAAAAAAAAAAAAAAAAAAAFAAAADwAAAABAAAAAAAAALRfBgAPAAAAAQAAACMAAAAjAAAAIwAAAB4AAAAAAAAASwAAAEsAAAACAAAAlgAAAJYAAAAVAAAAYAAAAAAAAAAAAAAADwAAACADAAAAAAAAAAAAAAEAAACgMgAAVgcAAKr4//8BAAAAf39/AAEAAABkAAAAAAAAABQAAABAHwAAAAAAACYAAAAAAAAAwOD//wAAAAAmAAAAZAAAABYAAABMAAAAAAAAAAAAAAAEAAAAAAAAAAEAAAAsPEMKAAAAACgAAAAoAAAAZAAAAGQAAAAAAAAAzMzMAAAAAABQAAAAUAAAAGQAAABkAAAAAAAAABcAAAAUAAAAAAAAAAAAAAD/fwAA/38AAAAAAAAJAAAABAAAAAAAAAAMAAAAEAAAAAAAAAAAAAAAAAAAAAAAAAAeAAAAaAAAAAAAAAAAAAAAAAAAAAAAAAAAAAAAECcAABAnAAAAAAAAAAAAAAAAAAAAAAAAAAAAAAAAAAAAAAAAAAAAABQAAAAAAAAAwMD/AAAAAABkAAAAMgAAAAAAAABkAAAAAAAAAH9/fwAKAAAAHwAAAFQAAACQwiYF////AQAAAAAAAAAAAAAAAAAAAAAAAAAAAAAAAAAAAAAAAAAAtF8GAH9/fwAsPEMDzMzMAMDA/wB/f38AAAAAAAAAAAAAAAAAAAAAAAAAAAAhAAAAGAAAABQAAAAiEAAAXhwAAPoYAADqIAAAEAAAACYAAAAIAAAA//////////8="/>
               </a:ext>
             </a:extLst>
           </p:cNvCxnSpPr>
@@ -27786,7 +28367,7 @@
             <a:stCxn id="4" idx="0"/>
             <a:extLst>
               <a:ext uri="smNativeData">
-                <pr:smNativeData xmlns="" xmlns:p14="http://schemas.microsoft.com/office/powerpoint/2010/main" xmlns:pr="smNativeData" val="SMDATA_13_w78LXxMAAAAlAAAADQAAAA0AAAAAkAAAAEgAAACQAAAASAAAAAAAAAAAAAAAAAAAAAEAAABQAAAAAAAAAAAA8L8AAAAAAAAAAAAAAAAAAPA/AAAAAAAA4D8AAAAAAADgPwAAAAAAAOA/AAAAAAAA4D8AAAAAAADgPwAAAAAAAOA/AAAAAAAA4D8CAAAAjAAAAAAAAAAAAAAAkMImDP///wgAAAAAAAAAAAAAAAAAAAAAAAAAAAAAAAAAAAAAZAAAAAEAAABAAAAAAAAAAAAAAAAAAAAAAAAAAAAAAAAAAAAAAAAAAAAAAAAAAAAAAAAAAAAAAAAAAAAAAAAAAAAAAAAAAAAAAAAAAAAAAAAAAAAAAAAAAAAAAAAAAAAAFAAAADwAAAABAAAAAAAAALRfBgAPAAAAAQAAACMAAAAjAAAAIwAAAB4AAAAAAAAASwAAAEsAAAACAAAAlgAAAJYAAAAVAAAAYAAAAAAAAAAAAAAADwAAACADAAAAAAAAAAAAAAEAAACgMgAAVgcAAKr4//8BAAAAf39/AAEAAABkAAAAAAAAABQAAABAHwAAAAAAACYAAAAAAAAAwOD//wAAAAAmAAAAZAAAABYAAABMAAAAAAAAAAAAAAAEAAAAAAAAAAEAAAAsPEMKAAAAACgAAAAoAAAAZAAAAGQAAAAAAAAAzMzMAAAAAABQAAAAUAAAAGQAAABkAAAAAAAAABcAAAAUAAAAAAAAAAAAAAD/fwAA/38AAAAAAAAJAAAABAAAABcQuQAMAAAAEAAAAAAAAAAAAAAAAAAAAAAAAAAeAAAAaAAAAAAAAAAAAAAAAAAAAAAAAAAAAAAAECcAABAnAAAAAAAAAAAAAAAAAAAAAAAAAAAAAAAAAAAAAAAAAAAAABQAAAAAAAAAwMD/AAAAAABkAAAAMgAAAAAAAABkAAAAAAAAAH9/fwAKAAAAHwAAAFQAAACQwiYF////AQAAAAAAAAAAAAAAAAAAAAAAAAAAAAAAAAAAAAAAAAAAtF8GAH9/fwAsPEMDzMzMAMDA/wB/f38AAAAAAAAAAAAAAAAAAAAAAAAAAAAhAAAAGAAAABQAAAD6GAAATxwAAFUeAADqIAAAEAAAACYAAAAIAAAA//////////8="/>
+                <pr:smNativeData xmlns:pr="smNativeData" xmlns:p14="http://schemas.microsoft.com/office/powerpoint/2010/main" xmlns="" val="SMDATA_13_w78LXxMAAAAlAAAADQAAAA0AAAAAkAAAAEgAAACQAAAASAAAAAAAAAAAAAAAAAAAAAEAAABQAAAAAAAAAAAA8L8AAAAAAAAAAAAAAAAAAPA/AAAAAAAA4D8AAAAAAADgPwAAAAAAAOA/AAAAAAAA4D8AAAAAAADgPwAAAAAAAOA/AAAAAAAA4D8CAAAAjAAAAAAAAAAAAAAAkMImDP///wgAAAAAAAAAAAAAAAAAAAAAAAAAAAAAAAAAAAAAZAAAAAEAAABAAAAAAAAAAAAAAAAAAAAAAAAAAAAAAAAAAAAAAAAAAAAAAAAAAAAAAAAAAAAAAAAAAAAAAAAAAAAAAAAAAAAAAAAAAAAAAAAAAAAAAAAAAAAAAAAAAAAAFAAAADwAAAABAAAAAAAAALRfBgAPAAAAAQAAACMAAAAjAAAAIwAAAB4AAAAAAAAASwAAAEsAAAACAAAAlgAAAJYAAAAVAAAAYAAAAAAAAAAAAAAADwAAACADAAAAAAAAAAAAAAEAAACgMgAAVgcAAKr4//8BAAAAf39/AAEAAABkAAAAAAAAABQAAABAHwAAAAAAACYAAAAAAAAAwOD//wAAAAAmAAAAZAAAABYAAABMAAAAAAAAAAAAAAAEAAAAAAAAAAEAAAAsPEMKAAAAACgAAAAoAAAAZAAAAGQAAAAAAAAAzMzMAAAAAABQAAAAUAAAAGQAAABkAAAAAAAAABcAAAAUAAAAAAAAAAAAAAD/fwAA/38AAAAAAAAJAAAABAAAABcQuQAMAAAAEAAAAAAAAAAAAAAAAAAAAAAAAAAeAAAAaAAAAAAAAAAAAAAAAAAAAAAAAAAAAAAAECcAABAnAAAAAAAAAAAAAAAAAAAAAAAAAAAAAAAAAAAAAAAAAAAAABQAAAAAAAAAwMD/AAAAAABkAAAAMgAAAAAAAABkAAAAAAAAAH9/fwAKAAAAHwAAAFQAAACQwiYF////AQAAAAAAAAAAAAAAAAAAAAAAAAAAAAAAAAAAAAAAAAAAtF8GAH9/fwAsPEMDzMzMAMDA/wB/f38AAAAAAAAAAAAAAAAAAAAAAAAAAAAhAAAAGAAAABQAAAD6GAAATxwAAFUeAADqIAAAEAAAACYAAAAIAAAA//////////8="/>
               </a:ext>
             </a:extLst>
           </p:cNvCxnSpPr>
@@ -27819,7 +28400,7 @@
             <a:cxnSpLocks/>
             <a:extLst>
               <a:ext uri="smNativeData">
-                <pr:smNativeData xmlns="" xmlns:p14="http://schemas.microsoft.com/office/powerpoint/2010/main" xmlns:pr="smNativeData" val="SMDATA_13_w78LXxMAAAAlAAAADQAAAA0AAAAAkAAAAEgAAACQAAAASAAAAAAAAAAAAAAAAAAAAAEAAABQAAAAAAAAAAAA8L8AAAAAAAAAAAAAAAAAAPA/AAAAAAAA4D8AAAAAAADgPwAAAAAAAOA/AAAAAAAA4D8AAAAAAADgPwAAAAAAAOA/AAAAAAAA4D8CAAAAjAAAAAAAAAAAAAAAkMImDP///wgAAAAAAAAAAAAAAAAAAAAAAAAAAAAAAAAAAAAAZAAAAAEAAABAAAAAAAAAAAAAAAAAAAAAAAAAAAAAAAAAAAAAAAAAAAAAAAAAAAAAAAAAAAAAAAAAAAAAAAAAAAAAAAAAAAAAAAAAAAAAAAAAAAAAAAAAAAAAAAAAAAAAFAAAADwAAAABAAAAAAAAALRfBgAPAAAAAQAAACMAAAAjAAAAIwAAAB4AAAAAAAAASwAAAEsAAAACAAAAlgAAAJYAAAAVAAAAYAAAAAAAAAAAAAAADwAAACADAAAAAAAAAAAAAAEAAACgMgAAVgcAAKr4//8BAAAAf39/AAEAAABkAAAAAAAAABQAAABAHwAAAAAAACYAAAAAAAAAwOD//wAAAAAmAAAAZAAAABYAAABMAAAAAAAAAAAAAAAEAAAAAAAAAAEAAAAsPEMKAAAAACgAAAAoAAAAZAAAAGQAAAAAAAAAzMzMAAAAAABQAAAAUAAAAGQAAABkAAAAAAAAABcAAAAUAAAAAAAAAAAAAAD/fwAA/38AAAAAAAAJAAAABAAAAAAAAAAMAAAAEAAAAAAAAAAAAAAAAAAAAAAAAAAeAAAAaAAAAAAAAAAAAAAAAAAAAAAAAAAAAAAAECcAABAnAAAAAAAAAAAAAAAAAAAAAAAAAAAAAAAAAAAAAAAAAAAAABQAAAAAAAAAwMD/AAAAAABkAAAAMgAAAAAAAABkAAAAAAAAAH9/fwAKAAAAHwAAAFQAAACQwiYF////AQAAAAAAAAAAAAAAAAAAAAAAAAAAAAAAAAAAAAAAAAAAtF8GAH9/fwAsPEMDzMzMAMDA/wB/f38AAAAAAAAAAAAAAAAAAAAAAAAAAAAhAAAAGAAAABQAAAC8CAAAXhwAAPoYAADqIAAAEAAAACYAAAAIAAAA//////////8="/>
+                <pr:smNativeData xmlns:pr="smNativeData" xmlns:p14="http://schemas.microsoft.com/office/powerpoint/2010/main" xmlns="" val="SMDATA_13_w78LXxMAAAAlAAAADQAAAA0AAAAAkAAAAEgAAACQAAAASAAAAAAAAAAAAAAAAAAAAAEAAABQAAAAAAAAAAAA8L8AAAAAAAAAAAAAAAAAAPA/AAAAAAAA4D8AAAAAAADgPwAAAAAAAOA/AAAAAAAA4D8AAAAAAADgPwAAAAAAAOA/AAAAAAAA4D8CAAAAjAAAAAAAAAAAAAAAkMImDP///wgAAAAAAAAAAAAAAAAAAAAAAAAAAAAAAAAAAAAAZAAAAAEAAABAAAAAAAAAAAAAAAAAAAAAAAAAAAAAAAAAAAAAAAAAAAAAAAAAAAAAAAAAAAAAAAAAAAAAAAAAAAAAAAAAAAAAAAAAAAAAAAAAAAAAAAAAAAAAAAAAAAAAFAAAADwAAAABAAAAAAAAALRfBgAPAAAAAQAAACMAAAAjAAAAIwAAAB4AAAAAAAAASwAAAEsAAAACAAAAlgAAAJYAAAAVAAAAYAAAAAAAAAAAAAAADwAAACADAAAAAAAAAAAAAAEAAACgMgAAVgcAAKr4//8BAAAAf39/AAEAAABkAAAAAAAAABQAAABAHwAAAAAAACYAAAAAAAAAwOD//wAAAAAmAAAAZAAAABYAAABMAAAAAAAAAAAAAAAEAAAAAAAAAAEAAAAsPEMKAAAAACgAAAAoAAAAZAAAAGQAAAAAAAAAzMzMAAAAAABQAAAAUAAAAGQAAABkAAAAAAAAABcAAAAUAAAAAAAAAAAAAAD/fwAA/38AAAAAAAAJAAAABAAAAAAAAAAMAAAAEAAAAAAAAAAAAAAAAAAAAAAAAAAeAAAAaAAAAAAAAAAAAAAAAAAAAAAAAAAAAAAAECcAABAnAAAAAAAAAAAAAAAAAAAAAAAAAAAAAAAAAAAAAAAAAAAAABQAAAAAAAAAwMD/AAAAAABkAAAAMgAAAAAAAABkAAAAAAAAAH9/fwAKAAAAHwAAAFQAAACQwiYF////AQAAAAAAAAAAAAAAAAAAAAAAAAAAAAAAAAAAAAAAAAAAtF8GAH9/fwAsPEMDzMzMAMDA/wB/f38AAAAAAAAAAAAAAAAAAAAAAAAAAAAhAAAAGAAAABQAAAC8CAAAXhwAAPoYAADqIAAAEAAAACYAAAAIAAAA//////////8="/>
               </a:ext>
             </a:extLst>
           </p:cNvCxnSpPr>
@@ -27851,7 +28432,7 @@
           <p:cNvSpPr>
             <a:extLst>
               <a:ext uri="smNativeData">
-                <pr:smNativeData xmlns="" xmlns:p14="http://schemas.microsoft.com/office/powerpoint/2010/main" xmlns:pr="smNativeData" val="SMDATA_13_w78LXxMAAAAlAAAAZAAAAA0AAAAAkAAAAJAAAACQAAAAkAAAAAAAAAABAAAAAAAAAAEAAABQAAAAAAAAAAAA4D8AAAAAAADgPwAAAAAAAOA/AAAAAAAA4D8AAAAAAADgPwAAAAAAAOA/AAAAAAAA4D8AAAAAAADgPwAAAAAAAOA/AAAAAAAA4D8CAAAAjAAAAAAAAAAAAAAAkMImDP///wgAAAAAAAAAAAAAAAAAAAAAAAAAAAAAAAAAAAAAZAAAAAEAAABAAAAAAAAAAAAAAAAAAAAAAAAAAAAAAAAAAAAAAAAAAAAAAAAAAAAAAAAAAAAAAAAAAAAAAAAAAAAAAAAAAAAAAAAAAAAAAAAAAAAAAAAAAAAAAAAAAAAAFAAAADwAAAAAAAAAAAAAAAAAAAkUAAAAAQAAABQAAAAUAAAAFAAAAAEAAAAAAAAAZAAAAGQAAAAAAAAAZAAAAGQAAAAVAAAAYAAAAAAAAAAAAAAADwAAACADAAAAAAAAAAAAAAEAAACgMgAAVgcAAKr4//8BAAAAf39/AAEAAABkAAAAAAAAABQAAABAHwAAAAAAACYAAAAAAAAAwOD//wAAAAAmAAAAZAAAABYAAABMAAAAAAAAAAAAAAAEAAAAAAAAAAEAAAAsPEMKAAAAACgAAAAoAAAAZAAAAGQAAAAAAAAAzMzMAAAAAABQAAAAUAAAAGQAAABkAAAAAAAAABcAAAAUAAAAAAAAAAAAAAD/fwAA/38AAAAAAAAJAAAABAAAAM1nAAAMAAAAEAAAAAAAAAAAAAAAAAAAAAAAAAAeAAAAaAAAAAAAAAAAAAAAAAAAAAAAAAAAAAAAECcAABAnAAAAAAAAAAAAAAAAAAAAAAAAAAAAAAAAAAAAAAAAAAAAABQAAAAAAAAAwMD/AAAAAABkAAAAMgAAAAAAAABkAAAAAAAAAH9/fwAKAAAAHwAAAFQAAACQwiYF////AQAAAAAAAAAAAAAAAAAAAAAAAAAAAAAAAAAAAAAAAAAAAAAAAn9/fwAsPEMDzMzMAMDA/wB/f38AAAAAAAAAAAAAAAAAAAAAAAAAAAAhAAAAGAAAABQAAADDDgAAgg0AAAM1AACGEwAAEAAAACYAAAAIAAAA//////////8="/>
+                <pr:smNativeData xmlns:pr="smNativeData" xmlns:p14="http://schemas.microsoft.com/office/powerpoint/2010/main" xmlns="" val="SMDATA_13_w78LXxMAAAAlAAAAZAAAAA0AAAAAkAAAAJAAAACQAAAAkAAAAAAAAAABAAAAAAAAAAEAAABQAAAAAAAAAAAA4D8AAAAAAADgPwAAAAAAAOA/AAAAAAAA4D8AAAAAAADgPwAAAAAAAOA/AAAAAAAA4D8AAAAAAADgPwAAAAAAAOA/AAAAAAAA4D8CAAAAjAAAAAAAAAAAAAAAkMImDP///wgAAAAAAAAAAAAAAAAAAAAAAAAAAAAAAAAAAAAAZAAAAAEAAABAAAAAAAAAAAAAAAAAAAAAAAAAAAAAAAAAAAAAAAAAAAAAAAAAAAAAAAAAAAAAAAAAAAAAAAAAAAAAAAAAAAAAAAAAAAAAAAAAAAAAAAAAAAAAAAAAAAAAFAAAADwAAAAAAAAAAAAAAAAAAAkUAAAAAQAAABQAAAAUAAAAFAAAAAEAAAAAAAAAZAAAAGQAAAAAAAAAZAAAAGQAAAAVAAAAYAAAAAAAAAAAAAAADwAAACADAAAAAAAAAAAAAAEAAACgMgAAVgcAAKr4//8BAAAAf39/AAEAAABkAAAAAAAAABQAAABAHwAAAAAAACYAAAAAAAAAwOD//wAAAAAmAAAAZAAAABYAAABMAAAAAAAAAAAAAAAEAAAAAAAAAAEAAAAsPEMKAAAAACgAAAAoAAAAZAAAAGQAAAAAAAAAzMzMAAAAAABQAAAAUAAAAGQAAABkAAAAAAAAABcAAAAUAAAAAAAAAAAAAAD/fwAA/38AAAAAAAAJAAAABAAAAM1nAAAMAAAAEAAAAAAAAAAAAAAAAAAAAAAAAAAeAAAAaAAAAAAAAAAAAAAAAAAAAAAAAAAAAAAAECcAABAnAAAAAAAAAAAAAAAAAAAAAAAAAAAAAAAAAAAAAAAAAAAAABQAAAAAAAAAwMD/AAAAAABkAAAAMgAAAAAAAABkAAAAAAAAAH9/fwAKAAAAHwAAAFQAAACQwiYF////AQAAAAAAAAAAAAAAAAAAAAAAAAAAAAAAAAAAAAAAAAAAAAAAAn9/fwAsPEMDzMzMAMDA/wB/f38AAAAAAAAAAAAAAAAAAAAAAAAAAAAhAAAAGAAAABQAAADDDgAAgg0AAAM1AACGEwAAEAAAACYAAAAIAAAA//////////8="/>
               </a:ext>
             </a:extLst>
           </p:cNvSpPr>
@@ -27996,7 +28577,7 @@
           <p:cNvSpPr>
             <a:extLst>
               <a:ext uri="smNativeData">
-                <pr:smNativeData xmlns="" xmlns:p14="http://schemas.microsoft.com/office/powerpoint/2010/main" xmlns:pr="smNativeData" val="SMDATA_13_w78LXxMAAAAlAAAAZAAAAA0AAAAAkAAAAJAAAACQAAAAkAAAAAAAAAAAAAAAAAAAAAEAAABQAAAAAAAAAAAA4D8AAAAAAADgPwAAAAAAAOA/AAAAAAAA4D8AAAAAAADgPwAAAAAAAOA/AAAAAAAA4D8AAAAAAADgPwAAAAAAAOA/AAAAAAAA4D8CAAAAjAAAAAAAAAAAAAAAkMImDP///wgAAAAAAAAAAAAAAAAAAAAAAAAAAAAAAAAAAAAAZAAAAAEAAABAAAAAAAAAAAAAAAAAAAAAAAAAAAAAAAAAAAAAAAAAAAAAAAAAAAAAAAAAAAAAAAAAAAAAAAAAAAAAAAAAAAAAAAAAAAAAAAAAAAAAAAAAAAAAAAAAAAAAFAAAADwAAAAAAAAAAAAAAAAAAAkUAAAAAQAAABQAAAAUAAAAFAAAAAEAAAAAAAAAZAAAAGQAAAAAAAAAZAAAAGQAAAAVAAAAYAAAAAAAAAAAAAAADwAAACADAAAAAAAAAAAAAAEAAACgMgAAVgcAAKr4//8BAAAAf39/AAEAAABkAAAAAAAAABQAAABAHwAAAAAAACYAAAAAAAAAwOD//wAAAAAmAAAAZAAAABYAAABMAAAAAAAAAAAAAAAEAAAAAAAAAAEAAAAsPEMKAAAAACgAAAAoAAAAZAAAAGQAAAAAAAAAzMzMAAAAAABQAAAAUAAAAGQAAABkAAAAAAAAABcAAAAUAAAAAAAAAAAAAAD/fwAA/38AAAAAAAAJAAAABAAAAD0sAAAMAAAAEAAAAAAAAAAAAAAAAAAAAAAAAAAeAAAAaAAAAAAAAAAAAAAAAAAAAAAAAAAAAAAAECcAABAnAAAAAAAAAAAAAAAAAAAAAAAAAAAAAAAAAAAAAAAAAAAAABQAAAAAAAAAwMD/AAAAAABkAAAAMgAAAAAAAABkAAAAAAAAAH9/fwAKAAAAHwAAAFQAAACQwiYF////AQAAAAAAAAAAAAAAAAAAAAAAAAAAAAAAAAAAAAAAAAAAAAAAAn9/fwAsPEMDzMzMAMDA/wB/f38AAAAAAAAAAAAAAAAAAAAAAAAAAAAhAAAAGAAAABQAAADsEQAAzBMAACoaAACBFgAAEAAAACYAAAAIAAAA//////////8="/>
+                <pr:smNativeData xmlns:pr="smNativeData" xmlns:p14="http://schemas.microsoft.com/office/powerpoint/2010/main" xmlns="" val="SMDATA_13_w78LXxMAAAAlAAAAZAAAAA0AAAAAkAAAAJAAAACQAAAAkAAAAAAAAAAAAAAAAAAAAAEAAABQAAAAAAAAAAAA4D8AAAAAAADgPwAAAAAAAOA/AAAAAAAA4D8AAAAAAADgPwAAAAAAAOA/AAAAAAAA4D8AAAAAAADgPwAAAAAAAOA/AAAAAAAA4D8CAAAAjAAAAAAAAAAAAAAAkMImDP///wgAAAAAAAAAAAAAAAAAAAAAAAAAAAAAAAAAAAAAZAAAAAEAAABAAAAAAAAAAAAAAAAAAAAAAAAAAAAAAAAAAAAAAAAAAAAAAAAAAAAAAAAAAAAAAAAAAAAAAAAAAAAAAAAAAAAAAAAAAAAAAAAAAAAAAAAAAAAAAAAAAAAAFAAAADwAAAAAAAAAAAAAAAAAAAkUAAAAAQAAABQAAAAUAAAAFAAAAAEAAAAAAAAAZAAAAGQAAAAAAAAAZAAAAGQAAAAVAAAAYAAAAAAAAAAAAAAADwAAACADAAAAAAAAAAAAAAEAAACgMgAAVgcAAKr4//8BAAAAf39/AAEAAABkAAAAAAAAABQAAABAHwAAAAAAACYAAAAAAAAAwOD//wAAAAAmAAAAZAAAABYAAABMAAAAAAAAAAAAAAAEAAAAAAAAAAEAAAAsPEMKAAAAACgAAAAoAAAAZAAAAGQAAAAAAAAAzMzMAAAAAABQAAAAUAAAAGQAAABkAAAAAAAAABcAAAAUAAAAAAAAAAAAAAD/fwAA/38AAAAAAAAJAAAABAAAAD0sAAAMAAAAEAAAAAAAAAAAAAAAAAAAAAAAAAAeAAAAaAAAAAAAAAAAAAAAAAAAAAAAAAAAAAAAECcAABAnAAAAAAAAAAAAAAAAAAAAAAAAAAAAAAAAAAAAAAAAAAAAABQAAAAAAAAAwMD/AAAAAABkAAAAMgAAAAAAAABkAAAAAAAAAH9/fwAKAAAAHwAAAFQAAACQwiYF////AQAAAAAAAAAAAAAAAAAAAAAAAAAAAAAAAAAAAAAAAAAAAAAAAn9/fwAsPEMDzMzMAMDA/wB/f38AAAAAAAAAAAAAAAAAAAAAAAAAAAAhAAAAGAAAABQAAADsEQAAzBMAACoaAACBFgAAEAAAACYAAAAIAAAA//////////8="/>
               </a:ext>
             </a:extLst>
           </p:cNvSpPr>
@@ -28050,7 +28631,7 @@
             <a:stCxn id="9" idx="0"/>
             <a:extLst>
               <a:ext uri="smNativeData">
-                <pr:smNativeData xmlns="" xmlns:p14="http://schemas.microsoft.com/office/powerpoint/2010/main" xmlns:pr="smNativeData" val="SMDATA_13_w78LXxMAAAAlAAAADQAAAA0AAAAAkAAAAEgAAACQAAAASAAAAAAAAAAAAAAAAAAAAAEAAABQAAAAAAAAAAAA8L8AAAAAAAAAAAAAAAAAAPA/AAAAAAAA4D8AAAAAAADgPwAAAAAAAOA/AAAAAAAA4D8AAAAAAADgPwAAAAAAAOA/AAAAAAAA4D8CAAAAjAAAAAAAAAAAAAAAkMImDP///wgAAAAAAAAAAAAAAAAAAAAAAAAAAAAAAAAAAAAAZAAAAAEAAABAAAAAAAAAAAAAAAAAAAAAAAAAAAAAAAAAAAAAAAAAAAAAAAAAAAAAAAAAAAAAAAAAAAAAAAAAAAAAAAAAAAAAAAAAAAAAAAAAAAAAAAAAAAAAAAAAAAAAFAAAADwAAAABAAAAAAAAALRfBgAPAAAAAQAAACMAAAAjAAAAIwAAAB4AAAAAAAAASwAAAEsAAAACAAAAlgAAAJYAAAAVAAAAYAAAAAAAAAAAAAAADwAAACADAAAAAAAAAAAAAAEAAACgMgAAVgcAAKr4//8BAAAAf39/AAEAAABkAAAAAAAAABQAAABAHwAAAAAAACYAAAAAAAAAwOD//wAAAAAmAAAAZAAAABYAAABMAAAAAAAAAAAAAAAEAAAAAAAAAAEAAAAsPEMKAAAAACgAAAAoAAAAZAAAAGQAAAAAAAAAzMzMAAAAAABQAAAAUAAAAGQAAABkAAAAAAAAABcAAAAUAAAAAAAAAAAAAAD/fwAA/38AAAAAAAAJAAAABAAAAAY3AAAMAAAAEAAAAAAAAAAAAAAAAAAAAAAAAAAeAAAAaAAAAAAAAAAAAAAAAAAAAAAAAAAAAAAAECcAABAnAAAAAAAAAAAAAAAAAAAAAAAAAAAAAAAAAAAAAAAAAAAAABQAAAAAAAAAwMD/AAAAAABkAAAAMgAAAAAAAABkAAAAAAAAAH9/fwAKAAAAHwAAAFQAAACQwiYF////AQAAAAAAAAAAAAAAAAAAAAAAAAAAAAAAAAAAAAAAAAAAtF8GAH9/fwAsPEMDzMzMAMDA/wB/f38AAAAAAAAAAAAAAAAAAAAAAAAAAAAhAAAAGAAAABQAAADyFAAAHhEAAAsWAADMEwAAEAAAACYAAAAIAAAA//////////8="/>
+                <pr:smNativeData xmlns:pr="smNativeData" xmlns:p14="http://schemas.microsoft.com/office/powerpoint/2010/main" xmlns="" val="SMDATA_13_w78LXxMAAAAlAAAADQAAAA0AAAAAkAAAAEgAAACQAAAASAAAAAAAAAAAAAAAAAAAAAEAAABQAAAAAAAAAAAA8L8AAAAAAAAAAAAAAAAAAPA/AAAAAAAA4D8AAAAAAADgPwAAAAAAAOA/AAAAAAAA4D8AAAAAAADgPwAAAAAAAOA/AAAAAAAA4D8CAAAAjAAAAAAAAAAAAAAAkMImDP///wgAAAAAAAAAAAAAAAAAAAAAAAAAAAAAAAAAAAAAZAAAAAEAAABAAAAAAAAAAAAAAAAAAAAAAAAAAAAAAAAAAAAAAAAAAAAAAAAAAAAAAAAAAAAAAAAAAAAAAAAAAAAAAAAAAAAAAAAAAAAAAAAAAAAAAAAAAAAAAAAAAAAAFAAAADwAAAABAAAAAAAAALRfBgAPAAAAAQAAACMAAAAjAAAAIwAAAB4AAAAAAAAASwAAAEsAAAACAAAAlgAAAJYAAAAVAAAAYAAAAAAAAAAAAAAADwAAACADAAAAAAAAAAAAAAEAAACgMgAAVgcAAKr4//8BAAAAf39/AAEAAABkAAAAAAAAABQAAABAHwAAAAAAACYAAAAAAAAAwOD//wAAAAAmAAAAZAAAABYAAABMAAAAAAAAAAAAAAAEAAAAAAAAAAEAAAAsPEMKAAAAACgAAAAoAAAAZAAAAGQAAAAAAAAAzMzMAAAAAABQAAAAUAAAAGQAAABkAAAAAAAAABcAAAAUAAAAAAAAAAAAAAD/fwAA/38AAAAAAAAJAAAABAAAAAY3AAAMAAAAEAAAAAAAAAAAAAAAAAAAAAAAAAAeAAAAaAAAAAAAAAAAAAAAAAAAAAAAAAAAAAAAECcAABAnAAAAAAAAAAAAAAAAAAAAAAAAAAAAAAAAAAAAAAAAAAAAABQAAAAAAAAAwMD/AAAAAABkAAAAMgAAAAAAAABkAAAAAAAAAH9/fwAKAAAAHwAAAFQAAACQwiYF////AQAAAAAAAAAAAAAAAAAAAAAAAAAAAAAAAAAAAAAAAAAAtF8GAH9/fwAsPEMDzMzMAMDA/wB/f38AAAAAAAAAAAAAAAAAAAAAAAAAAAAhAAAAGAAAABQAAADyFAAAHhEAAAsWAADMEwAAEAAAACYAAAAIAAAA//////////8="/>
               </a:ext>
             </a:extLst>
           </p:cNvCxnSpPr>
@@ -28088,7 +28669,7 @@
           <p:cNvSpPr>
             <a:extLst>
               <a:ext uri="smNativeData">
-                <pr:smNativeData xmlns="" xmlns:p14="http://schemas.microsoft.com/office/powerpoint/2010/main" xmlns:pr="smNativeData" val="SMDATA_13_w78LXxMAAAAlAAAAZAAAAA0AAAAAkAAAAJAAAACQAAAAkAAAAAAAAAAAAAAAAAAAAAEAAABQAAAAAAAAAAAA4D8AAAAAAADgPwAAAAAAAOA/AAAAAAAA4D8AAAAAAADgPwAAAAAAAOA/AAAAAAAA4D8AAAAAAADgPwAAAAAAAOA/AAAAAAAA4D8CAAAAjAAAAAAAAAAAAAAAkMImDP///wgAAAAAAAAAAAAAAAAAAAAAAAAAAAAAAAAAAAAAZAAAAAEAAABAAAAAAAAAAAAAAAAAAAAAAAAAAAAAAAAAAAAAAAAAAAAAAAAAAAAAAAAAAAAAAAAAAAAAAAAAAAAAAAAAAAAAAAAAAAAAAAAAAAAAAAAAAAAAAAAAAAAAFAAAADwAAAAAAAAAAAAAAAAAAAkUAAAAAQAAABQAAAAUAAAAFAAAAAEAAAAAAAAAZAAAAGQAAAAAAAAAZAAAAGQAAAAVAAAAYAAAAAAAAAAAAAAADwAAACADAAAAAAAAAAAAAAEAAACgMgAAVgcAAKr4//8BAAAAf39/AAEAAABkAAAAAAAAABQAAABAHwAAAAAAACYAAAAAAAAAwOD//wAAAAAmAAAAZAAAABYAAABMAAAAAAAAAAAAAAAEAAAAAAAAAAEAAAAsPEMKAAAAACgAAAAoAAAAZAAAAGQAAAAAAAAAzMzMAAAAAABQAAAAUAAAAGQAAABkAAAAAAAAABcAAAAUAAAAAAAAAAAAAAD/fwAA/38AAAAAAAAJAAAABAAAAD0sAAAMAAAAEAAAAAAAAAAAAAAAAAAAAAAAAAAeAAAAaAAAAAAAAAAAAAAAAAAAAAAAAAAAAAAAECcAABAnAAAAAAAAAAAAAAAAAAAAAAAAAAAAAAAAAAAAAAAAAAAAABQAAAAAAAAAwMD/AAAAAABkAAAAMgAAAAAAAABkAAAAAAAAAH9/fwAKAAAAHwAAAFQAAACQwiYF////AQAAAAAAAAAAAAAAAAAAAAAAAAAAAAAAAAAAAAAAAAAAAAAAAn9/fwAsPEMDzMzMAMDA/wB/f38AAAAAAAAAAAAAAAAAAAAAAAAAAAAhAAAAGAAAABQAAADsEQAAzBMAACoaAACBFgAAEAAAACYAAAAIAAAA//////////8="/>
+                <pr:smNativeData xmlns:pr="smNativeData" xmlns:p14="http://schemas.microsoft.com/office/powerpoint/2010/main" xmlns="" val="SMDATA_13_w78LXxMAAAAlAAAAZAAAAA0AAAAAkAAAAJAAAACQAAAAkAAAAAAAAAAAAAAAAAAAAAEAAABQAAAAAAAAAAAA4D8AAAAAAADgPwAAAAAAAOA/AAAAAAAA4D8AAAAAAADgPwAAAAAAAOA/AAAAAAAA4D8AAAAAAADgPwAAAAAAAOA/AAAAAAAA4D8CAAAAjAAAAAAAAAAAAAAAkMImDP///wgAAAAAAAAAAAAAAAAAAAAAAAAAAAAAAAAAAAAAZAAAAAEAAABAAAAAAAAAAAAAAAAAAAAAAAAAAAAAAAAAAAAAAAAAAAAAAAAAAAAAAAAAAAAAAAAAAAAAAAAAAAAAAAAAAAAAAAAAAAAAAAAAAAAAAAAAAAAAAAAAAAAAFAAAADwAAAAAAAAAAAAAAAAAAAkUAAAAAQAAABQAAAAUAAAAFAAAAAEAAAAAAAAAZAAAAGQAAAAAAAAAZAAAAGQAAAAVAAAAYAAAAAAAAAAAAAAADwAAACADAAAAAAAAAAAAAAEAAACgMgAAVgcAAKr4//8BAAAAf39/AAEAAABkAAAAAAAAABQAAABAHwAAAAAAACYAAAAAAAAAwOD//wAAAAAmAAAAZAAAABYAAABMAAAAAAAAAAAAAAAEAAAAAAAAAAEAAAAsPEMKAAAAACgAAAAoAAAAZAAAAGQAAAAAAAAAzMzMAAAAAABQAAAAUAAAAGQAAABkAAAAAAAAABcAAAAUAAAAAAAAAAAAAAD/fwAA/38AAAAAAAAJAAAABAAAAD0sAAAMAAAAEAAAAAAAAAAAAAAAAAAAAAAAAAAeAAAAaAAAAAAAAAAAAAAAAAAAAAAAAAAAAAAAECcAABAnAAAAAAAAAAAAAAAAAAAAAAAAAAAAAAAAAAAAAAAAAAAAABQAAAAAAAAAwMD/AAAAAABkAAAAMgAAAAAAAABkAAAAAAAAAH9/fwAKAAAAHwAAAFQAAACQwiYF////AQAAAAAAAAAAAAAAAAAAAAAAAAAAAAAAAAAAAAAAAAAAAAAAAn9/fwAsPEMDzMzMAMDA/wB/f38AAAAAAAAAAAAAAAAAAAAAAAAAAAAhAAAAGAAAABQAAADsEQAAzBMAACoaAACBFgAAEAAAACYAAAAIAAAA//////////8="/>
               </a:ext>
             </a:extLst>
           </p:cNvSpPr>
@@ -28155,7 +28736,7 @@
           <p:cNvCxnSpPr>
             <a:extLst>
               <a:ext uri="smNativeData">
-                <pr:smNativeData xmlns="" xmlns:p14="http://schemas.microsoft.com/office/powerpoint/2010/main" xmlns:pr="smNativeData" val="SMDATA_13_w78LXxMAAAAlAAAADQAAAA0AAAAAkAAAAEgAAACQAAAASAAAAAAAAAAAAAAAAAAAAAEAAABQAAAAAAAAAAAA8L8AAAAAAAAAAAAAAAAAAPA/AAAAAAAA4D8AAAAAAADgPwAAAAAAAOA/AAAAAAAA4D8AAAAAAADgPwAAAAAAAOA/AAAAAAAA4D8CAAAAjAAAAAAAAAAAAAAAkMImDP///wgAAAAAAAAAAAAAAAAAAAAAAAAAAAAAAAAAAAAAZAAAAAEAAABAAAAAAAAAAAAAAAAAAAAAAAAAAAAAAAAAAAAAAAAAAAAAAAAAAAAAAAAAAAAAAAAAAAAAAAAAAAAAAAAAAAAAAAAAAAAAAAAAAAAAAAAAAAAAAAAAAAAAFAAAADwAAAABAAAAAAAAALRfBgAPAAAAAQAAACMAAAAjAAAAIwAAAB4AAAAAAAAASwAAAEsAAAACAAAAlgAAAJYAAAAVAAAAYAAAAAAAAAAAAAAADwAAACADAAAAAAAAAAAAAAEAAACgMgAAVgcAAKr4//8BAAAAf39/AAEAAABkAAAAAAAAABQAAABAHwAAAAAAACYAAAAAAAAAwOD//wAAAAAmAAAAZAAAABYAAABMAAAAAAAAAAAAAAAEAAAAAAAAAAEAAAAsPEMKAAAAACgAAAAoAAAAZAAAAGQAAAAAAAAAzMzMAAAAAABQAAAAUAAAAGQAAABkAAAAAAAAABcAAAAUAAAAAAAAAAAAAAD/fwAA/38AAAAAAAAJAAAABAAAAAY3AAAMAAAAEAAAAAAAAAAAAAAAAAAAAAAAAAAeAAAAaAAAAAAAAAAAAAAAAAAAAAAAAAAAAAAAECcAABAnAAAAAAAAAAAAAAAAAAAAAAAAAAAAAAAAAAAAAAAAAAAAABQAAAAAAAAAwMD/AAAAAABkAAAAMgAAAAAAAABkAAAAAAAAAH9/fwAKAAAAHwAAAFQAAACQwiYF////AQAAAAAAAAAAAAAAAAAAAAAAAAAAAAAAAAAAAAAAAAAAtF8GAH9/fwAsPEMDzMzMAMDA/wB/f38AAAAAAAAAAAAAAAAAAAAAAAAAAAAhAAAAGAAAABQAAADyFAAAHhEAAAsWAADMEwAAEAAAACYAAAAIAAAA//////////8="/>
+                <pr:smNativeData xmlns:pr="smNativeData" xmlns:p14="http://schemas.microsoft.com/office/powerpoint/2010/main" xmlns="" val="SMDATA_13_w78LXxMAAAAlAAAADQAAAA0AAAAAkAAAAEgAAACQAAAASAAAAAAAAAAAAAAAAAAAAAEAAABQAAAAAAAAAAAA8L8AAAAAAAAAAAAAAAAAAPA/AAAAAAAA4D8AAAAAAADgPwAAAAAAAOA/AAAAAAAA4D8AAAAAAADgPwAAAAAAAOA/AAAAAAAA4D8CAAAAjAAAAAAAAAAAAAAAkMImDP///wgAAAAAAAAAAAAAAAAAAAAAAAAAAAAAAAAAAAAAZAAAAAEAAABAAAAAAAAAAAAAAAAAAAAAAAAAAAAAAAAAAAAAAAAAAAAAAAAAAAAAAAAAAAAAAAAAAAAAAAAAAAAAAAAAAAAAAAAAAAAAAAAAAAAAAAAAAAAAAAAAAAAAFAAAADwAAAABAAAAAAAAALRfBgAPAAAAAQAAACMAAAAjAAAAIwAAAB4AAAAAAAAASwAAAEsAAAACAAAAlgAAAJYAAAAVAAAAYAAAAAAAAAAAAAAADwAAACADAAAAAAAAAAAAAAEAAACgMgAAVgcAAKr4//8BAAAAf39/AAEAAABkAAAAAAAAABQAAABAHwAAAAAAACYAAAAAAAAAwOD//wAAAAAmAAAAZAAAABYAAABMAAAAAAAAAAAAAAAEAAAAAAAAAAEAAAAsPEMKAAAAACgAAAAoAAAAZAAAAGQAAAAAAAAAzMzMAAAAAABQAAAAUAAAAGQAAABkAAAAAAAAABcAAAAUAAAAAAAAAAAAAAD/fwAA/38AAAAAAAAJAAAABAAAAAY3AAAMAAAAEAAAAAAAAAAAAAAAAAAAAAAAAAAeAAAAaAAAAAAAAAAAAAAAAAAAAAAAAAAAAAAAECcAABAnAAAAAAAAAAAAAAAAAAAAAAAAAAAAAAAAAAAAAAAAAAAAABQAAAAAAAAAwMD/AAAAAABkAAAAMgAAAAAAAABkAAAAAAAAAH9/fwAKAAAAHwAAAFQAAACQwiYF////AQAAAAAAAAAAAAAAAAAAAAAAAAAAAAAAAAAAAAAAAAAAtF8GAH9/fwAsPEMDzMzMAMDA/wB/f38AAAAAAAAAAAAAAAAAAAAAAAAAAAAhAAAAGAAAABQAAADyFAAAHhEAAAsWAADMEwAAEAAAACYAAAAIAAAA//////////8="/>
               </a:ext>
             </a:extLst>
           </p:cNvCxnSpPr>
@@ -28193,7 +28774,7 @@
           <p:cNvSpPr>
             <a:extLst>
               <a:ext uri="smNativeData">
-                <pr:smNativeData xmlns="" xmlns:p14="http://schemas.microsoft.com/office/powerpoint/2010/main" xmlns:pr="smNativeData" val="SMDATA_13_w78LXxMAAAAlAAAAZAAAAA0AAAAAkAAAAJAAAACQAAAAkAAAAAAAAAAAAAAAAAAAAAEAAABQAAAAAAAAAAAA4D8AAAAAAADgPwAAAAAAAOA/AAAAAAAA4D8AAAAAAADgPwAAAAAAAOA/AAAAAAAA4D8AAAAAAADgPwAAAAAAAOA/AAAAAAAA4D8CAAAAjAAAAAAAAAAAAAAAkMImDP///wgAAAAAAAAAAAAAAAAAAAAAAAAAAAAAAAAAAAAAZAAAAAEAAABAAAAAAAAAAAAAAAAAAAAAAAAAAAAAAAAAAAAAAAAAAAAAAAAAAAAAAAAAAAAAAAAAAAAAAAAAAAAAAAAAAAAAAAAAAAAAAAAAAAAAAAAAAAAAAAAAAAAAFAAAADwAAAAAAAAAAAAAAAAAAAkUAAAAAQAAABQAAAAUAAAAFAAAAAEAAAAAAAAAZAAAAGQAAAAAAAAAZAAAAGQAAAAVAAAAYAAAAAAAAAAAAAAADwAAACADAAAAAAAAAAAAAAEAAACgMgAAVgcAAKr4//8BAAAAf39/AAEAAABkAAAAAAAAABQAAABAHwAAAAAAACYAAAAAAAAAwOD//wAAAAAmAAAAZAAAABYAAABMAAAAAAAAAAAAAAAEAAAAAAAAAAEAAAAsPEMKAAAAACgAAAAoAAAAZAAAAGQAAAAAAAAAzMzMAAAAAABQAAAAUAAAAGQAAABkAAAAAAAAABcAAAAUAAAAAAAAAAAAAAD/fwAA/38AAAAAAAAJAAAABAAAAD0sAAAMAAAAEAAAAAAAAAAAAAAAAAAAAAAAAAAeAAAAaAAAAAAAAAAAAAAAAAAAAAAAAAAAAAAAECcAABAnAAAAAAAAAAAAAAAAAAAAAAAAAAAAAAAAAAAAAAAAAAAAABQAAAAAAAAAwMD/AAAAAABkAAAAMgAAAAAAAABkAAAAAAAAAH9/fwAKAAAAHwAAAFQAAACQwiYF////AQAAAAAAAAAAAAAAAAAAAAAAAAAAAAAAAAAAAAAAAAAAAAAAAn9/fwAsPEMDzMzMAMDA/wB/f38AAAAAAAAAAAAAAAAAAAAAAAAAAAAhAAAAGAAAABQAAADsEQAAzBMAACoaAACBFgAAEAAAACYAAAAIAAAA//////////8="/>
+                <pr:smNativeData xmlns:pr="smNativeData" xmlns:p14="http://schemas.microsoft.com/office/powerpoint/2010/main" xmlns="" val="SMDATA_13_w78LXxMAAAAlAAAAZAAAAA0AAAAAkAAAAJAAAACQAAAAkAAAAAAAAAAAAAAAAAAAAAEAAABQAAAAAAAAAAAA4D8AAAAAAADgPwAAAAAAAOA/AAAAAAAA4D8AAAAAAADgPwAAAAAAAOA/AAAAAAAA4D8AAAAAAADgPwAAAAAAAOA/AAAAAAAA4D8CAAAAjAAAAAAAAAAAAAAAkMImDP///wgAAAAAAAAAAAAAAAAAAAAAAAAAAAAAAAAAAAAAZAAAAAEAAABAAAAAAAAAAAAAAAAAAAAAAAAAAAAAAAAAAAAAAAAAAAAAAAAAAAAAAAAAAAAAAAAAAAAAAAAAAAAAAAAAAAAAAAAAAAAAAAAAAAAAAAAAAAAAAAAAAAAAFAAAADwAAAAAAAAAAAAAAAAAAAkUAAAAAQAAABQAAAAUAAAAFAAAAAEAAAAAAAAAZAAAAGQAAAAAAAAAZAAAAGQAAAAVAAAAYAAAAAAAAAAAAAAADwAAACADAAAAAAAAAAAAAAEAAACgMgAAVgcAAKr4//8BAAAAf39/AAEAAABkAAAAAAAAABQAAABAHwAAAAAAACYAAAAAAAAAwOD//wAAAAAmAAAAZAAAABYAAABMAAAAAAAAAAAAAAAEAAAAAAAAAAEAAAAsPEMKAAAAACgAAAAoAAAAZAAAAGQAAAAAAAAAzMzMAAAAAABQAAAAUAAAAGQAAABkAAAAAAAAABcAAAAUAAAAAAAAAAAAAAD/fwAA/38AAAAAAAAJAAAABAAAAD0sAAAMAAAAEAAAAAAAAAAAAAAAAAAAAAAAAAAeAAAAaAAAAAAAAAAAAAAAAAAAAAAAAAAAAAAAECcAABAnAAAAAAAAAAAAAAAAAAAAAAAAAAAAAAAAAAAAAAAAAAAAABQAAAAAAAAAwMD/AAAAAABkAAAAMgAAAAAAAABkAAAAAAAAAH9/fwAKAAAAHwAAAFQAAACQwiYF////AQAAAAAAAAAAAAAAAAAAAAAAAAAAAAAAAAAAAAAAAAAAAAAAAn9/fwAsPEMDzMzMAMDA/wB/f38AAAAAAAAAAAAAAAAAAAAAAAAAAAAhAAAAGAAAABQAAADsEQAAzBMAACoaAACBFgAAEAAAACYAAAAIAAAA//////////8="/>
               </a:ext>
             </a:extLst>
           </p:cNvSpPr>
@@ -28257,7 +28838,7 @@
           <p:cNvCxnSpPr>
             <a:extLst>
               <a:ext uri="smNativeData">
-                <pr:smNativeData xmlns="" xmlns:p14="http://schemas.microsoft.com/office/powerpoint/2010/main" xmlns:pr="smNativeData" val="SMDATA_13_w78LXxMAAAAlAAAADQAAAA0AAAAAkAAAAEgAAACQAAAASAAAAAAAAAAAAAAAAAAAAAEAAABQAAAAAAAAAAAA8L8AAAAAAAAAAAAAAAAAAPA/AAAAAAAA4D8AAAAAAADgPwAAAAAAAOA/AAAAAAAA4D8AAAAAAADgPwAAAAAAAOA/AAAAAAAA4D8CAAAAjAAAAAAAAAAAAAAAkMImDP///wgAAAAAAAAAAAAAAAAAAAAAAAAAAAAAAAAAAAAAZAAAAAEAAABAAAAAAAAAAAAAAAAAAAAAAAAAAAAAAAAAAAAAAAAAAAAAAAAAAAAAAAAAAAAAAAAAAAAAAAAAAAAAAAAAAAAAAAAAAAAAAAAAAAAAAAAAAAAAAAAAAAAAFAAAADwAAAABAAAAAAAAALRfBgAPAAAAAQAAACMAAAAjAAAAIwAAAB4AAAAAAAAASwAAAEsAAAACAAAAlgAAAJYAAAAVAAAAYAAAAAAAAAAAAAAADwAAACADAAAAAAAAAAAAAAEAAACgMgAAVgcAAKr4//8BAAAAf39/AAEAAABkAAAAAAAAABQAAABAHwAAAAAAACYAAAAAAAAAwOD//wAAAAAmAAAAZAAAABYAAABMAAAAAAAAAAAAAAAEAAAAAAAAAAEAAAAsPEMKAAAAACgAAAAoAAAAZAAAAGQAAAAAAAAAzMzMAAAAAABQAAAAUAAAAGQAAABkAAAAAAAAABcAAAAUAAAAAAAAAAAAAAD/fwAA/38AAAAAAAAJAAAABAAAAAY3AAAMAAAAEAAAAAAAAAAAAAAAAAAAAAAAAAAeAAAAaAAAAAAAAAAAAAAAAAAAAAAAAAAAAAAAECcAABAnAAAAAAAAAAAAAAAAAAAAAAAAAAAAAAAAAAAAAAAAAAAAABQAAAAAAAAAwMD/AAAAAABkAAAAMgAAAAAAAABkAAAAAAAAAH9/fwAKAAAAHwAAAFQAAACQwiYF////AQAAAAAAAAAAAAAAAAAAAAAAAAAAAAAAAAAAAAAAAAAAtF8GAH9/fwAsPEMDzMzMAMDA/wB/f38AAAAAAAAAAAAAAAAAAAAAAAAAAAAhAAAAGAAAABQAAADyFAAAHhEAAAsWAADMEwAAEAAAACYAAAAIAAAA//////////8="/>
+                <pr:smNativeData xmlns:pr="smNativeData" xmlns:p14="http://schemas.microsoft.com/office/powerpoint/2010/main" xmlns="" val="SMDATA_13_w78LXxMAAAAlAAAADQAAAA0AAAAAkAAAAEgAAACQAAAASAAAAAAAAAAAAAAAAAAAAAEAAABQAAAAAAAAAAAA8L8AAAAAAAAAAAAAAAAAAPA/AAAAAAAA4D8AAAAAAADgPwAAAAAAAOA/AAAAAAAA4D8AAAAAAADgPwAAAAAAAOA/AAAAAAAA4D8CAAAAjAAAAAAAAAAAAAAAkMImDP///wgAAAAAAAAAAAAAAAAAAAAAAAAAAAAAAAAAAAAAZAAAAAEAAABAAAAAAAAAAAAAAAAAAAAAAAAAAAAAAAAAAAAAAAAAAAAAAAAAAAAAAAAAAAAAAAAAAAAAAAAAAAAAAAAAAAAAAAAAAAAAAAAAAAAAAAAAAAAAAAAAAAAAFAAAADwAAAABAAAAAAAAALRfBgAPAAAAAQAAACMAAAAjAAAAIwAAAB4AAAAAAAAASwAAAEsAAAACAAAAlgAAAJYAAAAVAAAAYAAAAAAAAAAAAAAADwAAACADAAAAAAAAAAAAAAEAAACgMgAAVgcAAKr4//8BAAAAf39/AAEAAABkAAAAAAAAABQAAABAHwAAAAAAACYAAAAAAAAAwOD//wAAAAAmAAAAZAAAABYAAABMAAAAAAAAAAAAAAAEAAAAAAAAAAEAAAAsPEMKAAAAACgAAAAoAAAAZAAAAGQAAAAAAAAAzMzMAAAAAABQAAAAUAAAAGQAAABkAAAAAAAAABcAAAAUAAAAAAAAAAAAAAD/fwAA/38AAAAAAAAJAAAABAAAAAY3AAAMAAAAEAAAAAAAAAAAAAAAAAAAAAAAAAAeAAAAaAAAAAAAAAAAAAAAAAAAAAAAAAAAAAAAECcAABAnAAAAAAAAAAAAAAAAAAAAAAAAAAAAAAAAAAAAAAAAAAAAABQAAAAAAAAAwMD/AAAAAABkAAAAMgAAAAAAAABkAAAAAAAAAH9/fwAKAAAAHwAAAFQAAACQwiYF////AQAAAAAAAAAAAAAAAAAAAAAAAAAAAAAAAAAAAAAAAAAAtF8GAH9/fwAsPEMDzMzMAMDA/wB/f38AAAAAAAAAAAAAAAAAAAAAAAAAAAAhAAAAGAAAABQAAADyFAAAHhEAAAsWAADMEwAAEAAAACYAAAAIAAAA//////////8="/>
               </a:ext>
             </a:extLst>
           </p:cNvCxnSpPr>
@@ -28295,7 +28876,7 @@
           <p:cNvSpPr>
             <a:extLst>
               <a:ext uri="smNativeData">
-                <pr:smNativeData xmlns="" xmlns:p14="http://schemas.microsoft.com/office/powerpoint/2010/main" xmlns:pr="smNativeData" val="SMDATA_13_w78LXxMAAAAlAAAAZAAAAA0AAAAAkAAAAJAAAACQAAAAkAAAAAAAAAAAAAAAAAAAAAEAAABQAAAAAAAAAAAA4D8AAAAAAADgPwAAAAAAAOA/AAAAAAAA4D8AAAAAAADgPwAAAAAAAOA/AAAAAAAA4D8AAAAAAADgPwAAAAAAAOA/AAAAAAAA4D8CAAAAjAAAAAAAAAAAAAAAkMImDP///wgAAAAAAAAAAAAAAAAAAAAAAAAAAAAAAAAAAAAAZAAAAAEAAABAAAAAAAAAAAAAAAAAAAAAAAAAAAAAAAAAAAAAAAAAAAAAAAAAAAAAAAAAAAAAAAAAAAAAAAAAAAAAAAAAAAAAAAAAAAAAAAAAAAAAAAAAAAAAAAAAAAAAFAAAADwAAAAAAAAAAAAAAAAAAAkUAAAAAQAAABQAAAAUAAAAFAAAAAEAAAAAAAAAZAAAAGQAAAAAAAAAZAAAAGQAAAAVAAAAYAAAAAAAAAAAAAAADwAAACADAAAAAAAAAAAAAAEAAACgMgAAVgcAAKr4//8BAAAAf39/AAEAAABkAAAAAAAAABQAAABAHwAAAAAAACYAAAAAAAAAwOD//wAAAAAmAAAAZAAAABYAAABMAAAAAAAAAAAAAAAEAAAAAAAAAAEAAAAsPEMKAAAAACgAAAAoAAAAZAAAAGQAAAAAAAAAzMzMAAAAAABQAAAAUAAAAGQAAABkAAAAAAAAABcAAAAUAAAAAAAAAAAAAAD/fwAA/38AAAAAAAAJAAAABAAAAD0sAAAMAAAAEAAAAAAAAAAAAAAAAAAAAAAAAAAeAAAAaAAAAAAAAAAAAAAAAAAAAAAAAAAAAAAAECcAABAnAAAAAAAAAAAAAAAAAAAAAAAAAAAAAAAAAAAAAAAAAAAAABQAAAAAAAAAwMD/AAAAAABkAAAAMgAAAAAAAABkAAAAAAAAAH9/fwAKAAAAHwAAAFQAAACQwiYF////AQAAAAAAAAAAAAAAAAAAAAAAAAAAAAAAAAAAAAAAAAAAAAAAAn9/fwAsPEMDzMzMAMDA/wB/f38AAAAAAAAAAAAAAAAAAAAAAAAAAAAhAAAAGAAAABQAAADsEQAAzBMAACoaAACBFgAAEAAAACYAAAAIAAAA//////////8="/>
+                <pr:smNativeData xmlns:pr="smNativeData" xmlns:p14="http://schemas.microsoft.com/office/powerpoint/2010/main" xmlns="" val="SMDATA_13_w78LXxMAAAAlAAAAZAAAAA0AAAAAkAAAAJAAAACQAAAAkAAAAAAAAAAAAAAAAAAAAAEAAABQAAAAAAAAAAAA4D8AAAAAAADgPwAAAAAAAOA/AAAAAAAA4D8AAAAAAADgPwAAAAAAAOA/AAAAAAAA4D8AAAAAAADgPwAAAAAAAOA/AAAAAAAA4D8CAAAAjAAAAAAAAAAAAAAAkMImDP///wgAAAAAAAAAAAAAAAAAAAAAAAAAAAAAAAAAAAAAZAAAAAEAAABAAAAAAAAAAAAAAAAAAAAAAAAAAAAAAAAAAAAAAAAAAAAAAAAAAAAAAAAAAAAAAAAAAAAAAAAAAAAAAAAAAAAAAAAAAAAAAAAAAAAAAAAAAAAAAAAAAAAAFAAAADwAAAAAAAAAAAAAAAAAAAkUAAAAAQAAABQAAAAUAAAAFAAAAAEAAAAAAAAAZAAAAGQAAAAAAAAAZAAAAGQAAAAVAAAAYAAAAAAAAAAAAAAADwAAACADAAAAAAAAAAAAAAEAAACgMgAAVgcAAKr4//8BAAAAf39/AAEAAABkAAAAAAAAABQAAABAHwAAAAAAACYAAAAAAAAAwOD//wAAAAAmAAAAZAAAABYAAABMAAAAAAAAAAAAAAAEAAAAAAAAAAEAAAAsPEMKAAAAACgAAAAoAAAAZAAAAGQAAAAAAAAAzMzMAAAAAABQAAAAUAAAAGQAAABkAAAAAAAAABcAAAAUAAAAAAAAAAAAAAD/fwAA/38AAAAAAAAJAAAABAAAAD0sAAAMAAAAEAAAAAAAAAAAAAAAAAAAAAAAAAAeAAAAaAAAAAAAAAAAAAAAAAAAAAAAAAAAAAAAECcAABAnAAAAAAAAAAAAAAAAAAAAAAAAAAAAAAAAAAAAAAAAAAAAABQAAAAAAAAAwMD/AAAAAABkAAAAMgAAAAAAAABkAAAAAAAAAH9/fwAKAAAAHwAAAFQAAACQwiYF////AQAAAAAAAAAAAAAAAAAAAAAAAAAAAAAAAAAAAAAAAAAAAAAAAn9/fwAsPEMDzMzMAMDA/wB/f38AAAAAAAAAAAAAAAAAAAAAAAAAAAAhAAAAGAAAABQAAADsEQAAzBMAACoaAACBFgAAEAAAACYAAAAIAAAA//////////8="/>
               </a:ext>
             </a:extLst>
           </p:cNvSpPr>
@@ -28375,7 +28956,7 @@
           <p:cNvCxnSpPr>
             <a:extLst>
               <a:ext uri="smNativeData">
-                <pr:smNativeData xmlns="" xmlns:p14="http://schemas.microsoft.com/office/powerpoint/2010/main" xmlns:pr="smNativeData" val="SMDATA_13_w78LXxMAAAAlAAAADQAAAA0AAAAAkAAAAEgAAACQAAAASAAAAAAAAAAAAAAAAAAAAAEAAABQAAAAAAAAAAAA8L8AAAAAAAAAAAAAAAAAAPA/AAAAAAAA4D8AAAAAAADgPwAAAAAAAOA/AAAAAAAA4D8AAAAAAADgPwAAAAAAAOA/AAAAAAAA4D8CAAAAjAAAAAAAAAAAAAAAkMImDP///wgAAAAAAAAAAAAAAAAAAAAAAAAAAAAAAAAAAAAAZAAAAAEAAABAAAAAAAAAAAAAAAAAAAAAAAAAAAAAAAAAAAAAAAAAAAAAAAAAAAAAAAAAAAAAAAAAAAAAAAAAAAAAAAAAAAAAAAAAAAAAAAAAAAAAAAAAAAAAAAAAAAAAFAAAADwAAAABAAAAAAAAALRfBgAPAAAAAQAAACMAAAAjAAAAIwAAAB4AAAAAAAAASwAAAEsAAAACAAAAlgAAAJYAAAAVAAAAYAAAAAAAAAAAAAAADwAAACADAAAAAAAAAAAAAAEAAACgMgAAVgcAAKr4//8BAAAAf39/AAEAAABkAAAAAAAAABQAAABAHwAAAAAAACYAAAAAAAAAwOD//wAAAAAmAAAAZAAAABYAAABMAAAAAAAAAAAAAAAEAAAAAAAAAAEAAAAsPEMKAAAAACgAAAAoAAAAZAAAAGQAAAAAAAAAzMzMAAAAAABQAAAAUAAAAGQAAABkAAAAAAAAABcAAAAUAAAAAAAAAAAAAAD/fwAA/38AAAAAAAAJAAAABAAAAAY3AAAMAAAAEAAAAAAAAAAAAAAAAAAAAAAAAAAeAAAAaAAAAAAAAAAAAAAAAAAAAAAAAAAAAAAAECcAABAnAAAAAAAAAAAAAAAAAAAAAAAAAAAAAAAAAAAAAAAAAAAAABQAAAAAAAAAwMD/AAAAAABkAAAAMgAAAAAAAABkAAAAAAAAAH9/fwAKAAAAHwAAAFQAAACQwiYF////AQAAAAAAAAAAAAAAAAAAAAAAAAAAAAAAAAAAAAAAAAAAtF8GAH9/fwAsPEMDzMzMAMDA/wB/f38AAAAAAAAAAAAAAAAAAAAAAAAAAAAhAAAAGAAAABQAAADyFAAAHhEAAAsWAADMEwAAEAAAACYAAAAIAAAA//////////8="/>
+                <pr:smNativeData xmlns:pr="smNativeData" xmlns:p14="http://schemas.microsoft.com/office/powerpoint/2010/main" xmlns="" val="SMDATA_13_w78LXxMAAAAlAAAADQAAAA0AAAAAkAAAAEgAAACQAAAASAAAAAAAAAAAAAAAAAAAAAEAAABQAAAAAAAAAAAA8L8AAAAAAAAAAAAAAAAAAPA/AAAAAAAA4D8AAAAAAADgPwAAAAAAAOA/AAAAAAAA4D8AAAAAAADgPwAAAAAAAOA/AAAAAAAA4D8CAAAAjAAAAAAAAAAAAAAAkMImDP///wgAAAAAAAAAAAAAAAAAAAAAAAAAAAAAAAAAAAAAZAAAAAEAAABAAAAAAAAAAAAAAAAAAAAAAAAAAAAAAAAAAAAAAAAAAAAAAAAAAAAAAAAAAAAAAAAAAAAAAAAAAAAAAAAAAAAAAAAAAAAAAAAAAAAAAAAAAAAAAAAAAAAAFAAAADwAAAABAAAAAAAAALRfBgAPAAAAAQAAACMAAAAjAAAAIwAAAB4AAAAAAAAASwAAAEsAAAACAAAAlgAAAJYAAAAVAAAAYAAAAAAAAAAAAAAADwAAACADAAAAAAAAAAAAAAEAAACgMgAAVgcAAKr4//8BAAAAf39/AAEAAABkAAAAAAAAABQAAABAHwAAAAAAACYAAAAAAAAAwOD//wAAAAAmAAAAZAAAABYAAABMAAAAAAAAAAAAAAAEAAAAAAAAAAEAAAAsPEMKAAAAACgAAAAoAAAAZAAAAGQAAAAAAAAAzMzMAAAAAABQAAAAUAAAAGQAAABkAAAAAAAAABcAAAAUAAAAAAAAAAAAAAD/fwAA/38AAAAAAAAJAAAABAAAAAY3AAAMAAAAEAAAAAAAAAAAAAAAAAAAAAAAAAAeAAAAaAAAAAAAAAAAAAAAAAAAAAAAAAAAAAAAECcAABAnAAAAAAAAAAAAAAAAAAAAAAAAAAAAAAAAAAAAAAAAAAAAABQAAAAAAAAAwMD/AAAAAABkAAAAMgAAAAAAAABkAAAAAAAAAH9/fwAKAAAAHwAAAFQAAACQwiYF////AQAAAAAAAAAAAAAAAAAAAAAAAAAAAAAAAAAAAAAAAAAAtF8GAH9/fwAsPEMDzMzMAMDA/wB/f38AAAAAAAAAAAAAAAAAAAAAAAAAAAAhAAAAGAAAABQAAADyFAAAHhEAAAsWAADMEwAAEAAAACYAAAAIAAAA//////////8="/>
               </a:ext>
             </a:extLst>
           </p:cNvCxnSpPr>
@@ -28413,7 +28994,7 @@
           <p:cNvSpPr>
             <a:extLst>
               <a:ext uri="smNativeData">
-                <pr:smNativeData xmlns="" xmlns:p14="http://schemas.microsoft.com/office/powerpoint/2010/main" xmlns:pr="smNativeData" val="SMDATA_13_w78LXxMAAAAlAAAAZAAAAA0AAAAAkAAAAJAAAACQAAAAkAAAAAAAAAAAAAAAAAAAAAEAAABQAAAAAAAAAAAA4D8AAAAAAADgPwAAAAAAAOA/AAAAAAAA4D8AAAAAAADgPwAAAAAAAOA/AAAAAAAA4D8AAAAAAADgPwAAAAAAAOA/AAAAAAAA4D8CAAAAjAAAAAAAAAAAAAAAkMImDP///wgAAAAAAAAAAAAAAAAAAAAAAAAAAAAAAAAAAAAAZAAAAAEAAABAAAAAAAAAAAAAAAAAAAAAAAAAAAAAAAAAAAAAAAAAAAAAAAAAAAAAAAAAAAAAAAAAAAAAAAAAAAAAAAAAAAAAAAAAAAAAAAAAAAAAAAAAAAAAAAAAAAAAFAAAADwAAAAAAAAAAAAAAAAAAAkUAAAAAQAAABQAAAAUAAAAFAAAAAEAAAAAAAAAZAAAAGQAAAAAAAAAZAAAAGQAAAAVAAAAYAAAAAAAAAAAAAAADwAAACADAAAAAAAAAAAAAAEAAACgMgAAVgcAAKr4//8BAAAAf39/AAEAAABkAAAAAAAAABQAAABAHwAAAAAAACYAAAAAAAAAwOD//wAAAAAmAAAAZAAAABYAAABMAAAAAAAAAAAAAAAEAAAAAAAAAAEAAAAsPEMKAAAAACgAAAAoAAAAZAAAAGQAAAAAAAAAzMzMAAAAAABQAAAAUAAAAGQAAABkAAAAAAAAABcAAAAUAAAAAAAAAAAAAAD/fwAA/38AAAAAAAAJAAAABAAAAD0sAAAMAAAAEAAAAAAAAAAAAAAAAAAAAAAAAAAeAAAAaAAAAAAAAAAAAAAAAAAAAAAAAAAAAAAAECcAABAnAAAAAAAAAAAAAAAAAAAAAAAAAAAAAAAAAAAAAAAAAAAAABQAAAAAAAAAwMD/AAAAAABkAAAAMgAAAAAAAABkAAAAAAAAAH9/fwAKAAAAHwAAAFQAAACQwiYF////AQAAAAAAAAAAAAAAAAAAAAAAAAAAAAAAAAAAAAAAAAAAAAAAAn9/fwAsPEMDzMzMAMDA/wB/f38AAAAAAAAAAAAAAAAAAAAAAAAAAAAhAAAAGAAAABQAAADsEQAAzBMAACoaAACBFgAAEAAAACYAAAAIAAAA//////////8="/>
+                <pr:smNativeData xmlns:pr="smNativeData" xmlns:p14="http://schemas.microsoft.com/office/powerpoint/2010/main" xmlns="" val="SMDATA_13_w78LXxMAAAAlAAAAZAAAAA0AAAAAkAAAAJAAAACQAAAAkAAAAAAAAAAAAAAAAAAAAAEAAABQAAAAAAAAAAAA4D8AAAAAAADgPwAAAAAAAOA/AAAAAAAA4D8AAAAAAADgPwAAAAAAAOA/AAAAAAAA4D8AAAAAAADgPwAAAAAAAOA/AAAAAAAA4D8CAAAAjAAAAAAAAAAAAAAAkMImDP///wgAAAAAAAAAAAAAAAAAAAAAAAAAAAAAAAAAAAAAZAAAAAEAAABAAAAAAAAAAAAAAAAAAAAAAAAAAAAAAAAAAAAAAAAAAAAAAAAAAAAAAAAAAAAAAAAAAAAAAAAAAAAAAAAAAAAAAAAAAAAAAAAAAAAAAAAAAAAAAAAAAAAAFAAAADwAAAAAAAAAAAAAAAAAAAkUAAAAAQAAABQAAAAUAAAAFAAAAAEAAAAAAAAAZAAAAGQAAAAAAAAAZAAAAGQAAAAVAAAAYAAAAAAAAAAAAAAADwAAACADAAAAAAAAAAAAAAEAAACgMgAAVgcAAKr4//8BAAAAf39/AAEAAABkAAAAAAAAABQAAABAHwAAAAAAACYAAAAAAAAAwOD//wAAAAAmAAAAZAAAABYAAABMAAAAAAAAAAAAAAAEAAAAAAAAAAEAAAAsPEMKAAAAACgAAAAoAAAAZAAAAGQAAAAAAAAAzMzMAAAAAABQAAAAUAAAAGQAAABkAAAAAAAAABcAAAAUAAAAAAAAAAAAAAD/fwAA/38AAAAAAAAJAAAABAAAAD0sAAAMAAAAEAAAAAAAAAAAAAAAAAAAAAAAAAAeAAAAaAAAAAAAAAAAAAAAAAAAAAAAAAAAAAAAECcAABAnAAAAAAAAAAAAAAAAAAAAAAAAAAAAAAAAAAAAAAAAAAAAABQAAAAAAAAAwMD/AAAAAABkAAAAMgAAAAAAAABkAAAAAAAAAH9/fwAKAAAAHwAAAFQAAACQwiYF////AQAAAAAAAAAAAAAAAAAAAAAAAAAAAAAAAAAAAAAAAAAAAAAAAn9/fwAsPEMDzMzMAMDA/wB/f38AAAAAAAAAAAAAAAAAAAAAAAAAAAAhAAAAGAAAABQAAADsEQAAzBMAACoaAACBFgAAEAAAACYAAAAIAAAA//////////8="/>
               </a:ext>
             </a:extLst>
           </p:cNvSpPr>
@@ -28494,7 +29075,7 @@
             <a:cxnSpLocks/>
             <a:extLst>
               <a:ext uri="smNativeData">
-                <pr:smNativeData xmlns="" xmlns:p14="http://schemas.microsoft.com/office/powerpoint/2010/main" xmlns:pr="smNativeData" val="SMDATA_13_w78LXxMAAAAlAAAADQAAAA0AAAAAkAAAAEgAAACQAAAASAAAAAAAAAAAAAAAAAAAAAEAAABQAAAAAAAAAAAA8L8AAAAAAAAAAAAAAAAAAPA/AAAAAAAA4D8AAAAAAADgPwAAAAAAAOA/AAAAAAAA4D8AAAAAAADgPwAAAAAAAOA/AAAAAAAA4D8CAAAAjAAAAAAAAAAAAAAAkMImDP///wgAAAAAAAAAAAAAAAAAAAAAAAAAAAAAAAAAAAAAZAAAAAEAAABAAAAAAAAAAAAAAAAAAAAAAAAAAAAAAAAAAAAAAAAAAAAAAAAAAAAAAAAAAAAAAAAAAAAAAAAAAAAAAAAAAAAAAAAAAAAAAAAAAAAAAAAAAAAAAAAAAAAAFAAAADwAAAABAAAAAAAAALRfBgAPAAAAAQAAACMAAAAjAAAAIwAAAB4AAAAAAAAASwAAAEsAAAACAAAAlgAAAJYAAAAVAAAAYAAAAAAAAAAAAAAADwAAACADAAAAAAAAAAAAAAEAAACgMgAAVgcAAKr4//8BAAAAf39/AAEAAABkAAAAAAAAABQAAABAHwAAAAAAACYAAAAAAAAAwOD//wAAAAAmAAAAZAAAABYAAABMAAAAAAAAAAAAAAAEAAAAAAAAAAEAAAAsPEMKAAAAACgAAAAoAAAAZAAAAGQAAAAAAAAAzMzMAAAAAABQAAAAUAAAAGQAAABkAAAAAAAAABcAAAAUAAAAAAAAAAAAAAD/fwAA/38AAAAAAAAJAAAABAAAAAY3AAAMAAAAEAAAAAAAAAAAAAAAAAAAAAAAAAAeAAAAaAAAAAAAAAAAAAAAAAAAAAAAAAAAAAAAECcAABAnAAAAAAAAAAAAAAAAAAAAAAAAAAAAAAAAAAAAAAAAAAAAABQAAAAAAAAAwMD/AAAAAABkAAAAMgAAAAAAAABkAAAAAAAAAH9/fwAKAAAAHwAAAFQAAACQwiYF////AQAAAAAAAAAAAAAAAAAAAAAAAAAAAAAAAAAAAAAAAAAAtF8GAH9/fwAsPEMDzMzMAMDA/wB/f38AAAAAAAAAAAAAAAAAAAAAAAAAAAAhAAAAGAAAABQAAADyFAAAHhEAAAsWAADMEwAAEAAAACYAAAAIAAAA//////////8="/>
+                <pr:smNativeData xmlns:pr="smNativeData" xmlns:p14="http://schemas.microsoft.com/office/powerpoint/2010/main" xmlns="" val="SMDATA_13_w78LXxMAAAAlAAAADQAAAA0AAAAAkAAAAEgAAACQAAAASAAAAAAAAAAAAAAAAAAAAAEAAABQAAAAAAAAAAAA8L8AAAAAAAAAAAAAAAAAAPA/AAAAAAAA4D8AAAAAAADgPwAAAAAAAOA/AAAAAAAA4D8AAAAAAADgPwAAAAAAAOA/AAAAAAAA4D8CAAAAjAAAAAAAAAAAAAAAkMImDP///wgAAAAAAAAAAAAAAAAAAAAAAAAAAAAAAAAAAAAAZAAAAAEAAABAAAAAAAAAAAAAAAAAAAAAAAAAAAAAAAAAAAAAAAAAAAAAAAAAAAAAAAAAAAAAAAAAAAAAAAAAAAAAAAAAAAAAAAAAAAAAAAAAAAAAAAAAAAAAAAAAAAAAFAAAADwAAAABAAAAAAAAALRfBgAPAAAAAQAAACMAAAAjAAAAIwAAAB4AAAAAAAAASwAAAEsAAAACAAAAlgAAAJYAAAAVAAAAYAAAAAAAAAAAAAAADwAAACADAAAAAAAAAAAAAAEAAACgMgAAVgcAAKr4//8BAAAAf39/AAEAAABkAAAAAAAAABQAAABAHwAAAAAAACYAAAAAAAAAwOD//wAAAAAmAAAAZAAAABYAAABMAAAAAAAAAAAAAAAEAAAAAAAAAAEAAAAsPEMKAAAAACgAAAAoAAAAZAAAAGQAAAAAAAAAzMzMAAAAAABQAAAAUAAAAGQAAABkAAAAAAAAABcAAAAUAAAAAAAAAAAAAAD/fwAA/38AAAAAAAAJAAAABAAAAAY3AAAMAAAAEAAAAAAAAAAAAAAAAAAAAAAAAAAeAAAAaAAAAAAAAAAAAAAAAAAAAAAAAAAAAAAAECcAABAnAAAAAAAAAAAAAAAAAAAAAAAAAAAAAAAAAAAAAAAAAAAAABQAAAAAAAAAwMD/AAAAAABkAAAAMgAAAAAAAABkAAAAAAAAAH9/fwAKAAAAHwAAAFQAAACQwiYF////AQAAAAAAAAAAAAAAAAAAAAAAAAAAAAAAAAAAAAAAAAAAtF8GAH9/fwAsPEMDzMzMAMDA/wB/f38AAAAAAAAAAAAAAAAAAAAAAAAAAAAhAAAAGAAAABQAAADyFAAAHhEAAAsWAADMEwAAEAAAACYAAAAIAAAA//////////8="/>
               </a:ext>
             </a:extLst>
           </p:cNvCxnSpPr>
@@ -28533,7 +29114,7 @@
             <a:cxnSpLocks/>
             <a:extLst>
               <a:ext uri="smNativeData">
-                <pr:smNativeData xmlns="" xmlns:p14="http://schemas.microsoft.com/office/powerpoint/2010/main" xmlns:pr="smNativeData" val="SMDATA_13_w78LXxMAAAAlAAAADQAAAA0AAAAAkAAAAEgAAACQAAAASAAAAAAAAAAAAAAAAAAAAAEAAABQAAAAAAAAAAAA8L8AAAAAAAAAAAAAAAAAAPA/AAAAAAAA4D8AAAAAAADgPwAAAAAAAOA/AAAAAAAA4D8AAAAAAADgPwAAAAAAAOA/AAAAAAAA4D8CAAAAjAAAAAAAAAAAAAAAkMImDP///wgAAAAAAAAAAAAAAAAAAAAAAAAAAAAAAAAAAAAAZAAAAAEAAABAAAAAAAAAAAAAAAAAAAAAAAAAAAAAAAAAAAAAAAAAAAAAAAAAAAAAAAAAAAAAAAAAAAAAAAAAAAAAAAAAAAAAAAAAAAAAAAAAAAAAAAAAAAAAAAAAAAAAFAAAADwAAAABAAAAAAAAALRfBgAPAAAAAQAAACMAAAAjAAAAIwAAAB4AAAAAAAAASwAAAEsAAAACAAAAlgAAAJYAAAAVAAAAYAAAAAAAAAAAAAAADwAAACADAAAAAAAAAAAAAAEAAACgMgAAVgcAAKr4//8BAAAAf39/AAEAAABkAAAAAAAAABQAAABAHwAAAAAAACYAAAAAAAAAwOD//wAAAAAmAAAAZAAAABYAAABMAAAAAAAAAAAAAAAEAAAAAAAAAAEAAAAsPEMKAAAAACgAAAAoAAAAZAAAAGQAAAAAAAAAzMzMAAAAAABQAAAAUAAAAGQAAABkAAAAAAAAABcAAAAUAAAAAAAAAAAAAAD/fwAA/38AAAAAAAAJAAAABAAAAAY3AAAMAAAAEAAAAAAAAAAAAAAAAAAAAAAAAAAeAAAAaAAAAAAAAAAAAAAAAAAAAAAAAAAAAAAAECcAABAnAAAAAAAAAAAAAAAAAAAAAAAAAAAAAAAAAAAAAAAAAAAAABQAAAAAAAAAwMD/AAAAAABkAAAAMgAAAAAAAABkAAAAAAAAAH9/fwAKAAAAHwAAAFQAAACQwiYF////AQAAAAAAAAAAAAAAAAAAAAAAAAAAAAAAAAAAAAAAAAAAtF8GAH9/fwAsPEMDzMzMAMDA/wB/f38AAAAAAAAAAAAAAAAAAAAAAAAAAAAhAAAAGAAAABQAAADyFAAAHhEAAAsWAADMEwAAEAAAACYAAAAIAAAA//////////8="/>
+                <pr:smNativeData xmlns:pr="smNativeData" xmlns:p14="http://schemas.microsoft.com/office/powerpoint/2010/main" xmlns="" val="SMDATA_13_w78LXxMAAAAlAAAADQAAAA0AAAAAkAAAAEgAAACQAAAASAAAAAAAAAAAAAAAAAAAAAEAAABQAAAAAAAAAAAA8L8AAAAAAAAAAAAAAAAAAPA/AAAAAAAA4D8AAAAAAADgPwAAAAAAAOA/AAAAAAAA4D8AAAAAAADgPwAAAAAAAOA/AAAAAAAA4D8CAAAAjAAAAAAAAAAAAAAAkMImDP///wgAAAAAAAAAAAAAAAAAAAAAAAAAAAAAAAAAAAAAZAAAAAEAAABAAAAAAAAAAAAAAAAAAAAAAAAAAAAAAAAAAAAAAAAAAAAAAAAAAAAAAAAAAAAAAAAAAAAAAAAAAAAAAAAAAAAAAAAAAAAAAAAAAAAAAAAAAAAAAAAAAAAAFAAAADwAAAABAAAAAAAAALRfBgAPAAAAAQAAACMAAAAjAAAAIwAAAB4AAAAAAAAASwAAAEsAAAACAAAAlgAAAJYAAAAVAAAAYAAAAAAAAAAAAAAADwAAACADAAAAAAAAAAAAAAEAAACgMgAAVgcAAKr4//8BAAAAf39/AAEAAABkAAAAAAAAABQAAABAHwAAAAAAACYAAAAAAAAAwOD//wAAAAAmAAAAZAAAABYAAABMAAAAAAAAAAAAAAAEAAAAAAAAAAEAAAAsPEMKAAAAACgAAAAoAAAAZAAAAGQAAAAAAAAAzMzMAAAAAABQAAAAUAAAAGQAAABkAAAAAAAAABcAAAAUAAAAAAAAAAAAAAD/fwAA/38AAAAAAAAJAAAABAAAAAY3AAAMAAAAEAAAAAAAAAAAAAAAAAAAAAAAAAAeAAAAaAAAAAAAAAAAAAAAAAAAAAAAAAAAAAAAECcAABAnAAAAAAAAAAAAAAAAAAAAAAAAAAAAAAAAAAAAAAAAAAAAABQAAAAAAAAAwMD/AAAAAABkAAAAMgAAAAAAAABkAAAAAAAAAH9/fwAKAAAAHwAAAFQAAACQwiYF////AQAAAAAAAAAAAAAAAAAAAAAAAAAAAAAAAAAAAAAAAAAAtF8GAH9/fwAsPEMDzMzMAMDA/wB/f38AAAAAAAAAAAAAAAAAAAAAAAAAAAAhAAAAGAAAABQAAADyFAAAHhEAAAsWAADMEwAAEAAAACYAAAAIAAAA//////////8="/>
               </a:ext>
             </a:extLst>
           </p:cNvCxnSpPr>
@@ -28572,7 +29153,7 @@
             <a:cxnSpLocks/>
             <a:extLst>
               <a:ext uri="smNativeData">
-                <pr:smNativeData xmlns="" xmlns:p14="http://schemas.microsoft.com/office/powerpoint/2010/main" xmlns:pr="smNativeData" val="SMDATA_13_w78LXxMAAAAlAAAADQAAAA0AAAAAkAAAAEgAAACQAAAASAAAAAAAAAAAAAAAAAAAAAEAAABQAAAAAAAAAAAA8L8AAAAAAAAAAAAAAAAAAPA/AAAAAAAA4D8AAAAAAADgPwAAAAAAAOA/AAAAAAAA4D8AAAAAAADgPwAAAAAAAOA/AAAAAAAA4D8CAAAAjAAAAAAAAAAAAAAAkMImDP///wgAAAAAAAAAAAAAAAAAAAAAAAAAAAAAAAAAAAAAZAAAAAEAAABAAAAAAAAAAAAAAAAAAAAAAAAAAAAAAAAAAAAAAAAAAAAAAAAAAAAAAAAAAAAAAAAAAAAAAAAAAAAAAAAAAAAAAAAAAAAAAAAAAAAAAAAAAAAAAAAAAAAAFAAAADwAAAABAAAAAAAAALRfBgAPAAAAAQAAACMAAAAjAAAAIwAAAB4AAAAAAAAASwAAAEsAAAACAAAAlgAAAJYAAAAVAAAAYAAAAAAAAAAAAAAADwAAACADAAAAAAAAAAAAAAEAAACgMgAAVgcAAKr4//8BAAAAf39/AAEAAABkAAAAAAAAABQAAABAHwAAAAAAACYAAAAAAAAAwOD//wAAAAAmAAAAZAAAABYAAABMAAAAAAAAAAAAAAAEAAAAAAAAAAEAAAAsPEMKAAAAACgAAAAoAAAAZAAAAGQAAAAAAAAAzMzMAAAAAABQAAAAUAAAAGQAAABkAAAAAAAAABcAAAAUAAAAAAAAAAAAAAD/fwAA/38AAAAAAAAJAAAABAAAAAY3AAAMAAAAEAAAAAAAAAAAAAAAAAAAAAAAAAAeAAAAaAAAAAAAAAAAAAAAAAAAAAAAAAAAAAAAECcAABAnAAAAAAAAAAAAAAAAAAAAAAAAAAAAAAAAAAAAAAAAAAAAABQAAAAAAAAAwMD/AAAAAABkAAAAMgAAAAAAAABkAAAAAAAAAH9/fwAKAAAAHwAAAFQAAACQwiYF////AQAAAAAAAAAAAAAAAAAAAAAAAAAAAAAAAAAAAAAAAAAAtF8GAH9/fwAsPEMDzMzMAMDA/wB/f38AAAAAAAAAAAAAAAAAAAAAAAAAAAAhAAAAGAAAABQAAADyFAAAHhEAAAsWAADMEwAAEAAAACYAAAAIAAAA//////////8="/>
+                <pr:smNativeData xmlns:pr="smNativeData" xmlns:p14="http://schemas.microsoft.com/office/powerpoint/2010/main" xmlns="" val="SMDATA_13_w78LXxMAAAAlAAAADQAAAA0AAAAAkAAAAEgAAACQAAAASAAAAAAAAAAAAAAAAAAAAAEAAABQAAAAAAAAAAAA8L8AAAAAAAAAAAAAAAAAAPA/AAAAAAAA4D8AAAAAAADgPwAAAAAAAOA/AAAAAAAA4D8AAAAAAADgPwAAAAAAAOA/AAAAAAAA4D8CAAAAjAAAAAAAAAAAAAAAkMImDP///wgAAAAAAAAAAAAAAAAAAAAAAAAAAAAAAAAAAAAAZAAAAAEAAABAAAAAAAAAAAAAAAAAAAAAAAAAAAAAAAAAAAAAAAAAAAAAAAAAAAAAAAAAAAAAAAAAAAAAAAAAAAAAAAAAAAAAAAAAAAAAAAAAAAAAAAAAAAAAAAAAAAAAFAAAADwAAAABAAAAAAAAALRfBgAPAAAAAQAAACMAAAAjAAAAIwAAAB4AAAAAAAAASwAAAEsAAAACAAAAlgAAAJYAAAAVAAAAYAAAAAAAAAAAAAAADwAAACADAAAAAAAAAAAAAAEAAACgMgAAVgcAAKr4//8BAAAAf39/AAEAAABkAAAAAAAAABQAAABAHwAAAAAAACYAAAAAAAAAwOD//wAAAAAmAAAAZAAAABYAAABMAAAAAAAAAAAAAAAEAAAAAAAAAAEAAAAsPEMKAAAAACgAAAAoAAAAZAAAAGQAAAAAAAAAzMzMAAAAAABQAAAAUAAAAGQAAABkAAAAAAAAABcAAAAUAAAAAAAAAAAAAAD/fwAA/38AAAAAAAAJAAAABAAAAAY3AAAMAAAAEAAAAAAAAAAAAAAAAAAAAAAAAAAeAAAAaAAAAAAAAAAAAAAAAAAAAAAAAAAAAAAAECcAABAnAAAAAAAAAAAAAAAAAAAAAAAAAAAAAAAAAAAAAAAAAAAAABQAAAAAAAAAwMD/AAAAAABkAAAAMgAAAAAAAABkAAAAAAAAAH9/fwAKAAAAHwAAAFQAAACQwiYF////AQAAAAAAAAAAAAAAAAAAAAAAAAAAAAAAAAAAAAAAAAAAtF8GAH9/fwAsPEMDzMzMAMDA/wB/f38AAAAAAAAAAAAAAAAAAAAAAAAAAAAhAAAAGAAAABQAAADyFAAAHhEAAAsWAADMEwAAEAAAACYAAAAIAAAA//////////8="/>
               </a:ext>
             </a:extLst>
           </p:cNvCxnSpPr>
@@ -28610,7 +29191,7 @@
           <p:cNvSpPr>
             <a:extLst>
               <a:ext uri="smNativeData">
-                <pr:smNativeData xmlns="" xmlns:p14="http://schemas.microsoft.com/office/powerpoint/2010/main" xmlns:pr="smNativeData" val="SMDATA_13_w78LXxMAAAAlAAAAZAAAAA0AAAAAkAAAAJAAAACQAAAAkAAAAAAAAAAAAAAAAAAAAAEAAABQAAAAAAAAAAAA4D8AAAAAAADgPwAAAAAAAOA/AAAAAAAA4D8AAAAAAADgPwAAAAAAAOA/AAAAAAAA4D8AAAAAAADgPwAAAAAAAOA/AAAAAAAA4D8CAAAAjAAAAAAAAAAAAAAAkMImDP///wgAAAAAAAAAAAAAAAAAAAAAAAAAAAAAAAAAAAAAZAAAAAEAAABAAAAAAAAAAAAAAAAAAAAAAAAAAAAAAAAAAAAAAAAAAAAAAAAAAAAAAAAAAAAAAAAAAAAAAAAAAAAAAAAAAAAAAAAAAAAAAAAAAAAAAAAAAAAAAAAAAAAAFAAAADwAAAAAAAAAAAAAAAAAAAkUAAAAAQAAABQAAAAUAAAAFAAAAAEAAAAAAAAAZAAAAGQAAAAAAAAAZAAAAGQAAAAVAAAAYAAAAAAAAAAAAAAADwAAACADAAAAAAAAAAAAAAEAAACgMgAAVgcAAKr4//8BAAAAf39/AAEAAABkAAAAAAAAABQAAABAHwAAAAAAACYAAAAAAAAAwOD//wAAAAAmAAAAZAAAABYAAABMAAAAAAAAAAAAAAAEAAAAAAAAAAEAAAAsPEMKAAAAACgAAAAoAAAAZAAAAGQAAAAAAAAAzMzMAAAAAABQAAAAUAAAAGQAAABkAAAAAAAAABcAAAAUAAAAAAAAAAAAAAD/fwAA/38AAAAAAAAJAAAABAAAAD0sAAAMAAAAEAAAAAAAAAAAAAAAAAAAAAAAAAAeAAAAaAAAAAAAAAAAAAAAAAAAAAAAAAAAAAAAECcAABAnAAAAAAAAAAAAAAAAAAAAAAAAAAAAAAAAAAAAAAAAAAAAABQAAAAAAAAAwMD/AAAAAABkAAAAMgAAAAAAAABkAAAAAAAAAH9/fwAKAAAAHwAAAFQAAACQwiYF////AQAAAAAAAAAAAAAAAAAAAAAAAAAAAAAAAAAAAAAAAAAAAAAAAn9/fwAsPEMDzMzMAMDA/wB/f38AAAAAAAAAAAAAAAAAAAAAAAAAAAAhAAAAGAAAABQAAADsEQAAzBMAACoaAACBFgAAEAAAACYAAAAIAAAA//////////8="/>
+                <pr:smNativeData xmlns:pr="smNativeData" xmlns:p14="http://schemas.microsoft.com/office/powerpoint/2010/main" xmlns="" val="SMDATA_13_w78LXxMAAAAlAAAAZAAAAA0AAAAAkAAAAJAAAACQAAAAkAAAAAAAAAAAAAAAAAAAAAEAAABQAAAAAAAAAAAA4D8AAAAAAADgPwAAAAAAAOA/AAAAAAAA4D8AAAAAAADgPwAAAAAAAOA/AAAAAAAA4D8AAAAAAADgPwAAAAAAAOA/AAAAAAAA4D8CAAAAjAAAAAAAAAAAAAAAkMImDP///wgAAAAAAAAAAAAAAAAAAAAAAAAAAAAAAAAAAAAAZAAAAAEAAABAAAAAAAAAAAAAAAAAAAAAAAAAAAAAAAAAAAAAAAAAAAAAAAAAAAAAAAAAAAAAAAAAAAAAAAAAAAAAAAAAAAAAAAAAAAAAAAAAAAAAAAAAAAAAAAAAAAAAFAAAADwAAAAAAAAAAAAAAAAAAAkUAAAAAQAAABQAAAAUAAAAFAAAAAEAAAAAAAAAZAAAAGQAAAAAAAAAZAAAAGQAAAAVAAAAYAAAAAAAAAAAAAAADwAAACADAAAAAAAAAAAAAAEAAACgMgAAVgcAAKr4//8BAAAAf39/AAEAAABkAAAAAAAAABQAAABAHwAAAAAAACYAAAAAAAAAwOD//wAAAAAmAAAAZAAAABYAAABMAAAAAAAAAAAAAAAEAAAAAAAAAAEAAAAsPEMKAAAAACgAAAAoAAAAZAAAAGQAAAAAAAAAzMzMAAAAAABQAAAAUAAAAGQAAABkAAAAAAAAABcAAAAUAAAAAAAAAAAAAAD/fwAA/38AAAAAAAAJAAAABAAAAD0sAAAMAAAAEAAAAAAAAAAAAAAAAAAAAAAAAAAeAAAAaAAAAAAAAAAAAAAAAAAAAAAAAAAAAAAAECcAABAnAAAAAAAAAAAAAAAAAAAAAAAAAAAAAAAAAAAAAAAAAAAAABQAAAAAAAAAwMD/AAAAAABkAAAAMgAAAAAAAABkAAAAAAAAAH9/fwAKAAAAHwAAAFQAAACQwiYF////AQAAAAAAAAAAAAAAAAAAAAAAAAAAAAAAAAAAAAAAAAAAAAAAAn9/fwAsPEMDzMzMAMDA/wB/f38AAAAAAAAAAAAAAAAAAAAAAAAAAAAhAAAAGAAAABQAAADsEQAAzBMAACoaAACBFgAAEAAAACYAAAAIAAAA//////////8="/>
               </a:ext>
             </a:extLst>
           </p:cNvSpPr>
@@ -28674,7 +29255,7 @@
           <p:cNvCxnSpPr>
             <a:extLst>
               <a:ext uri="smNativeData">
-                <pr:smNativeData xmlns="" xmlns:p14="http://schemas.microsoft.com/office/powerpoint/2010/main" xmlns:pr="smNativeData" val="SMDATA_13_w78LXxMAAAAlAAAADQAAAA0AAAAAkAAAAEgAAACQAAAASAAAAAAAAAAAAAAAAAAAAAEAAABQAAAAAAAAAAAA8L8AAAAAAAAAAAAAAAAAAPA/AAAAAAAA4D8AAAAAAADgPwAAAAAAAOA/AAAAAAAA4D8AAAAAAADgPwAAAAAAAOA/AAAAAAAA4D8CAAAAjAAAAAAAAAAAAAAAkMImDP///wgAAAAAAAAAAAAAAAAAAAAAAAAAAAAAAAAAAAAAZAAAAAEAAABAAAAAAAAAAAAAAAAAAAAAAAAAAAAAAAAAAAAAAAAAAAAAAAAAAAAAAAAAAAAAAAAAAAAAAAAAAAAAAAAAAAAAAAAAAAAAAAAAAAAAAAAAAAAAAAAAAAAAFAAAADwAAAABAAAAAAAAALRfBgAPAAAAAQAAACMAAAAjAAAAIwAAAB4AAAAAAAAASwAAAEsAAAACAAAAlgAAAJYAAAAVAAAAYAAAAAAAAAAAAAAADwAAACADAAAAAAAAAAAAAAEAAACgMgAAVgcAAKr4//8BAAAAf39/AAEAAABkAAAAAAAAABQAAABAHwAAAAAAACYAAAAAAAAAwOD//wAAAAAmAAAAZAAAABYAAABMAAAAAAAAAAAAAAAEAAAAAAAAAAEAAAAsPEMKAAAAACgAAAAoAAAAZAAAAGQAAAAAAAAAzMzMAAAAAABQAAAAUAAAAGQAAABkAAAAAAAAABcAAAAUAAAAAAAAAAAAAAD/fwAA/38AAAAAAAAJAAAABAAAAAY3AAAMAAAAEAAAAAAAAAAAAAAAAAAAAAAAAAAeAAAAaAAAAAAAAAAAAAAAAAAAAAAAAAAAAAAAECcAABAnAAAAAAAAAAAAAAAAAAAAAAAAAAAAAAAAAAAAAAAAAAAAABQAAAAAAAAAwMD/AAAAAABkAAAAMgAAAAAAAABkAAAAAAAAAH9/fwAKAAAAHwAAAFQAAACQwiYF////AQAAAAAAAAAAAAAAAAAAAAAAAAAAAAAAAAAAAAAAAAAAtF8GAH9/fwAsPEMDzMzMAMDA/wB/f38AAAAAAAAAAAAAAAAAAAAAAAAAAAAhAAAAGAAAABQAAADyFAAAHhEAAAsWAADMEwAAEAAAACYAAAAIAAAA//////////8="/>
+                <pr:smNativeData xmlns:pr="smNativeData" xmlns:p14="http://schemas.microsoft.com/office/powerpoint/2010/main" xmlns="" val="SMDATA_13_w78LXxMAAAAlAAAADQAAAA0AAAAAkAAAAEgAAACQAAAASAAAAAAAAAAAAAAAAAAAAAEAAABQAAAAAAAAAAAA8L8AAAAAAAAAAAAAAAAAAPA/AAAAAAAA4D8AAAAAAADgPwAAAAAAAOA/AAAAAAAA4D8AAAAAAADgPwAAAAAAAOA/AAAAAAAA4D8CAAAAjAAAAAAAAAAAAAAAkMImDP///wgAAAAAAAAAAAAAAAAAAAAAAAAAAAAAAAAAAAAAZAAAAAEAAABAAAAAAAAAAAAAAAAAAAAAAAAAAAAAAAAAAAAAAAAAAAAAAAAAAAAAAAAAAAAAAAAAAAAAAAAAAAAAAAAAAAAAAAAAAAAAAAAAAAAAAAAAAAAAAAAAAAAAFAAAADwAAAABAAAAAAAAALRfBgAPAAAAAQAAACMAAAAjAAAAIwAAAB4AAAAAAAAASwAAAEsAAAACAAAAlgAAAJYAAAAVAAAAYAAAAAAAAAAAAAAADwAAACADAAAAAAAAAAAAAAEAAACgMgAAVgcAAKr4//8BAAAAf39/AAEAAABkAAAAAAAAABQAAABAHwAAAAAAACYAAAAAAAAAwOD//wAAAAAmAAAAZAAAABYAAABMAAAAAAAAAAAAAAAEAAAAAAAAAAEAAAAsPEMKAAAAACgAAAAoAAAAZAAAAGQAAAAAAAAAzMzMAAAAAABQAAAAUAAAAGQAAABkAAAAAAAAABcAAAAUAAAAAAAAAAAAAAD/fwAA/38AAAAAAAAJAAAABAAAAAY3AAAMAAAAEAAAAAAAAAAAAAAAAAAAAAAAAAAeAAAAaAAAAAAAAAAAAAAAAAAAAAAAAAAAAAAAECcAABAnAAAAAAAAAAAAAAAAAAAAAAAAAAAAAAAAAAAAAAAAAAAAABQAAAAAAAAAwMD/AAAAAABkAAAAMgAAAAAAAABkAAAAAAAAAH9/fwAKAAAAHwAAAFQAAACQwiYF////AQAAAAAAAAAAAAAAAAAAAAAAAAAAAAAAAAAAAAAAAAAAtF8GAH9/fwAsPEMDzMzMAMDA/wB/f38AAAAAAAAAAAAAAAAAAAAAAAAAAAAhAAAAGAAAABQAAADyFAAAHhEAAAsWAADMEwAAEAAAACYAAAAIAAAA//////////8="/>
               </a:ext>
             </a:extLst>
           </p:cNvCxnSpPr>
@@ -28712,7 +29293,7 @@
           <p:cNvSpPr>
             <a:extLst>
               <a:ext uri="smNativeData">
-                <pr:smNativeData xmlns="" xmlns:p14="http://schemas.microsoft.com/office/powerpoint/2010/main" xmlns:pr="smNativeData" val="SMDATA_13_w78LXxMAAAAlAAAAZAAAAA0AAAAAkAAAAJAAAACQAAAAkAAAAAAAAAAAAAAAAAAAAAEAAABQAAAAAAAAAAAA4D8AAAAAAADgPwAAAAAAAOA/AAAAAAAA4D8AAAAAAADgPwAAAAAAAOA/AAAAAAAA4D8AAAAAAADgPwAAAAAAAOA/AAAAAAAA4D8CAAAAjAAAAAAAAAAAAAAAkMImDP///wgAAAAAAAAAAAAAAAAAAAAAAAAAAAAAAAAAAAAAZAAAAAEAAABAAAAAAAAAAAAAAAAAAAAAAAAAAAAAAAAAAAAAAAAAAAAAAAAAAAAAAAAAAAAAAAAAAAAAAAAAAAAAAAAAAAAAAAAAAAAAAAAAAAAAAAAAAAAAAAAAAAAAFAAAADwAAAAAAAAAAAAAAAAAAAkUAAAAAQAAABQAAAAUAAAAFAAAAAEAAAAAAAAAZAAAAGQAAAAAAAAAZAAAAGQAAAAVAAAAYAAAAAAAAAAAAAAADwAAACADAAAAAAAAAAAAAAEAAACgMgAAVgcAAKr4//8BAAAAf39/AAEAAABkAAAAAAAAABQAAABAHwAAAAAAACYAAAAAAAAAwOD//wAAAAAmAAAAZAAAABYAAABMAAAAAAAAAAAAAAAEAAAAAAAAAAEAAAAsPEMKAAAAACgAAAAoAAAAZAAAAGQAAAAAAAAAzMzMAAAAAABQAAAAUAAAAGQAAABkAAAAAAAAABcAAAAUAAAAAAAAAAAAAAD/fwAA/38AAAAAAAAJAAAABAAAAD0sAAAMAAAAEAAAAAAAAAAAAAAAAAAAAAAAAAAeAAAAaAAAAAAAAAAAAAAAAAAAAAAAAAAAAAAAECcAABAnAAAAAAAAAAAAAAAAAAAAAAAAAAAAAAAAAAAAAAAAAAAAABQAAAAAAAAAwMD/AAAAAABkAAAAMgAAAAAAAABkAAAAAAAAAH9/fwAKAAAAHwAAAFQAAACQwiYF////AQAAAAAAAAAAAAAAAAAAAAAAAAAAAAAAAAAAAAAAAAAAAAAAAn9/fwAsPEMDzMzMAMDA/wB/f38AAAAAAAAAAAAAAAAAAAAAAAAAAAAhAAAAGAAAABQAAADsEQAAzBMAACoaAACBFgAAEAAAACYAAAAIAAAA//////////8="/>
+                <pr:smNativeData xmlns:pr="smNativeData" xmlns:p14="http://schemas.microsoft.com/office/powerpoint/2010/main" xmlns="" val="SMDATA_13_w78LXxMAAAAlAAAAZAAAAA0AAAAAkAAAAJAAAACQAAAAkAAAAAAAAAAAAAAAAAAAAAEAAABQAAAAAAAAAAAA4D8AAAAAAADgPwAAAAAAAOA/AAAAAAAA4D8AAAAAAADgPwAAAAAAAOA/AAAAAAAA4D8AAAAAAADgPwAAAAAAAOA/AAAAAAAA4D8CAAAAjAAAAAAAAAAAAAAAkMImDP///wgAAAAAAAAAAAAAAAAAAAAAAAAAAAAAAAAAAAAAZAAAAAEAAABAAAAAAAAAAAAAAAAAAAAAAAAAAAAAAAAAAAAAAAAAAAAAAAAAAAAAAAAAAAAAAAAAAAAAAAAAAAAAAAAAAAAAAAAAAAAAAAAAAAAAAAAAAAAAAAAAAAAAFAAAADwAAAAAAAAAAAAAAAAAAAkUAAAAAQAAABQAAAAUAAAAFAAAAAEAAAAAAAAAZAAAAGQAAAAAAAAAZAAAAGQAAAAVAAAAYAAAAAAAAAAAAAAADwAAACADAAAAAAAAAAAAAAEAAACgMgAAVgcAAKr4//8BAAAAf39/AAEAAABkAAAAAAAAABQAAABAHwAAAAAAACYAAAAAAAAAwOD//wAAAAAmAAAAZAAAABYAAABMAAAAAAAAAAAAAAAEAAAAAAAAAAEAAAAsPEMKAAAAACgAAAAoAAAAZAAAAGQAAAAAAAAAzMzMAAAAAABQAAAAUAAAAGQAAABkAAAAAAAAABcAAAAUAAAAAAAAAAAAAAD/fwAA/38AAAAAAAAJAAAABAAAAD0sAAAMAAAAEAAAAAAAAAAAAAAAAAAAAAAAAAAeAAAAaAAAAAAAAAAAAAAAAAAAAAAAAAAAAAAAECcAABAnAAAAAAAAAAAAAAAAAAAAAAAAAAAAAAAAAAAAAAAAAAAAABQAAAAAAAAAwMD/AAAAAABkAAAAMgAAAAAAAABkAAAAAAAAAH9/fwAKAAAAHwAAAFQAAACQwiYF////AQAAAAAAAAAAAAAAAAAAAAAAAAAAAAAAAAAAAAAAAAAAAAAAAn9/fwAsPEMDzMzMAMDA/wB/f38AAAAAAAAAAAAAAAAAAAAAAAAAAAAhAAAAGAAAABQAAADsEQAAzBMAACoaAACBFgAAEAAAACYAAAAIAAAA//////////8="/>
               </a:ext>
             </a:extLst>
           </p:cNvSpPr>
@@ -28777,7 +29358,7 @@
             <a:cxnSpLocks/>
             <a:extLst>
               <a:ext uri="smNativeData">
-                <pr:smNativeData xmlns="" xmlns:p14="http://schemas.microsoft.com/office/powerpoint/2010/main" xmlns:pr="smNativeData" val="SMDATA_13_w78LXxMAAAAlAAAADQAAAA0AAAAAkAAAAEgAAACQAAAASAAAAAAAAAAAAAAAAAAAAAEAAABQAAAAAAAAAAAA8L8AAAAAAAAAAAAAAAAAAPA/AAAAAAAA4D8AAAAAAADgPwAAAAAAAOA/AAAAAAAA4D8AAAAAAADgPwAAAAAAAOA/AAAAAAAA4D8CAAAAjAAAAAAAAAAAAAAAkMImDP///wgAAAAAAAAAAAAAAAAAAAAAAAAAAAAAAAAAAAAAZAAAAAEAAABAAAAAAAAAAAAAAAAAAAAAAAAAAAAAAAAAAAAAAAAAAAAAAAAAAAAAAAAAAAAAAAAAAAAAAAAAAAAAAAAAAAAAAAAAAAAAAAAAAAAAAAAAAAAAAAAAAAAAFAAAADwAAAABAAAAAAAAALRfBgAPAAAAAQAAACMAAAAjAAAAIwAAAB4AAAAAAAAASwAAAEsAAAACAAAAlgAAAJYAAAAVAAAAYAAAAAAAAAAAAAAADwAAACADAAAAAAAAAAAAAAEAAACgMgAAVgcAAKr4//8BAAAAf39/AAEAAABkAAAAAAAAABQAAABAHwAAAAAAACYAAAAAAAAAwOD//wAAAAAmAAAAZAAAABYAAABMAAAAAAAAAAAAAAAEAAAAAAAAAAEAAAAsPEMKAAAAACgAAAAoAAAAZAAAAGQAAAAAAAAAzMzMAAAAAABQAAAAUAAAAGQAAABkAAAAAAAAABcAAAAUAAAAAAAAAAAAAAD/fwAA/38AAAAAAAAJAAAABAAAAAY3AAAMAAAAEAAAAAAAAAAAAAAAAAAAAAAAAAAeAAAAaAAAAAAAAAAAAAAAAAAAAAAAAAAAAAAAECcAABAnAAAAAAAAAAAAAAAAAAAAAAAAAAAAAAAAAAAAAAAAAAAAABQAAAAAAAAAwMD/AAAAAABkAAAAMgAAAAAAAABkAAAAAAAAAH9/fwAKAAAAHwAAAFQAAACQwiYF////AQAAAAAAAAAAAAAAAAAAAAAAAAAAAAAAAAAAAAAAAAAAtF8GAH9/fwAsPEMDzMzMAMDA/wB/f38AAAAAAAAAAAAAAAAAAAAAAAAAAAAhAAAAGAAAABQAAADyFAAAHhEAAAsWAADMEwAAEAAAACYAAAAIAAAA//////////8="/>
+                <pr:smNativeData xmlns:pr="smNativeData" xmlns:p14="http://schemas.microsoft.com/office/powerpoint/2010/main" xmlns="" val="SMDATA_13_w78LXxMAAAAlAAAADQAAAA0AAAAAkAAAAEgAAACQAAAASAAAAAAAAAAAAAAAAAAAAAEAAABQAAAAAAAAAAAA8L8AAAAAAAAAAAAAAAAAAPA/AAAAAAAA4D8AAAAAAADgPwAAAAAAAOA/AAAAAAAA4D8AAAAAAADgPwAAAAAAAOA/AAAAAAAA4D8CAAAAjAAAAAAAAAAAAAAAkMImDP///wgAAAAAAAAAAAAAAAAAAAAAAAAAAAAAAAAAAAAAZAAAAAEAAABAAAAAAAAAAAAAAAAAAAAAAAAAAAAAAAAAAAAAAAAAAAAAAAAAAAAAAAAAAAAAAAAAAAAAAAAAAAAAAAAAAAAAAAAAAAAAAAAAAAAAAAAAAAAAAAAAAAAAFAAAADwAAAABAAAAAAAAALRfBgAPAAAAAQAAACMAAAAjAAAAIwAAAB4AAAAAAAAASwAAAEsAAAACAAAAlgAAAJYAAAAVAAAAYAAAAAAAAAAAAAAADwAAACADAAAAAAAAAAAAAAEAAACgMgAAVgcAAKr4//8BAAAAf39/AAEAAABkAAAAAAAAABQAAABAHwAAAAAAACYAAAAAAAAAwOD//wAAAAAmAAAAZAAAABYAAABMAAAAAAAAAAAAAAAEAAAAAAAAAAEAAAAsPEMKAAAAACgAAAAoAAAAZAAAAGQAAAAAAAAAzMzMAAAAAABQAAAAUAAAAGQAAABkAAAAAAAAABcAAAAUAAAAAAAAAAAAAAD/fwAA/38AAAAAAAAJAAAABAAAAAY3AAAMAAAAEAAAAAAAAAAAAAAAAAAAAAAAAAAeAAAAaAAAAAAAAAAAAAAAAAAAAAAAAAAAAAAAECcAABAnAAAAAAAAAAAAAAAAAAAAAAAAAAAAAAAAAAAAAAAAAAAAABQAAAAAAAAAwMD/AAAAAABkAAAAMgAAAAAAAABkAAAAAAAAAH9/fwAKAAAAHwAAAFQAAACQwiYF////AQAAAAAAAAAAAAAAAAAAAAAAAAAAAAAAAAAAAAAAAAAAtF8GAH9/fwAsPEMDzMzMAMDA/wB/f38AAAAAAAAAAAAAAAAAAAAAAAAAAAAhAAAAGAAAABQAAADyFAAAHhEAAAsWAADMEwAAEAAAACYAAAAIAAAA//////////8="/>
               </a:ext>
             </a:extLst>
           </p:cNvCxnSpPr>
@@ -28978,7 +29559,7 @@
           <p:cNvSpPr>
             <a:extLst>
               <a:ext uri="smNativeData">
-                <pr:smNativeData xmlns="" xmlns:p14="http://schemas.microsoft.com/office/powerpoint/2010/main" xmlns:pr="smNativeData" val="SMDATA_13_w78LXxMAAAAlAAAAZAAAAA0AAAAAkAAAAJAAAACQAAAAkAAAAAAAAAAAAAAAAAAAAAEAAABQAAAAAAAAAAAA4D8AAAAAAADgPwAAAAAAAOA/AAAAAAAA4D8AAAAAAADgPwAAAAAAAOA/AAAAAAAA4D8AAAAAAADgPwAAAAAAAOA/AAAAAAAA4D8CAAAAjAAAAAAAAAAAAAAAkMImDP///wgAAAAAAAAAAAAAAAAAAAAAAAAAAAAAAAAAAAAAZAAAAAEAAABAAAAAAAAAAAAAAAAAAAAAAAAAAAAAAAAAAAAAAAAAAAAAAAAAAAAAAAAAAAAAAAAAAAAAAAAAAAAAAAAAAAAAAAAAAAAAAAAAAAAAAAAAAAAAAAAAAAAAFAAAADwAAAAAAAAAAAAAAAAAAAkUAAAAAQAAABQAAAAUAAAAFAAAAAEAAAAAAAAAZAAAAGQAAAAAAAAAZAAAAGQAAAAVAAAAYAAAAAAAAAAAAAAADwAAACADAAAAAAAAAAAAAAEAAACgMgAAVgcAAKr4//8BAAAAf39/AAEAAABkAAAAAAAAABQAAABAHwAAAAAAACYAAAAAAAAAwOD//wAAAAAmAAAAZAAAABYAAABMAAAAAAAAAAAAAAAEAAAAAAAAAAEAAAAsPEMKAAAAACgAAAAoAAAAZAAAAGQAAAAAAAAAzMzMAAAAAABQAAAAUAAAAGQAAABkAAAAAAAAABcAAAAUAAAAAAAAAAAAAAD/fwAA/38AAAAAAAAJAAAABAAAAD0sAAAMAAAAEAAAAAAAAAAAAAAAAAAAAAAAAAAeAAAAaAAAAAAAAAAAAAAAAAAAAAAAAAAAAAAAECcAABAnAAAAAAAAAAAAAAAAAAAAAAAAAAAAAAAAAAAAAAAAAAAAABQAAAAAAAAAwMD/AAAAAABkAAAAMgAAAAAAAABkAAAAAAAAAH9/fwAKAAAAHwAAAFQAAACQwiYF////AQAAAAAAAAAAAAAAAAAAAAAAAAAAAAAAAAAAAAAAAAAAAAAAAn9/fwAsPEMDzMzMAMDA/wB/f38AAAAAAAAAAAAAAAAAAAAAAAAAAAAhAAAAGAAAABQAAADsEQAAzBMAACoaAACBFgAAEAAAACYAAAAIAAAA//////////8="/>
+                <pr:smNativeData xmlns:pr="smNativeData" xmlns:p14="http://schemas.microsoft.com/office/powerpoint/2010/main" xmlns="" val="SMDATA_13_w78LXxMAAAAlAAAAZAAAAA0AAAAAkAAAAJAAAACQAAAAkAAAAAAAAAAAAAAAAAAAAAEAAABQAAAAAAAAAAAA4D8AAAAAAADgPwAAAAAAAOA/AAAAAAAA4D8AAAAAAADgPwAAAAAAAOA/AAAAAAAA4D8AAAAAAADgPwAAAAAAAOA/AAAAAAAA4D8CAAAAjAAAAAAAAAAAAAAAkMImDP///wgAAAAAAAAAAAAAAAAAAAAAAAAAAAAAAAAAAAAAZAAAAAEAAABAAAAAAAAAAAAAAAAAAAAAAAAAAAAAAAAAAAAAAAAAAAAAAAAAAAAAAAAAAAAAAAAAAAAAAAAAAAAAAAAAAAAAAAAAAAAAAAAAAAAAAAAAAAAAAAAAAAAAFAAAADwAAAAAAAAAAAAAAAAAAAkUAAAAAQAAABQAAAAUAAAAFAAAAAEAAAAAAAAAZAAAAGQAAAAAAAAAZAAAAGQAAAAVAAAAYAAAAAAAAAAAAAAADwAAACADAAAAAAAAAAAAAAEAAACgMgAAVgcAAKr4//8BAAAAf39/AAEAAABkAAAAAAAAABQAAABAHwAAAAAAACYAAAAAAAAAwOD//wAAAAAmAAAAZAAAABYAAABMAAAAAAAAAAAAAAAEAAAAAAAAAAEAAAAsPEMKAAAAACgAAAAoAAAAZAAAAGQAAAAAAAAAzMzMAAAAAABQAAAAUAAAAGQAAABkAAAAAAAAABcAAAAUAAAAAAAAAAAAAAD/fwAA/38AAAAAAAAJAAAABAAAAD0sAAAMAAAAEAAAAAAAAAAAAAAAAAAAAAAAAAAeAAAAaAAAAAAAAAAAAAAAAAAAAAAAAAAAAAAAECcAABAnAAAAAAAAAAAAAAAAAAAAAAAAAAAAAAAAAAAAAAAAAAAAABQAAAAAAAAAwMD/AAAAAABkAAAAMgAAAAAAAABkAAAAAAAAAH9/fwAKAAAAHwAAAFQAAACQwiYF////AQAAAAAAAAAAAAAAAAAAAAAAAAAAAAAAAAAAAAAAAAAAAAAAAn9/fwAsPEMDzMzMAMDA/wB/f38AAAAAAAAAAAAAAAAAAAAAAAAAAAAhAAAAGAAAABQAAADsEQAAzBMAACoaAACBFgAAEAAAACYAAAAIAAAA//////////8="/>
               </a:ext>
             </a:extLst>
           </p:cNvSpPr>

</xml_diff>